<commit_message>
+ added LTG L00 slides * updated LTG Readme
</commit_message>
<xml_diff>
--- a/Emerging-Technologies-for-the-Circular-Economy/ETCE-L00-Organization.pptx
+++ b/Emerging-Technologies-for-the-Circular-Economy/ETCE-L00-Organization.pptx
@@ -275,7 +275,7 @@
           </a:bodyPr>
           <a:p>
             <a:pPr algn="r"/>
-            <a:fld id="{E84329BB-7B3E-4BC8-805B-BF6DBDF8F8AC}" type="slidenum">
+            <a:fld id="{5ECD46DA-4230-4046-84A8-61710A22EBCD}" type="slidenum">
               <a:rPr b="0" lang="en-US" sz="1400" spc="-1" strike="noStrike">
                 <a:latin typeface="Times New Roman"/>
               </a:rPr>
@@ -323,7 +323,7 @@
         <p:spPr>
           <a:xfrm>
             <a:off x="533520" y="763560"/>
-            <a:ext cx="6693480" cy="3761640"/>
+            <a:ext cx="6693120" cy="3761280"/>
           </a:xfrm>
           <a:prstGeom prst="rect">
             <a:avLst/>
@@ -343,7 +343,7 @@
         <p:spPr>
           <a:xfrm>
             <a:off x="777240" y="4777560"/>
-            <a:ext cx="6207120" cy="4515480"/>
+            <a:ext cx="6206760" cy="4515120"/>
           </a:xfrm>
           <a:prstGeom prst="rect">
             <a:avLst/>
@@ -369,7 +369,7 @@
         <p:spPr>
           <a:xfrm>
             <a:off x="4399200" y="9555480"/>
-            <a:ext cx="3362400" cy="492120"/>
+            <a:ext cx="3362040" cy="491760"/>
           </a:xfrm>
           <a:prstGeom prst="rect">
             <a:avLst/>
@@ -395,7 +395,7 @@
                 <a:spcPct val="100000"/>
               </a:lnSpc>
             </a:pPr>
-            <a:fld id="{2FB134E6-C436-49BB-9C1B-E31FE3CF26A9}" type="slidenum">
+            <a:fld id="{D3096E35-33F8-48D7-8CD7-658F8BE49151}" type="slidenum">
               <a:rPr b="0" lang="de-DE" sz="1800" spc="-1" strike="noStrike">
                 <a:solidFill>
                   <a:srgbClr val="000000"/>
@@ -446,7 +446,7 @@
         <p:spPr>
           <a:xfrm>
             <a:off x="533520" y="763560"/>
-            <a:ext cx="6693480" cy="3761640"/>
+            <a:ext cx="6693120" cy="3761280"/>
           </a:xfrm>
           <a:prstGeom prst="rect">
             <a:avLst/>
@@ -466,7 +466,7 @@
         <p:spPr>
           <a:xfrm>
             <a:off x="777240" y="4777560"/>
-            <a:ext cx="6207120" cy="4515480"/>
+            <a:ext cx="6206760" cy="4515120"/>
           </a:xfrm>
           <a:prstGeom prst="rect">
             <a:avLst/>
@@ -492,7 +492,7 @@
         <p:spPr>
           <a:xfrm>
             <a:off x="4399200" y="9555480"/>
-            <a:ext cx="3362400" cy="492120"/>
+            <a:ext cx="3362040" cy="491760"/>
           </a:xfrm>
           <a:prstGeom prst="rect">
             <a:avLst/>
@@ -518,7 +518,7 @@
                 <a:spcPct val="100000"/>
               </a:lnSpc>
             </a:pPr>
-            <a:fld id="{9DEB0B5D-DD2B-4C92-A778-316CB3527D41}" type="slidenum">
+            <a:fld id="{1860606C-2E9D-4576-A441-E663D91DC71A}" type="slidenum">
               <a:rPr b="0" lang="de-DE" sz="1800" spc="-1" strike="noStrike">
                 <a:solidFill>
                   <a:srgbClr val="000000"/>
@@ -569,7 +569,7 @@
         <p:spPr>
           <a:xfrm>
             <a:off x="533520" y="763560"/>
-            <a:ext cx="6693480" cy="3761640"/>
+            <a:ext cx="6693120" cy="3761280"/>
           </a:xfrm>
           <a:prstGeom prst="rect">
             <a:avLst/>
@@ -589,7 +589,7 @@
         <p:spPr>
           <a:xfrm>
             <a:off x="777240" y="4777560"/>
-            <a:ext cx="6207120" cy="4515480"/>
+            <a:ext cx="6206760" cy="4515120"/>
           </a:xfrm>
           <a:prstGeom prst="rect">
             <a:avLst/>
@@ -615,7 +615,7 @@
         <p:spPr>
           <a:xfrm>
             <a:off x="4399200" y="9555480"/>
-            <a:ext cx="3362400" cy="492120"/>
+            <a:ext cx="3362040" cy="491760"/>
           </a:xfrm>
           <a:prstGeom prst="rect">
             <a:avLst/>
@@ -641,7 +641,7 @@
                 <a:spcPct val="100000"/>
               </a:lnSpc>
             </a:pPr>
-            <a:fld id="{2A43621D-D98A-46B5-8BEE-EC0AF2C908A6}" type="slidenum">
+            <a:fld id="{B5E96E47-7C1B-4AF5-B2E1-4B50898BFB02}" type="slidenum">
               <a:rPr b="0" lang="de-DE" sz="1800" spc="-1" strike="noStrike">
                 <a:solidFill>
                   <a:srgbClr val="000000"/>
@@ -3407,7 +3407,7 @@
         <p:spPr>
           <a:xfrm>
             <a:off x="11444760" y="0"/>
-            <a:ext cx="741960" cy="6850800"/>
+            <a:ext cx="741600" cy="6850440"/>
           </a:xfrm>
           <a:prstGeom prst="rect">
             <a:avLst/>
@@ -3437,7 +3437,7 @@
         <p:spPr>
           <a:xfrm>
             <a:off x="11438640" y="6453360"/>
-            <a:ext cx="758880" cy="363960"/>
+            <a:ext cx="758520" cy="363960"/>
           </a:xfrm>
           <a:prstGeom prst="rect">
             <a:avLst/>
@@ -3463,7 +3463,7 @@
                 <a:spcPct val="100000"/>
               </a:lnSpc>
             </a:pPr>
-            <a:fld id="{C4E5637E-5E20-42AE-9016-582724A7AC05}" type="slidenum">
+            <a:fld id="{983A4D07-A85E-4391-887B-5A7861E955B2}" type="slidenum">
               <a:rPr b="0" lang="en-US" sz="1800" spc="-1" strike="noStrike">
                 <a:solidFill>
                   <a:srgbClr val="808080"/>
@@ -3488,7 +3488,7 @@
         <p:spPr>
           <a:xfrm>
             <a:off x="912240" y="1268280"/>
-            <a:ext cx="9208800" cy="362160"/>
+            <a:ext cx="9208440" cy="361800"/>
           </a:xfrm>
           <a:prstGeom prst="rect">
             <a:avLst/>
@@ -3518,7 +3518,7 @@
         <p:spPr>
           <a:xfrm>
             <a:off x="0" y="0"/>
-            <a:ext cx="3052800" cy="562680"/>
+            <a:ext cx="3052440" cy="562320"/>
           </a:xfrm>
           <a:prstGeom prst="rect">
             <a:avLst/>
@@ -3541,7 +3541,7 @@
         <p:spPr>
           <a:xfrm>
             <a:off x="7430400" y="134640"/>
-            <a:ext cx="3698640" cy="514800"/>
+            <a:ext cx="3698280" cy="514440"/>
           </a:xfrm>
           <a:prstGeom prst="rect">
             <a:avLst/>
@@ -3560,7 +3560,7 @@
         <p:spPr>
           <a:xfrm>
             <a:off x="912240" y="1268280"/>
-            <a:ext cx="9208800" cy="362160"/>
+            <a:ext cx="9208440" cy="361800"/>
           </a:xfrm>
           <a:prstGeom prst="rect">
             <a:avLst/>
@@ -3586,7 +3586,7 @@
         <p:spPr>
           <a:xfrm>
             <a:off x="11444760" y="0"/>
-            <a:ext cx="741960" cy="6850800"/>
+            <a:ext cx="741600" cy="6850440"/>
           </a:xfrm>
           <a:prstGeom prst="rect">
             <a:avLst/>
@@ -3616,7 +3616,7 @@
         <p:spPr>
           <a:xfrm>
             <a:off x="0" y="6642720"/>
-            <a:ext cx="12184920" cy="211320"/>
+            <a:ext cx="12184560" cy="211320"/>
           </a:xfrm>
           <a:prstGeom prst="rect">
             <a:avLst/>
@@ -3947,7 +3947,7 @@
         <p:spPr>
           <a:xfrm>
             <a:off x="11444760" y="0"/>
-            <a:ext cx="741960" cy="6850800"/>
+            <a:ext cx="741600" cy="6850440"/>
           </a:xfrm>
           <a:prstGeom prst="rect">
             <a:avLst/>
@@ -3977,7 +3977,7 @@
         <p:spPr>
           <a:xfrm>
             <a:off x="11438640" y="6453360"/>
-            <a:ext cx="758880" cy="363960"/>
+            <a:ext cx="758520" cy="363960"/>
           </a:xfrm>
           <a:prstGeom prst="rect">
             <a:avLst/>
@@ -4003,7 +4003,7 @@
                 <a:spcPct val="100000"/>
               </a:lnSpc>
             </a:pPr>
-            <a:fld id="{B7DDF3F0-3C03-49E0-AFB5-2AC1DFF078F1}" type="slidenum">
+            <a:fld id="{CA93730F-E943-4A7C-800F-456443448E77}" type="slidenum">
               <a:rPr b="0" lang="en-US" sz="1800" spc="-1" strike="noStrike">
                 <a:solidFill>
                   <a:srgbClr val="808080"/>
@@ -4028,7 +4028,7 @@
         <p:spPr>
           <a:xfrm>
             <a:off x="912240" y="1268280"/>
-            <a:ext cx="9208800" cy="362160"/>
+            <a:ext cx="9208440" cy="361800"/>
           </a:xfrm>
           <a:prstGeom prst="rect">
             <a:avLst/>
@@ -4058,7 +4058,7 @@
         <p:spPr>
           <a:xfrm>
             <a:off x="0" y="0"/>
-            <a:ext cx="3052800" cy="562680"/>
+            <a:ext cx="3052440" cy="562320"/>
           </a:xfrm>
           <a:prstGeom prst="rect">
             <a:avLst/>
@@ -4081,7 +4081,7 @@
         <p:spPr>
           <a:xfrm>
             <a:off x="7430400" y="134640"/>
-            <a:ext cx="3698640" cy="514800"/>
+            <a:ext cx="3698280" cy="514440"/>
           </a:xfrm>
           <a:prstGeom prst="rect">
             <a:avLst/>
@@ -4100,7 +4100,7 @@
         <p:spPr>
           <a:xfrm>
             <a:off x="11444760" y="0"/>
-            <a:ext cx="741960" cy="6850800"/>
+            <a:ext cx="741600" cy="6850440"/>
           </a:xfrm>
           <a:prstGeom prst="rect">
             <a:avLst/>
@@ -4130,7 +4130,7 @@
         <p:spPr>
           <a:xfrm>
             <a:off x="11438640" y="6453360"/>
-            <a:ext cx="758880" cy="363960"/>
+            <a:ext cx="758520" cy="363960"/>
           </a:xfrm>
           <a:prstGeom prst="rect">
             <a:avLst/>
@@ -4156,7 +4156,7 @@
                 <a:spcPct val="100000"/>
               </a:lnSpc>
             </a:pPr>
-            <a:fld id="{CF790835-D345-4872-A5AE-21C9E0B57641}" type="slidenum">
+            <a:fld id="{79FA8AE6-4C4F-4BE2-A321-727953DB9B24}" type="slidenum">
               <a:rPr b="0" lang="en-US" sz="1800" spc="-1" strike="noStrike">
                 <a:solidFill>
                   <a:srgbClr val="808080"/>
@@ -4181,7 +4181,7 @@
         <p:spPr>
           <a:xfrm>
             <a:off x="0" y="6642720"/>
-            <a:ext cx="12184920" cy="211320"/>
+            <a:ext cx="12184560" cy="211320"/>
           </a:xfrm>
           <a:prstGeom prst="rect">
             <a:avLst/>
@@ -4505,7 +4505,7 @@
         <p:spPr>
           <a:xfrm>
             <a:off x="527400" y="1412640"/>
-            <a:ext cx="10361880" cy="1148400"/>
+            <a:ext cx="10361520" cy="1148040"/>
           </a:xfrm>
           <a:prstGeom prst="rect">
             <a:avLst/>
@@ -4556,7 +4556,7 @@
         <p:spPr>
           <a:xfrm>
             <a:off x="527400" y="2852640"/>
-            <a:ext cx="10361880" cy="2369160"/>
+            <a:ext cx="10361520" cy="2368800"/>
           </a:xfrm>
           <a:prstGeom prst="rect">
             <a:avLst/>
@@ -4769,7 +4769,7 @@
         <p:spPr>
           <a:xfrm>
             <a:off x="335520" y="764640"/>
-            <a:ext cx="10746000" cy="496800"/>
+            <a:ext cx="10745640" cy="496440"/>
           </a:xfrm>
           <a:prstGeom prst="rect">
             <a:avLst/>
@@ -4830,7 +4830,7 @@
         <p:spPr>
           <a:xfrm>
             <a:off x="335520" y="2408400"/>
-            <a:ext cx="10746000" cy="3893760"/>
+            <a:ext cx="10745640" cy="3893400"/>
           </a:xfrm>
           <a:prstGeom prst="rect">
             <a:avLst/>
@@ -4851,7 +4851,7 @@
             <a:noAutofit/>
           </a:bodyPr>
           <a:p>
-            <a:pPr marL="195120" indent="-191520">
+            <a:pPr marL="195120" indent="-191160">
               <a:lnSpc>
                 <a:spcPct val="100000"/>
               </a:lnSpc>
@@ -4880,7 +4880,7 @@
             </a:endParaRPr>
           </a:p>
           <a:p>
-            <a:pPr marL="195120" indent="-191520">
+            <a:pPr marL="195120" indent="-191160">
               <a:lnSpc>
                 <a:spcPct val="100000"/>
               </a:lnSpc>
@@ -4909,7 +4909,7 @@
             </a:endParaRPr>
           </a:p>
           <a:p>
-            <a:pPr marL="195120" indent="-191520">
+            <a:pPr marL="195120" indent="-191160">
               <a:lnSpc>
                 <a:spcPct val="100000"/>
               </a:lnSpc>
@@ -4938,7 +4938,7 @@
             </a:endParaRPr>
           </a:p>
           <a:p>
-            <a:pPr marL="195120" indent="-191520">
+            <a:pPr marL="195120" indent="-191160">
               <a:lnSpc>
                 <a:spcPct val="100000"/>
               </a:lnSpc>
@@ -5007,7 +5007,7 @@
         <p:spPr>
           <a:xfrm>
             <a:off x="335520" y="764640"/>
-            <a:ext cx="10746000" cy="496800"/>
+            <a:ext cx="10745640" cy="496440"/>
           </a:xfrm>
           <a:prstGeom prst="rect">
             <a:avLst/>
@@ -5058,7 +5058,7 @@
         <p:spPr>
           <a:xfrm>
             <a:off x="335520" y="2408400"/>
-            <a:ext cx="10746000" cy="3893760"/>
+            <a:ext cx="10745640" cy="3893400"/>
           </a:xfrm>
           <a:prstGeom prst="rect">
             <a:avLst/>
@@ -5079,7 +5079,7 @@
             <a:noAutofit/>
           </a:bodyPr>
           <a:p>
-            <a:pPr marL="195120" indent="-191520">
+            <a:pPr marL="195120" indent="-191160">
               <a:lnSpc>
                 <a:spcPct val="100000"/>
               </a:lnSpc>
@@ -5108,7 +5108,7 @@
             </a:endParaRPr>
           </a:p>
           <a:p>
-            <a:pPr marL="195120" indent="-191520">
+            <a:pPr marL="195120" indent="-191160">
               <a:lnSpc>
                 <a:spcPct val="100000"/>
               </a:lnSpc>
@@ -5137,7 +5137,7 @@
             </a:endParaRPr>
           </a:p>
           <a:p>
-            <a:pPr marL="195120" indent="-191520">
+            <a:pPr marL="195120" indent="-191160">
               <a:lnSpc>
                 <a:spcPct val="100000"/>
               </a:lnSpc>
@@ -5166,7 +5166,7 @@
             </a:endParaRPr>
           </a:p>
           <a:p>
-            <a:pPr marL="195120" indent="-191520">
+            <a:pPr marL="195120" indent="-191160">
               <a:lnSpc>
                 <a:spcPct val="100000"/>
               </a:lnSpc>
@@ -5195,7 +5195,7 @@
             </a:endParaRPr>
           </a:p>
           <a:p>
-            <a:pPr marL="195120" indent="-191520">
+            <a:pPr marL="195120" indent="-191160">
               <a:lnSpc>
                 <a:spcPct val="100000"/>
               </a:lnSpc>
@@ -5264,7 +5264,7 @@
         <p:spPr>
           <a:xfrm>
             <a:off x="335520" y="764640"/>
-            <a:ext cx="10746000" cy="496800"/>
+            <a:ext cx="10745640" cy="496440"/>
           </a:xfrm>
           <a:prstGeom prst="rect">
             <a:avLst/>
@@ -5325,7 +5325,7 @@
         <p:spPr>
           <a:xfrm>
             <a:off x="335520" y="2408400"/>
-            <a:ext cx="10746000" cy="3893760"/>
+            <a:ext cx="10745640" cy="3893400"/>
           </a:xfrm>
           <a:prstGeom prst="rect">
             <a:avLst/>
@@ -5346,7 +5346,7 @@
             <a:noAutofit/>
           </a:bodyPr>
           <a:p>
-            <a:pPr marL="195120" indent="-191520">
+            <a:pPr marL="195120" indent="-191160">
               <a:lnSpc>
                 <a:spcPct val="100000"/>
               </a:lnSpc>
@@ -5375,7 +5375,7 @@
             </a:endParaRPr>
           </a:p>
           <a:p>
-            <a:pPr marL="195120" indent="-191520">
+            <a:pPr marL="195120" indent="-191160">
               <a:lnSpc>
                 <a:spcPct val="100000"/>
               </a:lnSpc>
@@ -5404,7 +5404,7 @@
             </a:endParaRPr>
           </a:p>
           <a:p>
-            <a:pPr marL="195120" indent="-191520">
+            <a:pPr marL="195120" indent="-191160">
               <a:lnSpc>
                 <a:spcPct val="100000"/>
               </a:lnSpc>
@@ -5433,7 +5433,7 @@
             </a:endParaRPr>
           </a:p>
           <a:p>
-            <a:pPr marL="195120" indent="-191520">
+            <a:pPr marL="195120" indent="-191160">
               <a:lnSpc>
                 <a:spcPct val="100000"/>
               </a:lnSpc>
@@ -5462,7 +5462,7 @@
             </a:endParaRPr>
           </a:p>
           <a:p>
-            <a:pPr marL="195120" indent="-191520">
+            <a:pPr marL="195120" indent="-191160">
               <a:lnSpc>
                 <a:spcPct val="100000"/>
               </a:lnSpc>
@@ -5491,7 +5491,7 @@
             </a:endParaRPr>
           </a:p>
           <a:p>
-            <a:pPr marL="195120" indent="-191520">
+            <a:pPr marL="195120" indent="-191160">
               <a:lnSpc>
                 <a:spcPct val="100000"/>
               </a:lnSpc>
@@ -5560,7 +5560,7 @@
         <p:spPr>
           <a:xfrm>
             <a:off x="335520" y="764640"/>
-            <a:ext cx="10746000" cy="496800"/>
+            <a:ext cx="10745640" cy="496440"/>
           </a:xfrm>
           <a:prstGeom prst="rect">
             <a:avLst/>
@@ -5611,7 +5611,7 @@
         <p:spPr>
           <a:xfrm>
             <a:off x="335520" y="1268640"/>
-            <a:ext cx="10746000" cy="5033520"/>
+            <a:ext cx="10745640" cy="5033160"/>
           </a:xfrm>
           <a:prstGeom prst="rect">
             <a:avLst/>
@@ -5632,7 +5632,7 @@
             <a:noAutofit/>
           </a:bodyPr>
           <a:p>
-            <a:pPr marL="195120" indent="-191520">
+            <a:pPr marL="195120" indent="-191160">
               <a:lnSpc>
                 <a:spcPct val="100000"/>
               </a:lnSpc>
@@ -5661,7 +5661,7 @@
             </a:endParaRPr>
           </a:p>
           <a:p>
-            <a:pPr marL="195120" indent="-191520">
+            <a:pPr marL="195120" indent="-191160">
               <a:lnSpc>
                 <a:spcPct val="100000"/>
               </a:lnSpc>
@@ -5690,7 +5690,7 @@
             </a:endParaRPr>
           </a:p>
           <a:p>
-            <a:pPr marL="195120" indent="-191520">
+            <a:pPr marL="195120" indent="-191160">
               <a:lnSpc>
                 <a:spcPct val="100000"/>
               </a:lnSpc>
@@ -5719,7 +5719,7 @@
             </a:endParaRPr>
           </a:p>
           <a:p>
-            <a:pPr marL="195120" indent="-191520">
+            <a:pPr marL="195120" indent="-191160">
               <a:lnSpc>
                 <a:spcPct val="100000"/>
               </a:lnSpc>
@@ -5748,7 +5748,7 @@
             </a:endParaRPr>
           </a:p>
           <a:p>
-            <a:pPr marL="195120" indent="-191520">
+            <a:pPr marL="195120" indent="-191160">
               <a:lnSpc>
                 <a:spcPct val="100000"/>
               </a:lnSpc>
@@ -5777,7 +5777,7 @@
             </a:endParaRPr>
           </a:p>
           <a:p>
-            <a:pPr marL="195120" indent="-191520">
+            <a:pPr marL="195120" indent="-191160">
               <a:lnSpc>
                 <a:spcPct val="100000"/>
               </a:lnSpc>
@@ -5806,7 +5806,7 @@
             </a:endParaRPr>
           </a:p>
           <a:p>
-            <a:pPr marL="195120" indent="-191520">
+            <a:pPr marL="195120" indent="-191160">
               <a:lnSpc>
                 <a:spcPct val="100000"/>
               </a:lnSpc>
@@ -5835,7 +5835,7 @@
             </a:endParaRPr>
           </a:p>
           <a:p>
-            <a:pPr marL="195120" indent="-191520">
+            <a:pPr marL="195120" indent="-191160">
               <a:lnSpc>
                 <a:spcPct val="100000"/>
               </a:lnSpc>
@@ -5864,7 +5864,7 @@
             </a:endParaRPr>
           </a:p>
           <a:p>
-            <a:pPr marL="195120" indent="-191520">
+            <a:pPr marL="195120" indent="-191160">
               <a:lnSpc>
                 <a:spcPct val="100000"/>
               </a:lnSpc>
@@ -5893,7 +5893,7 @@
             </a:endParaRPr>
           </a:p>
           <a:p>
-            <a:pPr marL="195120" indent="-191520">
+            <a:pPr marL="195120" indent="-191160">
               <a:lnSpc>
                 <a:spcPct val="100000"/>
               </a:lnSpc>
@@ -5922,7 +5922,7 @@
             </a:endParaRPr>
           </a:p>
           <a:p>
-            <a:pPr marL="195120" indent="-191520">
+            <a:pPr marL="195120" indent="-191160">
               <a:lnSpc>
                 <a:spcPct val="100000"/>
               </a:lnSpc>
@@ -5951,7 +5951,7 @@
             </a:endParaRPr>
           </a:p>
           <a:p>
-            <a:pPr marL="195120" indent="-191520">
+            <a:pPr marL="195120" indent="-191160">
               <a:lnSpc>
                 <a:spcPct val="100000"/>
               </a:lnSpc>
@@ -5980,7 +5980,7 @@
             </a:endParaRPr>
           </a:p>
           <a:p>
-            <a:pPr marL="195120" indent="-191520">
+            <a:pPr marL="195120" indent="-191160">
               <a:lnSpc>
                 <a:spcPct val="100000"/>
               </a:lnSpc>
@@ -6009,7 +6009,7 @@
             </a:endParaRPr>
           </a:p>
           <a:p>
-            <a:pPr marL="195120" indent="-191520">
+            <a:pPr marL="195120" indent="-191160">
               <a:lnSpc>
                 <a:spcPct val="100000"/>
               </a:lnSpc>
@@ -6099,7 +6099,7 @@
         <p:spPr>
           <a:xfrm>
             <a:off x="335520" y="764640"/>
-            <a:ext cx="10746000" cy="496800"/>
+            <a:ext cx="10745640" cy="496440"/>
           </a:xfrm>
           <a:prstGeom prst="rect">
             <a:avLst/>
@@ -6150,7 +6150,7 @@
         <p:spPr>
           <a:xfrm>
             <a:off x="335520" y="1268640"/>
-            <a:ext cx="10746000" cy="5033520"/>
+            <a:ext cx="10745640" cy="5033160"/>
           </a:xfrm>
           <a:prstGeom prst="rect">
             <a:avLst/>
@@ -6171,7 +6171,7 @@
             <a:noAutofit/>
           </a:bodyPr>
           <a:p>
-            <a:pPr marL="195120" indent="-191520">
+            <a:pPr marL="195120" indent="-191160">
               <a:lnSpc>
                 <a:spcPct val="100000"/>
               </a:lnSpc>
@@ -6220,7 +6220,7 @@
             </a:endParaRPr>
           </a:p>
           <a:p>
-            <a:pPr marL="195120" indent="-191520">
+            <a:pPr marL="195120" indent="-191160">
               <a:lnSpc>
                 <a:spcPct val="100000"/>
               </a:lnSpc>
@@ -6269,7 +6269,7 @@
             </a:endParaRPr>
           </a:p>
           <a:p>
-            <a:pPr marL="195120" indent="-191520">
+            <a:pPr marL="195120" indent="-191160">
               <a:lnSpc>
                 <a:spcPct val="100000"/>
               </a:lnSpc>
@@ -6318,7 +6318,7 @@
             </a:endParaRPr>
           </a:p>
           <a:p>
-            <a:pPr marL="195120" indent="-191520">
+            <a:pPr marL="195120" indent="-191160">
               <a:lnSpc>
                 <a:spcPct val="100000"/>
               </a:lnSpc>
@@ -6367,7 +6367,7 @@
             </a:endParaRPr>
           </a:p>
           <a:p>
-            <a:pPr marL="195120" indent="-191520">
+            <a:pPr marL="195120" indent="-191160">
               <a:lnSpc>
                 <a:spcPct val="100000"/>
               </a:lnSpc>
@@ -6416,7 +6416,7 @@
             </a:endParaRPr>
           </a:p>
           <a:p>
-            <a:pPr marL="195120" indent="-191520">
+            <a:pPr marL="195120" indent="-191160">
               <a:lnSpc>
                 <a:spcPct val="100000"/>
               </a:lnSpc>
@@ -6485,7 +6485,7 @@
             </a:endParaRPr>
           </a:p>
           <a:p>
-            <a:pPr marL="195120" indent="-191520">
+            <a:pPr marL="195120" indent="-191160">
               <a:lnSpc>
                 <a:spcPct val="100000"/>
               </a:lnSpc>
@@ -6534,7 +6534,7 @@
             </a:endParaRPr>
           </a:p>
           <a:p>
-            <a:pPr marL="195120" indent="-191520">
+            <a:pPr marL="195120" indent="-191160">
               <a:lnSpc>
                 <a:spcPct val="100000"/>
               </a:lnSpc>
@@ -6583,7 +6583,7 @@
             </a:endParaRPr>
           </a:p>
           <a:p>
-            <a:pPr marL="195120" indent="-191520">
+            <a:pPr marL="195120" indent="-191160">
               <a:lnSpc>
                 <a:spcPct val="100000"/>
               </a:lnSpc>
@@ -6632,7 +6632,7 @@
             </a:endParaRPr>
           </a:p>
           <a:p>
-            <a:pPr marL="195120" indent="-191520">
+            <a:pPr marL="195120" indent="-191160">
               <a:lnSpc>
                 <a:spcPct val="100000"/>
               </a:lnSpc>
@@ -6721,7 +6721,7 @@
         <p:spPr>
           <a:xfrm>
             <a:off x="335520" y="764640"/>
-            <a:ext cx="10746000" cy="496800"/>
+            <a:ext cx="10745640" cy="496440"/>
           </a:xfrm>
           <a:prstGeom prst="rect">
             <a:avLst/>
@@ -6772,7 +6772,7 @@
         <p:spPr>
           <a:xfrm>
             <a:off x="335520" y="1268280"/>
-            <a:ext cx="10746000" cy="5033520"/>
+            <a:ext cx="10745640" cy="5033160"/>
           </a:xfrm>
           <a:prstGeom prst="rect">
             <a:avLst/>
@@ -6793,7 +6793,7 @@
             <a:noAutofit/>
           </a:bodyPr>
           <a:p>
-            <a:pPr marL="195120" indent="-191520">
+            <a:pPr marL="195120" indent="-191160">
               <a:lnSpc>
                 <a:spcPct val="100000"/>
               </a:lnSpc>
@@ -6835,7 +6835,7 @@
             </a:endParaRPr>
           </a:p>
           <a:p>
-            <a:pPr marL="195120" indent="-191520">
+            <a:pPr marL="195120" indent="-191160">
               <a:lnSpc>
                 <a:spcPct val="100000"/>
               </a:lnSpc>
@@ -6864,7 +6864,7 @@
             </a:endParaRPr>
           </a:p>
           <a:p>
-            <a:pPr lvl="1" marL="652320" indent="-191520">
+            <a:pPr lvl="1" marL="652320" indent="-191160">
               <a:lnSpc>
                 <a:spcPct val="100000"/>
               </a:lnSpc>
@@ -6915,7 +6915,7 @@
             </a:endParaRPr>
           </a:p>
           <a:p>
-            <a:pPr lvl="3" marL="864000" indent="-213840">
+            <a:pPr lvl="3" marL="864000" indent="-213480">
               <a:lnSpc>
                 <a:spcPct val="100000"/>
               </a:lnSpc>
@@ -6944,7 +6944,7 @@
             </a:endParaRPr>
           </a:p>
           <a:p>
-            <a:pPr lvl="1" marL="652320" indent="-191520">
+            <a:pPr lvl="1" marL="652320" indent="-191160">
               <a:lnSpc>
                 <a:spcPct val="100000"/>
               </a:lnSpc>
@@ -6973,7 +6973,7 @@
             </a:endParaRPr>
           </a:p>
           <a:p>
-            <a:pPr lvl="1" marL="652320" indent="-191520">
+            <a:pPr lvl="1" marL="652320" indent="-191160">
               <a:lnSpc>
                 <a:spcPct val="100000"/>
               </a:lnSpc>
@@ -7002,7 +7002,7 @@
             </a:endParaRPr>
           </a:p>
           <a:p>
-            <a:pPr lvl="1" marL="652320" indent="-191520">
+            <a:pPr lvl="1" marL="652320" indent="-191160">
               <a:lnSpc>
                 <a:spcPct val="100000"/>
               </a:lnSpc>
@@ -7202,7 +7202,7 @@
         <p:spPr>
           <a:xfrm>
             <a:off x="335520" y="764640"/>
-            <a:ext cx="10744560" cy="495360"/>
+            <a:ext cx="10744200" cy="495000"/>
           </a:xfrm>
           <a:prstGeom prst="rect">
             <a:avLst/>
@@ -7273,7 +7273,7 @@
         <p:spPr>
           <a:xfrm>
             <a:off x="335520" y="1268640"/>
-            <a:ext cx="10744560" cy="5032080"/>
+            <a:ext cx="10744200" cy="5031720"/>
           </a:xfrm>
           <a:prstGeom prst="rect">
             <a:avLst/>
@@ -7294,7 +7294,7 @@
             <a:noAutofit/>
           </a:bodyPr>
           <a:p>
-            <a:pPr marL="195120" indent="-190440">
+            <a:pPr marL="195120" indent="-190080">
               <a:lnSpc>
                 <a:spcPct val="100000"/>
               </a:lnSpc>
@@ -7334,7 +7334,7 @@
             </a:endParaRPr>
           </a:p>
           <a:p>
-            <a:pPr lvl="1" marL="432000" indent="-213120">
+            <a:pPr lvl="1" marL="432000" indent="-212760">
               <a:lnSpc>
                 <a:spcPct val="100000"/>
               </a:lnSpc>
@@ -7383,7 +7383,7 @@
             </a:endParaRPr>
           </a:p>
           <a:p>
-            <a:pPr lvl="1" marL="432000" indent="-213120">
+            <a:pPr lvl="1" marL="432000" indent="-212760">
               <a:lnSpc>
                 <a:spcPct val="100000"/>
               </a:lnSpc>
@@ -7425,7 +7425,7 @@
             </a:endParaRPr>
           </a:p>
           <a:p>
-            <a:pPr marL="195120" indent="-190440">
+            <a:pPr marL="195120" indent="-190080">
               <a:lnSpc>
                 <a:spcPct val="100000"/>
               </a:lnSpc>
@@ -7455,7 +7455,7 @@
             </a:endParaRPr>
           </a:p>
           <a:p>
-            <a:pPr lvl="1" marL="432000" indent="-213120">
+            <a:pPr lvl="1" marL="432000" indent="-212760">
               <a:lnSpc>
                 <a:spcPct val="100000"/>
               </a:lnSpc>
@@ -7544,7 +7544,7 @@
             </a:endParaRPr>
           </a:p>
           <a:p>
-            <a:pPr lvl="1" marL="432000" indent="-213120">
+            <a:pPr lvl="1" marL="432000" indent="-212760">
               <a:lnSpc>
                 <a:spcPct val="100000"/>
               </a:lnSpc>
@@ -7608,7 +7608,7 @@
             </a:endParaRPr>
           </a:p>
           <a:p>
-            <a:pPr marL="195120" indent="-190440">
+            <a:pPr marL="195120" indent="-190080">
               <a:lnSpc>
                 <a:spcPct val="100000"/>
               </a:lnSpc>
@@ -7638,7 +7638,7 @@
             </a:endParaRPr>
           </a:p>
           <a:p>
-            <a:pPr lvl="1" marL="432000" indent="-213120">
+            <a:pPr lvl="1" marL="432000" indent="-212760">
               <a:lnSpc>
                 <a:spcPct val="100000"/>
               </a:lnSpc>
@@ -7727,7 +7727,7 @@
             </a:endParaRPr>
           </a:p>
           <a:p>
-            <a:pPr lvl="1" marL="432000" indent="-213120">
+            <a:pPr lvl="1" marL="432000" indent="-212760">
               <a:lnSpc>
                 <a:spcPct val="100000"/>
               </a:lnSpc>
@@ -7818,7 +7818,7 @@
         <p:spPr>
           <a:xfrm>
             <a:off x="335520" y="764640"/>
-            <a:ext cx="10746000" cy="496800"/>
+            <a:ext cx="10745640" cy="496440"/>
           </a:xfrm>
           <a:prstGeom prst="rect">
             <a:avLst/>
@@ -7869,7 +7869,7 @@
         <p:spPr>
           <a:xfrm>
             <a:off x="335520" y="1268280"/>
-            <a:ext cx="10746000" cy="5033520"/>
+            <a:ext cx="10745640" cy="5033160"/>
           </a:xfrm>
           <a:prstGeom prst="rect">
             <a:avLst/>
@@ -7900,7 +7900,7 @@
             </a:endParaRPr>
           </a:p>
           <a:p>
-            <a:pPr marL="195120" indent="-191520">
+            <a:pPr marL="195120" indent="-191160">
               <a:lnSpc>
                 <a:spcPct val="100000"/>
               </a:lnSpc>
@@ -7969,7 +7969,7 @@
             </a:endParaRPr>
           </a:p>
           <a:p>
-            <a:pPr marL="195120" indent="-191520">
+            <a:pPr marL="195120" indent="-191160">
               <a:lnSpc>
                 <a:spcPct val="100000"/>
               </a:lnSpc>
@@ -7998,7 +7998,7 @@
             </a:endParaRPr>
           </a:p>
           <a:p>
-            <a:pPr marL="195120" indent="-191520">
+            <a:pPr marL="195120" indent="-191160">
               <a:lnSpc>
                 <a:spcPct val="100000"/>
               </a:lnSpc>
@@ -8027,7 +8027,7 @@
             </a:endParaRPr>
           </a:p>
           <a:p>
-            <a:pPr marL="195120" indent="-191520">
+            <a:pPr marL="195120" indent="-191160">
               <a:lnSpc>
                 <a:spcPct val="100000"/>
               </a:lnSpc>
@@ -8056,7 +8056,7 @@
             </a:endParaRPr>
           </a:p>
           <a:p>
-            <a:pPr marL="195120" indent="-191520">
+            <a:pPr marL="195120" indent="-191160">
               <a:lnSpc>
                 <a:spcPct val="100000"/>
               </a:lnSpc>
@@ -8115,7 +8115,7 @@
             </a:endParaRPr>
           </a:p>
           <a:p>
-            <a:pPr marL="195120" indent="-191520">
+            <a:pPr marL="195120" indent="-191160">
               <a:lnSpc>
                 <a:spcPct val="100000"/>
               </a:lnSpc>
@@ -8145,7 +8145,7 @@
             </a:endParaRPr>
           </a:p>
           <a:p>
-            <a:pPr marL="195120" indent="-191520">
+            <a:pPr marL="195120" indent="-191160">
               <a:lnSpc>
                 <a:spcPct val="100000"/>
               </a:lnSpc>
@@ -8174,7 +8174,7 @@
             </a:endParaRPr>
           </a:p>
           <a:p>
-            <a:pPr marL="195120" indent="-191520">
+            <a:pPr marL="195120" indent="-191160">
               <a:lnSpc>
                 <a:spcPct val="100000"/>
               </a:lnSpc>
@@ -8243,7 +8243,7 @@
         <p:spPr>
           <a:xfrm>
             <a:off x="335520" y="764640"/>
-            <a:ext cx="10746000" cy="496800"/>
+            <a:ext cx="10745640" cy="496440"/>
           </a:xfrm>
           <a:prstGeom prst="rect">
             <a:avLst/>
@@ -8294,7 +8294,7 @@
         <p:spPr>
           <a:xfrm>
             <a:off x="335520" y="1268280"/>
-            <a:ext cx="10746000" cy="5033520"/>
+            <a:ext cx="10745640" cy="5033160"/>
           </a:xfrm>
           <a:prstGeom prst="rect">
             <a:avLst/>
@@ -8315,7 +8315,7 @@
             <a:noAutofit/>
           </a:bodyPr>
           <a:p>
-            <a:pPr marL="216000" indent="-215640">
+            <a:pPr marL="216000" indent="-215280">
               <a:lnSpc>
                 <a:spcPct val="100000"/>
               </a:lnSpc>
@@ -8341,7 +8341,7 @@
             </a:endParaRPr>
           </a:p>
           <a:p>
-            <a:pPr lvl="1" marL="432000" indent="-215640">
+            <a:pPr lvl="1" marL="432000" indent="-215280">
               <a:lnSpc>
                 <a:spcPct val="100000"/>
               </a:lnSpc>
@@ -8370,7 +8370,7 @@
             </a:endParaRPr>
           </a:p>
           <a:p>
-            <a:pPr lvl="1" marL="432000" indent="-215640">
+            <a:pPr lvl="1" marL="432000" indent="-215280">
               <a:lnSpc>
                 <a:spcPct val="100000"/>
               </a:lnSpc>
@@ -8399,7 +8399,7 @@
             </a:endParaRPr>
           </a:p>
           <a:p>
-            <a:pPr lvl="1" marL="432000" indent="-215640">
+            <a:pPr lvl="1" marL="432000" indent="-215280">
               <a:lnSpc>
                 <a:spcPct val="100000"/>
               </a:lnSpc>
@@ -8428,7 +8428,7 @@
             </a:endParaRPr>
           </a:p>
           <a:p>
-            <a:pPr lvl="1" marL="432000" indent="-215640">
+            <a:pPr lvl="1" marL="432000" indent="-215280">
               <a:lnSpc>
                 <a:spcPct val="100000"/>
               </a:lnSpc>
@@ -8457,7 +8457,7 @@
             </a:endParaRPr>
           </a:p>
           <a:p>
-            <a:pPr lvl="1" marL="432000" indent="-215640">
+            <a:pPr lvl="1" marL="432000" indent="-215280">
               <a:lnSpc>
                 <a:spcPct val="100000"/>
               </a:lnSpc>
@@ -8526,7 +8526,7 @@
         <p:spPr>
           <a:xfrm>
             <a:off x="335520" y="764640"/>
-            <a:ext cx="10746000" cy="496800"/>
+            <a:ext cx="10745640" cy="496440"/>
           </a:xfrm>
           <a:prstGeom prst="rect">
             <a:avLst/>
@@ -8577,7 +8577,7 @@
         <p:spPr>
           <a:xfrm>
             <a:off x="335520" y="1268640"/>
-            <a:ext cx="10746000" cy="5033520"/>
+            <a:ext cx="10745640" cy="5033160"/>
           </a:xfrm>
           <a:prstGeom prst="rect">
             <a:avLst/>
@@ -8598,7 +8598,7 @@
             <a:noAutofit/>
           </a:bodyPr>
           <a:p>
-            <a:pPr marL="216000" indent="-215640">
+            <a:pPr marL="216000" indent="-215280">
               <a:lnSpc>
                 <a:spcPct val="100000"/>
               </a:lnSpc>
@@ -8627,7 +8627,7 @@
             </a:endParaRPr>
           </a:p>
           <a:p>
-            <a:pPr marL="216000" indent="-215640">
+            <a:pPr marL="216000" indent="-215280">
               <a:lnSpc>
                 <a:spcPct val="100000"/>
               </a:lnSpc>
@@ -8656,7 +8656,7 @@
             </a:endParaRPr>
           </a:p>
           <a:p>
-            <a:pPr marL="216000" indent="-215640">
+            <a:pPr marL="216000" indent="-215280">
               <a:lnSpc>
                 <a:spcPct val="100000"/>
               </a:lnSpc>
@@ -8705,7 +8705,7 @@
             </a:endParaRPr>
           </a:p>
           <a:p>
-            <a:pPr lvl="1" marL="432000" indent="-215640">
+            <a:pPr lvl="1" marL="432000" indent="-215280">
               <a:lnSpc>
                 <a:spcPct val="100000"/>
               </a:lnSpc>
@@ -8734,7 +8734,7 @@
             </a:endParaRPr>
           </a:p>
           <a:p>
-            <a:pPr lvl="1" marL="432000" indent="-215640">
+            <a:pPr lvl="1" marL="432000" indent="-215280">
               <a:lnSpc>
                 <a:spcPct val="100000"/>
               </a:lnSpc>
@@ -8793,7 +8793,7 @@
         <p:spPr>
           <a:xfrm>
             <a:off x="4655880" y="476640"/>
-            <a:ext cx="2432160" cy="358200"/>
+            <a:ext cx="2431800" cy="357840"/>
           </a:xfrm>
           <a:prstGeom prst="rect">
             <a:avLst/>
@@ -8849,7 +8849,7 @@
         <p:spPr>
           <a:xfrm>
             <a:off x="335520" y="764640"/>
-            <a:ext cx="10743840" cy="494640"/>
+            <a:ext cx="10743480" cy="494280"/>
           </a:xfrm>
           <a:prstGeom prst="rect">
             <a:avLst/>
@@ -8900,7 +8900,7 @@
         <p:spPr>
           <a:xfrm>
             <a:off x="335520" y="1268640"/>
-            <a:ext cx="10743840" cy="5031360"/>
+            <a:ext cx="10743480" cy="5031000"/>
           </a:xfrm>
           <a:prstGeom prst="rect">
             <a:avLst/>
@@ -8957,7 +8957,7 @@
         <p:spPr>
           <a:xfrm>
             <a:off x="336600" y="3429000"/>
-            <a:ext cx="10861560" cy="2053440"/>
+            <a:ext cx="10861200" cy="2053080"/>
           </a:xfrm>
           <a:prstGeom prst="rect">
             <a:avLst/>
@@ -8978,7 +8978,7 @@
             <a:noAutofit/>
           </a:bodyPr>
           <a:p>
-            <a:pPr marL="216000" indent="-214560">
+            <a:pPr marL="216000" indent="-214200">
               <a:lnSpc>
                 <a:spcPct val="100000"/>
               </a:lnSpc>
@@ -9052,7 +9052,7 @@
             </a:endParaRPr>
           </a:p>
           <a:p>
-            <a:pPr marL="216000" indent="-214560">
+            <a:pPr marL="216000" indent="-214200">
               <a:lnSpc>
                 <a:spcPct val="100000"/>
               </a:lnSpc>
@@ -9146,7 +9146,7 @@
         <p:spPr>
           <a:xfrm>
             <a:off x="335520" y="764640"/>
-            <a:ext cx="10746000" cy="496800"/>
+            <a:ext cx="10745640" cy="496440"/>
           </a:xfrm>
           <a:prstGeom prst="rect">
             <a:avLst/>
@@ -9197,7 +9197,7 @@
         <p:spPr>
           <a:xfrm>
             <a:off x="335520" y="1268640"/>
-            <a:ext cx="10746000" cy="5033520"/>
+            <a:ext cx="10745640" cy="5033160"/>
           </a:xfrm>
           <a:prstGeom prst="rect">
             <a:avLst/>
@@ -9218,7 +9218,7 @@
             <a:noAutofit/>
           </a:bodyPr>
           <a:p>
-            <a:pPr marL="195120" indent="-191520">
+            <a:pPr marL="195120" indent="-191160">
               <a:lnSpc>
                 <a:spcPct val="100000"/>
               </a:lnSpc>
@@ -9247,7 +9247,7 @@
             </a:endParaRPr>
           </a:p>
           <a:p>
-            <a:pPr marL="195120" indent="-191520">
+            <a:pPr marL="195120" indent="-191160">
               <a:lnSpc>
                 <a:spcPct val="100000"/>
               </a:lnSpc>
@@ -9276,7 +9276,7 @@
             </a:endParaRPr>
           </a:p>
           <a:p>
-            <a:pPr marL="195120" indent="-191520">
+            <a:pPr marL="195120" indent="-191160">
               <a:lnSpc>
                 <a:spcPct val="100000"/>
               </a:lnSpc>
@@ -9315,7 +9315,7 @@
         <p:spPr>
           <a:xfrm>
             <a:off x="4655880" y="476640"/>
-            <a:ext cx="2432160" cy="358200"/>
+            <a:ext cx="2431800" cy="357840"/>
           </a:xfrm>
           <a:prstGeom prst="rect">
             <a:avLst/>
@@ -9371,7 +9371,7 @@
         <p:spPr>
           <a:xfrm>
             <a:off x="335520" y="840960"/>
-            <a:ext cx="10746000" cy="496800"/>
+            <a:ext cx="10745640" cy="496440"/>
           </a:xfrm>
           <a:prstGeom prst="rect">
             <a:avLst/>
@@ -9422,7 +9422,7 @@
         <p:spPr>
           <a:xfrm>
             <a:off x="388800" y="1488600"/>
-            <a:ext cx="10724400" cy="5204520"/>
+            <a:ext cx="10724040" cy="5204520"/>
           </a:xfrm>
           <a:prstGeom prst="rect">
             <a:avLst/>
@@ -9473,7 +9473,7 @@
             </a:endParaRPr>
           </a:p>
           <a:p>
-            <a:pPr marL="216000" indent="-215640">
+            <a:pPr marL="216000" indent="-215280">
               <a:lnSpc>
                 <a:spcPct val="100000"/>
               </a:lnSpc>
@@ -9519,7 +9519,7 @@
             </a:endParaRPr>
           </a:p>
           <a:p>
-            <a:pPr marL="216000" indent="-215640">
+            <a:pPr marL="216000" indent="-215280">
               <a:lnSpc>
                 <a:spcPct val="100000"/>
               </a:lnSpc>
@@ -9565,7 +9565,7 @@
             </a:endParaRPr>
           </a:p>
           <a:p>
-            <a:pPr marL="216000" indent="-215640">
+            <a:pPr marL="216000" indent="-215280">
               <a:lnSpc>
                 <a:spcPct val="100000"/>
               </a:lnSpc>
@@ -9591,7 +9591,7 @@
             </a:endParaRPr>
           </a:p>
           <a:p>
-            <a:pPr marL="216000" indent="-215640">
+            <a:pPr marL="216000" indent="-215280">
               <a:lnSpc>
                 <a:spcPct val="100000"/>
               </a:lnSpc>
@@ -9627,7 +9627,7 @@
             </a:endParaRPr>
           </a:p>
           <a:p>
-            <a:pPr marL="216000" indent="-215640">
+            <a:pPr marL="216000" indent="-215280">
               <a:lnSpc>
                 <a:spcPct val="100000"/>
               </a:lnSpc>
@@ -9653,7 +9653,7 @@
             </a:endParaRPr>
           </a:p>
           <a:p>
-            <a:pPr marL="216000" indent="-215640">
+            <a:pPr marL="216000" indent="-215280">
               <a:lnSpc>
                 <a:spcPct val="100000"/>
               </a:lnSpc>
@@ -9679,7 +9679,7 @@
             </a:endParaRPr>
           </a:p>
           <a:p>
-            <a:pPr marL="216000" indent="-215640">
+            <a:pPr marL="216000" indent="-215280">
               <a:lnSpc>
                 <a:spcPct val="100000"/>
               </a:lnSpc>
@@ -9715,7 +9715,7 @@
             </a:endParaRPr>
           </a:p>
           <a:p>
-            <a:pPr marL="216000" indent="-215640">
+            <a:pPr marL="216000" indent="-215280">
               <a:lnSpc>
                 <a:spcPct val="100000"/>
               </a:lnSpc>
@@ -9741,7 +9741,7 @@
             </a:endParaRPr>
           </a:p>
           <a:p>
-            <a:pPr marL="216000" indent="-215640">
+            <a:pPr marL="216000" indent="-215280">
               <a:lnSpc>
                 <a:spcPct val="100000"/>
               </a:lnSpc>
@@ -9787,7 +9787,7 @@
             </a:endParaRPr>
           </a:p>
           <a:p>
-            <a:pPr marL="216000" indent="-215640">
+            <a:pPr marL="216000" indent="-215280">
               <a:lnSpc>
                 <a:spcPct val="100000"/>
               </a:lnSpc>
@@ -9823,7 +9823,7 @@
             </a:endParaRPr>
           </a:p>
           <a:p>
-            <a:pPr marL="216000" indent="-215640">
+            <a:pPr marL="216000" indent="-215280">
               <a:lnSpc>
                 <a:spcPct val="100000"/>
               </a:lnSpc>
@@ -9889,7 +9889,7 @@
             </a:endParaRPr>
           </a:p>
           <a:p>
-            <a:pPr marL="216000" indent="-215640">
+            <a:pPr marL="216000" indent="-215280">
               <a:lnSpc>
                 <a:spcPct val="100000"/>
               </a:lnSpc>
@@ -9925,7 +9925,7 @@
             </a:endParaRPr>
           </a:p>
           <a:p>
-            <a:pPr marL="216000" indent="-215640">
+            <a:pPr marL="216000" indent="-215280">
               <a:lnSpc>
                 <a:spcPct val="100000"/>
               </a:lnSpc>
@@ -9991,7 +9991,7 @@
         <p:spPr>
           <a:xfrm>
             <a:off x="335520" y="764640"/>
-            <a:ext cx="10746000" cy="496800"/>
+            <a:ext cx="10745640" cy="496440"/>
           </a:xfrm>
           <a:prstGeom prst="rect">
             <a:avLst/>
@@ -10042,7 +10042,7 @@
         <p:spPr>
           <a:xfrm>
             <a:off x="4655880" y="476640"/>
-            <a:ext cx="2432160" cy="358200"/>
+            <a:ext cx="2431800" cy="357840"/>
           </a:xfrm>
           <a:prstGeom prst="rect">
             <a:avLst/>
@@ -10068,7 +10068,7 @@
         <p:spPr>
           <a:xfrm>
             <a:off x="494640" y="1523880"/>
-            <a:ext cx="10364760" cy="479880"/>
+            <a:ext cx="10364400" cy="479520"/>
           </a:xfrm>
           <a:prstGeom prst="rect">
             <a:avLst/>
@@ -10118,13 +10118,13 @@
         </p:nvPicPr>
         <p:blipFill>
           <a:blip r:embed="rId1"/>
-          <a:srcRect l="0" t="0" r="0" b="43302"/>
+          <a:srcRect l="0" t="0" r="0" b="43298"/>
           <a:stretch/>
         </p:blipFill>
         <p:spPr>
           <a:xfrm>
             <a:off x="609120" y="2057760"/>
-            <a:ext cx="9517320" cy="3881520"/>
+            <a:ext cx="9516960" cy="3881160"/>
           </a:xfrm>
           <a:prstGeom prst="rect">
             <a:avLst/>
@@ -10173,7 +10173,7 @@
         <p:spPr>
           <a:xfrm>
             <a:off x="335520" y="764640"/>
-            <a:ext cx="10746000" cy="496800"/>
+            <a:ext cx="10745640" cy="496440"/>
           </a:xfrm>
           <a:prstGeom prst="rect">
             <a:avLst/>
@@ -10224,7 +10224,7 @@
         <p:spPr>
           <a:xfrm>
             <a:off x="4655880" y="476640"/>
-            <a:ext cx="2432160" cy="358200"/>
+            <a:ext cx="2431800" cy="357840"/>
           </a:xfrm>
           <a:prstGeom prst="rect">
             <a:avLst/>
@@ -10250,7 +10250,7 @@
         <p:spPr>
           <a:xfrm>
             <a:off x="494640" y="1474920"/>
-            <a:ext cx="10364760" cy="479880"/>
+            <a:ext cx="10364400" cy="479520"/>
           </a:xfrm>
           <a:prstGeom prst="rect">
             <a:avLst/>
@@ -10316,7 +10316,7 @@
         <p:spPr>
           <a:xfrm>
             <a:off x="446400" y="2185200"/>
-            <a:ext cx="9404640" cy="3847680"/>
+            <a:ext cx="9404280" cy="3847320"/>
           </a:xfrm>
           <a:prstGeom prst="rect">
             <a:avLst/>
@@ -10365,7 +10365,7 @@
         <p:spPr>
           <a:xfrm>
             <a:off x="335520" y="764640"/>
-            <a:ext cx="10746000" cy="496800"/>
+            <a:ext cx="10745640" cy="496440"/>
           </a:xfrm>
           <a:prstGeom prst="rect">
             <a:avLst/>
@@ -10416,7 +10416,7 @@
         <p:spPr>
           <a:xfrm>
             <a:off x="4655880" y="476640"/>
-            <a:ext cx="2432160" cy="358200"/>
+            <a:ext cx="2431800" cy="357840"/>
           </a:xfrm>
           <a:prstGeom prst="rect">
             <a:avLst/>
@@ -10442,7 +10442,7 @@
         <p:spPr>
           <a:xfrm>
             <a:off x="494640" y="1523880"/>
-            <a:ext cx="10364760" cy="479880"/>
+            <a:ext cx="10364400" cy="479520"/>
           </a:xfrm>
           <a:prstGeom prst="rect">
             <a:avLst/>
@@ -10498,7 +10498,7 @@
         <p:spPr>
           <a:xfrm>
             <a:off x="494640" y="2088360"/>
-            <a:ext cx="8942400" cy="3963960"/>
+            <a:ext cx="8942040" cy="3963600"/>
           </a:xfrm>
           <a:prstGeom prst="rect">
             <a:avLst/>
@@ -10547,7 +10547,7 @@
         <p:spPr>
           <a:xfrm>
             <a:off x="335520" y="764640"/>
-            <a:ext cx="10746000" cy="496800"/>
+            <a:ext cx="10745640" cy="496440"/>
           </a:xfrm>
           <a:prstGeom prst="rect">
             <a:avLst/>
@@ -10598,7 +10598,7 @@
         <p:spPr>
           <a:xfrm>
             <a:off x="4655880" y="476640"/>
-            <a:ext cx="2432160" cy="358200"/>
+            <a:ext cx="2431800" cy="357840"/>
           </a:xfrm>
           <a:prstGeom prst="rect">
             <a:avLst/>
@@ -10624,7 +10624,7 @@
         <p:spPr>
           <a:xfrm>
             <a:off x="494640" y="1523880"/>
-            <a:ext cx="10364760" cy="479880"/>
+            <a:ext cx="10364400" cy="479520"/>
           </a:xfrm>
           <a:prstGeom prst="rect">
             <a:avLst/>
@@ -10680,7 +10680,7 @@
         <p:spPr>
           <a:xfrm>
             <a:off x="494640" y="2166840"/>
-            <a:ext cx="8337960" cy="4179240"/>
+            <a:ext cx="8337600" cy="4178880"/>
           </a:xfrm>
           <a:prstGeom prst="rect">
             <a:avLst/>
@@ -10729,7 +10729,7 @@
         <p:spPr>
           <a:xfrm>
             <a:off x="335520" y="768240"/>
-            <a:ext cx="10746000" cy="496800"/>
+            <a:ext cx="10745640" cy="496440"/>
           </a:xfrm>
           <a:prstGeom prst="rect">
             <a:avLst/>
@@ -10780,7 +10780,7 @@
         <p:spPr>
           <a:xfrm>
             <a:off x="388800" y="1488600"/>
-            <a:ext cx="10719720" cy="5204520"/>
+            <a:ext cx="10719360" cy="5204520"/>
           </a:xfrm>
           <a:prstGeom prst="rect">
             <a:avLst/>
@@ -10831,7 +10831,7 @@
             </a:endParaRPr>
           </a:p>
           <a:p>
-            <a:pPr marL="216000" indent="-213840">
+            <a:pPr marL="216000" indent="-213480">
               <a:lnSpc>
                 <a:spcPct val="100000"/>
               </a:lnSpc>
@@ -10887,7 +10887,7 @@
             </a:endParaRPr>
           </a:p>
           <a:p>
-            <a:pPr marL="216000" indent="-213840">
+            <a:pPr marL="216000" indent="-213480">
               <a:lnSpc>
                 <a:spcPct val="100000"/>
               </a:lnSpc>
@@ -10943,7 +10943,7 @@
             </a:endParaRPr>
           </a:p>
           <a:p>
-            <a:pPr marL="216000" indent="-213840">
+            <a:pPr marL="216000" indent="-213480">
               <a:lnSpc>
                 <a:spcPct val="100000"/>
               </a:lnSpc>
@@ -10969,7 +10969,7 @@
             </a:endParaRPr>
           </a:p>
           <a:p>
-            <a:pPr marL="216000" indent="-213840">
+            <a:pPr marL="216000" indent="-213480">
               <a:lnSpc>
                 <a:spcPct val="100000"/>
               </a:lnSpc>
@@ -11005,7 +11005,7 @@
             </a:endParaRPr>
           </a:p>
           <a:p>
-            <a:pPr marL="216000" indent="-213840">
+            <a:pPr marL="216000" indent="-213480">
               <a:lnSpc>
                 <a:spcPct val="100000"/>
               </a:lnSpc>
@@ -11031,7 +11031,7 @@
             </a:endParaRPr>
           </a:p>
           <a:p>
-            <a:pPr marL="216000" indent="-213840">
+            <a:pPr marL="216000" indent="-213480">
               <a:lnSpc>
                 <a:spcPct val="100000"/>
               </a:lnSpc>
@@ -11057,7 +11057,7 @@
             </a:endParaRPr>
           </a:p>
           <a:p>
-            <a:pPr marL="216000" indent="-213840">
+            <a:pPr marL="216000" indent="-213480">
               <a:lnSpc>
                 <a:spcPct val="100000"/>
               </a:lnSpc>
@@ -11093,7 +11093,7 @@
             </a:endParaRPr>
           </a:p>
           <a:p>
-            <a:pPr marL="216000" indent="-213840">
+            <a:pPr marL="216000" indent="-213480">
               <a:lnSpc>
                 <a:spcPct val="100000"/>
               </a:lnSpc>
@@ -11119,7 +11119,7 @@
             </a:endParaRPr>
           </a:p>
           <a:p>
-            <a:pPr marL="216000" indent="-213840">
+            <a:pPr marL="216000" indent="-213480">
               <a:lnSpc>
                 <a:spcPct val="100000"/>
               </a:lnSpc>
@@ -11165,7 +11165,7 @@
             </a:endParaRPr>
           </a:p>
           <a:p>
-            <a:pPr marL="216000" indent="-213840">
+            <a:pPr marL="216000" indent="-213480">
               <a:lnSpc>
                 <a:spcPct val="100000"/>
               </a:lnSpc>
@@ -11201,7 +11201,7 @@
             </a:endParaRPr>
           </a:p>
           <a:p>
-            <a:pPr marL="216000" indent="-213840">
+            <a:pPr marL="216000" indent="-213480">
               <a:lnSpc>
                 <a:spcPct val="100000"/>
               </a:lnSpc>
@@ -11267,7 +11267,7 @@
             </a:endParaRPr>
           </a:p>
           <a:p>
-            <a:pPr marL="216000" indent="-213840">
+            <a:pPr marL="216000" indent="-213480">
               <a:lnSpc>
                 <a:spcPct val="100000"/>
               </a:lnSpc>
@@ -11303,7 +11303,7 @@
             </a:endParaRPr>
           </a:p>
           <a:p>
-            <a:pPr marL="216000" indent="-213840">
+            <a:pPr marL="216000" indent="-213480">
               <a:lnSpc>
                 <a:spcPct val="100000"/>
               </a:lnSpc>
@@ -11369,7 +11369,7 @@
         <p:spPr>
           <a:xfrm>
             <a:off x="335520" y="764640"/>
-            <a:ext cx="10746000" cy="496800"/>
+            <a:ext cx="10745640" cy="496440"/>
           </a:xfrm>
           <a:prstGeom prst="rect">
             <a:avLst/>
@@ -11420,7 +11420,7 @@
         <p:spPr>
           <a:xfrm>
             <a:off x="494640" y="1523880"/>
-            <a:ext cx="10364760" cy="479880"/>
+            <a:ext cx="10364400" cy="479520"/>
           </a:xfrm>
           <a:prstGeom prst="rect">
             <a:avLst/>
@@ -11510,7 +11510,7 @@
         <p:spPr>
           <a:xfrm>
             <a:off x="1895760" y="2238840"/>
-            <a:ext cx="6787080" cy="4158000"/>
+            <a:ext cx="6786720" cy="4157640"/>
           </a:xfrm>
           <a:prstGeom prst="rect">
             <a:avLst/>
@@ -11559,7 +11559,7 @@
         <p:spPr>
           <a:xfrm>
             <a:off x="335520" y="764640"/>
-            <a:ext cx="10746000" cy="496800"/>
+            <a:ext cx="10745640" cy="496440"/>
           </a:xfrm>
           <a:prstGeom prst="rect">
             <a:avLst/>
@@ -11610,7 +11610,7 @@
         <p:spPr>
           <a:xfrm>
             <a:off x="494640" y="1488600"/>
-            <a:ext cx="5447520" cy="444600"/>
+            <a:ext cx="5447160" cy="444240"/>
           </a:xfrm>
           <a:prstGeom prst="rect">
             <a:avLst/>
@@ -11676,7 +11676,7 @@
         <p:spPr>
           <a:xfrm>
             <a:off x="1828800" y="1937160"/>
-            <a:ext cx="7954560" cy="4088880"/>
+            <a:ext cx="7954200" cy="4088520"/>
           </a:xfrm>
           <a:prstGeom prst="rect">
             <a:avLst/>
@@ -11725,7 +11725,7 @@
         <p:spPr>
           <a:xfrm>
             <a:off x="335520" y="764640"/>
-            <a:ext cx="10746000" cy="496800"/>
+            <a:ext cx="10745640" cy="496440"/>
           </a:xfrm>
           <a:prstGeom prst="rect">
             <a:avLst/>
@@ -11780,7 +11780,7 @@
         <p:spPr>
           <a:xfrm>
             <a:off x="2679480" y="2130480"/>
-            <a:ext cx="7374960" cy="3485880"/>
+            <a:ext cx="7374600" cy="3485520"/>
           </a:xfrm>
           <a:prstGeom prst="rect">
             <a:avLst/>
@@ -11799,7 +11799,7 @@
         <p:spPr>
           <a:xfrm>
             <a:off x="494640" y="1418040"/>
-            <a:ext cx="5218920" cy="444600"/>
+            <a:ext cx="5218560" cy="444240"/>
           </a:xfrm>
           <a:prstGeom prst="rect">
             <a:avLst/>
@@ -11880,7 +11880,7 @@
         <p:spPr>
           <a:xfrm>
             <a:off x="335520" y="764640"/>
-            <a:ext cx="10746000" cy="496800"/>
+            <a:ext cx="10745640" cy="496440"/>
           </a:xfrm>
           <a:prstGeom prst="rect">
             <a:avLst/>
@@ -11935,7 +11935,7 @@
         <p:spPr>
           <a:xfrm>
             <a:off x="2394720" y="1153800"/>
-            <a:ext cx="1468800" cy="2170080"/>
+            <a:ext cx="1468440" cy="2169720"/>
           </a:xfrm>
           <a:prstGeom prst="rect">
             <a:avLst/>
@@ -11958,7 +11958,7 @@
         <p:spPr>
           <a:xfrm>
             <a:off x="7250040" y="1153800"/>
-            <a:ext cx="1734120" cy="2170080"/>
+            <a:ext cx="1733760" cy="2169720"/>
           </a:xfrm>
           <a:prstGeom prst="rect">
             <a:avLst/>
@@ -11981,7 +11981,7 @@
         <p:spPr>
           <a:xfrm>
             <a:off x="4846320" y="4206240"/>
-            <a:ext cx="1782720" cy="1774800"/>
+            <a:ext cx="1782360" cy="1774440"/>
           </a:xfrm>
           <a:prstGeom prst="rect">
             <a:avLst/>
@@ -12000,7 +12000,7 @@
         <p:spPr>
           <a:xfrm>
             <a:off x="1330200" y="3269880"/>
-            <a:ext cx="3633480" cy="675000"/>
+            <a:ext cx="3633120" cy="674640"/>
           </a:xfrm>
           <a:prstGeom prst="rect">
             <a:avLst/>
@@ -12077,7 +12077,7 @@
         <p:spPr>
           <a:xfrm>
             <a:off x="6321600" y="3269880"/>
-            <a:ext cx="3633480" cy="675000"/>
+            <a:ext cx="3633120" cy="674640"/>
           </a:xfrm>
           <a:prstGeom prst="rect">
             <a:avLst/>
@@ -12154,7 +12154,7 @@
         <p:spPr>
           <a:xfrm>
             <a:off x="1312200" y="5920200"/>
-            <a:ext cx="3633480" cy="675000"/>
+            <a:ext cx="3633120" cy="674640"/>
           </a:xfrm>
           <a:prstGeom prst="rect">
             <a:avLst/>
@@ -12211,7 +12211,7 @@
         <p:spPr>
           <a:xfrm>
             <a:off x="3950640" y="5903280"/>
-            <a:ext cx="3633480" cy="675000"/>
+            <a:ext cx="3633120" cy="674640"/>
           </a:xfrm>
           <a:prstGeom prst="rect">
             <a:avLst/>
@@ -12322,7 +12322,7 @@
         <p:spPr>
           <a:xfrm>
             <a:off x="685800" y="2514600"/>
-            <a:ext cx="8872920" cy="3839400"/>
+            <a:ext cx="8872560" cy="3839040"/>
           </a:xfrm>
           <a:prstGeom prst="rect">
             <a:avLst/>
@@ -12341,7 +12341,7 @@
         <p:spPr>
           <a:xfrm>
             <a:off x="335520" y="764640"/>
-            <a:ext cx="10746000" cy="496800"/>
+            <a:ext cx="10745640" cy="496440"/>
           </a:xfrm>
           <a:prstGeom prst="rect">
             <a:avLst/>
@@ -12392,7 +12392,7 @@
         <p:spPr>
           <a:xfrm>
             <a:off x="494640" y="1312200"/>
-            <a:ext cx="1735920" cy="367200"/>
+            <a:ext cx="1735560" cy="366840"/>
           </a:xfrm>
           <a:prstGeom prst="rect">
             <a:avLst/>
@@ -12568,7 +12568,7 @@
         <p:spPr>
           <a:xfrm>
             <a:off x="642600" y="1679400"/>
-            <a:ext cx="4402800" cy="638280"/>
+            <a:ext cx="4402440" cy="638280"/>
           </a:xfrm>
           <a:prstGeom prst="rect">
             <a:avLst/>
@@ -12639,7 +12639,7 @@
         <p:spPr>
           <a:xfrm>
             <a:off x="6549480" y="1679400"/>
-            <a:ext cx="4876560" cy="633240"/>
+            <a:ext cx="4876200" cy="632880"/>
           </a:xfrm>
           <a:prstGeom prst="rect">
             <a:avLst/>
@@ -12710,7 +12710,7 @@
         <p:spPr>
           <a:xfrm>
             <a:off x="7839360" y="1679400"/>
-            <a:ext cx="2617920" cy="430560"/>
+            <a:ext cx="2617560" cy="430200"/>
           </a:xfrm>
           <a:prstGeom prst="rect">
             <a:avLst/>
@@ -12761,7 +12761,7 @@
         <p:spPr>
           <a:xfrm>
             <a:off x="8857440" y="3943440"/>
-            <a:ext cx="282600" cy="363960"/>
+            <a:ext cx="282240" cy="363960"/>
           </a:xfrm>
           <a:prstGeom prst="rect">
             <a:avLst/>
@@ -12812,7 +12812,7 @@
         <p:spPr>
           <a:xfrm>
             <a:off x="9537840" y="4548960"/>
-            <a:ext cx="282600" cy="363960"/>
+            <a:ext cx="282240" cy="363960"/>
           </a:xfrm>
           <a:prstGeom prst="rect">
             <a:avLst/>
@@ -12863,7 +12863,7 @@
         <p:spPr>
           <a:xfrm>
             <a:off x="7279920" y="6101280"/>
-            <a:ext cx="282960" cy="363960"/>
+            <a:ext cx="282600" cy="363960"/>
           </a:xfrm>
           <a:prstGeom prst="rect">
             <a:avLst/>
@@ -12949,7 +12949,7 @@
         <p:spPr>
           <a:xfrm>
             <a:off x="1058760" y="6130800"/>
-            <a:ext cx="282960" cy="363960"/>
+            <a:ext cx="282600" cy="363960"/>
           </a:xfrm>
           <a:prstGeom prst="rect">
             <a:avLst/>
@@ -13030,7 +13030,7 @@
         <p:spPr>
           <a:xfrm>
             <a:off x="335520" y="764640"/>
-            <a:ext cx="10746000" cy="496800"/>
+            <a:ext cx="10745640" cy="496440"/>
           </a:xfrm>
           <a:prstGeom prst="rect">
             <a:avLst/>
@@ -13081,7 +13081,7 @@
         <p:spPr>
           <a:xfrm>
             <a:off x="335520" y="1268640"/>
-            <a:ext cx="10746000" cy="5033520"/>
+            <a:ext cx="10745640" cy="5033160"/>
           </a:xfrm>
           <a:prstGeom prst="rect">
             <a:avLst/>
@@ -13102,7 +13102,7 @@
             <a:noAutofit/>
           </a:bodyPr>
           <a:p>
-            <a:pPr marL="216000" indent="-215640">
+            <a:pPr marL="216000" indent="-215280">
               <a:lnSpc>
                 <a:spcPct val="100000"/>
               </a:lnSpc>
@@ -13131,7 +13131,7 @@
             </a:endParaRPr>
           </a:p>
           <a:p>
-            <a:pPr lvl="1" marL="432000" indent="-215640">
+            <a:pPr lvl="1" marL="432000" indent="-215280">
               <a:lnSpc>
                 <a:spcPct val="100000"/>
               </a:lnSpc>
@@ -13173,7 +13173,7 @@
             </a:endParaRPr>
           </a:p>
           <a:p>
-            <a:pPr marL="216000" indent="-215640">
+            <a:pPr marL="216000" indent="-215280">
               <a:lnSpc>
                 <a:spcPct val="100000"/>
               </a:lnSpc>
@@ -13202,7 +13202,7 @@
             </a:endParaRPr>
           </a:p>
           <a:p>
-            <a:pPr lvl="1" marL="432000" indent="-215640">
+            <a:pPr lvl="1" marL="432000" indent="-215280">
               <a:lnSpc>
                 <a:spcPct val="100000"/>
               </a:lnSpc>
@@ -13241,7 +13241,7 @@
             </a:endParaRPr>
           </a:p>
           <a:p>
-            <a:pPr lvl="1" marL="432000" indent="-215640">
+            <a:pPr lvl="1" marL="432000" indent="-215280">
               <a:lnSpc>
                 <a:spcPct val="100000"/>
               </a:lnSpc>
@@ -13270,7 +13270,7 @@
             </a:endParaRPr>
           </a:p>
           <a:p>
-            <a:pPr lvl="1" marL="432000" indent="-215640">
+            <a:pPr lvl="1" marL="432000" indent="-215280">
               <a:lnSpc>
                 <a:spcPct val="100000"/>
               </a:lnSpc>
@@ -13352,7 +13352,7 @@
         <p:spPr>
           <a:xfrm>
             <a:off x="335520" y="764640"/>
-            <a:ext cx="10744200" cy="495000"/>
+            <a:ext cx="10743840" cy="494640"/>
           </a:xfrm>
           <a:prstGeom prst="rect">
             <a:avLst/>
@@ -13403,7 +13403,7 @@
         <p:spPr>
           <a:xfrm>
             <a:off x="335520" y="1268280"/>
-            <a:ext cx="10744200" cy="5031720"/>
+            <a:ext cx="10743840" cy="5031360"/>
           </a:xfrm>
           <a:prstGeom prst="rect">
             <a:avLst/>
@@ -13437,7 +13437,7 @@
             </a:endParaRPr>
           </a:p>
           <a:p>
-            <a:pPr marL="195120" indent="-190080">
+            <a:pPr marL="195120" indent="-189720">
               <a:lnSpc>
                 <a:spcPct val="100000"/>
               </a:lnSpc>
@@ -13493,7 +13493,7 @@
         <p:spPr>
           <a:xfrm>
             <a:off x="6285600" y="2132640"/>
-            <a:ext cx="513720" cy="493560"/>
+            <a:ext cx="513360" cy="493200"/>
           </a:xfrm>
           <a:prstGeom prst="star5">
             <a:avLst>
@@ -13535,7 +13535,7 @@
         <p:spPr>
           <a:xfrm>
             <a:off x="4089960" y="2247480"/>
-            <a:ext cx="2282040" cy="363960"/>
+            <a:ext cx="2281680" cy="363960"/>
           </a:xfrm>
           <a:prstGeom prst="rect">
             <a:avLst/>
@@ -13636,7 +13636,7 @@
         <p:spPr>
           <a:xfrm>
             <a:off x="335520" y="764640"/>
-            <a:ext cx="10744200" cy="495000"/>
+            <a:ext cx="10743840" cy="494640"/>
           </a:xfrm>
           <a:prstGeom prst="rect">
             <a:avLst/>
@@ -13687,7 +13687,7 @@
         <p:spPr>
           <a:xfrm>
             <a:off x="335520" y="1268640"/>
-            <a:ext cx="10744200" cy="5031720"/>
+            <a:ext cx="10743840" cy="5031360"/>
           </a:xfrm>
           <a:prstGeom prst="rect">
             <a:avLst/>
@@ -13708,7 +13708,7 @@
             <a:noAutofit/>
           </a:bodyPr>
           <a:p>
-            <a:pPr marL="195120" indent="-190080">
+            <a:pPr marL="195120" indent="-189720">
               <a:lnSpc>
                 <a:spcPct val="100000"/>
               </a:lnSpc>
@@ -13770,7 +13770,7 @@
             </a:endParaRPr>
           </a:p>
           <a:p>
-            <a:pPr marL="195120" indent="-190080">
+            <a:pPr marL="195120" indent="-189720">
               <a:lnSpc>
                 <a:spcPct val="100000"/>
               </a:lnSpc>
@@ -13819,7 +13819,7 @@
             </a:endParaRPr>
           </a:p>
           <a:p>
-            <a:pPr marL="195120" indent="-190080">
+            <a:pPr marL="195120" indent="-189720">
               <a:lnSpc>
                 <a:spcPct val="100000"/>
               </a:lnSpc>
@@ -13868,7 +13868,7 @@
             </a:endParaRPr>
           </a:p>
           <a:p>
-            <a:pPr marL="195120" indent="-190080">
+            <a:pPr marL="195120" indent="-189720">
               <a:lnSpc>
                 <a:spcPct val="100000"/>
               </a:lnSpc>
@@ -13917,7 +13917,7 @@
             </a:endParaRPr>
           </a:p>
           <a:p>
-            <a:pPr marL="195120" indent="-190080">
+            <a:pPr marL="195120" indent="-189720">
               <a:lnSpc>
                 <a:spcPct val="100000"/>
               </a:lnSpc>
@@ -13966,7 +13966,7 @@
             </a:endParaRPr>
           </a:p>
           <a:p>
-            <a:pPr marL="195120" indent="-190080">
+            <a:pPr marL="195120" indent="-189720">
               <a:lnSpc>
                 <a:spcPct val="100000"/>
               </a:lnSpc>
@@ -14015,7 +14015,7 @@
             </a:endParaRPr>
           </a:p>
           <a:p>
-            <a:pPr marL="195120" indent="-190080">
+            <a:pPr marL="195120" indent="-189720">
               <a:lnSpc>
                 <a:spcPct val="100000"/>
               </a:lnSpc>
@@ -14064,7 +14064,7 @@
             </a:endParaRPr>
           </a:p>
           <a:p>
-            <a:pPr marL="195120" indent="-190080">
+            <a:pPr marL="195120" indent="-189720">
               <a:lnSpc>
                 <a:spcPct val="100000"/>
               </a:lnSpc>
@@ -14153,7 +14153,7 @@
         <p:spPr>
           <a:xfrm>
             <a:off x="335520" y="764640"/>
-            <a:ext cx="10746000" cy="496800"/>
+            <a:ext cx="10745640" cy="496440"/>
           </a:xfrm>
           <a:prstGeom prst="rect">
             <a:avLst/>
@@ -14204,7 +14204,7 @@
         <p:spPr>
           <a:xfrm>
             <a:off x="335520" y="1268640"/>
-            <a:ext cx="10746000" cy="5033520"/>
+            <a:ext cx="10745640" cy="5033160"/>
           </a:xfrm>
           <a:prstGeom prst="rect">
             <a:avLst/>
@@ -14238,7 +14238,7 @@
             </a:endParaRPr>
           </a:p>
           <a:p>
-            <a:pPr marL="195120" indent="-191520">
+            <a:pPr marL="195120" indent="-191160">
               <a:lnSpc>
                 <a:spcPct val="100000"/>
               </a:lnSpc>
@@ -14309,7 +14309,7 @@
             </a:endParaRPr>
           </a:p>
           <a:p>
-            <a:pPr marL="195120" indent="-191520">
+            <a:pPr marL="195120" indent="-191160">
               <a:lnSpc>
                 <a:spcPct val="100000"/>
               </a:lnSpc>
@@ -14380,7 +14380,7 @@
             </a:endParaRPr>
           </a:p>
           <a:p>
-            <a:pPr marL="195120" indent="-191520">
+            <a:pPr marL="195120" indent="-191160">
               <a:lnSpc>
                 <a:spcPct val="100000"/>
               </a:lnSpc>
@@ -14429,7 +14429,7 @@
             </a:endParaRPr>
           </a:p>
           <a:p>
-            <a:pPr marL="195120" indent="-191520">
+            <a:pPr marL="195120" indent="-191160">
               <a:lnSpc>
                 <a:spcPct val="100000"/>
               </a:lnSpc>
@@ -14478,7 +14478,7 @@
             </a:endParaRPr>
           </a:p>
           <a:p>
-            <a:pPr marL="195120" indent="-191520">
+            <a:pPr marL="195120" indent="-191160">
               <a:lnSpc>
                 <a:spcPct val="100000"/>
               </a:lnSpc>
@@ -14527,7 +14527,7 @@
             </a:endParaRPr>
           </a:p>
           <a:p>
-            <a:pPr marL="195120" indent="-191520">
+            <a:pPr marL="195120" indent="-191160">
               <a:lnSpc>
                 <a:spcPct val="100000"/>
               </a:lnSpc>
@@ -14576,7 +14576,7 @@
             </a:endParaRPr>
           </a:p>
           <a:p>
-            <a:pPr marL="195120" indent="-191520">
+            <a:pPr marL="195120" indent="-191160">
               <a:lnSpc>
                 <a:spcPct val="100000"/>
               </a:lnSpc>
@@ -14665,7 +14665,7 @@
         <p:spPr>
           <a:xfrm>
             <a:off x="335520" y="764640"/>
-            <a:ext cx="10744200" cy="495000"/>
+            <a:ext cx="10743840" cy="494640"/>
           </a:xfrm>
           <a:prstGeom prst="rect">
             <a:avLst/>
@@ -14716,7 +14716,7 @@
         <p:spPr>
           <a:xfrm>
             <a:off x="335520" y="1268640"/>
-            <a:ext cx="10744200" cy="5031720"/>
+            <a:ext cx="10743840" cy="5031360"/>
           </a:xfrm>
           <a:prstGeom prst="rect">
             <a:avLst/>
@@ -14737,7 +14737,7 @@
             <a:noAutofit/>
           </a:bodyPr>
           <a:p>
-            <a:pPr marL="195120" indent="-190080">
+            <a:pPr marL="195120" indent="-189720">
               <a:lnSpc>
                 <a:spcPct val="100000"/>
               </a:lnSpc>
@@ -14778,7 +14778,7 @@
             </a:endParaRPr>
           </a:p>
           <a:p>
-            <a:pPr marL="195120" indent="-190080">
+            <a:pPr marL="195120" indent="-189720">
               <a:lnSpc>
                 <a:spcPct val="100000"/>
               </a:lnSpc>
@@ -14829,7 +14829,7 @@
             </a:endParaRPr>
           </a:p>
           <a:p>
-            <a:pPr marL="195120" indent="-190080">
+            <a:pPr marL="195120" indent="-189720">
               <a:lnSpc>
                 <a:spcPct val="100000"/>
               </a:lnSpc>
@@ -14865,6 +14865,25 @@
               </a:rPr>
               <a:t>Link</a:t>
             </a:r>
+            <a:endParaRPr b="0" lang="en-US" sz="1800" spc="-1" strike="noStrike">
+              <a:latin typeface="Arial"/>
+            </a:endParaRPr>
+          </a:p>
+          <a:p>
+            <a:pPr marL="195120" indent="-189720">
+              <a:lnSpc>
+                <a:spcPct val="100000"/>
+              </a:lnSpc>
+              <a:spcBef>
+                <a:spcPts val="360"/>
+              </a:spcBef>
+              <a:buClr>
+                <a:srgbClr val="008c4f"/>
+              </a:buClr>
+              <a:buSzPct val="80000"/>
+              <a:buFont typeface="Wingdings" charset="2"/>
+              <a:buChar char=""/>
+            </a:pPr>
             <a:r>
               <a:rPr b="0" lang="en-US" sz="1800" spc="-1" strike="noStrike">
                 <a:solidFill>
@@ -14873,7 +14892,151 @@
                 <a:latin typeface="DejaVu Sans"/>
                 <a:ea typeface="DejaVu Sans"/>
               </a:rPr>
-              <a:t> </a:t>
+              <a:t>Podcasts:</a:t>
+            </a:r>
+            <a:endParaRPr b="0" lang="en-US" sz="1800" spc="-1" strike="noStrike">
+              <a:latin typeface="Arial"/>
+            </a:endParaRPr>
+          </a:p>
+          <a:p>
+            <a:pPr lvl="1" marL="432000" indent="-216000">
+              <a:buClr>
+                <a:srgbClr val="008c4f"/>
+              </a:buClr>
+              <a:buSzPct val="45000"/>
+              <a:buFont typeface="OpenSymbol"/>
+              <a:buChar char="—"/>
+            </a:pPr>
+            <a:r>
+              <a:rPr b="0" lang="en-US" sz="1800" spc="-1" strike="noStrike">
+                <a:solidFill>
+                  <a:srgbClr val="000000"/>
+                </a:solidFill>
+                <a:latin typeface="DejaVu Sans"/>
+                <a:ea typeface="DejaVu Sans"/>
+              </a:rPr>
+              <a:t>Drilled (</a:t>
+            </a:r>
+            <a:r>
+              <a:rPr b="0" lang="en-US" sz="1800" spc="-1" strike="noStrike">
+                <a:solidFill>
+                  <a:srgbClr val="000000"/>
+                </a:solidFill>
+                <a:latin typeface="DejaVu Sans"/>
+                <a:ea typeface="DejaVu Sans"/>
+                <a:hlinkClick r:id="rId4"/>
+              </a:rPr>
+              <a:t>Link</a:t>
+            </a:r>
+            <a:r>
+              <a:rPr b="0" lang="en-US" sz="1800" spc="-1" strike="noStrike">
+                <a:solidFill>
+                  <a:srgbClr val="000000"/>
+                </a:solidFill>
+                <a:latin typeface="DejaVu Sans"/>
+                <a:ea typeface="DejaVu Sans"/>
+              </a:rPr>
+              <a:t>)</a:t>
+            </a:r>
+            <a:endParaRPr b="0" lang="en-US" sz="1800" spc="-1" strike="noStrike">
+              <a:latin typeface="Arial"/>
+            </a:endParaRPr>
+          </a:p>
+          <a:p>
+            <a:pPr lvl="1" marL="432000" indent="-216000">
+              <a:lnSpc>
+                <a:spcPct val="100000"/>
+              </a:lnSpc>
+              <a:spcBef>
+                <a:spcPts val="360"/>
+              </a:spcBef>
+              <a:buClr>
+                <a:srgbClr val="008c4f"/>
+              </a:buClr>
+              <a:buSzPct val="45000"/>
+              <a:buFont typeface="OpenSymbol"/>
+              <a:buChar char="—"/>
+            </a:pPr>
+            <a:r>
+              <a:rPr b="0" lang="en-US" sz="1800" spc="-1" strike="noStrike">
+                <a:solidFill>
+                  <a:srgbClr val="000000"/>
+                </a:solidFill>
+                <a:latin typeface="DejaVu Sans"/>
+                <a:ea typeface="DejaVu Sans"/>
+              </a:rPr>
+              <a:t>How to Save a Planet (</a:t>
+            </a:r>
+            <a:r>
+              <a:rPr b="0" lang="en-US" sz="1800" spc="-1" strike="noStrike">
+                <a:solidFill>
+                  <a:srgbClr val="000000"/>
+                </a:solidFill>
+                <a:latin typeface="DejaVu Sans"/>
+                <a:ea typeface="DejaVu Sans"/>
+                <a:hlinkClick r:id="rId5"/>
+              </a:rPr>
+              <a:t>Link</a:t>
+            </a:r>
+            <a:r>
+              <a:rPr b="0" lang="en-US" sz="1800" spc="-1" strike="noStrike">
+                <a:solidFill>
+                  <a:srgbClr val="000000"/>
+                </a:solidFill>
+                <a:latin typeface="DejaVu Sans"/>
+                <a:ea typeface="DejaVu Sans"/>
+              </a:rPr>
+              <a:t>)</a:t>
+            </a:r>
+            <a:endParaRPr b="0" lang="en-US" sz="1800" spc="-1" strike="noStrike">
+              <a:latin typeface="Arial"/>
+            </a:endParaRPr>
+          </a:p>
+          <a:p>
+            <a:pPr lvl="1" marL="432000" indent="-216000">
+              <a:lnSpc>
+                <a:spcPct val="100000"/>
+              </a:lnSpc>
+              <a:spcBef>
+                <a:spcPts val="360"/>
+              </a:spcBef>
+              <a:buClr>
+                <a:srgbClr val="008c4f"/>
+              </a:buClr>
+              <a:buSzPct val="45000"/>
+              <a:buFont typeface="OpenSymbol"/>
+              <a:buChar char="—"/>
+            </a:pPr>
+            <a:r>
+              <a:rPr b="0" lang="en-US" sz="1800" spc="-1" strike="noStrike">
+                <a:solidFill>
+                  <a:srgbClr val="000000"/>
+                </a:solidFill>
+                <a:latin typeface="DejaVu Sans"/>
+                <a:ea typeface="DejaVu Sans"/>
+              </a:rPr>
+              <a:t>1,5 Grad – der Klima-Podcast mit Luisa Neubauer (German) (</a:t>
+            </a:r>
+            <a:r>
+              <a:rPr b="0" lang="en-US" sz="1800" spc="-1" strike="noStrike">
+                <a:solidFill>
+                  <a:srgbClr val="000000"/>
+                </a:solidFill>
+                <a:latin typeface="DejaVu Sans"/>
+                <a:ea typeface="DejaVu Sans"/>
+                <a:hlinkClick r:id="rId6"/>
+              </a:rPr>
+              <a:t>Link</a:t>
+            </a:r>
+            <a:r>
+              <a:rPr b="0" lang="en-US" sz="1800" spc="-1" strike="noStrike">
+                <a:solidFill>
+                  <a:srgbClr val="000000"/>
+                </a:solidFill>
+                <a:latin typeface="DejaVu Sans"/>
+                <a:ea typeface="DejaVu Sans"/>
+              </a:rPr>
+              <a:t>)</a:t>
             </a:r>
             <a:endParaRPr b="0" lang="en-US" sz="1800" spc="-1" strike="noStrike">
               <a:latin typeface="Arial"/>
@@ -14920,7 +15083,7 @@
         <p:spPr>
           <a:xfrm>
             <a:off x="335520" y="1268640"/>
-            <a:ext cx="10746000" cy="5033520"/>
+            <a:ext cx="10745640" cy="5033160"/>
           </a:xfrm>
           <a:prstGeom prst="rect">
             <a:avLst/>
@@ -14977,7 +15140,7 @@
         <p:spPr>
           <a:xfrm>
             <a:off x="335520" y="764640"/>
-            <a:ext cx="10746000" cy="496800"/>
+            <a:ext cx="10745640" cy="496440"/>
           </a:xfrm>
           <a:prstGeom prst="rect">
             <a:avLst/>
@@ -15033,7 +15196,7 @@
         <p:spPr>
           <a:xfrm>
             <a:off x="542880" y="721800"/>
-            <a:ext cx="10350360" cy="491040"/>
+            <a:ext cx="10350000" cy="490680"/>
           </a:xfrm>
           <a:prstGeom prst="rect">
             <a:avLst/>
@@ -15084,7 +15247,7 @@
         <p:spPr>
           <a:xfrm>
             <a:off x="451800" y="1709280"/>
-            <a:ext cx="8217720" cy="4345920"/>
+            <a:ext cx="8217360" cy="4345560"/>
           </a:xfrm>
           <a:prstGeom prst="rect">
             <a:avLst/>
@@ -15110,7 +15273,7 @@
         <p:spPr>
           <a:xfrm>
             <a:off x="609480" y="1769400"/>
-            <a:ext cx="10580760" cy="4848840"/>
+            <a:ext cx="10580400" cy="4848480"/>
           </a:xfrm>
           <a:prstGeom prst="rect">
             <a:avLst/>
@@ -15131,7 +15294,7 @@
             <a:normAutofit/>
           </a:bodyPr>
           <a:p>
-            <a:pPr marL="216000" indent="-212400">
+            <a:pPr marL="216000" indent="-212040">
               <a:lnSpc>
                 <a:spcPct val="90000"/>
               </a:lnSpc>
@@ -15240,7 +15403,7 @@
             </a:endParaRPr>
           </a:p>
           <a:p>
-            <a:pPr marL="216000" indent="-212400">
+            <a:pPr marL="216000" indent="-212040">
               <a:lnSpc>
                 <a:spcPct val="100000"/>
               </a:lnSpc>
@@ -15269,7 +15432,7 @@
             </a:endParaRPr>
           </a:p>
           <a:p>
-            <a:pPr lvl="1" marL="685800" indent="-225000">
+            <a:pPr lvl="1" marL="685800" indent="-224640">
               <a:lnSpc>
                 <a:spcPct val="100000"/>
               </a:lnSpc>
@@ -15298,7 +15461,7 @@
             </a:endParaRPr>
           </a:p>
           <a:p>
-            <a:pPr lvl="1" marL="685800" indent="-225000">
+            <a:pPr lvl="1" marL="685800" indent="-224640">
               <a:lnSpc>
                 <a:spcPct val="100000"/>
               </a:lnSpc>
@@ -15327,7 +15490,7 @@
             </a:endParaRPr>
           </a:p>
           <a:p>
-            <a:pPr lvl="1" marL="685800" indent="-225000">
+            <a:pPr lvl="1" marL="685800" indent="-224640">
               <a:lnSpc>
                 <a:spcPct val="100000"/>
               </a:lnSpc>
@@ -15356,7 +15519,7 @@
             </a:endParaRPr>
           </a:p>
           <a:p>
-            <a:pPr lvl="1" marL="685800" indent="-225000">
+            <a:pPr lvl="1" marL="685800" indent="-224640">
               <a:lnSpc>
                 <a:spcPct val="100000"/>
               </a:lnSpc>
@@ -15385,7 +15548,7 @@
             </a:endParaRPr>
           </a:p>
           <a:p>
-            <a:pPr marL="216000" indent="-212400">
+            <a:pPr marL="216000" indent="-212040">
               <a:lnSpc>
                 <a:spcPct val="100000"/>
               </a:lnSpc>
@@ -15414,7 +15577,7 @@
             </a:endParaRPr>
           </a:p>
           <a:p>
-            <a:pPr lvl="1" marL="685800" indent="-225000">
+            <a:pPr lvl="1" marL="685800" indent="-224640">
               <a:lnSpc>
                 <a:spcPct val="100000"/>
               </a:lnSpc>
@@ -15443,7 +15606,7 @@
             </a:endParaRPr>
           </a:p>
           <a:p>
-            <a:pPr lvl="1" marL="685800" indent="-225000">
+            <a:pPr lvl="1" marL="685800" indent="-224640">
               <a:lnSpc>
                 <a:spcPct val="100000"/>
               </a:lnSpc>
@@ -15512,7 +15675,7 @@
         <p:spPr>
           <a:xfrm>
             <a:off x="542880" y="721800"/>
-            <a:ext cx="10350360" cy="491040"/>
+            <a:ext cx="10350000" cy="490680"/>
           </a:xfrm>
           <a:prstGeom prst="rect">
             <a:avLst/>
@@ -15563,7 +15726,7 @@
         <p:spPr>
           <a:xfrm>
             <a:off x="451800" y="1709280"/>
-            <a:ext cx="8217720" cy="4345920"/>
+            <a:ext cx="8217360" cy="4345560"/>
           </a:xfrm>
           <a:prstGeom prst="rect">
             <a:avLst/>
@@ -15589,7 +15752,7 @@
         <p:spPr>
           <a:xfrm>
             <a:off x="609480" y="1769400"/>
-            <a:ext cx="10580760" cy="4848840"/>
+            <a:ext cx="10580400" cy="4848480"/>
           </a:xfrm>
           <a:prstGeom prst="rect">
             <a:avLst/>
@@ -15610,7 +15773,7 @@
             <a:normAutofit/>
           </a:bodyPr>
           <a:p>
-            <a:pPr marL="216000" indent="-212400">
+            <a:pPr marL="216000" indent="-212040">
               <a:lnSpc>
                 <a:spcPct val="90000"/>
               </a:lnSpc>
@@ -15661,7 +15824,7 @@
             </a:endParaRPr>
           </a:p>
           <a:p>
-            <a:pPr lvl="1" marL="685800" indent="-225000">
+            <a:pPr lvl="1" marL="685800" indent="-224640">
               <a:lnSpc>
                 <a:spcPct val="100000"/>
               </a:lnSpc>
@@ -15690,7 +15853,7 @@
             </a:endParaRPr>
           </a:p>
           <a:p>
-            <a:pPr lvl="1" marL="685800" indent="-225000">
+            <a:pPr lvl="1" marL="685800" indent="-224640">
               <a:lnSpc>
                 <a:spcPct val="100000"/>
               </a:lnSpc>
@@ -15732,7 +15895,7 @@
             </a:endParaRPr>
           </a:p>
           <a:p>
-            <a:pPr marL="216000" indent="-212400">
+            <a:pPr marL="216000" indent="-212040">
               <a:lnSpc>
                 <a:spcPct val="90000"/>
               </a:lnSpc>
@@ -15764,7 +15927,7 @@
             </a:endParaRPr>
           </a:p>
           <a:p>
-            <a:pPr lvl="1" marL="685800" indent="-225000">
+            <a:pPr lvl="1" marL="685800" indent="-224640">
               <a:lnSpc>
                 <a:spcPct val="100000"/>
               </a:lnSpc>
@@ -15818,7 +15981,7 @@
             </a:endParaRPr>
           </a:p>
           <a:p>
-            <a:pPr lvl="1" marL="685800" indent="-225000">
+            <a:pPr lvl="1" marL="685800" indent="-224640">
               <a:lnSpc>
                 <a:spcPct val="100000"/>
               </a:lnSpc>
@@ -15872,7 +16035,7 @@
             </a:endParaRPr>
           </a:p>
           <a:p>
-            <a:pPr marL="228600" indent="-225000">
+            <a:pPr marL="228600" indent="-224640">
               <a:lnSpc>
                 <a:spcPct val="90000"/>
               </a:lnSpc>
@@ -15888,7 +16051,7 @@
             </a:endParaRPr>
           </a:p>
           <a:p>
-            <a:pPr marL="228600" indent="-225000" algn="ctr">
+            <a:pPr marL="228600" indent="-224640" algn="ctr">
               <a:lnSpc>
                 <a:spcPct val="90000"/>
               </a:lnSpc>
@@ -15914,7 +16077,7 @@
             </a:endParaRPr>
           </a:p>
           <a:p>
-            <a:pPr marL="457200" indent="-225000" algn="ctr">
+            <a:pPr marL="457200" indent="-224640" algn="ctr">
               <a:lnSpc>
                 <a:spcPct val="90000"/>
               </a:lnSpc>
@@ -15990,7 +16153,7 @@
         <p:spPr>
           <a:xfrm>
             <a:off x="542880" y="721800"/>
-            <a:ext cx="10350360" cy="491040"/>
+            <a:ext cx="10350000" cy="490680"/>
           </a:xfrm>
           <a:prstGeom prst="rect">
             <a:avLst/>
@@ -16041,7 +16204,7 @@
         <p:spPr>
           <a:xfrm>
             <a:off x="451800" y="1709280"/>
-            <a:ext cx="8217720" cy="4345920"/>
+            <a:ext cx="8217360" cy="4345560"/>
           </a:xfrm>
           <a:prstGeom prst="rect">
             <a:avLst/>
@@ -16067,7 +16230,7 @@
         <p:spPr>
           <a:xfrm>
             <a:off x="609480" y="1769400"/>
-            <a:ext cx="10580760" cy="4848840"/>
+            <a:ext cx="10580400" cy="4848480"/>
           </a:xfrm>
           <a:prstGeom prst="rect">
             <a:avLst/>
@@ -16088,7 +16251,7 @@
             <a:normAutofit/>
           </a:bodyPr>
           <a:p>
-            <a:pPr marL="216000" indent="-212400">
+            <a:pPr marL="216000" indent="-212040">
               <a:lnSpc>
                 <a:spcPct val="90000"/>
               </a:lnSpc>
@@ -16139,7 +16302,7 @@
             </a:endParaRPr>
           </a:p>
           <a:p>
-            <a:pPr lvl="1" marL="685800" indent="-225000">
+            <a:pPr lvl="1" marL="685800" indent="-224640">
               <a:lnSpc>
                 <a:spcPct val="100000"/>
               </a:lnSpc>
@@ -16168,7 +16331,7 @@
             </a:endParaRPr>
           </a:p>
           <a:p>
-            <a:pPr lvl="1" marL="685800" indent="-225000">
+            <a:pPr lvl="1" marL="685800" indent="-224640">
               <a:lnSpc>
                 <a:spcPct val="100000"/>
               </a:lnSpc>
@@ -16210,7 +16373,7 @@
             </a:endParaRPr>
           </a:p>
           <a:p>
-            <a:pPr marL="216000" indent="-212400">
+            <a:pPr marL="216000" indent="-212040">
               <a:lnSpc>
                 <a:spcPct val="90000"/>
               </a:lnSpc>
@@ -16242,7 +16405,7 @@
             </a:endParaRPr>
           </a:p>
           <a:p>
-            <a:pPr lvl="1" marL="685800" indent="-225000">
+            <a:pPr lvl="1" marL="685800" indent="-224640">
               <a:lnSpc>
                 <a:spcPct val="100000"/>
               </a:lnSpc>
@@ -16296,7 +16459,7 @@
             </a:endParaRPr>
           </a:p>
           <a:p>
-            <a:pPr lvl="1" marL="685800" indent="-225000">
+            <a:pPr lvl="1" marL="685800" indent="-224640">
               <a:lnSpc>
                 <a:spcPct val="100000"/>
               </a:lnSpc>
@@ -16350,7 +16513,7 @@
             </a:endParaRPr>
           </a:p>
           <a:p>
-            <a:pPr marL="228600" indent="-225000">
+            <a:pPr marL="228600" indent="-224640">
               <a:lnSpc>
                 <a:spcPct val="90000"/>
               </a:lnSpc>
@@ -16366,7 +16529,7 @@
             </a:endParaRPr>
           </a:p>
           <a:p>
-            <a:pPr marL="228600" indent="-225000" algn="ctr">
+            <a:pPr marL="228600" indent="-224640" algn="ctr">
               <a:lnSpc>
                 <a:spcPct val="90000"/>
               </a:lnSpc>
@@ -16392,7 +16555,7 @@
             </a:endParaRPr>
           </a:p>
           <a:p>
-            <a:pPr marL="457200" indent="-225000" algn="ctr">
+            <a:pPr marL="457200" indent="-224640" algn="ctr">
               <a:lnSpc>
                 <a:spcPct val="90000"/>
               </a:lnSpc>
@@ -16468,7 +16631,7 @@
         <p:spPr>
           <a:xfrm>
             <a:off x="335520" y="764640"/>
-            <a:ext cx="10746000" cy="496800"/>
+            <a:ext cx="10745640" cy="496440"/>
           </a:xfrm>
           <a:prstGeom prst="rect">
             <a:avLst/>
@@ -16519,7 +16682,7 @@
         <p:spPr>
           <a:xfrm>
             <a:off x="335520" y="2408400"/>
-            <a:ext cx="10746000" cy="3893760"/>
+            <a:ext cx="10745640" cy="3893400"/>
           </a:xfrm>
           <a:prstGeom prst="rect">
             <a:avLst/>
@@ -16540,7 +16703,7 @@
             <a:noAutofit/>
           </a:bodyPr>
           <a:p>
-            <a:pPr marL="195120" indent="-191520">
+            <a:pPr marL="195120" indent="-191160">
               <a:lnSpc>
                 <a:spcPct val="100000"/>
               </a:lnSpc>
@@ -16609,7 +16772,7 @@
         <p:spPr>
           <a:xfrm>
             <a:off x="335520" y="764640"/>
-            <a:ext cx="10746000" cy="496800"/>
+            <a:ext cx="10745640" cy="496440"/>
           </a:xfrm>
           <a:prstGeom prst="rect">
             <a:avLst/>
@@ -16660,7 +16823,7 @@
         <p:spPr>
           <a:xfrm>
             <a:off x="335520" y="2408400"/>
-            <a:ext cx="10746000" cy="3893760"/>
+            <a:ext cx="10745640" cy="3893400"/>
           </a:xfrm>
           <a:prstGeom prst="rect">
             <a:avLst/>
@@ -16681,7 +16844,7 @@
             <a:noAutofit/>
           </a:bodyPr>
           <a:p>
-            <a:pPr marL="195120" indent="-191520">
+            <a:pPr marL="195120" indent="-191160">
               <a:lnSpc>
                 <a:spcPct val="100000"/>
               </a:lnSpc>
@@ -16710,7 +16873,7 @@
             </a:endParaRPr>
           </a:p>
           <a:p>
-            <a:pPr marL="195120" indent="-191520">
+            <a:pPr marL="195120" indent="-191160">
               <a:lnSpc>
                 <a:spcPct val="100000"/>
               </a:lnSpc>
@@ -16779,7 +16942,7 @@
         <p:spPr>
           <a:xfrm>
             <a:off x="335520" y="764640"/>
-            <a:ext cx="10746000" cy="496800"/>
+            <a:ext cx="10745640" cy="496440"/>
           </a:xfrm>
           <a:prstGeom prst="rect">
             <a:avLst/>
@@ -16830,7 +16993,7 @@
         <p:spPr>
           <a:xfrm>
             <a:off x="335520" y="2408400"/>
-            <a:ext cx="10746000" cy="3893760"/>
+            <a:ext cx="10745640" cy="3893400"/>
           </a:xfrm>
           <a:prstGeom prst="rect">
             <a:avLst/>
@@ -16851,7 +17014,7 @@
             <a:noAutofit/>
           </a:bodyPr>
           <a:p>
-            <a:pPr marL="195120" indent="-191520">
+            <a:pPr marL="195120" indent="-191160">
               <a:lnSpc>
                 <a:spcPct val="100000"/>
               </a:lnSpc>
@@ -16880,7 +17043,7 @@
             </a:endParaRPr>
           </a:p>
           <a:p>
-            <a:pPr marL="195120" indent="-191520">
+            <a:pPr marL="195120" indent="-191160">
               <a:lnSpc>
                 <a:spcPct val="100000"/>
               </a:lnSpc>
@@ -16909,7 +17072,7 @@
             </a:endParaRPr>
           </a:p>
           <a:p>
-            <a:pPr marL="195120" indent="-191520">
+            <a:pPr marL="195120" indent="-191160">
               <a:lnSpc>
                 <a:spcPct val="100000"/>
               </a:lnSpc>

</xml_diff>

<commit_message>
* updated ETCE L00 + L01 + added ETCE L02
</commit_message>
<xml_diff>
--- a/Emerging-Technologies-for-the-Circular-Economy/ETCE-L00-Organization.pptx
+++ b/Emerging-Technologies-for-the-Circular-Economy/ETCE-L00-Organization.pptx
@@ -275,7 +275,7 @@
           </a:bodyPr>
           <a:p>
             <a:pPr algn="r"/>
-            <a:fld id="{5ECD46DA-4230-4046-84A8-61710A22EBCD}" type="slidenum">
+            <a:fld id="{E39EE973-E0ED-4EEA-B437-584D454F7CF3}" type="slidenum">
               <a:rPr b="0" lang="en-US" sz="1400" spc="-1" strike="noStrike">
                 <a:latin typeface="Times New Roman"/>
               </a:rPr>
@@ -323,7 +323,7 @@
         <p:spPr>
           <a:xfrm>
             <a:off x="533520" y="763560"/>
-            <a:ext cx="6693120" cy="3761280"/>
+            <a:ext cx="6692400" cy="3760560"/>
           </a:xfrm>
           <a:prstGeom prst="rect">
             <a:avLst/>
@@ -343,7 +343,7 @@
         <p:spPr>
           <a:xfrm>
             <a:off x="777240" y="4777560"/>
-            <a:ext cx="6206760" cy="4515120"/>
+            <a:ext cx="6206040" cy="4514400"/>
           </a:xfrm>
           <a:prstGeom prst="rect">
             <a:avLst/>
@@ -369,7 +369,7 @@
         <p:spPr>
           <a:xfrm>
             <a:off x="4399200" y="9555480"/>
-            <a:ext cx="3362040" cy="491760"/>
+            <a:ext cx="3361320" cy="491040"/>
           </a:xfrm>
           <a:prstGeom prst="rect">
             <a:avLst/>
@@ -395,7 +395,7 @@
                 <a:spcPct val="100000"/>
               </a:lnSpc>
             </a:pPr>
-            <a:fld id="{D3096E35-33F8-48D7-8CD7-658F8BE49151}" type="slidenum">
+            <a:fld id="{763C4B7C-9159-4CA7-AB57-8502AAA82317}" type="slidenum">
               <a:rPr b="0" lang="de-DE" sz="1800" spc="-1" strike="noStrike">
                 <a:solidFill>
                   <a:srgbClr val="000000"/>
@@ -403,7 +403,7 @@
                 <a:latin typeface="+mn-lt"/>
                 <a:ea typeface="+mn-ea"/>
               </a:rPr>
-              <a:t>6</a:t>
+              <a:t>&lt;number&gt;</a:t>
             </a:fld>
             <a:endParaRPr b="0" lang="en-US" sz="1800" spc="-1" strike="noStrike">
               <a:latin typeface="Arial"/>
@@ -446,7 +446,7 @@
         <p:spPr>
           <a:xfrm>
             <a:off x="533520" y="763560"/>
-            <a:ext cx="6693120" cy="3761280"/>
+            <a:ext cx="6692400" cy="3760560"/>
           </a:xfrm>
           <a:prstGeom prst="rect">
             <a:avLst/>
@@ -466,7 +466,7 @@
         <p:spPr>
           <a:xfrm>
             <a:off x="777240" y="4777560"/>
-            <a:ext cx="6206760" cy="4515120"/>
+            <a:ext cx="6206040" cy="4514400"/>
           </a:xfrm>
           <a:prstGeom prst="rect">
             <a:avLst/>
@@ -492,7 +492,7 @@
         <p:spPr>
           <a:xfrm>
             <a:off x="4399200" y="9555480"/>
-            <a:ext cx="3362040" cy="491760"/>
+            <a:ext cx="3361320" cy="491040"/>
           </a:xfrm>
           <a:prstGeom prst="rect">
             <a:avLst/>
@@ -518,7 +518,7 @@
                 <a:spcPct val="100000"/>
               </a:lnSpc>
             </a:pPr>
-            <a:fld id="{1860606C-2E9D-4576-A441-E663D91DC71A}" type="slidenum">
+            <a:fld id="{F9B6BD41-40AB-4500-BF7C-223F1AF8951E}" type="slidenum">
               <a:rPr b="0" lang="de-DE" sz="1800" spc="-1" strike="noStrike">
                 <a:solidFill>
                   <a:srgbClr val="000000"/>
@@ -569,7 +569,7 @@
         <p:spPr>
           <a:xfrm>
             <a:off x="533520" y="763560"/>
-            <a:ext cx="6693120" cy="3761280"/>
+            <a:ext cx="6692400" cy="3760560"/>
           </a:xfrm>
           <a:prstGeom prst="rect">
             <a:avLst/>
@@ -589,7 +589,7 @@
         <p:spPr>
           <a:xfrm>
             <a:off x="777240" y="4777560"/>
-            <a:ext cx="6206760" cy="4515120"/>
+            <a:ext cx="6206040" cy="4514400"/>
           </a:xfrm>
           <a:prstGeom prst="rect">
             <a:avLst/>
@@ -615,7 +615,7 @@
         <p:spPr>
           <a:xfrm>
             <a:off x="4399200" y="9555480"/>
-            <a:ext cx="3362040" cy="491760"/>
+            <a:ext cx="3361320" cy="491040"/>
           </a:xfrm>
           <a:prstGeom prst="rect">
             <a:avLst/>
@@ -641,7 +641,7 @@
                 <a:spcPct val="100000"/>
               </a:lnSpc>
             </a:pPr>
-            <a:fld id="{B5E96E47-7C1B-4AF5-B2E1-4B50898BFB02}" type="slidenum">
+            <a:fld id="{1BC73638-B934-41A5-9DBB-275FB7F04711}" type="slidenum">
               <a:rPr b="0" lang="de-DE" sz="1800" spc="-1" strike="noStrike">
                 <a:solidFill>
                   <a:srgbClr val="000000"/>
@@ -3407,7 +3407,7 @@
         <p:spPr>
           <a:xfrm>
             <a:off x="11444760" y="0"/>
-            <a:ext cx="741600" cy="6850440"/>
+            <a:ext cx="740880" cy="6849720"/>
           </a:xfrm>
           <a:prstGeom prst="rect">
             <a:avLst/>
@@ -3437,7 +3437,7 @@
         <p:spPr>
           <a:xfrm>
             <a:off x="11438640" y="6453360"/>
-            <a:ext cx="758520" cy="363960"/>
+            <a:ext cx="757800" cy="363960"/>
           </a:xfrm>
           <a:prstGeom prst="rect">
             <a:avLst/>
@@ -3463,7 +3463,7 @@
                 <a:spcPct val="100000"/>
               </a:lnSpc>
             </a:pPr>
-            <a:fld id="{983A4D07-A85E-4391-887B-5A7861E955B2}" type="slidenum">
+            <a:fld id="{A18C56F5-37E9-43B1-BFFE-30EE46C3F845}" type="slidenum">
               <a:rPr b="0" lang="en-US" sz="1800" spc="-1" strike="noStrike">
                 <a:solidFill>
                   <a:srgbClr val="808080"/>
@@ -3488,7 +3488,7 @@
         <p:spPr>
           <a:xfrm>
             <a:off x="912240" y="1268280"/>
-            <a:ext cx="9208440" cy="361800"/>
+            <a:ext cx="9207720" cy="361080"/>
           </a:xfrm>
           <a:prstGeom prst="rect">
             <a:avLst/>
@@ -3518,7 +3518,7 @@
         <p:spPr>
           <a:xfrm>
             <a:off x="0" y="0"/>
-            <a:ext cx="3052440" cy="562320"/>
+            <a:ext cx="3051720" cy="561600"/>
           </a:xfrm>
           <a:prstGeom prst="rect">
             <a:avLst/>
@@ -3541,7 +3541,7 @@
         <p:spPr>
           <a:xfrm>
             <a:off x="7430400" y="134640"/>
-            <a:ext cx="3698280" cy="514440"/>
+            <a:ext cx="3697560" cy="513720"/>
           </a:xfrm>
           <a:prstGeom prst="rect">
             <a:avLst/>
@@ -3560,7 +3560,7 @@
         <p:spPr>
           <a:xfrm>
             <a:off x="912240" y="1268280"/>
-            <a:ext cx="9208440" cy="361800"/>
+            <a:ext cx="9207720" cy="361080"/>
           </a:xfrm>
           <a:prstGeom prst="rect">
             <a:avLst/>
@@ -3586,7 +3586,7 @@
         <p:spPr>
           <a:xfrm>
             <a:off x="11444760" y="0"/>
-            <a:ext cx="741600" cy="6850440"/>
+            <a:ext cx="740880" cy="6849720"/>
           </a:xfrm>
           <a:prstGeom prst="rect">
             <a:avLst/>
@@ -3616,7 +3616,7 @@
         <p:spPr>
           <a:xfrm>
             <a:off x="0" y="6642720"/>
-            <a:ext cx="12184560" cy="211320"/>
+            <a:ext cx="12183840" cy="211320"/>
           </a:xfrm>
           <a:prstGeom prst="rect">
             <a:avLst/>
@@ -3947,7 +3947,7 @@
         <p:spPr>
           <a:xfrm>
             <a:off x="11444760" y="0"/>
-            <a:ext cx="741600" cy="6850440"/>
+            <a:ext cx="740880" cy="6849720"/>
           </a:xfrm>
           <a:prstGeom prst="rect">
             <a:avLst/>
@@ -3977,7 +3977,7 @@
         <p:spPr>
           <a:xfrm>
             <a:off x="11438640" y="6453360"/>
-            <a:ext cx="758520" cy="363960"/>
+            <a:ext cx="757800" cy="363960"/>
           </a:xfrm>
           <a:prstGeom prst="rect">
             <a:avLst/>
@@ -4003,7 +4003,7 @@
                 <a:spcPct val="100000"/>
               </a:lnSpc>
             </a:pPr>
-            <a:fld id="{CA93730F-E943-4A7C-800F-456443448E77}" type="slidenum">
+            <a:fld id="{D266A90D-D4FA-4FF5-96B1-607B5D79A465}" type="slidenum">
               <a:rPr b="0" lang="en-US" sz="1800" spc="-1" strike="noStrike">
                 <a:solidFill>
                   <a:srgbClr val="808080"/>
@@ -4028,7 +4028,7 @@
         <p:spPr>
           <a:xfrm>
             <a:off x="912240" y="1268280"/>
-            <a:ext cx="9208440" cy="361800"/>
+            <a:ext cx="9207720" cy="361080"/>
           </a:xfrm>
           <a:prstGeom prst="rect">
             <a:avLst/>
@@ -4058,7 +4058,7 @@
         <p:spPr>
           <a:xfrm>
             <a:off x="0" y="0"/>
-            <a:ext cx="3052440" cy="562320"/>
+            <a:ext cx="3051720" cy="561600"/>
           </a:xfrm>
           <a:prstGeom prst="rect">
             <a:avLst/>
@@ -4081,7 +4081,7 @@
         <p:spPr>
           <a:xfrm>
             <a:off x="7430400" y="134640"/>
-            <a:ext cx="3698280" cy="514440"/>
+            <a:ext cx="3697560" cy="513720"/>
           </a:xfrm>
           <a:prstGeom prst="rect">
             <a:avLst/>
@@ -4100,7 +4100,7 @@
         <p:spPr>
           <a:xfrm>
             <a:off x="11444760" y="0"/>
-            <a:ext cx="741600" cy="6850440"/>
+            <a:ext cx="740880" cy="6849720"/>
           </a:xfrm>
           <a:prstGeom prst="rect">
             <a:avLst/>
@@ -4130,7 +4130,7 @@
         <p:spPr>
           <a:xfrm>
             <a:off x="11438640" y="6453360"/>
-            <a:ext cx="758520" cy="363960"/>
+            <a:ext cx="757800" cy="363960"/>
           </a:xfrm>
           <a:prstGeom prst="rect">
             <a:avLst/>
@@ -4156,7 +4156,7 @@
                 <a:spcPct val="100000"/>
               </a:lnSpc>
             </a:pPr>
-            <a:fld id="{79FA8AE6-4C4F-4BE2-A321-727953DB9B24}" type="slidenum">
+            <a:fld id="{631B6035-C301-4FF1-B248-629F0E53E5E8}" type="slidenum">
               <a:rPr b="0" lang="en-US" sz="1800" spc="-1" strike="noStrike">
                 <a:solidFill>
                   <a:srgbClr val="808080"/>
@@ -4181,7 +4181,7 @@
         <p:spPr>
           <a:xfrm>
             <a:off x="0" y="6642720"/>
-            <a:ext cx="12184560" cy="211320"/>
+            <a:ext cx="12183840" cy="211320"/>
           </a:xfrm>
           <a:prstGeom prst="rect">
             <a:avLst/>
@@ -4505,7 +4505,7 @@
         <p:spPr>
           <a:xfrm>
             <a:off x="527400" y="1412640"/>
-            <a:ext cx="10361520" cy="1148040"/>
+            <a:ext cx="10360800" cy="1147320"/>
           </a:xfrm>
           <a:prstGeom prst="rect">
             <a:avLst/>
@@ -4556,7 +4556,7 @@
         <p:spPr>
           <a:xfrm>
             <a:off x="527400" y="2852640"/>
-            <a:ext cx="10361520" cy="2368800"/>
+            <a:ext cx="10360800" cy="2368080"/>
           </a:xfrm>
           <a:prstGeom prst="rect">
             <a:avLst/>
@@ -4769,7 +4769,7 @@
         <p:spPr>
           <a:xfrm>
             <a:off x="335520" y="764640"/>
-            <a:ext cx="10745640" cy="496440"/>
+            <a:ext cx="10744920" cy="495720"/>
           </a:xfrm>
           <a:prstGeom prst="rect">
             <a:avLst/>
@@ -4830,7 +4830,7 @@
         <p:spPr>
           <a:xfrm>
             <a:off x="335520" y="2408400"/>
-            <a:ext cx="10745640" cy="3893400"/>
+            <a:ext cx="10744920" cy="3892680"/>
           </a:xfrm>
           <a:prstGeom prst="rect">
             <a:avLst/>
@@ -4851,7 +4851,7 @@
             <a:noAutofit/>
           </a:bodyPr>
           <a:p>
-            <a:pPr marL="195120" indent="-191160">
+            <a:pPr marL="195120" indent="-190440">
               <a:lnSpc>
                 <a:spcPct val="100000"/>
               </a:lnSpc>
@@ -4880,7 +4880,7 @@
             </a:endParaRPr>
           </a:p>
           <a:p>
-            <a:pPr marL="195120" indent="-191160">
+            <a:pPr marL="195120" indent="-190440">
               <a:lnSpc>
                 <a:spcPct val="100000"/>
               </a:lnSpc>
@@ -4909,7 +4909,7 @@
             </a:endParaRPr>
           </a:p>
           <a:p>
-            <a:pPr marL="195120" indent="-191160">
+            <a:pPr marL="195120" indent="-190440">
               <a:lnSpc>
                 <a:spcPct val="100000"/>
               </a:lnSpc>
@@ -4938,7 +4938,7 @@
             </a:endParaRPr>
           </a:p>
           <a:p>
-            <a:pPr marL="195120" indent="-191160">
+            <a:pPr marL="195120" indent="-190440">
               <a:lnSpc>
                 <a:spcPct val="100000"/>
               </a:lnSpc>
@@ -5007,7 +5007,7 @@
         <p:spPr>
           <a:xfrm>
             <a:off x="335520" y="764640"/>
-            <a:ext cx="10745640" cy="496440"/>
+            <a:ext cx="10744920" cy="495720"/>
           </a:xfrm>
           <a:prstGeom prst="rect">
             <a:avLst/>
@@ -5058,7 +5058,7 @@
         <p:spPr>
           <a:xfrm>
             <a:off x="335520" y="2408400"/>
-            <a:ext cx="10745640" cy="3893400"/>
+            <a:ext cx="10744920" cy="3892680"/>
           </a:xfrm>
           <a:prstGeom prst="rect">
             <a:avLst/>
@@ -5079,7 +5079,7 @@
             <a:noAutofit/>
           </a:bodyPr>
           <a:p>
-            <a:pPr marL="195120" indent="-191160">
+            <a:pPr marL="195120" indent="-190440">
               <a:lnSpc>
                 <a:spcPct val="100000"/>
               </a:lnSpc>
@@ -5108,7 +5108,7 @@
             </a:endParaRPr>
           </a:p>
           <a:p>
-            <a:pPr marL="195120" indent="-191160">
+            <a:pPr marL="195120" indent="-190440">
               <a:lnSpc>
                 <a:spcPct val="100000"/>
               </a:lnSpc>
@@ -5137,7 +5137,7 @@
             </a:endParaRPr>
           </a:p>
           <a:p>
-            <a:pPr marL="195120" indent="-191160">
+            <a:pPr marL="195120" indent="-190440">
               <a:lnSpc>
                 <a:spcPct val="100000"/>
               </a:lnSpc>
@@ -5166,7 +5166,7 @@
             </a:endParaRPr>
           </a:p>
           <a:p>
-            <a:pPr marL="195120" indent="-191160">
+            <a:pPr marL="195120" indent="-190440">
               <a:lnSpc>
                 <a:spcPct val="100000"/>
               </a:lnSpc>
@@ -5195,7 +5195,7 @@
             </a:endParaRPr>
           </a:p>
           <a:p>
-            <a:pPr marL="195120" indent="-191160">
+            <a:pPr marL="195120" indent="-190440">
               <a:lnSpc>
                 <a:spcPct val="100000"/>
               </a:lnSpc>
@@ -5264,7 +5264,7 @@
         <p:spPr>
           <a:xfrm>
             <a:off x="335520" y="764640"/>
-            <a:ext cx="10745640" cy="496440"/>
+            <a:ext cx="10744920" cy="495720"/>
           </a:xfrm>
           <a:prstGeom prst="rect">
             <a:avLst/>
@@ -5325,7 +5325,7 @@
         <p:spPr>
           <a:xfrm>
             <a:off x="335520" y="2408400"/>
-            <a:ext cx="10745640" cy="3893400"/>
+            <a:ext cx="10744920" cy="3892680"/>
           </a:xfrm>
           <a:prstGeom prst="rect">
             <a:avLst/>
@@ -5346,7 +5346,7 @@
             <a:noAutofit/>
           </a:bodyPr>
           <a:p>
-            <a:pPr marL="195120" indent="-191160">
+            <a:pPr marL="195120" indent="-190440">
               <a:lnSpc>
                 <a:spcPct val="100000"/>
               </a:lnSpc>
@@ -5375,7 +5375,7 @@
             </a:endParaRPr>
           </a:p>
           <a:p>
-            <a:pPr marL="195120" indent="-191160">
+            <a:pPr marL="195120" indent="-190440">
               <a:lnSpc>
                 <a:spcPct val="100000"/>
               </a:lnSpc>
@@ -5404,7 +5404,7 @@
             </a:endParaRPr>
           </a:p>
           <a:p>
-            <a:pPr marL="195120" indent="-191160">
+            <a:pPr marL="195120" indent="-190440">
               <a:lnSpc>
                 <a:spcPct val="100000"/>
               </a:lnSpc>
@@ -5433,7 +5433,7 @@
             </a:endParaRPr>
           </a:p>
           <a:p>
-            <a:pPr marL="195120" indent="-191160">
+            <a:pPr marL="195120" indent="-190440">
               <a:lnSpc>
                 <a:spcPct val="100000"/>
               </a:lnSpc>
@@ -5462,7 +5462,7 @@
             </a:endParaRPr>
           </a:p>
           <a:p>
-            <a:pPr marL="195120" indent="-191160">
+            <a:pPr marL="195120" indent="-190440">
               <a:lnSpc>
                 <a:spcPct val="100000"/>
               </a:lnSpc>
@@ -5491,7 +5491,7 @@
             </a:endParaRPr>
           </a:p>
           <a:p>
-            <a:pPr marL="195120" indent="-191160">
+            <a:pPr marL="195120" indent="-190440">
               <a:lnSpc>
                 <a:spcPct val="100000"/>
               </a:lnSpc>
@@ -5560,7 +5560,7 @@
         <p:spPr>
           <a:xfrm>
             <a:off x="335520" y="764640"/>
-            <a:ext cx="10745640" cy="496440"/>
+            <a:ext cx="10744920" cy="495720"/>
           </a:xfrm>
           <a:prstGeom prst="rect">
             <a:avLst/>
@@ -5611,7 +5611,7 @@
         <p:spPr>
           <a:xfrm>
             <a:off x="335520" y="1268640"/>
-            <a:ext cx="10745640" cy="5033160"/>
+            <a:ext cx="10744920" cy="5032440"/>
           </a:xfrm>
           <a:prstGeom prst="rect">
             <a:avLst/>
@@ -5632,7 +5632,7 @@
             <a:noAutofit/>
           </a:bodyPr>
           <a:p>
-            <a:pPr marL="195120" indent="-191160">
+            <a:pPr marL="195120" indent="-190440">
               <a:lnSpc>
                 <a:spcPct val="100000"/>
               </a:lnSpc>
@@ -5654,14 +5654,14 @@
                 <a:latin typeface="DejaVu Sans"/>
                 <a:ea typeface="DejaVu Sans"/>
               </a:rPr>
-              <a:t>20.04.2022 → Organization + Introduction to the Circular Economy</a:t>
+              <a:t>20.04.2022 → Organization + Introduction</a:t>
             </a:r>
             <a:endParaRPr b="0" lang="en-US" sz="1800" spc="-1" strike="noStrike">
               <a:latin typeface="Arial"/>
             </a:endParaRPr>
           </a:p>
           <a:p>
-            <a:pPr marL="195120" indent="-191160">
+            <a:pPr marL="195120" indent="-190440">
               <a:lnSpc>
                 <a:spcPct val="100000"/>
               </a:lnSpc>
@@ -5683,14 +5683,14 @@
                 <a:latin typeface="DejaVu Sans"/>
                 <a:ea typeface="DejaVu Sans"/>
               </a:rPr>
-              <a:t>27.04.2022 → Emerging Technologies for the Circular Economy</a:t>
+              <a:t>27.04.2022 → Emerging Technologies for the Circular Economy I</a:t>
             </a:r>
             <a:endParaRPr b="0" lang="en-US" sz="1800" spc="-1" strike="noStrike">
               <a:latin typeface="Arial"/>
             </a:endParaRPr>
           </a:p>
           <a:p>
-            <a:pPr marL="195120" indent="-191160">
+            <a:pPr marL="195120" indent="-190440">
               <a:lnSpc>
                 <a:spcPct val="100000"/>
               </a:lnSpc>
@@ -5712,14 +5712,14 @@
                 <a:latin typeface="DejaVu Sans"/>
                 <a:ea typeface="DejaVu Sans"/>
               </a:rPr>
-              <a:t>04.05.2022 → Introduction to the Internet of Things</a:t>
+              <a:t>04.05.2022 → Emerging Technologies for the Circular Economy II</a:t>
             </a:r>
             <a:endParaRPr b="0" lang="en-US" sz="1800" spc="-1" strike="noStrike">
               <a:latin typeface="Arial"/>
             </a:endParaRPr>
           </a:p>
           <a:p>
-            <a:pPr marL="195120" indent="-191160">
+            <a:pPr marL="195120" indent="-190440">
               <a:lnSpc>
                 <a:spcPct val="100000"/>
               </a:lnSpc>
@@ -5741,14 +5741,14 @@
                 <a:latin typeface="DejaVu Sans"/>
                 <a:ea typeface="DejaVu Sans"/>
               </a:rPr>
-              <a:t>11.05.2022 → Internet of Things – Communication</a:t>
+              <a:t>11.05.2022 → Introduction to the Internet of Things</a:t>
             </a:r>
             <a:endParaRPr b="0" lang="en-US" sz="1800" spc="-1" strike="noStrike">
               <a:latin typeface="Arial"/>
             </a:endParaRPr>
           </a:p>
           <a:p>
-            <a:pPr marL="195120" indent="-191160">
+            <a:pPr marL="195120" indent="-190440">
               <a:lnSpc>
                 <a:spcPct val="100000"/>
               </a:lnSpc>
@@ -5770,14 +5770,14 @@
                 <a:latin typeface="DejaVu Sans"/>
                 <a:ea typeface="DejaVu Sans"/>
               </a:rPr>
-              <a:t>18.05.2022 → Internet of Things – Cloud and BigData</a:t>
+              <a:t>18.05.2022 → Internet of Things – Communication</a:t>
             </a:r>
             <a:endParaRPr b="0" lang="en-US" sz="1800" spc="-1" strike="noStrike">
               <a:latin typeface="Arial"/>
             </a:endParaRPr>
           </a:p>
           <a:p>
-            <a:pPr marL="195120" indent="-191160">
+            <a:pPr marL="195120" indent="-190440">
               <a:lnSpc>
                 <a:spcPct val="100000"/>
               </a:lnSpc>
@@ -5799,14 +5799,14 @@
                 <a:latin typeface="DejaVu Sans"/>
                 <a:ea typeface="DejaVu Sans"/>
               </a:rPr>
-              <a:t>25.05.2022 → Internet of Things – Digital Twins, Privacy and Security</a:t>
+              <a:t>25.05.2022 → Internet of Things – Cloud and BigData + Privacy and Security</a:t>
             </a:r>
             <a:endParaRPr b="0" lang="en-US" sz="1800" spc="-1" strike="noStrike">
               <a:latin typeface="Arial"/>
             </a:endParaRPr>
           </a:p>
           <a:p>
-            <a:pPr marL="195120" indent="-191160">
+            <a:pPr marL="195120" indent="-190440">
               <a:lnSpc>
                 <a:spcPct val="100000"/>
               </a:lnSpc>
@@ -5835,7 +5835,7 @@
             </a:endParaRPr>
           </a:p>
           <a:p>
-            <a:pPr marL="195120" indent="-191160">
+            <a:pPr marL="195120" indent="-190440">
               <a:lnSpc>
                 <a:spcPct val="100000"/>
               </a:lnSpc>
@@ -5864,7 +5864,7 @@
             </a:endParaRPr>
           </a:p>
           <a:p>
-            <a:pPr marL="195120" indent="-191160">
+            <a:pPr marL="195120" indent="-190440">
               <a:lnSpc>
                 <a:spcPct val="100000"/>
               </a:lnSpc>
@@ -5893,7 +5893,7 @@
             </a:endParaRPr>
           </a:p>
           <a:p>
-            <a:pPr marL="195120" indent="-191160">
+            <a:pPr marL="195120" indent="-190440">
               <a:lnSpc>
                 <a:spcPct val="100000"/>
               </a:lnSpc>
@@ -5922,7 +5922,7 @@
             </a:endParaRPr>
           </a:p>
           <a:p>
-            <a:pPr marL="195120" indent="-191160">
+            <a:pPr marL="195120" indent="-190440">
               <a:lnSpc>
                 <a:spcPct val="100000"/>
               </a:lnSpc>
@@ -5951,7 +5951,7 @@
             </a:endParaRPr>
           </a:p>
           <a:p>
-            <a:pPr marL="195120" indent="-191160">
+            <a:pPr marL="195120" indent="-190440">
               <a:lnSpc>
                 <a:spcPct val="100000"/>
               </a:lnSpc>
@@ -5980,7 +5980,7 @@
             </a:endParaRPr>
           </a:p>
           <a:p>
-            <a:pPr marL="195120" indent="-191160">
+            <a:pPr marL="195120" indent="-190440">
               <a:lnSpc>
                 <a:spcPct val="100000"/>
               </a:lnSpc>
@@ -6009,7 +6009,7 @@
             </a:endParaRPr>
           </a:p>
           <a:p>
-            <a:pPr marL="195120" indent="-191160">
+            <a:pPr marL="195120" indent="-190440">
               <a:lnSpc>
                 <a:spcPct val="100000"/>
               </a:lnSpc>
@@ -6099,7 +6099,7 @@
         <p:spPr>
           <a:xfrm>
             <a:off x="335520" y="764640"/>
-            <a:ext cx="10745640" cy="496440"/>
+            <a:ext cx="10744920" cy="495720"/>
           </a:xfrm>
           <a:prstGeom prst="rect">
             <a:avLst/>
@@ -6150,7 +6150,7 @@
         <p:spPr>
           <a:xfrm>
             <a:off x="335520" y="1268640"/>
-            <a:ext cx="10745640" cy="5033160"/>
+            <a:ext cx="10744920" cy="5032440"/>
           </a:xfrm>
           <a:prstGeom prst="rect">
             <a:avLst/>
@@ -6171,7 +6171,7 @@
             <a:noAutofit/>
           </a:bodyPr>
           <a:p>
-            <a:pPr marL="195120" indent="-191160">
+            <a:pPr marL="195120" indent="-190440">
               <a:lnSpc>
                 <a:spcPct val="100000"/>
               </a:lnSpc>
@@ -6220,7 +6220,7 @@
             </a:endParaRPr>
           </a:p>
           <a:p>
-            <a:pPr marL="195120" indent="-191160">
+            <a:pPr marL="195120" indent="-190440">
               <a:lnSpc>
                 <a:spcPct val="100000"/>
               </a:lnSpc>
@@ -6269,7 +6269,7 @@
             </a:endParaRPr>
           </a:p>
           <a:p>
-            <a:pPr marL="195120" indent="-191160">
+            <a:pPr marL="195120" indent="-190440">
               <a:lnSpc>
                 <a:spcPct val="100000"/>
               </a:lnSpc>
@@ -6318,7 +6318,7 @@
             </a:endParaRPr>
           </a:p>
           <a:p>
-            <a:pPr marL="195120" indent="-191160">
+            <a:pPr marL="195120" indent="-190440">
               <a:lnSpc>
                 <a:spcPct val="100000"/>
               </a:lnSpc>
@@ -6367,7 +6367,7 @@
             </a:endParaRPr>
           </a:p>
           <a:p>
-            <a:pPr marL="195120" indent="-191160">
+            <a:pPr marL="195120" indent="-190440">
               <a:lnSpc>
                 <a:spcPct val="100000"/>
               </a:lnSpc>
@@ -6416,7 +6416,7 @@
             </a:endParaRPr>
           </a:p>
           <a:p>
-            <a:pPr marL="195120" indent="-191160">
+            <a:pPr marL="195120" indent="-190440">
               <a:lnSpc>
                 <a:spcPct val="100000"/>
               </a:lnSpc>
@@ -6485,7 +6485,7 @@
             </a:endParaRPr>
           </a:p>
           <a:p>
-            <a:pPr marL="195120" indent="-191160">
+            <a:pPr marL="195120" indent="-190440">
               <a:lnSpc>
                 <a:spcPct val="100000"/>
               </a:lnSpc>
@@ -6534,7 +6534,7 @@
             </a:endParaRPr>
           </a:p>
           <a:p>
-            <a:pPr marL="195120" indent="-191160">
+            <a:pPr marL="195120" indent="-190440">
               <a:lnSpc>
                 <a:spcPct val="100000"/>
               </a:lnSpc>
@@ -6583,7 +6583,7 @@
             </a:endParaRPr>
           </a:p>
           <a:p>
-            <a:pPr marL="195120" indent="-191160">
+            <a:pPr marL="195120" indent="-190440">
               <a:lnSpc>
                 <a:spcPct val="100000"/>
               </a:lnSpc>
@@ -6632,7 +6632,7 @@
             </a:endParaRPr>
           </a:p>
           <a:p>
-            <a:pPr marL="195120" indent="-191160">
+            <a:pPr marL="195120" indent="-190440">
               <a:lnSpc>
                 <a:spcPct val="100000"/>
               </a:lnSpc>
@@ -6721,7 +6721,7 @@
         <p:spPr>
           <a:xfrm>
             <a:off x="335520" y="764640"/>
-            <a:ext cx="10745640" cy="496440"/>
+            <a:ext cx="10744920" cy="495720"/>
           </a:xfrm>
           <a:prstGeom prst="rect">
             <a:avLst/>
@@ -6772,7 +6772,7 @@
         <p:spPr>
           <a:xfrm>
             <a:off x="335520" y="1268280"/>
-            <a:ext cx="10745640" cy="5033160"/>
+            <a:ext cx="10744920" cy="5032440"/>
           </a:xfrm>
           <a:prstGeom prst="rect">
             <a:avLst/>
@@ -6793,7 +6793,7 @@
             <a:noAutofit/>
           </a:bodyPr>
           <a:p>
-            <a:pPr marL="195120" indent="-191160">
+            <a:pPr marL="195120" indent="-190440">
               <a:lnSpc>
                 <a:spcPct val="100000"/>
               </a:lnSpc>
@@ -6835,7 +6835,7 @@
             </a:endParaRPr>
           </a:p>
           <a:p>
-            <a:pPr marL="195120" indent="-191160">
+            <a:pPr marL="195120" indent="-190440">
               <a:lnSpc>
                 <a:spcPct val="100000"/>
               </a:lnSpc>
@@ -6864,7 +6864,7 @@
             </a:endParaRPr>
           </a:p>
           <a:p>
-            <a:pPr lvl="1" marL="652320" indent="-191160">
+            <a:pPr lvl="1" marL="652320" indent="-190440">
               <a:lnSpc>
                 <a:spcPct val="100000"/>
               </a:lnSpc>
@@ -6915,7 +6915,7 @@
             </a:endParaRPr>
           </a:p>
           <a:p>
-            <a:pPr lvl="3" marL="864000" indent="-213480">
+            <a:pPr lvl="3" marL="864000" indent="-212760">
               <a:lnSpc>
                 <a:spcPct val="100000"/>
               </a:lnSpc>
@@ -6944,7 +6944,7 @@
             </a:endParaRPr>
           </a:p>
           <a:p>
-            <a:pPr lvl="1" marL="652320" indent="-191160">
+            <a:pPr lvl="1" marL="652320" indent="-190440">
               <a:lnSpc>
                 <a:spcPct val="100000"/>
               </a:lnSpc>
@@ -6973,7 +6973,7 @@
             </a:endParaRPr>
           </a:p>
           <a:p>
-            <a:pPr lvl="1" marL="652320" indent="-191160">
+            <a:pPr lvl="1" marL="652320" indent="-190440">
               <a:lnSpc>
                 <a:spcPct val="100000"/>
               </a:lnSpc>
@@ -7002,7 +7002,7 @@
             </a:endParaRPr>
           </a:p>
           <a:p>
-            <a:pPr lvl="1" marL="652320" indent="-191160">
+            <a:pPr lvl="1" marL="652320" indent="-190440">
               <a:lnSpc>
                 <a:spcPct val="100000"/>
               </a:lnSpc>
@@ -7202,7 +7202,7 @@
         <p:spPr>
           <a:xfrm>
             <a:off x="335520" y="764640"/>
-            <a:ext cx="10744200" cy="495000"/>
+            <a:ext cx="10743480" cy="494280"/>
           </a:xfrm>
           <a:prstGeom prst="rect">
             <a:avLst/>
@@ -7273,7 +7273,7 @@
         <p:spPr>
           <a:xfrm>
             <a:off x="335520" y="1268640"/>
-            <a:ext cx="10744200" cy="5031720"/>
+            <a:ext cx="10743480" cy="5031000"/>
           </a:xfrm>
           <a:prstGeom prst="rect">
             <a:avLst/>
@@ -7294,7 +7294,7 @@
             <a:noAutofit/>
           </a:bodyPr>
           <a:p>
-            <a:pPr marL="195120" indent="-190080">
+            <a:pPr marL="195120" indent="-189360">
               <a:lnSpc>
                 <a:spcPct val="100000"/>
               </a:lnSpc>
@@ -7334,7 +7334,7 @@
             </a:endParaRPr>
           </a:p>
           <a:p>
-            <a:pPr lvl="1" marL="432000" indent="-212760">
+            <a:pPr lvl="1" marL="432000" indent="-212040">
               <a:lnSpc>
                 <a:spcPct val="100000"/>
               </a:lnSpc>
@@ -7383,7 +7383,7 @@
             </a:endParaRPr>
           </a:p>
           <a:p>
-            <a:pPr lvl="1" marL="432000" indent="-212760">
+            <a:pPr lvl="1" marL="432000" indent="-212040">
               <a:lnSpc>
                 <a:spcPct val="100000"/>
               </a:lnSpc>
@@ -7425,7 +7425,7 @@
             </a:endParaRPr>
           </a:p>
           <a:p>
-            <a:pPr marL="195120" indent="-190080">
+            <a:pPr marL="195120" indent="-189360">
               <a:lnSpc>
                 <a:spcPct val="100000"/>
               </a:lnSpc>
@@ -7455,7 +7455,7 @@
             </a:endParaRPr>
           </a:p>
           <a:p>
-            <a:pPr lvl="1" marL="432000" indent="-212760">
+            <a:pPr lvl="1" marL="432000" indent="-212040">
               <a:lnSpc>
                 <a:spcPct val="100000"/>
               </a:lnSpc>
@@ -7544,7 +7544,7 @@
             </a:endParaRPr>
           </a:p>
           <a:p>
-            <a:pPr lvl="1" marL="432000" indent="-212760">
+            <a:pPr lvl="1" marL="432000" indent="-212040">
               <a:lnSpc>
                 <a:spcPct val="100000"/>
               </a:lnSpc>
@@ -7608,7 +7608,7 @@
             </a:endParaRPr>
           </a:p>
           <a:p>
-            <a:pPr marL="195120" indent="-190080">
+            <a:pPr marL="195120" indent="-189360">
               <a:lnSpc>
                 <a:spcPct val="100000"/>
               </a:lnSpc>
@@ -7638,7 +7638,7 @@
             </a:endParaRPr>
           </a:p>
           <a:p>
-            <a:pPr lvl="1" marL="432000" indent="-212760">
+            <a:pPr lvl="1" marL="432000" indent="-212040">
               <a:lnSpc>
                 <a:spcPct val="100000"/>
               </a:lnSpc>
@@ -7727,7 +7727,7 @@
             </a:endParaRPr>
           </a:p>
           <a:p>
-            <a:pPr lvl="1" marL="432000" indent="-212760">
+            <a:pPr lvl="1" marL="432000" indent="-212040">
               <a:lnSpc>
                 <a:spcPct val="100000"/>
               </a:lnSpc>
@@ -7818,7 +7818,7 @@
         <p:spPr>
           <a:xfrm>
             <a:off x="335520" y="764640"/>
-            <a:ext cx="10745640" cy="496440"/>
+            <a:ext cx="10744920" cy="495720"/>
           </a:xfrm>
           <a:prstGeom prst="rect">
             <a:avLst/>
@@ -7869,7 +7869,7 @@
         <p:spPr>
           <a:xfrm>
             <a:off x="335520" y="1268280"/>
-            <a:ext cx="10745640" cy="5033160"/>
+            <a:ext cx="10744920" cy="5032440"/>
           </a:xfrm>
           <a:prstGeom prst="rect">
             <a:avLst/>
@@ -7900,7 +7900,7 @@
             </a:endParaRPr>
           </a:p>
           <a:p>
-            <a:pPr marL="195120" indent="-191160">
+            <a:pPr marL="195120" indent="-190440">
               <a:lnSpc>
                 <a:spcPct val="100000"/>
               </a:lnSpc>
@@ -7969,7 +7969,7 @@
             </a:endParaRPr>
           </a:p>
           <a:p>
-            <a:pPr marL="195120" indent="-191160">
+            <a:pPr marL="195120" indent="-190440">
               <a:lnSpc>
                 <a:spcPct val="100000"/>
               </a:lnSpc>
@@ -7998,7 +7998,7 @@
             </a:endParaRPr>
           </a:p>
           <a:p>
-            <a:pPr marL="195120" indent="-191160">
+            <a:pPr marL="195120" indent="-190440">
               <a:lnSpc>
                 <a:spcPct val="100000"/>
               </a:lnSpc>
@@ -8027,7 +8027,7 @@
             </a:endParaRPr>
           </a:p>
           <a:p>
-            <a:pPr marL="195120" indent="-191160">
+            <a:pPr marL="195120" indent="-190440">
               <a:lnSpc>
                 <a:spcPct val="100000"/>
               </a:lnSpc>
@@ -8056,7 +8056,7 @@
             </a:endParaRPr>
           </a:p>
           <a:p>
-            <a:pPr marL="195120" indent="-191160">
+            <a:pPr marL="195120" indent="-190440">
               <a:lnSpc>
                 <a:spcPct val="100000"/>
               </a:lnSpc>
@@ -8115,7 +8115,7 @@
             </a:endParaRPr>
           </a:p>
           <a:p>
-            <a:pPr marL="195120" indent="-191160">
+            <a:pPr marL="195120" indent="-190440">
               <a:lnSpc>
                 <a:spcPct val="100000"/>
               </a:lnSpc>
@@ -8145,7 +8145,7 @@
             </a:endParaRPr>
           </a:p>
           <a:p>
-            <a:pPr marL="195120" indent="-191160">
+            <a:pPr marL="195120" indent="-190440">
               <a:lnSpc>
                 <a:spcPct val="100000"/>
               </a:lnSpc>
@@ -8174,7 +8174,7 @@
             </a:endParaRPr>
           </a:p>
           <a:p>
-            <a:pPr marL="195120" indent="-191160">
+            <a:pPr marL="195120" indent="-190440">
               <a:lnSpc>
                 <a:spcPct val="100000"/>
               </a:lnSpc>
@@ -8243,7 +8243,7 @@
         <p:spPr>
           <a:xfrm>
             <a:off x="335520" y="764640"/>
-            <a:ext cx="10745640" cy="496440"/>
+            <a:ext cx="10744920" cy="495720"/>
           </a:xfrm>
           <a:prstGeom prst="rect">
             <a:avLst/>
@@ -8294,7 +8294,7 @@
         <p:spPr>
           <a:xfrm>
             <a:off x="335520" y="1268280"/>
-            <a:ext cx="10745640" cy="5033160"/>
+            <a:ext cx="10744920" cy="5032440"/>
           </a:xfrm>
           <a:prstGeom prst="rect">
             <a:avLst/>
@@ -8315,7 +8315,7 @@
             <a:noAutofit/>
           </a:bodyPr>
           <a:p>
-            <a:pPr marL="216000" indent="-215280">
+            <a:pPr marL="216000" indent="-214560">
               <a:lnSpc>
                 <a:spcPct val="100000"/>
               </a:lnSpc>
@@ -8341,7 +8341,7 @@
             </a:endParaRPr>
           </a:p>
           <a:p>
-            <a:pPr lvl="1" marL="432000" indent="-215280">
+            <a:pPr lvl="1" marL="432000" indent="-214560">
               <a:lnSpc>
                 <a:spcPct val="100000"/>
               </a:lnSpc>
@@ -8370,7 +8370,7 @@
             </a:endParaRPr>
           </a:p>
           <a:p>
-            <a:pPr lvl="1" marL="432000" indent="-215280">
+            <a:pPr lvl="1" marL="432000" indent="-214560">
               <a:lnSpc>
                 <a:spcPct val="100000"/>
               </a:lnSpc>
@@ -8399,7 +8399,7 @@
             </a:endParaRPr>
           </a:p>
           <a:p>
-            <a:pPr lvl="1" marL="432000" indent="-215280">
+            <a:pPr lvl="1" marL="432000" indent="-214560">
               <a:lnSpc>
                 <a:spcPct val="100000"/>
               </a:lnSpc>
@@ -8428,7 +8428,7 @@
             </a:endParaRPr>
           </a:p>
           <a:p>
-            <a:pPr lvl="1" marL="432000" indent="-215280">
+            <a:pPr lvl="1" marL="432000" indent="-214560">
               <a:lnSpc>
                 <a:spcPct val="100000"/>
               </a:lnSpc>
@@ -8457,7 +8457,7 @@
             </a:endParaRPr>
           </a:p>
           <a:p>
-            <a:pPr lvl="1" marL="432000" indent="-215280">
+            <a:pPr lvl="1" marL="432000" indent="-214560">
               <a:lnSpc>
                 <a:spcPct val="100000"/>
               </a:lnSpc>
@@ -8526,7 +8526,7 @@
         <p:spPr>
           <a:xfrm>
             <a:off x="335520" y="764640"/>
-            <a:ext cx="10745640" cy="496440"/>
+            <a:ext cx="10744920" cy="495720"/>
           </a:xfrm>
           <a:prstGeom prst="rect">
             <a:avLst/>
@@ -8577,7 +8577,7 @@
         <p:spPr>
           <a:xfrm>
             <a:off x="335520" y="1268640"/>
-            <a:ext cx="10745640" cy="5033160"/>
+            <a:ext cx="10744920" cy="5032440"/>
           </a:xfrm>
           <a:prstGeom prst="rect">
             <a:avLst/>
@@ -8598,7 +8598,7 @@
             <a:noAutofit/>
           </a:bodyPr>
           <a:p>
-            <a:pPr marL="216000" indent="-215280">
+            <a:pPr marL="216000" indent="-214560">
               <a:lnSpc>
                 <a:spcPct val="100000"/>
               </a:lnSpc>
@@ -8627,7 +8627,7 @@
             </a:endParaRPr>
           </a:p>
           <a:p>
-            <a:pPr marL="216000" indent="-215280">
+            <a:pPr marL="216000" indent="-214560">
               <a:lnSpc>
                 <a:spcPct val="100000"/>
               </a:lnSpc>
@@ -8656,7 +8656,7 @@
             </a:endParaRPr>
           </a:p>
           <a:p>
-            <a:pPr marL="216000" indent="-215280">
+            <a:pPr marL="216000" indent="-214560">
               <a:lnSpc>
                 <a:spcPct val="100000"/>
               </a:lnSpc>
@@ -8705,7 +8705,7 @@
             </a:endParaRPr>
           </a:p>
           <a:p>
-            <a:pPr lvl="1" marL="432000" indent="-215280">
+            <a:pPr lvl="1" marL="432000" indent="-214560">
               <a:lnSpc>
                 <a:spcPct val="100000"/>
               </a:lnSpc>
@@ -8734,7 +8734,7 @@
             </a:endParaRPr>
           </a:p>
           <a:p>
-            <a:pPr lvl="1" marL="432000" indent="-215280">
+            <a:pPr lvl="1" marL="432000" indent="-214560">
               <a:lnSpc>
                 <a:spcPct val="100000"/>
               </a:lnSpc>
@@ -8793,7 +8793,7 @@
         <p:spPr>
           <a:xfrm>
             <a:off x="4655880" y="476640"/>
-            <a:ext cx="2431800" cy="357840"/>
+            <a:ext cx="2431080" cy="357120"/>
           </a:xfrm>
           <a:prstGeom prst="rect">
             <a:avLst/>
@@ -8849,7 +8849,7 @@
         <p:spPr>
           <a:xfrm>
             <a:off x="335520" y="764640"/>
-            <a:ext cx="10743480" cy="494280"/>
+            <a:ext cx="10742760" cy="493560"/>
           </a:xfrm>
           <a:prstGeom prst="rect">
             <a:avLst/>
@@ -8900,7 +8900,7 @@
         <p:spPr>
           <a:xfrm>
             <a:off x="335520" y="1268640"/>
-            <a:ext cx="10743480" cy="5031000"/>
+            <a:ext cx="10742760" cy="5030280"/>
           </a:xfrm>
           <a:prstGeom prst="rect">
             <a:avLst/>
@@ -8957,7 +8957,7 @@
         <p:spPr>
           <a:xfrm>
             <a:off x="336600" y="3429000"/>
-            <a:ext cx="10861200" cy="2053080"/>
+            <a:ext cx="10860480" cy="2052360"/>
           </a:xfrm>
           <a:prstGeom prst="rect">
             <a:avLst/>
@@ -8978,7 +8978,7 @@
             <a:noAutofit/>
           </a:bodyPr>
           <a:p>
-            <a:pPr marL="216000" indent="-214200">
+            <a:pPr marL="216000" indent="-213480">
               <a:lnSpc>
                 <a:spcPct val="100000"/>
               </a:lnSpc>
@@ -9052,7 +9052,7 @@
             </a:endParaRPr>
           </a:p>
           <a:p>
-            <a:pPr marL="216000" indent="-214200">
+            <a:pPr marL="216000" indent="-213480">
               <a:lnSpc>
                 <a:spcPct val="100000"/>
               </a:lnSpc>
@@ -9146,7 +9146,7 @@
         <p:spPr>
           <a:xfrm>
             <a:off x="335520" y="764640"/>
-            <a:ext cx="10745640" cy="496440"/>
+            <a:ext cx="10744920" cy="495720"/>
           </a:xfrm>
           <a:prstGeom prst="rect">
             <a:avLst/>
@@ -9197,7 +9197,7 @@
         <p:spPr>
           <a:xfrm>
             <a:off x="335520" y="1268640"/>
-            <a:ext cx="10745640" cy="5033160"/>
+            <a:ext cx="10744920" cy="5032440"/>
           </a:xfrm>
           <a:prstGeom prst="rect">
             <a:avLst/>
@@ -9218,7 +9218,7 @@
             <a:noAutofit/>
           </a:bodyPr>
           <a:p>
-            <a:pPr marL="195120" indent="-191160">
+            <a:pPr marL="195120" indent="-190440">
               <a:lnSpc>
                 <a:spcPct val="100000"/>
               </a:lnSpc>
@@ -9247,7 +9247,7 @@
             </a:endParaRPr>
           </a:p>
           <a:p>
-            <a:pPr marL="195120" indent="-191160">
+            <a:pPr marL="195120" indent="-190440">
               <a:lnSpc>
                 <a:spcPct val="100000"/>
               </a:lnSpc>
@@ -9276,7 +9276,7 @@
             </a:endParaRPr>
           </a:p>
           <a:p>
-            <a:pPr marL="195120" indent="-191160">
+            <a:pPr marL="195120" indent="-190440">
               <a:lnSpc>
                 <a:spcPct val="100000"/>
               </a:lnSpc>
@@ -9315,7 +9315,7 @@
         <p:spPr>
           <a:xfrm>
             <a:off x="4655880" y="476640"/>
-            <a:ext cx="2431800" cy="357840"/>
+            <a:ext cx="2431080" cy="357120"/>
           </a:xfrm>
           <a:prstGeom prst="rect">
             <a:avLst/>
@@ -9371,7 +9371,7 @@
         <p:spPr>
           <a:xfrm>
             <a:off x="335520" y="840960"/>
-            <a:ext cx="10745640" cy="496440"/>
+            <a:ext cx="10744920" cy="495720"/>
           </a:xfrm>
           <a:prstGeom prst="rect">
             <a:avLst/>
@@ -9422,7 +9422,7 @@
         <p:spPr>
           <a:xfrm>
             <a:off x="388800" y="1488600"/>
-            <a:ext cx="10724040" cy="5204520"/>
+            <a:ext cx="10723320" cy="5204520"/>
           </a:xfrm>
           <a:prstGeom prst="rect">
             <a:avLst/>
@@ -9473,7 +9473,7 @@
             </a:endParaRPr>
           </a:p>
           <a:p>
-            <a:pPr marL="216000" indent="-215280">
+            <a:pPr marL="216000" indent="-214560">
               <a:lnSpc>
                 <a:spcPct val="100000"/>
               </a:lnSpc>
@@ -9519,7 +9519,7 @@
             </a:endParaRPr>
           </a:p>
           <a:p>
-            <a:pPr marL="216000" indent="-215280">
+            <a:pPr marL="216000" indent="-214560">
               <a:lnSpc>
                 <a:spcPct val="100000"/>
               </a:lnSpc>
@@ -9565,7 +9565,7 @@
             </a:endParaRPr>
           </a:p>
           <a:p>
-            <a:pPr marL="216000" indent="-215280">
+            <a:pPr marL="216000" indent="-214560">
               <a:lnSpc>
                 <a:spcPct val="100000"/>
               </a:lnSpc>
@@ -9591,7 +9591,7 @@
             </a:endParaRPr>
           </a:p>
           <a:p>
-            <a:pPr marL="216000" indent="-215280">
+            <a:pPr marL="216000" indent="-214560">
               <a:lnSpc>
                 <a:spcPct val="100000"/>
               </a:lnSpc>
@@ -9627,7 +9627,7 @@
             </a:endParaRPr>
           </a:p>
           <a:p>
-            <a:pPr marL="216000" indent="-215280">
+            <a:pPr marL="216000" indent="-214560">
               <a:lnSpc>
                 <a:spcPct val="100000"/>
               </a:lnSpc>
@@ -9653,7 +9653,7 @@
             </a:endParaRPr>
           </a:p>
           <a:p>
-            <a:pPr marL="216000" indent="-215280">
+            <a:pPr marL="216000" indent="-214560">
               <a:lnSpc>
                 <a:spcPct val="100000"/>
               </a:lnSpc>
@@ -9679,7 +9679,7 @@
             </a:endParaRPr>
           </a:p>
           <a:p>
-            <a:pPr marL="216000" indent="-215280">
+            <a:pPr marL="216000" indent="-214560">
               <a:lnSpc>
                 <a:spcPct val="100000"/>
               </a:lnSpc>
@@ -9715,7 +9715,7 @@
             </a:endParaRPr>
           </a:p>
           <a:p>
-            <a:pPr marL="216000" indent="-215280">
+            <a:pPr marL="216000" indent="-214560">
               <a:lnSpc>
                 <a:spcPct val="100000"/>
               </a:lnSpc>
@@ -9741,7 +9741,7 @@
             </a:endParaRPr>
           </a:p>
           <a:p>
-            <a:pPr marL="216000" indent="-215280">
+            <a:pPr marL="216000" indent="-214560">
               <a:lnSpc>
                 <a:spcPct val="100000"/>
               </a:lnSpc>
@@ -9787,7 +9787,7 @@
             </a:endParaRPr>
           </a:p>
           <a:p>
-            <a:pPr marL="216000" indent="-215280">
+            <a:pPr marL="216000" indent="-214560">
               <a:lnSpc>
                 <a:spcPct val="100000"/>
               </a:lnSpc>
@@ -9823,7 +9823,7 @@
             </a:endParaRPr>
           </a:p>
           <a:p>
-            <a:pPr marL="216000" indent="-215280">
+            <a:pPr marL="216000" indent="-214560">
               <a:lnSpc>
                 <a:spcPct val="100000"/>
               </a:lnSpc>
@@ -9889,7 +9889,7 @@
             </a:endParaRPr>
           </a:p>
           <a:p>
-            <a:pPr marL="216000" indent="-215280">
+            <a:pPr marL="216000" indent="-214560">
               <a:lnSpc>
                 <a:spcPct val="100000"/>
               </a:lnSpc>
@@ -9925,7 +9925,7 @@
             </a:endParaRPr>
           </a:p>
           <a:p>
-            <a:pPr marL="216000" indent="-215280">
+            <a:pPr marL="216000" indent="-214560">
               <a:lnSpc>
                 <a:spcPct val="100000"/>
               </a:lnSpc>
@@ -9991,7 +9991,7 @@
         <p:spPr>
           <a:xfrm>
             <a:off x="335520" y="764640"/>
-            <a:ext cx="10745640" cy="496440"/>
+            <a:ext cx="10744920" cy="495720"/>
           </a:xfrm>
           <a:prstGeom prst="rect">
             <a:avLst/>
@@ -10042,7 +10042,7 @@
         <p:spPr>
           <a:xfrm>
             <a:off x="4655880" y="476640"/>
-            <a:ext cx="2431800" cy="357840"/>
+            <a:ext cx="2431080" cy="357120"/>
           </a:xfrm>
           <a:prstGeom prst="rect">
             <a:avLst/>
@@ -10068,7 +10068,7 @@
         <p:spPr>
           <a:xfrm>
             <a:off x="494640" y="1523880"/>
-            <a:ext cx="10364400" cy="479520"/>
+            <a:ext cx="10363680" cy="478800"/>
           </a:xfrm>
           <a:prstGeom prst="rect">
             <a:avLst/>
@@ -10118,13 +10118,13 @@
         </p:nvPicPr>
         <p:blipFill>
           <a:blip r:embed="rId1"/>
-          <a:srcRect l="0" t="0" r="0" b="43298"/>
+          <a:srcRect l="0" t="0" r="0" b="43289"/>
           <a:stretch/>
         </p:blipFill>
         <p:spPr>
           <a:xfrm>
             <a:off x="609120" y="2057760"/>
-            <a:ext cx="9516960" cy="3881160"/>
+            <a:ext cx="9516240" cy="3880440"/>
           </a:xfrm>
           <a:prstGeom prst="rect">
             <a:avLst/>
@@ -10173,7 +10173,7 @@
         <p:spPr>
           <a:xfrm>
             <a:off x="335520" y="764640"/>
-            <a:ext cx="10745640" cy="496440"/>
+            <a:ext cx="10744920" cy="495720"/>
           </a:xfrm>
           <a:prstGeom prst="rect">
             <a:avLst/>
@@ -10224,7 +10224,7 @@
         <p:spPr>
           <a:xfrm>
             <a:off x="4655880" y="476640"/>
-            <a:ext cx="2431800" cy="357840"/>
+            <a:ext cx="2431080" cy="357120"/>
           </a:xfrm>
           <a:prstGeom prst="rect">
             <a:avLst/>
@@ -10250,7 +10250,7 @@
         <p:spPr>
           <a:xfrm>
             <a:off x="494640" y="1474920"/>
-            <a:ext cx="10364400" cy="479520"/>
+            <a:ext cx="10363680" cy="478800"/>
           </a:xfrm>
           <a:prstGeom prst="rect">
             <a:avLst/>
@@ -10316,7 +10316,7 @@
         <p:spPr>
           <a:xfrm>
             <a:off x="446400" y="2185200"/>
-            <a:ext cx="9404280" cy="3847320"/>
+            <a:ext cx="9403560" cy="3846600"/>
           </a:xfrm>
           <a:prstGeom prst="rect">
             <a:avLst/>
@@ -10365,7 +10365,7 @@
         <p:spPr>
           <a:xfrm>
             <a:off x="335520" y="764640"/>
-            <a:ext cx="10745640" cy="496440"/>
+            <a:ext cx="10744920" cy="495720"/>
           </a:xfrm>
           <a:prstGeom prst="rect">
             <a:avLst/>
@@ -10416,7 +10416,7 @@
         <p:spPr>
           <a:xfrm>
             <a:off x="4655880" y="476640"/>
-            <a:ext cx="2431800" cy="357840"/>
+            <a:ext cx="2431080" cy="357120"/>
           </a:xfrm>
           <a:prstGeom prst="rect">
             <a:avLst/>
@@ -10442,7 +10442,7 @@
         <p:spPr>
           <a:xfrm>
             <a:off x="494640" y="1523880"/>
-            <a:ext cx="10364400" cy="479520"/>
+            <a:ext cx="10363680" cy="478800"/>
           </a:xfrm>
           <a:prstGeom prst="rect">
             <a:avLst/>
@@ -10498,7 +10498,7 @@
         <p:spPr>
           <a:xfrm>
             <a:off x="494640" y="2088360"/>
-            <a:ext cx="8942040" cy="3963600"/>
+            <a:ext cx="8941320" cy="3962880"/>
           </a:xfrm>
           <a:prstGeom prst="rect">
             <a:avLst/>
@@ -10547,7 +10547,7 @@
         <p:spPr>
           <a:xfrm>
             <a:off x="335520" y="764640"/>
-            <a:ext cx="10745640" cy="496440"/>
+            <a:ext cx="10744920" cy="495720"/>
           </a:xfrm>
           <a:prstGeom prst="rect">
             <a:avLst/>
@@ -10598,7 +10598,7 @@
         <p:spPr>
           <a:xfrm>
             <a:off x="4655880" y="476640"/>
-            <a:ext cx="2431800" cy="357840"/>
+            <a:ext cx="2431080" cy="357120"/>
           </a:xfrm>
           <a:prstGeom prst="rect">
             <a:avLst/>
@@ -10624,7 +10624,7 @@
         <p:spPr>
           <a:xfrm>
             <a:off x="494640" y="1523880"/>
-            <a:ext cx="10364400" cy="479520"/>
+            <a:ext cx="10363680" cy="478800"/>
           </a:xfrm>
           <a:prstGeom prst="rect">
             <a:avLst/>
@@ -10680,7 +10680,7 @@
         <p:spPr>
           <a:xfrm>
             <a:off x="494640" y="2166840"/>
-            <a:ext cx="8337600" cy="4178880"/>
+            <a:ext cx="8336880" cy="4178160"/>
           </a:xfrm>
           <a:prstGeom prst="rect">
             <a:avLst/>
@@ -10729,7 +10729,7 @@
         <p:spPr>
           <a:xfrm>
             <a:off x="335520" y="768240"/>
-            <a:ext cx="10745640" cy="496440"/>
+            <a:ext cx="10744920" cy="495720"/>
           </a:xfrm>
           <a:prstGeom prst="rect">
             <a:avLst/>
@@ -10780,7 +10780,7 @@
         <p:spPr>
           <a:xfrm>
             <a:off x="388800" y="1488600"/>
-            <a:ext cx="10719360" cy="5204520"/>
+            <a:ext cx="10718640" cy="5204520"/>
           </a:xfrm>
           <a:prstGeom prst="rect">
             <a:avLst/>
@@ -10831,7 +10831,7 @@
             </a:endParaRPr>
           </a:p>
           <a:p>
-            <a:pPr marL="216000" indent="-213480">
+            <a:pPr marL="216000" indent="-212760">
               <a:lnSpc>
                 <a:spcPct val="100000"/>
               </a:lnSpc>
@@ -10887,7 +10887,7 @@
             </a:endParaRPr>
           </a:p>
           <a:p>
-            <a:pPr marL="216000" indent="-213480">
+            <a:pPr marL="216000" indent="-212760">
               <a:lnSpc>
                 <a:spcPct val="100000"/>
               </a:lnSpc>
@@ -10943,7 +10943,7 @@
             </a:endParaRPr>
           </a:p>
           <a:p>
-            <a:pPr marL="216000" indent="-213480">
+            <a:pPr marL="216000" indent="-212760">
               <a:lnSpc>
                 <a:spcPct val="100000"/>
               </a:lnSpc>
@@ -10969,7 +10969,7 @@
             </a:endParaRPr>
           </a:p>
           <a:p>
-            <a:pPr marL="216000" indent="-213480">
+            <a:pPr marL="216000" indent="-212760">
               <a:lnSpc>
                 <a:spcPct val="100000"/>
               </a:lnSpc>
@@ -11005,7 +11005,7 @@
             </a:endParaRPr>
           </a:p>
           <a:p>
-            <a:pPr marL="216000" indent="-213480">
+            <a:pPr marL="216000" indent="-212760">
               <a:lnSpc>
                 <a:spcPct val="100000"/>
               </a:lnSpc>
@@ -11031,7 +11031,7 @@
             </a:endParaRPr>
           </a:p>
           <a:p>
-            <a:pPr marL="216000" indent="-213480">
+            <a:pPr marL="216000" indent="-212760">
               <a:lnSpc>
                 <a:spcPct val="100000"/>
               </a:lnSpc>
@@ -11057,7 +11057,7 @@
             </a:endParaRPr>
           </a:p>
           <a:p>
-            <a:pPr marL="216000" indent="-213480">
+            <a:pPr marL="216000" indent="-212760">
               <a:lnSpc>
                 <a:spcPct val="100000"/>
               </a:lnSpc>
@@ -11093,7 +11093,7 @@
             </a:endParaRPr>
           </a:p>
           <a:p>
-            <a:pPr marL="216000" indent="-213480">
+            <a:pPr marL="216000" indent="-212760">
               <a:lnSpc>
                 <a:spcPct val="100000"/>
               </a:lnSpc>
@@ -11119,7 +11119,7 @@
             </a:endParaRPr>
           </a:p>
           <a:p>
-            <a:pPr marL="216000" indent="-213480">
+            <a:pPr marL="216000" indent="-212760">
               <a:lnSpc>
                 <a:spcPct val="100000"/>
               </a:lnSpc>
@@ -11165,7 +11165,7 @@
             </a:endParaRPr>
           </a:p>
           <a:p>
-            <a:pPr marL="216000" indent="-213480">
+            <a:pPr marL="216000" indent="-212760">
               <a:lnSpc>
                 <a:spcPct val="100000"/>
               </a:lnSpc>
@@ -11201,7 +11201,7 @@
             </a:endParaRPr>
           </a:p>
           <a:p>
-            <a:pPr marL="216000" indent="-213480">
+            <a:pPr marL="216000" indent="-212760">
               <a:lnSpc>
                 <a:spcPct val="100000"/>
               </a:lnSpc>
@@ -11267,7 +11267,7 @@
             </a:endParaRPr>
           </a:p>
           <a:p>
-            <a:pPr marL="216000" indent="-213480">
+            <a:pPr marL="216000" indent="-212760">
               <a:lnSpc>
                 <a:spcPct val="100000"/>
               </a:lnSpc>
@@ -11303,7 +11303,7 @@
             </a:endParaRPr>
           </a:p>
           <a:p>
-            <a:pPr marL="216000" indent="-213480">
+            <a:pPr marL="216000" indent="-212760">
               <a:lnSpc>
                 <a:spcPct val="100000"/>
               </a:lnSpc>
@@ -11369,7 +11369,7 @@
         <p:spPr>
           <a:xfrm>
             <a:off x="335520" y="764640"/>
-            <a:ext cx="10745640" cy="496440"/>
+            <a:ext cx="10744920" cy="495720"/>
           </a:xfrm>
           <a:prstGeom prst="rect">
             <a:avLst/>
@@ -11420,7 +11420,7 @@
         <p:spPr>
           <a:xfrm>
             <a:off x="494640" y="1523880"/>
-            <a:ext cx="10364400" cy="479520"/>
+            <a:ext cx="10363680" cy="478800"/>
           </a:xfrm>
           <a:prstGeom prst="rect">
             <a:avLst/>
@@ -11510,7 +11510,7 @@
         <p:spPr>
           <a:xfrm>
             <a:off x="1895760" y="2238840"/>
-            <a:ext cx="6786720" cy="4157640"/>
+            <a:ext cx="6786000" cy="4156920"/>
           </a:xfrm>
           <a:prstGeom prst="rect">
             <a:avLst/>
@@ -11559,7 +11559,7 @@
         <p:spPr>
           <a:xfrm>
             <a:off x="335520" y="764640"/>
-            <a:ext cx="10745640" cy="496440"/>
+            <a:ext cx="10744920" cy="495720"/>
           </a:xfrm>
           <a:prstGeom prst="rect">
             <a:avLst/>
@@ -11610,7 +11610,7 @@
         <p:spPr>
           <a:xfrm>
             <a:off x="494640" y="1488600"/>
-            <a:ext cx="5447160" cy="444240"/>
+            <a:ext cx="5446440" cy="443520"/>
           </a:xfrm>
           <a:prstGeom prst="rect">
             <a:avLst/>
@@ -11676,7 +11676,7 @@
         <p:spPr>
           <a:xfrm>
             <a:off x="1828800" y="1937160"/>
-            <a:ext cx="7954200" cy="4088520"/>
+            <a:ext cx="7953480" cy="4087800"/>
           </a:xfrm>
           <a:prstGeom prst="rect">
             <a:avLst/>
@@ -11725,7 +11725,7 @@
         <p:spPr>
           <a:xfrm>
             <a:off x="335520" y="764640"/>
-            <a:ext cx="10745640" cy="496440"/>
+            <a:ext cx="10744920" cy="495720"/>
           </a:xfrm>
           <a:prstGeom prst="rect">
             <a:avLst/>
@@ -11780,7 +11780,7 @@
         <p:spPr>
           <a:xfrm>
             <a:off x="2679480" y="2130480"/>
-            <a:ext cx="7374600" cy="3485520"/>
+            <a:ext cx="7373880" cy="3484800"/>
           </a:xfrm>
           <a:prstGeom prst="rect">
             <a:avLst/>
@@ -11799,7 +11799,7 @@
         <p:spPr>
           <a:xfrm>
             <a:off x="494640" y="1418040"/>
-            <a:ext cx="5218560" cy="444240"/>
+            <a:ext cx="5217840" cy="443520"/>
           </a:xfrm>
           <a:prstGeom prst="rect">
             <a:avLst/>
@@ -11880,7 +11880,7 @@
         <p:spPr>
           <a:xfrm>
             <a:off x="335520" y="764640"/>
-            <a:ext cx="10745640" cy="496440"/>
+            <a:ext cx="10744920" cy="495720"/>
           </a:xfrm>
           <a:prstGeom prst="rect">
             <a:avLst/>
@@ -11935,7 +11935,7 @@
         <p:spPr>
           <a:xfrm>
             <a:off x="2394720" y="1153800"/>
-            <a:ext cx="1468440" cy="2169720"/>
+            <a:ext cx="1467720" cy="2169000"/>
           </a:xfrm>
           <a:prstGeom prst="rect">
             <a:avLst/>
@@ -11958,7 +11958,7 @@
         <p:spPr>
           <a:xfrm>
             <a:off x="7250040" y="1153800"/>
-            <a:ext cx="1733760" cy="2169720"/>
+            <a:ext cx="1733040" cy="2169000"/>
           </a:xfrm>
           <a:prstGeom prst="rect">
             <a:avLst/>
@@ -11981,7 +11981,7 @@
         <p:spPr>
           <a:xfrm>
             <a:off x="4846320" y="4206240"/>
-            <a:ext cx="1782360" cy="1774440"/>
+            <a:ext cx="1781640" cy="1773720"/>
           </a:xfrm>
           <a:prstGeom prst="rect">
             <a:avLst/>
@@ -12000,7 +12000,7 @@
         <p:spPr>
           <a:xfrm>
             <a:off x="1330200" y="3269880"/>
-            <a:ext cx="3633120" cy="674640"/>
+            <a:ext cx="3632400" cy="673920"/>
           </a:xfrm>
           <a:prstGeom prst="rect">
             <a:avLst/>
@@ -12077,7 +12077,7 @@
         <p:spPr>
           <a:xfrm>
             <a:off x="6321600" y="3269880"/>
-            <a:ext cx="3633120" cy="674640"/>
+            <a:ext cx="3632400" cy="673920"/>
           </a:xfrm>
           <a:prstGeom prst="rect">
             <a:avLst/>
@@ -12154,7 +12154,7 @@
         <p:spPr>
           <a:xfrm>
             <a:off x="1312200" y="5920200"/>
-            <a:ext cx="3633120" cy="674640"/>
+            <a:ext cx="3632400" cy="673920"/>
           </a:xfrm>
           <a:prstGeom prst="rect">
             <a:avLst/>
@@ -12211,7 +12211,7 @@
         <p:spPr>
           <a:xfrm>
             <a:off x="3950640" y="5903280"/>
-            <a:ext cx="3633120" cy="674640"/>
+            <a:ext cx="3632400" cy="673920"/>
           </a:xfrm>
           <a:prstGeom prst="rect">
             <a:avLst/>
@@ -12322,7 +12322,7 @@
         <p:spPr>
           <a:xfrm>
             <a:off x="685800" y="2514600"/>
-            <a:ext cx="8872560" cy="3839040"/>
+            <a:ext cx="8871840" cy="3838320"/>
           </a:xfrm>
           <a:prstGeom prst="rect">
             <a:avLst/>
@@ -12341,7 +12341,7 @@
         <p:spPr>
           <a:xfrm>
             <a:off x="335520" y="764640"/>
-            <a:ext cx="10745640" cy="496440"/>
+            <a:ext cx="10744920" cy="495720"/>
           </a:xfrm>
           <a:prstGeom prst="rect">
             <a:avLst/>
@@ -12392,7 +12392,7 @@
         <p:spPr>
           <a:xfrm>
             <a:off x="494640" y="1312200"/>
-            <a:ext cx="1735560" cy="366840"/>
+            <a:ext cx="1734840" cy="366120"/>
           </a:xfrm>
           <a:prstGeom prst="rect">
             <a:avLst/>
@@ -12568,7 +12568,7 @@
         <p:spPr>
           <a:xfrm>
             <a:off x="642600" y="1679400"/>
-            <a:ext cx="4402440" cy="638280"/>
+            <a:ext cx="4401720" cy="638280"/>
           </a:xfrm>
           <a:prstGeom prst="rect">
             <a:avLst/>
@@ -12639,7 +12639,7 @@
         <p:spPr>
           <a:xfrm>
             <a:off x="6549480" y="1679400"/>
-            <a:ext cx="4876200" cy="632880"/>
+            <a:ext cx="4875480" cy="632160"/>
           </a:xfrm>
           <a:prstGeom prst="rect">
             <a:avLst/>
@@ -12710,7 +12710,7 @@
         <p:spPr>
           <a:xfrm>
             <a:off x="7839360" y="1679400"/>
-            <a:ext cx="2617560" cy="430200"/>
+            <a:ext cx="2616840" cy="429480"/>
           </a:xfrm>
           <a:prstGeom prst="rect">
             <a:avLst/>
@@ -12761,7 +12761,7 @@
         <p:spPr>
           <a:xfrm>
             <a:off x="8857440" y="3943440"/>
-            <a:ext cx="282240" cy="363960"/>
+            <a:ext cx="281520" cy="363960"/>
           </a:xfrm>
           <a:prstGeom prst="rect">
             <a:avLst/>
@@ -12812,7 +12812,7 @@
         <p:spPr>
           <a:xfrm>
             <a:off x="9537840" y="4548960"/>
-            <a:ext cx="282240" cy="363960"/>
+            <a:ext cx="281520" cy="363960"/>
           </a:xfrm>
           <a:prstGeom prst="rect">
             <a:avLst/>
@@ -12863,7 +12863,7 @@
         <p:spPr>
           <a:xfrm>
             <a:off x="7279920" y="6101280"/>
-            <a:ext cx="282600" cy="363960"/>
+            <a:ext cx="281880" cy="363960"/>
           </a:xfrm>
           <a:prstGeom prst="rect">
             <a:avLst/>
@@ -12949,7 +12949,7 @@
         <p:spPr>
           <a:xfrm>
             <a:off x="1058760" y="6130800"/>
-            <a:ext cx="282600" cy="363960"/>
+            <a:ext cx="281880" cy="363960"/>
           </a:xfrm>
           <a:prstGeom prst="rect">
             <a:avLst/>
@@ -13030,7 +13030,7 @@
         <p:spPr>
           <a:xfrm>
             <a:off x="335520" y="764640"/>
-            <a:ext cx="10745640" cy="496440"/>
+            <a:ext cx="10744920" cy="495720"/>
           </a:xfrm>
           <a:prstGeom prst="rect">
             <a:avLst/>
@@ -13081,7 +13081,7 @@
         <p:spPr>
           <a:xfrm>
             <a:off x="335520" y="1268640"/>
-            <a:ext cx="10745640" cy="5033160"/>
+            <a:ext cx="10744920" cy="5032440"/>
           </a:xfrm>
           <a:prstGeom prst="rect">
             <a:avLst/>
@@ -13102,7 +13102,7 @@
             <a:noAutofit/>
           </a:bodyPr>
           <a:p>
-            <a:pPr marL="216000" indent="-215280">
+            <a:pPr marL="216000" indent="-214560">
               <a:lnSpc>
                 <a:spcPct val="100000"/>
               </a:lnSpc>
@@ -13131,7 +13131,7 @@
             </a:endParaRPr>
           </a:p>
           <a:p>
-            <a:pPr lvl="1" marL="432000" indent="-215280">
+            <a:pPr lvl="1" marL="432000" indent="-214560">
               <a:lnSpc>
                 <a:spcPct val="100000"/>
               </a:lnSpc>
@@ -13173,7 +13173,7 @@
             </a:endParaRPr>
           </a:p>
           <a:p>
-            <a:pPr marL="216000" indent="-215280">
+            <a:pPr marL="216000" indent="-214560">
               <a:lnSpc>
                 <a:spcPct val="100000"/>
               </a:lnSpc>
@@ -13202,7 +13202,7 @@
             </a:endParaRPr>
           </a:p>
           <a:p>
-            <a:pPr lvl="1" marL="432000" indent="-215280">
+            <a:pPr lvl="1" marL="432000" indent="-214560">
               <a:lnSpc>
                 <a:spcPct val="100000"/>
               </a:lnSpc>
@@ -13241,7 +13241,7 @@
             </a:endParaRPr>
           </a:p>
           <a:p>
-            <a:pPr lvl="1" marL="432000" indent="-215280">
+            <a:pPr lvl="1" marL="432000" indent="-214560">
               <a:lnSpc>
                 <a:spcPct val="100000"/>
               </a:lnSpc>
@@ -13270,7 +13270,7 @@
             </a:endParaRPr>
           </a:p>
           <a:p>
-            <a:pPr lvl="1" marL="432000" indent="-215280">
+            <a:pPr lvl="1" marL="432000" indent="-214560">
               <a:lnSpc>
                 <a:spcPct val="100000"/>
               </a:lnSpc>
@@ -13352,7 +13352,7 @@
         <p:spPr>
           <a:xfrm>
             <a:off x="335520" y="764640"/>
-            <a:ext cx="10743840" cy="494640"/>
+            <a:ext cx="10743120" cy="493920"/>
           </a:xfrm>
           <a:prstGeom prst="rect">
             <a:avLst/>
@@ -13403,7 +13403,7 @@
         <p:spPr>
           <a:xfrm>
             <a:off x="335520" y="1268280"/>
-            <a:ext cx="10743840" cy="5031360"/>
+            <a:ext cx="10743120" cy="5030640"/>
           </a:xfrm>
           <a:prstGeom prst="rect">
             <a:avLst/>
@@ -13437,7 +13437,7 @@
             </a:endParaRPr>
           </a:p>
           <a:p>
-            <a:pPr marL="195120" indent="-189720">
+            <a:pPr marL="195120" indent="-189000">
               <a:lnSpc>
                 <a:spcPct val="100000"/>
               </a:lnSpc>
@@ -13493,7 +13493,7 @@
         <p:spPr>
           <a:xfrm>
             <a:off x="6285600" y="2132640"/>
-            <a:ext cx="513360" cy="493200"/>
+            <a:ext cx="512640" cy="492480"/>
           </a:xfrm>
           <a:prstGeom prst="star5">
             <a:avLst>
@@ -13535,7 +13535,7 @@
         <p:spPr>
           <a:xfrm>
             <a:off x="4089960" y="2247480"/>
-            <a:ext cx="2281680" cy="363960"/>
+            <a:ext cx="2280960" cy="363960"/>
           </a:xfrm>
           <a:prstGeom prst="rect">
             <a:avLst/>
@@ -13636,7 +13636,7 @@
         <p:spPr>
           <a:xfrm>
             <a:off x="335520" y="764640"/>
-            <a:ext cx="10743840" cy="494640"/>
+            <a:ext cx="10743120" cy="493920"/>
           </a:xfrm>
           <a:prstGeom prst="rect">
             <a:avLst/>
@@ -13687,7 +13687,7 @@
         <p:spPr>
           <a:xfrm>
             <a:off x="335520" y="1268640"/>
-            <a:ext cx="10743840" cy="5031360"/>
+            <a:ext cx="10743120" cy="5030640"/>
           </a:xfrm>
           <a:prstGeom prst="rect">
             <a:avLst/>
@@ -13708,7 +13708,7 @@
             <a:noAutofit/>
           </a:bodyPr>
           <a:p>
-            <a:pPr marL="195120" indent="-189720">
+            <a:pPr marL="195120" indent="-189000">
               <a:lnSpc>
                 <a:spcPct val="100000"/>
               </a:lnSpc>
@@ -13770,7 +13770,7 @@
             </a:endParaRPr>
           </a:p>
           <a:p>
-            <a:pPr marL="195120" indent="-189720">
+            <a:pPr marL="195120" indent="-189000">
               <a:lnSpc>
                 <a:spcPct val="100000"/>
               </a:lnSpc>
@@ -13819,7 +13819,7 @@
             </a:endParaRPr>
           </a:p>
           <a:p>
-            <a:pPr marL="195120" indent="-189720">
+            <a:pPr marL="195120" indent="-189000">
               <a:lnSpc>
                 <a:spcPct val="100000"/>
               </a:lnSpc>
@@ -13868,7 +13868,7 @@
             </a:endParaRPr>
           </a:p>
           <a:p>
-            <a:pPr marL="195120" indent="-189720">
+            <a:pPr marL="195120" indent="-189000">
               <a:lnSpc>
                 <a:spcPct val="100000"/>
               </a:lnSpc>
@@ -13917,7 +13917,7 @@
             </a:endParaRPr>
           </a:p>
           <a:p>
-            <a:pPr marL="195120" indent="-189720">
+            <a:pPr marL="195120" indent="-189000">
               <a:lnSpc>
                 <a:spcPct val="100000"/>
               </a:lnSpc>
@@ -13966,7 +13966,7 @@
             </a:endParaRPr>
           </a:p>
           <a:p>
-            <a:pPr marL="195120" indent="-189720">
+            <a:pPr marL="195120" indent="-189000">
               <a:lnSpc>
                 <a:spcPct val="100000"/>
               </a:lnSpc>
@@ -14015,7 +14015,7 @@
             </a:endParaRPr>
           </a:p>
           <a:p>
-            <a:pPr marL="195120" indent="-189720">
+            <a:pPr marL="195120" indent="-189000">
               <a:lnSpc>
                 <a:spcPct val="100000"/>
               </a:lnSpc>
@@ -14064,7 +14064,7 @@
             </a:endParaRPr>
           </a:p>
           <a:p>
-            <a:pPr marL="195120" indent="-189720">
+            <a:pPr marL="195120" indent="-189000">
               <a:lnSpc>
                 <a:spcPct val="100000"/>
               </a:lnSpc>
@@ -14153,7 +14153,7 @@
         <p:spPr>
           <a:xfrm>
             <a:off x="335520" y="764640"/>
-            <a:ext cx="10745640" cy="496440"/>
+            <a:ext cx="10744920" cy="495720"/>
           </a:xfrm>
           <a:prstGeom prst="rect">
             <a:avLst/>
@@ -14204,7 +14204,7 @@
         <p:spPr>
           <a:xfrm>
             <a:off x="335520" y="1268640"/>
-            <a:ext cx="10745640" cy="5033160"/>
+            <a:ext cx="10744920" cy="5032440"/>
           </a:xfrm>
           <a:prstGeom prst="rect">
             <a:avLst/>
@@ -14238,7 +14238,7 @@
             </a:endParaRPr>
           </a:p>
           <a:p>
-            <a:pPr marL="195120" indent="-191160">
+            <a:pPr marL="195120" indent="-190440">
               <a:lnSpc>
                 <a:spcPct val="100000"/>
               </a:lnSpc>
@@ -14309,7 +14309,7 @@
             </a:endParaRPr>
           </a:p>
           <a:p>
-            <a:pPr marL="195120" indent="-191160">
+            <a:pPr marL="195120" indent="-190440">
               <a:lnSpc>
                 <a:spcPct val="100000"/>
               </a:lnSpc>
@@ -14380,7 +14380,7 @@
             </a:endParaRPr>
           </a:p>
           <a:p>
-            <a:pPr marL="195120" indent="-191160">
+            <a:pPr marL="195120" indent="-190440">
               <a:lnSpc>
                 <a:spcPct val="100000"/>
               </a:lnSpc>
@@ -14429,7 +14429,7 @@
             </a:endParaRPr>
           </a:p>
           <a:p>
-            <a:pPr marL="195120" indent="-191160">
+            <a:pPr marL="195120" indent="-190440">
               <a:lnSpc>
                 <a:spcPct val="100000"/>
               </a:lnSpc>
@@ -14478,7 +14478,7 @@
             </a:endParaRPr>
           </a:p>
           <a:p>
-            <a:pPr marL="195120" indent="-191160">
+            <a:pPr marL="195120" indent="-190440">
               <a:lnSpc>
                 <a:spcPct val="100000"/>
               </a:lnSpc>
@@ -14527,7 +14527,7 @@
             </a:endParaRPr>
           </a:p>
           <a:p>
-            <a:pPr marL="195120" indent="-191160">
+            <a:pPr marL="195120" indent="-190440">
               <a:lnSpc>
                 <a:spcPct val="100000"/>
               </a:lnSpc>
@@ -14576,7 +14576,7 @@
             </a:endParaRPr>
           </a:p>
           <a:p>
-            <a:pPr marL="195120" indent="-191160">
+            <a:pPr marL="195120" indent="-190440">
               <a:lnSpc>
                 <a:spcPct val="100000"/>
               </a:lnSpc>
@@ -14665,7 +14665,7 @@
         <p:spPr>
           <a:xfrm>
             <a:off x="335520" y="764640"/>
-            <a:ext cx="10743840" cy="494640"/>
+            <a:ext cx="10743120" cy="493920"/>
           </a:xfrm>
           <a:prstGeom prst="rect">
             <a:avLst/>
@@ -14716,7 +14716,7 @@
         <p:spPr>
           <a:xfrm>
             <a:off x="335520" y="1268640"/>
-            <a:ext cx="10743840" cy="5031360"/>
+            <a:ext cx="10743120" cy="5030640"/>
           </a:xfrm>
           <a:prstGeom prst="rect">
             <a:avLst/>
@@ -14737,7 +14737,7 @@
             <a:noAutofit/>
           </a:bodyPr>
           <a:p>
-            <a:pPr marL="195120" indent="-189720">
+            <a:pPr marL="195120" indent="-189000">
               <a:lnSpc>
                 <a:spcPct val="100000"/>
               </a:lnSpc>
@@ -14778,7 +14778,7 @@
             </a:endParaRPr>
           </a:p>
           <a:p>
-            <a:pPr marL="195120" indent="-189720">
+            <a:pPr marL="195120" indent="-189000">
               <a:lnSpc>
                 <a:spcPct val="100000"/>
               </a:lnSpc>
@@ -14829,7 +14829,7 @@
             </a:endParaRPr>
           </a:p>
           <a:p>
-            <a:pPr marL="195120" indent="-189720">
+            <a:pPr marL="195120" indent="-189000">
               <a:lnSpc>
                 <a:spcPct val="100000"/>
               </a:lnSpc>
@@ -14870,7 +14870,7 @@
             </a:endParaRPr>
           </a:p>
           <a:p>
-            <a:pPr marL="195120" indent="-189720">
+            <a:pPr marL="195120" indent="-189000">
               <a:lnSpc>
                 <a:spcPct val="100000"/>
               </a:lnSpc>
@@ -14899,7 +14899,10 @@
             </a:endParaRPr>
           </a:p>
           <a:p>
-            <a:pPr lvl="1" marL="432000" indent="-216000">
+            <a:pPr lvl="1" marL="432000" indent="-215280">
+              <a:lnSpc>
+                <a:spcPct val="100000"/>
+              </a:lnSpc>
               <a:buClr>
                 <a:srgbClr val="008c4f"/>
               </a:buClr>
@@ -14918,23 +14921,24 @@
               <a:t>Drilled (</a:t>
             </a:r>
             <a:r>
+              <a:rPr b="0" lang="en-US" sz="1800" spc="-1" strike="noStrike" u="sng">
+                <a:solidFill>
+                  <a:srgbClr val="0000ff"/>
+                </a:solidFill>
+                <a:uFillTx/>
+                <a:latin typeface="DejaVu Sans"/>
+                <a:ea typeface="DejaVu Sans"/>
+                <a:hlinkClick r:id="rId4"/>
+              </a:rPr>
+              <a:t>Link</a:t>
+            </a:r>
+            <a:r>
               <a:rPr b="0" lang="en-US" sz="1800" spc="-1" strike="noStrike">
                 <a:solidFill>
                   <a:srgbClr val="000000"/>
                 </a:solidFill>
                 <a:latin typeface="DejaVu Sans"/>
                 <a:ea typeface="DejaVu Sans"/>
-                <a:hlinkClick r:id="rId4"/>
-              </a:rPr>
-              <a:t>Link</a:t>
-            </a:r>
-            <a:r>
-              <a:rPr b="0" lang="en-US" sz="1800" spc="-1" strike="noStrike">
-                <a:solidFill>
-                  <a:srgbClr val="000000"/>
-                </a:solidFill>
-                <a:latin typeface="DejaVu Sans"/>
-                <a:ea typeface="DejaVu Sans"/>
               </a:rPr>
               <a:t>)</a:t>
             </a:r>
@@ -14943,7 +14947,7 @@
             </a:endParaRPr>
           </a:p>
           <a:p>
-            <a:pPr lvl="1" marL="432000" indent="-216000">
+            <a:pPr lvl="1" marL="432000" indent="-215280">
               <a:lnSpc>
                 <a:spcPct val="100000"/>
               </a:lnSpc>
@@ -14968,23 +14972,24 @@
               <a:t>How to Save a Planet (</a:t>
             </a:r>
             <a:r>
+              <a:rPr b="0" lang="en-US" sz="1800" spc="-1" strike="noStrike" u="sng">
+                <a:solidFill>
+                  <a:srgbClr val="0000ff"/>
+                </a:solidFill>
+                <a:uFillTx/>
+                <a:latin typeface="DejaVu Sans"/>
+                <a:ea typeface="DejaVu Sans"/>
+                <a:hlinkClick r:id="rId5"/>
+              </a:rPr>
+              <a:t>Link</a:t>
+            </a:r>
+            <a:r>
               <a:rPr b="0" lang="en-US" sz="1800" spc="-1" strike="noStrike">
                 <a:solidFill>
                   <a:srgbClr val="000000"/>
                 </a:solidFill>
                 <a:latin typeface="DejaVu Sans"/>
                 <a:ea typeface="DejaVu Sans"/>
-                <a:hlinkClick r:id="rId5"/>
-              </a:rPr>
-              <a:t>Link</a:t>
-            </a:r>
-            <a:r>
-              <a:rPr b="0" lang="en-US" sz="1800" spc="-1" strike="noStrike">
-                <a:solidFill>
-                  <a:srgbClr val="000000"/>
-                </a:solidFill>
-                <a:latin typeface="DejaVu Sans"/>
-                <a:ea typeface="DejaVu Sans"/>
               </a:rPr>
               <a:t>)</a:t>
             </a:r>
@@ -14993,7 +14998,7 @@
             </a:endParaRPr>
           </a:p>
           <a:p>
-            <a:pPr lvl="1" marL="432000" indent="-216000">
+            <a:pPr lvl="1" marL="432000" indent="-215280">
               <a:lnSpc>
                 <a:spcPct val="100000"/>
               </a:lnSpc>
@@ -15018,10 +15023,11 @@
               <a:t>1,5 Grad – der Klima-Podcast mit Luisa Neubauer (German) (</a:t>
             </a:r>
             <a:r>
-              <a:rPr b="0" lang="en-US" sz="1800" spc="-1" strike="noStrike">
-                <a:solidFill>
-                  <a:srgbClr val="000000"/>
-                </a:solidFill>
+              <a:rPr b="0" lang="en-US" sz="1800" spc="-1" strike="noStrike" u="sng">
+                <a:solidFill>
+                  <a:srgbClr val="0000ff"/>
+                </a:solidFill>
+                <a:uFillTx/>
                 <a:latin typeface="DejaVu Sans"/>
                 <a:ea typeface="DejaVu Sans"/>
                 <a:hlinkClick r:id="rId6"/>
@@ -15083,7 +15089,7 @@
         <p:spPr>
           <a:xfrm>
             <a:off x="335520" y="1268640"/>
-            <a:ext cx="10745640" cy="5033160"/>
+            <a:ext cx="10744920" cy="5032440"/>
           </a:xfrm>
           <a:prstGeom prst="rect">
             <a:avLst/>
@@ -15140,7 +15146,7 @@
         <p:spPr>
           <a:xfrm>
             <a:off x="335520" y="764640"/>
-            <a:ext cx="10745640" cy="496440"/>
+            <a:ext cx="10744920" cy="495720"/>
           </a:xfrm>
           <a:prstGeom prst="rect">
             <a:avLst/>
@@ -15196,7 +15202,7 @@
         <p:spPr>
           <a:xfrm>
             <a:off x="542880" y="721800"/>
-            <a:ext cx="10350000" cy="490680"/>
+            <a:ext cx="10349280" cy="489960"/>
           </a:xfrm>
           <a:prstGeom prst="rect">
             <a:avLst/>
@@ -15247,7 +15253,7 @@
         <p:spPr>
           <a:xfrm>
             <a:off x="451800" y="1709280"/>
-            <a:ext cx="8217360" cy="4345560"/>
+            <a:ext cx="8216640" cy="4344840"/>
           </a:xfrm>
           <a:prstGeom prst="rect">
             <a:avLst/>
@@ -15273,7 +15279,7 @@
         <p:spPr>
           <a:xfrm>
             <a:off x="609480" y="1769400"/>
-            <a:ext cx="10580400" cy="4848480"/>
+            <a:ext cx="10579680" cy="4847760"/>
           </a:xfrm>
           <a:prstGeom prst="rect">
             <a:avLst/>
@@ -15294,7 +15300,7 @@
             <a:normAutofit/>
           </a:bodyPr>
           <a:p>
-            <a:pPr marL="216000" indent="-212040">
+            <a:pPr marL="216000" indent="-211320">
               <a:lnSpc>
                 <a:spcPct val="90000"/>
               </a:lnSpc>
@@ -15403,7 +15409,7 @@
             </a:endParaRPr>
           </a:p>
           <a:p>
-            <a:pPr marL="216000" indent="-212040">
+            <a:pPr marL="216000" indent="-211320">
               <a:lnSpc>
                 <a:spcPct val="100000"/>
               </a:lnSpc>
@@ -15432,7 +15438,7 @@
             </a:endParaRPr>
           </a:p>
           <a:p>
-            <a:pPr lvl="1" marL="685800" indent="-224640">
+            <a:pPr lvl="1" marL="685800" indent="-223920">
               <a:lnSpc>
                 <a:spcPct val="100000"/>
               </a:lnSpc>
@@ -15461,7 +15467,7 @@
             </a:endParaRPr>
           </a:p>
           <a:p>
-            <a:pPr lvl="1" marL="685800" indent="-224640">
+            <a:pPr lvl="1" marL="685800" indent="-223920">
               <a:lnSpc>
                 <a:spcPct val="100000"/>
               </a:lnSpc>
@@ -15490,7 +15496,7 @@
             </a:endParaRPr>
           </a:p>
           <a:p>
-            <a:pPr lvl="1" marL="685800" indent="-224640">
+            <a:pPr lvl="1" marL="685800" indent="-223920">
               <a:lnSpc>
                 <a:spcPct val="100000"/>
               </a:lnSpc>
@@ -15519,7 +15525,7 @@
             </a:endParaRPr>
           </a:p>
           <a:p>
-            <a:pPr lvl="1" marL="685800" indent="-224640">
+            <a:pPr lvl="1" marL="685800" indent="-223920">
               <a:lnSpc>
                 <a:spcPct val="100000"/>
               </a:lnSpc>
@@ -15548,7 +15554,7 @@
             </a:endParaRPr>
           </a:p>
           <a:p>
-            <a:pPr marL="216000" indent="-212040">
+            <a:pPr marL="216000" indent="-211320">
               <a:lnSpc>
                 <a:spcPct val="100000"/>
               </a:lnSpc>
@@ -15577,7 +15583,7 @@
             </a:endParaRPr>
           </a:p>
           <a:p>
-            <a:pPr lvl="1" marL="685800" indent="-224640">
+            <a:pPr lvl="1" marL="685800" indent="-223920">
               <a:lnSpc>
                 <a:spcPct val="100000"/>
               </a:lnSpc>
@@ -15606,7 +15612,7 @@
             </a:endParaRPr>
           </a:p>
           <a:p>
-            <a:pPr lvl="1" marL="685800" indent="-224640">
+            <a:pPr lvl="1" marL="685800" indent="-223920">
               <a:lnSpc>
                 <a:spcPct val="100000"/>
               </a:lnSpc>
@@ -15675,7 +15681,7 @@
         <p:spPr>
           <a:xfrm>
             <a:off x="542880" y="721800"/>
-            <a:ext cx="10350000" cy="490680"/>
+            <a:ext cx="10349280" cy="489960"/>
           </a:xfrm>
           <a:prstGeom prst="rect">
             <a:avLst/>
@@ -15726,7 +15732,7 @@
         <p:spPr>
           <a:xfrm>
             <a:off x="451800" y="1709280"/>
-            <a:ext cx="8217360" cy="4345560"/>
+            <a:ext cx="8216640" cy="4344840"/>
           </a:xfrm>
           <a:prstGeom prst="rect">
             <a:avLst/>
@@ -15752,7 +15758,7 @@
         <p:spPr>
           <a:xfrm>
             <a:off x="609480" y="1769400"/>
-            <a:ext cx="10580400" cy="4848480"/>
+            <a:ext cx="10579680" cy="4847760"/>
           </a:xfrm>
           <a:prstGeom prst="rect">
             <a:avLst/>
@@ -15773,7 +15779,7 @@
             <a:normAutofit/>
           </a:bodyPr>
           <a:p>
-            <a:pPr marL="216000" indent="-212040">
+            <a:pPr marL="216000" indent="-211320">
               <a:lnSpc>
                 <a:spcPct val="90000"/>
               </a:lnSpc>
@@ -15824,7 +15830,7 @@
             </a:endParaRPr>
           </a:p>
           <a:p>
-            <a:pPr lvl="1" marL="685800" indent="-224640">
+            <a:pPr lvl="1" marL="685800" indent="-223920">
               <a:lnSpc>
                 <a:spcPct val="100000"/>
               </a:lnSpc>
@@ -15853,7 +15859,7 @@
             </a:endParaRPr>
           </a:p>
           <a:p>
-            <a:pPr lvl="1" marL="685800" indent="-224640">
+            <a:pPr lvl="1" marL="685800" indent="-223920">
               <a:lnSpc>
                 <a:spcPct val="100000"/>
               </a:lnSpc>
@@ -15895,7 +15901,7 @@
             </a:endParaRPr>
           </a:p>
           <a:p>
-            <a:pPr marL="216000" indent="-212040">
+            <a:pPr marL="216000" indent="-211320">
               <a:lnSpc>
                 <a:spcPct val="90000"/>
               </a:lnSpc>
@@ -15927,7 +15933,7 @@
             </a:endParaRPr>
           </a:p>
           <a:p>
-            <a:pPr lvl="1" marL="685800" indent="-224640">
+            <a:pPr lvl="1" marL="685800" indent="-223920">
               <a:lnSpc>
                 <a:spcPct val="100000"/>
               </a:lnSpc>
@@ -15981,7 +15987,7 @@
             </a:endParaRPr>
           </a:p>
           <a:p>
-            <a:pPr lvl="1" marL="685800" indent="-224640">
+            <a:pPr lvl="1" marL="685800" indent="-223920">
               <a:lnSpc>
                 <a:spcPct val="100000"/>
               </a:lnSpc>
@@ -16035,7 +16041,7 @@
             </a:endParaRPr>
           </a:p>
           <a:p>
-            <a:pPr marL="228600" indent="-224640">
+            <a:pPr marL="228600" indent="-223920">
               <a:lnSpc>
                 <a:spcPct val="90000"/>
               </a:lnSpc>
@@ -16051,7 +16057,7 @@
             </a:endParaRPr>
           </a:p>
           <a:p>
-            <a:pPr marL="228600" indent="-224640" algn="ctr">
+            <a:pPr marL="228600" indent="-223920" algn="ctr">
               <a:lnSpc>
                 <a:spcPct val="90000"/>
               </a:lnSpc>
@@ -16077,7 +16083,7 @@
             </a:endParaRPr>
           </a:p>
           <a:p>
-            <a:pPr marL="457200" indent="-224640" algn="ctr">
+            <a:pPr marL="457200" indent="-223920" algn="ctr">
               <a:lnSpc>
                 <a:spcPct val="90000"/>
               </a:lnSpc>
@@ -16153,7 +16159,7 @@
         <p:spPr>
           <a:xfrm>
             <a:off x="542880" y="721800"/>
-            <a:ext cx="10350000" cy="490680"/>
+            <a:ext cx="10349280" cy="489960"/>
           </a:xfrm>
           <a:prstGeom prst="rect">
             <a:avLst/>
@@ -16204,7 +16210,7 @@
         <p:spPr>
           <a:xfrm>
             <a:off x="451800" y="1709280"/>
-            <a:ext cx="8217360" cy="4345560"/>
+            <a:ext cx="8216640" cy="4344840"/>
           </a:xfrm>
           <a:prstGeom prst="rect">
             <a:avLst/>
@@ -16230,7 +16236,7 @@
         <p:spPr>
           <a:xfrm>
             <a:off x="609480" y="1769400"/>
-            <a:ext cx="10580400" cy="4848480"/>
+            <a:ext cx="10579680" cy="4847760"/>
           </a:xfrm>
           <a:prstGeom prst="rect">
             <a:avLst/>
@@ -16251,7 +16257,7 @@
             <a:normAutofit/>
           </a:bodyPr>
           <a:p>
-            <a:pPr marL="216000" indent="-212040">
+            <a:pPr marL="216000" indent="-211320">
               <a:lnSpc>
                 <a:spcPct val="90000"/>
               </a:lnSpc>
@@ -16302,7 +16308,7 @@
             </a:endParaRPr>
           </a:p>
           <a:p>
-            <a:pPr lvl="1" marL="685800" indent="-224640">
+            <a:pPr lvl="1" marL="685800" indent="-223920">
               <a:lnSpc>
                 <a:spcPct val="100000"/>
               </a:lnSpc>
@@ -16331,7 +16337,7 @@
             </a:endParaRPr>
           </a:p>
           <a:p>
-            <a:pPr lvl="1" marL="685800" indent="-224640">
+            <a:pPr lvl="1" marL="685800" indent="-223920">
               <a:lnSpc>
                 <a:spcPct val="100000"/>
               </a:lnSpc>
@@ -16373,7 +16379,7 @@
             </a:endParaRPr>
           </a:p>
           <a:p>
-            <a:pPr marL="216000" indent="-212040">
+            <a:pPr marL="216000" indent="-211320">
               <a:lnSpc>
                 <a:spcPct val="90000"/>
               </a:lnSpc>
@@ -16405,7 +16411,7 @@
             </a:endParaRPr>
           </a:p>
           <a:p>
-            <a:pPr lvl="1" marL="685800" indent="-224640">
+            <a:pPr lvl="1" marL="685800" indent="-223920">
               <a:lnSpc>
                 <a:spcPct val="100000"/>
               </a:lnSpc>
@@ -16459,7 +16465,7 @@
             </a:endParaRPr>
           </a:p>
           <a:p>
-            <a:pPr lvl="1" marL="685800" indent="-224640">
+            <a:pPr lvl="1" marL="685800" indent="-223920">
               <a:lnSpc>
                 <a:spcPct val="100000"/>
               </a:lnSpc>
@@ -16513,7 +16519,7 @@
             </a:endParaRPr>
           </a:p>
           <a:p>
-            <a:pPr marL="228600" indent="-224640">
+            <a:pPr marL="228600" indent="-223920">
               <a:lnSpc>
                 <a:spcPct val="90000"/>
               </a:lnSpc>
@@ -16529,7 +16535,7 @@
             </a:endParaRPr>
           </a:p>
           <a:p>
-            <a:pPr marL="228600" indent="-224640" algn="ctr">
+            <a:pPr marL="228600" indent="-223920" algn="ctr">
               <a:lnSpc>
                 <a:spcPct val="90000"/>
               </a:lnSpc>
@@ -16555,7 +16561,7 @@
             </a:endParaRPr>
           </a:p>
           <a:p>
-            <a:pPr marL="457200" indent="-224640" algn="ctr">
+            <a:pPr marL="457200" indent="-223920" algn="ctr">
               <a:lnSpc>
                 <a:spcPct val="90000"/>
               </a:lnSpc>
@@ -16631,7 +16637,7 @@
         <p:spPr>
           <a:xfrm>
             <a:off x="335520" y="764640"/>
-            <a:ext cx="10745640" cy="496440"/>
+            <a:ext cx="10744920" cy="495720"/>
           </a:xfrm>
           <a:prstGeom prst="rect">
             <a:avLst/>
@@ -16682,7 +16688,7 @@
         <p:spPr>
           <a:xfrm>
             <a:off x="335520" y="2408400"/>
-            <a:ext cx="10745640" cy="3893400"/>
+            <a:ext cx="10744920" cy="3892680"/>
           </a:xfrm>
           <a:prstGeom prst="rect">
             <a:avLst/>
@@ -16703,7 +16709,7 @@
             <a:noAutofit/>
           </a:bodyPr>
           <a:p>
-            <a:pPr marL="195120" indent="-191160">
+            <a:pPr marL="195120" indent="-190440">
               <a:lnSpc>
                 <a:spcPct val="100000"/>
               </a:lnSpc>
@@ -16772,7 +16778,7 @@
         <p:spPr>
           <a:xfrm>
             <a:off x="335520" y="764640"/>
-            <a:ext cx="10745640" cy="496440"/>
+            <a:ext cx="10744920" cy="495720"/>
           </a:xfrm>
           <a:prstGeom prst="rect">
             <a:avLst/>
@@ -16823,7 +16829,7 @@
         <p:spPr>
           <a:xfrm>
             <a:off x="335520" y="2408400"/>
-            <a:ext cx="10745640" cy="3893400"/>
+            <a:ext cx="10744920" cy="3892680"/>
           </a:xfrm>
           <a:prstGeom prst="rect">
             <a:avLst/>
@@ -16844,7 +16850,7 @@
             <a:noAutofit/>
           </a:bodyPr>
           <a:p>
-            <a:pPr marL="195120" indent="-191160">
+            <a:pPr marL="195120" indent="-190440">
               <a:lnSpc>
                 <a:spcPct val="100000"/>
               </a:lnSpc>
@@ -16873,7 +16879,7 @@
             </a:endParaRPr>
           </a:p>
           <a:p>
-            <a:pPr marL="195120" indent="-191160">
+            <a:pPr marL="195120" indent="-190440">
               <a:lnSpc>
                 <a:spcPct val="100000"/>
               </a:lnSpc>
@@ -16942,7 +16948,7 @@
         <p:spPr>
           <a:xfrm>
             <a:off x="335520" y="764640"/>
-            <a:ext cx="10745640" cy="496440"/>
+            <a:ext cx="10744920" cy="495720"/>
           </a:xfrm>
           <a:prstGeom prst="rect">
             <a:avLst/>
@@ -16993,7 +16999,7 @@
         <p:spPr>
           <a:xfrm>
             <a:off x="335520" y="2408400"/>
-            <a:ext cx="10745640" cy="3893400"/>
+            <a:ext cx="10744920" cy="3892680"/>
           </a:xfrm>
           <a:prstGeom prst="rect">
             <a:avLst/>
@@ -17014,7 +17020,7 @@
             <a:noAutofit/>
           </a:bodyPr>
           <a:p>
-            <a:pPr marL="195120" indent="-191160">
+            <a:pPr marL="195120" indent="-190440">
               <a:lnSpc>
                 <a:spcPct val="100000"/>
               </a:lnSpc>
@@ -17043,7 +17049,7 @@
             </a:endParaRPr>
           </a:p>
           <a:p>
-            <a:pPr marL="195120" indent="-191160">
+            <a:pPr marL="195120" indent="-190440">
               <a:lnSpc>
                 <a:spcPct val="100000"/>
               </a:lnSpc>
@@ -17072,7 +17078,7 @@
             </a:endParaRPr>
           </a:p>
           <a:p>
-            <a:pPr marL="195120" indent="-191160">
+            <a:pPr marL="195120" indent="-190440">
               <a:lnSpc>
                 <a:spcPct val="100000"/>
               </a:lnSpc>

</xml_diff>

<commit_message>
* updated ETCE literature recommendations and additional ressources (L00 + L02)
</commit_message>
<xml_diff>
--- a/Emerging-Technologies-for-the-Circular-Economy/ETCE-L00-Organization.pptx
+++ b/Emerging-Technologies-for-the-Circular-Economy/ETCE-L00-Organization.pptx
@@ -45,6 +45,7 @@
     <p:sldId id="289" r:id="rId38"/>
     <p:sldId id="290" r:id="rId39"/>
     <p:sldId id="291" r:id="rId40"/>
+    <p:sldId id="292" r:id="rId41"/>
   </p:sldIdLst>
   <p:sldSz cx="12192000" cy="6858000"/>
   <p:notesSz cx="7559675" cy="10691812"/>
@@ -275,7 +276,7 @@
           </a:bodyPr>
           <a:p>
             <a:pPr algn="r"/>
-            <a:fld id="{E39EE973-E0ED-4EEA-B437-584D454F7CF3}" type="slidenum">
+            <a:fld id="{58832755-6DD1-47A3-AF0A-13D817347393}" type="slidenum">
               <a:rPr b="0" lang="en-US" sz="1400" spc="-1" strike="noStrike">
                 <a:latin typeface="Times New Roman"/>
               </a:rPr>
@@ -312,7 +313,7 @@
       </p:grpSpPr>
       <p:sp>
         <p:nvSpPr>
-          <p:cNvPr id="208" name="PlaceHolder 1"/>
+          <p:cNvPr id="210" name="PlaceHolder 1"/>
           <p:cNvSpPr>
             <a:spLocks noGrp="1"/>
           </p:cNvSpPr>
@@ -323,16 +324,16 @@
         <p:spPr>
           <a:xfrm>
             <a:off x="533520" y="763560"/>
-            <a:ext cx="6692400" cy="3760560"/>
-          </a:xfrm>
-          <a:prstGeom prst="rect">
-            <a:avLst/>
-          </a:prstGeom>
-        </p:spPr>
-      </p:sp>
-      <p:sp>
-        <p:nvSpPr>
-          <p:cNvPr id="209" name="PlaceHolder 2"/>
+            <a:ext cx="6692040" cy="3760200"/>
+          </a:xfrm>
+          <a:prstGeom prst="rect">
+            <a:avLst/>
+          </a:prstGeom>
+        </p:spPr>
+      </p:sp>
+      <p:sp>
+        <p:nvSpPr>
+          <p:cNvPr id="211" name="PlaceHolder 2"/>
           <p:cNvSpPr>
             <a:spLocks noGrp="1"/>
           </p:cNvSpPr>
@@ -343,7 +344,7 @@
         <p:spPr>
           <a:xfrm>
             <a:off x="777240" y="4777560"/>
-            <a:ext cx="6206040" cy="4514400"/>
+            <a:ext cx="6205680" cy="4514040"/>
           </a:xfrm>
           <a:prstGeom prst="rect">
             <a:avLst/>
@@ -362,14 +363,14 @@
       </p:sp>
       <p:sp>
         <p:nvSpPr>
-          <p:cNvPr id="210" name="CustomShape 3"/>
+          <p:cNvPr id="212" name="CustomShape 3"/>
           <p:cNvSpPr/>
           <p:nvPr/>
         </p:nvSpPr>
         <p:spPr>
           <a:xfrm>
             <a:off x="4399200" y="9555480"/>
-            <a:ext cx="3361320" cy="491040"/>
+            <a:ext cx="3360960" cy="490680"/>
           </a:xfrm>
           <a:prstGeom prst="rect">
             <a:avLst/>
@@ -395,7 +396,7 @@
                 <a:spcPct val="100000"/>
               </a:lnSpc>
             </a:pPr>
-            <a:fld id="{763C4B7C-9159-4CA7-AB57-8502AAA82317}" type="slidenum">
+            <a:fld id="{9C9CA965-31E6-41B9-A8A2-7E94CDCAF326}" type="slidenum">
               <a:rPr b="0" lang="de-DE" sz="1800" spc="-1" strike="noStrike">
                 <a:solidFill>
                   <a:srgbClr val="000000"/>
@@ -435,7 +436,7 @@
       </p:grpSpPr>
       <p:sp>
         <p:nvSpPr>
-          <p:cNvPr id="211" name="PlaceHolder 1"/>
+          <p:cNvPr id="213" name="PlaceHolder 1"/>
           <p:cNvSpPr>
             <a:spLocks noGrp="1"/>
           </p:cNvSpPr>
@@ -446,16 +447,16 @@
         <p:spPr>
           <a:xfrm>
             <a:off x="533520" y="763560"/>
-            <a:ext cx="6692400" cy="3760560"/>
-          </a:xfrm>
-          <a:prstGeom prst="rect">
-            <a:avLst/>
-          </a:prstGeom>
-        </p:spPr>
-      </p:sp>
-      <p:sp>
-        <p:nvSpPr>
-          <p:cNvPr id="212" name="PlaceHolder 2"/>
+            <a:ext cx="6692040" cy="3760200"/>
+          </a:xfrm>
+          <a:prstGeom prst="rect">
+            <a:avLst/>
+          </a:prstGeom>
+        </p:spPr>
+      </p:sp>
+      <p:sp>
+        <p:nvSpPr>
+          <p:cNvPr id="214" name="PlaceHolder 2"/>
           <p:cNvSpPr>
             <a:spLocks noGrp="1"/>
           </p:cNvSpPr>
@@ -466,7 +467,7 @@
         <p:spPr>
           <a:xfrm>
             <a:off x="777240" y="4777560"/>
-            <a:ext cx="6206040" cy="4514400"/>
+            <a:ext cx="6205680" cy="4514040"/>
           </a:xfrm>
           <a:prstGeom prst="rect">
             <a:avLst/>
@@ -485,14 +486,14 @@
       </p:sp>
       <p:sp>
         <p:nvSpPr>
-          <p:cNvPr id="213" name="CustomShape 3"/>
+          <p:cNvPr id="215" name="CustomShape 3"/>
           <p:cNvSpPr/>
           <p:nvPr/>
         </p:nvSpPr>
         <p:spPr>
           <a:xfrm>
             <a:off x="4399200" y="9555480"/>
-            <a:ext cx="3361320" cy="491040"/>
+            <a:ext cx="3360960" cy="490680"/>
           </a:xfrm>
           <a:prstGeom prst="rect">
             <a:avLst/>
@@ -518,7 +519,7 @@
                 <a:spcPct val="100000"/>
               </a:lnSpc>
             </a:pPr>
-            <a:fld id="{F9B6BD41-40AB-4500-BF7C-223F1AF8951E}" type="slidenum">
+            <a:fld id="{A78CC963-FCF6-44AC-A846-BD99ACEDCBC7}" type="slidenum">
               <a:rPr b="0" lang="de-DE" sz="1800" spc="-1" strike="noStrike">
                 <a:solidFill>
                   <a:srgbClr val="000000"/>
@@ -558,7 +559,7 @@
       </p:grpSpPr>
       <p:sp>
         <p:nvSpPr>
-          <p:cNvPr id="214" name="PlaceHolder 1"/>
+          <p:cNvPr id="216" name="PlaceHolder 1"/>
           <p:cNvSpPr>
             <a:spLocks noGrp="1"/>
           </p:cNvSpPr>
@@ -569,16 +570,16 @@
         <p:spPr>
           <a:xfrm>
             <a:off x="533520" y="763560"/>
-            <a:ext cx="6692400" cy="3760560"/>
-          </a:xfrm>
-          <a:prstGeom prst="rect">
-            <a:avLst/>
-          </a:prstGeom>
-        </p:spPr>
-      </p:sp>
-      <p:sp>
-        <p:nvSpPr>
-          <p:cNvPr id="215" name="PlaceHolder 2"/>
+            <a:ext cx="6692040" cy="3760200"/>
+          </a:xfrm>
+          <a:prstGeom prst="rect">
+            <a:avLst/>
+          </a:prstGeom>
+        </p:spPr>
+      </p:sp>
+      <p:sp>
+        <p:nvSpPr>
+          <p:cNvPr id="217" name="PlaceHolder 2"/>
           <p:cNvSpPr>
             <a:spLocks noGrp="1"/>
           </p:cNvSpPr>
@@ -589,7 +590,7 @@
         <p:spPr>
           <a:xfrm>
             <a:off x="777240" y="4777560"/>
-            <a:ext cx="6206040" cy="4514400"/>
+            <a:ext cx="6205680" cy="4514040"/>
           </a:xfrm>
           <a:prstGeom prst="rect">
             <a:avLst/>
@@ -608,14 +609,14 @@
       </p:sp>
       <p:sp>
         <p:nvSpPr>
-          <p:cNvPr id="216" name="CustomShape 3"/>
+          <p:cNvPr id="218" name="CustomShape 3"/>
           <p:cNvSpPr/>
           <p:nvPr/>
         </p:nvSpPr>
         <p:spPr>
           <a:xfrm>
             <a:off x="4399200" y="9555480"/>
-            <a:ext cx="3361320" cy="491040"/>
+            <a:ext cx="3360960" cy="490680"/>
           </a:xfrm>
           <a:prstGeom prst="rect">
             <a:avLst/>
@@ -641,7 +642,7 @@
                 <a:spcPct val="100000"/>
               </a:lnSpc>
             </a:pPr>
-            <a:fld id="{1BC73638-B934-41A5-9DBB-275FB7F04711}" type="slidenum">
+            <a:fld id="{A52296E6-6EE4-40E6-A36A-FF3DA7A9D4C8}" type="slidenum">
               <a:rPr b="0" lang="de-DE" sz="1800" spc="-1" strike="noStrike">
                 <a:solidFill>
                   <a:srgbClr val="000000"/>
@@ -3407,7 +3408,7 @@
         <p:spPr>
           <a:xfrm>
             <a:off x="11444760" y="0"/>
-            <a:ext cx="740880" cy="6849720"/>
+            <a:ext cx="740520" cy="6849360"/>
           </a:xfrm>
           <a:prstGeom prst="rect">
             <a:avLst/>
@@ -3437,7 +3438,7 @@
         <p:spPr>
           <a:xfrm>
             <a:off x="11438640" y="6453360"/>
-            <a:ext cx="757800" cy="363960"/>
+            <a:ext cx="757440" cy="363960"/>
           </a:xfrm>
           <a:prstGeom prst="rect">
             <a:avLst/>
@@ -3463,7 +3464,7 @@
                 <a:spcPct val="100000"/>
               </a:lnSpc>
             </a:pPr>
-            <a:fld id="{A18C56F5-37E9-43B1-BFFE-30EE46C3F845}" type="slidenum">
+            <a:fld id="{F7016FE4-DF96-4B3C-B18B-08273505302A}" type="slidenum">
               <a:rPr b="0" lang="en-US" sz="1800" spc="-1" strike="noStrike">
                 <a:solidFill>
                   <a:srgbClr val="808080"/>
@@ -3488,7 +3489,7 @@
         <p:spPr>
           <a:xfrm>
             <a:off x="912240" y="1268280"/>
-            <a:ext cx="9207720" cy="361080"/>
+            <a:ext cx="9207360" cy="360720"/>
           </a:xfrm>
           <a:prstGeom prst="rect">
             <a:avLst/>
@@ -3518,7 +3519,7 @@
         <p:spPr>
           <a:xfrm>
             <a:off x="0" y="0"/>
-            <a:ext cx="3051720" cy="561600"/>
+            <a:ext cx="3051360" cy="561240"/>
           </a:xfrm>
           <a:prstGeom prst="rect">
             <a:avLst/>
@@ -3541,7 +3542,7 @@
         <p:spPr>
           <a:xfrm>
             <a:off x="7430400" y="134640"/>
-            <a:ext cx="3697560" cy="513720"/>
+            <a:ext cx="3697200" cy="513360"/>
           </a:xfrm>
           <a:prstGeom prst="rect">
             <a:avLst/>
@@ -3560,7 +3561,7 @@
         <p:spPr>
           <a:xfrm>
             <a:off x="912240" y="1268280"/>
-            <a:ext cx="9207720" cy="361080"/>
+            <a:ext cx="9207360" cy="360720"/>
           </a:xfrm>
           <a:prstGeom prst="rect">
             <a:avLst/>
@@ -3586,7 +3587,7 @@
         <p:spPr>
           <a:xfrm>
             <a:off x="11444760" y="0"/>
-            <a:ext cx="740880" cy="6849720"/>
+            <a:ext cx="740520" cy="6849360"/>
           </a:xfrm>
           <a:prstGeom prst="rect">
             <a:avLst/>
@@ -3616,7 +3617,7 @@
         <p:spPr>
           <a:xfrm>
             <a:off x="0" y="6642720"/>
-            <a:ext cx="12183840" cy="211320"/>
+            <a:ext cx="12183480" cy="211320"/>
           </a:xfrm>
           <a:prstGeom prst="rect">
             <a:avLst/>
@@ -3947,7 +3948,7 @@
         <p:spPr>
           <a:xfrm>
             <a:off x="11444760" y="0"/>
-            <a:ext cx="740880" cy="6849720"/>
+            <a:ext cx="740520" cy="6849360"/>
           </a:xfrm>
           <a:prstGeom prst="rect">
             <a:avLst/>
@@ -3977,7 +3978,7 @@
         <p:spPr>
           <a:xfrm>
             <a:off x="11438640" y="6453360"/>
-            <a:ext cx="757800" cy="363960"/>
+            <a:ext cx="757440" cy="363960"/>
           </a:xfrm>
           <a:prstGeom prst="rect">
             <a:avLst/>
@@ -4003,7 +4004,7 @@
                 <a:spcPct val="100000"/>
               </a:lnSpc>
             </a:pPr>
-            <a:fld id="{D266A90D-D4FA-4FF5-96B1-607B5D79A465}" type="slidenum">
+            <a:fld id="{6774BBFC-1F0A-4468-9B4E-66BE06AB9395}" type="slidenum">
               <a:rPr b="0" lang="en-US" sz="1800" spc="-1" strike="noStrike">
                 <a:solidFill>
                   <a:srgbClr val="808080"/>
@@ -4028,7 +4029,7 @@
         <p:spPr>
           <a:xfrm>
             <a:off x="912240" y="1268280"/>
-            <a:ext cx="9207720" cy="361080"/>
+            <a:ext cx="9207360" cy="360720"/>
           </a:xfrm>
           <a:prstGeom prst="rect">
             <a:avLst/>
@@ -4058,7 +4059,7 @@
         <p:spPr>
           <a:xfrm>
             <a:off x="0" y="0"/>
-            <a:ext cx="3051720" cy="561600"/>
+            <a:ext cx="3051360" cy="561240"/>
           </a:xfrm>
           <a:prstGeom prst="rect">
             <a:avLst/>
@@ -4081,7 +4082,7 @@
         <p:spPr>
           <a:xfrm>
             <a:off x="7430400" y="134640"/>
-            <a:ext cx="3697560" cy="513720"/>
+            <a:ext cx="3697200" cy="513360"/>
           </a:xfrm>
           <a:prstGeom prst="rect">
             <a:avLst/>
@@ -4100,7 +4101,7 @@
         <p:spPr>
           <a:xfrm>
             <a:off x="11444760" y="0"/>
-            <a:ext cx="740880" cy="6849720"/>
+            <a:ext cx="740520" cy="6849360"/>
           </a:xfrm>
           <a:prstGeom prst="rect">
             <a:avLst/>
@@ -4130,7 +4131,7 @@
         <p:spPr>
           <a:xfrm>
             <a:off x="11438640" y="6453360"/>
-            <a:ext cx="757800" cy="363960"/>
+            <a:ext cx="757440" cy="363960"/>
           </a:xfrm>
           <a:prstGeom prst="rect">
             <a:avLst/>
@@ -4156,7 +4157,7 @@
                 <a:spcPct val="100000"/>
               </a:lnSpc>
             </a:pPr>
-            <a:fld id="{631B6035-C301-4FF1-B248-629F0E53E5E8}" type="slidenum">
+            <a:fld id="{BD17B7AE-4D92-4D87-B7E0-D1FC7FC1DF9B}" type="slidenum">
               <a:rPr b="0" lang="en-US" sz="1800" spc="-1" strike="noStrike">
                 <a:solidFill>
                   <a:srgbClr val="808080"/>
@@ -4181,7 +4182,7 @@
         <p:spPr>
           <a:xfrm>
             <a:off x="0" y="6642720"/>
-            <a:ext cx="12183840" cy="211320"/>
+            <a:ext cx="12183480" cy="211320"/>
           </a:xfrm>
           <a:prstGeom prst="rect">
             <a:avLst/>
@@ -4505,7 +4506,7 @@
         <p:spPr>
           <a:xfrm>
             <a:off x="527400" y="1412640"/>
-            <a:ext cx="10360800" cy="1147320"/>
+            <a:ext cx="10360440" cy="1146960"/>
           </a:xfrm>
           <a:prstGeom prst="rect">
             <a:avLst/>
@@ -4556,7 +4557,7 @@
         <p:spPr>
           <a:xfrm>
             <a:off x="527400" y="2852640"/>
-            <a:ext cx="10360800" cy="2368080"/>
+            <a:ext cx="10360440" cy="2367720"/>
           </a:xfrm>
           <a:prstGeom prst="rect">
             <a:avLst/>
@@ -4769,7 +4770,7 @@
         <p:spPr>
           <a:xfrm>
             <a:off x="335520" y="764640"/>
-            <a:ext cx="10744920" cy="495720"/>
+            <a:ext cx="10744560" cy="495360"/>
           </a:xfrm>
           <a:prstGeom prst="rect">
             <a:avLst/>
@@ -4830,7 +4831,7 @@
         <p:spPr>
           <a:xfrm>
             <a:off x="335520" y="2408400"/>
-            <a:ext cx="10744920" cy="3892680"/>
+            <a:ext cx="10744560" cy="3892320"/>
           </a:xfrm>
           <a:prstGeom prst="rect">
             <a:avLst/>
@@ -4851,7 +4852,7 @@
             <a:noAutofit/>
           </a:bodyPr>
           <a:p>
-            <a:pPr marL="195120" indent="-190440">
+            <a:pPr marL="195120" indent="-190080">
               <a:lnSpc>
                 <a:spcPct val="100000"/>
               </a:lnSpc>
@@ -4880,7 +4881,7 @@
             </a:endParaRPr>
           </a:p>
           <a:p>
-            <a:pPr marL="195120" indent="-190440">
+            <a:pPr marL="195120" indent="-190080">
               <a:lnSpc>
                 <a:spcPct val="100000"/>
               </a:lnSpc>
@@ -4909,7 +4910,7 @@
             </a:endParaRPr>
           </a:p>
           <a:p>
-            <a:pPr marL="195120" indent="-190440">
+            <a:pPr marL="195120" indent="-190080">
               <a:lnSpc>
                 <a:spcPct val="100000"/>
               </a:lnSpc>
@@ -4938,7 +4939,7 @@
             </a:endParaRPr>
           </a:p>
           <a:p>
-            <a:pPr marL="195120" indent="-190440">
+            <a:pPr marL="195120" indent="-190080">
               <a:lnSpc>
                 <a:spcPct val="100000"/>
               </a:lnSpc>
@@ -5007,7 +5008,7 @@
         <p:spPr>
           <a:xfrm>
             <a:off x="335520" y="764640"/>
-            <a:ext cx="10744920" cy="495720"/>
+            <a:ext cx="10744560" cy="495360"/>
           </a:xfrm>
           <a:prstGeom prst="rect">
             <a:avLst/>
@@ -5058,7 +5059,7 @@
         <p:spPr>
           <a:xfrm>
             <a:off x="335520" y="2408400"/>
-            <a:ext cx="10744920" cy="3892680"/>
+            <a:ext cx="10744560" cy="3892320"/>
           </a:xfrm>
           <a:prstGeom prst="rect">
             <a:avLst/>
@@ -5079,7 +5080,7 @@
             <a:noAutofit/>
           </a:bodyPr>
           <a:p>
-            <a:pPr marL="195120" indent="-190440">
+            <a:pPr marL="195120" indent="-190080">
               <a:lnSpc>
                 <a:spcPct val="100000"/>
               </a:lnSpc>
@@ -5108,7 +5109,7 @@
             </a:endParaRPr>
           </a:p>
           <a:p>
-            <a:pPr marL="195120" indent="-190440">
+            <a:pPr marL="195120" indent="-190080">
               <a:lnSpc>
                 <a:spcPct val="100000"/>
               </a:lnSpc>
@@ -5137,7 +5138,7 @@
             </a:endParaRPr>
           </a:p>
           <a:p>
-            <a:pPr marL="195120" indent="-190440">
+            <a:pPr marL="195120" indent="-190080">
               <a:lnSpc>
                 <a:spcPct val="100000"/>
               </a:lnSpc>
@@ -5166,7 +5167,7 @@
             </a:endParaRPr>
           </a:p>
           <a:p>
-            <a:pPr marL="195120" indent="-190440">
+            <a:pPr marL="195120" indent="-190080">
               <a:lnSpc>
                 <a:spcPct val="100000"/>
               </a:lnSpc>
@@ -5195,7 +5196,7 @@
             </a:endParaRPr>
           </a:p>
           <a:p>
-            <a:pPr marL="195120" indent="-190440">
+            <a:pPr marL="195120" indent="-190080">
               <a:lnSpc>
                 <a:spcPct val="100000"/>
               </a:lnSpc>
@@ -5264,7 +5265,7 @@
         <p:spPr>
           <a:xfrm>
             <a:off x="335520" y="764640"/>
-            <a:ext cx="10744920" cy="495720"/>
+            <a:ext cx="10744560" cy="495360"/>
           </a:xfrm>
           <a:prstGeom prst="rect">
             <a:avLst/>
@@ -5325,7 +5326,7 @@
         <p:spPr>
           <a:xfrm>
             <a:off x="335520" y="2408400"/>
-            <a:ext cx="10744920" cy="3892680"/>
+            <a:ext cx="10744560" cy="3892320"/>
           </a:xfrm>
           <a:prstGeom prst="rect">
             <a:avLst/>
@@ -5346,7 +5347,7 @@
             <a:noAutofit/>
           </a:bodyPr>
           <a:p>
-            <a:pPr marL="195120" indent="-190440">
+            <a:pPr marL="195120" indent="-190080">
               <a:lnSpc>
                 <a:spcPct val="100000"/>
               </a:lnSpc>
@@ -5375,7 +5376,7 @@
             </a:endParaRPr>
           </a:p>
           <a:p>
-            <a:pPr marL="195120" indent="-190440">
+            <a:pPr marL="195120" indent="-190080">
               <a:lnSpc>
                 <a:spcPct val="100000"/>
               </a:lnSpc>
@@ -5404,7 +5405,7 @@
             </a:endParaRPr>
           </a:p>
           <a:p>
-            <a:pPr marL="195120" indent="-190440">
+            <a:pPr marL="195120" indent="-190080">
               <a:lnSpc>
                 <a:spcPct val="100000"/>
               </a:lnSpc>
@@ -5433,7 +5434,7 @@
             </a:endParaRPr>
           </a:p>
           <a:p>
-            <a:pPr marL="195120" indent="-190440">
+            <a:pPr marL="195120" indent="-190080">
               <a:lnSpc>
                 <a:spcPct val="100000"/>
               </a:lnSpc>
@@ -5462,7 +5463,7 @@
             </a:endParaRPr>
           </a:p>
           <a:p>
-            <a:pPr marL="195120" indent="-190440">
+            <a:pPr marL="195120" indent="-190080">
               <a:lnSpc>
                 <a:spcPct val="100000"/>
               </a:lnSpc>
@@ -5491,7 +5492,7 @@
             </a:endParaRPr>
           </a:p>
           <a:p>
-            <a:pPr marL="195120" indent="-190440">
+            <a:pPr marL="195120" indent="-190080">
               <a:lnSpc>
                 <a:spcPct val="100000"/>
               </a:lnSpc>
@@ -5560,7 +5561,7 @@
         <p:spPr>
           <a:xfrm>
             <a:off x="335520" y="764640"/>
-            <a:ext cx="10744920" cy="495720"/>
+            <a:ext cx="10744560" cy="495360"/>
           </a:xfrm>
           <a:prstGeom prst="rect">
             <a:avLst/>
@@ -5611,7 +5612,7 @@
         <p:spPr>
           <a:xfrm>
             <a:off x="335520" y="1268640"/>
-            <a:ext cx="10744920" cy="5032440"/>
+            <a:ext cx="10744560" cy="5032080"/>
           </a:xfrm>
           <a:prstGeom prst="rect">
             <a:avLst/>
@@ -5632,7 +5633,7 @@
             <a:noAutofit/>
           </a:bodyPr>
           <a:p>
-            <a:pPr marL="195120" indent="-190440">
+            <a:pPr marL="195120" indent="-190080">
               <a:lnSpc>
                 <a:spcPct val="100000"/>
               </a:lnSpc>
@@ -5661,7 +5662,7 @@
             </a:endParaRPr>
           </a:p>
           <a:p>
-            <a:pPr marL="195120" indent="-190440">
+            <a:pPr marL="195120" indent="-190080">
               <a:lnSpc>
                 <a:spcPct val="100000"/>
               </a:lnSpc>
@@ -5690,7 +5691,7 @@
             </a:endParaRPr>
           </a:p>
           <a:p>
-            <a:pPr marL="195120" indent="-190440">
+            <a:pPr marL="195120" indent="-190080">
               <a:lnSpc>
                 <a:spcPct val="100000"/>
               </a:lnSpc>
@@ -5719,7 +5720,7 @@
             </a:endParaRPr>
           </a:p>
           <a:p>
-            <a:pPr marL="195120" indent="-190440">
+            <a:pPr marL="195120" indent="-190080">
               <a:lnSpc>
                 <a:spcPct val="100000"/>
               </a:lnSpc>
@@ -5748,7 +5749,7 @@
             </a:endParaRPr>
           </a:p>
           <a:p>
-            <a:pPr marL="195120" indent="-190440">
+            <a:pPr marL="195120" indent="-190080">
               <a:lnSpc>
                 <a:spcPct val="100000"/>
               </a:lnSpc>
@@ -5777,7 +5778,7 @@
             </a:endParaRPr>
           </a:p>
           <a:p>
-            <a:pPr marL="195120" indent="-190440">
+            <a:pPr marL="195120" indent="-190080">
               <a:lnSpc>
                 <a:spcPct val="100000"/>
               </a:lnSpc>
@@ -5806,7 +5807,7 @@
             </a:endParaRPr>
           </a:p>
           <a:p>
-            <a:pPr marL="195120" indent="-190440">
+            <a:pPr marL="195120" indent="-190080">
               <a:lnSpc>
                 <a:spcPct val="100000"/>
               </a:lnSpc>
@@ -5835,7 +5836,7 @@
             </a:endParaRPr>
           </a:p>
           <a:p>
-            <a:pPr marL="195120" indent="-190440">
+            <a:pPr marL="195120" indent="-190080">
               <a:lnSpc>
                 <a:spcPct val="100000"/>
               </a:lnSpc>
@@ -5864,7 +5865,7 @@
             </a:endParaRPr>
           </a:p>
           <a:p>
-            <a:pPr marL="195120" indent="-190440">
+            <a:pPr marL="195120" indent="-190080">
               <a:lnSpc>
                 <a:spcPct val="100000"/>
               </a:lnSpc>
@@ -5893,7 +5894,7 @@
             </a:endParaRPr>
           </a:p>
           <a:p>
-            <a:pPr marL="195120" indent="-190440">
+            <a:pPr marL="195120" indent="-190080">
               <a:lnSpc>
                 <a:spcPct val="100000"/>
               </a:lnSpc>
@@ -5922,7 +5923,7 @@
             </a:endParaRPr>
           </a:p>
           <a:p>
-            <a:pPr marL="195120" indent="-190440">
+            <a:pPr marL="195120" indent="-190080">
               <a:lnSpc>
                 <a:spcPct val="100000"/>
               </a:lnSpc>
@@ -5951,7 +5952,7 @@
             </a:endParaRPr>
           </a:p>
           <a:p>
-            <a:pPr marL="195120" indent="-190440">
+            <a:pPr marL="195120" indent="-190080">
               <a:lnSpc>
                 <a:spcPct val="100000"/>
               </a:lnSpc>
@@ -5980,7 +5981,7 @@
             </a:endParaRPr>
           </a:p>
           <a:p>
-            <a:pPr marL="195120" indent="-190440">
+            <a:pPr marL="195120" indent="-190080">
               <a:lnSpc>
                 <a:spcPct val="100000"/>
               </a:lnSpc>
@@ -6009,7 +6010,7 @@
             </a:endParaRPr>
           </a:p>
           <a:p>
-            <a:pPr marL="195120" indent="-190440">
+            <a:pPr marL="195120" indent="-190080">
               <a:lnSpc>
                 <a:spcPct val="100000"/>
               </a:lnSpc>
@@ -6099,7 +6100,7 @@
         <p:spPr>
           <a:xfrm>
             <a:off x="335520" y="764640"/>
-            <a:ext cx="10744920" cy="495720"/>
+            <a:ext cx="10744560" cy="495360"/>
           </a:xfrm>
           <a:prstGeom prst="rect">
             <a:avLst/>
@@ -6150,7 +6151,7 @@
         <p:spPr>
           <a:xfrm>
             <a:off x="335520" y="1268640"/>
-            <a:ext cx="10744920" cy="5032440"/>
+            <a:ext cx="10744560" cy="5032080"/>
           </a:xfrm>
           <a:prstGeom prst="rect">
             <a:avLst/>
@@ -6171,7 +6172,7 @@
             <a:noAutofit/>
           </a:bodyPr>
           <a:p>
-            <a:pPr marL="195120" indent="-190440">
+            <a:pPr marL="195120" indent="-190080">
               <a:lnSpc>
                 <a:spcPct val="100000"/>
               </a:lnSpc>
@@ -6220,7 +6221,7 @@
             </a:endParaRPr>
           </a:p>
           <a:p>
-            <a:pPr marL="195120" indent="-190440">
+            <a:pPr marL="195120" indent="-190080">
               <a:lnSpc>
                 <a:spcPct val="100000"/>
               </a:lnSpc>
@@ -6269,7 +6270,7 @@
             </a:endParaRPr>
           </a:p>
           <a:p>
-            <a:pPr marL="195120" indent="-190440">
+            <a:pPr marL="195120" indent="-190080">
               <a:lnSpc>
                 <a:spcPct val="100000"/>
               </a:lnSpc>
@@ -6318,7 +6319,7 @@
             </a:endParaRPr>
           </a:p>
           <a:p>
-            <a:pPr marL="195120" indent="-190440">
+            <a:pPr marL="195120" indent="-190080">
               <a:lnSpc>
                 <a:spcPct val="100000"/>
               </a:lnSpc>
@@ -6367,7 +6368,7 @@
             </a:endParaRPr>
           </a:p>
           <a:p>
-            <a:pPr marL="195120" indent="-190440">
+            <a:pPr marL="195120" indent="-190080">
               <a:lnSpc>
                 <a:spcPct val="100000"/>
               </a:lnSpc>
@@ -6416,7 +6417,7 @@
             </a:endParaRPr>
           </a:p>
           <a:p>
-            <a:pPr marL="195120" indent="-190440">
+            <a:pPr marL="195120" indent="-190080">
               <a:lnSpc>
                 <a:spcPct val="100000"/>
               </a:lnSpc>
@@ -6485,7 +6486,7 @@
             </a:endParaRPr>
           </a:p>
           <a:p>
-            <a:pPr marL="195120" indent="-190440">
+            <a:pPr marL="195120" indent="-190080">
               <a:lnSpc>
                 <a:spcPct val="100000"/>
               </a:lnSpc>
@@ -6534,7 +6535,7 @@
             </a:endParaRPr>
           </a:p>
           <a:p>
-            <a:pPr marL="195120" indent="-190440">
+            <a:pPr marL="195120" indent="-190080">
               <a:lnSpc>
                 <a:spcPct val="100000"/>
               </a:lnSpc>
@@ -6583,7 +6584,7 @@
             </a:endParaRPr>
           </a:p>
           <a:p>
-            <a:pPr marL="195120" indent="-190440">
+            <a:pPr marL="195120" indent="-190080">
               <a:lnSpc>
                 <a:spcPct val="100000"/>
               </a:lnSpc>
@@ -6632,7 +6633,7 @@
             </a:endParaRPr>
           </a:p>
           <a:p>
-            <a:pPr marL="195120" indent="-190440">
+            <a:pPr marL="195120" indent="-190080">
               <a:lnSpc>
                 <a:spcPct val="100000"/>
               </a:lnSpc>
@@ -6721,7 +6722,7 @@
         <p:spPr>
           <a:xfrm>
             <a:off x="335520" y="764640"/>
-            <a:ext cx="10744920" cy="495720"/>
+            <a:ext cx="10744560" cy="495360"/>
           </a:xfrm>
           <a:prstGeom prst="rect">
             <a:avLst/>
@@ -6772,7 +6773,7 @@
         <p:spPr>
           <a:xfrm>
             <a:off x="335520" y="1268280"/>
-            <a:ext cx="10744920" cy="5032440"/>
+            <a:ext cx="10744560" cy="5032080"/>
           </a:xfrm>
           <a:prstGeom prst="rect">
             <a:avLst/>
@@ -6793,7 +6794,7 @@
             <a:noAutofit/>
           </a:bodyPr>
           <a:p>
-            <a:pPr marL="195120" indent="-190440">
+            <a:pPr marL="195120" indent="-190080">
               <a:lnSpc>
                 <a:spcPct val="100000"/>
               </a:lnSpc>
@@ -6835,7 +6836,7 @@
             </a:endParaRPr>
           </a:p>
           <a:p>
-            <a:pPr marL="195120" indent="-190440">
+            <a:pPr marL="195120" indent="-190080">
               <a:lnSpc>
                 <a:spcPct val="100000"/>
               </a:lnSpc>
@@ -6864,7 +6865,7 @@
             </a:endParaRPr>
           </a:p>
           <a:p>
-            <a:pPr lvl="1" marL="652320" indent="-190440">
+            <a:pPr lvl="1" marL="652320" indent="-190080">
               <a:lnSpc>
                 <a:spcPct val="100000"/>
               </a:lnSpc>
@@ -6915,7 +6916,7 @@
             </a:endParaRPr>
           </a:p>
           <a:p>
-            <a:pPr lvl="3" marL="864000" indent="-212760">
+            <a:pPr lvl="3" marL="864000" indent="-212400">
               <a:lnSpc>
                 <a:spcPct val="100000"/>
               </a:lnSpc>
@@ -6944,7 +6945,7 @@
             </a:endParaRPr>
           </a:p>
           <a:p>
-            <a:pPr lvl="1" marL="652320" indent="-190440">
+            <a:pPr lvl="1" marL="652320" indent="-190080">
               <a:lnSpc>
                 <a:spcPct val="100000"/>
               </a:lnSpc>
@@ -6973,7 +6974,7 @@
             </a:endParaRPr>
           </a:p>
           <a:p>
-            <a:pPr lvl="1" marL="652320" indent="-190440">
+            <a:pPr lvl="1" marL="652320" indent="-190080">
               <a:lnSpc>
                 <a:spcPct val="100000"/>
               </a:lnSpc>
@@ -7002,7 +7003,7 @@
             </a:endParaRPr>
           </a:p>
           <a:p>
-            <a:pPr lvl="1" marL="652320" indent="-190440">
+            <a:pPr lvl="1" marL="652320" indent="-190080">
               <a:lnSpc>
                 <a:spcPct val="100000"/>
               </a:lnSpc>
@@ -7202,7 +7203,7 @@
         <p:spPr>
           <a:xfrm>
             <a:off x="335520" y="764640"/>
-            <a:ext cx="10743480" cy="494280"/>
+            <a:ext cx="10743120" cy="493920"/>
           </a:xfrm>
           <a:prstGeom prst="rect">
             <a:avLst/>
@@ -7273,7 +7274,7 @@
         <p:spPr>
           <a:xfrm>
             <a:off x="335520" y="1268640"/>
-            <a:ext cx="10743480" cy="5031000"/>
+            <a:ext cx="10743120" cy="5030640"/>
           </a:xfrm>
           <a:prstGeom prst="rect">
             <a:avLst/>
@@ -7294,7 +7295,7 @@
             <a:noAutofit/>
           </a:bodyPr>
           <a:p>
-            <a:pPr marL="195120" indent="-189360">
+            <a:pPr marL="195120" indent="-189000">
               <a:lnSpc>
                 <a:spcPct val="100000"/>
               </a:lnSpc>
@@ -7334,7 +7335,7 @@
             </a:endParaRPr>
           </a:p>
           <a:p>
-            <a:pPr lvl="1" marL="432000" indent="-212040">
+            <a:pPr lvl="1" marL="432000" indent="-211680">
               <a:lnSpc>
                 <a:spcPct val="100000"/>
               </a:lnSpc>
@@ -7383,7 +7384,7 @@
             </a:endParaRPr>
           </a:p>
           <a:p>
-            <a:pPr lvl="1" marL="432000" indent="-212040">
+            <a:pPr lvl="1" marL="432000" indent="-211680">
               <a:lnSpc>
                 <a:spcPct val="100000"/>
               </a:lnSpc>
@@ -7425,7 +7426,7 @@
             </a:endParaRPr>
           </a:p>
           <a:p>
-            <a:pPr marL="195120" indent="-189360">
+            <a:pPr marL="195120" indent="-189000">
               <a:lnSpc>
                 <a:spcPct val="100000"/>
               </a:lnSpc>
@@ -7455,7 +7456,7 @@
             </a:endParaRPr>
           </a:p>
           <a:p>
-            <a:pPr lvl="1" marL="432000" indent="-212040">
+            <a:pPr lvl="1" marL="432000" indent="-211680">
               <a:lnSpc>
                 <a:spcPct val="100000"/>
               </a:lnSpc>
@@ -7544,7 +7545,7 @@
             </a:endParaRPr>
           </a:p>
           <a:p>
-            <a:pPr lvl="1" marL="432000" indent="-212040">
+            <a:pPr lvl="1" marL="432000" indent="-211680">
               <a:lnSpc>
                 <a:spcPct val="100000"/>
               </a:lnSpc>
@@ -7608,7 +7609,7 @@
             </a:endParaRPr>
           </a:p>
           <a:p>
-            <a:pPr marL="195120" indent="-189360">
+            <a:pPr marL="195120" indent="-189000">
               <a:lnSpc>
                 <a:spcPct val="100000"/>
               </a:lnSpc>
@@ -7638,7 +7639,7 @@
             </a:endParaRPr>
           </a:p>
           <a:p>
-            <a:pPr lvl="1" marL="432000" indent="-212040">
+            <a:pPr lvl="1" marL="432000" indent="-211680">
               <a:lnSpc>
                 <a:spcPct val="100000"/>
               </a:lnSpc>
@@ -7727,7 +7728,7 @@
             </a:endParaRPr>
           </a:p>
           <a:p>
-            <a:pPr lvl="1" marL="432000" indent="-212040">
+            <a:pPr lvl="1" marL="432000" indent="-211680">
               <a:lnSpc>
                 <a:spcPct val="100000"/>
               </a:lnSpc>
@@ -7818,7 +7819,7 @@
         <p:spPr>
           <a:xfrm>
             <a:off x="335520" y="764640"/>
-            <a:ext cx="10744920" cy="495720"/>
+            <a:ext cx="10744560" cy="495360"/>
           </a:xfrm>
           <a:prstGeom prst="rect">
             <a:avLst/>
@@ -7869,7 +7870,7 @@
         <p:spPr>
           <a:xfrm>
             <a:off x="335520" y="1268280"/>
-            <a:ext cx="10744920" cy="5032440"/>
+            <a:ext cx="10744560" cy="5032080"/>
           </a:xfrm>
           <a:prstGeom prst="rect">
             <a:avLst/>
@@ -7900,7 +7901,7 @@
             </a:endParaRPr>
           </a:p>
           <a:p>
-            <a:pPr marL="195120" indent="-190440">
+            <a:pPr marL="195120" indent="-190080">
               <a:lnSpc>
                 <a:spcPct val="100000"/>
               </a:lnSpc>
@@ -7969,7 +7970,7 @@
             </a:endParaRPr>
           </a:p>
           <a:p>
-            <a:pPr marL="195120" indent="-190440">
+            <a:pPr marL="195120" indent="-190080">
               <a:lnSpc>
                 <a:spcPct val="100000"/>
               </a:lnSpc>
@@ -7998,7 +7999,7 @@
             </a:endParaRPr>
           </a:p>
           <a:p>
-            <a:pPr marL="195120" indent="-190440">
+            <a:pPr marL="195120" indent="-190080">
               <a:lnSpc>
                 <a:spcPct val="100000"/>
               </a:lnSpc>
@@ -8027,7 +8028,7 @@
             </a:endParaRPr>
           </a:p>
           <a:p>
-            <a:pPr marL="195120" indent="-190440">
+            <a:pPr marL="195120" indent="-190080">
               <a:lnSpc>
                 <a:spcPct val="100000"/>
               </a:lnSpc>
@@ -8056,7 +8057,7 @@
             </a:endParaRPr>
           </a:p>
           <a:p>
-            <a:pPr marL="195120" indent="-190440">
+            <a:pPr marL="195120" indent="-190080">
               <a:lnSpc>
                 <a:spcPct val="100000"/>
               </a:lnSpc>
@@ -8115,7 +8116,7 @@
             </a:endParaRPr>
           </a:p>
           <a:p>
-            <a:pPr marL="195120" indent="-190440">
+            <a:pPr marL="195120" indent="-190080">
               <a:lnSpc>
                 <a:spcPct val="100000"/>
               </a:lnSpc>
@@ -8145,7 +8146,7 @@
             </a:endParaRPr>
           </a:p>
           <a:p>
-            <a:pPr marL="195120" indent="-190440">
+            <a:pPr marL="195120" indent="-190080">
               <a:lnSpc>
                 <a:spcPct val="100000"/>
               </a:lnSpc>
@@ -8174,7 +8175,7 @@
             </a:endParaRPr>
           </a:p>
           <a:p>
-            <a:pPr marL="195120" indent="-190440">
+            <a:pPr marL="195120" indent="-190080">
               <a:lnSpc>
                 <a:spcPct val="100000"/>
               </a:lnSpc>
@@ -8243,7 +8244,7 @@
         <p:spPr>
           <a:xfrm>
             <a:off x="335520" y="764640"/>
-            <a:ext cx="10744920" cy="495720"/>
+            <a:ext cx="10744560" cy="495360"/>
           </a:xfrm>
           <a:prstGeom prst="rect">
             <a:avLst/>
@@ -8294,7 +8295,7 @@
         <p:spPr>
           <a:xfrm>
             <a:off x="335520" y="1268280"/>
-            <a:ext cx="10744920" cy="5032440"/>
+            <a:ext cx="10744560" cy="5032080"/>
           </a:xfrm>
           <a:prstGeom prst="rect">
             <a:avLst/>
@@ -8315,7 +8316,7 @@
             <a:noAutofit/>
           </a:bodyPr>
           <a:p>
-            <a:pPr marL="216000" indent="-214560">
+            <a:pPr marL="216000" indent="-214200">
               <a:lnSpc>
                 <a:spcPct val="100000"/>
               </a:lnSpc>
@@ -8341,7 +8342,7 @@
             </a:endParaRPr>
           </a:p>
           <a:p>
-            <a:pPr lvl="1" marL="432000" indent="-214560">
+            <a:pPr lvl="1" marL="432000" indent="-214200">
               <a:lnSpc>
                 <a:spcPct val="100000"/>
               </a:lnSpc>
@@ -8370,7 +8371,7 @@
             </a:endParaRPr>
           </a:p>
           <a:p>
-            <a:pPr lvl="1" marL="432000" indent="-214560">
+            <a:pPr lvl="1" marL="432000" indent="-214200">
               <a:lnSpc>
                 <a:spcPct val="100000"/>
               </a:lnSpc>
@@ -8399,7 +8400,7 @@
             </a:endParaRPr>
           </a:p>
           <a:p>
-            <a:pPr lvl="1" marL="432000" indent="-214560">
+            <a:pPr lvl="1" marL="432000" indent="-214200">
               <a:lnSpc>
                 <a:spcPct val="100000"/>
               </a:lnSpc>
@@ -8428,7 +8429,7 @@
             </a:endParaRPr>
           </a:p>
           <a:p>
-            <a:pPr lvl="1" marL="432000" indent="-214560">
+            <a:pPr lvl="1" marL="432000" indent="-214200">
               <a:lnSpc>
                 <a:spcPct val="100000"/>
               </a:lnSpc>
@@ -8457,7 +8458,7 @@
             </a:endParaRPr>
           </a:p>
           <a:p>
-            <a:pPr lvl="1" marL="432000" indent="-214560">
+            <a:pPr lvl="1" marL="432000" indent="-214200">
               <a:lnSpc>
                 <a:spcPct val="100000"/>
               </a:lnSpc>
@@ -8526,7 +8527,7 @@
         <p:spPr>
           <a:xfrm>
             <a:off x="335520" y="764640"/>
-            <a:ext cx="10744920" cy="495720"/>
+            <a:ext cx="10744560" cy="495360"/>
           </a:xfrm>
           <a:prstGeom prst="rect">
             <a:avLst/>
@@ -8577,7 +8578,7 @@
         <p:spPr>
           <a:xfrm>
             <a:off x="335520" y="1268640"/>
-            <a:ext cx="10744920" cy="5032440"/>
+            <a:ext cx="10744560" cy="5032080"/>
           </a:xfrm>
           <a:prstGeom prst="rect">
             <a:avLst/>
@@ -8598,7 +8599,7 @@
             <a:noAutofit/>
           </a:bodyPr>
           <a:p>
-            <a:pPr marL="216000" indent="-214560">
+            <a:pPr marL="216000" indent="-214200">
               <a:lnSpc>
                 <a:spcPct val="100000"/>
               </a:lnSpc>
@@ -8627,7 +8628,7 @@
             </a:endParaRPr>
           </a:p>
           <a:p>
-            <a:pPr marL="216000" indent="-214560">
+            <a:pPr marL="216000" indent="-214200">
               <a:lnSpc>
                 <a:spcPct val="100000"/>
               </a:lnSpc>
@@ -8656,7 +8657,7 @@
             </a:endParaRPr>
           </a:p>
           <a:p>
-            <a:pPr marL="216000" indent="-214560">
+            <a:pPr marL="216000" indent="-214200">
               <a:lnSpc>
                 <a:spcPct val="100000"/>
               </a:lnSpc>
@@ -8705,7 +8706,7 @@
             </a:endParaRPr>
           </a:p>
           <a:p>
-            <a:pPr lvl="1" marL="432000" indent="-214560">
+            <a:pPr lvl="1" marL="432000" indent="-214200">
               <a:lnSpc>
                 <a:spcPct val="100000"/>
               </a:lnSpc>
@@ -8734,7 +8735,7 @@
             </a:endParaRPr>
           </a:p>
           <a:p>
-            <a:pPr lvl="1" marL="432000" indent="-214560">
+            <a:pPr lvl="1" marL="432000" indent="-214200">
               <a:lnSpc>
                 <a:spcPct val="100000"/>
               </a:lnSpc>
@@ -8793,7 +8794,7 @@
         <p:spPr>
           <a:xfrm>
             <a:off x="4655880" y="476640"/>
-            <a:ext cx="2431080" cy="357120"/>
+            <a:ext cx="2430720" cy="356760"/>
           </a:xfrm>
           <a:prstGeom prst="rect">
             <a:avLst/>
@@ -8849,7 +8850,7 @@
         <p:spPr>
           <a:xfrm>
             <a:off x="335520" y="764640"/>
-            <a:ext cx="10742760" cy="493560"/>
+            <a:ext cx="10742400" cy="493200"/>
           </a:xfrm>
           <a:prstGeom prst="rect">
             <a:avLst/>
@@ -8900,7 +8901,7 @@
         <p:spPr>
           <a:xfrm>
             <a:off x="335520" y="1268640"/>
-            <a:ext cx="10742760" cy="5030280"/>
+            <a:ext cx="10742400" cy="5029920"/>
           </a:xfrm>
           <a:prstGeom prst="rect">
             <a:avLst/>
@@ -8957,7 +8958,7 @@
         <p:spPr>
           <a:xfrm>
             <a:off x="336600" y="3429000"/>
-            <a:ext cx="10860480" cy="2052360"/>
+            <a:ext cx="10860120" cy="2052000"/>
           </a:xfrm>
           <a:prstGeom prst="rect">
             <a:avLst/>
@@ -8978,7 +8979,7 @@
             <a:noAutofit/>
           </a:bodyPr>
           <a:p>
-            <a:pPr marL="216000" indent="-213480">
+            <a:pPr marL="216000" indent="-213120">
               <a:lnSpc>
                 <a:spcPct val="100000"/>
               </a:lnSpc>
@@ -9052,7 +9053,7 @@
             </a:endParaRPr>
           </a:p>
           <a:p>
-            <a:pPr marL="216000" indent="-213480">
+            <a:pPr marL="216000" indent="-213120">
               <a:lnSpc>
                 <a:spcPct val="100000"/>
               </a:lnSpc>
@@ -9146,7 +9147,7 @@
         <p:spPr>
           <a:xfrm>
             <a:off x="335520" y="764640"/>
-            <a:ext cx="10744920" cy="495720"/>
+            <a:ext cx="10744560" cy="495360"/>
           </a:xfrm>
           <a:prstGeom prst="rect">
             <a:avLst/>
@@ -9197,7 +9198,7 @@
         <p:spPr>
           <a:xfrm>
             <a:off x="335520" y="1268640"/>
-            <a:ext cx="10744920" cy="5032440"/>
+            <a:ext cx="10744560" cy="5032080"/>
           </a:xfrm>
           <a:prstGeom prst="rect">
             <a:avLst/>
@@ -9218,7 +9219,7 @@
             <a:noAutofit/>
           </a:bodyPr>
           <a:p>
-            <a:pPr marL="195120" indent="-190440">
+            <a:pPr marL="195120" indent="-190080">
               <a:lnSpc>
                 <a:spcPct val="100000"/>
               </a:lnSpc>
@@ -9247,7 +9248,7 @@
             </a:endParaRPr>
           </a:p>
           <a:p>
-            <a:pPr marL="195120" indent="-190440">
+            <a:pPr marL="195120" indent="-190080">
               <a:lnSpc>
                 <a:spcPct val="100000"/>
               </a:lnSpc>
@@ -9276,7 +9277,7 @@
             </a:endParaRPr>
           </a:p>
           <a:p>
-            <a:pPr marL="195120" indent="-190440">
+            <a:pPr marL="195120" indent="-190080">
               <a:lnSpc>
                 <a:spcPct val="100000"/>
               </a:lnSpc>
@@ -9315,7 +9316,7 @@
         <p:spPr>
           <a:xfrm>
             <a:off x="4655880" y="476640"/>
-            <a:ext cx="2431080" cy="357120"/>
+            <a:ext cx="2430720" cy="356760"/>
           </a:xfrm>
           <a:prstGeom prst="rect">
             <a:avLst/>
@@ -9371,7 +9372,7 @@
         <p:spPr>
           <a:xfrm>
             <a:off x="335520" y="840960"/>
-            <a:ext cx="10744920" cy="495720"/>
+            <a:ext cx="10744560" cy="495360"/>
           </a:xfrm>
           <a:prstGeom prst="rect">
             <a:avLst/>
@@ -9422,7 +9423,7 @@
         <p:spPr>
           <a:xfrm>
             <a:off x="388800" y="1488600"/>
-            <a:ext cx="10723320" cy="5204520"/>
+            <a:ext cx="10722960" cy="5204520"/>
           </a:xfrm>
           <a:prstGeom prst="rect">
             <a:avLst/>
@@ -9473,7 +9474,7 @@
             </a:endParaRPr>
           </a:p>
           <a:p>
-            <a:pPr marL="216000" indent="-214560">
+            <a:pPr marL="216000" indent="-214200">
               <a:lnSpc>
                 <a:spcPct val="100000"/>
               </a:lnSpc>
@@ -9519,7 +9520,7 @@
             </a:endParaRPr>
           </a:p>
           <a:p>
-            <a:pPr marL="216000" indent="-214560">
+            <a:pPr marL="216000" indent="-214200">
               <a:lnSpc>
                 <a:spcPct val="100000"/>
               </a:lnSpc>
@@ -9565,7 +9566,7 @@
             </a:endParaRPr>
           </a:p>
           <a:p>
-            <a:pPr marL="216000" indent="-214560">
+            <a:pPr marL="216000" indent="-214200">
               <a:lnSpc>
                 <a:spcPct val="100000"/>
               </a:lnSpc>
@@ -9591,7 +9592,7 @@
             </a:endParaRPr>
           </a:p>
           <a:p>
-            <a:pPr marL="216000" indent="-214560">
+            <a:pPr marL="216000" indent="-214200">
               <a:lnSpc>
                 <a:spcPct val="100000"/>
               </a:lnSpc>
@@ -9627,7 +9628,7 @@
             </a:endParaRPr>
           </a:p>
           <a:p>
-            <a:pPr marL="216000" indent="-214560">
+            <a:pPr marL="216000" indent="-214200">
               <a:lnSpc>
                 <a:spcPct val="100000"/>
               </a:lnSpc>
@@ -9653,7 +9654,7 @@
             </a:endParaRPr>
           </a:p>
           <a:p>
-            <a:pPr marL="216000" indent="-214560">
+            <a:pPr marL="216000" indent="-214200">
               <a:lnSpc>
                 <a:spcPct val="100000"/>
               </a:lnSpc>
@@ -9679,7 +9680,7 @@
             </a:endParaRPr>
           </a:p>
           <a:p>
-            <a:pPr marL="216000" indent="-214560">
+            <a:pPr marL="216000" indent="-214200">
               <a:lnSpc>
                 <a:spcPct val="100000"/>
               </a:lnSpc>
@@ -9715,7 +9716,7 @@
             </a:endParaRPr>
           </a:p>
           <a:p>
-            <a:pPr marL="216000" indent="-214560">
+            <a:pPr marL="216000" indent="-214200">
               <a:lnSpc>
                 <a:spcPct val="100000"/>
               </a:lnSpc>
@@ -9741,7 +9742,7 @@
             </a:endParaRPr>
           </a:p>
           <a:p>
-            <a:pPr marL="216000" indent="-214560">
+            <a:pPr marL="216000" indent="-214200">
               <a:lnSpc>
                 <a:spcPct val="100000"/>
               </a:lnSpc>
@@ -9787,7 +9788,7 @@
             </a:endParaRPr>
           </a:p>
           <a:p>
-            <a:pPr marL="216000" indent="-214560">
+            <a:pPr marL="216000" indent="-214200">
               <a:lnSpc>
                 <a:spcPct val="100000"/>
               </a:lnSpc>
@@ -9823,7 +9824,7 @@
             </a:endParaRPr>
           </a:p>
           <a:p>
-            <a:pPr marL="216000" indent="-214560">
+            <a:pPr marL="216000" indent="-214200">
               <a:lnSpc>
                 <a:spcPct val="100000"/>
               </a:lnSpc>
@@ -9889,7 +9890,7 @@
             </a:endParaRPr>
           </a:p>
           <a:p>
-            <a:pPr marL="216000" indent="-214560">
+            <a:pPr marL="216000" indent="-214200">
               <a:lnSpc>
                 <a:spcPct val="100000"/>
               </a:lnSpc>
@@ -9925,7 +9926,7 @@
             </a:endParaRPr>
           </a:p>
           <a:p>
-            <a:pPr marL="216000" indent="-214560">
+            <a:pPr marL="216000" indent="-214200">
               <a:lnSpc>
                 <a:spcPct val="100000"/>
               </a:lnSpc>
@@ -9991,7 +9992,7 @@
         <p:spPr>
           <a:xfrm>
             <a:off x="335520" y="764640"/>
-            <a:ext cx="10744920" cy="495720"/>
+            <a:ext cx="10744560" cy="495360"/>
           </a:xfrm>
           <a:prstGeom prst="rect">
             <a:avLst/>
@@ -10042,7 +10043,7 @@
         <p:spPr>
           <a:xfrm>
             <a:off x="4655880" y="476640"/>
-            <a:ext cx="2431080" cy="357120"/>
+            <a:ext cx="2430720" cy="356760"/>
           </a:xfrm>
           <a:prstGeom prst="rect">
             <a:avLst/>
@@ -10068,7 +10069,7 @@
         <p:spPr>
           <a:xfrm>
             <a:off x="494640" y="1523880"/>
-            <a:ext cx="10363680" cy="478800"/>
+            <a:ext cx="10363320" cy="478440"/>
           </a:xfrm>
           <a:prstGeom prst="rect">
             <a:avLst/>
@@ -10118,13 +10119,13 @@
         </p:nvPicPr>
         <p:blipFill>
           <a:blip r:embed="rId1"/>
-          <a:srcRect l="0" t="0" r="0" b="43289"/>
+          <a:srcRect l="0" t="0" r="0" b="43284"/>
           <a:stretch/>
         </p:blipFill>
         <p:spPr>
           <a:xfrm>
             <a:off x="609120" y="2057760"/>
-            <a:ext cx="9516240" cy="3880440"/>
+            <a:ext cx="9515880" cy="3880080"/>
           </a:xfrm>
           <a:prstGeom prst="rect">
             <a:avLst/>
@@ -10173,7 +10174,7 @@
         <p:spPr>
           <a:xfrm>
             <a:off x="335520" y="764640"/>
-            <a:ext cx="10744920" cy="495720"/>
+            <a:ext cx="10744560" cy="495360"/>
           </a:xfrm>
           <a:prstGeom prst="rect">
             <a:avLst/>
@@ -10224,7 +10225,7 @@
         <p:spPr>
           <a:xfrm>
             <a:off x="4655880" y="476640"/>
-            <a:ext cx="2431080" cy="357120"/>
+            <a:ext cx="2430720" cy="356760"/>
           </a:xfrm>
           <a:prstGeom prst="rect">
             <a:avLst/>
@@ -10250,7 +10251,7 @@
         <p:spPr>
           <a:xfrm>
             <a:off x="494640" y="1474920"/>
-            <a:ext cx="10363680" cy="478800"/>
+            <a:ext cx="10363320" cy="478440"/>
           </a:xfrm>
           <a:prstGeom prst="rect">
             <a:avLst/>
@@ -10316,7 +10317,7 @@
         <p:spPr>
           <a:xfrm>
             <a:off x="446400" y="2185200"/>
-            <a:ext cx="9403560" cy="3846600"/>
+            <a:ext cx="9403200" cy="3846240"/>
           </a:xfrm>
           <a:prstGeom prst="rect">
             <a:avLst/>
@@ -10365,7 +10366,7 @@
         <p:spPr>
           <a:xfrm>
             <a:off x="335520" y="764640"/>
-            <a:ext cx="10744920" cy="495720"/>
+            <a:ext cx="10744560" cy="495360"/>
           </a:xfrm>
           <a:prstGeom prst="rect">
             <a:avLst/>
@@ -10416,7 +10417,7 @@
         <p:spPr>
           <a:xfrm>
             <a:off x="4655880" y="476640"/>
-            <a:ext cx="2431080" cy="357120"/>
+            <a:ext cx="2430720" cy="356760"/>
           </a:xfrm>
           <a:prstGeom prst="rect">
             <a:avLst/>
@@ -10442,7 +10443,7 @@
         <p:spPr>
           <a:xfrm>
             <a:off x="494640" y="1523880"/>
-            <a:ext cx="10363680" cy="478800"/>
+            <a:ext cx="10363320" cy="478440"/>
           </a:xfrm>
           <a:prstGeom prst="rect">
             <a:avLst/>
@@ -10498,7 +10499,7 @@
         <p:spPr>
           <a:xfrm>
             <a:off x="494640" y="2088360"/>
-            <a:ext cx="8941320" cy="3962880"/>
+            <a:ext cx="8940960" cy="3962520"/>
           </a:xfrm>
           <a:prstGeom prst="rect">
             <a:avLst/>
@@ -10547,7 +10548,7 @@
         <p:spPr>
           <a:xfrm>
             <a:off x="335520" y="764640"/>
-            <a:ext cx="10744920" cy="495720"/>
+            <a:ext cx="10744560" cy="495360"/>
           </a:xfrm>
           <a:prstGeom prst="rect">
             <a:avLst/>
@@ -10598,7 +10599,7 @@
         <p:spPr>
           <a:xfrm>
             <a:off x="4655880" y="476640"/>
-            <a:ext cx="2431080" cy="357120"/>
+            <a:ext cx="2430720" cy="356760"/>
           </a:xfrm>
           <a:prstGeom prst="rect">
             <a:avLst/>
@@ -10624,7 +10625,7 @@
         <p:spPr>
           <a:xfrm>
             <a:off x="494640" y="1523880"/>
-            <a:ext cx="10363680" cy="478800"/>
+            <a:ext cx="10363320" cy="478440"/>
           </a:xfrm>
           <a:prstGeom prst="rect">
             <a:avLst/>
@@ -10680,7 +10681,7 @@
         <p:spPr>
           <a:xfrm>
             <a:off x="494640" y="2166840"/>
-            <a:ext cx="8336880" cy="4178160"/>
+            <a:ext cx="8336520" cy="4177800"/>
           </a:xfrm>
           <a:prstGeom prst="rect">
             <a:avLst/>
@@ -10729,7 +10730,7 @@
         <p:spPr>
           <a:xfrm>
             <a:off x="335520" y="768240"/>
-            <a:ext cx="10744920" cy="495720"/>
+            <a:ext cx="10744560" cy="495360"/>
           </a:xfrm>
           <a:prstGeom prst="rect">
             <a:avLst/>
@@ -10780,7 +10781,7 @@
         <p:spPr>
           <a:xfrm>
             <a:off x="388800" y="1488600"/>
-            <a:ext cx="10718640" cy="5204520"/>
+            <a:ext cx="10718280" cy="5204520"/>
           </a:xfrm>
           <a:prstGeom prst="rect">
             <a:avLst/>
@@ -10831,7 +10832,7 @@
             </a:endParaRPr>
           </a:p>
           <a:p>
-            <a:pPr marL="216000" indent="-212760">
+            <a:pPr marL="216000" indent="-212400">
               <a:lnSpc>
                 <a:spcPct val="100000"/>
               </a:lnSpc>
@@ -10887,7 +10888,7 @@
             </a:endParaRPr>
           </a:p>
           <a:p>
-            <a:pPr marL="216000" indent="-212760">
+            <a:pPr marL="216000" indent="-212400">
               <a:lnSpc>
                 <a:spcPct val="100000"/>
               </a:lnSpc>
@@ -10943,7 +10944,7 @@
             </a:endParaRPr>
           </a:p>
           <a:p>
-            <a:pPr marL="216000" indent="-212760">
+            <a:pPr marL="216000" indent="-212400">
               <a:lnSpc>
                 <a:spcPct val="100000"/>
               </a:lnSpc>
@@ -10969,7 +10970,7 @@
             </a:endParaRPr>
           </a:p>
           <a:p>
-            <a:pPr marL="216000" indent="-212760">
+            <a:pPr marL="216000" indent="-212400">
               <a:lnSpc>
                 <a:spcPct val="100000"/>
               </a:lnSpc>
@@ -11005,7 +11006,7 @@
             </a:endParaRPr>
           </a:p>
           <a:p>
-            <a:pPr marL="216000" indent="-212760">
+            <a:pPr marL="216000" indent="-212400">
               <a:lnSpc>
                 <a:spcPct val="100000"/>
               </a:lnSpc>
@@ -11031,7 +11032,7 @@
             </a:endParaRPr>
           </a:p>
           <a:p>
-            <a:pPr marL="216000" indent="-212760">
+            <a:pPr marL="216000" indent="-212400">
               <a:lnSpc>
                 <a:spcPct val="100000"/>
               </a:lnSpc>
@@ -11057,7 +11058,7 @@
             </a:endParaRPr>
           </a:p>
           <a:p>
-            <a:pPr marL="216000" indent="-212760">
+            <a:pPr marL="216000" indent="-212400">
               <a:lnSpc>
                 <a:spcPct val="100000"/>
               </a:lnSpc>
@@ -11093,7 +11094,7 @@
             </a:endParaRPr>
           </a:p>
           <a:p>
-            <a:pPr marL="216000" indent="-212760">
+            <a:pPr marL="216000" indent="-212400">
               <a:lnSpc>
                 <a:spcPct val="100000"/>
               </a:lnSpc>
@@ -11119,7 +11120,7 @@
             </a:endParaRPr>
           </a:p>
           <a:p>
-            <a:pPr marL="216000" indent="-212760">
+            <a:pPr marL="216000" indent="-212400">
               <a:lnSpc>
                 <a:spcPct val="100000"/>
               </a:lnSpc>
@@ -11165,7 +11166,7 @@
             </a:endParaRPr>
           </a:p>
           <a:p>
-            <a:pPr marL="216000" indent="-212760">
+            <a:pPr marL="216000" indent="-212400">
               <a:lnSpc>
                 <a:spcPct val="100000"/>
               </a:lnSpc>
@@ -11201,7 +11202,7 @@
             </a:endParaRPr>
           </a:p>
           <a:p>
-            <a:pPr marL="216000" indent="-212760">
+            <a:pPr marL="216000" indent="-212400">
               <a:lnSpc>
                 <a:spcPct val="100000"/>
               </a:lnSpc>
@@ -11267,7 +11268,7 @@
             </a:endParaRPr>
           </a:p>
           <a:p>
-            <a:pPr marL="216000" indent="-212760">
+            <a:pPr marL="216000" indent="-212400">
               <a:lnSpc>
                 <a:spcPct val="100000"/>
               </a:lnSpc>
@@ -11303,7 +11304,7 @@
             </a:endParaRPr>
           </a:p>
           <a:p>
-            <a:pPr marL="216000" indent="-212760">
+            <a:pPr marL="216000" indent="-212400">
               <a:lnSpc>
                 <a:spcPct val="100000"/>
               </a:lnSpc>
@@ -11369,7 +11370,7 @@
         <p:spPr>
           <a:xfrm>
             <a:off x="335520" y="764640"/>
-            <a:ext cx="10744920" cy="495720"/>
+            <a:ext cx="10744560" cy="495360"/>
           </a:xfrm>
           <a:prstGeom prst="rect">
             <a:avLst/>
@@ -11420,7 +11421,7 @@
         <p:spPr>
           <a:xfrm>
             <a:off x="494640" y="1523880"/>
-            <a:ext cx="10363680" cy="478800"/>
+            <a:ext cx="10363320" cy="478440"/>
           </a:xfrm>
           <a:prstGeom prst="rect">
             <a:avLst/>
@@ -11510,7 +11511,7 @@
         <p:spPr>
           <a:xfrm>
             <a:off x="1895760" y="2238840"/>
-            <a:ext cx="6786000" cy="4156920"/>
+            <a:ext cx="6785640" cy="4156560"/>
           </a:xfrm>
           <a:prstGeom prst="rect">
             <a:avLst/>
@@ -11559,7 +11560,7 @@
         <p:spPr>
           <a:xfrm>
             <a:off x="335520" y="764640"/>
-            <a:ext cx="10744920" cy="495720"/>
+            <a:ext cx="10744560" cy="495360"/>
           </a:xfrm>
           <a:prstGeom prst="rect">
             <a:avLst/>
@@ -11610,7 +11611,7 @@
         <p:spPr>
           <a:xfrm>
             <a:off x="494640" y="1488600"/>
-            <a:ext cx="5446440" cy="443520"/>
+            <a:ext cx="5446080" cy="443160"/>
           </a:xfrm>
           <a:prstGeom prst="rect">
             <a:avLst/>
@@ -11676,7 +11677,7 @@
         <p:spPr>
           <a:xfrm>
             <a:off x="1828800" y="1937160"/>
-            <a:ext cx="7953480" cy="4087800"/>
+            <a:ext cx="7953120" cy="4087440"/>
           </a:xfrm>
           <a:prstGeom prst="rect">
             <a:avLst/>
@@ -11725,7 +11726,7 @@
         <p:spPr>
           <a:xfrm>
             <a:off x="335520" y="764640"/>
-            <a:ext cx="10744920" cy="495720"/>
+            <a:ext cx="10744560" cy="495360"/>
           </a:xfrm>
           <a:prstGeom prst="rect">
             <a:avLst/>
@@ -11780,7 +11781,7 @@
         <p:spPr>
           <a:xfrm>
             <a:off x="2679480" y="2130480"/>
-            <a:ext cx="7373880" cy="3484800"/>
+            <a:ext cx="7373520" cy="3484440"/>
           </a:xfrm>
           <a:prstGeom prst="rect">
             <a:avLst/>
@@ -11799,7 +11800,7 @@
         <p:spPr>
           <a:xfrm>
             <a:off x="494640" y="1418040"/>
-            <a:ext cx="5217840" cy="443520"/>
+            <a:ext cx="5217480" cy="443160"/>
           </a:xfrm>
           <a:prstGeom prst="rect">
             <a:avLst/>
@@ -11880,7 +11881,7 @@
         <p:spPr>
           <a:xfrm>
             <a:off x="335520" y="764640"/>
-            <a:ext cx="10744920" cy="495720"/>
+            <a:ext cx="10744560" cy="495360"/>
           </a:xfrm>
           <a:prstGeom prst="rect">
             <a:avLst/>
@@ -11935,7 +11936,7 @@
         <p:spPr>
           <a:xfrm>
             <a:off x="2394720" y="1153800"/>
-            <a:ext cx="1467720" cy="2169000"/>
+            <a:ext cx="1467360" cy="2168640"/>
           </a:xfrm>
           <a:prstGeom prst="rect">
             <a:avLst/>
@@ -11958,7 +11959,7 @@
         <p:spPr>
           <a:xfrm>
             <a:off x="7250040" y="1153800"/>
-            <a:ext cx="1733040" cy="2169000"/>
+            <a:ext cx="1732680" cy="2168640"/>
           </a:xfrm>
           <a:prstGeom prst="rect">
             <a:avLst/>
@@ -11981,7 +11982,7 @@
         <p:spPr>
           <a:xfrm>
             <a:off x="4846320" y="4206240"/>
-            <a:ext cx="1781640" cy="1773720"/>
+            <a:ext cx="1781280" cy="1773360"/>
           </a:xfrm>
           <a:prstGeom prst="rect">
             <a:avLst/>
@@ -12000,7 +12001,7 @@
         <p:spPr>
           <a:xfrm>
             <a:off x="1330200" y="3269880"/>
-            <a:ext cx="3632400" cy="673920"/>
+            <a:ext cx="3632040" cy="673560"/>
           </a:xfrm>
           <a:prstGeom prst="rect">
             <a:avLst/>
@@ -12077,7 +12078,7 @@
         <p:spPr>
           <a:xfrm>
             <a:off x="6321600" y="3269880"/>
-            <a:ext cx="3632400" cy="673920"/>
+            <a:ext cx="3632040" cy="673560"/>
           </a:xfrm>
           <a:prstGeom prst="rect">
             <a:avLst/>
@@ -12154,7 +12155,7 @@
         <p:spPr>
           <a:xfrm>
             <a:off x="1312200" y="5920200"/>
-            <a:ext cx="3632400" cy="673920"/>
+            <a:ext cx="3632040" cy="673560"/>
           </a:xfrm>
           <a:prstGeom prst="rect">
             <a:avLst/>
@@ -12211,7 +12212,7 @@
         <p:spPr>
           <a:xfrm>
             <a:off x="3950640" y="5903280"/>
-            <a:ext cx="3632400" cy="673920"/>
+            <a:ext cx="3632040" cy="673560"/>
           </a:xfrm>
           <a:prstGeom prst="rect">
             <a:avLst/>
@@ -12322,7 +12323,7 @@
         <p:spPr>
           <a:xfrm>
             <a:off x="685800" y="2514600"/>
-            <a:ext cx="8871840" cy="3838320"/>
+            <a:ext cx="8871480" cy="3837960"/>
           </a:xfrm>
           <a:prstGeom prst="rect">
             <a:avLst/>
@@ -12341,7 +12342,7 @@
         <p:spPr>
           <a:xfrm>
             <a:off x="335520" y="764640"/>
-            <a:ext cx="10744920" cy="495720"/>
+            <a:ext cx="10744560" cy="495360"/>
           </a:xfrm>
           <a:prstGeom prst="rect">
             <a:avLst/>
@@ -12392,7 +12393,7 @@
         <p:spPr>
           <a:xfrm>
             <a:off x="494640" y="1312200"/>
-            <a:ext cx="1734840" cy="366120"/>
+            <a:ext cx="1734480" cy="365760"/>
           </a:xfrm>
           <a:prstGeom prst="rect">
             <a:avLst/>
@@ -12568,7 +12569,7 @@
         <p:spPr>
           <a:xfrm>
             <a:off x="642600" y="1679400"/>
-            <a:ext cx="4401720" cy="638280"/>
+            <a:ext cx="4401360" cy="638280"/>
           </a:xfrm>
           <a:prstGeom prst="rect">
             <a:avLst/>
@@ -12639,7 +12640,7 @@
         <p:spPr>
           <a:xfrm>
             <a:off x="6549480" y="1679400"/>
-            <a:ext cx="4875480" cy="632160"/>
+            <a:ext cx="4875120" cy="631800"/>
           </a:xfrm>
           <a:prstGeom prst="rect">
             <a:avLst/>
@@ -12710,7 +12711,7 @@
         <p:spPr>
           <a:xfrm>
             <a:off x="7839360" y="1679400"/>
-            <a:ext cx="2616840" cy="429480"/>
+            <a:ext cx="2616480" cy="429120"/>
           </a:xfrm>
           <a:prstGeom prst="rect">
             <a:avLst/>
@@ -12761,7 +12762,7 @@
         <p:spPr>
           <a:xfrm>
             <a:off x="8857440" y="3943440"/>
-            <a:ext cx="281520" cy="363960"/>
+            <a:ext cx="281160" cy="363960"/>
           </a:xfrm>
           <a:prstGeom prst="rect">
             <a:avLst/>
@@ -12812,7 +12813,7 @@
         <p:spPr>
           <a:xfrm>
             <a:off x="9537840" y="4548960"/>
-            <a:ext cx="281520" cy="363960"/>
+            <a:ext cx="281160" cy="363960"/>
           </a:xfrm>
           <a:prstGeom prst="rect">
             <a:avLst/>
@@ -12863,7 +12864,7 @@
         <p:spPr>
           <a:xfrm>
             <a:off x="7279920" y="6101280"/>
-            <a:ext cx="281880" cy="363960"/>
+            <a:ext cx="281520" cy="363960"/>
           </a:xfrm>
           <a:prstGeom prst="rect">
             <a:avLst/>
@@ -12949,7 +12950,7 @@
         <p:spPr>
           <a:xfrm>
             <a:off x="1058760" y="6130800"/>
-            <a:ext cx="281880" cy="363960"/>
+            <a:ext cx="281520" cy="363960"/>
           </a:xfrm>
           <a:prstGeom prst="rect">
             <a:avLst/>
@@ -13030,7 +13031,7 @@
         <p:spPr>
           <a:xfrm>
             <a:off x="335520" y="764640"/>
-            <a:ext cx="10744920" cy="495720"/>
+            <a:ext cx="10744560" cy="495360"/>
           </a:xfrm>
           <a:prstGeom prst="rect">
             <a:avLst/>
@@ -13081,7 +13082,7 @@
         <p:spPr>
           <a:xfrm>
             <a:off x="335520" y="1268640"/>
-            <a:ext cx="10744920" cy="5032440"/>
+            <a:ext cx="10744560" cy="5032080"/>
           </a:xfrm>
           <a:prstGeom prst="rect">
             <a:avLst/>
@@ -13102,7 +13103,7 @@
             <a:noAutofit/>
           </a:bodyPr>
           <a:p>
-            <a:pPr marL="216000" indent="-214560">
+            <a:pPr marL="216000" indent="-214200">
               <a:lnSpc>
                 <a:spcPct val="100000"/>
               </a:lnSpc>
@@ -13131,7 +13132,7 @@
             </a:endParaRPr>
           </a:p>
           <a:p>
-            <a:pPr lvl="1" marL="432000" indent="-214560">
+            <a:pPr lvl="1" marL="432000" indent="-214200">
               <a:lnSpc>
                 <a:spcPct val="100000"/>
               </a:lnSpc>
@@ -13173,7 +13174,7 @@
             </a:endParaRPr>
           </a:p>
           <a:p>
-            <a:pPr marL="216000" indent="-214560">
+            <a:pPr marL="216000" indent="-214200">
               <a:lnSpc>
                 <a:spcPct val="100000"/>
               </a:lnSpc>
@@ -13202,7 +13203,7 @@
             </a:endParaRPr>
           </a:p>
           <a:p>
-            <a:pPr lvl="1" marL="432000" indent="-214560">
+            <a:pPr lvl="1" marL="432000" indent="-214200">
               <a:lnSpc>
                 <a:spcPct val="100000"/>
               </a:lnSpc>
@@ -13241,7 +13242,7 @@
             </a:endParaRPr>
           </a:p>
           <a:p>
-            <a:pPr lvl="1" marL="432000" indent="-214560">
+            <a:pPr lvl="1" marL="432000" indent="-214200">
               <a:lnSpc>
                 <a:spcPct val="100000"/>
               </a:lnSpc>
@@ -13270,7 +13271,7 @@
             </a:endParaRPr>
           </a:p>
           <a:p>
-            <a:pPr lvl="1" marL="432000" indent="-214560">
+            <a:pPr lvl="1" marL="432000" indent="-214200">
               <a:lnSpc>
                 <a:spcPct val="100000"/>
               </a:lnSpc>
@@ -13352,7 +13353,7 @@
         <p:spPr>
           <a:xfrm>
             <a:off x="335520" y="764640"/>
-            <a:ext cx="10743120" cy="493920"/>
+            <a:ext cx="10742760" cy="493560"/>
           </a:xfrm>
           <a:prstGeom prst="rect">
             <a:avLst/>
@@ -13403,7 +13404,7 @@
         <p:spPr>
           <a:xfrm>
             <a:off x="335520" y="1268280"/>
-            <a:ext cx="10743120" cy="5030640"/>
+            <a:ext cx="10742760" cy="5030280"/>
           </a:xfrm>
           <a:prstGeom prst="rect">
             <a:avLst/>
@@ -13437,7 +13438,7 @@
             </a:endParaRPr>
           </a:p>
           <a:p>
-            <a:pPr marL="195120" indent="-189000">
+            <a:pPr marL="195120" indent="-188640">
               <a:lnSpc>
                 <a:spcPct val="100000"/>
               </a:lnSpc>
@@ -13493,7 +13494,7 @@
         <p:spPr>
           <a:xfrm>
             <a:off x="6285600" y="2132640"/>
-            <a:ext cx="512640" cy="492480"/>
+            <a:ext cx="512280" cy="492120"/>
           </a:xfrm>
           <a:prstGeom prst="star5">
             <a:avLst>
@@ -13535,7 +13536,7 @@
         <p:spPr>
           <a:xfrm>
             <a:off x="4089960" y="2247480"/>
-            <a:ext cx="2280960" cy="363960"/>
+            <a:ext cx="2280600" cy="363960"/>
           </a:xfrm>
           <a:prstGeom prst="rect">
             <a:avLst/>
@@ -13636,7 +13637,7 @@
         <p:spPr>
           <a:xfrm>
             <a:off x="335520" y="764640"/>
-            <a:ext cx="10743120" cy="493920"/>
+            <a:ext cx="10742760" cy="493560"/>
           </a:xfrm>
           <a:prstGeom prst="rect">
             <a:avLst/>
@@ -13687,7 +13688,7 @@
         <p:spPr>
           <a:xfrm>
             <a:off x="335520" y="1268640"/>
-            <a:ext cx="10743120" cy="5030640"/>
+            <a:ext cx="10742760" cy="5030280"/>
           </a:xfrm>
           <a:prstGeom prst="rect">
             <a:avLst/>
@@ -13708,7 +13709,7 @@
             <a:noAutofit/>
           </a:bodyPr>
           <a:p>
-            <a:pPr marL="195120" indent="-189000">
+            <a:pPr marL="195120" indent="-188640">
               <a:lnSpc>
                 <a:spcPct val="100000"/>
               </a:lnSpc>
@@ -13770,7 +13771,7 @@
             </a:endParaRPr>
           </a:p>
           <a:p>
-            <a:pPr marL="195120" indent="-189000">
+            <a:pPr marL="195120" indent="-188640">
               <a:lnSpc>
                 <a:spcPct val="100000"/>
               </a:lnSpc>
@@ -13819,7 +13820,7 @@
             </a:endParaRPr>
           </a:p>
           <a:p>
-            <a:pPr marL="195120" indent="-189000">
+            <a:pPr marL="195120" indent="-188640">
               <a:lnSpc>
                 <a:spcPct val="100000"/>
               </a:lnSpc>
@@ -13868,7 +13869,7 @@
             </a:endParaRPr>
           </a:p>
           <a:p>
-            <a:pPr marL="195120" indent="-189000">
+            <a:pPr marL="195120" indent="-188640">
               <a:lnSpc>
                 <a:spcPct val="100000"/>
               </a:lnSpc>
@@ -13917,7 +13918,7 @@
             </a:endParaRPr>
           </a:p>
           <a:p>
-            <a:pPr marL="195120" indent="-189000">
+            <a:pPr marL="195120" indent="-188640">
               <a:lnSpc>
                 <a:spcPct val="100000"/>
               </a:lnSpc>
@@ -13966,7 +13967,7 @@
             </a:endParaRPr>
           </a:p>
           <a:p>
-            <a:pPr marL="195120" indent="-189000">
+            <a:pPr marL="195120" indent="-188640">
               <a:lnSpc>
                 <a:spcPct val="100000"/>
               </a:lnSpc>
@@ -14015,7 +14016,7 @@
             </a:endParaRPr>
           </a:p>
           <a:p>
-            <a:pPr marL="195120" indent="-189000">
+            <a:pPr marL="195120" indent="-188640">
               <a:lnSpc>
                 <a:spcPct val="100000"/>
               </a:lnSpc>
@@ -14064,7 +14065,7 @@
             </a:endParaRPr>
           </a:p>
           <a:p>
-            <a:pPr marL="195120" indent="-189000">
+            <a:pPr marL="195120" indent="-188640">
               <a:lnSpc>
                 <a:spcPct val="100000"/>
               </a:lnSpc>
@@ -14153,7 +14154,7 @@
         <p:spPr>
           <a:xfrm>
             <a:off x="335520" y="764640"/>
-            <a:ext cx="10744920" cy="495720"/>
+            <a:ext cx="10746000" cy="496800"/>
           </a:xfrm>
           <a:prstGeom prst="rect">
             <a:avLst/>
@@ -14180,7 +14181,7 @@
               </a:lnSpc>
             </a:pPr>
             <a:r>
-              <a:rPr b="1" lang="de-DE" sz="2400" spc="-1" strike="noStrike">
+              <a:rPr b="1" lang="en-US" sz="2400" spc="-1" strike="noStrike">
                 <a:solidFill>
                   <a:srgbClr val="000000"/>
                 </a:solidFill>
@@ -14204,7 +14205,7 @@
         <p:spPr>
           <a:xfrm>
             <a:off x="335520" y="1268640"/>
-            <a:ext cx="10744920" cy="5032440"/>
+            <a:ext cx="10746000" cy="5033520"/>
           </a:xfrm>
           <a:prstGeom prst="rect">
             <a:avLst/>
@@ -14225,20 +14226,7 @@
             <a:noAutofit/>
           </a:bodyPr>
           <a:p>
-            <a:pPr>
-              <a:lnSpc>
-                <a:spcPct val="100000"/>
-              </a:lnSpc>
-              <a:spcBef>
-                <a:spcPts val="360"/>
-              </a:spcBef>
-            </a:pPr>
-            <a:endParaRPr b="0" lang="en-US" sz="1800" spc="-1" strike="noStrike">
-              <a:latin typeface="Arial"/>
-            </a:endParaRPr>
-          </a:p>
-          <a:p>
-            <a:pPr marL="195120" indent="-190440">
+            <a:pPr marL="195120" indent="-188640">
               <a:lnSpc>
                 <a:spcPct val="100000"/>
               </a:lnSpc>
@@ -14248,68 +14236,46 @@
               <a:buClr>
                 <a:srgbClr val="008c4f"/>
               </a:buClr>
-              <a:buSzPct val="115000"/>
+              <a:buSzPct val="80000"/>
               <a:buFont typeface="Wingdings" charset="2"/>
               <a:buChar char=""/>
             </a:pPr>
             <a:r>
-              <a:rPr b="0" lang="de-DE" sz="1800" spc="-1" strike="noStrike">
-                <a:solidFill>
-                  <a:srgbClr val="000000"/>
-                </a:solidFill>
-                <a:latin typeface="DejaVu Sans"/>
-                <a:ea typeface="DejaVu Sans"/>
-              </a:rPr>
-              <a:t>Satoshi Nakamoto. </a:t>
-            </a:r>
-            <a:r>
-              <a:rPr b="0" i="1" lang="de-DE" sz="1800" spc="-1" strike="noStrike">
-                <a:solidFill>
-                  <a:srgbClr val="000000"/>
-                </a:solidFill>
-                <a:latin typeface="DejaVu Sans"/>
-                <a:ea typeface="DejaVu Sans"/>
-              </a:rPr>
-              <a:t>Bitcoin: A Peer-to-Peer Electronic Cash System</a:t>
-            </a:r>
-            <a:r>
-              <a:rPr b="0" lang="de-DE" sz="1800" spc="-1" strike="noStrike">
-                <a:solidFill>
-                  <a:srgbClr val="000000"/>
-                </a:solidFill>
-                <a:latin typeface="DejaVu Sans"/>
-                <a:ea typeface="DejaVu Sans"/>
-              </a:rPr>
-              <a:t> (2008) – (</a:t>
-            </a:r>
-            <a:r>
-              <a:rPr b="0" lang="de-DE" sz="1800" spc="-1" strike="noStrike" u="sng">
-                <a:solidFill>
-                  <a:srgbClr val="0000ff"/>
-                </a:solidFill>
-                <a:uFillTx/>
-                <a:latin typeface="DejaVu Sans"/>
-                <a:ea typeface="DejaVu Sans"/>
-                <a:hlinkClick r:id="rId1"/>
-              </a:rPr>
-              <a:t>Link</a:t>
-            </a:r>
-            <a:r>
-              <a:rPr b="0" lang="de-DE" sz="1800" spc="-1" strike="noStrike">
-                <a:solidFill>
-                  <a:srgbClr val="000000"/>
-                </a:solidFill>
-                <a:latin typeface="DejaVu Sans"/>
-                <a:ea typeface="DejaVu Sans"/>
-              </a:rPr>
-              <a:t>).</a:t>
+              <a:rPr b="0" lang="en-US" sz="1800" spc="-1" strike="noStrike">
+                <a:solidFill>
+                  <a:srgbClr val="000000"/>
+                </a:solidFill>
+                <a:latin typeface="DejaVu Sans"/>
+                <a:ea typeface="DejaVu Sans"/>
+              </a:rPr>
+              <a:t>(German) Stefan Rahmstorf, Hans Joachim Schellnhuber. </a:t>
+            </a:r>
+            <a:r>
+              <a:rPr b="0" i="1" lang="en-US" sz="1800" spc="-1" strike="noStrike">
+                <a:solidFill>
+                  <a:srgbClr val="000000"/>
+                </a:solidFill>
+                <a:latin typeface="DejaVu Sans"/>
+                <a:ea typeface="DejaVu Sans"/>
+              </a:rPr>
+              <a:t>Der Klimawandel</a:t>
+            </a:r>
+            <a:r>
+              <a:rPr b="0" lang="en-US" sz="1800" spc="-1" strike="noStrike">
+                <a:solidFill>
+                  <a:srgbClr val="000000"/>
+                </a:solidFill>
+                <a:latin typeface="DejaVu Sans"/>
+                <a:ea typeface="DejaVu Sans"/>
+              </a:rPr>
+              <a:t> (2019).</a:t>
             </a:r>
             <a:endParaRPr b="0" lang="en-US" sz="1800" spc="-1" strike="noStrike">
               <a:latin typeface="Arial"/>
             </a:endParaRPr>
           </a:p>
           <a:p>
-            <a:pPr marL="195120" indent="-190440">
+            <a:pPr marL="195120" indent="-188640">
               <a:lnSpc>
                 <a:spcPct val="100000"/>
               </a:lnSpc>
@@ -14319,68 +14285,46 @@
               <a:buClr>
                 <a:srgbClr val="008c4f"/>
               </a:buClr>
-              <a:buSzPct val="115000"/>
+              <a:buSzPct val="80000"/>
               <a:buFont typeface="Wingdings" charset="2"/>
               <a:buChar char=""/>
             </a:pPr>
             <a:r>
-              <a:rPr b="0" lang="de-DE" sz="1800" spc="-1" strike="noStrike">
-                <a:solidFill>
-                  <a:srgbClr val="000000"/>
-                </a:solidFill>
-                <a:latin typeface="DejaVu Sans"/>
-                <a:ea typeface="DejaVu Sans"/>
-              </a:rPr>
-              <a:t>Gavin Wood. </a:t>
-            </a:r>
-            <a:r>
-              <a:rPr b="0" i="1" lang="de-DE" sz="1800" spc="-1" strike="noStrike">
-                <a:solidFill>
-                  <a:srgbClr val="000000"/>
-                </a:solidFill>
-                <a:latin typeface="DejaVu Sans"/>
-                <a:ea typeface="DejaVu Sans"/>
-              </a:rPr>
-              <a:t>Ethereum: A Secure Decentralized Generalised Transaction Ledger</a:t>
-            </a:r>
-            <a:r>
-              <a:rPr b="0" lang="de-DE" sz="1800" spc="-1" strike="noStrike">
-                <a:solidFill>
-                  <a:srgbClr val="000000"/>
-                </a:solidFill>
-                <a:latin typeface="DejaVu Sans"/>
-                <a:ea typeface="DejaVu Sans"/>
-              </a:rPr>
-              <a:t> (2014) – (</a:t>
-            </a:r>
-            <a:r>
-              <a:rPr b="0" lang="de-DE" sz="1800" spc="-1" strike="noStrike" u="sng">
-                <a:solidFill>
-                  <a:srgbClr val="0000ff"/>
-                </a:solidFill>
-                <a:uFillTx/>
-                <a:latin typeface="DejaVu Sans"/>
-                <a:ea typeface="DejaVu Sans"/>
-                <a:hlinkClick r:id="rId2"/>
-              </a:rPr>
-              <a:t>Link</a:t>
-            </a:r>
-            <a:r>
-              <a:rPr b="0" lang="de-DE" sz="1800" spc="-1" strike="noStrike">
-                <a:solidFill>
-                  <a:srgbClr val="000000"/>
-                </a:solidFill>
-                <a:latin typeface="DejaVu Sans"/>
-                <a:ea typeface="DejaVu Sans"/>
-              </a:rPr>
-              <a:t>).</a:t>
+              <a:rPr b="0" lang="en-US" sz="1800" spc="-1" strike="noStrike">
+                <a:solidFill>
+                  <a:srgbClr val="000000"/>
+                </a:solidFill>
+                <a:latin typeface="DejaVu Sans"/>
+                <a:ea typeface="DejaVu Sans"/>
+              </a:rPr>
+              <a:t>David Archer, Stefan Rahmstorf. </a:t>
+            </a:r>
+            <a:r>
+              <a:rPr b="0" i="1" lang="en-US" sz="1800" spc="-1" strike="noStrike">
+                <a:solidFill>
+                  <a:srgbClr val="000000"/>
+                </a:solidFill>
+                <a:latin typeface="DejaVu Sans"/>
+                <a:ea typeface="DejaVu Sans"/>
+              </a:rPr>
+              <a:t>The Climate Crisis</a:t>
+            </a:r>
+            <a:r>
+              <a:rPr b="0" lang="en-US" sz="1800" spc="-1" strike="noStrike">
+                <a:solidFill>
+                  <a:srgbClr val="000000"/>
+                </a:solidFill>
+                <a:latin typeface="DejaVu Sans"/>
+                <a:ea typeface="DejaVu Sans"/>
+              </a:rPr>
+              <a:t> (2010).</a:t>
             </a:r>
             <a:endParaRPr b="0" lang="en-US" sz="1800" spc="-1" strike="noStrike">
               <a:latin typeface="Arial"/>
             </a:endParaRPr>
           </a:p>
           <a:p>
-            <a:pPr marL="195120" indent="-190440">
+            <a:pPr marL="195120" indent="-188640">
               <a:lnSpc>
                 <a:spcPct val="100000"/>
               </a:lnSpc>
@@ -14390,235 +14334,39 @@
               <a:buClr>
                 <a:srgbClr val="008c4f"/>
               </a:buClr>
-              <a:buSzPct val="115000"/>
+              <a:buSzPct val="80000"/>
               <a:buFont typeface="Wingdings" charset="2"/>
               <a:buChar char=""/>
             </a:pPr>
             <a:r>
-              <a:rPr b="0" lang="de-DE" sz="1800" spc="-1" strike="noStrike">
-                <a:solidFill>
-                  <a:srgbClr val="000000"/>
-                </a:solidFill>
-                <a:latin typeface="DejaVu Sans"/>
-                <a:ea typeface="DejaVu Sans"/>
-              </a:rPr>
-              <a:t>Andreas Schütz und Tobias Fertig. </a:t>
-            </a:r>
-            <a:r>
-              <a:rPr b="0" i="1" lang="de-DE" sz="1800" spc="-1" strike="noStrike">
-                <a:solidFill>
-                  <a:srgbClr val="000000"/>
-                </a:solidFill>
-                <a:latin typeface="DejaVu Sans"/>
-                <a:ea typeface="DejaVu Sans"/>
-              </a:rPr>
-              <a:t>Blockchain für Entwickler: Grundlagen, Programmierung, Anwendung</a:t>
-            </a:r>
-            <a:r>
-              <a:rPr b="0" lang="de-DE" sz="1800" spc="-1" strike="noStrike">
-                <a:solidFill>
-                  <a:srgbClr val="000000"/>
-                </a:solidFill>
-                <a:latin typeface="DejaVu Sans"/>
-                <a:ea typeface="DejaVu Sans"/>
-              </a:rPr>
-              <a:t> (2019).</a:t>
-            </a:r>
-            <a:endParaRPr b="0" lang="en-US" sz="1800" spc="-1" strike="noStrike">
-              <a:latin typeface="Arial"/>
-            </a:endParaRPr>
-          </a:p>
-          <a:p>
-            <a:pPr marL="195120" indent="-190440">
-              <a:lnSpc>
-                <a:spcPct val="100000"/>
-              </a:lnSpc>
-              <a:spcBef>
-                <a:spcPts val="360"/>
-              </a:spcBef>
-              <a:buClr>
-                <a:srgbClr val="008c4f"/>
-              </a:buClr>
-              <a:buSzPct val="115000"/>
-              <a:buFont typeface="Wingdings" charset="2"/>
-              <a:buChar char=""/>
-            </a:pPr>
-            <a:r>
-              <a:rPr b="0" lang="de-DE" sz="1800" spc="-1" strike="noStrike">
-                <a:solidFill>
-                  <a:srgbClr val="000000"/>
-                </a:solidFill>
-                <a:latin typeface="DejaVu Sans"/>
-                <a:ea typeface="DejaVu Sans"/>
-              </a:rPr>
-              <a:t>M.A. Khan, M.T. Quasim, F. Algarni, A. Alharthi. </a:t>
-            </a:r>
-            <a:r>
-              <a:rPr b="0" i="1" lang="de-DE" sz="1800" spc="-1" strike="noStrike">
-                <a:solidFill>
-                  <a:srgbClr val="000000"/>
-                </a:solidFill>
-                <a:latin typeface="DejaVu Sans"/>
-                <a:ea typeface="DejaVu Sans"/>
-              </a:rPr>
-              <a:t>Decentralised Internet of Things</a:t>
-            </a:r>
-            <a:r>
-              <a:rPr b="0" lang="de-DE" sz="1800" spc="-1" strike="noStrike">
-                <a:solidFill>
-                  <a:srgbClr val="000000"/>
-                </a:solidFill>
-                <a:latin typeface="DejaVu Sans"/>
-                <a:ea typeface="DejaVu Sans"/>
-              </a:rPr>
-              <a:t> (2020).</a:t>
-            </a:r>
-            <a:endParaRPr b="0" lang="en-US" sz="1800" spc="-1" strike="noStrike">
-              <a:latin typeface="Arial"/>
-            </a:endParaRPr>
-          </a:p>
-          <a:p>
-            <a:pPr marL="195120" indent="-190440">
-              <a:lnSpc>
-                <a:spcPct val="100000"/>
-              </a:lnSpc>
-              <a:spcBef>
-                <a:spcPts val="360"/>
-              </a:spcBef>
-              <a:buClr>
-                <a:srgbClr val="008c4f"/>
-              </a:buClr>
-              <a:buSzPct val="115000"/>
-              <a:buFont typeface="Wingdings" charset="2"/>
-              <a:buChar char=""/>
-            </a:pPr>
-            <a:r>
-              <a:rPr b="0" lang="de-DE" sz="1800" spc="-1" strike="noStrike">
-                <a:solidFill>
-                  <a:srgbClr val="000000"/>
-                </a:solidFill>
-                <a:latin typeface="DejaVu Sans"/>
-                <a:ea typeface="DejaVu Sans"/>
-              </a:rPr>
-              <a:t>Dimitrios Serpanos und Marilyn Claire Wolf. I</a:t>
-            </a:r>
-            <a:r>
-              <a:rPr b="0" i="1" lang="de-DE" sz="1800" spc="-1" strike="noStrike">
-                <a:solidFill>
-                  <a:srgbClr val="000000"/>
-                </a:solidFill>
-                <a:latin typeface="DejaVu Sans"/>
-                <a:ea typeface="DejaVu Sans"/>
-              </a:rPr>
-              <a:t>nternet-of-Things (IoT) Systems Architectures, Algorithms, Methodologies</a:t>
-            </a:r>
-            <a:r>
-              <a:rPr b="0" lang="de-DE" sz="1800" spc="-1" strike="noStrike">
-                <a:solidFill>
-                  <a:srgbClr val="000000"/>
-                </a:solidFill>
-                <a:latin typeface="DejaVu Sans"/>
-                <a:ea typeface="DejaVu Sans"/>
-              </a:rPr>
-              <a:t> (2018).</a:t>
-            </a:r>
-            <a:endParaRPr b="0" lang="en-US" sz="1800" spc="-1" strike="noStrike">
-              <a:latin typeface="Arial"/>
-            </a:endParaRPr>
-          </a:p>
-          <a:p>
-            <a:pPr marL="195120" indent="-190440">
-              <a:lnSpc>
-                <a:spcPct val="100000"/>
-              </a:lnSpc>
-              <a:spcBef>
-                <a:spcPts val="360"/>
-              </a:spcBef>
-              <a:buClr>
-                <a:srgbClr val="008c4f"/>
-              </a:buClr>
-              <a:buSzPct val="115000"/>
-              <a:buFont typeface="Wingdings" charset="2"/>
-              <a:buChar char=""/>
-            </a:pPr>
-            <a:r>
-              <a:rPr b="0" lang="de-DE" sz="1800" spc="-1" strike="noStrike">
-                <a:solidFill>
-                  <a:srgbClr val="000000"/>
-                </a:solidFill>
-                <a:latin typeface="DejaVu Sans"/>
-                <a:ea typeface="DejaVu Sans"/>
-              </a:rPr>
-              <a:t>Perry Lea. </a:t>
-            </a:r>
-            <a:r>
-              <a:rPr b="0" i="1" lang="de-DE" sz="1800" spc="-1" strike="noStrike">
-                <a:solidFill>
-                  <a:srgbClr val="000000"/>
-                </a:solidFill>
-                <a:latin typeface="DejaVu Sans"/>
-                <a:ea typeface="DejaVu Sans"/>
-              </a:rPr>
-              <a:t>Internet of Things for Architects: Architecting IoT solutions by implementing sensors, communication infrastructure, edge computing, analytics, and security</a:t>
-            </a:r>
-            <a:r>
-              <a:rPr b="0" lang="de-DE" sz="1800" spc="-1" strike="noStrike">
-                <a:solidFill>
-                  <a:srgbClr val="000000"/>
-                </a:solidFill>
-                <a:latin typeface="DejaVu Sans"/>
-                <a:ea typeface="DejaVu Sans"/>
-              </a:rPr>
-              <a:t> (2018).</a:t>
-            </a:r>
-            <a:endParaRPr b="0" lang="en-US" sz="1800" spc="-1" strike="noStrike">
-              <a:latin typeface="Arial"/>
-            </a:endParaRPr>
-          </a:p>
-          <a:p>
-            <a:pPr marL="195120" indent="-190440">
-              <a:lnSpc>
-                <a:spcPct val="100000"/>
-              </a:lnSpc>
-              <a:spcBef>
-                <a:spcPts val="360"/>
-              </a:spcBef>
-              <a:buClr>
-                <a:srgbClr val="008c4f"/>
-              </a:buClr>
-              <a:buSzPct val="115000"/>
-              <a:buFont typeface="Wingdings" charset="2"/>
-              <a:buChar char=""/>
-            </a:pPr>
-            <a:r>
-              <a:rPr b="0" lang="de-DE" sz="1800" spc="-1" strike="noStrike">
-                <a:solidFill>
-                  <a:srgbClr val="000000"/>
-                </a:solidFill>
-                <a:latin typeface="DejaVu Sans"/>
-                <a:ea typeface="DejaVu Sans"/>
-              </a:rPr>
-              <a:t>Dan Boneh, Amit Sahai und Brent Waters. </a:t>
-            </a:r>
-            <a:r>
-              <a:rPr b="0" i="1" lang="de-DE" sz="1800" spc="-1" strike="noStrike">
-                <a:solidFill>
-                  <a:srgbClr val="000000"/>
-                </a:solidFill>
-                <a:latin typeface="DejaVu Sans"/>
-                <a:ea typeface="DejaVu Sans"/>
-              </a:rPr>
-              <a:t>Functional Encryption: Definitions and Challenges</a:t>
-            </a:r>
-            <a:r>
-              <a:rPr b="0" lang="de-DE" sz="1800" spc="-1" strike="noStrike">
-                <a:solidFill>
-                  <a:srgbClr val="000000"/>
-                </a:solidFill>
-                <a:latin typeface="DejaVu Sans"/>
-                <a:ea typeface="DejaVu Sans"/>
-              </a:rPr>
-              <a:t> (2010).</a:t>
+              <a:rPr b="0" lang="en-US" sz="1800" spc="-1" strike="noStrike">
+                <a:solidFill>
+                  <a:srgbClr val="000000"/>
+                </a:solidFill>
+                <a:latin typeface="DejaVu Sans"/>
+                <a:ea typeface="DejaVu Sans"/>
+              </a:rPr>
+              <a:t>Gabrielle Walker, David King. </a:t>
+            </a:r>
+            <a:r>
+              <a:rPr b="0" i="1" lang="en-US" sz="1800" spc="-1" strike="noStrike">
+                <a:solidFill>
+                  <a:srgbClr val="000000"/>
+                </a:solidFill>
+                <a:latin typeface="DejaVu Sans"/>
+                <a:ea typeface="DejaVu Sans"/>
+              </a:rPr>
+              <a:t>The Hot Topic: How to Tackle Global Warming and Still Keep the Lights on</a:t>
+            </a:r>
+            <a:r>
+              <a:rPr b="0" lang="en-US" sz="1800" spc="-1" strike="noStrike">
+                <a:solidFill>
+                  <a:srgbClr val="000000"/>
+                </a:solidFill>
+                <a:latin typeface="DejaVu Sans"/>
+                <a:ea typeface="DejaVu Sans"/>
+              </a:rPr>
+              <a:t> (2008).</a:t>
             </a:r>
             <a:endParaRPr b="0" lang="en-US" sz="1800" spc="-1" strike="noStrike">
               <a:latin typeface="Arial"/>
@@ -14665,7 +14413,7 @@
         <p:spPr>
           <a:xfrm>
             <a:off x="335520" y="764640"/>
-            <a:ext cx="10743120" cy="493920"/>
+            <a:ext cx="10744560" cy="495360"/>
           </a:xfrm>
           <a:prstGeom prst="rect">
             <a:avLst/>
@@ -14692,14 +14440,14 @@
               </a:lnSpc>
             </a:pPr>
             <a:r>
-              <a:rPr b="1" lang="en-US" sz="2400" spc="-1" strike="noStrike">
-                <a:solidFill>
-                  <a:srgbClr val="000000"/>
-                </a:solidFill>
-                <a:latin typeface="DejaVu Sans"/>
-                <a:ea typeface="DejaVu Sans"/>
-              </a:rPr>
-              <a:t>Further Resources </a:t>
+              <a:rPr b="1" lang="de-DE" sz="2400" spc="-1" strike="noStrike">
+                <a:solidFill>
+                  <a:srgbClr val="000000"/>
+                </a:solidFill>
+                <a:latin typeface="DejaVu Sans"/>
+                <a:ea typeface="DejaVu Sans"/>
+              </a:rPr>
+              <a:t>Literature</a:t>
             </a:r>
             <a:endParaRPr b="0" lang="en-US" sz="2400" spc="-1" strike="noStrike">
               <a:latin typeface="Arial"/>
@@ -14716,7 +14464,7 @@
         <p:spPr>
           <a:xfrm>
             <a:off x="335520" y="1268640"/>
-            <a:ext cx="10743120" cy="5030640"/>
+            <a:ext cx="10744560" cy="5032080"/>
           </a:xfrm>
           <a:prstGeom prst="rect">
             <a:avLst/>
@@ -14737,7 +14485,20 @@
             <a:noAutofit/>
           </a:bodyPr>
           <a:p>
-            <a:pPr marL="195120" indent="-189000">
+            <a:pPr>
+              <a:lnSpc>
+                <a:spcPct val="100000"/>
+              </a:lnSpc>
+              <a:spcBef>
+                <a:spcPts val="360"/>
+              </a:spcBef>
+            </a:pPr>
+            <a:endParaRPr b="0" lang="en-US" sz="1800" spc="-1" strike="noStrike">
+              <a:latin typeface="Arial"/>
+            </a:endParaRPr>
+          </a:p>
+          <a:p>
+            <a:pPr marL="195120" indent="-190080">
               <a:lnSpc>
                 <a:spcPct val="100000"/>
               </a:lnSpc>
@@ -14747,22 +14508,42 @@
               <a:buClr>
                 <a:srgbClr val="008c4f"/>
               </a:buClr>
-              <a:buSzPct val="80000"/>
+              <a:buSzPct val="115000"/>
               <a:buFont typeface="Wingdings" charset="2"/>
               <a:buChar char=""/>
             </a:pPr>
             <a:r>
-              <a:rPr b="0" lang="en-US" sz="1800" spc="-1" strike="noStrike">
-                <a:solidFill>
-                  <a:srgbClr val="000000"/>
-                </a:solidFill>
-                <a:latin typeface="DejaVu Sans"/>
-                <a:ea typeface="DejaVu Sans"/>
-              </a:rPr>
-              <a:t>Climate University – Teaching and learning for a sustainable future – </a:t>
-            </a:r>
-            <a:r>
-              <a:rPr b="0" lang="en-US" sz="1800" spc="-1" strike="noStrike" u="sng">
+              <a:rPr b="0" lang="de-DE" sz="1800" spc="-1" strike="noStrike">
+                <a:solidFill>
+                  <a:srgbClr val="000000"/>
+                </a:solidFill>
+                <a:latin typeface="DejaVu Sans"/>
+                <a:ea typeface="DejaVu Sans"/>
+              </a:rPr>
+              <a:t>Satoshi Nakamoto. </a:t>
+            </a:r>
+            <a:r>
+              <a:rPr b="0" i="1" lang="de-DE" sz="1800" spc="-1" strike="noStrike">
+                <a:solidFill>
+                  <a:srgbClr val="000000"/>
+                </a:solidFill>
+                <a:latin typeface="DejaVu Sans"/>
+                <a:ea typeface="DejaVu Sans"/>
+              </a:rPr>
+              <a:t>Bitcoin: A Peer-to-Peer Electronic Cash System</a:t>
+            </a:r>
+            <a:r>
+              <a:rPr b="0" lang="de-DE" sz="1800" spc="-1" strike="noStrike">
+                <a:solidFill>
+                  <a:srgbClr val="000000"/>
+                </a:solidFill>
+                <a:latin typeface="DejaVu Sans"/>
+                <a:ea typeface="DejaVu Sans"/>
+              </a:rPr>
+              <a:t> (2008) – (</a:t>
+            </a:r>
+            <a:r>
+              <a:rPr b="0" lang="de-DE" sz="1800" spc="-1" strike="noStrike" u="sng">
                 <a:solidFill>
                   <a:srgbClr val="0000ff"/>
                 </a:solidFill>
@@ -14773,12 +14554,22 @@
               </a:rPr>
               <a:t>Link</a:t>
             </a:r>
+            <a:r>
+              <a:rPr b="0" lang="de-DE" sz="1800" spc="-1" strike="noStrike">
+                <a:solidFill>
+                  <a:srgbClr val="000000"/>
+                </a:solidFill>
+                <a:latin typeface="DejaVu Sans"/>
+                <a:ea typeface="DejaVu Sans"/>
+              </a:rPr>
+              <a:t>).</a:t>
+            </a:r>
             <a:endParaRPr b="0" lang="en-US" sz="1800" spc="-1" strike="noStrike">
               <a:latin typeface="Arial"/>
             </a:endParaRPr>
           </a:p>
           <a:p>
-            <a:pPr marL="195120" indent="-189000">
+            <a:pPr marL="195120" indent="-190080">
               <a:lnSpc>
                 <a:spcPct val="100000"/>
               </a:lnSpc>
@@ -14788,22 +14579,42 @@
               <a:buClr>
                 <a:srgbClr val="008c4f"/>
               </a:buClr>
-              <a:buSzPct val="80000"/>
+              <a:buSzPct val="115000"/>
               <a:buFont typeface="Wingdings" charset="2"/>
               <a:buChar char=""/>
             </a:pPr>
             <a:r>
-              <a:rPr b="0" lang="en-US" sz="1800" spc="-1" strike="noStrike">
-                <a:solidFill>
-                  <a:srgbClr val="000000"/>
-                </a:solidFill>
-                <a:latin typeface="DejaVu Sans"/>
-                <a:ea typeface="DejaVu Sans"/>
-              </a:rPr>
-              <a:t>Circular Societies (German) – </a:t>
-            </a:r>
-            <a:r>
-              <a:rPr b="0" lang="en-US" sz="1800" spc="-1" strike="noStrike" u="sng">
+              <a:rPr b="0" lang="de-DE" sz="1800" spc="-1" strike="noStrike">
+                <a:solidFill>
+                  <a:srgbClr val="000000"/>
+                </a:solidFill>
+                <a:latin typeface="DejaVu Sans"/>
+                <a:ea typeface="DejaVu Sans"/>
+              </a:rPr>
+              <a:t>Gavin Wood. </a:t>
+            </a:r>
+            <a:r>
+              <a:rPr b="0" i="1" lang="de-DE" sz="1800" spc="-1" strike="noStrike">
+                <a:solidFill>
+                  <a:srgbClr val="000000"/>
+                </a:solidFill>
+                <a:latin typeface="DejaVu Sans"/>
+                <a:ea typeface="DejaVu Sans"/>
+              </a:rPr>
+              <a:t>Ethereum: A Secure Decentralized Generalised Transaction Ledger</a:t>
+            </a:r>
+            <a:r>
+              <a:rPr b="0" lang="de-DE" sz="1800" spc="-1" strike="noStrike">
+                <a:solidFill>
+                  <a:srgbClr val="000000"/>
+                </a:solidFill>
+                <a:latin typeface="DejaVu Sans"/>
+                <a:ea typeface="DejaVu Sans"/>
+              </a:rPr>
+              <a:t> (2014) – (</a:t>
+            </a:r>
+            <a:r>
+              <a:rPr b="0" lang="de-DE" sz="1800" spc="-1" strike="noStrike" u="sng">
                 <a:solidFill>
                   <a:srgbClr val="0000ff"/>
                 </a:solidFill>
@@ -14815,21 +14626,21 @@
               <a:t>Link</a:t>
             </a:r>
             <a:r>
-              <a:rPr b="0" lang="en-US" sz="1800" spc="-1" strike="noStrike">
-                <a:solidFill>
-                  <a:srgbClr val="000000"/>
-                </a:solidFill>
-                <a:latin typeface="DejaVu Sans"/>
-                <a:ea typeface="DejaVu Sans"/>
-              </a:rPr>
-              <a:t> </a:t>
+              <a:rPr b="0" lang="de-DE" sz="1800" spc="-1" strike="noStrike">
+                <a:solidFill>
+                  <a:srgbClr val="000000"/>
+                </a:solidFill>
+                <a:latin typeface="DejaVu Sans"/>
+                <a:ea typeface="DejaVu Sans"/>
+              </a:rPr>
+              <a:t>).</a:t>
             </a:r>
             <a:endParaRPr b="0" lang="en-US" sz="1800" spc="-1" strike="noStrike">
               <a:latin typeface="Arial"/>
             </a:endParaRPr>
           </a:p>
           <a:p>
-            <a:pPr marL="195120" indent="-189000">
+            <a:pPr marL="195120" indent="-190080">
               <a:lnSpc>
                 <a:spcPct val="100000"/>
               </a:lnSpc>
@@ -14839,38 +14650,46 @@
               <a:buClr>
                 <a:srgbClr val="008c4f"/>
               </a:buClr>
-              <a:buSzPct val="80000"/>
+              <a:buSzPct val="115000"/>
               <a:buFont typeface="Wingdings" charset="2"/>
               <a:buChar char=""/>
             </a:pPr>
             <a:r>
-              <a:rPr b="0" lang="en-US" sz="1800" spc="-1" strike="noStrike">
-                <a:solidFill>
-                  <a:srgbClr val="000000"/>
-                </a:solidFill>
-                <a:latin typeface="DejaVu Sans"/>
-                <a:ea typeface="DejaVu Sans"/>
-              </a:rPr>
-              <a:t>Server Infrastructure for a Global Rebellion – </a:t>
-            </a:r>
-            <a:r>
-              <a:rPr b="0" lang="en-US" sz="1800" spc="-1" strike="noStrike" u="sng">
-                <a:solidFill>
-                  <a:srgbClr val="0000ff"/>
-                </a:solidFill>
-                <a:uFillTx/>
-                <a:latin typeface="DejaVu Sans"/>
-                <a:ea typeface="DejaVu Sans"/>
-                <a:hlinkClick r:id="rId3"/>
-              </a:rPr>
-              <a:t>Link</a:t>
+              <a:rPr b="0" lang="de-DE" sz="1800" spc="-1" strike="noStrike">
+                <a:solidFill>
+                  <a:srgbClr val="000000"/>
+                </a:solidFill>
+                <a:latin typeface="DejaVu Sans"/>
+                <a:ea typeface="DejaVu Sans"/>
+              </a:rPr>
+              <a:t>Andreas Schütz und Tobias Fertig. </a:t>
+            </a:r>
+            <a:r>
+              <a:rPr b="0" i="1" lang="de-DE" sz="1800" spc="-1" strike="noStrike">
+                <a:solidFill>
+                  <a:srgbClr val="000000"/>
+                </a:solidFill>
+                <a:latin typeface="DejaVu Sans"/>
+                <a:ea typeface="DejaVu Sans"/>
+              </a:rPr>
+              <a:t>Blockchain für Entwickler: Grundlagen, Programmierung, Anwendung</a:t>
+            </a:r>
+            <a:r>
+              <a:rPr b="0" lang="de-DE" sz="1800" spc="-1" strike="noStrike">
+                <a:solidFill>
+                  <a:srgbClr val="000000"/>
+                </a:solidFill>
+                <a:latin typeface="DejaVu Sans"/>
+                <a:ea typeface="DejaVu Sans"/>
+              </a:rPr>
+              <a:t> (2019).</a:t>
             </a:r>
             <a:endParaRPr b="0" lang="en-US" sz="1800" spc="-1" strike="noStrike">
               <a:latin typeface="Arial"/>
             </a:endParaRPr>
           </a:p>
           <a:p>
-            <a:pPr marL="195120" indent="-189000">
+            <a:pPr marL="195120" indent="-190080">
               <a:lnSpc>
                 <a:spcPct val="100000"/>
               </a:lnSpc>
@@ -14880,74 +14699,95 @@
               <a:buClr>
                 <a:srgbClr val="008c4f"/>
               </a:buClr>
-              <a:buSzPct val="80000"/>
+              <a:buSzPct val="115000"/>
               <a:buFont typeface="Wingdings" charset="2"/>
               <a:buChar char=""/>
             </a:pPr>
             <a:r>
-              <a:rPr b="0" lang="en-US" sz="1800" spc="-1" strike="noStrike">
-                <a:solidFill>
-                  <a:srgbClr val="000000"/>
-                </a:solidFill>
-                <a:latin typeface="DejaVu Sans"/>
-                <a:ea typeface="DejaVu Sans"/>
-              </a:rPr>
-              <a:t>Podcasts:</a:t>
+              <a:rPr b="0" lang="de-DE" sz="1800" spc="-1" strike="noStrike">
+                <a:solidFill>
+                  <a:srgbClr val="000000"/>
+                </a:solidFill>
+                <a:latin typeface="DejaVu Sans"/>
+                <a:ea typeface="DejaVu Sans"/>
+              </a:rPr>
+              <a:t>M.A. Khan, M.T. Quasim, F. Algarni, A. Alharthi. </a:t>
+            </a:r>
+            <a:r>
+              <a:rPr b="0" i="1" lang="de-DE" sz="1800" spc="-1" strike="noStrike">
+                <a:solidFill>
+                  <a:srgbClr val="000000"/>
+                </a:solidFill>
+                <a:latin typeface="DejaVu Sans"/>
+                <a:ea typeface="DejaVu Sans"/>
+              </a:rPr>
+              <a:t>Decentralised Internet of Things</a:t>
+            </a:r>
+            <a:r>
+              <a:rPr b="0" lang="de-DE" sz="1800" spc="-1" strike="noStrike">
+                <a:solidFill>
+                  <a:srgbClr val="000000"/>
+                </a:solidFill>
+                <a:latin typeface="DejaVu Sans"/>
+                <a:ea typeface="DejaVu Sans"/>
+              </a:rPr>
+              <a:t> (2020).</a:t>
             </a:r>
             <a:endParaRPr b="0" lang="en-US" sz="1800" spc="-1" strike="noStrike">
               <a:latin typeface="Arial"/>
             </a:endParaRPr>
           </a:p>
           <a:p>
-            <a:pPr lvl="1" marL="432000" indent="-215280">
-              <a:lnSpc>
-                <a:spcPct val="100000"/>
-              </a:lnSpc>
+            <a:pPr marL="195120" indent="-190080">
+              <a:lnSpc>
+                <a:spcPct val="100000"/>
+              </a:lnSpc>
+              <a:spcBef>
+                <a:spcPts val="360"/>
+              </a:spcBef>
               <a:buClr>
                 <a:srgbClr val="008c4f"/>
               </a:buClr>
-              <a:buSzPct val="45000"/>
-              <a:buFont typeface="OpenSymbol"/>
-              <a:buChar char="—"/>
-            </a:pPr>
-            <a:r>
-              <a:rPr b="0" lang="en-US" sz="1800" spc="-1" strike="noStrike">
-                <a:solidFill>
-                  <a:srgbClr val="000000"/>
-                </a:solidFill>
-                <a:latin typeface="DejaVu Sans"/>
-                <a:ea typeface="DejaVu Sans"/>
-              </a:rPr>
-              <a:t>Drilled (</a:t>
-            </a:r>
-            <a:r>
-              <a:rPr b="0" lang="en-US" sz="1800" spc="-1" strike="noStrike" u="sng">
-                <a:solidFill>
-                  <a:srgbClr val="0000ff"/>
-                </a:solidFill>
-                <a:uFillTx/>
-                <a:latin typeface="DejaVu Sans"/>
-                <a:ea typeface="DejaVu Sans"/>
-                <a:hlinkClick r:id="rId4"/>
-              </a:rPr>
-              <a:t>Link</a:t>
-            </a:r>
-            <a:r>
-              <a:rPr b="0" lang="en-US" sz="1800" spc="-1" strike="noStrike">
-                <a:solidFill>
-                  <a:srgbClr val="000000"/>
-                </a:solidFill>
-                <a:latin typeface="DejaVu Sans"/>
-                <a:ea typeface="DejaVu Sans"/>
-              </a:rPr>
-              <a:t>)</a:t>
+              <a:buSzPct val="115000"/>
+              <a:buFont typeface="Wingdings" charset="2"/>
+              <a:buChar char=""/>
+            </a:pPr>
+            <a:r>
+              <a:rPr b="0" lang="de-DE" sz="1800" spc="-1" strike="noStrike">
+                <a:solidFill>
+                  <a:srgbClr val="000000"/>
+                </a:solidFill>
+                <a:latin typeface="DejaVu Sans"/>
+                <a:ea typeface="DejaVu Sans"/>
+              </a:rPr>
+              <a:t>Dimitrios Serpanos und Marilyn Claire Wolf. I</a:t>
+            </a:r>
+            <a:r>
+              <a:rPr b="0" i="1" lang="de-DE" sz="1800" spc="-1" strike="noStrike">
+                <a:solidFill>
+                  <a:srgbClr val="000000"/>
+                </a:solidFill>
+                <a:latin typeface="DejaVu Sans"/>
+                <a:ea typeface="DejaVu Sans"/>
+              </a:rPr>
+              <a:t>nternet-of-Things (IoT) Systems Architectures, Algorithms, Methodologies</a:t>
+            </a:r>
+            <a:r>
+              <a:rPr b="0" lang="de-DE" sz="1800" spc="-1" strike="noStrike">
+                <a:solidFill>
+                  <a:srgbClr val="000000"/>
+                </a:solidFill>
+                <a:latin typeface="DejaVu Sans"/>
+                <a:ea typeface="DejaVu Sans"/>
+              </a:rPr>
+              <a:t> (2018).</a:t>
             </a:r>
             <a:endParaRPr b="0" lang="en-US" sz="1800" spc="-1" strike="noStrike">
               <a:latin typeface="Arial"/>
             </a:endParaRPr>
           </a:p>
           <a:p>
-            <a:pPr lvl="1" marL="432000" indent="-215280">
+            <a:pPr marL="195120" indent="-190080">
               <a:lnSpc>
                 <a:spcPct val="100000"/>
               </a:lnSpc>
@@ -14957,48 +14797,46 @@
               <a:buClr>
                 <a:srgbClr val="008c4f"/>
               </a:buClr>
-              <a:buSzPct val="45000"/>
-              <a:buFont typeface="OpenSymbol"/>
-              <a:buChar char="—"/>
-            </a:pPr>
-            <a:r>
-              <a:rPr b="0" lang="en-US" sz="1800" spc="-1" strike="noStrike">
-                <a:solidFill>
-                  <a:srgbClr val="000000"/>
-                </a:solidFill>
-                <a:latin typeface="DejaVu Sans"/>
-                <a:ea typeface="DejaVu Sans"/>
-              </a:rPr>
-              <a:t>How to Save a Planet (</a:t>
-            </a:r>
-            <a:r>
-              <a:rPr b="0" lang="en-US" sz="1800" spc="-1" strike="noStrike" u="sng">
-                <a:solidFill>
-                  <a:srgbClr val="0000ff"/>
-                </a:solidFill>
-                <a:uFillTx/>
-                <a:latin typeface="DejaVu Sans"/>
-                <a:ea typeface="DejaVu Sans"/>
-                <a:hlinkClick r:id="rId5"/>
-              </a:rPr>
-              <a:t>Link</a:t>
-            </a:r>
-            <a:r>
-              <a:rPr b="0" lang="en-US" sz="1800" spc="-1" strike="noStrike">
-                <a:solidFill>
-                  <a:srgbClr val="000000"/>
-                </a:solidFill>
-                <a:latin typeface="DejaVu Sans"/>
-                <a:ea typeface="DejaVu Sans"/>
-              </a:rPr>
-              <a:t>)</a:t>
+              <a:buSzPct val="115000"/>
+              <a:buFont typeface="Wingdings" charset="2"/>
+              <a:buChar char=""/>
+            </a:pPr>
+            <a:r>
+              <a:rPr b="0" lang="de-DE" sz="1800" spc="-1" strike="noStrike">
+                <a:solidFill>
+                  <a:srgbClr val="000000"/>
+                </a:solidFill>
+                <a:latin typeface="DejaVu Sans"/>
+                <a:ea typeface="DejaVu Sans"/>
+              </a:rPr>
+              <a:t>Perry Lea. </a:t>
+            </a:r>
+            <a:r>
+              <a:rPr b="0" i="1" lang="de-DE" sz="1800" spc="-1" strike="noStrike">
+                <a:solidFill>
+                  <a:srgbClr val="000000"/>
+                </a:solidFill>
+                <a:latin typeface="DejaVu Sans"/>
+                <a:ea typeface="DejaVu Sans"/>
+              </a:rPr>
+              <a:t>Internet of Things for Architects: Architecting IoT solutions by implementing sensors, communication infrastructure, edge computing, analytics, and security</a:t>
+            </a:r>
+            <a:r>
+              <a:rPr b="0" lang="de-DE" sz="1800" spc="-1" strike="noStrike">
+                <a:solidFill>
+                  <a:srgbClr val="000000"/>
+                </a:solidFill>
+                <a:latin typeface="DejaVu Sans"/>
+                <a:ea typeface="DejaVu Sans"/>
+              </a:rPr>
+              <a:t> (2018).</a:t>
             </a:r>
             <a:endParaRPr b="0" lang="en-US" sz="1800" spc="-1" strike="noStrike">
               <a:latin typeface="Arial"/>
             </a:endParaRPr>
           </a:p>
           <a:p>
-            <a:pPr lvl="1" marL="432000" indent="-215280">
+            <a:pPr marL="195120" indent="-190080">
               <a:lnSpc>
                 <a:spcPct val="100000"/>
               </a:lnSpc>
@@ -15008,41 +14846,39 @@
               <a:buClr>
                 <a:srgbClr val="008c4f"/>
               </a:buClr>
-              <a:buSzPct val="45000"/>
-              <a:buFont typeface="OpenSymbol"/>
-              <a:buChar char="—"/>
-            </a:pPr>
-            <a:r>
-              <a:rPr b="0" lang="en-US" sz="1800" spc="-1" strike="noStrike">
-                <a:solidFill>
-                  <a:srgbClr val="000000"/>
-                </a:solidFill>
-                <a:latin typeface="DejaVu Sans"/>
-                <a:ea typeface="DejaVu Sans"/>
-              </a:rPr>
-              <a:t>1,5 Grad – der Klima-Podcast mit Luisa Neubauer (German) (</a:t>
-            </a:r>
-            <a:r>
-              <a:rPr b="0" lang="en-US" sz="1800" spc="-1" strike="noStrike" u="sng">
-                <a:solidFill>
-                  <a:srgbClr val="0000ff"/>
-                </a:solidFill>
-                <a:uFillTx/>
-                <a:latin typeface="DejaVu Sans"/>
-                <a:ea typeface="DejaVu Sans"/>
-                <a:hlinkClick r:id="rId6"/>
-              </a:rPr>
-              <a:t>Link</a:t>
-            </a:r>
-            <a:r>
-              <a:rPr b="0" lang="en-US" sz="1800" spc="-1" strike="noStrike">
-                <a:solidFill>
-                  <a:srgbClr val="000000"/>
-                </a:solidFill>
-                <a:latin typeface="DejaVu Sans"/>
-                <a:ea typeface="DejaVu Sans"/>
-              </a:rPr>
-              <a:t>)</a:t>
+              <a:buSzPct val="115000"/>
+              <a:buFont typeface="Wingdings" charset="2"/>
+              <a:buChar char=""/>
+            </a:pPr>
+            <a:r>
+              <a:rPr b="0" lang="de-DE" sz="1800" spc="-1" strike="noStrike">
+                <a:solidFill>
+                  <a:srgbClr val="000000"/>
+                </a:solidFill>
+                <a:latin typeface="DejaVu Sans"/>
+                <a:ea typeface="DejaVu Sans"/>
+              </a:rPr>
+              <a:t>Dan Boneh, Amit Sahai und Brent Waters. </a:t>
+            </a:r>
+            <a:r>
+              <a:rPr b="0" i="1" lang="de-DE" sz="1800" spc="-1" strike="noStrike">
+                <a:solidFill>
+                  <a:srgbClr val="000000"/>
+                </a:solidFill>
+                <a:latin typeface="DejaVu Sans"/>
+                <a:ea typeface="DejaVu Sans"/>
+              </a:rPr>
+              <a:t>Functional Encryption: Definitions and Challenges</a:t>
+            </a:r>
+            <a:r>
+              <a:rPr b="0" lang="de-DE" sz="1800" spc="-1" strike="noStrike">
+                <a:solidFill>
+                  <a:srgbClr val="000000"/>
+                </a:solidFill>
+                <a:latin typeface="DejaVu Sans"/>
+                <a:ea typeface="DejaVu Sans"/>
+              </a:rPr>
+              <a:t> (2010).</a:t>
             </a:r>
             <a:endParaRPr b="0" lang="en-US" sz="1800" spc="-1" strike="noStrike">
               <a:latin typeface="Arial"/>
@@ -15088,8 +14924,59 @@
         </p:nvSpPr>
         <p:spPr>
           <a:xfrm>
+            <a:off x="335520" y="764640"/>
+            <a:ext cx="10742760" cy="493560"/>
+          </a:xfrm>
+          <a:prstGeom prst="rect">
+            <a:avLst/>
+          </a:prstGeom>
+          <a:noFill/>
+          <a:ln>
+            <a:noFill/>
+          </a:ln>
+        </p:spPr>
+        <p:style>
+          <a:lnRef idx="0"/>
+          <a:fillRef idx="0"/>
+          <a:effectRef idx="0"/>
+          <a:fontRef idx="minor"/>
+        </p:style>
+        <p:txBody>
+          <a:bodyPr lIns="90000" rIns="90000" tIns="45000" bIns="45000">
+            <a:noAutofit/>
+          </a:bodyPr>
+          <a:p>
+            <a:pPr>
+              <a:lnSpc>
+                <a:spcPct val="100000"/>
+              </a:lnSpc>
+            </a:pPr>
+            <a:r>
+              <a:rPr b="1" lang="en-US" sz="2400" spc="-1" strike="noStrike">
+                <a:solidFill>
+                  <a:srgbClr val="000000"/>
+                </a:solidFill>
+                <a:latin typeface="DejaVu Sans"/>
+                <a:ea typeface="DejaVu Sans"/>
+              </a:rPr>
+              <a:t>Further Resources </a:t>
+            </a:r>
+            <a:endParaRPr b="0" lang="en-US" sz="2400" spc="-1" strike="noStrike">
+              <a:latin typeface="Arial"/>
+            </a:endParaRPr>
+          </a:p>
+        </p:txBody>
+      </p:sp>
+      <p:sp>
+        <p:nvSpPr>
+          <p:cNvPr id="207" name="CustomShape 2"/>
+          <p:cNvSpPr/>
+          <p:nvPr/>
+        </p:nvSpPr>
+        <p:spPr>
+          <a:xfrm>
             <a:off x="335520" y="1268640"/>
-            <a:ext cx="10744920" cy="5032440"/>
+            <a:ext cx="10742760" cy="5030280"/>
           </a:xfrm>
           <a:prstGeom prst="rect">
             <a:avLst/>
@@ -15110,6 +14997,379 @@
             <a:noAutofit/>
           </a:bodyPr>
           <a:p>
+            <a:pPr marL="195120" indent="-188640">
+              <a:lnSpc>
+                <a:spcPct val="100000"/>
+              </a:lnSpc>
+              <a:spcBef>
+                <a:spcPts val="360"/>
+              </a:spcBef>
+              <a:buClr>
+                <a:srgbClr val="008c4f"/>
+              </a:buClr>
+              <a:buSzPct val="80000"/>
+              <a:buFont typeface="Wingdings" charset="2"/>
+              <a:buChar char=""/>
+            </a:pPr>
+            <a:r>
+              <a:rPr b="0" lang="en-US" sz="1800" spc="-1" strike="noStrike">
+                <a:solidFill>
+                  <a:srgbClr val="000000"/>
+                </a:solidFill>
+                <a:latin typeface="DejaVu Sans"/>
+                <a:ea typeface="DejaVu Sans"/>
+              </a:rPr>
+              <a:t>Climate University – Teaching and learning for a sustainable future – </a:t>
+            </a:r>
+            <a:r>
+              <a:rPr b="0" lang="en-US" sz="1800" spc="-1" strike="noStrike" u="sng">
+                <a:solidFill>
+                  <a:srgbClr val="0000ff"/>
+                </a:solidFill>
+                <a:uFillTx/>
+                <a:latin typeface="DejaVu Sans"/>
+                <a:ea typeface="DejaVu Sans"/>
+                <a:hlinkClick r:id="rId1"/>
+              </a:rPr>
+              <a:t>Link</a:t>
+            </a:r>
+            <a:endParaRPr b="0" lang="en-US" sz="1800" spc="-1" strike="noStrike">
+              <a:latin typeface="Arial"/>
+            </a:endParaRPr>
+          </a:p>
+          <a:p>
+            <a:pPr marL="195120" indent="-188640">
+              <a:lnSpc>
+                <a:spcPct val="100000"/>
+              </a:lnSpc>
+              <a:spcBef>
+                <a:spcPts val="360"/>
+              </a:spcBef>
+              <a:buClr>
+                <a:srgbClr val="008c4f"/>
+              </a:buClr>
+              <a:buSzPct val="80000"/>
+              <a:buFont typeface="Wingdings" charset="2"/>
+              <a:buChar char=""/>
+            </a:pPr>
+            <a:r>
+              <a:rPr b="0" lang="en-US" sz="1800" spc="-1" strike="noStrike">
+                <a:solidFill>
+                  <a:srgbClr val="000000"/>
+                </a:solidFill>
+                <a:latin typeface="DejaVu Sans"/>
+                <a:ea typeface="DejaVu Sans"/>
+              </a:rPr>
+              <a:t>Circular Societies (German) – </a:t>
+            </a:r>
+            <a:r>
+              <a:rPr b="0" lang="en-US" sz="1800" spc="-1" strike="noStrike" u="sng">
+                <a:solidFill>
+                  <a:srgbClr val="0000ff"/>
+                </a:solidFill>
+                <a:uFillTx/>
+                <a:latin typeface="DejaVu Sans"/>
+                <a:ea typeface="DejaVu Sans"/>
+                <a:hlinkClick r:id="rId2"/>
+              </a:rPr>
+              <a:t>Link</a:t>
+            </a:r>
+            <a:r>
+              <a:rPr b="0" lang="en-US" sz="1800" spc="-1" strike="noStrike">
+                <a:solidFill>
+                  <a:srgbClr val="000000"/>
+                </a:solidFill>
+                <a:latin typeface="DejaVu Sans"/>
+                <a:ea typeface="DejaVu Sans"/>
+              </a:rPr>
+              <a:t> </a:t>
+            </a:r>
+            <a:endParaRPr b="0" lang="en-US" sz="1800" spc="-1" strike="noStrike">
+              <a:latin typeface="Arial"/>
+            </a:endParaRPr>
+          </a:p>
+          <a:p>
+            <a:pPr marL="195120" indent="-188640">
+              <a:lnSpc>
+                <a:spcPct val="100000"/>
+              </a:lnSpc>
+              <a:spcBef>
+                <a:spcPts val="360"/>
+              </a:spcBef>
+              <a:buClr>
+                <a:srgbClr val="008c4f"/>
+              </a:buClr>
+              <a:buSzPct val="80000"/>
+              <a:buFont typeface="Wingdings" charset="2"/>
+              <a:buChar char=""/>
+            </a:pPr>
+            <a:r>
+              <a:rPr b="0" lang="en-US" sz="1800" spc="-1" strike="noStrike">
+                <a:solidFill>
+                  <a:srgbClr val="000000"/>
+                </a:solidFill>
+                <a:latin typeface="DejaVu Sans"/>
+                <a:ea typeface="DejaVu Sans"/>
+              </a:rPr>
+              <a:t>Server Infrastructure for a Global Rebellion – </a:t>
+            </a:r>
+            <a:r>
+              <a:rPr b="0" lang="en-US" sz="1800" spc="-1" strike="noStrike" u="sng">
+                <a:solidFill>
+                  <a:srgbClr val="0000ff"/>
+                </a:solidFill>
+                <a:uFillTx/>
+                <a:latin typeface="DejaVu Sans"/>
+                <a:ea typeface="DejaVu Sans"/>
+                <a:hlinkClick r:id="rId3"/>
+              </a:rPr>
+              <a:t>Link</a:t>
+            </a:r>
+            <a:endParaRPr b="0" lang="en-US" sz="1800" spc="-1" strike="noStrike">
+              <a:latin typeface="Arial"/>
+            </a:endParaRPr>
+          </a:p>
+          <a:p>
+            <a:pPr marL="195120" indent="-188640">
+              <a:lnSpc>
+                <a:spcPct val="100000"/>
+              </a:lnSpc>
+              <a:spcBef>
+                <a:spcPts val="360"/>
+              </a:spcBef>
+              <a:buClr>
+                <a:srgbClr val="008c4f"/>
+              </a:buClr>
+              <a:buSzPct val="80000"/>
+              <a:buFont typeface="Wingdings" charset="2"/>
+              <a:buChar char=""/>
+            </a:pPr>
+            <a:r>
+              <a:rPr b="0" lang="en-US" sz="1800" spc="-1" strike="noStrike">
+                <a:solidFill>
+                  <a:srgbClr val="000000"/>
+                </a:solidFill>
+                <a:latin typeface="DejaVu Sans"/>
+                <a:ea typeface="DejaVu Sans"/>
+              </a:rPr>
+              <a:t>Podcasts:</a:t>
+            </a:r>
+            <a:endParaRPr b="0" lang="en-US" sz="1800" spc="-1" strike="noStrike">
+              <a:latin typeface="Arial"/>
+            </a:endParaRPr>
+          </a:p>
+          <a:p>
+            <a:pPr lvl="1" marL="432000" indent="-214920">
+              <a:lnSpc>
+                <a:spcPct val="100000"/>
+              </a:lnSpc>
+              <a:buClr>
+                <a:srgbClr val="008c4f"/>
+              </a:buClr>
+              <a:buSzPct val="45000"/>
+              <a:buFont typeface="OpenSymbol"/>
+              <a:buChar char="—"/>
+            </a:pPr>
+            <a:r>
+              <a:rPr b="0" lang="en-US" sz="1800" spc="-1" strike="noStrike">
+                <a:solidFill>
+                  <a:srgbClr val="000000"/>
+                </a:solidFill>
+                <a:latin typeface="DejaVu Sans"/>
+                <a:ea typeface="DejaVu Sans"/>
+              </a:rPr>
+              <a:t>Drilled (</a:t>
+            </a:r>
+            <a:r>
+              <a:rPr b="0" lang="en-US" sz="1800" spc="-1" strike="noStrike" u="sng">
+                <a:solidFill>
+                  <a:srgbClr val="0000ff"/>
+                </a:solidFill>
+                <a:uFillTx/>
+                <a:latin typeface="DejaVu Sans"/>
+                <a:ea typeface="DejaVu Sans"/>
+                <a:hlinkClick r:id="rId4"/>
+              </a:rPr>
+              <a:t>Link</a:t>
+            </a:r>
+            <a:r>
+              <a:rPr b="0" lang="en-US" sz="1800" spc="-1" strike="noStrike">
+                <a:solidFill>
+                  <a:srgbClr val="000000"/>
+                </a:solidFill>
+                <a:latin typeface="DejaVu Sans"/>
+                <a:ea typeface="DejaVu Sans"/>
+              </a:rPr>
+              <a:t>)</a:t>
+            </a:r>
+            <a:endParaRPr b="0" lang="en-US" sz="1800" spc="-1" strike="noStrike">
+              <a:latin typeface="Arial"/>
+            </a:endParaRPr>
+          </a:p>
+          <a:p>
+            <a:pPr lvl="1" marL="432000" indent="-214920">
+              <a:lnSpc>
+                <a:spcPct val="100000"/>
+              </a:lnSpc>
+              <a:spcBef>
+                <a:spcPts val="360"/>
+              </a:spcBef>
+              <a:buClr>
+                <a:srgbClr val="008c4f"/>
+              </a:buClr>
+              <a:buSzPct val="45000"/>
+              <a:buFont typeface="OpenSymbol"/>
+              <a:buChar char="—"/>
+            </a:pPr>
+            <a:r>
+              <a:rPr b="0" lang="en-US" sz="1800" spc="-1" strike="noStrike">
+                <a:solidFill>
+                  <a:srgbClr val="000000"/>
+                </a:solidFill>
+                <a:latin typeface="DejaVu Sans"/>
+                <a:ea typeface="DejaVu Sans"/>
+              </a:rPr>
+              <a:t>How to Save a Planet (</a:t>
+            </a:r>
+            <a:r>
+              <a:rPr b="0" lang="en-US" sz="1800" spc="-1" strike="noStrike" u="sng">
+                <a:solidFill>
+                  <a:srgbClr val="0000ff"/>
+                </a:solidFill>
+                <a:uFillTx/>
+                <a:latin typeface="DejaVu Sans"/>
+                <a:ea typeface="DejaVu Sans"/>
+                <a:hlinkClick r:id="rId5"/>
+              </a:rPr>
+              <a:t>Link</a:t>
+            </a:r>
+            <a:r>
+              <a:rPr b="0" lang="en-US" sz="1800" spc="-1" strike="noStrike">
+                <a:solidFill>
+                  <a:srgbClr val="000000"/>
+                </a:solidFill>
+                <a:latin typeface="DejaVu Sans"/>
+                <a:ea typeface="DejaVu Sans"/>
+              </a:rPr>
+              <a:t>)</a:t>
+            </a:r>
+            <a:endParaRPr b="0" lang="en-US" sz="1800" spc="-1" strike="noStrike">
+              <a:latin typeface="Arial"/>
+            </a:endParaRPr>
+          </a:p>
+          <a:p>
+            <a:pPr lvl="1" marL="432000" indent="-214920">
+              <a:lnSpc>
+                <a:spcPct val="100000"/>
+              </a:lnSpc>
+              <a:spcBef>
+                <a:spcPts val="360"/>
+              </a:spcBef>
+              <a:buClr>
+                <a:srgbClr val="008c4f"/>
+              </a:buClr>
+              <a:buSzPct val="45000"/>
+              <a:buFont typeface="OpenSymbol"/>
+              <a:buChar char="—"/>
+            </a:pPr>
+            <a:r>
+              <a:rPr b="0" lang="en-US" sz="1800" spc="-1" strike="noStrike">
+                <a:solidFill>
+                  <a:srgbClr val="000000"/>
+                </a:solidFill>
+                <a:latin typeface="DejaVu Sans"/>
+                <a:ea typeface="DejaVu Sans"/>
+              </a:rPr>
+              <a:t>1,5 Grad – der Klima-Podcast mit Luisa Neubauer (German) (</a:t>
+            </a:r>
+            <a:r>
+              <a:rPr b="0" lang="en-US" sz="1800" spc="-1" strike="noStrike" u="sng">
+                <a:solidFill>
+                  <a:srgbClr val="0000ff"/>
+                </a:solidFill>
+                <a:uFillTx/>
+                <a:latin typeface="DejaVu Sans"/>
+                <a:ea typeface="DejaVu Sans"/>
+                <a:hlinkClick r:id="rId6"/>
+              </a:rPr>
+              <a:t>Link</a:t>
+            </a:r>
+            <a:r>
+              <a:rPr b="0" lang="en-US" sz="1800" spc="-1" strike="noStrike">
+                <a:solidFill>
+                  <a:srgbClr val="000000"/>
+                </a:solidFill>
+                <a:latin typeface="DejaVu Sans"/>
+                <a:ea typeface="DejaVu Sans"/>
+              </a:rPr>
+              <a:t>)</a:t>
+            </a:r>
+            <a:endParaRPr b="0" lang="en-US" sz="1800" spc="-1" strike="noStrike">
+              <a:latin typeface="Arial"/>
+            </a:endParaRPr>
+          </a:p>
+        </p:txBody>
+      </p:sp>
+    </p:spTree>
+  </p:cSld>
+  <mc:AlternateContent>
+    <mc:Choice Requires="p14">
+      <p:transition spd="slow" p14:dur="2000"/>
+    </mc:Choice>
+    <mc:Fallback>
+      <p:transition spd="slow"/>
+    </mc:Fallback>
+  </mc:AlternateContent>
+</p:sld>
+</file>
+
+<file path=ppt/slides/slide37.xml><?xml version="1.0" encoding="utf-8"?>
+<p:sld xmlns:a="http://schemas.openxmlformats.org/drawingml/2006/main" xmlns:p="http://schemas.openxmlformats.org/presentationml/2006/main" xmlns:r="http://schemas.openxmlformats.org/officeDocument/2006/relationships" xmlns:p14="http://schemas.microsoft.com/office/powerpoint/2010/main" xmlns:p15="http://schemas.microsoft.com/office/powerpoint/2012/main" xmlns:mc="http://schemas.openxmlformats.org/markup-compatibility/2006">
+  <p:cSld>
+    <p:spTree>
+      <p:nvGrpSpPr>
+        <p:cNvPr id="1" name=""/>
+        <p:cNvGrpSpPr/>
+        <p:nvPr/>
+      </p:nvGrpSpPr>
+      <p:grpSpPr>
+        <a:xfrm>
+          <a:off x="0" y="0"/>
+          <a:ext cx="0" cy="0"/>
+          <a:chOff x="0" y="0"/>
+          <a:chExt cx="0" cy="0"/>
+        </a:xfrm>
+      </p:grpSpPr>
+      <p:sp>
+        <p:nvSpPr>
+          <p:cNvPr id="208" name="CustomShape 1"/>
+          <p:cNvSpPr/>
+          <p:nvPr/>
+        </p:nvSpPr>
+        <p:spPr>
+          <a:xfrm>
+            <a:off x="335520" y="1268640"/>
+            <a:ext cx="10744560" cy="5032080"/>
+          </a:xfrm>
+          <a:prstGeom prst="rect">
+            <a:avLst/>
+          </a:prstGeom>
+          <a:noFill/>
+          <a:ln>
+            <a:noFill/>
+          </a:ln>
+        </p:spPr>
+        <p:style>
+          <a:lnRef idx="0"/>
+          <a:fillRef idx="0"/>
+          <a:effectRef idx="0"/>
+          <a:fontRef idx="minor"/>
+        </p:style>
+        <p:txBody>
+          <a:bodyPr lIns="90000" rIns="90000" tIns="45000" bIns="45000" anchor="ctr">
+            <a:noAutofit/>
+          </a:bodyPr>
+          <a:p>
             <a:pPr algn="ctr">
               <a:lnSpc>
                 <a:spcPct val="100000"/>
@@ -15139,14 +15399,14 @@
       </p:sp>
       <p:sp>
         <p:nvSpPr>
-          <p:cNvPr id="207" name="CustomShape 2"/>
+          <p:cNvPr id="209" name="CustomShape 2"/>
           <p:cNvSpPr/>
           <p:nvPr/>
         </p:nvSpPr>
         <p:spPr>
           <a:xfrm>
             <a:off x="335520" y="764640"/>
-            <a:ext cx="10744920" cy="495720"/>
+            <a:ext cx="10744560" cy="495360"/>
           </a:xfrm>
           <a:prstGeom prst="rect">
             <a:avLst/>
@@ -15202,7 +15462,7 @@
         <p:spPr>
           <a:xfrm>
             <a:off x="542880" y="721800"/>
-            <a:ext cx="10349280" cy="489960"/>
+            <a:ext cx="10348920" cy="489600"/>
           </a:xfrm>
           <a:prstGeom prst="rect">
             <a:avLst/>
@@ -15253,7 +15513,7 @@
         <p:spPr>
           <a:xfrm>
             <a:off x="451800" y="1709280"/>
-            <a:ext cx="8216640" cy="4344840"/>
+            <a:ext cx="8216280" cy="4344480"/>
           </a:xfrm>
           <a:prstGeom prst="rect">
             <a:avLst/>
@@ -15279,7 +15539,7 @@
         <p:spPr>
           <a:xfrm>
             <a:off x="609480" y="1769400"/>
-            <a:ext cx="10579680" cy="4847760"/>
+            <a:ext cx="10579320" cy="4847400"/>
           </a:xfrm>
           <a:prstGeom prst="rect">
             <a:avLst/>
@@ -15300,7 +15560,7 @@
             <a:normAutofit/>
           </a:bodyPr>
           <a:p>
-            <a:pPr marL="216000" indent="-211320">
+            <a:pPr marL="216000" indent="-210960">
               <a:lnSpc>
                 <a:spcPct val="90000"/>
               </a:lnSpc>
@@ -15409,7 +15669,7 @@
             </a:endParaRPr>
           </a:p>
           <a:p>
-            <a:pPr marL="216000" indent="-211320">
+            <a:pPr marL="216000" indent="-210960">
               <a:lnSpc>
                 <a:spcPct val="100000"/>
               </a:lnSpc>
@@ -15438,7 +15698,7 @@
             </a:endParaRPr>
           </a:p>
           <a:p>
-            <a:pPr lvl="1" marL="685800" indent="-223920">
+            <a:pPr lvl="1" marL="685800" indent="-223560">
               <a:lnSpc>
                 <a:spcPct val="100000"/>
               </a:lnSpc>
@@ -15467,7 +15727,7 @@
             </a:endParaRPr>
           </a:p>
           <a:p>
-            <a:pPr lvl="1" marL="685800" indent="-223920">
+            <a:pPr lvl="1" marL="685800" indent="-223560">
               <a:lnSpc>
                 <a:spcPct val="100000"/>
               </a:lnSpc>
@@ -15496,7 +15756,7 @@
             </a:endParaRPr>
           </a:p>
           <a:p>
-            <a:pPr lvl="1" marL="685800" indent="-223920">
+            <a:pPr lvl="1" marL="685800" indent="-223560">
               <a:lnSpc>
                 <a:spcPct val="100000"/>
               </a:lnSpc>
@@ -15525,7 +15785,7 @@
             </a:endParaRPr>
           </a:p>
           <a:p>
-            <a:pPr lvl="1" marL="685800" indent="-223920">
+            <a:pPr lvl="1" marL="685800" indent="-223560">
               <a:lnSpc>
                 <a:spcPct val="100000"/>
               </a:lnSpc>
@@ -15554,7 +15814,7 @@
             </a:endParaRPr>
           </a:p>
           <a:p>
-            <a:pPr marL="216000" indent="-211320">
+            <a:pPr marL="216000" indent="-210960">
               <a:lnSpc>
                 <a:spcPct val="100000"/>
               </a:lnSpc>
@@ -15583,7 +15843,7 @@
             </a:endParaRPr>
           </a:p>
           <a:p>
-            <a:pPr lvl="1" marL="685800" indent="-223920">
+            <a:pPr lvl="1" marL="685800" indent="-223560">
               <a:lnSpc>
                 <a:spcPct val="100000"/>
               </a:lnSpc>
@@ -15612,7 +15872,7 @@
             </a:endParaRPr>
           </a:p>
           <a:p>
-            <a:pPr lvl="1" marL="685800" indent="-223920">
+            <a:pPr lvl="1" marL="685800" indent="-223560">
               <a:lnSpc>
                 <a:spcPct val="100000"/>
               </a:lnSpc>
@@ -15681,7 +15941,7 @@
         <p:spPr>
           <a:xfrm>
             <a:off x="542880" y="721800"/>
-            <a:ext cx="10349280" cy="489960"/>
+            <a:ext cx="10348920" cy="489600"/>
           </a:xfrm>
           <a:prstGeom prst="rect">
             <a:avLst/>
@@ -15732,7 +15992,7 @@
         <p:spPr>
           <a:xfrm>
             <a:off x="451800" y="1709280"/>
-            <a:ext cx="8216640" cy="4344840"/>
+            <a:ext cx="8216280" cy="4344480"/>
           </a:xfrm>
           <a:prstGeom prst="rect">
             <a:avLst/>
@@ -15758,7 +16018,7 @@
         <p:spPr>
           <a:xfrm>
             <a:off x="609480" y="1769400"/>
-            <a:ext cx="10579680" cy="4847760"/>
+            <a:ext cx="10579320" cy="4847400"/>
           </a:xfrm>
           <a:prstGeom prst="rect">
             <a:avLst/>
@@ -15779,7 +16039,7 @@
             <a:normAutofit/>
           </a:bodyPr>
           <a:p>
-            <a:pPr marL="216000" indent="-211320">
+            <a:pPr marL="216000" indent="-210960">
               <a:lnSpc>
                 <a:spcPct val="90000"/>
               </a:lnSpc>
@@ -15830,7 +16090,7 @@
             </a:endParaRPr>
           </a:p>
           <a:p>
-            <a:pPr lvl="1" marL="685800" indent="-223920">
+            <a:pPr lvl="1" marL="685800" indent="-223560">
               <a:lnSpc>
                 <a:spcPct val="100000"/>
               </a:lnSpc>
@@ -15859,7 +16119,7 @@
             </a:endParaRPr>
           </a:p>
           <a:p>
-            <a:pPr lvl="1" marL="685800" indent="-223920">
+            <a:pPr lvl="1" marL="685800" indent="-223560">
               <a:lnSpc>
                 <a:spcPct val="100000"/>
               </a:lnSpc>
@@ -15901,7 +16161,7 @@
             </a:endParaRPr>
           </a:p>
           <a:p>
-            <a:pPr marL="216000" indent="-211320">
+            <a:pPr marL="216000" indent="-210960">
               <a:lnSpc>
                 <a:spcPct val="90000"/>
               </a:lnSpc>
@@ -15933,7 +16193,7 @@
             </a:endParaRPr>
           </a:p>
           <a:p>
-            <a:pPr lvl="1" marL="685800" indent="-223920">
+            <a:pPr lvl="1" marL="685800" indent="-223560">
               <a:lnSpc>
                 <a:spcPct val="100000"/>
               </a:lnSpc>
@@ -15987,7 +16247,7 @@
             </a:endParaRPr>
           </a:p>
           <a:p>
-            <a:pPr lvl="1" marL="685800" indent="-223920">
+            <a:pPr lvl="1" marL="685800" indent="-223560">
               <a:lnSpc>
                 <a:spcPct val="100000"/>
               </a:lnSpc>
@@ -16041,7 +16301,7 @@
             </a:endParaRPr>
           </a:p>
           <a:p>
-            <a:pPr marL="228600" indent="-223920">
+            <a:pPr marL="228600" indent="-223560">
               <a:lnSpc>
                 <a:spcPct val="90000"/>
               </a:lnSpc>
@@ -16057,7 +16317,7 @@
             </a:endParaRPr>
           </a:p>
           <a:p>
-            <a:pPr marL="228600" indent="-223920" algn="ctr">
+            <a:pPr marL="228600" indent="-223560" algn="ctr">
               <a:lnSpc>
                 <a:spcPct val="90000"/>
               </a:lnSpc>
@@ -16083,7 +16343,7 @@
             </a:endParaRPr>
           </a:p>
           <a:p>
-            <a:pPr marL="457200" indent="-223920" algn="ctr">
+            <a:pPr marL="457200" indent="-223560" algn="ctr">
               <a:lnSpc>
                 <a:spcPct val="90000"/>
               </a:lnSpc>
@@ -16159,7 +16419,7 @@
         <p:spPr>
           <a:xfrm>
             <a:off x="542880" y="721800"/>
-            <a:ext cx="10349280" cy="489960"/>
+            <a:ext cx="10348920" cy="489600"/>
           </a:xfrm>
           <a:prstGeom prst="rect">
             <a:avLst/>
@@ -16210,7 +16470,7 @@
         <p:spPr>
           <a:xfrm>
             <a:off x="451800" y="1709280"/>
-            <a:ext cx="8216640" cy="4344840"/>
+            <a:ext cx="8216280" cy="4344480"/>
           </a:xfrm>
           <a:prstGeom prst="rect">
             <a:avLst/>
@@ -16236,7 +16496,7 @@
         <p:spPr>
           <a:xfrm>
             <a:off x="609480" y="1769400"/>
-            <a:ext cx="10579680" cy="4847760"/>
+            <a:ext cx="10579320" cy="4847400"/>
           </a:xfrm>
           <a:prstGeom prst="rect">
             <a:avLst/>
@@ -16257,7 +16517,7 @@
             <a:normAutofit/>
           </a:bodyPr>
           <a:p>
-            <a:pPr marL="216000" indent="-211320">
+            <a:pPr marL="216000" indent="-210960">
               <a:lnSpc>
                 <a:spcPct val="90000"/>
               </a:lnSpc>
@@ -16308,7 +16568,7 @@
             </a:endParaRPr>
           </a:p>
           <a:p>
-            <a:pPr lvl="1" marL="685800" indent="-223920">
+            <a:pPr lvl="1" marL="685800" indent="-223560">
               <a:lnSpc>
                 <a:spcPct val="100000"/>
               </a:lnSpc>
@@ -16337,7 +16597,7 @@
             </a:endParaRPr>
           </a:p>
           <a:p>
-            <a:pPr lvl="1" marL="685800" indent="-223920">
+            <a:pPr lvl="1" marL="685800" indent="-223560">
               <a:lnSpc>
                 <a:spcPct val="100000"/>
               </a:lnSpc>
@@ -16379,7 +16639,7 @@
             </a:endParaRPr>
           </a:p>
           <a:p>
-            <a:pPr marL="216000" indent="-211320">
+            <a:pPr marL="216000" indent="-210960">
               <a:lnSpc>
                 <a:spcPct val="90000"/>
               </a:lnSpc>
@@ -16411,7 +16671,7 @@
             </a:endParaRPr>
           </a:p>
           <a:p>
-            <a:pPr lvl="1" marL="685800" indent="-223920">
+            <a:pPr lvl="1" marL="685800" indent="-223560">
               <a:lnSpc>
                 <a:spcPct val="100000"/>
               </a:lnSpc>
@@ -16465,7 +16725,7 @@
             </a:endParaRPr>
           </a:p>
           <a:p>
-            <a:pPr lvl="1" marL="685800" indent="-223920">
+            <a:pPr lvl="1" marL="685800" indent="-223560">
               <a:lnSpc>
                 <a:spcPct val="100000"/>
               </a:lnSpc>
@@ -16519,7 +16779,7 @@
             </a:endParaRPr>
           </a:p>
           <a:p>
-            <a:pPr marL="228600" indent="-223920">
+            <a:pPr marL="228600" indent="-223560">
               <a:lnSpc>
                 <a:spcPct val="90000"/>
               </a:lnSpc>
@@ -16535,7 +16795,7 @@
             </a:endParaRPr>
           </a:p>
           <a:p>
-            <a:pPr marL="228600" indent="-223920" algn="ctr">
+            <a:pPr marL="228600" indent="-223560" algn="ctr">
               <a:lnSpc>
                 <a:spcPct val="90000"/>
               </a:lnSpc>
@@ -16561,7 +16821,7 @@
             </a:endParaRPr>
           </a:p>
           <a:p>
-            <a:pPr marL="457200" indent="-223920" algn="ctr">
+            <a:pPr marL="457200" indent="-223560" algn="ctr">
               <a:lnSpc>
                 <a:spcPct val="90000"/>
               </a:lnSpc>
@@ -16637,7 +16897,7 @@
         <p:spPr>
           <a:xfrm>
             <a:off x="335520" y="764640"/>
-            <a:ext cx="10744920" cy="495720"/>
+            <a:ext cx="10744560" cy="495360"/>
           </a:xfrm>
           <a:prstGeom prst="rect">
             <a:avLst/>
@@ -16688,7 +16948,7 @@
         <p:spPr>
           <a:xfrm>
             <a:off x="335520" y="2408400"/>
-            <a:ext cx="10744920" cy="3892680"/>
+            <a:ext cx="10744560" cy="3892320"/>
           </a:xfrm>
           <a:prstGeom prst="rect">
             <a:avLst/>
@@ -16709,7 +16969,7 @@
             <a:noAutofit/>
           </a:bodyPr>
           <a:p>
-            <a:pPr marL="195120" indent="-190440">
+            <a:pPr marL="195120" indent="-190080">
               <a:lnSpc>
                 <a:spcPct val="100000"/>
               </a:lnSpc>
@@ -16778,7 +17038,7 @@
         <p:spPr>
           <a:xfrm>
             <a:off x="335520" y="764640"/>
-            <a:ext cx="10744920" cy="495720"/>
+            <a:ext cx="10744560" cy="495360"/>
           </a:xfrm>
           <a:prstGeom prst="rect">
             <a:avLst/>
@@ -16829,7 +17089,7 @@
         <p:spPr>
           <a:xfrm>
             <a:off x="335520" y="2408400"/>
-            <a:ext cx="10744920" cy="3892680"/>
+            <a:ext cx="10744560" cy="3892320"/>
           </a:xfrm>
           <a:prstGeom prst="rect">
             <a:avLst/>
@@ -16850,7 +17110,7 @@
             <a:noAutofit/>
           </a:bodyPr>
           <a:p>
-            <a:pPr marL="195120" indent="-190440">
+            <a:pPr marL="195120" indent="-190080">
               <a:lnSpc>
                 <a:spcPct val="100000"/>
               </a:lnSpc>
@@ -16879,7 +17139,7 @@
             </a:endParaRPr>
           </a:p>
           <a:p>
-            <a:pPr marL="195120" indent="-190440">
+            <a:pPr marL="195120" indent="-190080">
               <a:lnSpc>
                 <a:spcPct val="100000"/>
               </a:lnSpc>
@@ -16948,7 +17208,7 @@
         <p:spPr>
           <a:xfrm>
             <a:off x="335520" y="764640"/>
-            <a:ext cx="10744920" cy="495720"/>
+            <a:ext cx="10744560" cy="495360"/>
           </a:xfrm>
           <a:prstGeom prst="rect">
             <a:avLst/>
@@ -16999,7 +17259,7 @@
         <p:spPr>
           <a:xfrm>
             <a:off x="335520" y="2408400"/>
-            <a:ext cx="10744920" cy="3892680"/>
+            <a:ext cx="10744560" cy="3892320"/>
           </a:xfrm>
           <a:prstGeom prst="rect">
             <a:avLst/>
@@ -17020,7 +17280,7 @@
             <a:noAutofit/>
           </a:bodyPr>
           <a:p>
-            <a:pPr marL="195120" indent="-190440">
+            <a:pPr marL="195120" indent="-190080">
               <a:lnSpc>
                 <a:spcPct val="100000"/>
               </a:lnSpc>
@@ -17049,7 +17309,7 @@
             </a:endParaRPr>
           </a:p>
           <a:p>
-            <a:pPr marL="195120" indent="-190440">
+            <a:pPr marL="195120" indent="-190080">
               <a:lnSpc>
                 <a:spcPct val="100000"/>
               </a:lnSpc>
@@ -17078,7 +17338,7 @@
             </a:endParaRPr>
           </a:p>
           <a:p>
-            <a:pPr marL="195120" indent="-190440">
+            <a:pPr marL="195120" indent="-190080">
               <a:lnSpc>
                 <a:spcPct val="100000"/>
               </a:lnSpc>

</xml_diff>

<commit_message>
* updated ETCE L0 lecture plan
</commit_message>
<xml_diff>
--- a/Emerging-Technologies-for-the-Circular-Economy/ETCE-L00-Organization.pptx
+++ b/Emerging-Technologies-for-the-Circular-Economy/ETCE-L00-Organization.pptx
@@ -276,7 +276,7 @@
           </a:bodyPr>
           <a:p>
             <a:pPr algn="r"/>
-            <a:fld id="{58832755-6DD1-47A3-AF0A-13D817347393}" type="slidenum">
+            <a:fld id="{32DD3130-876D-42A2-99B5-D2A20E790699}" type="slidenum">
               <a:rPr b="0" lang="en-US" sz="1400" spc="-1" strike="noStrike">
                 <a:latin typeface="Times New Roman"/>
               </a:rPr>
@@ -324,7 +324,7 @@
         <p:spPr>
           <a:xfrm>
             <a:off x="533520" y="763560"/>
-            <a:ext cx="6692040" cy="3760200"/>
+            <a:ext cx="6691680" cy="3759840"/>
           </a:xfrm>
           <a:prstGeom prst="rect">
             <a:avLst/>
@@ -344,7 +344,7 @@
         <p:spPr>
           <a:xfrm>
             <a:off x="777240" y="4777560"/>
-            <a:ext cx="6205680" cy="4514040"/>
+            <a:ext cx="6205320" cy="4513680"/>
           </a:xfrm>
           <a:prstGeom prst="rect">
             <a:avLst/>
@@ -370,7 +370,7 @@
         <p:spPr>
           <a:xfrm>
             <a:off x="4399200" y="9555480"/>
-            <a:ext cx="3360960" cy="490680"/>
+            <a:ext cx="3360600" cy="490320"/>
           </a:xfrm>
           <a:prstGeom prst="rect">
             <a:avLst/>
@@ -396,7 +396,7 @@
                 <a:spcPct val="100000"/>
               </a:lnSpc>
             </a:pPr>
-            <a:fld id="{9C9CA965-31E6-41B9-A8A2-7E94CDCAF326}" type="slidenum">
+            <a:fld id="{28D9C04C-2A0A-4351-A3DE-AE1E330029D0}" type="slidenum">
               <a:rPr b="0" lang="de-DE" sz="1800" spc="-1" strike="noStrike">
                 <a:solidFill>
                   <a:srgbClr val="000000"/>
@@ -447,7 +447,7 @@
         <p:spPr>
           <a:xfrm>
             <a:off x="533520" y="763560"/>
-            <a:ext cx="6692040" cy="3760200"/>
+            <a:ext cx="6691680" cy="3759840"/>
           </a:xfrm>
           <a:prstGeom prst="rect">
             <a:avLst/>
@@ -467,7 +467,7 @@
         <p:spPr>
           <a:xfrm>
             <a:off x="777240" y="4777560"/>
-            <a:ext cx="6205680" cy="4514040"/>
+            <a:ext cx="6205320" cy="4513680"/>
           </a:xfrm>
           <a:prstGeom prst="rect">
             <a:avLst/>
@@ -493,7 +493,7 @@
         <p:spPr>
           <a:xfrm>
             <a:off x="4399200" y="9555480"/>
-            <a:ext cx="3360960" cy="490680"/>
+            <a:ext cx="3360600" cy="490320"/>
           </a:xfrm>
           <a:prstGeom prst="rect">
             <a:avLst/>
@@ -519,7 +519,7 @@
                 <a:spcPct val="100000"/>
               </a:lnSpc>
             </a:pPr>
-            <a:fld id="{A78CC963-FCF6-44AC-A846-BD99ACEDCBC7}" type="slidenum">
+            <a:fld id="{DF1CD553-A57D-48F8-9BA0-15D1712CF429}" type="slidenum">
               <a:rPr b="0" lang="de-DE" sz="1800" spc="-1" strike="noStrike">
                 <a:solidFill>
                   <a:srgbClr val="000000"/>
@@ -570,7 +570,7 @@
         <p:spPr>
           <a:xfrm>
             <a:off x="533520" y="763560"/>
-            <a:ext cx="6692040" cy="3760200"/>
+            <a:ext cx="6691680" cy="3759840"/>
           </a:xfrm>
           <a:prstGeom prst="rect">
             <a:avLst/>
@@ -590,7 +590,7 @@
         <p:spPr>
           <a:xfrm>
             <a:off x="777240" y="4777560"/>
-            <a:ext cx="6205680" cy="4514040"/>
+            <a:ext cx="6205320" cy="4513680"/>
           </a:xfrm>
           <a:prstGeom prst="rect">
             <a:avLst/>
@@ -616,7 +616,7 @@
         <p:spPr>
           <a:xfrm>
             <a:off x="4399200" y="9555480"/>
-            <a:ext cx="3360960" cy="490680"/>
+            <a:ext cx="3360600" cy="490320"/>
           </a:xfrm>
           <a:prstGeom prst="rect">
             <a:avLst/>
@@ -642,7 +642,7 @@
                 <a:spcPct val="100000"/>
               </a:lnSpc>
             </a:pPr>
-            <a:fld id="{A52296E6-6EE4-40E6-A36A-FF3DA7A9D4C8}" type="slidenum">
+            <a:fld id="{D6A1FBB9-C7C5-46DB-A78B-4B7CB53517C2}" type="slidenum">
               <a:rPr b="0" lang="de-DE" sz="1800" spc="-1" strike="noStrike">
                 <a:solidFill>
                   <a:srgbClr val="000000"/>
@@ -3408,7 +3408,7 @@
         <p:spPr>
           <a:xfrm>
             <a:off x="11444760" y="0"/>
-            <a:ext cx="740520" cy="6849360"/>
+            <a:ext cx="740160" cy="6849000"/>
           </a:xfrm>
           <a:prstGeom prst="rect">
             <a:avLst/>
@@ -3438,7 +3438,7 @@
         <p:spPr>
           <a:xfrm>
             <a:off x="11438640" y="6453360"/>
-            <a:ext cx="757440" cy="363960"/>
+            <a:ext cx="757080" cy="363960"/>
           </a:xfrm>
           <a:prstGeom prst="rect">
             <a:avLst/>
@@ -3464,7 +3464,7 @@
                 <a:spcPct val="100000"/>
               </a:lnSpc>
             </a:pPr>
-            <a:fld id="{F7016FE4-DF96-4B3C-B18B-08273505302A}" type="slidenum">
+            <a:fld id="{99F13142-53A1-4EF1-960C-BF25176D7E2F}" type="slidenum">
               <a:rPr b="0" lang="en-US" sz="1800" spc="-1" strike="noStrike">
                 <a:solidFill>
                   <a:srgbClr val="808080"/>
@@ -3489,7 +3489,7 @@
         <p:spPr>
           <a:xfrm>
             <a:off x="912240" y="1268280"/>
-            <a:ext cx="9207360" cy="360720"/>
+            <a:ext cx="9207000" cy="360360"/>
           </a:xfrm>
           <a:prstGeom prst="rect">
             <a:avLst/>
@@ -3519,7 +3519,7 @@
         <p:spPr>
           <a:xfrm>
             <a:off x="0" y="0"/>
-            <a:ext cx="3051360" cy="561240"/>
+            <a:ext cx="3051000" cy="560880"/>
           </a:xfrm>
           <a:prstGeom prst="rect">
             <a:avLst/>
@@ -3542,7 +3542,7 @@
         <p:spPr>
           <a:xfrm>
             <a:off x="7430400" y="134640"/>
-            <a:ext cx="3697200" cy="513360"/>
+            <a:ext cx="3696840" cy="513000"/>
           </a:xfrm>
           <a:prstGeom prst="rect">
             <a:avLst/>
@@ -3561,7 +3561,7 @@
         <p:spPr>
           <a:xfrm>
             <a:off x="912240" y="1268280"/>
-            <a:ext cx="9207360" cy="360720"/>
+            <a:ext cx="9207000" cy="360360"/>
           </a:xfrm>
           <a:prstGeom prst="rect">
             <a:avLst/>
@@ -3587,7 +3587,7 @@
         <p:spPr>
           <a:xfrm>
             <a:off x="11444760" y="0"/>
-            <a:ext cx="740520" cy="6849360"/>
+            <a:ext cx="740160" cy="6849000"/>
           </a:xfrm>
           <a:prstGeom prst="rect">
             <a:avLst/>
@@ -3617,7 +3617,7 @@
         <p:spPr>
           <a:xfrm>
             <a:off x="0" y="6642720"/>
-            <a:ext cx="12183480" cy="211320"/>
+            <a:ext cx="12183120" cy="211320"/>
           </a:xfrm>
           <a:prstGeom prst="rect">
             <a:avLst/>
@@ -3948,7 +3948,7 @@
         <p:spPr>
           <a:xfrm>
             <a:off x="11444760" y="0"/>
-            <a:ext cx="740520" cy="6849360"/>
+            <a:ext cx="740160" cy="6849000"/>
           </a:xfrm>
           <a:prstGeom prst="rect">
             <a:avLst/>
@@ -3978,7 +3978,7 @@
         <p:spPr>
           <a:xfrm>
             <a:off x="11438640" y="6453360"/>
-            <a:ext cx="757440" cy="363960"/>
+            <a:ext cx="757080" cy="363960"/>
           </a:xfrm>
           <a:prstGeom prst="rect">
             <a:avLst/>
@@ -4004,7 +4004,7 @@
                 <a:spcPct val="100000"/>
               </a:lnSpc>
             </a:pPr>
-            <a:fld id="{6774BBFC-1F0A-4468-9B4E-66BE06AB9395}" type="slidenum">
+            <a:fld id="{DA304390-DD76-4E50-85A2-5CC0017E4C5F}" type="slidenum">
               <a:rPr b="0" lang="en-US" sz="1800" spc="-1" strike="noStrike">
                 <a:solidFill>
                   <a:srgbClr val="808080"/>
@@ -4029,7 +4029,7 @@
         <p:spPr>
           <a:xfrm>
             <a:off x="912240" y="1268280"/>
-            <a:ext cx="9207360" cy="360720"/>
+            <a:ext cx="9207000" cy="360360"/>
           </a:xfrm>
           <a:prstGeom prst="rect">
             <a:avLst/>
@@ -4059,7 +4059,7 @@
         <p:spPr>
           <a:xfrm>
             <a:off x="0" y="0"/>
-            <a:ext cx="3051360" cy="561240"/>
+            <a:ext cx="3051000" cy="560880"/>
           </a:xfrm>
           <a:prstGeom prst="rect">
             <a:avLst/>
@@ -4082,7 +4082,7 @@
         <p:spPr>
           <a:xfrm>
             <a:off x="7430400" y="134640"/>
-            <a:ext cx="3697200" cy="513360"/>
+            <a:ext cx="3696840" cy="513000"/>
           </a:xfrm>
           <a:prstGeom prst="rect">
             <a:avLst/>
@@ -4101,7 +4101,7 @@
         <p:spPr>
           <a:xfrm>
             <a:off x="11444760" y="0"/>
-            <a:ext cx="740520" cy="6849360"/>
+            <a:ext cx="740160" cy="6849000"/>
           </a:xfrm>
           <a:prstGeom prst="rect">
             <a:avLst/>
@@ -4131,7 +4131,7 @@
         <p:spPr>
           <a:xfrm>
             <a:off x="11438640" y="6453360"/>
-            <a:ext cx="757440" cy="363960"/>
+            <a:ext cx="757080" cy="363960"/>
           </a:xfrm>
           <a:prstGeom prst="rect">
             <a:avLst/>
@@ -4157,7 +4157,7 @@
                 <a:spcPct val="100000"/>
               </a:lnSpc>
             </a:pPr>
-            <a:fld id="{BD17B7AE-4D92-4D87-B7E0-D1FC7FC1DF9B}" type="slidenum">
+            <a:fld id="{C2D75C28-E56E-475A-BAD0-23C75BDC948A}" type="slidenum">
               <a:rPr b="0" lang="en-US" sz="1800" spc="-1" strike="noStrike">
                 <a:solidFill>
                   <a:srgbClr val="808080"/>
@@ -4182,7 +4182,7 @@
         <p:spPr>
           <a:xfrm>
             <a:off x="0" y="6642720"/>
-            <a:ext cx="12183480" cy="211320"/>
+            <a:ext cx="12183120" cy="211320"/>
           </a:xfrm>
           <a:prstGeom prst="rect">
             <a:avLst/>
@@ -4506,7 +4506,7 @@
         <p:spPr>
           <a:xfrm>
             <a:off x="527400" y="1412640"/>
-            <a:ext cx="10360440" cy="1146960"/>
+            <a:ext cx="10360080" cy="1146600"/>
           </a:xfrm>
           <a:prstGeom prst="rect">
             <a:avLst/>
@@ -4557,7 +4557,7 @@
         <p:spPr>
           <a:xfrm>
             <a:off x="527400" y="2852640"/>
-            <a:ext cx="10360440" cy="2367720"/>
+            <a:ext cx="10360080" cy="2367360"/>
           </a:xfrm>
           <a:prstGeom prst="rect">
             <a:avLst/>
@@ -4770,7 +4770,7 @@
         <p:spPr>
           <a:xfrm>
             <a:off x="335520" y="764640"/>
-            <a:ext cx="10744560" cy="495360"/>
+            <a:ext cx="10744200" cy="495000"/>
           </a:xfrm>
           <a:prstGeom prst="rect">
             <a:avLst/>
@@ -4831,7 +4831,7 @@
         <p:spPr>
           <a:xfrm>
             <a:off x="335520" y="2408400"/>
-            <a:ext cx="10744560" cy="3892320"/>
+            <a:ext cx="10744200" cy="3891960"/>
           </a:xfrm>
           <a:prstGeom prst="rect">
             <a:avLst/>
@@ -4852,7 +4852,7 @@
             <a:noAutofit/>
           </a:bodyPr>
           <a:p>
-            <a:pPr marL="195120" indent="-190080">
+            <a:pPr marL="195120" indent="-189720">
               <a:lnSpc>
                 <a:spcPct val="100000"/>
               </a:lnSpc>
@@ -4881,7 +4881,7 @@
             </a:endParaRPr>
           </a:p>
           <a:p>
-            <a:pPr marL="195120" indent="-190080">
+            <a:pPr marL="195120" indent="-189720">
               <a:lnSpc>
                 <a:spcPct val="100000"/>
               </a:lnSpc>
@@ -4910,7 +4910,7 @@
             </a:endParaRPr>
           </a:p>
           <a:p>
-            <a:pPr marL="195120" indent="-190080">
+            <a:pPr marL="195120" indent="-189720">
               <a:lnSpc>
                 <a:spcPct val="100000"/>
               </a:lnSpc>
@@ -4939,7 +4939,7 @@
             </a:endParaRPr>
           </a:p>
           <a:p>
-            <a:pPr marL="195120" indent="-190080">
+            <a:pPr marL="195120" indent="-189720">
               <a:lnSpc>
                 <a:spcPct val="100000"/>
               </a:lnSpc>
@@ -5008,7 +5008,7 @@
         <p:spPr>
           <a:xfrm>
             <a:off x="335520" y="764640"/>
-            <a:ext cx="10744560" cy="495360"/>
+            <a:ext cx="10744200" cy="495000"/>
           </a:xfrm>
           <a:prstGeom prst="rect">
             <a:avLst/>
@@ -5059,7 +5059,7 @@
         <p:spPr>
           <a:xfrm>
             <a:off x="335520" y="2408400"/>
-            <a:ext cx="10744560" cy="3892320"/>
+            <a:ext cx="10744200" cy="3891960"/>
           </a:xfrm>
           <a:prstGeom prst="rect">
             <a:avLst/>
@@ -5080,7 +5080,7 @@
             <a:noAutofit/>
           </a:bodyPr>
           <a:p>
-            <a:pPr marL="195120" indent="-190080">
+            <a:pPr marL="195120" indent="-189720">
               <a:lnSpc>
                 <a:spcPct val="100000"/>
               </a:lnSpc>
@@ -5109,7 +5109,7 @@
             </a:endParaRPr>
           </a:p>
           <a:p>
-            <a:pPr marL="195120" indent="-190080">
+            <a:pPr marL="195120" indent="-189720">
               <a:lnSpc>
                 <a:spcPct val="100000"/>
               </a:lnSpc>
@@ -5138,7 +5138,7 @@
             </a:endParaRPr>
           </a:p>
           <a:p>
-            <a:pPr marL="195120" indent="-190080">
+            <a:pPr marL="195120" indent="-189720">
               <a:lnSpc>
                 <a:spcPct val="100000"/>
               </a:lnSpc>
@@ -5167,7 +5167,7 @@
             </a:endParaRPr>
           </a:p>
           <a:p>
-            <a:pPr marL="195120" indent="-190080">
+            <a:pPr marL="195120" indent="-189720">
               <a:lnSpc>
                 <a:spcPct val="100000"/>
               </a:lnSpc>
@@ -5196,7 +5196,7 @@
             </a:endParaRPr>
           </a:p>
           <a:p>
-            <a:pPr marL="195120" indent="-190080">
+            <a:pPr marL="195120" indent="-189720">
               <a:lnSpc>
                 <a:spcPct val="100000"/>
               </a:lnSpc>
@@ -5265,7 +5265,7 @@
         <p:spPr>
           <a:xfrm>
             <a:off x="335520" y="764640"/>
-            <a:ext cx="10744560" cy="495360"/>
+            <a:ext cx="10744200" cy="495000"/>
           </a:xfrm>
           <a:prstGeom prst="rect">
             <a:avLst/>
@@ -5326,7 +5326,7 @@
         <p:spPr>
           <a:xfrm>
             <a:off x="335520" y="2408400"/>
-            <a:ext cx="10744560" cy="3892320"/>
+            <a:ext cx="10744200" cy="3891960"/>
           </a:xfrm>
           <a:prstGeom prst="rect">
             <a:avLst/>
@@ -5347,7 +5347,7 @@
             <a:noAutofit/>
           </a:bodyPr>
           <a:p>
-            <a:pPr marL="195120" indent="-190080">
+            <a:pPr marL="195120" indent="-189720">
               <a:lnSpc>
                 <a:spcPct val="100000"/>
               </a:lnSpc>
@@ -5376,7 +5376,7 @@
             </a:endParaRPr>
           </a:p>
           <a:p>
-            <a:pPr marL="195120" indent="-190080">
+            <a:pPr marL="195120" indent="-189720">
               <a:lnSpc>
                 <a:spcPct val="100000"/>
               </a:lnSpc>
@@ -5405,7 +5405,7 @@
             </a:endParaRPr>
           </a:p>
           <a:p>
-            <a:pPr marL="195120" indent="-190080">
+            <a:pPr marL="195120" indent="-189720">
               <a:lnSpc>
                 <a:spcPct val="100000"/>
               </a:lnSpc>
@@ -5434,7 +5434,7 @@
             </a:endParaRPr>
           </a:p>
           <a:p>
-            <a:pPr marL="195120" indent="-190080">
+            <a:pPr marL="195120" indent="-189720">
               <a:lnSpc>
                 <a:spcPct val="100000"/>
               </a:lnSpc>
@@ -5463,7 +5463,7 @@
             </a:endParaRPr>
           </a:p>
           <a:p>
-            <a:pPr marL="195120" indent="-190080">
+            <a:pPr marL="195120" indent="-189720">
               <a:lnSpc>
                 <a:spcPct val="100000"/>
               </a:lnSpc>
@@ -5492,7 +5492,7 @@
             </a:endParaRPr>
           </a:p>
           <a:p>
-            <a:pPr marL="195120" indent="-190080">
+            <a:pPr marL="195120" indent="-189720">
               <a:lnSpc>
                 <a:spcPct val="100000"/>
               </a:lnSpc>
@@ -5561,7 +5561,7 @@
         <p:spPr>
           <a:xfrm>
             <a:off x="335520" y="764640"/>
-            <a:ext cx="10744560" cy="495360"/>
+            <a:ext cx="10744200" cy="495000"/>
           </a:xfrm>
           <a:prstGeom prst="rect">
             <a:avLst/>
@@ -5612,7 +5612,7 @@
         <p:spPr>
           <a:xfrm>
             <a:off x="335520" y="1268640"/>
-            <a:ext cx="10744560" cy="5032080"/>
+            <a:ext cx="10744200" cy="5031720"/>
           </a:xfrm>
           <a:prstGeom prst="rect">
             <a:avLst/>
@@ -5633,7 +5633,7 @@
             <a:noAutofit/>
           </a:bodyPr>
           <a:p>
-            <a:pPr marL="195120" indent="-190080">
+            <a:pPr marL="195120" indent="-189720">
               <a:lnSpc>
                 <a:spcPct val="100000"/>
               </a:lnSpc>
@@ -5662,7 +5662,7 @@
             </a:endParaRPr>
           </a:p>
           <a:p>
-            <a:pPr marL="195120" indent="-190080">
+            <a:pPr marL="195120" indent="-189720">
               <a:lnSpc>
                 <a:spcPct val="100000"/>
               </a:lnSpc>
@@ -5691,7 +5691,7 @@
             </a:endParaRPr>
           </a:p>
           <a:p>
-            <a:pPr marL="195120" indent="-190080">
+            <a:pPr marL="195120" indent="-189720">
               <a:lnSpc>
                 <a:spcPct val="100000"/>
               </a:lnSpc>
@@ -5720,7 +5720,7 @@
             </a:endParaRPr>
           </a:p>
           <a:p>
-            <a:pPr marL="195120" indent="-190080">
+            <a:pPr marL="195120" indent="-189720">
               <a:lnSpc>
                 <a:spcPct val="100000"/>
               </a:lnSpc>
@@ -5749,7 +5749,7 @@
             </a:endParaRPr>
           </a:p>
           <a:p>
-            <a:pPr marL="195120" indent="-190080">
+            <a:pPr marL="195120" indent="-189720">
               <a:lnSpc>
                 <a:spcPct val="100000"/>
               </a:lnSpc>
@@ -5778,7 +5778,7 @@
             </a:endParaRPr>
           </a:p>
           <a:p>
-            <a:pPr marL="195120" indent="-190080">
+            <a:pPr marL="195120" indent="-189720">
               <a:lnSpc>
                 <a:spcPct val="100000"/>
               </a:lnSpc>
@@ -5807,7 +5807,7 @@
             </a:endParaRPr>
           </a:p>
           <a:p>
-            <a:pPr marL="195120" indent="-190080">
+            <a:pPr marL="195120" indent="-189720">
               <a:lnSpc>
                 <a:spcPct val="100000"/>
               </a:lnSpc>
@@ -5829,14 +5829,24 @@
                 <a:latin typeface="DejaVu Sans"/>
                 <a:ea typeface="DejaVu Sans"/>
               </a:rPr>
-              <a:t>01.06.2022 → The Machine-to-Everything Economy – A step towards the CE 2.0?</a:t>
+              <a:t>01.06.2022 → </a:t>
+            </a:r>
+            <a:r>
+              <a:rPr b="0" lang="en-US" sz="1800" spc="-1" strike="noStrike">
+                <a:solidFill>
+                  <a:srgbClr val="000000"/>
+                </a:solidFill>
+                <a:latin typeface="DejaVu Sans"/>
+                <a:ea typeface="DejaVu Sans"/>
+              </a:rPr>
+              <a:t>Introduction to Blockchain Technology</a:t>
             </a:r>
             <a:endParaRPr b="0" lang="en-US" sz="1800" spc="-1" strike="noStrike">
               <a:latin typeface="Arial"/>
             </a:endParaRPr>
           </a:p>
           <a:p>
-            <a:pPr marL="195120" indent="-190080">
+            <a:pPr marL="195120" indent="-189720">
               <a:lnSpc>
                 <a:spcPct val="100000"/>
               </a:lnSpc>
@@ -5858,14 +5868,24 @@
                 <a:latin typeface="DejaVu Sans"/>
                 <a:ea typeface="DejaVu Sans"/>
               </a:rPr>
-              <a:t>15.06.2022 → Introduction to Blockchain Technology</a:t>
+              <a:t>15.06.2022 → </a:t>
+            </a:r>
+            <a:r>
+              <a:rPr b="0" lang="en-US" sz="1800" spc="-1" strike="noStrike">
+                <a:solidFill>
+                  <a:srgbClr val="000000"/>
+                </a:solidFill>
+                <a:latin typeface="DejaVu Sans"/>
+                <a:ea typeface="DejaVu Sans"/>
+              </a:rPr>
+              <a:t>Blockchain Technology – Consensus</a:t>
             </a:r>
             <a:endParaRPr b="0" lang="en-US" sz="1800" spc="-1" strike="noStrike">
               <a:latin typeface="Arial"/>
             </a:endParaRPr>
           </a:p>
           <a:p>
-            <a:pPr marL="195120" indent="-190080">
+            <a:pPr marL="195120" indent="-189720">
               <a:lnSpc>
                 <a:spcPct val="100000"/>
               </a:lnSpc>
@@ -5887,14 +5907,24 @@
                 <a:latin typeface="DejaVu Sans"/>
                 <a:ea typeface="DejaVu Sans"/>
               </a:rPr>
-              <a:t>22.06.2022 → Blockchain Technology – Consensus</a:t>
+              <a:t>22.06.2022 → Blockchain Technology – </a:t>
+            </a:r>
+            <a:r>
+              <a:rPr b="0" lang="en-US" sz="1800" spc="-1" strike="noStrike">
+                <a:solidFill>
+                  <a:srgbClr val="000000"/>
+                </a:solidFill>
+                <a:latin typeface="DejaVu Sans"/>
+                <a:ea typeface="DejaVu Sans"/>
+              </a:rPr>
+              <a:t>Ethereum and Smart Contracts Part 1</a:t>
             </a:r>
             <a:endParaRPr b="0" lang="en-US" sz="1800" spc="-1" strike="noStrike">
               <a:latin typeface="Arial"/>
             </a:endParaRPr>
           </a:p>
           <a:p>
-            <a:pPr marL="195120" indent="-190080">
+            <a:pPr marL="195120" indent="-189720">
               <a:lnSpc>
                 <a:spcPct val="100000"/>
               </a:lnSpc>
@@ -5916,14 +5946,24 @@
                 <a:latin typeface="DejaVu Sans"/>
                 <a:ea typeface="DejaVu Sans"/>
               </a:rPr>
-              <a:t>29.06.2022 → Blockchain Technology – Ethereum and Smart Contracts Part 1</a:t>
+              <a:t>29.06.2022 → Blockchain Technology – </a:t>
+            </a:r>
+            <a:r>
+              <a:rPr b="0" lang="en-US" sz="1800" spc="-1" strike="noStrike">
+                <a:solidFill>
+                  <a:srgbClr val="000000"/>
+                </a:solidFill>
+                <a:latin typeface="DejaVu Sans"/>
+                <a:ea typeface="DejaVu Sans"/>
+              </a:rPr>
+              <a:t>Ethereum and Smart Contracts Part 2</a:t>
             </a:r>
             <a:endParaRPr b="0" lang="en-US" sz="1800" spc="-1" strike="noStrike">
               <a:latin typeface="Arial"/>
             </a:endParaRPr>
           </a:p>
           <a:p>
-            <a:pPr marL="195120" indent="-190080">
+            <a:pPr marL="195120" indent="-189720">
               <a:lnSpc>
                 <a:spcPct val="100000"/>
               </a:lnSpc>
@@ -5952,7 +5992,7 @@
             </a:endParaRPr>
           </a:p>
           <a:p>
-            <a:pPr marL="195120" indent="-190080">
+            <a:pPr marL="195120" indent="-189720">
               <a:lnSpc>
                 <a:spcPct val="100000"/>
               </a:lnSpc>
@@ -5981,7 +6021,7 @@
             </a:endParaRPr>
           </a:p>
           <a:p>
-            <a:pPr marL="195120" indent="-190080">
+            <a:pPr marL="195120" indent="-189720">
               <a:lnSpc>
                 <a:spcPct val="100000"/>
               </a:lnSpc>
@@ -6003,14 +6043,14 @@
                 <a:latin typeface="DejaVu Sans"/>
                 <a:ea typeface="DejaVu Sans"/>
               </a:rPr>
-              <a:t>20.07.2022 → Blockchain Technology – Ethereum and Smart Contracts Part 2</a:t>
+              <a:t>20.07.2022 → Blockchain Technology and Sustainability</a:t>
             </a:r>
             <a:endParaRPr b="0" lang="en-US" sz="1800" spc="-1" strike="noStrike">
               <a:latin typeface="Arial"/>
             </a:endParaRPr>
           </a:p>
           <a:p>
-            <a:pPr marL="195120" indent="-190080">
+            <a:pPr marL="195120" indent="-189720">
               <a:lnSpc>
                 <a:spcPct val="100000"/>
               </a:lnSpc>
@@ -6032,18 +6072,7 @@
                 <a:latin typeface="DejaVu Sans"/>
                 <a:ea typeface="DejaVu Sans"/>
               </a:rPr>
-              <a:t>27.07.2022 → Backup </a:t>
-            </a:r>
-            <a:r>
-              <a:rPr b="0" lang="en-US" sz="1800" spc="-1" strike="noStrike" u="sng">
-                <a:solidFill>
-                  <a:srgbClr val="000000"/>
-                </a:solidFill>
-                <a:uFillTx/>
-                <a:latin typeface="DejaVu Sans"/>
-                <a:ea typeface="DejaVu Sans"/>
-              </a:rPr>
-              <a:t>XOR</a:t>
+              <a:t>27.07.2022 → </a:t>
             </a:r>
             <a:r>
               <a:rPr b="0" lang="en-US" sz="1800" spc="-1" strike="noStrike">
@@ -6053,7 +6082,7 @@
                 <a:latin typeface="DejaVu Sans"/>
                 <a:ea typeface="DejaVu Sans"/>
               </a:rPr>
-              <a:t> no lecture</a:t>
+              <a:t>The Machine-to-Everything Economy – A step towards the CE 2.0?</a:t>
             </a:r>
             <a:endParaRPr b="0" lang="en-US" sz="1800" spc="-1" strike="noStrike">
               <a:latin typeface="Arial"/>
@@ -6100,7 +6129,7 @@
         <p:spPr>
           <a:xfrm>
             <a:off x="335520" y="764640"/>
-            <a:ext cx="10744560" cy="495360"/>
+            <a:ext cx="10744200" cy="495000"/>
           </a:xfrm>
           <a:prstGeom prst="rect">
             <a:avLst/>
@@ -6151,7 +6180,7 @@
         <p:spPr>
           <a:xfrm>
             <a:off x="335520" y="1268640"/>
-            <a:ext cx="10744560" cy="5032080"/>
+            <a:ext cx="10744200" cy="5031720"/>
           </a:xfrm>
           <a:prstGeom prst="rect">
             <a:avLst/>
@@ -6172,7 +6201,7 @@
             <a:noAutofit/>
           </a:bodyPr>
           <a:p>
-            <a:pPr marL="195120" indent="-190080">
+            <a:pPr marL="195120" indent="-189720">
               <a:lnSpc>
                 <a:spcPct val="100000"/>
               </a:lnSpc>
@@ -6221,7 +6250,7 @@
             </a:endParaRPr>
           </a:p>
           <a:p>
-            <a:pPr marL="195120" indent="-190080">
+            <a:pPr marL="195120" indent="-189720">
               <a:lnSpc>
                 <a:spcPct val="100000"/>
               </a:lnSpc>
@@ -6270,7 +6299,7 @@
             </a:endParaRPr>
           </a:p>
           <a:p>
-            <a:pPr marL="195120" indent="-190080">
+            <a:pPr marL="195120" indent="-189720">
               <a:lnSpc>
                 <a:spcPct val="100000"/>
               </a:lnSpc>
@@ -6319,7 +6348,7 @@
             </a:endParaRPr>
           </a:p>
           <a:p>
-            <a:pPr marL="195120" indent="-190080">
+            <a:pPr marL="195120" indent="-189720">
               <a:lnSpc>
                 <a:spcPct val="100000"/>
               </a:lnSpc>
@@ -6368,7 +6397,7 @@
             </a:endParaRPr>
           </a:p>
           <a:p>
-            <a:pPr marL="195120" indent="-190080">
+            <a:pPr marL="195120" indent="-189720">
               <a:lnSpc>
                 <a:spcPct val="100000"/>
               </a:lnSpc>
@@ -6417,7 +6446,7 @@
             </a:endParaRPr>
           </a:p>
           <a:p>
-            <a:pPr marL="195120" indent="-190080">
+            <a:pPr marL="195120" indent="-189720">
               <a:lnSpc>
                 <a:spcPct val="100000"/>
               </a:lnSpc>
@@ -6486,7 +6515,7 @@
             </a:endParaRPr>
           </a:p>
           <a:p>
-            <a:pPr marL="195120" indent="-190080">
+            <a:pPr marL="195120" indent="-189720">
               <a:lnSpc>
                 <a:spcPct val="100000"/>
               </a:lnSpc>
@@ -6535,7 +6564,7 @@
             </a:endParaRPr>
           </a:p>
           <a:p>
-            <a:pPr marL="195120" indent="-190080">
+            <a:pPr marL="195120" indent="-189720">
               <a:lnSpc>
                 <a:spcPct val="100000"/>
               </a:lnSpc>
@@ -6584,7 +6613,7 @@
             </a:endParaRPr>
           </a:p>
           <a:p>
-            <a:pPr marL="195120" indent="-190080">
+            <a:pPr marL="195120" indent="-189720">
               <a:lnSpc>
                 <a:spcPct val="100000"/>
               </a:lnSpc>
@@ -6633,7 +6662,7 @@
             </a:endParaRPr>
           </a:p>
           <a:p>
-            <a:pPr marL="195120" indent="-190080">
+            <a:pPr marL="195120" indent="-189720">
               <a:lnSpc>
                 <a:spcPct val="100000"/>
               </a:lnSpc>
@@ -6722,7 +6751,7 @@
         <p:spPr>
           <a:xfrm>
             <a:off x="335520" y="764640"/>
-            <a:ext cx="10744560" cy="495360"/>
+            <a:ext cx="10744200" cy="495000"/>
           </a:xfrm>
           <a:prstGeom prst="rect">
             <a:avLst/>
@@ -6773,7 +6802,7 @@
         <p:spPr>
           <a:xfrm>
             <a:off x="335520" y="1268280"/>
-            <a:ext cx="10744560" cy="5032080"/>
+            <a:ext cx="10744200" cy="5031720"/>
           </a:xfrm>
           <a:prstGeom prst="rect">
             <a:avLst/>
@@ -6794,7 +6823,7 @@
             <a:noAutofit/>
           </a:bodyPr>
           <a:p>
-            <a:pPr marL="195120" indent="-190080">
+            <a:pPr marL="195120" indent="-189720">
               <a:lnSpc>
                 <a:spcPct val="100000"/>
               </a:lnSpc>
@@ -6836,7 +6865,7 @@
             </a:endParaRPr>
           </a:p>
           <a:p>
-            <a:pPr marL="195120" indent="-190080">
+            <a:pPr marL="195120" indent="-189720">
               <a:lnSpc>
                 <a:spcPct val="100000"/>
               </a:lnSpc>
@@ -6865,7 +6894,7 @@
             </a:endParaRPr>
           </a:p>
           <a:p>
-            <a:pPr lvl="1" marL="652320" indent="-190080">
+            <a:pPr lvl="1" marL="652320" indent="-189720">
               <a:lnSpc>
                 <a:spcPct val="100000"/>
               </a:lnSpc>
@@ -6916,7 +6945,7 @@
             </a:endParaRPr>
           </a:p>
           <a:p>
-            <a:pPr lvl="3" marL="864000" indent="-212400">
+            <a:pPr lvl="3" marL="864000" indent="-212040">
               <a:lnSpc>
                 <a:spcPct val="100000"/>
               </a:lnSpc>
@@ -6945,7 +6974,7 @@
             </a:endParaRPr>
           </a:p>
           <a:p>
-            <a:pPr lvl="1" marL="652320" indent="-190080">
+            <a:pPr lvl="1" marL="652320" indent="-189720">
               <a:lnSpc>
                 <a:spcPct val="100000"/>
               </a:lnSpc>
@@ -6974,7 +7003,7 @@
             </a:endParaRPr>
           </a:p>
           <a:p>
-            <a:pPr lvl="1" marL="652320" indent="-190080">
+            <a:pPr lvl="1" marL="652320" indent="-189720">
               <a:lnSpc>
                 <a:spcPct val="100000"/>
               </a:lnSpc>
@@ -7003,7 +7032,7 @@
             </a:endParaRPr>
           </a:p>
           <a:p>
-            <a:pPr lvl="1" marL="652320" indent="-190080">
+            <a:pPr lvl="1" marL="652320" indent="-189720">
               <a:lnSpc>
                 <a:spcPct val="100000"/>
               </a:lnSpc>
@@ -7203,7 +7232,7 @@
         <p:spPr>
           <a:xfrm>
             <a:off x="335520" y="764640"/>
-            <a:ext cx="10743120" cy="493920"/>
+            <a:ext cx="10742760" cy="493560"/>
           </a:xfrm>
           <a:prstGeom prst="rect">
             <a:avLst/>
@@ -7274,7 +7303,7 @@
         <p:spPr>
           <a:xfrm>
             <a:off x="335520" y="1268640"/>
-            <a:ext cx="10743120" cy="5030640"/>
+            <a:ext cx="10742760" cy="5030280"/>
           </a:xfrm>
           <a:prstGeom prst="rect">
             <a:avLst/>
@@ -7295,7 +7324,7 @@
             <a:noAutofit/>
           </a:bodyPr>
           <a:p>
-            <a:pPr marL="195120" indent="-189000">
+            <a:pPr marL="195120" indent="-188640">
               <a:lnSpc>
                 <a:spcPct val="100000"/>
               </a:lnSpc>
@@ -7335,7 +7364,7 @@
             </a:endParaRPr>
           </a:p>
           <a:p>
-            <a:pPr lvl="1" marL="432000" indent="-211680">
+            <a:pPr lvl="1" marL="432000" indent="-211320">
               <a:lnSpc>
                 <a:spcPct val="100000"/>
               </a:lnSpc>
@@ -7384,7 +7413,7 @@
             </a:endParaRPr>
           </a:p>
           <a:p>
-            <a:pPr lvl="1" marL="432000" indent="-211680">
+            <a:pPr lvl="1" marL="432000" indent="-211320">
               <a:lnSpc>
                 <a:spcPct val="100000"/>
               </a:lnSpc>
@@ -7426,7 +7455,7 @@
             </a:endParaRPr>
           </a:p>
           <a:p>
-            <a:pPr marL="195120" indent="-189000">
+            <a:pPr marL="195120" indent="-188640">
               <a:lnSpc>
                 <a:spcPct val="100000"/>
               </a:lnSpc>
@@ -7456,7 +7485,7 @@
             </a:endParaRPr>
           </a:p>
           <a:p>
-            <a:pPr lvl="1" marL="432000" indent="-211680">
+            <a:pPr lvl="1" marL="432000" indent="-211320">
               <a:lnSpc>
                 <a:spcPct val="100000"/>
               </a:lnSpc>
@@ -7545,7 +7574,7 @@
             </a:endParaRPr>
           </a:p>
           <a:p>
-            <a:pPr lvl="1" marL="432000" indent="-211680">
+            <a:pPr lvl="1" marL="432000" indent="-211320">
               <a:lnSpc>
                 <a:spcPct val="100000"/>
               </a:lnSpc>
@@ -7609,7 +7638,7 @@
             </a:endParaRPr>
           </a:p>
           <a:p>
-            <a:pPr marL="195120" indent="-189000">
+            <a:pPr marL="195120" indent="-188640">
               <a:lnSpc>
                 <a:spcPct val="100000"/>
               </a:lnSpc>
@@ -7639,7 +7668,7 @@
             </a:endParaRPr>
           </a:p>
           <a:p>
-            <a:pPr lvl="1" marL="432000" indent="-211680">
+            <a:pPr lvl="1" marL="432000" indent="-211320">
               <a:lnSpc>
                 <a:spcPct val="100000"/>
               </a:lnSpc>
@@ -7728,7 +7757,7 @@
             </a:endParaRPr>
           </a:p>
           <a:p>
-            <a:pPr lvl="1" marL="432000" indent="-211680">
+            <a:pPr lvl="1" marL="432000" indent="-211320">
               <a:lnSpc>
                 <a:spcPct val="100000"/>
               </a:lnSpc>
@@ -7819,7 +7848,7 @@
         <p:spPr>
           <a:xfrm>
             <a:off x="335520" y="764640"/>
-            <a:ext cx="10744560" cy="495360"/>
+            <a:ext cx="10744200" cy="495000"/>
           </a:xfrm>
           <a:prstGeom prst="rect">
             <a:avLst/>
@@ -7870,7 +7899,7 @@
         <p:spPr>
           <a:xfrm>
             <a:off x="335520" y="1268280"/>
-            <a:ext cx="10744560" cy="5032080"/>
+            <a:ext cx="10744200" cy="5031720"/>
           </a:xfrm>
           <a:prstGeom prst="rect">
             <a:avLst/>
@@ -7901,7 +7930,7 @@
             </a:endParaRPr>
           </a:p>
           <a:p>
-            <a:pPr marL="195120" indent="-190080">
+            <a:pPr marL="195120" indent="-189720">
               <a:lnSpc>
                 <a:spcPct val="100000"/>
               </a:lnSpc>
@@ -7970,7 +7999,7 @@
             </a:endParaRPr>
           </a:p>
           <a:p>
-            <a:pPr marL="195120" indent="-190080">
+            <a:pPr marL="195120" indent="-189720">
               <a:lnSpc>
                 <a:spcPct val="100000"/>
               </a:lnSpc>
@@ -7999,7 +8028,7 @@
             </a:endParaRPr>
           </a:p>
           <a:p>
-            <a:pPr marL="195120" indent="-190080">
+            <a:pPr marL="195120" indent="-189720">
               <a:lnSpc>
                 <a:spcPct val="100000"/>
               </a:lnSpc>
@@ -8028,7 +8057,7 @@
             </a:endParaRPr>
           </a:p>
           <a:p>
-            <a:pPr marL="195120" indent="-190080">
+            <a:pPr marL="195120" indent="-189720">
               <a:lnSpc>
                 <a:spcPct val="100000"/>
               </a:lnSpc>
@@ -8057,7 +8086,7 @@
             </a:endParaRPr>
           </a:p>
           <a:p>
-            <a:pPr marL="195120" indent="-190080">
+            <a:pPr marL="195120" indent="-189720">
               <a:lnSpc>
                 <a:spcPct val="100000"/>
               </a:lnSpc>
@@ -8116,7 +8145,7 @@
             </a:endParaRPr>
           </a:p>
           <a:p>
-            <a:pPr marL="195120" indent="-190080">
+            <a:pPr marL="195120" indent="-189720">
               <a:lnSpc>
                 <a:spcPct val="100000"/>
               </a:lnSpc>
@@ -8146,7 +8175,7 @@
             </a:endParaRPr>
           </a:p>
           <a:p>
-            <a:pPr marL="195120" indent="-190080">
+            <a:pPr marL="195120" indent="-189720">
               <a:lnSpc>
                 <a:spcPct val="100000"/>
               </a:lnSpc>
@@ -8175,7 +8204,7 @@
             </a:endParaRPr>
           </a:p>
           <a:p>
-            <a:pPr marL="195120" indent="-190080">
+            <a:pPr marL="195120" indent="-189720">
               <a:lnSpc>
                 <a:spcPct val="100000"/>
               </a:lnSpc>
@@ -8244,7 +8273,7 @@
         <p:spPr>
           <a:xfrm>
             <a:off x="335520" y="764640"/>
-            <a:ext cx="10744560" cy="495360"/>
+            <a:ext cx="10744200" cy="495000"/>
           </a:xfrm>
           <a:prstGeom prst="rect">
             <a:avLst/>
@@ -8295,7 +8324,7 @@
         <p:spPr>
           <a:xfrm>
             <a:off x="335520" y="1268280"/>
-            <a:ext cx="10744560" cy="5032080"/>
+            <a:ext cx="10744200" cy="5031720"/>
           </a:xfrm>
           <a:prstGeom prst="rect">
             <a:avLst/>
@@ -8316,7 +8345,7 @@
             <a:noAutofit/>
           </a:bodyPr>
           <a:p>
-            <a:pPr marL="216000" indent="-214200">
+            <a:pPr marL="216000" indent="-213840">
               <a:lnSpc>
                 <a:spcPct val="100000"/>
               </a:lnSpc>
@@ -8342,7 +8371,7 @@
             </a:endParaRPr>
           </a:p>
           <a:p>
-            <a:pPr lvl="1" marL="432000" indent="-214200">
+            <a:pPr lvl="1" marL="432000" indent="-213840">
               <a:lnSpc>
                 <a:spcPct val="100000"/>
               </a:lnSpc>
@@ -8371,7 +8400,7 @@
             </a:endParaRPr>
           </a:p>
           <a:p>
-            <a:pPr lvl="1" marL="432000" indent="-214200">
+            <a:pPr lvl="1" marL="432000" indent="-213840">
               <a:lnSpc>
                 <a:spcPct val="100000"/>
               </a:lnSpc>
@@ -8400,7 +8429,7 @@
             </a:endParaRPr>
           </a:p>
           <a:p>
-            <a:pPr lvl="1" marL="432000" indent="-214200">
+            <a:pPr lvl="1" marL="432000" indent="-213840">
               <a:lnSpc>
                 <a:spcPct val="100000"/>
               </a:lnSpc>
@@ -8429,7 +8458,7 @@
             </a:endParaRPr>
           </a:p>
           <a:p>
-            <a:pPr lvl="1" marL="432000" indent="-214200">
+            <a:pPr lvl="1" marL="432000" indent="-213840">
               <a:lnSpc>
                 <a:spcPct val="100000"/>
               </a:lnSpc>
@@ -8458,7 +8487,7 @@
             </a:endParaRPr>
           </a:p>
           <a:p>
-            <a:pPr lvl="1" marL="432000" indent="-214200">
+            <a:pPr lvl="1" marL="432000" indent="-213840">
               <a:lnSpc>
                 <a:spcPct val="100000"/>
               </a:lnSpc>
@@ -8527,7 +8556,7 @@
         <p:spPr>
           <a:xfrm>
             <a:off x="335520" y="764640"/>
-            <a:ext cx="10744560" cy="495360"/>
+            <a:ext cx="10744200" cy="495000"/>
           </a:xfrm>
           <a:prstGeom prst="rect">
             <a:avLst/>
@@ -8578,7 +8607,7 @@
         <p:spPr>
           <a:xfrm>
             <a:off x="335520" y="1268640"/>
-            <a:ext cx="10744560" cy="5032080"/>
+            <a:ext cx="10744200" cy="5031720"/>
           </a:xfrm>
           <a:prstGeom prst="rect">
             <a:avLst/>
@@ -8599,7 +8628,7 @@
             <a:noAutofit/>
           </a:bodyPr>
           <a:p>
-            <a:pPr marL="216000" indent="-214200">
+            <a:pPr marL="216000" indent="-213840">
               <a:lnSpc>
                 <a:spcPct val="100000"/>
               </a:lnSpc>
@@ -8628,7 +8657,7 @@
             </a:endParaRPr>
           </a:p>
           <a:p>
-            <a:pPr marL="216000" indent="-214200">
+            <a:pPr marL="216000" indent="-213840">
               <a:lnSpc>
                 <a:spcPct val="100000"/>
               </a:lnSpc>
@@ -8657,7 +8686,7 @@
             </a:endParaRPr>
           </a:p>
           <a:p>
-            <a:pPr marL="216000" indent="-214200">
+            <a:pPr marL="216000" indent="-213840">
               <a:lnSpc>
                 <a:spcPct val="100000"/>
               </a:lnSpc>
@@ -8706,7 +8735,7 @@
             </a:endParaRPr>
           </a:p>
           <a:p>
-            <a:pPr lvl="1" marL="432000" indent="-214200">
+            <a:pPr lvl="1" marL="432000" indent="-213840">
               <a:lnSpc>
                 <a:spcPct val="100000"/>
               </a:lnSpc>
@@ -8735,7 +8764,7 @@
             </a:endParaRPr>
           </a:p>
           <a:p>
-            <a:pPr lvl="1" marL="432000" indent="-214200">
+            <a:pPr lvl="1" marL="432000" indent="-213840">
               <a:lnSpc>
                 <a:spcPct val="100000"/>
               </a:lnSpc>
@@ -8794,7 +8823,7 @@
         <p:spPr>
           <a:xfrm>
             <a:off x="4655880" y="476640"/>
-            <a:ext cx="2430720" cy="356760"/>
+            <a:ext cx="2430360" cy="356400"/>
           </a:xfrm>
           <a:prstGeom prst="rect">
             <a:avLst/>
@@ -8850,7 +8879,7 @@
         <p:spPr>
           <a:xfrm>
             <a:off x="335520" y="764640"/>
-            <a:ext cx="10742400" cy="493200"/>
+            <a:ext cx="10742040" cy="492840"/>
           </a:xfrm>
           <a:prstGeom prst="rect">
             <a:avLst/>
@@ -8901,7 +8930,7 @@
         <p:spPr>
           <a:xfrm>
             <a:off x="335520" y="1268640"/>
-            <a:ext cx="10742400" cy="5029920"/>
+            <a:ext cx="10742040" cy="5029560"/>
           </a:xfrm>
           <a:prstGeom prst="rect">
             <a:avLst/>
@@ -8958,7 +8987,7 @@
         <p:spPr>
           <a:xfrm>
             <a:off x="336600" y="3429000"/>
-            <a:ext cx="10860120" cy="2052000"/>
+            <a:ext cx="10859760" cy="2051640"/>
           </a:xfrm>
           <a:prstGeom prst="rect">
             <a:avLst/>
@@ -8979,7 +9008,7 @@
             <a:noAutofit/>
           </a:bodyPr>
           <a:p>
-            <a:pPr marL="216000" indent="-213120">
+            <a:pPr marL="216000" indent="-212760">
               <a:lnSpc>
                 <a:spcPct val="100000"/>
               </a:lnSpc>
@@ -9053,7 +9082,7 @@
             </a:endParaRPr>
           </a:p>
           <a:p>
-            <a:pPr marL="216000" indent="-213120">
+            <a:pPr marL="216000" indent="-212760">
               <a:lnSpc>
                 <a:spcPct val="100000"/>
               </a:lnSpc>
@@ -9147,7 +9176,7 @@
         <p:spPr>
           <a:xfrm>
             <a:off x="335520" y="764640"/>
-            <a:ext cx="10744560" cy="495360"/>
+            <a:ext cx="10744200" cy="495000"/>
           </a:xfrm>
           <a:prstGeom prst="rect">
             <a:avLst/>
@@ -9198,7 +9227,7 @@
         <p:spPr>
           <a:xfrm>
             <a:off x="335520" y="1268640"/>
-            <a:ext cx="10744560" cy="5032080"/>
+            <a:ext cx="10744200" cy="5031720"/>
           </a:xfrm>
           <a:prstGeom prst="rect">
             <a:avLst/>
@@ -9219,7 +9248,7 @@
             <a:noAutofit/>
           </a:bodyPr>
           <a:p>
-            <a:pPr marL="195120" indent="-190080">
+            <a:pPr marL="195120" indent="-189720">
               <a:lnSpc>
                 <a:spcPct val="100000"/>
               </a:lnSpc>
@@ -9248,7 +9277,7 @@
             </a:endParaRPr>
           </a:p>
           <a:p>
-            <a:pPr marL="195120" indent="-190080">
+            <a:pPr marL="195120" indent="-189720">
               <a:lnSpc>
                 <a:spcPct val="100000"/>
               </a:lnSpc>
@@ -9277,7 +9306,7 @@
             </a:endParaRPr>
           </a:p>
           <a:p>
-            <a:pPr marL="195120" indent="-190080">
+            <a:pPr marL="195120" indent="-189720">
               <a:lnSpc>
                 <a:spcPct val="100000"/>
               </a:lnSpc>
@@ -9316,7 +9345,7 @@
         <p:spPr>
           <a:xfrm>
             <a:off x="4655880" y="476640"/>
-            <a:ext cx="2430720" cy="356760"/>
+            <a:ext cx="2430360" cy="356400"/>
           </a:xfrm>
           <a:prstGeom prst="rect">
             <a:avLst/>
@@ -9372,7 +9401,7 @@
         <p:spPr>
           <a:xfrm>
             <a:off x="335520" y="840960"/>
-            <a:ext cx="10744560" cy="495360"/>
+            <a:ext cx="10744200" cy="495000"/>
           </a:xfrm>
           <a:prstGeom prst="rect">
             <a:avLst/>
@@ -9423,7 +9452,7 @@
         <p:spPr>
           <a:xfrm>
             <a:off x="388800" y="1488600"/>
-            <a:ext cx="10722960" cy="5204520"/>
+            <a:ext cx="10722600" cy="5204520"/>
           </a:xfrm>
           <a:prstGeom prst="rect">
             <a:avLst/>
@@ -9474,7 +9503,7 @@
             </a:endParaRPr>
           </a:p>
           <a:p>
-            <a:pPr marL="216000" indent="-214200">
+            <a:pPr marL="216000" indent="-213840">
               <a:lnSpc>
                 <a:spcPct val="100000"/>
               </a:lnSpc>
@@ -9520,7 +9549,7 @@
             </a:endParaRPr>
           </a:p>
           <a:p>
-            <a:pPr marL="216000" indent="-214200">
+            <a:pPr marL="216000" indent="-213840">
               <a:lnSpc>
                 <a:spcPct val="100000"/>
               </a:lnSpc>
@@ -9566,7 +9595,7 @@
             </a:endParaRPr>
           </a:p>
           <a:p>
-            <a:pPr marL="216000" indent="-214200">
+            <a:pPr marL="216000" indent="-213840">
               <a:lnSpc>
                 <a:spcPct val="100000"/>
               </a:lnSpc>
@@ -9592,7 +9621,7 @@
             </a:endParaRPr>
           </a:p>
           <a:p>
-            <a:pPr marL="216000" indent="-214200">
+            <a:pPr marL="216000" indent="-213840">
               <a:lnSpc>
                 <a:spcPct val="100000"/>
               </a:lnSpc>
@@ -9628,7 +9657,7 @@
             </a:endParaRPr>
           </a:p>
           <a:p>
-            <a:pPr marL="216000" indent="-214200">
+            <a:pPr marL="216000" indent="-213840">
               <a:lnSpc>
                 <a:spcPct val="100000"/>
               </a:lnSpc>
@@ -9654,7 +9683,7 @@
             </a:endParaRPr>
           </a:p>
           <a:p>
-            <a:pPr marL="216000" indent="-214200">
+            <a:pPr marL="216000" indent="-213840">
               <a:lnSpc>
                 <a:spcPct val="100000"/>
               </a:lnSpc>
@@ -9680,7 +9709,7 @@
             </a:endParaRPr>
           </a:p>
           <a:p>
-            <a:pPr marL="216000" indent="-214200">
+            <a:pPr marL="216000" indent="-213840">
               <a:lnSpc>
                 <a:spcPct val="100000"/>
               </a:lnSpc>
@@ -9716,7 +9745,7 @@
             </a:endParaRPr>
           </a:p>
           <a:p>
-            <a:pPr marL="216000" indent="-214200">
+            <a:pPr marL="216000" indent="-213840">
               <a:lnSpc>
                 <a:spcPct val="100000"/>
               </a:lnSpc>
@@ -9742,7 +9771,7 @@
             </a:endParaRPr>
           </a:p>
           <a:p>
-            <a:pPr marL="216000" indent="-214200">
+            <a:pPr marL="216000" indent="-213840">
               <a:lnSpc>
                 <a:spcPct val="100000"/>
               </a:lnSpc>
@@ -9788,7 +9817,7 @@
             </a:endParaRPr>
           </a:p>
           <a:p>
-            <a:pPr marL="216000" indent="-214200">
+            <a:pPr marL="216000" indent="-213840">
               <a:lnSpc>
                 <a:spcPct val="100000"/>
               </a:lnSpc>
@@ -9824,7 +9853,7 @@
             </a:endParaRPr>
           </a:p>
           <a:p>
-            <a:pPr marL="216000" indent="-214200">
+            <a:pPr marL="216000" indent="-213840">
               <a:lnSpc>
                 <a:spcPct val="100000"/>
               </a:lnSpc>
@@ -9890,7 +9919,7 @@
             </a:endParaRPr>
           </a:p>
           <a:p>
-            <a:pPr marL="216000" indent="-214200">
+            <a:pPr marL="216000" indent="-213840">
               <a:lnSpc>
                 <a:spcPct val="100000"/>
               </a:lnSpc>
@@ -9926,7 +9955,7 @@
             </a:endParaRPr>
           </a:p>
           <a:p>
-            <a:pPr marL="216000" indent="-214200">
+            <a:pPr marL="216000" indent="-213840">
               <a:lnSpc>
                 <a:spcPct val="100000"/>
               </a:lnSpc>
@@ -9992,7 +10021,7 @@
         <p:spPr>
           <a:xfrm>
             <a:off x="335520" y="764640"/>
-            <a:ext cx="10744560" cy="495360"/>
+            <a:ext cx="10744200" cy="495000"/>
           </a:xfrm>
           <a:prstGeom prst="rect">
             <a:avLst/>
@@ -10043,7 +10072,7 @@
         <p:spPr>
           <a:xfrm>
             <a:off x="4655880" y="476640"/>
-            <a:ext cx="2430720" cy="356760"/>
+            <a:ext cx="2430360" cy="356400"/>
           </a:xfrm>
           <a:prstGeom prst="rect">
             <a:avLst/>
@@ -10069,7 +10098,7 @@
         <p:spPr>
           <a:xfrm>
             <a:off x="494640" y="1523880"/>
-            <a:ext cx="10363320" cy="478440"/>
+            <a:ext cx="10362960" cy="478080"/>
           </a:xfrm>
           <a:prstGeom prst="rect">
             <a:avLst/>
@@ -10119,13 +10148,13 @@
         </p:nvPicPr>
         <p:blipFill>
           <a:blip r:embed="rId1"/>
-          <a:srcRect l="0" t="0" r="0" b="43284"/>
+          <a:srcRect l="0" t="0" r="0" b="43280"/>
           <a:stretch/>
         </p:blipFill>
         <p:spPr>
           <a:xfrm>
             <a:off x="609120" y="2057760"/>
-            <a:ext cx="9515880" cy="3880080"/>
+            <a:ext cx="9515520" cy="3879720"/>
           </a:xfrm>
           <a:prstGeom prst="rect">
             <a:avLst/>
@@ -10174,7 +10203,7 @@
         <p:spPr>
           <a:xfrm>
             <a:off x="335520" y="764640"/>
-            <a:ext cx="10744560" cy="495360"/>
+            <a:ext cx="10744200" cy="495000"/>
           </a:xfrm>
           <a:prstGeom prst="rect">
             <a:avLst/>
@@ -10225,7 +10254,7 @@
         <p:spPr>
           <a:xfrm>
             <a:off x="4655880" y="476640"/>
-            <a:ext cx="2430720" cy="356760"/>
+            <a:ext cx="2430360" cy="356400"/>
           </a:xfrm>
           <a:prstGeom prst="rect">
             <a:avLst/>
@@ -10251,7 +10280,7 @@
         <p:spPr>
           <a:xfrm>
             <a:off x="494640" y="1474920"/>
-            <a:ext cx="10363320" cy="478440"/>
+            <a:ext cx="10362960" cy="478080"/>
           </a:xfrm>
           <a:prstGeom prst="rect">
             <a:avLst/>
@@ -10317,7 +10346,7 @@
         <p:spPr>
           <a:xfrm>
             <a:off x="446400" y="2185200"/>
-            <a:ext cx="9403200" cy="3846240"/>
+            <a:ext cx="9402840" cy="3845880"/>
           </a:xfrm>
           <a:prstGeom prst="rect">
             <a:avLst/>
@@ -10366,7 +10395,7 @@
         <p:spPr>
           <a:xfrm>
             <a:off x="335520" y="764640"/>
-            <a:ext cx="10744560" cy="495360"/>
+            <a:ext cx="10744200" cy="495000"/>
           </a:xfrm>
           <a:prstGeom prst="rect">
             <a:avLst/>
@@ -10417,7 +10446,7 @@
         <p:spPr>
           <a:xfrm>
             <a:off x="4655880" y="476640"/>
-            <a:ext cx="2430720" cy="356760"/>
+            <a:ext cx="2430360" cy="356400"/>
           </a:xfrm>
           <a:prstGeom prst="rect">
             <a:avLst/>
@@ -10443,7 +10472,7 @@
         <p:spPr>
           <a:xfrm>
             <a:off x="494640" y="1523880"/>
-            <a:ext cx="10363320" cy="478440"/>
+            <a:ext cx="10362960" cy="478080"/>
           </a:xfrm>
           <a:prstGeom prst="rect">
             <a:avLst/>
@@ -10499,7 +10528,7 @@
         <p:spPr>
           <a:xfrm>
             <a:off x="494640" y="2088360"/>
-            <a:ext cx="8940960" cy="3962520"/>
+            <a:ext cx="8940600" cy="3962160"/>
           </a:xfrm>
           <a:prstGeom prst="rect">
             <a:avLst/>
@@ -10548,7 +10577,7 @@
         <p:spPr>
           <a:xfrm>
             <a:off x="335520" y="764640"/>
-            <a:ext cx="10744560" cy="495360"/>
+            <a:ext cx="10744200" cy="495000"/>
           </a:xfrm>
           <a:prstGeom prst="rect">
             <a:avLst/>
@@ -10599,7 +10628,7 @@
         <p:spPr>
           <a:xfrm>
             <a:off x="4655880" y="476640"/>
-            <a:ext cx="2430720" cy="356760"/>
+            <a:ext cx="2430360" cy="356400"/>
           </a:xfrm>
           <a:prstGeom prst="rect">
             <a:avLst/>
@@ -10625,7 +10654,7 @@
         <p:spPr>
           <a:xfrm>
             <a:off x="494640" y="1523880"/>
-            <a:ext cx="10363320" cy="478440"/>
+            <a:ext cx="10362960" cy="478080"/>
           </a:xfrm>
           <a:prstGeom prst="rect">
             <a:avLst/>
@@ -10681,7 +10710,7 @@
         <p:spPr>
           <a:xfrm>
             <a:off x="494640" y="2166840"/>
-            <a:ext cx="8336520" cy="4177800"/>
+            <a:ext cx="8336160" cy="4177440"/>
           </a:xfrm>
           <a:prstGeom prst="rect">
             <a:avLst/>
@@ -10730,7 +10759,7 @@
         <p:spPr>
           <a:xfrm>
             <a:off x="335520" y="768240"/>
-            <a:ext cx="10744560" cy="495360"/>
+            <a:ext cx="10744200" cy="495000"/>
           </a:xfrm>
           <a:prstGeom prst="rect">
             <a:avLst/>
@@ -10781,7 +10810,7 @@
         <p:spPr>
           <a:xfrm>
             <a:off x="388800" y="1488600"/>
-            <a:ext cx="10718280" cy="5204520"/>
+            <a:ext cx="10717920" cy="5204520"/>
           </a:xfrm>
           <a:prstGeom prst="rect">
             <a:avLst/>
@@ -10832,7 +10861,7 @@
             </a:endParaRPr>
           </a:p>
           <a:p>
-            <a:pPr marL="216000" indent="-212400">
+            <a:pPr marL="216000" indent="-212040">
               <a:lnSpc>
                 <a:spcPct val="100000"/>
               </a:lnSpc>
@@ -10888,7 +10917,7 @@
             </a:endParaRPr>
           </a:p>
           <a:p>
-            <a:pPr marL="216000" indent="-212400">
+            <a:pPr marL="216000" indent="-212040">
               <a:lnSpc>
                 <a:spcPct val="100000"/>
               </a:lnSpc>
@@ -10944,7 +10973,7 @@
             </a:endParaRPr>
           </a:p>
           <a:p>
-            <a:pPr marL="216000" indent="-212400">
+            <a:pPr marL="216000" indent="-212040">
               <a:lnSpc>
                 <a:spcPct val="100000"/>
               </a:lnSpc>
@@ -10970,7 +10999,7 @@
             </a:endParaRPr>
           </a:p>
           <a:p>
-            <a:pPr marL="216000" indent="-212400">
+            <a:pPr marL="216000" indent="-212040">
               <a:lnSpc>
                 <a:spcPct val="100000"/>
               </a:lnSpc>
@@ -11006,7 +11035,7 @@
             </a:endParaRPr>
           </a:p>
           <a:p>
-            <a:pPr marL="216000" indent="-212400">
+            <a:pPr marL="216000" indent="-212040">
               <a:lnSpc>
                 <a:spcPct val="100000"/>
               </a:lnSpc>
@@ -11032,7 +11061,7 @@
             </a:endParaRPr>
           </a:p>
           <a:p>
-            <a:pPr marL="216000" indent="-212400">
+            <a:pPr marL="216000" indent="-212040">
               <a:lnSpc>
                 <a:spcPct val="100000"/>
               </a:lnSpc>
@@ -11058,7 +11087,7 @@
             </a:endParaRPr>
           </a:p>
           <a:p>
-            <a:pPr marL="216000" indent="-212400">
+            <a:pPr marL="216000" indent="-212040">
               <a:lnSpc>
                 <a:spcPct val="100000"/>
               </a:lnSpc>
@@ -11094,7 +11123,7 @@
             </a:endParaRPr>
           </a:p>
           <a:p>
-            <a:pPr marL="216000" indent="-212400">
+            <a:pPr marL="216000" indent="-212040">
               <a:lnSpc>
                 <a:spcPct val="100000"/>
               </a:lnSpc>
@@ -11120,7 +11149,7 @@
             </a:endParaRPr>
           </a:p>
           <a:p>
-            <a:pPr marL="216000" indent="-212400">
+            <a:pPr marL="216000" indent="-212040">
               <a:lnSpc>
                 <a:spcPct val="100000"/>
               </a:lnSpc>
@@ -11166,7 +11195,7 @@
             </a:endParaRPr>
           </a:p>
           <a:p>
-            <a:pPr marL="216000" indent="-212400">
+            <a:pPr marL="216000" indent="-212040">
               <a:lnSpc>
                 <a:spcPct val="100000"/>
               </a:lnSpc>
@@ -11202,7 +11231,7 @@
             </a:endParaRPr>
           </a:p>
           <a:p>
-            <a:pPr marL="216000" indent="-212400">
+            <a:pPr marL="216000" indent="-212040">
               <a:lnSpc>
                 <a:spcPct val="100000"/>
               </a:lnSpc>
@@ -11268,7 +11297,7 @@
             </a:endParaRPr>
           </a:p>
           <a:p>
-            <a:pPr marL="216000" indent="-212400">
+            <a:pPr marL="216000" indent="-212040">
               <a:lnSpc>
                 <a:spcPct val="100000"/>
               </a:lnSpc>
@@ -11304,7 +11333,7 @@
             </a:endParaRPr>
           </a:p>
           <a:p>
-            <a:pPr marL="216000" indent="-212400">
+            <a:pPr marL="216000" indent="-212040">
               <a:lnSpc>
                 <a:spcPct val="100000"/>
               </a:lnSpc>
@@ -11370,7 +11399,7 @@
         <p:spPr>
           <a:xfrm>
             <a:off x="335520" y="764640"/>
-            <a:ext cx="10744560" cy="495360"/>
+            <a:ext cx="10744200" cy="495000"/>
           </a:xfrm>
           <a:prstGeom prst="rect">
             <a:avLst/>
@@ -11421,7 +11450,7 @@
         <p:spPr>
           <a:xfrm>
             <a:off x="494640" y="1523880"/>
-            <a:ext cx="10363320" cy="478440"/>
+            <a:ext cx="10362960" cy="478080"/>
           </a:xfrm>
           <a:prstGeom prst="rect">
             <a:avLst/>
@@ -11511,7 +11540,7 @@
         <p:spPr>
           <a:xfrm>
             <a:off x="1895760" y="2238840"/>
-            <a:ext cx="6785640" cy="4156560"/>
+            <a:ext cx="6785280" cy="4156200"/>
           </a:xfrm>
           <a:prstGeom prst="rect">
             <a:avLst/>
@@ -11560,7 +11589,7 @@
         <p:spPr>
           <a:xfrm>
             <a:off x="335520" y="764640"/>
-            <a:ext cx="10744560" cy="495360"/>
+            <a:ext cx="10744200" cy="495000"/>
           </a:xfrm>
           <a:prstGeom prst="rect">
             <a:avLst/>
@@ -11611,7 +11640,7 @@
         <p:spPr>
           <a:xfrm>
             <a:off x="494640" y="1488600"/>
-            <a:ext cx="5446080" cy="443160"/>
+            <a:ext cx="5445720" cy="442800"/>
           </a:xfrm>
           <a:prstGeom prst="rect">
             <a:avLst/>
@@ -11677,7 +11706,7 @@
         <p:spPr>
           <a:xfrm>
             <a:off x="1828800" y="1937160"/>
-            <a:ext cx="7953120" cy="4087440"/>
+            <a:ext cx="7952760" cy="4087080"/>
           </a:xfrm>
           <a:prstGeom prst="rect">
             <a:avLst/>
@@ -11726,7 +11755,7 @@
         <p:spPr>
           <a:xfrm>
             <a:off x="335520" y="764640"/>
-            <a:ext cx="10744560" cy="495360"/>
+            <a:ext cx="10744200" cy="495000"/>
           </a:xfrm>
           <a:prstGeom prst="rect">
             <a:avLst/>
@@ -11781,7 +11810,7 @@
         <p:spPr>
           <a:xfrm>
             <a:off x="2679480" y="2130480"/>
-            <a:ext cx="7373520" cy="3484440"/>
+            <a:ext cx="7373160" cy="3484080"/>
           </a:xfrm>
           <a:prstGeom prst="rect">
             <a:avLst/>
@@ -11800,7 +11829,7 @@
         <p:spPr>
           <a:xfrm>
             <a:off x="494640" y="1418040"/>
-            <a:ext cx="5217480" cy="443160"/>
+            <a:ext cx="5217120" cy="442800"/>
           </a:xfrm>
           <a:prstGeom prst="rect">
             <a:avLst/>
@@ -11881,7 +11910,7 @@
         <p:spPr>
           <a:xfrm>
             <a:off x="335520" y="764640"/>
-            <a:ext cx="10744560" cy="495360"/>
+            <a:ext cx="10744200" cy="495000"/>
           </a:xfrm>
           <a:prstGeom prst="rect">
             <a:avLst/>
@@ -11936,7 +11965,7 @@
         <p:spPr>
           <a:xfrm>
             <a:off x="2394720" y="1153800"/>
-            <a:ext cx="1467360" cy="2168640"/>
+            <a:ext cx="1467000" cy="2168280"/>
           </a:xfrm>
           <a:prstGeom prst="rect">
             <a:avLst/>
@@ -11959,7 +11988,7 @@
         <p:spPr>
           <a:xfrm>
             <a:off x="7250040" y="1153800"/>
-            <a:ext cx="1732680" cy="2168640"/>
+            <a:ext cx="1732320" cy="2168280"/>
           </a:xfrm>
           <a:prstGeom prst="rect">
             <a:avLst/>
@@ -11982,7 +12011,7 @@
         <p:spPr>
           <a:xfrm>
             <a:off x="4846320" y="4206240"/>
-            <a:ext cx="1781280" cy="1773360"/>
+            <a:ext cx="1780920" cy="1773000"/>
           </a:xfrm>
           <a:prstGeom prst="rect">
             <a:avLst/>
@@ -12001,7 +12030,7 @@
         <p:spPr>
           <a:xfrm>
             <a:off x="1330200" y="3269880"/>
-            <a:ext cx="3632040" cy="673560"/>
+            <a:ext cx="3631680" cy="673200"/>
           </a:xfrm>
           <a:prstGeom prst="rect">
             <a:avLst/>
@@ -12078,7 +12107,7 @@
         <p:spPr>
           <a:xfrm>
             <a:off x="6321600" y="3269880"/>
-            <a:ext cx="3632040" cy="673560"/>
+            <a:ext cx="3631680" cy="673200"/>
           </a:xfrm>
           <a:prstGeom prst="rect">
             <a:avLst/>
@@ -12155,7 +12184,7 @@
         <p:spPr>
           <a:xfrm>
             <a:off x="1312200" y="5920200"/>
-            <a:ext cx="3632040" cy="673560"/>
+            <a:ext cx="3631680" cy="673200"/>
           </a:xfrm>
           <a:prstGeom prst="rect">
             <a:avLst/>
@@ -12212,7 +12241,7 @@
         <p:spPr>
           <a:xfrm>
             <a:off x="3950640" y="5903280"/>
-            <a:ext cx="3632040" cy="673560"/>
+            <a:ext cx="3631680" cy="673200"/>
           </a:xfrm>
           <a:prstGeom prst="rect">
             <a:avLst/>
@@ -12323,7 +12352,7 @@
         <p:spPr>
           <a:xfrm>
             <a:off x="685800" y="2514600"/>
-            <a:ext cx="8871480" cy="3837960"/>
+            <a:ext cx="8871120" cy="3837600"/>
           </a:xfrm>
           <a:prstGeom prst="rect">
             <a:avLst/>
@@ -12342,7 +12371,7 @@
         <p:spPr>
           <a:xfrm>
             <a:off x="335520" y="764640"/>
-            <a:ext cx="10744560" cy="495360"/>
+            <a:ext cx="10744200" cy="495000"/>
           </a:xfrm>
           <a:prstGeom prst="rect">
             <a:avLst/>
@@ -12393,7 +12422,7 @@
         <p:spPr>
           <a:xfrm>
             <a:off x="494640" y="1312200"/>
-            <a:ext cx="1734480" cy="365760"/>
+            <a:ext cx="1734120" cy="365400"/>
           </a:xfrm>
           <a:prstGeom prst="rect">
             <a:avLst/>
@@ -12569,7 +12598,7 @@
         <p:spPr>
           <a:xfrm>
             <a:off x="642600" y="1679400"/>
-            <a:ext cx="4401360" cy="638280"/>
+            <a:ext cx="4401000" cy="638280"/>
           </a:xfrm>
           <a:prstGeom prst="rect">
             <a:avLst/>
@@ -12640,7 +12669,7 @@
         <p:spPr>
           <a:xfrm>
             <a:off x="6549480" y="1679400"/>
-            <a:ext cx="4875120" cy="631800"/>
+            <a:ext cx="4874760" cy="631440"/>
           </a:xfrm>
           <a:prstGeom prst="rect">
             <a:avLst/>
@@ -12711,7 +12740,7 @@
         <p:spPr>
           <a:xfrm>
             <a:off x="7839360" y="1679400"/>
-            <a:ext cx="2616480" cy="429120"/>
+            <a:ext cx="2616120" cy="428760"/>
           </a:xfrm>
           <a:prstGeom prst="rect">
             <a:avLst/>
@@ -12762,7 +12791,7 @@
         <p:spPr>
           <a:xfrm>
             <a:off x="8857440" y="3943440"/>
-            <a:ext cx="281160" cy="363960"/>
+            <a:ext cx="280800" cy="363960"/>
           </a:xfrm>
           <a:prstGeom prst="rect">
             <a:avLst/>
@@ -12813,7 +12842,7 @@
         <p:spPr>
           <a:xfrm>
             <a:off x="9537840" y="4548960"/>
-            <a:ext cx="281160" cy="363960"/>
+            <a:ext cx="280800" cy="363960"/>
           </a:xfrm>
           <a:prstGeom prst="rect">
             <a:avLst/>
@@ -12864,7 +12893,7 @@
         <p:spPr>
           <a:xfrm>
             <a:off x="7279920" y="6101280"/>
-            <a:ext cx="281520" cy="363960"/>
+            <a:ext cx="281160" cy="363960"/>
           </a:xfrm>
           <a:prstGeom prst="rect">
             <a:avLst/>
@@ -12950,7 +12979,7 @@
         <p:spPr>
           <a:xfrm>
             <a:off x="1058760" y="6130800"/>
-            <a:ext cx="281520" cy="363960"/>
+            <a:ext cx="281160" cy="363960"/>
           </a:xfrm>
           <a:prstGeom prst="rect">
             <a:avLst/>
@@ -13031,7 +13060,7 @@
         <p:spPr>
           <a:xfrm>
             <a:off x="335520" y="764640"/>
-            <a:ext cx="10744560" cy="495360"/>
+            <a:ext cx="10744200" cy="495000"/>
           </a:xfrm>
           <a:prstGeom prst="rect">
             <a:avLst/>
@@ -13082,7 +13111,7 @@
         <p:spPr>
           <a:xfrm>
             <a:off x="335520" y="1268640"/>
-            <a:ext cx="10744560" cy="5032080"/>
+            <a:ext cx="10744200" cy="5031720"/>
           </a:xfrm>
           <a:prstGeom prst="rect">
             <a:avLst/>
@@ -13103,7 +13132,7 @@
             <a:noAutofit/>
           </a:bodyPr>
           <a:p>
-            <a:pPr marL="216000" indent="-214200">
+            <a:pPr marL="216000" indent="-213840">
               <a:lnSpc>
                 <a:spcPct val="100000"/>
               </a:lnSpc>
@@ -13132,7 +13161,7 @@
             </a:endParaRPr>
           </a:p>
           <a:p>
-            <a:pPr lvl="1" marL="432000" indent="-214200">
+            <a:pPr lvl="1" marL="432000" indent="-213840">
               <a:lnSpc>
                 <a:spcPct val="100000"/>
               </a:lnSpc>
@@ -13174,7 +13203,7 @@
             </a:endParaRPr>
           </a:p>
           <a:p>
-            <a:pPr marL="216000" indent="-214200">
+            <a:pPr marL="216000" indent="-213840">
               <a:lnSpc>
                 <a:spcPct val="100000"/>
               </a:lnSpc>
@@ -13203,7 +13232,7 @@
             </a:endParaRPr>
           </a:p>
           <a:p>
-            <a:pPr lvl="1" marL="432000" indent="-214200">
+            <a:pPr lvl="1" marL="432000" indent="-213840">
               <a:lnSpc>
                 <a:spcPct val="100000"/>
               </a:lnSpc>
@@ -13242,7 +13271,7 @@
             </a:endParaRPr>
           </a:p>
           <a:p>
-            <a:pPr lvl="1" marL="432000" indent="-214200">
+            <a:pPr lvl="1" marL="432000" indent="-213840">
               <a:lnSpc>
                 <a:spcPct val="100000"/>
               </a:lnSpc>
@@ -13271,7 +13300,7 @@
             </a:endParaRPr>
           </a:p>
           <a:p>
-            <a:pPr lvl="1" marL="432000" indent="-214200">
+            <a:pPr lvl="1" marL="432000" indent="-213840">
               <a:lnSpc>
                 <a:spcPct val="100000"/>
               </a:lnSpc>
@@ -13353,7 +13382,7 @@
         <p:spPr>
           <a:xfrm>
             <a:off x="335520" y="764640"/>
-            <a:ext cx="10742760" cy="493560"/>
+            <a:ext cx="10742400" cy="493200"/>
           </a:xfrm>
           <a:prstGeom prst="rect">
             <a:avLst/>
@@ -13404,7 +13433,7 @@
         <p:spPr>
           <a:xfrm>
             <a:off x="335520" y="1268280"/>
-            <a:ext cx="10742760" cy="5030280"/>
+            <a:ext cx="10742400" cy="5029920"/>
           </a:xfrm>
           <a:prstGeom prst="rect">
             <a:avLst/>
@@ -13438,7 +13467,7 @@
             </a:endParaRPr>
           </a:p>
           <a:p>
-            <a:pPr marL="195120" indent="-188640">
+            <a:pPr marL="195120" indent="-188280">
               <a:lnSpc>
                 <a:spcPct val="100000"/>
               </a:lnSpc>
@@ -13494,7 +13523,7 @@
         <p:spPr>
           <a:xfrm>
             <a:off x="6285600" y="2132640"/>
-            <a:ext cx="512280" cy="492120"/>
+            <a:ext cx="511920" cy="491760"/>
           </a:xfrm>
           <a:prstGeom prst="star5">
             <a:avLst>
@@ -13536,7 +13565,7 @@
         <p:spPr>
           <a:xfrm>
             <a:off x="4089960" y="2247480"/>
-            <a:ext cx="2280600" cy="363960"/>
+            <a:ext cx="2280240" cy="363960"/>
           </a:xfrm>
           <a:prstGeom prst="rect">
             <a:avLst/>
@@ -13637,7 +13666,7 @@
         <p:spPr>
           <a:xfrm>
             <a:off x="335520" y="764640"/>
-            <a:ext cx="10742760" cy="493560"/>
+            <a:ext cx="10742400" cy="493200"/>
           </a:xfrm>
           <a:prstGeom prst="rect">
             <a:avLst/>
@@ -13688,7 +13717,7 @@
         <p:spPr>
           <a:xfrm>
             <a:off x="335520" y="1268640"/>
-            <a:ext cx="10742760" cy="5030280"/>
+            <a:ext cx="10742400" cy="5029920"/>
           </a:xfrm>
           <a:prstGeom prst="rect">
             <a:avLst/>
@@ -13709,7 +13738,7 @@
             <a:noAutofit/>
           </a:bodyPr>
           <a:p>
-            <a:pPr marL="195120" indent="-188640">
+            <a:pPr marL="195120" indent="-188280">
               <a:lnSpc>
                 <a:spcPct val="100000"/>
               </a:lnSpc>
@@ -13771,7 +13800,7 @@
             </a:endParaRPr>
           </a:p>
           <a:p>
-            <a:pPr marL="195120" indent="-188640">
+            <a:pPr marL="195120" indent="-188280">
               <a:lnSpc>
                 <a:spcPct val="100000"/>
               </a:lnSpc>
@@ -13820,7 +13849,7 @@
             </a:endParaRPr>
           </a:p>
           <a:p>
-            <a:pPr marL="195120" indent="-188640">
+            <a:pPr marL="195120" indent="-188280">
               <a:lnSpc>
                 <a:spcPct val="100000"/>
               </a:lnSpc>
@@ -13869,7 +13898,7 @@
             </a:endParaRPr>
           </a:p>
           <a:p>
-            <a:pPr marL="195120" indent="-188640">
+            <a:pPr marL="195120" indent="-188280">
               <a:lnSpc>
                 <a:spcPct val="100000"/>
               </a:lnSpc>
@@ -13918,7 +13947,7 @@
             </a:endParaRPr>
           </a:p>
           <a:p>
-            <a:pPr marL="195120" indent="-188640">
+            <a:pPr marL="195120" indent="-188280">
               <a:lnSpc>
                 <a:spcPct val="100000"/>
               </a:lnSpc>
@@ -13967,7 +13996,7 @@
             </a:endParaRPr>
           </a:p>
           <a:p>
-            <a:pPr marL="195120" indent="-188640">
+            <a:pPr marL="195120" indent="-188280">
               <a:lnSpc>
                 <a:spcPct val="100000"/>
               </a:lnSpc>
@@ -14016,7 +14045,7 @@
             </a:endParaRPr>
           </a:p>
           <a:p>
-            <a:pPr marL="195120" indent="-188640">
+            <a:pPr marL="195120" indent="-188280">
               <a:lnSpc>
                 <a:spcPct val="100000"/>
               </a:lnSpc>
@@ -14065,7 +14094,7 @@
             </a:endParaRPr>
           </a:p>
           <a:p>
-            <a:pPr marL="195120" indent="-188640">
+            <a:pPr marL="195120" indent="-188280">
               <a:lnSpc>
                 <a:spcPct val="100000"/>
               </a:lnSpc>
@@ -14154,7 +14183,7 @@
         <p:spPr>
           <a:xfrm>
             <a:off x="335520" y="764640"/>
-            <a:ext cx="10746000" cy="496800"/>
+            <a:ext cx="10745640" cy="496440"/>
           </a:xfrm>
           <a:prstGeom prst="rect">
             <a:avLst/>
@@ -14205,7 +14234,7 @@
         <p:spPr>
           <a:xfrm>
             <a:off x="335520" y="1268640"/>
-            <a:ext cx="10746000" cy="5033520"/>
+            <a:ext cx="10745640" cy="5033160"/>
           </a:xfrm>
           <a:prstGeom prst="rect">
             <a:avLst/>
@@ -14226,7 +14255,7 @@
             <a:noAutofit/>
           </a:bodyPr>
           <a:p>
-            <a:pPr marL="195120" indent="-188640">
+            <a:pPr marL="195120" indent="-188280">
               <a:lnSpc>
                 <a:spcPct val="100000"/>
               </a:lnSpc>
@@ -14275,7 +14304,7 @@
             </a:endParaRPr>
           </a:p>
           <a:p>
-            <a:pPr marL="195120" indent="-188640">
+            <a:pPr marL="195120" indent="-188280">
               <a:lnSpc>
                 <a:spcPct val="100000"/>
               </a:lnSpc>
@@ -14324,7 +14353,7 @@
             </a:endParaRPr>
           </a:p>
           <a:p>
-            <a:pPr marL="195120" indent="-188640">
+            <a:pPr marL="195120" indent="-188280">
               <a:lnSpc>
                 <a:spcPct val="100000"/>
               </a:lnSpc>
@@ -14413,7 +14442,7 @@
         <p:spPr>
           <a:xfrm>
             <a:off x="335520" y="764640"/>
-            <a:ext cx="10744560" cy="495360"/>
+            <a:ext cx="10744200" cy="495000"/>
           </a:xfrm>
           <a:prstGeom prst="rect">
             <a:avLst/>
@@ -14464,7 +14493,7 @@
         <p:spPr>
           <a:xfrm>
             <a:off x="335520" y="1268640"/>
-            <a:ext cx="10744560" cy="5032080"/>
+            <a:ext cx="10744200" cy="5031720"/>
           </a:xfrm>
           <a:prstGeom prst="rect">
             <a:avLst/>
@@ -14498,7 +14527,7 @@
             </a:endParaRPr>
           </a:p>
           <a:p>
-            <a:pPr marL="195120" indent="-190080">
+            <a:pPr marL="195120" indent="-189720">
               <a:lnSpc>
                 <a:spcPct val="100000"/>
               </a:lnSpc>
@@ -14569,7 +14598,7 @@
             </a:endParaRPr>
           </a:p>
           <a:p>
-            <a:pPr marL="195120" indent="-190080">
+            <a:pPr marL="195120" indent="-189720">
               <a:lnSpc>
                 <a:spcPct val="100000"/>
               </a:lnSpc>
@@ -14640,7 +14669,7 @@
             </a:endParaRPr>
           </a:p>
           <a:p>
-            <a:pPr marL="195120" indent="-190080">
+            <a:pPr marL="195120" indent="-189720">
               <a:lnSpc>
                 <a:spcPct val="100000"/>
               </a:lnSpc>
@@ -14689,7 +14718,7 @@
             </a:endParaRPr>
           </a:p>
           <a:p>
-            <a:pPr marL="195120" indent="-190080">
+            <a:pPr marL="195120" indent="-189720">
               <a:lnSpc>
                 <a:spcPct val="100000"/>
               </a:lnSpc>
@@ -14738,7 +14767,7 @@
             </a:endParaRPr>
           </a:p>
           <a:p>
-            <a:pPr marL="195120" indent="-190080">
+            <a:pPr marL="195120" indent="-189720">
               <a:lnSpc>
                 <a:spcPct val="100000"/>
               </a:lnSpc>
@@ -14787,7 +14816,7 @@
             </a:endParaRPr>
           </a:p>
           <a:p>
-            <a:pPr marL="195120" indent="-190080">
+            <a:pPr marL="195120" indent="-189720">
               <a:lnSpc>
                 <a:spcPct val="100000"/>
               </a:lnSpc>
@@ -14836,7 +14865,7 @@
             </a:endParaRPr>
           </a:p>
           <a:p>
-            <a:pPr marL="195120" indent="-190080">
+            <a:pPr marL="195120" indent="-189720">
               <a:lnSpc>
                 <a:spcPct val="100000"/>
               </a:lnSpc>
@@ -14925,7 +14954,7 @@
         <p:spPr>
           <a:xfrm>
             <a:off x="335520" y="764640"/>
-            <a:ext cx="10742760" cy="493560"/>
+            <a:ext cx="10742400" cy="493200"/>
           </a:xfrm>
           <a:prstGeom prst="rect">
             <a:avLst/>
@@ -14976,7 +15005,7 @@
         <p:spPr>
           <a:xfrm>
             <a:off x="335520" y="1268640"/>
-            <a:ext cx="10742760" cy="5030280"/>
+            <a:ext cx="10742400" cy="5029920"/>
           </a:xfrm>
           <a:prstGeom prst="rect">
             <a:avLst/>
@@ -14997,7 +15026,7 @@
             <a:noAutofit/>
           </a:bodyPr>
           <a:p>
-            <a:pPr marL="195120" indent="-188640">
+            <a:pPr marL="195120" indent="-188280">
               <a:lnSpc>
                 <a:spcPct val="100000"/>
               </a:lnSpc>
@@ -15038,7 +15067,7 @@
             </a:endParaRPr>
           </a:p>
           <a:p>
-            <a:pPr marL="195120" indent="-188640">
+            <a:pPr marL="195120" indent="-188280">
               <a:lnSpc>
                 <a:spcPct val="100000"/>
               </a:lnSpc>
@@ -15089,7 +15118,7 @@
             </a:endParaRPr>
           </a:p>
           <a:p>
-            <a:pPr marL="195120" indent="-188640">
+            <a:pPr marL="195120" indent="-188280">
               <a:lnSpc>
                 <a:spcPct val="100000"/>
               </a:lnSpc>
@@ -15130,7 +15159,7 @@
             </a:endParaRPr>
           </a:p>
           <a:p>
-            <a:pPr marL="195120" indent="-188640">
+            <a:pPr marL="195120" indent="-188280">
               <a:lnSpc>
                 <a:spcPct val="100000"/>
               </a:lnSpc>
@@ -15159,7 +15188,7 @@
             </a:endParaRPr>
           </a:p>
           <a:p>
-            <a:pPr lvl="1" marL="432000" indent="-214920">
+            <a:pPr lvl="1" marL="432000" indent="-214560">
               <a:lnSpc>
                 <a:spcPct val="100000"/>
               </a:lnSpc>
@@ -15207,7 +15236,7 @@
             </a:endParaRPr>
           </a:p>
           <a:p>
-            <a:pPr lvl="1" marL="432000" indent="-214920">
+            <a:pPr lvl="1" marL="432000" indent="-214560">
               <a:lnSpc>
                 <a:spcPct val="100000"/>
               </a:lnSpc>
@@ -15258,7 +15287,7 @@
             </a:endParaRPr>
           </a:p>
           <a:p>
-            <a:pPr lvl="1" marL="432000" indent="-214920">
+            <a:pPr lvl="1" marL="432000" indent="-214560">
               <a:lnSpc>
                 <a:spcPct val="100000"/>
               </a:lnSpc>
@@ -15349,7 +15378,7 @@
         <p:spPr>
           <a:xfrm>
             <a:off x="335520" y="1268640"/>
-            <a:ext cx="10744560" cy="5032080"/>
+            <a:ext cx="10744200" cy="5031720"/>
           </a:xfrm>
           <a:prstGeom prst="rect">
             <a:avLst/>
@@ -15406,7 +15435,7 @@
         <p:spPr>
           <a:xfrm>
             <a:off x="335520" y="764640"/>
-            <a:ext cx="10744560" cy="495360"/>
+            <a:ext cx="10744200" cy="495000"/>
           </a:xfrm>
           <a:prstGeom prst="rect">
             <a:avLst/>
@@ -15462,7 +15491,7 @@
         <p:spPr>
           <a:xfrm>
             <a:off x="542880" y="721800"/>
-            <a:ext cx="10348920" cy="489600"/>
+            <a:ext cx="10348560" cy="489240"/>
           </a:xfrm>
           <a:prstGeom prst="rect">
             <a:avLst/>
@@ -15513,7 +15542,7 @@
         <p:spPr>
           <a:xfrm>
             <a:off x="451800" y="1709280"/>
-            <a:ext cx="8216280" cy="4344480"/>
+            <a:ext cx="8215920" cy="4344120"/>
           </a:xfrm>
           <a:prstGeom prst="rect">
             <a:avLst/>
@@ -15539,7 +15568,7 @@
         <p:spPr>
           <a:xfrm>
             <a:off x="609480" y="1769400"/>
-            <a:ext cx="10579320" cy="4847400"/>
+            <a:ext cx="10578960" cy="4847040"/>
           </a:xfrm>
           <a:prstGeom prst="rect">
             <a:avLst/>
@@ -15560,7 +15589,7 @@
             <a:normAutofit/>
           </a:bodyPr>
           <a:p>
-            <a:pPr marL="216000" indent="-210960">
+            <a:pPr marL="216000" indent="-210600">
               <a:lnSpc>
                 <a:spcPct val="90000"/>
               </a:lnSpc>
@@ -15669,7 +15698,7 @@
             </a:endParaRPr>
           </a:p>
           <a:p>
-            <a:pPr marL="216000" indent="-210960">
+            <a:pPr marL="216000" indent="-210600">
               <a:lnSpc>
                 <a:spcPct val="100000"/>
               </a:lnSpc>
@@ -15698,7 +15727,7 @@
             </a:endParaRPr>
           </a:p>
           <a:p>
-            <a:pPr lvl="1" marL="685800" indent="-223560">
+            <a:pPr lvl="1" marL="685800" indent="-223200">
               <a:lnSpc>
                 <a:spcPct val="100000"/>
               </a:lnSpc>
@@ -15727,7 +15756,7 @@
             </a:endParaRPr>
           </a:p>
           <a:p>
-            <a:pPr lvl="1" marL="685800" indent="-223560">
+            <a:pPr lvl="1" marL="685800" indent="-223200">
               <a:lnSpc>
                 <a:spcPct val="100000"/>
               </a:lnSpc>
@@ -15756,7 +15785,7 @@
             </a:endParaRPr>
           </a:p>
           <a:p>
-            <a:pPr lvl="1" marL="685800" indent="-223560">
+            <a:pPr lvl="1" marL="685800" indent="-223200">
               <a:lnSpc>
                 <a:spcPct val="100000"/>
               </a:lnSpc>
@@ -15785,7 +15814,7 @@
             </a:endParaRPr>
           </a:p>
           <a:p>
-            <a:pPr lvl="1" marL="685800" indent="-223560">
+            <a:pPr lvl="1" marL="685800" indent="-223200">
               <a:lnSpc>
                 <a:spcPct val="100000"/>
               </a:lnSpc>
@@ -15814,7 +15843,7 @@
             </a:endParaRPr>
           </a:p>
           <a:p>
-            <a:pPr marL="216000" indent="-210960">
+            <a:pPr marL="216000" indent="-210600">
               <a:lnSpc>
                 <a:spcPct val="100000"/>
               </a:lnSpc>
@@ -15843,7 +15872,7 @@
             </a:endParaRPr>
           </a:p>
           <a:p>
-            <a:pPr lvl="1" marL="685800" indent="-223560">
+            <a:pPr lvl="1" marL="685800" indent="-223200">
               <a:lnSpc>
                 <a:spcPct val="100000"/>
               </a:lnSpc>
@@ -15872,7 +15901,7 @@
             </a:endParaRPr>
           </a:p>
           <a:p>
-            <a:pPr lvl="1" marL="685800" indent="-223560">
+            <a:pPr lvl="1" marL="685800" indent="-223200">
               <a:lnSpc>
                 <a:spcPct val="100000"/>
               </a:lnSpc>
@@ -15941,7 +15970,7 @@
         <p:spPr>
           <a:xfrm>
             <a:off x="542880" y="721800"/>
-            <a:ext cx="10348920" cy="489600"/>
+            <a:ext cx="10348560" cy="489240"/>
           </a:xfrm>
           <a:prstGeom prst="rect">
             <a:avLst/>
@@ -15992,7 +16021,7 @@
         <p:spPr>
           <a:xfrm>
             <a:off x="451800" y="1709280"/>
-            <a:ext cx="8216280" cy="4344480"/>
+            <a:ext cx="8215920" cy="4344120"/>
           </a:xfrm>
           <a:prstGeom prst="rect">
             <a:avLst/>
@@ -16018,7 +16047,7 @@
         <p:spPr>
           <a:xfrm>
             <a:off x="609480" y="1769400"/>
-            <a:ext cx="10579320" cy="4847400"/>
+            <a:ext cx="10578960" cy="4847040"/>
           </a:xfrm>
           <a:prstGeom prst="rect">
             <a:avLst/>
@@ -16039,7 +16068,7 @@
             <a:normAutofit/>
           </a:bodyPr>
           <a:p>
-            <a:pPr marL="216000" indent="-210960">
+            <a:pPr marL="216000" indent="-210600">
               <a:lnSpc>
                 <a:spcPct val="90000"/>
               </a:lnSpc>
@@ -16090,7 +16119,7 @@
             </a:endParaRPr>
           </a:p>
           <a:p>
-            <a:pPr lvl="1" marL="685800" indent="-223560">
+            <a:pPr lvl="1" marL="685800" indent="-223200">
               <a:lnSpc>
                 <a:spcPct val="100000"/>
               </a:lnSpc>
@@ -16119,7 +16148,7 @@
             </a:endParaRPr>
           </a:p>
           <a:p>
-            <a:pPr lvl="1" marL="685800" indent="-223560">
+            <a:pPr lvl="1" marL="685800" indent="-223200">
               <a:lnSpc>
                 <a:spcPct val="100000"/>
               </a:lnSpc>
@@ -16161,7 +16190,7 @@
             </a:endParaRPr>
           </a:p>
           <a:p>
-            <a:pPr marL="216000" indent="-210960">
+            <a:pPr marL="216000" indent="-210600">
               <a:lnSpc>
                 <a:spcPct val="90000"/>
               </a:lnSpc>
@@ -16193,7 +16222,7 @@
             </a:endParaRPr>
           </a:p>
           <a:p>
-            <a:pPr lvl="1" marL="685800" indent="-223560">
+            <a:pPr lvl="1" marL="685800" indent="-223200">
               <a:lnSpc>
                 <a:spcPct val="100000"/>
               </a:lnSpc>
@@ -16247,7 +16276,7 @@
             </a:endParaRPr>
           </a:p>
           <a:p>
-            <a:pPr lvl="1" marL="685800" indent="-223560">
+            <a:pPr lvl="1" marL="685800" indent="-223200">
               <a:lnSpc>
                 <a:spcPct val="100000"/>
               </a:lnSpc>
@@ -16301,7 +16330,7 @@
             </a:endParaRPr>
           </a:p>
           <a:p>
-            <a:pPr marL="228600" indent="-223560">
+            <a:pPr marL="228600" indent="-223200">
               <a:lnSpc>
                 <a:spcPct val="90000"/>
               </a:lnSpc>
@@ -16317,7 +16346,7 @@
             </a:endParaRPr>
           </a:p>
           <a:p>
-            <a:pPr marL="228600" indent="-223560" algn="ctr">
+            <a:pPr marL="228600" indent="-223200" algn="ctr">
               <a:lnSpc>
                 <a:spcPct val="90000"/>
               </a:lnSpc>
@@ -16343,7 +16372,7 @@
             </a:endParaRPr>
           </a:p>
           <a:p>
-            <a:pPr marL="457200" indent="-223560" algn="ctr">
+            <a:pPr marL="457200" indent="-223200" algn="ctr">
               <a:lnSpc>
                 <a:spcPct val="90000"/>
               </a:lnSpc>
@@ -16419,7 +16448,7 @@
         <p:spPr>
           <a:xfrm>
             <a:off x="542880" y="721800"/>
-            <a:ext cx="10348920" cy="489600"/>
+            <a:ext cx="10348560" cy="489240"/>
           </a:xfrm>
           <a:prstGeom prst="rect">
             <a:avLst/>
@@ -16470,7 +16499,7 @@
         <p:spPr>
           <a:xfrm>
             <a:off x="451800" y="1709280"/>
-            <a:ext cx="8216280" cy="4344480"/>
+            <a:ext cx="8215920" cy="4344120"/>
           </a:xfrm>
           <a:prstGeom prst="rect">
             <a:avLst/>
@@ -16496,7 +16525,7 @@
         <p:spPr>
           <a:xfrm>
             <a:off x="609480" y="1769400"/>
-            <a:ext cx="10579320" cy="4847400"/>
+            <a:ext cx="10578960" cy="4847040"/>
           </a:xfrm>
           <a:prstGeom prst="rect">
             <a:avLst/>
@@ -16517,7 +16546,7 @@
             <a:normAutofit/>
           </a:bodyPr>
           <a:p>
-            <a:pPr marL="216000" indent="-210960">
+            <a:pPr marL="216000" indent="-210600">
               <a:lnSpc>
                 <a:spcPct val="90000"/>
               </a:lnSpc>
@@ -16568,7 +16597,7 @@
             </a:endParaRPr>
           </a:p>
           <a:p>
-            <a:pPr lvl="1" marL="685800" indent="-223560">
+            <a:pPr lvl="1" marL="685800" indent="-223200">
               <a:lnSpc>
                 <a:spcPct val="100000"/>
               </a:lnSpc>
@@ -16597,7 +16626,7 @@
             </a:endParaRPr>
           </a:p>
           <a:p>
-            <a:pPr lvl="1" marL="685800" indent="-223560">
+            <a:pPr lvl="1" marL="685800" indent="-223200">
               <a:lnSpc>
                 <a:spcPct val="100000"/>
               </a:lnSpc>
@@ -16639,7 +16668,7 @@
             </a:endParaRPr>
           </a:p>
           <a:p>
-            <a:pPr marL="216000" indent="-210960">
+            <a:pPr marL="216000" indent="-210600">
               <a:lnSpc>
                 <a:spcPct val="90000"/>
               </a:lnSpc>
@@ -16671,7 +16700,7 @@
             </a:endParaRPr>
           </a:p>
           <a:p>
-            <a:pPr lvl="1" marL="685800" indent="-223560">
+            <a:pPr lvl="1" marL="685800" indent="-223200">
               <a:lnSpc>
                 <a:spcPct val="100000"/>
               </a:lnSpc>
@@ -16725,7 +16754,7 @@
             </a:endParaRPr>
           </a:p>
           <a:p>
-            <a:pPr lvl="1" marL="685800" indent="-223560">
+            <a:pPr lvl="1" marL="685800" indent="-223200">
               <a:lnSpc>
                 <a:spcPct val="100000"/>
               </a:lnSpc>
@@ -16779,7 +16808,7 @@
             </a:endParaRPr>
           </a:p>
           <a:p>
-            <a:pPr marL="228600" indent="-223560">
+            <a:pPr marL="228600" indent="-223200">
               <a:lnSpc>
                 <a:spcPct val="90000"/>
               </a:lnSpc>
@@ -16795,7 +16824,7 @@
             </a:endParaRPr>
           </a:p>
           <a:p>
-            <a:pPr marL="228600" indent="-223560" algn="ctr">
+            <a:pPr marL="228600" indent="-223200" algn="ctr">
               <a:lnSpc>
                 <a:spcPct val="90000"/>
               </a:lnSpc>
@@ -16821,7 +16850,7 @@
             </a:endParaRPr>
           </a:p>
           <a:p>
-            <a:pPr marL="457200" indent="-223560" algn="ctr">
+            <a:pPr marL="457200" indent="-223200" algn="ctr">
               <a:lnSpc>
                 <a:spcPct val="90000"/>
               </a:lnSpc>
@@ -16897,7 +16926,7 @@
         <p:spPr>
           <a:xfrm>
             <a:off x="335520" y="764640"/>
-            <a:ext cx="10744560" cy="495360"/>
+            <a:ext cx="10744200" cy="495000"/>
           </a:xfrm>
           <a:prstGeom prst="rect">
             <a:avLst/>
@@ -16948,7 +16977,7 @@
         <p:spPr>
           <a:xfrm>
             <a:off x="335520" y="2408400"/>
-            <a:ext cx="10744560" cy="3892320"/>
+            <a:ext cx="10744200" cy="3891960"/>
           </a:xfrm>
           <a:prstGeom prst="rect">
             <a:avLst/>
@@ -16969,7 +16998,7 @@
             <a:noAutofit/>
           </a:bodyPr>
           <a:p>
-            <a:pPr marL="195120" indent="-190080">
+            <a:pPr marL="195120" indent="-189720">
               <a:lnSpc>
                 <a:spcPct val="100000"/>
               </a:lnSpc>
@@ -17038,7 +17067,7 @@
         <p:spPr>
           <a:xfrm>
             <a:off x="335520" y="764640"/>
-            <a:ext cx="10744560" cy="495360"/>
+            <a:ext cx="10744200" cy="495000"/>
           </a:xfrm>
           <a:prstGeom prst="rect">
             <a:avLst/>
@@ -17089,7 +17118,7 @@
         <p:spPr>
           <a:xfrm>
             <a:off x="335520" y="2408400"/>
-            <a:ext cx="10744560" cy="3892320"/>
+            <a:ext cx="10744200" cy="3891960"/>
           </a:xfrm>
           <a:prstGeom prst="rect">
             <a:avLst/>
@@ -17110,7 +17139,7 @@
             <a:noAutofit/>
           </a:bodyPr>
           <a:p>
-            <a:pPr marL="195120" indent="-190080">
+            <a:pPr marL="195120" indent="-189720">
               <a:lnSpc>
                 <a:spcPct val="100000"/>
               </a:lnSpc>
@@ -17139,7 +17168,7 @@
             </a:endParaRPr>
           </a:p>
           <a:p>
-            <a:pPr marL="195120" indent="-190080">
+            <a:pPr marL="195120" indent="-189720">
               <a:lnSpc>
                 <a:spcPct val="100000"/>
               </a:lnSpc>
@@ -17208,7 +17237,7 @@
         <p:spPr>
           <a:xfrm>
             <a:off x="335520" y="764640"/>
-            <a:ext cx="10744560" cy="495360"/>
+            <a:ext cx="10744200" cy="495000"/>
           </a:xfrm>
           <a:prstGeom prst="rect">
             <a:avLst/>
@@ -17259,7 +17288,7 @@
         <p:spPr>
           <a:xfrm>
             <a:off x="335520" y="2408400"/>
-            <a:ext cx="10744560" cy="3892320"/>
+            <a:ext cx="10744200" cy="3891960"/>
           </a:xfrm>
           <a:prstGeom prst="rect">
             <a:avLst/>
@@ -17280,7 +17309,7 @@
             <a:noAutofit/>
           </a:bodyPr>
           <a:p>
-            <a:pPr marL="195120" indent="-190080">
+            <a:pPr marL="195120" indent="-189720">
               <a:lnSpc>
                 <a:spcPct val="100000"/>
               </a:lnSpc>
@@ -17309,7 +17338,7 @@
             </a:endParaRPr>
           </a:p>
           <a:p>
-            <a:pPr marL="195120" indent="-190080">
+            <a:pPr marL="195120" indent="-189720">
               <a:lnSpc>
                 <a:spcPct val="100000"/>
               </a:lnSpc>
@@ -17338,7 +17367,7 @@
             </a:endParaRPr>
           </a:p>
           <a:p>
-            <a:pPr marL="195120" indent="-190080">
+            <a:pPr marL="195120" indent="-189720">
               <a:lnSpc>
                 <a:spcPct val="100000"/>
               </a:lnSpc>

</xml_diff>

<commit_message>
* updated ETCE L00 lecture overview
</commit_message>
<xml_diff>
--- a/Emerging-Technologies-for-the-Circular-Economy/ETCE-L00-Organization.pptx
+++ b/Emerging-Technologies-for-the-Circular-Economy/ETCE-L00-Organization.pptx
@@ -375,7 +375,7 @@
             <a:pPr indent="0" algn="r">
               <a:buNone/>
             </a:pPr>
-            <a:fld id="{1EB599FF-5ACE-4C17-872B-735073886E0C}" type="slidenum">
+            <a:fld id="{F2109E5F-2AF3-4057-9603-A5C720E359B5}" type="slidenum">
               <a:rPr b="0" lang="en-GB" sz="1400" spc="-1" strike="noStrike">
                 <a:solidFill>
                   <a:srgbClr val="000000"/>
@@ -429,7 +429,7 @@
         <p:spPr>
           <a:xfrm>
             <a:off x="533520" y="763560"/>
-            <a:ext cx="6691320" cy="3759480"/>
+            <a:ext cx="6690960" cy="3759120"/>
           </a:xfrm>
           <a:prstGeom prst="rect">
             <a:avLst/>
@@ -452,7 +452,7 @@
         <p:spPr>
           <a:xfrm>
             <a:off x="777240" y="4777560"/>
-            <a:ext cx="6204960" cy="4513320"/>
+            <a:ext cx="6204600" cy="4512960"/>
           </a:xfrm>
           <a:prstGeom prst="rect">
             <a:avLst/>
@@ -488,7 +488,7 @@
         <p:spPr>
           <a:xfrm>
             <a:off x="4399200" y="9555480"/>
-            <a:ext cx="3360240" cy="489960"/>
+            <a:ext cx="3359880" cy="489600"/>
           </a:xfrm>
           <a:prstGeom prst="rect">
             <a:avLst/>
@@ -514,7 +514,7 @@
                 <a:spcPct val="100000"/>
               </a:lnSpc>
             </a:pPr>
-            <a:fld id="{4FCF3497-DAB2-4E47-A476-DE4EB01C0142}" type="slidenum">
+            <a:fld id="{4D033D76-D718-4CEF-876B-8786A72D58FB}" type="slidenum">
               <a:rPr b="0" lang="de-DE" sz="1800" spc="-1" strike="noStrike">
                 <a:solidFill>
                   <a:srgbClr val="000000"/>
@@ -568,7 +568,7 @@
         <p:spPr>
           <a:xfrm>
             <a:off x="533520" y="763560"/>
-            <a:ext cx="6691320" cy="3759480"/>
+            <a:ext cx="6690960" cy="3759120"/>
           </a:xfrm>
           <a:prstGeom prst="rect">
             <a:avLst/>
@@ -591,7 +591,7 @@
         <p:spPr>
           <a:xfrm>
             <a:off x="777240" y="4777560"/>
-            <a:ext cx="6204960" cy="4513320"/>
+            <a:ext cx="6204600" cy="4512960"/>
           </a:xfrm>
           <a:prstGeom prst="rect">
             <a:avLst/>
@@ -627,7 +627,7 @@
         <p:spPr>
           <a:xfrm>
             <a:off x="4399200" y="9555480"/>
-            <a:ext cx="3360240" cy="489960"/>
+            <a:ext cx="3359880" cy="489600"/>
           </a:xfrm>
           <a:prstGeom prst="rect">
             <a:avLst/>
@@ -653,7 +653,7 @@
                 <a:spcPct val="100000"/>
               </a:lnSpc>
             </a:pPr>
-            <a:fld id="{8904329A-1B37-45BE-A4FC-A2FC3E045861}" type="slidenum">
+            <a:fld id="{E233E711-BAC5-4639-9C21-40D738D58F43}" type="slidenum">
               <a:rPr b="0" lang="de-DE" sz="1800" spc="-1" strike="noStrike">
                 <a:solidFill>
                   <a:srgbClr val="000000"/>
@@ -661,7 +661,7 @@
                 <a:latin typeface="+mn-lt"/>
                 <a:ea typeface="+mn-ea"/>
               </a:rPr>
-              <a:t>6</a:t>
+              <a:t>&lt;number&gt;</a:t>
             </a:fld>
             <a:endParaRPr b="0" lang="en-GB" sz="1800" spc="-1" strike="noStrike">
               <a:solidFill>
@@ -707,7 +707,7 @@
         <p:spPr>
           <a:xfrm>
             <a:off x="533520" y="763560"/>
-            <a:ext cx="6691320" cy="3759480"/>
+            <a:ext cx="6690960" cy="3759120"/>
           </a:xfrm>
           <a:prstGeom prst="rect">
             <a:avLst/>
@@ -730,7 +730,7 @@
         <p:spPr>
           <a:xfrm>
             <a:off x="777240" y="4777560"/>
-            <a:ext cx="6204960" cy="4513320"/>
+            <a:ext cx="6204600" cy="4512960"/>
           </a:xfrm>
           <a:prstGeom prst="rect">
             <a:avLst/>
@@ -766,7 +766,7 @@
         <p:spPr>
           <a:xfrm>
             <a:off x="4399200" y="9555480"/>
-            <a:ext cx="3360240" cy="489960"/>
+            <a:ext cx="3359880" cy="489600"/>
           </a:xfrm>
           <a:prstGeom prst="rect">
             <a:avLst/>
@@ -792,7 +792,7 @@
                 <a:spcPct val="100000"/>
               </a:lnSpc>
             </a:pPr>
-            <a:fld id="{79A63964-C288-425F-956F-BCE4E1282BC7}" type="slidenum">
+            <a:fld id="{F0FAF6FC-91EB-4049-94EE-52B45EBC9B62}" type="slidenum">
               <a:rPr b="0" lang="de-DE" sz="1800" spc="-1" strike="noStrike">
                 <a:solidFill>
                   <a:srgbClr val="000000"/>
@@ -4397,7 +4397,7 @@
         <p:spPr>
           <a:xfrm>
             <a:off x="11444760" y="0"/>
-            <a:ext cx="739800" cy="6848640"/>
+            <a:ext cx="739440" cy="6848280"/>
           </a:xfrm>
           <a:prstGeom prst="rect">
             <a:avLst/>
@@ -4422,11 +4422,17 @@
             <a:noAutofit/>
           </a:bodyPr>
           <a:p>
+            <a:pPr>
+              <a:lnSpc>
+                <a:spcPct val="100000"/>
+              </a:lnSpc>
+            </a:pPr>
             <a:endParaRPr b="0" lang="en-GB" sz="1800" spc="-1" strike="noStrike">
               <a:solidFill>
                 <a:srgbClr val="ffffff"/>
               </a:solidFill>
               <a:latin typeface="Arial"/>
+              <a:ea typeface="DejaVu Sans"/>
             </a:endParaRPr>
           </a:p>
         </p:txBody>
@@ -4440,7 +4446,7 @@
         <p:spPr>
           <a:xfrm>
             <a:off x="11438640" y="6453360"/>
-            <a:ext cx="756720" cy="363960"/>
+            <a:ext cx="756360" cy="363960"/>
           </a:xfrm>
           <a:prstGeom prst="rect">
             <a:avLst/>
@@ -4466,7 +4472,7 @@
                 <a:spcPct val="100000"/>
               </a:lnSpc>
             </a:pPr>
-            <a:fld id="{C97FACAF-F953-4F3D-BB4F-53C91C2E2330}" type="slidenum">
+            <a:fld id="{859994E3-0ECF-4F44-933B-82A179398C80}" type="slidenum">
               <a:rPr b="0" lang="en-US" sz="1800" spc="-1" strike="noStrike">
                 <a:solidFill>
                   <a:srgbClr val="808080"/>
@@ -4474,7 +4480,7 @@
                 <a:latin typeface="Arial"/>
                 <a:ea typeface="DejaVu Sans"/>
               </a:rPr>
-              <a:t>&lt;number&gt;</a:t>
+              <a:t>13</a:t>
             </a:fld>
             <a:endParaRPr b="0" lang="en-GB" sz="1800" spc="-1" strike="noStrike">
               <a:solidFill>
@@ -4494,7 +4500,7 @@
         <p:spPr>
           <a:xfrm>
             <a:off x="912240" y="1268280"/>
-            <a:ext cx="9206640" cy="360000"/>
+            <a:ext cx="9206280" cy="359640"/>
           </a:xfrm>
           <a:prstGeom prst="rect">
             <a:avLst/>
@@ -4515,11 +4521,17 @@
             <a:noAutofit/>
           </a:bodyPr>
           <a:p>
+            <a:pPr>
+              <a:lnSpc>
+                <a:spcPct val="100000"/>
+              </a:lnSpc>
+            </a:pPr>
             <a:endParaRPr b="0" lang="en-GB" sz="1800" spc="-1" strike="noStrike">
               <a:solidFill>
                 <a:srgbClr val="000000"/>
               </a:solidFill>
               <a:latin typeface="Arial"/>
+              <a:ea typeface="DejaVu Sans"/>
             </a:endParaRPr>
           </a:p>
         </p:txBody>
@@ -4537,7 +4549,7 @@
         <p:spPr>
           <a:xfrm>
             <a:off x="0" y="0"/>
-            <a:ext cx="3050640" cy="560520"/>
+            <a:ext cx="3050280" cy="560160"/>
           </a:xfrm>
           <a:prstGeom prst="rect">
             <a:avLst/>
@@ -4560,7 +4572,7 @@
         <p:spPr>
           <a:xfrm>
             <a:off x="7430400" y="134640"/>
-            <a:ext cx="3696480" cy="512640"/>
+            <a:ext cx="3696120" cy="512280"/>
           </a:xfrm>
           <a:prstGeom prst="rect">
             <a:avLst/>
@@ -4579,7 +4591,7 @@
         <p:spPr>
           <a:xfrm>
             <a:off x="912240" y="1268280"/>
-            <a:ext cx="9206640" cy="360000"/>
+            <a:ext cx="9206280" cy="359640"/>
           </a:xfrm>
           <a:prstGeom prst="rect">
             <a:avLst/>
@@ -4600,11 +4612,17 @@
             <a:noAutofit/>
           </a:bodyPr>
           <a:p>
+            <a:pPr>
+              <a:lnSpc>
+                <a:spcPct val="100000"/>
+              </a:lnSpc>
+            </a:pPr>
             <a:endParaRPr b="0" lang="en-GB" sz="1800" spc="-1" strike="noStrike">
               <a:solidFill>
                 <a:srgbClr val="000000"/>
               </a:solidFill>
               <a:latin typeface="Arial"/>
+              <a:ea typeface="DejaVu Sans"/>
             </a:endParaRPr>
           </a:p>
         </p:txBody>
@@ -4618,7 +4636,7 @@
         <p:spPr>
           <a:xfrm>
             <a:off x="11444760" y="0"/>
-            <a:ext cx="739800" cy="6848640"/>
+            <a:ext cx="739440" cy="6848280"/>
           </a:xfrm>
           <a:prstGeom prst="rect">
             <a:avLst/>
@@ -4643,11 +4661,17 @@
             <a:noAutofit/>
           </a:bodyPr>
           <a:p>
+            <a:pPr>
+              <a:lnSpc>
+                <a:spcPct val="100000"/>
+              </a:lnSpc>
+            </a:pPr>
             <a:endParaRPr b="0" lang="en-GB" sz="1800" spc="-1" strike="noStrike">
               <a:solidFill>
                 <a:srgbClr val="ffffff"/>
               </a:solidFill>
               <a:latin typeface="Arial"/>
+              <a:ea typeface="DejaVu Sans"/>
             </a:endParaRPr>
           </a:p>
         </p:txBody>
@@ -4661,7 +4685,7 @@
         <p:spPr>
           <a:xfrm>
             <a:off x="0" y="6642720"/>
-            <a:ext cx="12182760" cy="211320"/>
+            <a:ext cx="12182400" cy="211320"/>
           </a:xfrm>
           <a:prstGeom prst="rect">
             <a:avLst/>
@@ -5053,7 +5077,7 @@
         <p:spPr>
           <a:xfrm>
             <a:off x="11444760" y="0"/>
-            <a:ext cx="739800" cy="6848640"/>
+            <a:ext cx="739440" cy="6848280"/>
           </a:xfrm>
           <a:prstGeom prst="rect">
             <a:avLst/>
@@ -5078,11 +5102,17 @@
             <a:noAutofit/>
           </a:bodyPr>
           <a:p>
+            <a:pPr>
+              <a:lnSpc>
+                <a:spcPct val="100000"/>
+              </a:lnSpc>
+            </a:pPr>
             <a:endParaRPr b="0" lang="en-GB" sz="1800" spc="-1" strike="noStrike">
               <a:solidFill>
                 <a:srgbClr val="ffffff"/>
               </a:solidFill>
               <a:latin typeface="Arial"/>
+              <a:ea typeface="DejaVu Sans"/>
             </a:endParaRPr>
           </a:p>
         </p:txBody>
@@ -5096,7 +5126,7 @@
         <p:spPr>
           <a:xfrm>
             <a:off x="11438640" y="6453360"/>
-            <a:ext cx="756720" cy="363960"/>
+            <a:ext cx="756360" cy="363960"/>
           </a:xfrm>
           <a:prstGeom prst="rect">
             <a:avLst/>
@@ -5122,7 +5152,7 @@
                 <a:spcPct val="100000"/>
               </a:lnSpc>
             </a:pPr>
-            <a:fld id="{1C5CC3B5-12D6-4B14-91E6-374595B6925B}" type="slidenum">
+            <a:fld id="{A0E7FD5B-7F04-4F44-80AB-ED78A0579918}" type="slidenum">
               <a:rPr b="0" lang="en-US" sz="1800" spc="-1" strike="noStrike">
                 <a:solidFill>
                   <a:srgbClr val="808080"/>
@@ -5150,7 +5180,7 @@
         <p:spPr>
           <a:xfrm>
             <a:off x="912240" y="1268280"/>
-            <a:ext cx="9206640" cy="360000"/>
+            <a:ext cx="9206280" cy="359640"/>
           </a:xfrm>
           <a:prstGeom prst="rect">
             <a:avLst/>
@@ -5171,11 +5201,17 @@
             <a:noAutofit/>
           </a:bodyPr>
           <a:p>
+            <a:pPr>
+              <a:lnSpc>
+                <a:spcPct val="100000"/>
+              </a:lnSpc>
+            </a:pPr>
             <a:endParaRPr b="0" lang="en-GB" sz="1800" spc="-1" strike="noStrike">
               <a:solidFill>
                 <a:srgbClr val="000000"/>
               </a:solidFill>
               <a:latin typeface="Arial"/>
+              <a:ea typeface="DejaVu Sans"/>
             </a:endParaRPr>
           </a:p>
         </p:txBody>
@@ -5193,7 +5229,7 @@
         <p:spPr>
           <a:xfrm>
             <a:off x="0" y="0"/>
-            <a:ext cx="3050640" cy="560520"/>
+            <a:ext cx="3050280" cy="560160"/>
           </a:xfrm>
           <a:prstGeom prst="rect">
             <a:avLst/>
@@ -5216,7 +5252,7 @@
         <p:spPr>
           <a:xfrm>
             <a:off x="7430400" y="134640"/>
-            <a:ext cx="3696480" cy="512640"/>
+            <a:ext cx="3696120" cy="512280"/>
           </a:xfrm>
           <a:prstGeom prst="rect">
             <a:avLst/>
@@ -5235,7 +5271,7 @@
         <p:spPr>
           <a:xfrm>
             <a:off x="11444760" y="0"/>
-            <a:ext cx="739800" cy="6848640"/>
+            <a:ext cx="739440" cy="6848280"/>
           </a:xfrm>
           <a:prstGeom prst="rect">
             <a:avLst/>
@@ -5260,11 +5296,17 @@
             <a:noAutofit/>
           </a:bodyPr>
           <a:p>
+            <a:pPr>
+              <a:lnSpc>
+                <a:spcPct val="100000"/>
+              </a:lnSpc>
+            </a:pPr>
             <a:endParaRPr b="0" lang="en-GB" sz="1800" spc="-1" strike="noStrike">
               <a:solidFill>
                 <a:srgbClr val="ffffff"/>
               </a:solidFill>
               <a:latin typeface="Arial"/>
+              <a:ea typeface="DejaVu Sans"/>
             </a:endParaRPr>
           </a:p>
         </p:txBody>
@@ -5278,7 +5320,7 @@
         <p:spPr>
           <a:xfrm>
             <a:off x="11438640" y="6453360"/>
-            <a:ext cx="756720" cy="363960"/>
+            <a:ext cx="756360" cy="363960"/>
           </a:xfrm>
           <a:prstGeom prst="rect">
             <a:avLst/>
@@ -5304,7 +5346,7 @@
                 <a:spcPct val="100000"/>
               </a:lnSpc>
             </a:pPr>
-            <a:fld id="{B4437858-089D-47CF-9D55-259C422EB16F}" type="slidenum">
+            <a:fld id="{3AEE9EEE-E077-4779-9EA2-CCA91A517B40}" type="slidenum">
               <a:rPr b="0" lang="en-US" sz="1800" spc="-1" strike="noStrike">
                 <a:solidFill>
                   <a:srgbClr val="808080"/>
@@ -5332,7 +5374,7 @@
         <p:spPr>
           <a:xfrm>
             <a:off x="0" y="6642720"/>
-            <a:ext cx="12182760" cy="211320"/>
+            <a:ext cx="12182400" cy="211320"/>
           </a:xfrm>
           <a:prstGeom prst="rect">
             <a:avLst/>
@@ -5717,7 +5759,7 @@
         <p:spPr>
           <a:xfrm>
             <a:off x="527400" y="1412640"/>
-            <a:ext cx="10359720" cy="1146240"/>
+            <a:ext cx="10359360" cy="1145880"/>
           </a:xfrm>
           <a:prstGeom prst="rect">
             <a:avLst/>
@@ -5771,7 +5813,7 @@
         <p:spPr>
           <a:xfrm>
             <a:off x="527400" y="2852640"/>
-            <a:ext cx="10359720" cy="2367000"/>
+            <a:ext cx="10359360" cy="2366640"/>
           </a:xfrm>
           <a:prstGeom prst="rect">
             <a:avLst/>
@@ -6034,7 +6076,7 @@
         <p:spPr>
           <a:xfrm>
             <a:off x="335520" y="764640"/>
-            <a:ext cx="10743840" cy="494640"/>
+            <a:ext cx="10743480" cy="494280"/>
           </a:xfrm>
           <a:prstGeom prst="rect">
             <a:avLst/>
@@ -6101,7 +6143,7 @@
         <p:spPr>
           <a:xfrm>
             <a:off x="335520" y="2408400"/>
-            <a:ext cx="10743840" cy="3891600"/>
+            <a:ext cx="10743480" cy="3891240"/>
           </a:xfrm>
           <a:prstGeom prst="rect">
             <a:avLst/>
@@ -6290,7 +6332,7 @@
         <p:spPr>
           <a:xfrm>
             <a:off x="335520" y="764640"/>
-            <a:ext cx="10743840" cy="494640"/>
+            <a:ext cx="10743480" cy="494280"/>
           </a:xfrm>
           <a:prstGeom prst="rect">
             <a:avLst/>
@@ -6344,7 +6386,7 @@
         <p:spPr>
           <a:xfrm>
             <a:off x="335520" y="2408400"/>
-            <a:ext cx="10743840" cy="3891600"/>
+            <a:ext cx="10743480" cy="3891240"/>
           </a:xfrm>
           <a:prstGeom prst="rect">
             <a:avLst/>
@@ -6565,7 +6607,7 @@
         <p:spPr>
           <a:xfrm>
             <a:off x="335520" y="764640"/>
-            <a:ext cx="10743840" cy="494640"/>
+            <a:ext cx="10743480" cy="494280"/>
           </a:xfrm>
           <a:prstGeom prst="rect">
             <a:avLst/>
@@ -6632,7 +6674,7 @@
         <p:spPr>
           <a:xfrm>
             <a:off x="335520" y="2408400"/>
-            <a:ext cx="10743840" cy="3891600"/>
+            <a:ext cx="10743480" cy="3891240"/>
           </a:xfrm>
           <a:prstGeom prst="rect">
             <a:avLst/>
@@ -6885,7 +6927,7 @@
         <p:spPr>
           <a:xfrm>
             <a:off x="335520" y="764640"/>
-            <a:ext cx="10743840" cy="494640"/>
+            <a:ext cx="10743480" cy="494280"/>
           </a:xfrm>
           <a:prstGeom prst="rect">
             <a:avLst/>
@@ -6939,7 +6981,7 @@
         <p:spPr>
           <a:xfrm>
             <a:off x="335520" y="1268640"/>
-            <a:ext cx="10743840" cy="5031360"/>
+            <a:ext cx="10743480" cy="5031000"/>
           </a:xfrm>
           <a:prstGeom prst="rect">
             <a:avLst/>
@@ -6982,7 +7024,7 @@
                 <a:latin typeface="DejaVu Sans"/>
                 <a:ea typeface="DejaVu Sans"/>
               </a:rPr>
-              <a:t>17.04.2023 → Organization + Introduction</a:t>
+              <a:t>17.04.2023 → Organization (L00) + Introduction (L01)</a:t>
             </a:r>
             <a:endParaRPr b="0" lang="en-GB" sz="1800" spc="-1" strike="noStrike">
               <a:solidFill>
@@ -7014,7 +7056,7 @@
                 <a:latin typeface="DejaVu Sans"/>
                 <a:ea typeface="DejaVu Sans"/>
               </a:rPr>
-              <a:t>24.04.2023 → Circular Economy </a:t>
+              <a:t>24.04.2023 → Circular Economy (L02) </a:t>
             </a:r>
             <a:endParaRPr b="0" lang="en-GB" sz="1800" spc="-1" strike="noStrike">
               <a:solidFill>
@@ -7046,7 +7088,7 @@
                 <a:latin typeface="DejaVu Sans"/>
                 <a:ea typeface="DejaVu Sans"/>
               </a:rPr>
-              <a:t>08.05.2023 → Lifecycle Assessment (LCA) </a:t>
+              <a:t>08.05.2023 → Lifecycle Assessment – LCA (L03)</a:t>
             </a:r>
             <a:endParaRPr b="0" lang="en-GB" sz="1800" spc="-1" strike="noStrike">
               <a:solidFill>
@@ -7078,7 +7120,7 @@
                 <a:latin typeface="DejaVu Sans"/>
                 <a:ea typeface="DejaVu Sans"/>
               </a:rPr>
-              <a:t>15.05.2023 → Introduction to the Internet of Things</a:t>
+              <a:t>15.05.2023 → Introduction to the Internet of Things (L04)</a:t>
             </a:r>
             <a:endParaRPr b="0" lang="en-GB" sz="1800" spc="-1" strike="noStrike">
               <a:solidFill>
@@ -7110,7 +7152,7 @@
                 <a:latin typeface="DejaVu Sans"/>
                 <a:ea typeface="DejaVu Sans"/>
               </a:rPr>
-              <a:t>22.05.2023 → Internet of Things – Communication + Security and Privacy</a:t>
+              <a:t>22.05.2023 → Internet of Things – Communication + Security and Privacy (L05)</a:t>
             </a:r>
             <a:endParaRPr b="0" lang="en-GB" sz="1800" spc="-1" strike="noStrike">
               <a:solidFill>
@@ -7142,7 +7184,7 @@
                 <a:latin typeface="DejaVu Sans"/>
                 <a:ea typeface="DejaVu Sans"/>
               </a:rPr>
-              <a:t>05.06.2023 → Internet of Things – Data Processing and BigData</a:t>
+              <a:t>05.06.2023 → Internet of Things – Data Processing and BigData (L06)</a:t>
             </a:r>
             <a:endParaRPr b="0" lang="en-GB" sz="1800" spc="-1" strike="noStrike">
               <a:solidFill>
@@ -7152,19 +7194,13 @@
             </a:endParaRPr>
           </a:p>
           <a:p>
-            <a:pPr lvl="6" marL="1512000" indent="-216000">
+            <a:pPr>
               <a:lnSpc>
                 <a:spcPct val="100000"/>
               </a:lnSpc>
               <a:spcBef>
                 <a:spcPts val="360"/>
               </a:spcBef>
-              <a:buClr>
-                <a:srgbClr val="000000"/>
-              </a:buClr>
-              <a:buSzPct val="45000"/>
-              <a:buFont typeface="Wingdings" charset="2"/>
-              <a:buChar char=""/>
             </a:pPr>
             <a:r>
               <a:rPr b="0" lang="en-US" sz="1800" spc="-1" strike="noStrike">
@@ -7174,7 +7210,27 @@
                 <a:latin typeface="DejaVu Sans"/>
                 <a:ea typeface="DejaVu Sans"/>
               </a:rPr>
-              <a:t> → </a:t>
+              <a:t> </a:t>
+            </a:r>
+            <a:r>
+              <a:rPr b="0" lang="en-US" sz="1800" spc="-1" strike="noStrike">
+                <a:solidFill>
+                  <a:srgbClr val="000000"/>
+                </a:solidFill>
+                <a:latin typeface="DejaVu Sans"/>
+                <a:ea typeface="DejaVu Sans"/>
+              </a:rPr>
+              <a:t>	</a:t>
+            </a:r>
+            <a:r>
+              <a:rPr b="0" lang="en-US" sz="1800" spc="-1" strike="noStrike">
+                <a:solidFill>
+                  <a:srgbClr val="000000"/>
+                </a:solidFill>
+                <a:latin typeface="DejaVu Sans"/>
+                <a:ea typeface="DejaVu Sans"/>
+              </a:rPr>
+              <a:t>         → </a:t>
             </a:r>
             <a:r>
               <a:rPr b="0" lang="en-US" sz="1800" spc="-1" strike="noStrike">
@@ -7216,7 +7272,7 @@
                 <a:latin typeface="DejaVu Sans"/>
                 <a:ea typeface="DejaVu Sans"/>
               </a:rPr>
-              <a:t>12.06.2023 → Industrial Internet of Things</a:t>
+              <a:t>12.06.2023 → Industrial Internet of Things (L07)</a:t>
             </a:r>
             <a:endParaRPr b="0" lang="en-GB" sz="1800" spc="-1" strike="noStrike">
               <a:solidFill>
@@ -7248,7 +7304,7 @@
                 <a:latin typeface="DejaVu Sans"/>
                 <a:ea typeface="DejaVu Sans"/>
               </a:rPr>
-              <a:t>19.06.2023 → Introduction to Blockchain Technology</a:t>
+              <a:t>19.06.2023 → Introduction to Blockchain Technology (L08)</a:t>
             </a:r>
             <a:endParaRPr b="0" lang="en-GB" sz="1800" spc="-1" strike="noStrike">
               <a:solidFill>
@@ -7280,7 +7336,7 @@
                 <a:latin typeface="DejaVu Sans"/>
                 <a:ea typeface="DejaVu Sans"/>
               </a:rPr>
-              <a:t>26.06.2023 → Blockchain Technology – Consensus</a:t>
+              <a:t>26.06.2023 → Blockchain Technology – Consensus (L09)</a:t>
             </a:r>
             <a:endParaRPr b="0" lang="en-GB" sz="1800" spc="-1" strike="noStrike">
               <a:solidFill>
@@ -7312,7 +7368,7 @@
                 <a:latin typeface="DejaVu Sans"/>
                 <a:ea typeface="DejaVu Sans"/>
               </a:rPr>
-              <a:t>03.07.2023 → Blockchain Technology – Ethereum and Smart Contracts</a:t>
+              <a:t>03.07.2023 → Blockchain Technology – Ethereum and Smart Contracts (L10)</a:t>
             </a:r>
             <a:endParaRPr b="0" lang="en-GB" sz="1800" spc="-1" strike="noStrike">
               <a:solidFill>
@@ -7344,7 +7400,7 @@
                 <a:latin typeface="DejaVu Sans"/>
                 <a:ea typeface="DejaVu Sans"/>
               </a:rPr>
-              <a:t>10.07.2023 → Blockchain Technology and Sustainability</a:t>
+              <a:t>10.07.2023 → Blockchain Technology and Sustainability (L11)</a:t>
             </a:r>
             <a:endParaRPr b="0" lang="en-GB" sz="1800" spc="-1" strike="noStrike">
               <a:solidFill>
@@ -7396,7 +7452,7 @@
                 <a:latin typeface="DejaVu Sans"/>
                 <a:ea typeface="DejaVu Sans"/>
               </a:rPr>
-              <a:t> The Machine-to-Everything Economy – A step towards the CE 2.0?</a:t>
+              <a:t> The Machine-to-Everything Economy – A step towards the CE 2.0? (L12)</a:t>
             </a:r>
             <a:endParaRPr b="0" lang="en-GB" sz="1800" spc="-1" strike="noStrike">
               <a:solidFill>
@@ -7446,7 +7502,7 @@
         <p:spPr>
           <a:xfrm>
             <a:off x="335520" y="764640"/>
-            <a:ext cx="10743840" cy="494640"/>
+            <a:ext cx="10743480" cy="494280"/>
           </a:xfrm>
           <a:prstGeom prst="rect">
             <a:avLst/>
@@ -7500,7 +7556,7 @@
         <p:spPr>
           <a:xfrm>
             <a:off x="335520" y="1268640"/>
-            <a:ext cx="10743840" cy="5031360"/>
+            <a:ext cx="10743480" cy="5031000"/>
           </a:xfrm>
           <a:prstGeom prst="rect">
             <a:avLst/>
@@ -7771,17 +7827,7 @@
                 <a:latin typeface="DejaVu Sans"/>
                 <a:ea typeface="DejaVu Sans"/>
               </a:rPr>
-              <a:t> Exercise 05 – </a:t>
-            </a:r>
-            <a:r>
-              <a:rPr b="0" lang="de-DE" sz="1800" spc="-1" strike="noStrike">
-                <a:solidFill>
-                  <a:srgbClr val="000000"/>
-                </a:solidFill>
-                <a:latin typeface="DejaVu Sans"/>
-                <a:ea typeface="DejaVu Sans"/>
-              </a:rPr>
-              <a:t>IoT Security</a:t>
+              <a:t> Exercise 05 – IoT Security</a:t>
             </a:r>
             <a:endParaRPr b="0" lang="en-GB" sz="1800" spc="-1" strike="noStrike">
               <a:solidFill>
@@ -7833,17 +7879,7 @@
                 <a:latin typeface="DejaVu Sans"/>
                 <a:ea typeface="DejaVu Sans"/>
               </a:rPr>
-              <a:t> Exercise 06 – </a:t>
-            </a:r>
-            <a:r>
-              <a:rPr b="0" lang="de-DE" sz="1800" spc="-1" strike="noStrike">
-                <a:solidFill>
-                  <a:srgbClr val="000000"/>
-                </a:solidFill>
-                <a:latin typeface="DejaVu Sans"/>
-                <a:ea typeface="DejaVu Sans"/>
-              </a:rPr>
-              <a:t>IoT Data Processing</a:t>
+              <a:t> Exercise 06 – IoT Data Processing</a:t>
             </a:r>
             <a:endParaRPr b="0" lang="en-GB" sz="1800" spc="-1" strike="noStrike">
               <a:solidFill>
@@ -8205,7 +8241,7 @@
         <p:spPr>
           <a:xfrm>
             <a:off x="335520" y="764640"/>
-            <a:ext cx="10743840" cy="494640"/>
+            <a:ext cx="10743480" cy="494280"/>
           </a:xfrm>
           <a:prstGeom prst="rect">
             <a:avLst/>
@@ -8259,7 +8295,7 @@
         <p:spPr>
           <a:xfrm>
             <a:off x="335520" y="1268280"/>
-            <a:ext cx="10743840" cy="5031360"/>
+            <a:ext cx="10743480" cy="5031000"/>
           </a:xfrm>
           <a:prstGeom prst="rect">
             <a:avLst/>
@@ -8425,7 +8461,7 @@
                 <a:srgbClr val="008c4f"/>
               </a:buClr>
               <a:buSzPct val="45000"/>
-              <a:buFont typeface="Symbol" charset="2"/>
+              <a:buFont typeface="Symbol"/>
               <a:buChar char=""/>
             </a:pPr>
             <a:r>
@@ -8722,7 +8758,7 @@
         <p:spPr>
           <a:xfrm>
             <a:off x="335520" y="764640"/>
-            <a:ext cx="10742400" cy="493200"/>
+            <a:ext cx="10742040" cy="492840"/>
           </a:xfrm>
           <a:prstGeom prst="rect">
             <a:avLst/>
@@ -8802,7 +8838,7 @@
         <p:spPr>
           <a:xfrm>
             <a:off x="335520" y="1268640"/>
-            <a:ext cx="10742400" cy="5029920"/>
+            <a:ext cx="10742040" cy="5029560"/>
           </a:xfrm>
           <a:prstGeom prst="rect">
             <a:avLst/>
@@ -8823,19 +8859,13 @@
             <a:noAutofit/>
           </a:bodyPr>
           <a:p>
-            <a:pPr marL="195120" indent="-188640">
+            <a:pPr>
               <a:lnSpc>
                 <a:spcPct val="100000"/>
               </a:lnSpc>
               <a:spcBef>
                 <a:spcPts val="360"/>
               </a:spcBef>
-              <a:buClr>
-                <a:srgbClr val="008c4f"/>
-              </a:buClr>
-              <a:buSzPct val="80000"/>
-              <a:buFont typeface="Wingdings" charset="2"/>
-              <a:buChar char=""/>
             </a:pPr>
             <a:endParaRPr b="0" lang="en-GB" sz="1800" spc="-1" strike="noStrike">
               <a:solidFill>
@@ -9239,7 +9269,7 @@
         <p:spPr>
           <a:xfrm>
             <a:off x="335520" y="764640"/>
-            <a:ext cx="10743840" cy="494640"/>
+            <a:ext cx="10743480" cy="494280"/>
           </a:xfrm>
           <a:prstGeom prst="rect">
             <a:avLst/>
@@ -9293,7 +9323,7 @@
         <p:spPr>
           <a:xfrm>
             <a:off x="335520" y="1268280"/>
-            <a:ext cx="10743840" cy="5031360"/>
+            <a:ext cx="10743480" cy="5031000"/>
           </a:xfrm>
           <a:prstGeom prst="rect">
             <a:avLst/>
@@ -9694,7 +9724,7 @@
         <p:spPr>
           <a:xfrm>
             <a:off x="335520" y="764640"/>
-            <a:ext cx="10743840" cy="494640"/>
+            <a:ext cx="10743480" cy="494280"/>
           </a:xfrm>
           <a:prstGeom prst="rect">
             <a:avLst/>
@@ -9748,7 +9778,7 @@
         <p:spPr>
           <a:xfrm>
             <a:off x="335520" y="1268640"/>
-            <a:ext cx="10743840" cy="5031360"/>
+            <a:ext cx="10743480" cy="5031000"/>
           </a:xfrm>
           <a:prstGeom prst="rect">
             <a:avLst/>
@@ -9979,7 +10009,7 @@
         <p:spPr>
           <a:xfrm>
             <a:off x="4655880" y="476640"/>
-            <a:ext cx="2430000" cy="356040"/>
+            <a:ext cx="2429640" cy="355680"/>
           </a:xfrm>
           <a:prstGeom prst="rect">
             <a:avLst/>
@@ -10000,11 +10030,17 @@
             <a:noAutofit/>
           </a:bodyPr>
           <a:p>
+            <a:pPr>
+              <a:lnSpc>
+                <a:spcPct val="100000"/>
+              </a:lnSpc>
+            </a:pPr>
             <a:endParaRPr b="0" lang="en-GB" sz="1800" spc="-1" strike="noStrike">
               <a:solidFill>
                 <a:srgbClr val="000000"/>
               </a:solidFill>
               <a:latin typeface="Arial"/>
+              <a:ea typeface="DejaVu Sans"/>
             </a:endParaRPr>
           </a:p>
         </p:txBody>
@@ -10048,7 +10084,7 @@
         <p:spPr>
           <a:xfrm>
             <a:off x="335520" y="764640"/>
-            <a:ext cx="10743840" cy="494640"/>
+            <a:ext cx="10743480" cy="494280"/>
           </a:xfrm>
           <a:prstGeom prst="rect">
             <a:avLst/>
@@ -10102,7 +10138,7 @@
         <p:spPr>
           <a:xfrm>
             <a:off x="335520" y="1268640"/>
-            <a:ext cx="10743840" cy="5031360"/>
+            <a:ext cx="10743480" cy="5031000"/>
           </a:xfrm>
           <a:prstGeom prst="rect">
             <a:avLst/>
@@ -10229,7 +10265,7 @@
         <p:spPr>
           <a:xfrm>
             <a:off x="4655880" y="476640"/>
-            <a:ext cx="2430000" cy="356040"/>
+            <a:ext cx="2429640" cy="355680"/>
           </a:xfrm>
           <a:prstGeom prst="rect">
             <a:avLst/>
@@ -10250,11 +10286,17 @@
             <a:noAutofit/>
           </a:bodyPr>
           <a:p>
+            <a:pPr>
+              <a:lnSpc>
+                <a:spcPct val="100000"/>
+              </a:lnSpc>
+            </a:pPr>
             <a:endParaRPr b="0" lang="en-GB" sz="1800" spc="-1" strike="noStrike">
               <a:solidFill>
                 <a:srgbClr val="000000"/>
               </a:solidFill>
               <a:latin typeface="Arial"/>
+              <a:ea typeface="DejaVu Sans"/>
             </a:endParaRPr>
           </a:p>
         </p:txBody>
@@ -10298,7 +10340,7 @@
         <p:spPr>
           <a:xfrm>
             <a:off x="335520" y="764640"/>
-            <a:ext cx="10741680" cy="492480"/>
+            <a:ext cx="10741320" cy="492120"/>
           </a:xfrm>
           <a:prstGeom prst="rect">
             <a:avLst/>
@@ -10352,7 +10394,7 @@
         <p:spPr>
           <a:xfrm>
             <a:off x="335520" y="1268640"/>
-            <a:ext cx="10741680" cy="5029200"/>
+            <a:ext cx="10741320" cy="5028840"/>
           </a:xfrm>
           <a:prstGeom prst="rect">
             <a:avLst/>
@@ -10415,7 +10457,7 @@
         <p:spPr>
           <a:xfrm>
             <a:off x="336600" y="3429000"/>
-            <a:ext cx="10859400" cy="2051280"/>
+            <a:ext cx="10859040" cy="2050920"/>
           </a:xfrm>
           <a:prstGeom prst="rect">
             <a:avLst/>
@@ -10610,7 +10652,7 @@
         <p:spPr>
           <a:xfrm>
             <a:off x="335520" y="840960"/>
-            <a:ext cx="10743840" cy="494640"/>
+            <a:ext cx="10743480" cy="494280"/>
           </a:xfrm>
           <a:prstGeom prst="rect">
             <a:avLst/>
@@ -10664,7 +10706,7 @@
         <p:spPr>
           <a:xfrm>
             <a:off x="388800" y="1488600"/>
-            <a:ext cx="10722240" cy="5204520"/>
+            <a:ext cx="10721880" cy="5204520"/>
           </a:xfrm>
           <a:prstGeom prst="rect">
             <a:avLst/>
@@ -11370,7 +11412,7 @@
         <p:spPr>
           <a:xfrm>
             <a:off x="335520" y="764640"/>
-            <a:ext cx="10743840" cy="494640"/>
+            <a:ext cx="10743480" cy="494280"/>
           </a:xfrm>
           <a:prstGeom prst="rect">
             <a:avLst/>
@@ -11424,7 +11466,7 @@
         <p:spPr>
           <a:xfrm>
             <a:off x="4655880" y="476640"/>
-            <a:ext cx="2430000" cy="356040"/>
+            <a:ext cx="2429640" cy="355680"/>
           </a:xfrm>
           <a:prstGeom prst="rect">
             <a:avLst/>
@@ -11445,11 +11487,17 @@
             <a:noAutofit/>
           </a:bodyPr>
           <a:p>
+            <a:pPr>
+              <a:lnSpc>
+                <a:spcPct val="100000"/>
+              </a:lnSpc>
+            </a:pPr>
             <a:endParaRPr b="0" lang="en-GB" sz="1800" spc="-1" strike="noStrike">
               <a:solidFill>
                 <a:srgbClr val="000000"/>
               </a:solidFill>
               <a:latin typeface="Arial"/>
+              <a:ea typeface="DejaVu Sans"/>
             </a:endParaRPr>
           </a:p>
         </p:txBody>
@@ -11463,7 +11511,7 @@
         <p:spPr>
           <a:xfrm>
             <a:off x="494640" y="1523880"/>
-            <a:ext cx="10362600" cy="477720"/>
+            <a:ext cx="10362240" cy="477360"/>
           </a:xfrm>
           <a:prstGeom prst="rect">
             <a:avLst/>
@@ -11522,7 +11570,7 @@
         <p:spPr>
           <a:xfrm>
             <a:off x="609120" y="2057760"/>
-            <a:ext cx="9515160" cy="3879360"/>
+            <a:ext cx="9514800" cy="3879000"/>
           </a:xfrm>
           <a:prstGeom prst="rect">
             <a:avLst/>
@@ -11571,7 +11619,7 @@
         <p:spPr>
           <a:xfrm>
             <a:off x="335520" y="764640"/>
-            <a:ext cx="10743840" cy="494640"/>
+            <a:ext cx="10743480" cy="494280"/>
           </a:xfrm>
           <a:prstGeom prst="rect">
             <a:avLst/>
@@ -11625,7 +11673,7 @@
         <p:spPr>
           <a:xfrm>
             <a:off x="4655880" y="476640"/>
-            <a:ext cx="2430000" cy="356040"/>
+            <a:ext cx="2429640" cy="355680"/>
           </a:xfrm>
           <a:prstGeom prst="rect">
             <a:avLst/>
@@ -11646,11 +11694,17 @@
             <a:noAutofit/>
           </a:bodyPr>
           <a:p>
+            <a:pPr>
+              <a:lnSpc>
+                <a:spcPct val="100000"/>
+              </a:lnSpc>
+            </a:pPr>
             <a:endParaRPr b="0" lang="en-GB" sz="1800" spc="-1" strike="noStrike">
               <a:solidFill>
                 <a:srgbClr val="000000"/>
               </a:solidFill>
               <a:latin typeface="Arial"/>
+              <a:ea typeface="DejaVu Sans"/>
             </a:endParaRPr>
           </a:p>
         </p:txBody>
@@ -11664,7 +11718,7 @@
         <p:spPr>
           <a:xfrm>
             <a:off x="494640" y="1474920"/>
-            <a:ext cx="10362600" cy="477720"/>
+            <a:ext cx="10362240" cy="477360"/>
           </a:xfrm>
           <a:prstGeom prst="rect">
             <a:avLst/>
@@ -11733,7 +11787,7 @@
         <p:spPr>
           <a:xfrm>
             <a:off x="446400" y="2185200"/>
-            <a:ext cx="9402480" cy="3845520"/>
+            <a:ext cx="9402120" cy="3845160"/>
           </a:xfrm>
           <a:prstGeom prst="rect">
             <a:avLst/>
@@ -11782,7 +11836,7 @@
         <p:spPr>
           <a:xfrm>
             <a:off x="335520" y="764640"/>
-            <a:ext cx="10743840" cy="494640"/>
+            <a:ext cx="10743480" cy="494280"/>
           </a:xfrm>
           <a:prstGeom prst="rect">
             <a:avLst/>
@@ -11836,7 +11890,7 @@
         <p:spPr>
           <a:xfrm>
             <a:off x="4655880" y="476640"/>
-            <a:ext cx="2430000" cy="356040"/>
+            <a:ext cx="2429640" cy="355680"/>
           </a:xfrm>
           <a:prstGeom prst="rect">
             <a:avLst/>
@@ -11857,11 +11911,17 @@
             <a:noAutofit/>
           </a:bodyPr>
           <a:p>
+            <a:pPr>
+              <a:lnSpc>
+                <a:spcPct val="100000"/>
+              </a:lnSpc>
+            </a:pPr>
             <a:endParaRPr b="0" lang="en-GB" sz="1800" spc="-1" strike="noStrike">
               <a:solidFill>
                 <a:srgbClr val="000000"/>
               </a:solidFill>
               <a:latin typeface="Arial"/>
+              <a:ea typeface="DejaVu Sans"/>
             </a:endParaRPr>
           </a:p>
         </p:txBody>
@@ -11875,7 +11935,7 @@
         <p:spPr>
           <a:xfrm>
             <a:off x="494640" y="1523880"/>
-            <a:ext cx="10362600" cy="477720"/>
+            <a:ext cx="10362240" cy="477360"/>
           </a:xfrm>
           <a:prstGeom prst="rect">
             <a:avLst/>
@@ -11934,7 +11994,7 @@
         <p:spPr>
           <a:xfrm>
             <a:off x="494640" y="2088360"/>
-            <a:ext cx="8940240" cy="3961800"/>
+            <a:ext cx="8939880" cy="3961440"/>
           </a:xfrm>
           <a:prstGeom prst="rect">
             <a:avLst/>
@@ -11983,7 +12043,7 @@
         <p:spPr>
           <a:xfrm>
             <a:off x="335520" y="764640"/>
-            <a:ext cx="10743840" cy="494640"/>
+            <a:ext cx="10743480" cy="494280"/>
           </a:xfrm>
           <a:prstGeom prst="rect">
             <a:avLst/>
@@ -12037,7 +12097,7 @@
         <p:spPr>
           <a:xfrm>
             <a:off x="4655880" y="476640"/>
-            <a:ext cx="2430000" cy="356040"/>
+            <a:ext cx="2429640" cy="355680"/>
           </a:xfrm>
           <a:prstGeom prst="rect">
             <a:avLst/>
@@ -12058,11 +12118,17 @@
             <a:noAutofit/>
           </a:bodyPr>
           <a:p>
+            <a:pPr>
+              <a:lnSpc>
+                <a:spcPct val="100000"/>
+              </a:lnSpc>
+            </a:pPr>
             <a:endParaRPr b="0" lang="en-GB" sz="1800" spc="-1" strike="noStrike">
               <a:solidFill>
                 <a:srgbClr val="000000"/>
               </a:solidFill>
               <a:latin typeface="Arial"/>
+              <a:ea typeface="DejaVu Sans"/>
             </a:endParaRPr>
           </a:p>
         </p:txBody>
@@ -12076,7 +12142,7 @@
         <p:spPr>
           <a:xfrm>
             <a:off x="494640" y="1523880"/>
-            <a:ext cx="10362600" cy="477720"/>
+            <a:ext cx="10362240" cy="477360"/>
           </a:xfrm>
           <a:prstGeom prst="rect">
             <a:avLst/>
@@ -12135,7 +12201,7 @@
         <p:spPr>
           <a:xfrm>
             <a:off x="494640" y="2166840"/>
-            <a:ext cx="8335800" cy="4177080"/>
+            <a:ext cx="8335440" cy="4176720"/>
           </a:xfrm>
           <a:prstGeom prst="rect">
             <a:avLst/>
@@ -12184,7 +12250,7 @@
         <p:spPr>
           <a:xfrm>
             <a:off x="335520" y="768240"/>
-            <a:ext cx="10743840" cy="494640"/>
+            <a:ext cx="10743480" cy="494280"/>
           </a:xfrm>
           <a:prstGeom prst="rect">
             <a:avLst/>
@@ -12238,7 +12304,7 @@
         <p:spPr>
           <a:xfrm>
             <a:off x="388800" y="1488600"/>
-            <a:ext cx="10717560" cy="5204520"/>
+            <a:ext cx="10717200" cy="5204520"/>
           </a:xfrm>
           <a:prstGeom prst="rect">
             <a:avLst/>
@@ -12948,7 +13014,7 @@
         <p:spPr>
           <a:xfrm>
             <a:off x="335520" y="764640"/>
-            <a:ext cx="10743840" cy="494640"/>
+            <a:ext cx="10743480" cy="494280"/>
           </a:xfrm>
           <a:prstGeom prst="rect">
             <a:avLst/>
@@ -13002,7 +13068,7 @@
         <p:spPr>
           <a:xfrm>
             <a:off x="494640" y="1523880"/>
-            <a:ext cx="10362600" cy="477720"/>
+            <a:ext cx="10362240" cy="477360"/>
           </a:xfrm>
           <a:prstGeom prst="rect">
             <a:avLst/>
@@ -13091,6 +13157,7 @@
                 <a:srgbClr val="000000"/>
               </a:solidFill>
               <a:latin typeface="Arial"/>
+              <a:ea typeface="DejaVu Sans"/>
             </a:endParaRPr>
           </a:p>
         </p:txBody>
@@ -13108,7 +13175,7 @@
         <p:spPr>
           <a:xfrm>
             <a:off x="1895760" y="2238840"/>
-            <a:ext cx="6784920" cy="4155840"/>
+            <a:ext cx="6784560" cy="4155480"/>
           </a:xfrm>
           <a:prstGeom prst="rect">
             <a:avLst/>
@@ -13157,7 +13224,7 @@
         <p:spPr>
           <a:xfrm>
             <a:off x="335520" y="764640"/>
-            <a:ext cx="10743840" cy="494640"/>
+            <a:ext cx="10743480" cy="494280"/>
           </a:xfrm>
           <a:prstGeom prst="rect">
             <a:avLst/>
@@ -13211,7 +13278,7 @@
         <p:spPr>
           <a:xfrm>
             <a:off x="494640" y="1488600"/>
-            <a:ext cx="5445360" cy="442440"/>
+            <a:ext cx="5445000" cy="442080"/>
           </a:xfrm>
           <a:prstGeom prst="rect">
             <a:avLst/>
@@ -13280,7 +13347,7 @@
         <p:spPr>
           <a:xfrm>
             <a:off x="1828800" y="1937160"/>
-            <a:ext cx="7952400" cy="4086720"/>
+            <a:ext cx="7952040" cy="4086360"/>
           </a:xfrm>
           <a:prstGeom prst="rect">
             <a:avLst/>
@@ -13329,7 +13396,7 @@
         <p:spPr>
           <a:xfrm>
             <a:off x="335520" y="764640"/>
-            <a:ext cx="10743840" cy="494640"/>
+            <a:ext cx="10743480" cy="494280"/>
           </a:xfrm>
           <a:prstGeom prst="rect">
             <a:avLst/>
@@ -13387,7 +13454,7 @@
         <p:spPr>
           <a:xfrm>
             <a:off x="2679480" y="2130480"/>
-            <a:ext cx="7372800" cy="3483720"/>
+            <a:ext cx="7372440" cy="3483360"/>
           </a:xfrm>
           <a:prstGeom prst="rect">
             <a:avLst/>
@@ -13406,7 +13473,7 @@
         <p:spPr>
           <a:xfrm>
             <a:off x="494640" y="1418040"/>
-            <a:ext cx="5216760" cy="442440"/>
+            <a:ext cx="5216400" cy="442080"/>
           </a:xfrm>
           <a:prstGeom prst="rect">
             <a:avLst/>
@@ -13494,7 +13561,7 @@
         <p:spPr>
           <a:xfrm>
             <a:off x="685800" y="2514600"/>
-            <a:ext cx="8870760" cy="3837240"/>
+            <a:ext cx="8870400" cy="3836880"/>
           </a:xfrm>
           <a:prstGeom prst="rect">
             <a:avLst/>
@@ -13513,7 +13580,7 @@
         <p:spPr>
           <a:xfrm>
             <a:off x="335520" y="764640"/>
-            <a:ext cx="10743840" cy="494640"/>
+            <a:ext cx="10743480" cy="494280"/>
           </a:xfrm>
           <a:prstGeom prst="rect">
             <a:avLst/>
@@ -13567,7 +13634,7 @@
         <p:spPr>
           <a:xfrm>
             <a:off x="494640" y="1312200"/>
-            <a:ext cx="1733760" cy="365040"/>
+            <a:ext cx="1733400" cy="364680"/>
           </a:xfrm>
           <a:prstGeom prst="rect">
             <a:avLst/>
@@ -13682,6 +13749,7 @@
                 <a:srgbClr val="000000"/>
               </a:solidFill>
               <a:latin typeface="Arial"/>
+              <a:ea typeface="DejaVu Sans"/>
             </a:endParaRPr>
           </a:p>
         </p:txBody>
@@ -13730,6 +13798,7 @@
                 <a:srgbClr val="000000"/>
               </a:solidFill>
               <a:latin typeface="Arial"/>
+              <a:ea typeface="DejaVu Sans"/>
             </a:endParaRPr>
           </a:p>
         </p:txBody>
@@ -13778,6 +13847,7 @@
                 <a:srgbClr val="000000"/>
               </a:solidFill>
               <a:latin typeface="Arial"/>
+              <a:ea typeface="DejaVu Sans"/>
             </a:endParaRPr>
           </a:p>
         </p:txBody>
@@ -13791,7 +13861,7 @@
         <p:spPr>
           <a:xfrm>
             <a:off x="642600" y="1679400"/>
-            <a:ext cx="4400640" cy="638280"/>
+            <a:ext cx="4400280" cy="638280"/>
           </a:xfrm>
           <a:prstGeom prst="rect">
             <a:avLst/>
@@ -13868,7 +13938,7 @@
         <p:spPr>
           <a:xfrm>
             <a:off x="6549480" y="1679400"/>
-            <a:ext cx="4874400" cy="631080"/>
+            <a:ext cx="4874040" cy="630720"/>
           </a:xfrm>
           <a:prstGeom prst="rect">
             <a:avLst/>
@@ -13945,7 +14015,7 @@
         <p:spPr>
           <a:xfrm>
             <a:off x="7839360" y="1679400"/>
-            <a:ext cx="2615760" cy="428400"/>
+            <a:ext cx="2615400" cy="428040"/>
           </a:xfrm>
           <a:prstGeom prst="rect">
             <a:avLst/>
@@ -14002,7 +14072,7 @@
         <p:spPr>
           <a:xfrm>
             <a:off x="8857440" y="3943440"/>
-            <a:ext cx="280440" cy="363960"/>
+            <a:ext cx="280080" cy="363960"/>
           </a:xfrm>
           <a:prstGeom prst="rect">
             <a:avLst/>
@@ -14056,7 +14126,7 @@
         <p:spPr>
           <a:xfrm>
             <a:off x="9537840" y="4548960"/>
-            <a:ext cx="280440" cy="363960"/>
+            <a:ext cx="280080" cy="363960"/>
           </a:xfrm>
           <a:prstGeom prst="rect">
             <a:avLst/>
@@ -14110,7 +14180,7 @@
         <p:spPr>
           <a:xfrm>
             <a:off x="7279920" y="6101280"/>
-            <a:ext cx="280800" cy="363960"/>
+            <a:ext cx="280440" cy="363960"/>
           </a:xfrm>
           <a:prstGeom prst="rect">
             <a:avLst/>
@@ -14199,6 +14269,7 @@
                 <a:srgbClr val="000000"/>
               </a:solidFill>
               <a:latin typeface="Arial"/>
+              <a:ea typeface="DejaVu Sans"/>
             </a:endParaRPr>
           </a:p>
         </p:txBody>
@@ -14212,7 +14283,7 @@
         <p:spPr>
           <a:xfrm>
             <a:off x="1058760" y="6130800"/>
-            <a:ext cx="280800" cy="363960"/>
+            <a:ext cx="280440" cy="363960"/>
           </a:xfrm>
           <a:prstGeom prst="rect">
             <a:avLst/>
@@ -14296,7 +14367,7 @@
         <p:spPr>
           <a:xfrm>
             <a:off x="335520" y="764640"/>
-            <a:ext cx="10743840" cy="494640"/>
+            <a:ext cx="10743480" cy="494280"/>
           </a:xfrm>
           <a:prstGeom prst="rect">
             <a:avLst/>
@@ -14354,7 +14425,7 @@
         <p:spPr>
           <a:xfrm>
             <a:off x="2394720" y="1153800"/>
-            <a:ext cx="1466640" cy="2167920"/>
+            <a:ext cx="1466280" cy="2167560"/>
           </a:xfrm>
           <a:prstGeom prst="rect">
             <a:avLst/>
@@ -14377,7 +14448,7 @@
         <p:spPr>
           <a:xfrm>
             <a:off x="7250040" y="1153800"/>
-            <a:ext cx="1731960" cy="2167920"/>
+            <a:ext cx="1731600" cy="2167560"/>
           </a:xfrm>
           <a:prstGeom prst="rect">
             <a:avLst/>
@@ -14400,7 +14471,7 @@
         <p:spPr>
           <a:xfrm>
             <a:off x="2207880" y="4110120"/>
-            <a:ext cx="1780560" cy="1772640"/>
+            <a:ext cx="1780200" cy="1772280"/>
           </a:xfrm>
           <a:prstGeom prst="rect">
             <a:avLst/>
@@ -14419,7 +14490,7 @@
         <p:spPr>
           <a:xfrm>
             <a:off x="1330200" y="3269880"/>
-            <a:ext cx="3631320" cy="672840"/>
+            <a:ext cx="3630960" cy="672480"/>
           </a:xfrm>
           <a:prstGeom prst="rect">
             <a:avLst/>
@@ -14476,7 +14547,7 @@
         <p:spPr>
           <a:xfrm>
             <a:off x="6321600" y="3269880"/>
-            <a:ext cx="3631320" cy="672840"/>
+            <a:ext cx="3630960" cy="672480"/>
           </a:xfrm>
           <a:prstGeom prst="rect">
             <a:avLst/>
@@ -14533,7 +14604,7 @@
         <p:spPr>
           <a:xfrm>
             <a:off x="1312200" y="5920200"/>
-            <a:ext cx="3631320" cy="672840"/>
+            <a:ext cx="3630960" cy="672480"/>
           </a:xfrm>
           <a:prstGeom prst="rect">
             <a:avLst/>
@@ -14596,7 +14667,7 @@
         <p:spPr>
           <a:xfrm>
             <a:off x="1312200" y="5807160"/>
-            <a:ext cx="3631320" cy="672840"/>
+            <a:ext cx="3630960" cy="672480"/>
           </a:xfrm>
           <a:prstGeom prst="rect">
             <a:avLst/>
@@ -14653,7 +14724,7 @@
         <p:spPr>
           <a:xfrm>
             <a:off x="4860000" y="5920200"/>
-            <a:ext cx="3631320" cy="672840"/>
+            <a:ext cx="3630960" cy="672480"/>
           </a:xfrm>
           <a:prstGeom prst="rect">
             <a:avLst/>
@@ -14674,11 +14745,17 @@
             <a:noAutofit/>
           </a:bodyPr>
           <a:p>
+            <a:pPr>
+              <a:lnSpc>
+                <a:spcPct val="100000"/>
+              </a:lnSpc>
+            </a:pPr>
             <a:endParaRPr b="0" lang="en-GB" sz="1800" spc="-1" strike="noStrike">
               <a:solidFill>
                 <a:srgbClr val="000000"/>
               </a:solidFill>
               <a:latin typeface="Arial"/>
+              <a:ea typeface="DejaVu Sans"/>
             </a:endParaRPr>
           </a:p>
         </p:txBody>
@@ -14692,7 +14769,7 @@
         <p:spPr>
           <a:xfrm>
             <a:off x="6300000" y="5807160"/>
-            <a:ext cx="3631320" cy="672840"/>
+            <a:ext cx="3630960" cy="672480"/>
           </a:xfrm>
           <a:prstGeom prst="rect">
             <a:avLst/>
@@ -14754,7 +14831,7 @@
         <p:spPr>
           <a:xfrm>
             <a:off x="7380000" y="3960000"/>
-            <a:ext cx="1440000" cy="1923840"/>
+            <a:ext cx="1439640" cy="1923480"/>
           </a:xfrm>
           <a:prstGeom prst="rect">
             <a:avLst/>
@@ -14803,7 +14880,7 @@
         <p:spPr>
           <a:xfrm>
             <a:off x="335520" y="764640"/>
-            <a:ext cx="10743840" cy="494640"/>
+            <a:ext cx="10743480" cy="494280"/>
           </a:xfrm>
           <a:prstGeom prst="rect">
             <a:avLst/>
@@ -14857,7 +14934,7 @@
         <p:spPr>
           <a:xfrm>
             <a:off x="335520" y="1268640"/>
-            <a:ext cx="10743840" cy="5031360"/>
+            <a:ext cx="10743480" cy="5031000"/>
           </a:xfrm>
           <a:prstGeom prst="rect">
             <a:avLst/>
@@ -14942,6 +15019,22 @@
             </a:endParaRPr>
           </a:p>
           <a:p>
+            <a:pPr>
+              <a:lnSpc>
+                <a:spcPct val="100000"/>
+              </a:lnSpc>
+              <a:spcBef>
+                <a:spcPts val="360"/>
+              </a:spcBef>
+            </a:pPr>
+            <a:endParaRPr b="0" lang="en-GB" sz="1800" spc="-1" strike="noStrike">
+              <a:solidFill>
+                <a:srgbClr val="000000"/>
+              </a:solidFill>
+              <a:latin typeface="Arial"/>
+            </a:endParaRPr>
+          </a:p>
+          <a:p>
             <a:pPr marL="216000" indent="-216000">
               <a:lnSpc>
                 <a:spcPct val="100000"/>
@@ -14956,28 +15049,6 @@
               <a:buFont typeface="Monotype Sorts" charset="2"/>
               <a:buChar char=""/>
             </a:pPr>
-            <a:endParaRPr b="0" lang="en-GB" sz="1800" spc="-1" strike="noStrike">
-              <a:solidFill>
-                <a:srgbClr val="000000"/>
-              </a:solidFill>
-              <a:latin typeface="Arial"/>
-            </a:endParaRPr>
-          </a:p>
-          <a:p>
-            <a:pPr marL="216000" indent="-216000">
-              <a:lnSpc>
-                <a:spcPct val="100000"/>
-              </a:lnSpc>
-              <a:spcBef>
-                <a:spcPts val="360"/>
-              </a:spcBef>
-              <a:buClr>
-                <a:srgbClr val="008c4f"/>
-              </a:buClr>
-              <a:buSzPct val="45000"/>
-              <a:buFont typeface="Monotype Sorts" charset="2"/>
-              <a:buChar char=""/>
-            </a:pPr>
             <a:r>
               <a:rPr b="0" lang="en-US" sz="1800" spc="-1" strike="noStrike">
                 <a:solidFill>
@@ -15039,7 +15110,7 @@
                 <a:srgbClr val="008c4f"/>
               </a:buClr>
               <a:buSzPct val="45000"/>
-              <a:buFont typeface="Symbol" charset="2"/>
+              <a:buFont typeface="Symbol"/>
               <a:buChar char=""/>
             </a:pPr>
             <a:r>
@@ -15071,7 +15142,7 @@
                 <a:srgbClr val="008c4f"/>
               </a:buClr>
               <a:buSzPct val="45000"/>
-              <a:buFont typeface="Symbol" charset="2"/>
+              <a:buFont typeface="Symbol"/>
               <a:buChar char=""/>
             </a:pPr>
             <a:r>
@@ -15145,7 +15216,7 @@
                 <a:srgbClr val="008c4f"/>
               </a:buClr>
               <a:buSzPct val="45000"/>
-              <a:buFont typeface="Symbol" charset="2"/>
+              <a:buFont typeface="Symbol"/>
               <a:buChar char=""/>
             </a:pPr>
             <a:r>
@@ -15177,7 +15248,7 @@
                 <a:srgbClr val="008c4f"/>
               </a:buClr>
               <a:buSzPct val="45000"/>
-              <a:buFont typeface="Symbol" charset="2"/>
+              <a:buFont typeface="Symbol"/>
               <a:buChar char=""/>
             </a:pPr>
             <a:r>
@@ -15248,7 +15319,7 @@
         <p:spPr>
           <a:xfrm>
             <a:off x="335520" y="764640"/>
-            <a:ext cx="10742040" cy="492840"/>
+            <a:ext cx="10741680" cy="492480"/>
           </a:xfrm>
           <a:prstGeom prst="rect">
             <a:avLst/>
@@ -15302,7 +15373,7 @@
         <p:spPr>
           <a:xfrm>
             <a:off x="335520" y="1268280"/>
-            <a:ext cx="10742040" cy="5029560"/>
+            <a:ext cx="10741680" cy="5029200"/>
           </a:xfrm>
           <a:prstGeom prst="rect">
             <a:avLst/>
@@ -15398,7 +15469,7 @@
         <p:spPr>
           <a:xfrm>
             <a:off x="6285600" y="2132640"/>
-            <a:ext cx="511560" cy="491400"/>
+            <a:ext cx="511200" cy="491040"/>
           </a:xfrm>
           <a:prstGeom prst="star5">
             <a:avLst>
@@ -15435,11 +15506,17 @@
             <a:noAutofit/>
           </a:bodyPr>
           <a:p>
+            <a:pPr>
+              <a:lnSpc>
+                <a:spcPct val="100000"/>
+              </a:lnSpc>
+            </a:pPr>
             <a:endParaRPr b="0" lang="en-GB" sz="1800" spc="-1" strike="noStrike">
               <a:solidFill>
                 <a:srgbClr val="000000"/>
               </a:solidFill>
               <a:latin typeface="Arial"/>
+              <a:ea typeface="DejaVu Sans"/>
             </a:endParaRPr>
           </a:p>
         </p:txBody>
@@ -15453,7 +15530,7 @@
         <p:spPr>
           <a:xfrm>
             <a:off x="4089960" y="2247480"/>
-            <a:ext cx="2279880" cy="363960"/>
+            <a:ext cx="2279520" cy="363960"/>
           </a:xfrm>
           <a:prstGeom prst="rect">
             <a:avLst/>
@@ -15557,7 +15634,7 @@
         <p:spPr>
           <a:xfrm>
             <a:off x="335520" y="764640"/>
-            <a:ext cx="10742040" cy="492840"/>
+            <a:ext cx="10741680" cy="492480"/>
           </a:xfrm>
           <a:prstGeom prst="rect">
             <a:avLst/>
@@ -15611,7 +15688,7 @@
         <p:spPr>
           <a:xfrm>
             <a:off x="335520" y="1268640"/>
-            <a:ext cx="10742040" cy="5029560"/>
+            <a:ext cx="10741680" cy="5029200"/>
           </a:xfrm>
           <a:prstGeom prst="rect">
             <a:avLst/>
@@ -16052,7 +16129,7 @@
         <p:spPr>
           <a:xfrm>
             <a:off x="335520" y="764640"/>
-            <a:ext cx="10745280" cy="496080"/>
+            <a:ext cx="10744920" cy="495720"/>
           </a:xfrm>
           <a:prstGeom prst="rect">
             <a:avLst/>
@@ -16106,7 +16183,7 @@
         <p:spPr>
           <a:xfrm>
             <a:off x="335520" y="1268640"/>
-            <a:ext cx="10745280" cy="5032800"/>
+            <a:ext cx="10744920" cy="5032440"/>
           </a:xfrm>
           <a:prstGeom prst="rect">
             <a:avLst/>
@@ -16323,7 +16400,7 @@
         <p:spPr>
           <a:xfrm>
             <a:off x="335520" y="764640"/>
-            <a:ext cx="10743840" cy="494640"/>
+            <a:ext cx="10743480" cy="494280"/>
           </a:xfrm>
           <a:prstGeom prst="rect">
             <a:avLst/>
@@ -16377,7 +16454,7 @@
         <p:spPr>
           <a:xfrm>
             <a:off x="335520" y="1268640"/>
-            <a:ext cx="10743840" cy="5031360"/>
+            <a:ext cx="10743480" cy="5031000"/>
           </a:xfrm>
           <a:prstGeom prst="rect">
             <a:avLst/>
@@ -16862,7 +16939,7 @@
         <p:spPr>
           <a:xfrm>
             <a:off x="335520" y="764640"/>
-            <a:ext cx="10742040" cy="492840"/>
+            <a:ext cx="10741680" cy="492480"/>
           </a:xfrm>
           <a:prstGeom prst="rect">
             <a:avLst/>
@@ -16916,7 +16993,7 @@
         <p:spPr>
           <a:xfrm>
             <a:off x="335520" y="1268640"/>
-            <a:ext cx="10742040" cy="5029560"/>
+            <a:ext cx="10741680" cy="5029200"/>
           </a:xfrm>
           <a:prstGeom prst="rect">
             <a:avLst/>
@@ -17310,7 +17387,7 @@
         <p:spPr>
           <a:xfrm>
             <a:off x="335520" y="1268640"/>
-            <a:ext cx="10743840" cy="5031360"/>
+            <a:ext cx="10743480" cy="5031000"/>
           </a:xfrm>
           <a:prstGeom prst="rect">
             <a:avLst/>
@@ -17370,7 +17447,7 @@
         <p:spPr>
           <a:xfrm>
             <a:off x="335520" y="764640"/>
-            <a:ext cx="10743840" cy="494640"/>
+            <a:ext cx="10743480" cy="494280"/>
           </a:xfrm>
           <a:prstGeom prst="rect">
             <a:avLst/>
@@ -17391,11 +17468,17 @@
             <a:noAutofit/>
           </a:bodyPr>
           <a:p>
+            <a:pPr>
+              <a:lnSpc>
+                <a:spcPct val="100000"/>
+              </a:lnSpc>
+            </a:pPr>
             <a:endParaRPr b="0" lang="en-GB" sz="1800" spc="-1" strike="noStrike">
               <a:solidFill>
                 <a:srgbClr val="000000"/>
               </a:solidFill>
               <a:latin typeface="Arial"/>
+              <a:ea typeface="DejaVu Sans"/>
             </a:endParaRPr>
           </a:p>
         </p:txBody>
@@ -17439,7 +17522,7 @@
         <p:spPr>
           <a:xfrm>
             <a:off x="542880" y="721800"/>
-            <a:ext cx="10348200" cy="488880"/>
+            <a:ext cx="10347840" cy="488520"/>
           </a:xfrm>
           <a:prstGeom prst="rect">
             <a:avLst/>
@@ -17493,7 +17576,7 @@
         <p:spPr>
           <a:xfrm>
             <a:off x="451800" y="1709280"/>
-            <a:ext cx="8215560" cy="4343760"/>
+            <a:ext cx="8215200" cy="4343400"/>
           </a:xfrm>
           <a:prstGeom prst="rect">
             <a:avLst/>
@@ -17514,11 +17597,17 @@
             <a:noAutofit/>
           </a:bodyPr>
           <a:p>
+            <a:pPr>
+              <a:lnSpc>
+                <a:spcPct val="100000"/>
+              </a:lnSpc>
+            </a:pPr>
             <a:endParaRPr b="0" lang="en-GB" sz="1800" spc="-1" strike="noStrike">
               <a:solidFill>
                 <a:srgbClr val="000000"/>
               </a:solidFill>
               <a:latin typeface="Arial"/>
+              <a:ea typeface="DejaVu Sans"/>
             </a:endParaRPr>
           </a:p>
         </p:txBody>
@@ -17532,7 +17621,7 @@
         <p:spPr>
           <a:xfrm>
             <a:off x="609480" y="1769400"/>
-            <a:ext cx="10578600" cy="4846680"/>
+            <a:ext cx="10578240" cy="4846320"/>
           </a:xfrm>
           <a:prstGeom prst="rect">
             <a:avLst/>
@@ -17961,7 +18050,7 @@
         <p:spPr>
           <a:xfrm>
             <a:off x="542880" y="721800"/>
-            <a:ext cx="10348200" cy="488880"/>
+            <a:ext cx="10347840" cy="488520"/>
           </a:xfrm>
           <a:prstGeom prst="rect">
             <a:avLst/>
@@ -18015,7 +18104,7 @@
         <p:spPr>
           <a:xfrm>
             <a:off x="451800" y="1709280"/>
-            <a:ext cx="8215560" cy="4343760"/>
+            <a:ext cx="8215200" cy="4343400"/>
           </a:xfrm>
           <a:prstGeom prst="rect">
             <a:avLst/>
@@ -18036,11 +18125,17 @@
             <a:noAutofit/>
           </a:bodyPr>
           <a:p>
+            <a:pPr>
+              <a:lnSpc>
+                <a:spcPct val="100000"/>
+              </a:lnSpc>
+            </a:pPr>
             <a:endParaRPr b="0" lang="en-GB" sz="1800" spc="-1" strike="noStrike">
               <a:solidFill>
                 <a:srgbClr val="000000"/>
               </a:solidFill>
               <a:latin typeface="Arial"/>
+              <a:ea typeface="DejaVu Sans"/>
             </a:endParaRPr>
           </a:p>
         </p:txBody>
@@ -18054,7 +18149,7 @@
         <p:spPr>
           <a:xfrm>
             <a:off x="609480" y="1769400"/>
-            <a:ext cx="10578600" cy="4846680"/>
+            <a:ext cx="10578240" cy="4846320"/>
           </a:xfrm>
           <a:prstGeom prst="rect">
             <a:avLst/>
@@ -18485,7 +18580,7 @@
         <p:spPr>
           <a:xfrm>
             <a:off x="542880" y="721800"/>
-            <a:ext cx="10348200" cy="488880"/>
+            <a:ext cx="10347840" cy="488520"/>
           </a:xfrm>
           <a:prstGeom prst="rect">
             <a:avLst/>
@@ -18539,7 +18634,7 @@
         <p:spPr>
           <a:xfrm>
             <a:off x="451800" y="1709280"/>
-            <a:ext cx="8215560" cy="4343760"/>
+            <a:ext cx="8215200" cy="4343400"/>
           </a:xfrm>
           <a:prstGeom prst="rect">
             <a:avLst/>
@@ -18560,11 +18655,17 @@
             <a:noAutofit/>
           </a:bodyPr>
           <a:p>
+            <a:pPr>
+              <a:lnSpc>
+                <a:spcPct val="100000"/>
+              </a:lnSpc>
+            </a:pPr>
             <a:endParaRPr b="0" lang="en-GB" sz="1800" spc="-1" strike="noStrike">
               <a:solidFill>
                 <a:srgbClr val="000000"/>
               </a:solidFill>
               <a:latin typeface="Arial"/>
+              <a:ea typeface="DejaVu Sans"/>
             </a:endParaRPr>
           </a:p>
         </p:txBody>
@@ -18578,7 +18679,7 @@
         <p:spPr>
           <a:xfrm>
             <a:off x="609480" y="1769400"/>
-            <a:ext cx="10578600" cy="4846680"/>
+            <a:ext cx="10578240" cy="4846320"/>
           </a:xfrm>
           <a:prstGeom prst="rect">
             <a:avLst/>
@@ -19009,7 +19110,7 @@
         <p:spPr>
           <a:xfrm>
             <a:off x="335520" y="764640"/>
-            <a:ext cx="10743840" cy="494640"/>
+            <a:ext cx="10743480" cy="494280"/>
           </a:xfrm>
           <a:prstGeom prst="rect">
             <a:avLst/>
@@ -19063,7 +19164,7 @@
         <p:spPr>
           <a:xfrm>
             <a:off x="335520" y="2408400"/>
-            <a:ext cx="10743840" cy="3891600"/>
+            <a:ext cx="10743480" cy="3891240"/>
           </a:xfrm>
           <a:prstGeom prst="rect">
             <a:avLst/>
@@ -19156,7 +19257,7 @@
         <p:spPr>
           <a:xfrm>
             <a:off x="335520" y="764640"/>
-            <a:ext cx="10743840" cy="494640"/>
+            <a:ext cx="10743480" cy="494280"/>
           </a:xfrm>
           <a:prstGeom prst="rect">
             <a:avLst/>
@@ -19210,7 +19311,7 @@
         <p:spPr>
           <a:xfrm>
             <a:off x="335520" y="2408400"/>
-            <a:ext cx="10743840" cy="3891600"/>
+            <a:ext cx="10743480" cy="3891240"/>
           </a:xfrm>
           <a:prstGeom prst="rect">
             <a:avLst/>
@@ -19335,7 +19436,7 @@
         <p:spPr>
           <a:xfrm>
             <a:off x="335520" y="764640"/>
-            <a:ext cx="10743840" cy="494640"/>
+            <a:ext cx="10743480" cy="494280"/>
           </a:xfrm>
           <a:prstGeom prst="rect">
             <a:avLst/>
@@ -19389,7 +19490,7 @@
         <p:spPr>
           <a:xfrm>
             <a:off x="335520" y="2408400"/>
-            <a:ext cx="10743840" cy="3891600"/>
+            <a:ext cx="10743480" cy="3891240"/>
           </a:xfrm>
           <a:prstGeom prst="rect">
             <a:avLst/>

</xml_diff>

<commit_message>
+ added ETCE exam Q&A * working on IoT L00
</commit_message>
<xml_diff>
--- a/Emerging-Technologies-for-the-Circular-Economy/ETCE-L00-Organization.pptx
+++ b/Emerging-Technologies-for-the-Circular-Economy/ETCE-L00-Organization.pptx
@@ -375,7 +375,7 @@
             <a:pPr indent="0" algn="r">
               <a:buNone/>
             </a:pPr>
-            <a:fld id="{F2109E5F-2AF3-4057-9603-A5C720E359B5}" type="slidenum">
+            <a:fld id="{7F1FD6C5-BBD7-41AB-9196-E990DFC7774C}" type="slidenum">
               <a:rPr b="0" lang="en-GB" sz="1400" spc="-1" strike="noStrike">
                 <a:solidFill>
                   <a:srgbClr val="000000"/>
@@ -429,7 +429,7 @@
         <p:spPr>
           <a:xfrm>
             <a:off x="533520" y="763560"/>
-            <a:ext cx="6690960" cy="3759120"/>
+            <a:ext cx="6690600" cy="3758760"/>
           </a:xfrm>
           <a:prstGeom prst="rect">
             <a:avLst/>
@@ -452,7 +452,7 @@
         <p:spPr>
           <a:xfrm>
             <a:off x="777240" y="4777560"/>
-            <a:ext cx="6204600" cy="4512960"/>
+            <a:ext cx="6204240" cy="4512600"/>
           </a:xfrm>
           <a:prstGeom prst="rect">
             <a:avLst/>
@@ -488,7 +488,7 @@
         <p:spPr>
           <a:xfrm>
             <a:off x="4399200" y="9555480"/>
-            <a:ext cx="3359880" cy="489600"/>
+            <a:ext cx="3359520" cy="489240"/>
           </a:xfrm>
           <a:prstGeom prst="rect">
             <a:avLst/>
@@ -514,7 +514,7 @@
                 <a:spcPct val="100000"/>
               </a:lnSpc>
             </a:pPr>
-            <a:fld id="{4D033D76-D718-4CEF-876B-8786A72D58FB}" type="slidenum">
+            <a:fld id="{4C9B7804-20C1-441E-8733-71A7EE0F45FA}" type="slidenum">
               <a:rPr b="0" lang="de-DE" sz="1800" spc="-1" strike="noStrike">
                 <a:solidFill>
                   <a:srgbClr val="000000"/>
@@ -522,7 +522,7 @@
                 <a:latin typeface="+mn-lt"/>
                 <a:ea typeface="+mn-ea"/>
               </a:rPr>
-              <a:t>6</a:t>
+              <a:t>&lt;number&gt;</a:t>
             </a:fld>
             <a:endParaRPr b="0" lang="en-GB" sz="1800" spc="-1" strike="noStrike">
               <a:solidFill>
@@ -568,7 +568,7 @@
         <p:spPr>
           <a:xfrm>
             <a:off x="533520" y="763560"/>
-            <a:ext cx="6690960" cy="3759120"/>
+            <a:ext cx="6690600" cy="3758760"/>
           </a:xfrm>
           <a:prstGeom prst="rect">
             <a:avLst/>
@@ -591,7 +591,7 @@
         <p:spPr>
           <a:xfrm>
             <a:off x="777240" y="4777560"/>
-            <a:ext cx="6204600" cy="4512960"/>
+            <a:ext cx="6204240" cy="4512600"/>
           </a:xfrm>
           <a:prstGeom prst="rect">
             <a:avLst/>
@@ -627,7 +627,7 @@
         <p:spPr>
           <a:xfrm>
             <a:off x="4399200" y="9555480"/>
-            <a:ext cx="3359880" cy="489600"/>
+            <a:ext cx="3359520" cy="489240"/>
           </a:xfrm>
           <a:prstGeom prst="rect">
             <a:avLst/>
@@ -653,7 +653,7 @@
                 <a:spcPct val="100000"/>
               </a:lnSpc>
             </a:pPr>
-            <a:fld id="{E233E711-BAC5-4639-9C21-40D738D58F43}" type="slidenum">
+            <a:fld id="{DF78F199-E414-4034-9213-D17635B9D0E5}" type="slidenum">
               <a:rPr b="0" lang="de-DE" sz="1800" spc="-1" strike="noStrike">
                 <a:solidFill>
                   <a:srgbClr val="000000"/>
@@ -707,7 +707,7 @@
         <p:spPr>
           <a:xfrm>
             <a:off x="533520" y="763560"/>
-            <a:ext cx="6690960" cy="3759120"/>
+            <a:ext cx="6690600" cy="3758760"/>
           </a:xfrm>
           <a:prstGeom prst="rect">
             <a:avLst/>
@@ -730,7 +730,7 @@
         <p:spPr>
           <a:xfrm>
             <a:off x="777240" y="4777560"/>
-            <a:ext cx="6204600" cy="4512960"/>
+            <a:ext cx="6204240" cy="4512600"/>
           </a:xfrm>
           <a:prstGeom prst="rect">
             <a:avLst/>
@@ -766,7 +766,7 @@
         <p:spPr>
           <a:xfrm>
             <a:off x="4399200" y="9555480"/>
-            <a:ext cx="3359880" cy="489600"/>
+            <a:ext cx="3359520" cy="489240"/>
           </a:xfrm>
           <a:prstGeom prst="rect">
             <a:avLst/>
@@ -792,7 +792,7 @@
                 <a:spcPct val="100000"/>
               </a:lnSpc>
             </a:pPr>
-            <a:fld id="{F0FAF6FC-91EB-4049-94EE-52B45EBC9B62}" type="slidenum">
+            <a:fld id="{DFFA783B-34C1-4E33-9CAB-97A08DAEA4D2}" type="slidenum">
               <a:rPr b="0" lang="de-DE" sz="1800" spc="-1" strike="noStrike">
                 <a:solidFill>
                   <a:srgbClr val="000000"/>
@@ -4397,7 +4397,7 @@
         <p:spPr>
           <a:xfrm>
             <a:off x="11444760" y="0"/>
-            <a:ext cx="739440" cy="6848280"/>
+            <a:ext cx="739080" cy="6847920"/>
           </a:xfrm>
           <a:prstGeom prst="rect">
             <a:avLst/>
@@ -4446,7 +4446,7 @@
         <p:spPr>
           <a:xfrm>
             <a:off x="11438640" y="6453360"/>
-            <a:ext cx="756360" cy="363960"/>
+            <a:ext cx="756000" cy="363960"/>
           </a:xfrm>
           <a:prstGeom prst="rect">
             <a:avLst/>
@@ -4472,7 +4472,7 @@
                 <a:spcPct val="100000"/>
               </a:lnSpc>
             </a:pPr>
-            <a:fld id="{859994E3-0ECF-4F44-933B-82A179398C80}" type="slidenum">
+            <a:fld id="{6173C6F9-2DC4-4F80-A9BC-5B40C4F59393}" type="slidenum">
               <a:rPr b="0" lang="en-US" sz="1800" spc="-1" strike="noStrike">
                 <a:solidFill>
                   <a:srgbClr val="808080"/>
@@ -4480,7 +4480,7 @@
                 <a:latin typeface="Arial"/>
                 <a:ea typeface="DejaVu Sans"/>
               </a:rPr>
-              <a:t>13</a:t>
+              <a:t>&lt;number&gt;</a:t>
             </a:fld>
             <a:endParaRPr b="0" lang="en-GB" sz="1800" spc="-1" strike="noStrike">
               <a:solidFill>
@@ -4500,7 +4500,7 @@
         <p:spPr>
           <a:xfrm>
             <a:off x="912240" y="1268280"/>
-            <a:ext cx="9206280" cy="359640"/>
+            <a:ext cx="9205920" cy="359280"/>
           </a:xfrm>
           <a:prstGeom prst="rect">
             <a:avLst/>
@@ -4549,7 +4549,7 @@
         <p:spPr>
           <a:xfrm>
             <a:off x="0" y="0"/>
-            <a:ext cx="3050280" cy="560160"/>
+            <a:ext cx="3049920" cy="559800"/>
           </a:xfrm>
           <a:prstGeom prst="rect">
             <a:avLst/>
@@ -4572,7 +4572,7 @@
         <p:spPr>
           <a:xfrm>
             <a:off x="7430400" y="134640"/>
-            <a:ext cx="3696120" cy="512280"/>
+            <a:ext cx="3695760" cy="511920"/>
           </a:xfrm>
           <a:prstGeom prst="rect">
             <a:avLst/>
@@ -4591,7 +4591,7 @@
         <p:spPr>
           <a:xfrm>
             <a:off x="912240" y="1268280"/>
-            <a:ext cx="9206280" cy="359640"/>
+            <a:ext cx="9205920" cy="359280"/>
           </a:xfrm>
           <a:prstGeom prst="rect">
             <a:avLst/>
@@ -4636,7 +4636,7 @@
         <p:spPr>
           <a:xfrm>
             <a:off x="11444760" y="0"/>
-            <a:ext cx="739440" cy="6848280"/>
+            <a:ext cx="739080" cy="6847920"/>
           </a:xfrm>
           <a:prstGeom prst="rect">
             <a:avLst/>
@@ -4685,7 +4685,7 @@
         <p:spPr>
           <a:xfrm>
             <a:off x="0" y="6642720"/>
-            <a:ext cx="12182400" cy="211320"/>
+            <a:ext cx="12182040" cy="211320"/>
           </a:xfrm>
           <a:prstGeom prst="rect">
             <a:avLst/>
@@ -5077,7 +5077,7 @@
         <p:spPr>
           <a:xfrm>
             <a:off x="11444760" y="0"/>
-            <a:ext cx="739440" cy="6848280"/>
+            <a:ext cx="739080" cy="6847920"/>
           </a:xfrm>
           <a:prstGeom prst="rect">
             <a:avLst/>
@@ -5126,7 +5126,7 @@
         <p:spPr>
           <a:xfrm>
             <a:off x="11438640" y="6453360"/>
-            <a:ext cx="756360" cy="363960"/>
+            <a:ext cx="756000" cy="363960"/>
           </a:xfrm>
           <a:prstGeom prst="rect">
             <a:avLst/>
@@ -5152,7 +5152,7 @@
                 <a:spcPct val="100000"/>
               </a:lnSpc>
             </a:pPr>
-            <a:fld id="{A0E7FD5B-7F04-4F44-80AB-ED78A0579918}" type="slidenum">
+            <a:fld id="{5524F22B-EC04-46CC-85B8-40102B348ADC}" type="slidenum">
               <a:rPr b="0" lang="en-US" sz="1800" spc="-1" strike="noStrike">
                 <a:solidFill>
                   <a:srgbClr val="808080"/>
@@ -5180,7 +5180,7 @@
         <p:spPr>
           <a:xfrm>
             <a:off x="912240" y="1268280"/>
-            <a:ext cx="9206280" cy="359640"/>
+            <a:ext cx="9205920" cy="359280"/>
           </a:xfrm>
           <a:prstGeom prst="rect">
             <a:avLst/>
@@ -5229,7 +5229,7 @@
         <p:spPr>
           <a:xfrm>
             <a:off x="0" y="0"/>
-            <a:ext cx="3050280" cy="560160"/>
+            <a:ext cx="3049920" cy="559800"/>
           </a:xfrm>
           <a:prstGeom prst="rect">
             <a:avLst/>
@@ -5252,7 +5252,7 @@
         <p:spPr>
           <a:xfrm>
             <a:off x="7430400" y="134640"/>
-            <a:ext cx="3696120" cy="512280"/>
+            <a:ext cx="3695760" cy="511920"/>
           </a:xfrm>
           <a:prstGeom prst="rect">
             <a:avLst/>
@@ -5271,7 +5271,7 @@
         <p:spPr>
           <a:xfrm>
             <a:off x="11444760" y="0"/>
-            <a:ext cx="739440" cy="6848280"/>
+            <a:ext cx="739080" cy="6847920"/>
           </a:xfrm>
           <a:prstGeom prst="rect">
             <a:avLst/>
@@ -5320,7 +5320,7 @@
         <p:spPr>
           <a:xfrm>
             <a:off x="11438640" y="6453360"/>
-            <a:ext cx="756360" cy="363960"/>
+            <a:ext cx="756000" cy="363960"/>
           </a:xfrm>
           <a:prstGeom prst="rect">
             <a:avLst/>
@@ -5346,7 +5346,7 @@
                 <a:spcPct val="100000"/>
               </a:lnSpc>
             </a:pPr>
-            <a:fld id="{3AEE9EEE-E077-4779-9EA2-CCA91A517B40}" type="slidenum">
+            <a:fld id="{EE9E8B64-6847-406C-B80E-F2D219F5E5F0}" type="slidenum">
               <a:rPr b="0" lang="en-US" sz="1800" spc="-1" strike="noStrike">
                 <a:solidFill>
                   <a:srgbClr val="808080"/>
@@ -5374,7 +5374,7 @@
         <p:spPr>
           <a:xfrm>
             <a:off x="0" y="6642720"/>
-            <a:ext cx="12182400" cy="211320"/>
+            <a:ext cx="12182040" cy="211320"/>
           </a:xfrm>
           <a:prstGeom prst="rect">
             <a:avLst/>
@@ -5759,7 +5759,7 @@
         <p:spPr>
           <a:xfrm>
             <a:off x="527400" y="1412640"/>
-            <a:ext cx="10359360" cy="1145880"/>
+            <a:ext cx="10359000" cy="1145520"/>
           </a:xfrm>
           <a:prstGeom prst="rect">
             <a:avLst/>
@@ -5813,7 +5813,7 @@
         <p:spPr>
           <a:xfrm>
             <a:off x="527400" y="2852640"/>
-            <a:ext cx="10359360" cy="2366640"/>
+            <a:ext cx="10359000" cy="2366280"/>
           </a:xfrm>
           <a:prstGeom prst="rect">
             <a:avLst/>
@@ -6076,7 +6076,7 @@
         <p:spPr>
           <a:xfrm>
             <a:off x="335520" y="764640"/>
-            <a:ext cx="10743480" cy="494280"/>
+            <a:ext cx="10743120" cy="493920"/>
           </a:xfrm>
           <a:prstGeom prst="rect">
             <a:avLst/>
@@ -6143,7 +6143,7 @@
         <p:spPr>
           <a:xfrm>
             <a:off x="335520" y="2408400"/>
-            <a:ext cx="10743480" cy="3891240"/>
+            <a:ext cx="10743120" cy="3890880"/>
           </a:xfrm>
           <a:prstGeom prst="rect">
             <a:avLst/>
@@ -6332,7 +6332,7 @@
         <p:spPr>
           <a:xfrm>
             <a:off x="335520" y="764640"/>
-            <a:ext cx="10743480" cy="494280"/>
+            <a:ext cx="10743120" cy="493920"/>
           </a:xfrm>
           <a:prstGeom prst="rect">
             <a:avLst/>
@@ -6386,7 +6386,7 @@
         <p:spPr>
           <a:xfrm>
             <a:off x="335520" y="2408400"/>
-            <a:ext cx="10743480" cy="3891240"/>
+            <a:ext cx="10743120" cy="3890880"/>
           </a:xfrm>
           <a:prstGeom prst="rect">
             <a:avLst/>
@@ -6607,7 +6607,7 @@
         <p:spPr>
           <a:xfrm>
             <a:off x="335520" y="764640"/>
-            <a:ext cx="10743480" cy="494280"/>
+            <a:ext cx="10743120" cy="493920"/>
           </a:xfrm>
           <a:prstGeom prst="rect">
             <a:avLst/>
@@ -6674,7 +6674,7 @@
         <p:spPr>
           <a:xfrm>
             <a:off x="335520" y="2408400"/>
-            <a:ext cx="10743480" cy="3891240"/>
+            <a:ext cx="10743120" cy="3890880"/>
           </a:xfrm>
           <a:prstGeom prst="rect">
             <a:avLst/>
@@ -6927,7 +6927,7 @@
         <p:spPr>
           <a:xfrm>
             <a:off x="335520" y="764640"/>
-            <a:ext cx="10743480" cy="494280"/>
+            <a:ext cx="10743120" cy="493920"/>
           </a:xfrm>
           <a:prstGeom prst="rect">
             <a:avLst/>
@@ -6981,7 +6981,7 @@
         <p:spPr>
           <a:xfrm>
             <a:off x="335520" y="1268640"/>
-            <a:ext cx="10743480" cy="5031000"/>
+            <a:ext cx="10743120" cy="5030640"/>
           </a:xfrm>
           <a:prstGeom prst="rect">
             <a:avLst/>
@@ -7453,6 +7453,38 @@
                 <a:ea typeface="DejaVu Sans"/>
               </a:rPr>
               <a:t> The Machine-to-Everything Economy – A step towards the CE 2.0? (L12)</a:t>
+            </a:r>
+            <a:endParaRPr b="0" lang="en-GB" sz="1800" spc="-1" strike="noStrike">
+              <a:solidFill>
+                <a:srgbClr val="000000"/>
+              </a:solidFill>
+              <a:latin typeface="Arial"/>
+            </a:endParaRPr>
+          </a:p>
+          <a:p>
+            <a:pPr marL="195120" indent="-189720">
+              <a:lnSpc>
+                <a:spcPct val="100000"/>
+              </a:lnSpc>
+              <a:spcBef>
+                <a:spcPts val="360"/>
+              </a:spcBef>
+              <a:buClr>
+                <a:srgbClr val="008c4f"/>
+              </a:buClr>
+              <a:buSzPct val="115000"/>
+              <a:buFont typeface="Wingdings" charset="2"/>
+              <a:buChar char=""/>
+            </a:pPr>
+            <a:r>
+              <a:rPr b="0" lang="en-US" sz="1800" spc="-1" strike="noStrike">
+                <a:solidFill>
+                  <a:srgbClr val="000000"/>
+                </a:solidFill>
+                <a:latin typeface="DejaVu Sans"/>
+                <a:ea typeface="DejaVu Sans"/>
+              </a:rPr>
+              <a:t>31.07.2023 → Exam Q&amp;A</a:t>
             </a:r>
             <a:endParaRPr b="0" lang="en-GB" sz="1800" spc="-1" strike="noStrike">
               <a:solidFill>
@@ -7502,7 +7534,7 @@
         <p:spPr>
           <a:xfrm>
             <a:off x="335520" y="764640"/>
-            <a:ext cx="10743480" cy="494280"/>
+            <a:ext cx="10743120" cy="493920"/>
           </a:xfrm>
           <a:prstGeom prst="rect">
             <a:avLst/>
@@ -7556,7 +7588,7 @@
         <p:spPr>
           <a:xfrm>
             <a:off x="335520" y="1268640"/>
-            <a:ext cx="10743480" cy="5031000"/>
+            <a:ext cx="10743120" cy="5030640"/>
           </a:xfrm>
           <a:prstGeom prst="rect">
             <a:avLst/>
@@ -8241,7 +8273,7 @@
         <p:spPr>
           <a:xfrm>
             <a:off x="335520" y="764640"/>
-            <a:ext cx="10743480" cy="494280"/>
+            <a:ext cx="10743120" cy="493920"/>
           </a:xfrm>
           <a:prstGeom prst="rect">
             <a:avLst/>
@@ -8295,7 +8327,7 @@
         <p:spPr>
           <a:xfrm>
             <a:off x="335520" y="1268280"/>
-            <a:ext cx="10743480" cy="5031000"/>
+            <a:ext cx="10743120" cy="5030640"/>
           </a:xfrm>
           <a:prstGeom prst="rect">
             <a:avLst/>
@@ -8758,7 +8790,7 @@
         <p:spPr>
           <a:xfrm>
             <a:off x="335520" y="764640"/>
-            <a:ext cx="10742040" cy="492840"/>
+            <a:ext cx="10741680" cy="492480"/>
           </a:xfrm>
           <a:prstGeom prst="rect">
             <a:avLst/>
@@ -8838,7 +8870,7 @@
         <p:spPr>
           <a:xfrm>
             <a:off x="335520" y="1268640"/>
-            <a:ext cx="10742040" cy="5029560"/>
+            <a:ext cx="10741680" cy="5029200"/>
           </a:xfrm>
           <a:prstGeom prst="rect">
             <a:avLst/>
@@ -9269,7 +9301,7 @@
         <p:spPr>
           <a:xfrm>
             <a:off x="335520" y="764640"/>
-            <a:ext cx="10743480" cy="494280"/>
+            <a:ext cx="10743120" cy="493920"/>
           </a:xfrm>
           <a:prstGeom prst="rect">
             <a:avLst/>
@@ -9323,7 +9355,7 @@
         <p:spPr>
           <a:xfrm>
             <a:off x="335520" y="1268280"/>
-            <a:ext cx="10743480" cy="5031000"/>
+            <a:ext cx="10743120" cy="5030640"/>
           </a:xfrm>
           <a:prstGeom prst="rect">
             <a:avLst/>
@@ -9724,7 +9756,7 @@
         <p:spPr>
           <a:xfrm>
             <a:off x="335520" y="764640"/>
-            <a:ext cx="10743480" cy="494280"/>
+            <a:ext cx="10743120" cy="493920"/>
           </a:xfrm>
           <a:prstGeom prst="rect">
             <a:avLst/>
@@ -9778,7 +9810,7 @@
         <p:spPr>
           <a:xfrm>
             <a:off x="335520" y="1268640"/>
-            <a:ext cx="10743480" cy="5031000"/>
+            <a:ext cx="10743120" cy="5030640"/>
           </a:xfrm>
           <a:prstGeom prst="rect">
             <a:avLst/>
@@ -10009,7 +10041,7 @@
         <p:spPr>
           <a:xfrm>
             <a:off x="4655880" y="476640"/>
-            <a:ext cx="2429640" cy="355680"/>
+            <a:ext cx="2429280" cy="355320"/>
           </a:xfrm>
           <a:prstGeom prst="rect">
             <a:avLst/>
@@ -10084,7 +10116,7 @@
         <p:spPr>
           <a:xfrm>
             <a:off x="335520" y="764640"/>
-            <a:ext cx="10743480" cy="494280"/>
+            <a:ext cx="10743120" cy="493920"/>
           </a:xfrm>
           <a:prstGeom prst="rect">
             <a:avLst/>
@@ -10138,7 +10170,7 @@
         <p:spPr>
           <a:xfrm>
             <a:off x="335520" y="1268640"/>
-            <a:ext cx="10743480" cy="5031000"/>
+            <a:ext cx="10743120" cy="5030640"/>
           </a:xfrm>
           <a:prstGeom prst="rect">
             <a:avLst/>
@@ -10265,7 +10297,7 @@
         <p:spPr>
           <a:xfrm>
             <a:off x="4655880" y="476640"/>
-            <a:ext cx="2429640" cy="355680"/>
+            <a:ext cx="2429280" cy="355320"/>
           </a:xfrm>
           <a:prstGeom prst="rect">
             <a:avLst/>
@@ -10340,7 +10372,7 @@
         <p:spPr>
           <a:xfrm>
             <a:off x="335520" y="764640"/>
-            <a:ext cx="10741320" cy="492120"/>
+            <a:ext cx="10740960" cy="491760"/>
           </a:xfrm>
           <a:prstGeom prst="rect">
             <a:avLst/>
@@ -10394,7 +10426,7 @@
         <p:spPr>
           <a:xfrm>
             <a:off x="335520" y="1268640"/>
-            <a:ext cx="10741320" cy="5028840"/>
+            <a:ext cx="10740960" cy="5028480"/>
           </a:xfrm>
           <a:prstGeom prst="rect">
             <a:avLst/>
@@ -10457,7 +10489,7 @@
         <p:spPr>
           <a:xfrm>
             <a:off x="336600" y="3429000"/>
-            <a:ext cx="10859040" cy="2050920"/>
+            <a:ext cx="10858680" cy="2050560"/>
           </a:xfrm>
           <a:prstGeom prst="rect">
             <a:avLst/>
@@ -10652,7 +10684,7 @@
         <p:spPr>
           <a:xfrm>
             <a:off x="335520" y="840960"/>
-            <a:ext cx="10743480" cy="494280"/>
+            <a:ext cx="10743120" cy="493920"/>
           </a:xfrm>
           <a:prstGeom prst="rect">
             <a:avLst/>
@@ -10706,7 +10738,7 @@
         <p:spPr>
           <a:xfrm>
             <a:off x="388800" y="1488600"/>
-            <a:ext cx="10721880" cy="5204520"/>
+            <a:ext cx="10721520" cy="5204520"/>
           </a:xfrm>
           <a:prstGeom prst="rect">
             <a:avLst/>
@@ -11412,7 +11444,7 @@
         <p:spPr>
           <a:xfrm>
             <a:off x="335520" y="764640"/>
-            <a:ext cx="10743480" cy="494280"/>
+            <a:ext cx="10743120" cy="493920"/>
           </a:xfrm>
           <a:prstGeom prst="rect">
             <a:avLst/>
@@ -11466,7 +11498,7 @@
         <p:spPr>
           <a:xfrm>
             <a:off x="4655880" y="476640"/>
-            <a:ext cx="2429640" cy="355680"/>
+            <a:ext cx="2429280" cy="355320"/>
           </a:xfrm>
           <a:prstGeom prst="rect">
             <a:avLst/>
@@ -11511,7 +11543,7 @@
         <p:spPr>
           <a:xfrm>
             <a:off x="494640" y="1523880"/>
-            <a:ext cx="10362240" cy="477360"/>
+            <a:ext cx="10361880" cy="477000"/>
           </a:xfrm>
           <a:prstGeom prst="rect">
             <a:avLst/>
@@ -11570,7 +11602,7 @@
         <p:spPr>
           <a:xfrm>
             <a:off x="609120" y="2057760"/>
-            <a:ext cx="9514800" cy="3879000"/>
+            <a:ext cx="9514440" cy="3878640"/>
           </a:xfrm>
           <a:prstGeom prst="rect">
             <a:avLst/>
@@ -11619,7 +11651,7 @@
         <p:spPr>
           <a:xfrm>
             <a:off x="335520" y="764640"/>
-            <a:ext cx="10743480" cy="494280"/>
+            <a:ext cx="10743120" cy="493920"/>
           </a:xfrm>
           <a:prstGeom prst="rect">
             <a:avLst/>
@@ -11673,7 +11705,7 @@
         <p:spPr>
           <a:xfrm>
             <a:off x="4655880" y="476640"/>
-            <a:ext cx="2429640" cy="355680"/>
+            <a:ext cx="2429280" cy="355320"/>
           </a:xfrm>
           <a:prstGeom prst="rect">
             <a:avLst/>
@@ -11718,7 +11750,7 @@
         <p:spPr>
           <a:xfrm>
             <a:off x="494640" y="1474920"/>
-            <a:ext cx="10362240" cy="477360"/>
+            <a:ext cx="10361880" cy="477000"/>
           </a:xfrm>
           <a:prstGeom prst="rect">
             <a:avLst/>
@@ -11787,7 +11819,7 @@
         <p:spPr>
           <a:xfrm>
             <a:off x="446400" y="2185200"/>
-            <a:ext cx="9402120" cy="3845160"/>
+            <a:ext cx="9401760" cy="3844800"/>
           </a:xfrm>
           <a:prstGeom prst="rect">
             <a:avLst/>
@@ -11836,7 +11868,7 @@
         <p:spPr>
           <a:xfrm>
             <a:off x="335520" y="764640"/>
-            <a:ext cx="10743480" cy="494280"/>
+            <a:ext cx="10743120" cy="493920"/>
           </a:xfrm>
           <a:prstGeom prst="rect">
             <a:avLst/>
@@ -11890,7 +11922,7 @@
         <p:spPr>
           <a:xfrm>
             <a:off x="4655880" y="476640"/>
-            <a:ext cx="2429640" cy="355680"/>
+            <a:ext cx="2429280" cy="355320"/>
           </a:xfrm>
           <a:prstGeom prst="rect">
             <a:avLst/>
@@ -11935,7 +11967,7 @@
         <p:spPr>
           <a:xfrm>
             <a:off x="494640" y="1523880"/>
-            <a:ext cx="10362240" cy="477360"/>
+            <a:ext cx="10361880" cy="477000"/>
           </a:xfrm>
           <a:prstGeom prst="rect">
             <a:avLst/>
@@ -11994,7 +12026,7 @@
         <p:spPr>
           <a:xfrm>
             <a:off x="494640" y="2088360"/>
-            <a:ext cx="8939880" cy="3961440"/>
+            <a:ext cx="8939520" cy="3961080"/>
           </a:xfrm>
           <a:prstGeom prst="rect">
             <a:avLst/>
@@ -12043,7 +12075,7 @@
         <p:spPr>
           <a:xfrm>
             <a:off x="335520" y="764640"/>
-            <a:ext cx="10743480" cy="494280"/>
+            <a:ext cx="10743120" cy="493920"/>
           </a:xfrm>
           <a:prstGeom prst="rect">
             <a:avLst/>
@@ -12097,7 +12129,7 @@
         <p:spPr>
           <a:xfrm>
             <a:off x="4655880" y="476640"/>
-            <a:ext cx="2429640" cy="355680"/>
+            <a:ext cx="2429280" cy="355320"/>
           </a:xfrm>
           <a:prstGeom prst="rect">
             <a:avLst/>
@@ -12142,7 +12174,7 @@
         <p:spPr>
           <a:xfrm>
             <a:off x="494640" y="1523880"/>
-            <a:ext cx="10362240" cy="477360"/>
+            <a:ext cx="10361880" cy="477000"/>
           </a:xfrm>
           <a:prstGeom prst="rect">
             <a:avLst/>
@@ -12201,7 +12233,7 @@
         <p:spPr>
           <a:xfrm>
             <a:off x="494640" y="2166840"/>
-            <a:ext cx="8335440" cy="4176720"/>
+            <a:ext cx="8335080" cy="4176360"/>
           </a:xfrm>
           <a:prstGeom prst="rect">
             <a:avLst/>
@@ -12250,7 +12282,7 @@
         <p:spPr>
           <a:xfrm>
             <a:off x="335520" y="768240"/>
-            <a:ext cx="10743480" cy="494280"/>
+            <a:ext cx="10743120" cy="493920"/>
           </a:xfrm>
           <a:prstGeom prst="rect">
             <a:avLst/>
@@ -12304,7 +12336,7 @@
         <p:spPr>
           <a:xfrm>
             <a:off x="388800" y="1488600"/>
-            <a:ext cx="10717200" cy="5204520"/>
+            <a:ext cx="10716840" cy="5204520"/>
           </a:xfrm>
           <a:prstGeom prst="rect">
             <a:avLst/>
@@ -13014,7 +13046,7 @@
         <p:spPr>
           <a:xfrm>
             <a:off x="335520" y="764640"/>
-            <a:ext cx="10743480" cy="494280"/>
+            <a:ext cx="10743120" cy="493920"/>
           </a:xfrm>
           <a:prstGeom prst="rect">
             <a:avLst/>
@@ -13068,7 +13100,7 @@
         <p:spPr>
           <a:xfrm>
             <a:off x="494640" y="1523880"/>
-            <a:ext cx="10362240" cy="477360"/>
+            <a:ext cx="10361880" cy="477000"/>
           </a:xfrm>
           <a:prstGeom prst="rect">
             <a:avLst/>
@@ -13175,7 +13207,7 @@
         <p:spPr>
           <a:xfrm>
             <a:off x="1895760" y="2238840"/>
-            <a:ext cx="6784560" cy="4155480"/>
+            <a:ext cx="6784200" cy="4155120"/>
           </a:xfrm>
           <a:prstGeom prst="rect">
             <a:avLst/>
@@ -13224,7 +13256,7 @@
         <p:spPr>
           <a:xfrm>
             <a:off x="335520" y="764640"/>
-            <a:ext cx="10743480" cy="494280"/>
+            <a:ext cx="10743120" cy="493920"/>
           </a:xfrm>
           <a:prstGeom prst="rect">
             <a:avLst/>
@@ -13278,7 +13310,7 @@
         <p:spPr>
           <a:xfrm>
             <a:off x="494640" y="1488600"/>
-            <a:ext cx="5445000" cy="442080"/>
+            <a:ext cx="5444640" cy="441720"/>
           </a:xfrm>
           <a:prstGeom prst="rect">
             <a:avLst/>
@@ -13347,7 +13379,7 @@
         <p:spPr>
           <a:xfrm>
             <a:off x="1828800" y="1937160"/>
-            <a:ext cx="7952040" cy="4086360"/>
+            <a:ext cx="7951680" cy="4086000"/>
           </a:xfrm>
           <a:prstGeom prst="rect">
             <a:avLst/>
@@ -13396,7 +13428,7 @@
         <p:spPr>
           <a:xfrm>
             <a:off x="335520" y="764640"/>
-            <a:ext cx="10743480" cy="494280"/>
+            <a:ext cx="10743120" cy="493920"/>
           </a:xfrm>
           <a:prstGeom prst="rect">
             <a:avLst/>
@@ -13454,7 +13486,7 @@
         <p:spPr>
           <a:xfrm>
             <a:off x="2679480" y="2130480"/>
-            <a:ext cx="7372440" cy="3483360"/>
+            <a:ext cx="7372080" cy="3483000"/>
           </a:xfrm>
           <a:prstGeom prst="rect">
             <a:avLst/>
@@ -13473,7 +13505,7 @@
         <p:spPr>
           <a:xfrm>
             <a:off x="494640" y="1418040"/>
-            <a:ext cx="5216400" cy="442080"/>
+            <a:ext cx="5216040" cy="441720"/>
           </a:xfrm>
           <a:prstGeom prst="rect">
             <a:avLst/>
@@ -13561,7 +13593,7 @@
         <p:spPr>
           <a:xfrm>
             <a:off x="685800" y="2514600"/>
-            <a:ext cx="8870400" cy="3836880"/>
+            <a:ext cx="8870040" cy="3836520"/>
           </a:xfrm>
           <a:prstGeom prst="rect">
             <a:avLst/>
@@ -13580,7 +13612,7 @@
         <p:spPr>
           <a:xfrm>
             <a:off x="335520" y="764640"/>
-            <a:ext cx="10743480" cy="494280"/>
+            <a:ext cx="10743120" cy="493920"/>
           </a:xfrm>
           <a:prstGeom prst="rect">
             <a:avLst/>
@@ -13634,7 +13666,7 @@
         <p:spPr>
           <a:xfrm>
             <a:off x="494640" y="1312200"/>
-            <a:ext cx="1733400" cy="364680"/>
+            <a:ext cx="1733040" cy="364320"/>
           </a:xfrm>
           <a:prstGeom prst="rect">
             <a:avLst/>
@@ -13861,7 +13893,7 @@
         <p:spPr>
           <a:xfrm>
             <a:off x="642600" y="1679400"/>
-            <a:ext cx="4400280" cy="638280"/>
+            <a:ext cx="4399920" cy="638280"/>
           </a:xfrm>
           <a:prstGeom prst="rect">
             <a:avLst/>
@@ -13938,7 +13970,7 @@
         <p:spPr>
           <a:xfrm>
             <a:off x="6549480" y="1679400"/>
-            <a:ext cx="4874040" cy="630720"/>
+            <a:ext cx="4873680" cy="630360"/>
           </a:xfrm>
           <a:prstGeom prst="rect">
             <a:avLst/>
@@ -14015,7 +14047,7 @@
         <p:spPr>
           <a:xfrm>
             <a:off x="7839360" y="1679400"/>
-            <a:ext cx="2615400" cy="428040"/>
+            <a:ext cx="2615040" cy="427680"/>
           </a:xfrm>
           <a:prstGeom prst="rect">
             <a:avLst/>
@@ -14072,7 +14104,7 @@
         <p:spPr>
           <a:xfrm>
             <a:off x="8857440" y="3943440"/>
-            <a:ext cx="280080" cy="363960"/>
+            <a:ext cx="279720" cy="363960"/>
           </a:xfrm>
           <a:prstGeom prst="rect">
             <a:avLst/>
@@ -14126,7 +14158,7 @@
         <p:spPr>
           <a:xfrm>
             <a:off x="9537840" y="4548960"/>
-            <a:ext cx="280080" cy="363960"/>
+            <a:ext cx="279720" cy="363960"/>
           </a:xfrm>
           <a:prstGeom prst="rect">
             <a:avLst/>
@@ -14180,7 +14212,7 @@
         <p:spPr>
           <a:xfrm>
             <a:off x="7279920" y="6101280"/>
-            <a:ext cx="280440" cy="363960"/>
+            <a:ext cx="280080" cy="363960"/>
           </a:xfrm>
           <a:prstGeom prst="rect">
             <a:avLst/>
@@ -14283,7 +14315,7 @@
         <p:spPr>
           <a:xfrm>
             <a:off x="1058760" y="6130800"/>
-            <a:ext cx="280440" cy="363960"/>
+            <a:ext cx="280080" cy="363960"/>
           </a:xfrm>
           <a:prstGeom prst="rect">
             <a:avLst/>
@@ -14367,7 +14399,7 @@
         <p:spPr>
           <a:xfrm>
             <a:off x="335520" y="764640"/>
-            <a:ext cx="10743480" cy="494280"/>
+            <a:ext cx="10743120" cy="493920"/>
           </a:xfrm>
           <a:prstGeom prst="rect">
             <a:avLst/>
@@ -14425,7 +14457,7 @@
         <p:spPr>
           <a:xfrm>
             <a:off x="2394720" y="1153800"/>
-            <a:ext cx="1466280" cy="2167560"/>
+            <a:ext cx="1465920" cy="2167200"/>
           </a:xfrm>
           <a:prstGeom prst="rect">
             <a:avLst/>
@@ -14448,7 +14480,7 @@
         <p:spPr>
           <a:xfrm>
             <a:off x="7250040" y="1153800"/>
-            <a:ext cx="1731600" cy="2167560"/>
+            <a:ext cx="1731240" cy="2167200"/>
           </a:xfrm>
           <a:prstGeom prst="rect">
             <a:avLst/>
@@ -14471,7 +14503,7 @@
         <p:spPr>
           <a:xfrm>
             <a:off x="2207880" y="4110120"/>
-            <a:ext cx="1780200" cy="1772280"/>
+            <a:ext cx="1779840" cy="1771920"/>
           </a:xfrm>
           <a:prstGeom prst="rect">
             <a:avLst/>
@@ -14490,7 +14522,7 @@
         <p:spPr>
           <a:xfrm>
             <a:off x="1330200" y="3269880"/>
-            <a:ext cx="3630960" cy="672480"/>
+            <a:ext cx="3630600" cy="672120"/>
           </a:xfrm>
           <a:prstGeom prst="rect">
             <a:avLst/>
@@ -14547,7 +14579,7 @@
         <p:spPr>
           <a:xfrm>
             <a:off x="6321600" y="3269880"/>
-            <a:ext cx="3630960" cy="672480"/>
+            <a:ext cx="3630600" cy="672120"/>
           </a:xfrm>
           <a:prstGeom prst="rect">
             <a:avLst/>
@@ -14604,7 +14636,7 @@
         <p:spPr>
           <a:xfrm>
             <a:off x="1312200" y="5920200"/>
-            <a:ext cx="3630960" cy="672480"/>
+            <a:ext cx="3630600" cy="672120"/>
           </a:xfrm>
           <a:prstGeom prst="rect">
             <a:avLst/>
@@ -14667,7 +14699,7 @@
         <p:spPr>
           <a:xfrm>
             <a:off x="1312200" y="5807160"/>
-            <a:ext cx="3630960" cy="672480"/>
+            <a:ext cx="3630600" cy="672120"/>
           </a:xfrm>
           <a:prstGeom prst="rect">
             <a:avLst/>
@@ -14724,7 +14756,7 @@
         <p:spPr>
           <a:xfrm>
             <a:off x="4860000" y="5920200"/>
-            <a:ext cx="3630960" cy="672480"/>
+            <a:ext cx="3630600" cy="672120"/>
           </a:xfrm>
           <a:prstGeom prst="rect">
             <a:avLst/>
@@ -14769,7 +14801,7 @@
         <p:spPr>
           <a:xfrm>
             <a:off x="6300000" y="5807160"/>
-            <a:ext cx="3630960" cy="672480"/>
+            <a:ext cx="3630600" cy="672120"/>
           </a:xfrm>
           <a:prstGeom prst="rect">
             <a:avLst/>
@@ -14831,7 +14863,7 @@
         <p:spPr>
           <a:xfrm>
             <a:off x="7380000" y="3960000"/>
-            <a:ext cx="1439640" cy="1923480"/>
+            <a:ext cx="1439280" cy="1923120"/>
           </a:xfrm>
           <a:prstGeom prst="rect">
             <a:avLst/>
@@ -14880,7 +14912,7 @@
         <p:spPr>
           <a:xfrm>
             <a:off x="335520" y="764640"/>
-            <a:ext cx="10743480" cy="494280"/>
+            <a:ext cx="10743120" cy="493920"/>
           </a:xfrm>
           <a:prstGeom prst="rect">
             <a:avLst/>
@@ -14934,7 +14966,7 @@
         <p:spPr>
           <a:xfrm>
             <a:off x="335520" y="1268640"/>
-            <a:ext cx="10743480" cy="5031000"/>
+            <a:ext cx="10743120" cy="5030640"/>
           </a:xfrm>
           <a:prstGeom prst="rect">
             <a:avLst/>
@@ -15319,7 +15351,7 @@
         <p:spPr>
           <a:xfrm>
             <a:off x="335520" y="764640"/>
-            <a:ext cx="10741680" cy="492480"/>
+            <a:ext cx="10741320" cy="492120"/>
           </a:xfrm>
           <a:prstGeom prst="rect">
             <a:avLst/>
@@ -15373,7 +15405,7 @@
         <p:spPr>
           <a:xfrm>
             <a:off x="335520" y="1268280"/>
-            <a:ext cx="10741680" cy="5029200"/>
+            <a:ext cx="10741320" cy="5028840"/>
           </a:xfrm>
           <a:prstGeom prst="rect">
             <a:avLst/>
@@ -15469,7 +15501,7 @@
         <p:spPr>
           <a:xfrm>
             <a:off x="6285600" y="2132640"/>
-            <a:ext cx="511200" cy="491040"/>
+            <a:ext cx="510840" cy="490680"/>
           </a:xfrm>
           <a:prstGeom prst="star5">
             <a:avLst>
@@ -15530,7 +15562,7 @@
         <p:spPr>
           <a:xfrm>
             <a:off x="4089960" y="2247480"/>
-            <a:ext cx="2279520" cy="363960"/>
+            <a:ext cx="2279160" cy="363960"/>
           </a:xfrm>
           <a:prstGeom prst="rect">
             <a:avLst/>
@@ -15634,7 +15666,7 @@
         <p:spPr>
           <a:xfrm>
             <a:off x="335520" y="764640"/>
-            <a:ext cx="10741680" cy="492480"/>
+            <a:ext cx="10741320" cy="492120"/>
           </a:xfrm>
           <a:prstGeom prst="rect">
             <a:avLst/>
@@ -15688,7 +15720,7 @@
         <p:spPr>
           <a:xfrm>
             <a:off x="335520" y="1268640"/>
-            <a:ext cx="10741680" cy="5029200"/>
+            <a:ext cx="10741320" cy="5028840"/>
           </a:xfrm>
           <a:prstGeom prst="rect">
             <a:avLst/>
@@ -16129,7 +16161,7 @@
         <p:spPr>
           <a:xfrm>
             <a:off x="335520" y="764640"/>
-            <a:ext cx="10744920" cy="495720"/>
+            <a:ext cx="10744560" cy="495360"/>
           </a:xfrm>
           <a:prstGeom prst="rect">
             <a:avLst/>
@@ -16183,7 +16215,7 @@
         <p:spPr>
           <a:xfrm>
             <a:off x="335520" y="1268640"/>
-            <a:ext cx="10744920" cy="5032440"/>
+            <a:ext cx="10744560" cy="5032080"/>
           </a:xfrm>
           <a:prstGeom prst="rect">
             <a:avLst/>
@@ -16400,7 +16432,7 @@
         <p:spPr>
           <a:xfrm>
             <a:off x="335520" y="764640"/>
-            <a:ext cx="10743480" cy="494280"/>
+            <a:ext cx="10743120" cy="493920"/>
           </a:xfrm>
           <a:prstGeom prst="rect">
             <a:avLst/>
@@ -16454,7 +16486,7 @@
         <p:spPr>
           <a:xfrm>
             <a:off x="335520" y="1268640"/>
-            <a:ext cx="10743480" cy="5031000"/>
+            <a:ext cx="10743120" cy="5030640"/>
           </a:xfrm>
           <a:prstGeom prst="rect">
             <a:avLst/>
@@ -16939,7 +16971,7 @@
         <p:spPr>
           <a:xfrm>
             <a:off x="335520" y="764640"/>
-            <a:ext cx="10741680" cy="492480"/>
+            <a:ext cx="10741320" cy="492120"/>
           </a:xfrm>
           <a:prstGeom prst="rect">
             <a:avLst/>
@@ -16993,7 +17025,7 @@
         <p:spPr>
           <a:xfrm>
             <a:off x="335520" y="1268640"/>
-            <a:ext cx="10741680" cy="5029200"/>
+            <a:ext cx="10741320" cy="5028840"/>
           </a:xfrm>
           <a:prstGeom prst="rect">
             <a:avLst/>
@@ -17387,7 +17419,7 @@
         <p:spPr>
           <a:xfrm>
             <a:off x="335520" y="1268640"/>
-            <a:ext cx="10743480" cy="5031000"/>
+            <a:ext cx="10743120" cy="5030640"/>
           </a:xfrm>
           <a:prstGeom prst="rect">
             <a:avLst/>
@@ -17447,7 +17479,7 @@
         <p:spPr>
           <a:xfrm>
             <a:off x="335520" y="764640"/>
-            <a:ext cx="10743480" cy="494280"/>
+            <a:ext cx="10743120" cy="493920"/>
           </a:xfrm>
           <a:prstGeom prst="rect">
             <a:avLst/>
@@ -17522,7 +17554,7 @@
         <p:spPr>
           <a:xfrm>
             <a:off x="542880" y="721800"/>
-            <a:ext cx="10347840" cy="488520"/>
+            <a:ext cx="10347480" cy="488160"/>
           </a:xfrm>
           <a:prstGeom prst="rect">
             <a:avLst/>
@@ -17576,7 +17608,7 @@
         <p:spPr>
           <a:xfrm>
             <a:off x="451800" y="1709280"/>
-            <a:ext cx="8215200" cy="4343400"/>
+            <a:ext cx="8214840" cy="4343040"/>
           </a:xfrm>
           <a:prstGeom prst="rect">
             <a:avLst/>
@@ -17621,7 +17653,7 @@
         <p:spPr>
           <a:xfrm>
             <a:off x="609480" y="1769400"/>
-            <a:ext cx="10578240" cy="4846320"/>
+            <a:ext cx="10577880" cy="4845960"/>
           </a:xfrm>
           <a:prstGeom prst="rect">
             <a:avLst/>
@@ -18050,7 +18082,7 @@
         <p:spPr>
           <a:xfrm>
             <a:off x="542880" y="721800"/>
-            <a:ext cx="10347840" cy="488520"/>
+            <a:ext cx="10347480" cy="488160"/>
           </a:xfrm>
           <a:prstGeom prst="rect">
             <a:avLst/>
@@ -18104,7 +18136,7 @@
         <p:spPr>
           <a:xfrm>
             <a:off x="451800" y="1709280"/>
-            <a:ext cx="8215200" cy="4343400"/>
+            <a:ext cx="8214840" cy="4343040"/>
           </a:xfrm>
           <a:prstGeom prst="rect">
             <a:avLst/>
@@ -18149,7 +18181,7 @@
         <p:spPr>
           <a:xfrm>
             <a:off x="609480" y="1769400"/>
-            <a:ext cx="10578240" cy="4846320"/>
+            <a:ext cx="10577880" cy="4845960"/>
           </a:xfrm>
           <a:prstGeom prst="rect">
             <a:avLst/>
@@ -18580,7 +18612,7 @@
         <p:spPr>
           <a:xfrm>
             <a:off x="542880" y="721800"/>
-            <a:ext cx="10347840" cy="488520"/>
+            <a:ext cx="10347480" cy="488160"/>
           </a:xfrm>
           <a:prstGeom prst="rect">
             <a:avLst/>
@@ -18634,7 +18666,7 @@
         <p:spPr>
           <a:xfrm>
             <a:off x="451800" y="1709280"/>
-            <a:ext cx="8215200" cy="4343400"/>
+            <a:ext cx="8214840" cy="4343040"/>
           </a:xfrm>
           <a:prstGeom prst="rect">
             <a:avLst/>
@@ -18679,7 +18711,7 @@
         <p:spPr>
           <a:xfrm>
             <a:off x="609480" y="1769400"/>
-            <a:ext cx="10578240" cy="4846320"/>
+            <a:ext cx="10577880" cy="4845960"/>
           </a:xfrm>
           <a:prstGeom prst="rect">
             <a:avLst/>
@@ -19110,7 +19142,7 @@
         <p:spPr>
           <a:xfrm>
             <a:off x="335520" y="764640"/>
-            <a:ext cx="10743480" cy="494280"/>
+            <a:ext cx="10743120" cy="493920"/>
           </a:xfrm>
           <a:prstGeom prst="rect">
             <a:avLst/>
@@ -19164,7 +19196,7 @@
         <p:spPr>
           <a:xfrm>
             <a:off x="335520" y="2408400"/>
-            <a:ext cx="10743480" cy="3891240"/>
+            <a:ext cx="10743120" cy="3890880"/>
           </a:xfrm>
           <a:prstGeom prst="rect">
             <a:avLst/>
@@ -19257,7 +19289,7 @@
         <p:spPr>
           <a:xfrm>
             <a:off x="335520" y="764640"/>
-            <a:ext cx="10743480" cy="494280"/>
+            <a:ext cx="10743120" cy="493920"/>
           </a:xfrm>
           <a:prstGeom prst="rect">
             <a:avLst/>
@@ -19311,7 +19343,7 @@
         <p:spPr>
           <a:xfrm>
             <a:off x="335520" y="2408400"/>
-            <a:ext cx="10743480" cy="3891240"/>
+            <a:ext cx="10743120" cy="3890880"/>
           </a:xfrm>
           <a:prstGeom prst="rect">
             <a:avLst/>
@@ -19436,7 +19468,7 @@
         <p:spPr>
           <a:xfrm>
             <a:off x="335520" y="764640"/>
-            <a:ext cx="10743480" cy="494280"/>
+            <a:ext cx="10743120" cy="493920"/>
           </a:xfrm>
           <a:prstGeom prst="rect">
             <a:avLst/>
@@ -19490,7 +19522,7 @@
         <p:spPr>
           <a:xfrm>
             <a:off x="335520" y="2408400"/>
-            <a:ext cx="10743480" cy="3891240"/>
+            <a:ext cx="10743120" cy="3890880"/>
           </a:xfrm>
           <a:prstGeom prst="rect">
             <a:avLst/>

</xml_diff>

<commit_message>
* done IoT L00 * minor folder restructuring
</commit_message>
<xml_diff>
--- a/Emerging-Technologies-for-the-Circular-Economy/ETCE-L00-Organization.pptx
+++ b/Emerging-Technologies-for-the-Circular-Economy/ETCE-L00-Organization.pptx
@@ -375,7 +375,7 @@
             <a:pPr indent="0" algn="r">
               <a:buNone/>
             </a:pPr>
-            <a:fld id="{7F1FD6C5-BBD7-41AB-9196-E990DFC7774C}" type="slidenum">
+            <a:fld id="{D72ABDFB-0420-4E0E-8B3D-8043148A2448}" type="slidenum">
               <a:rPr b="0" lang="en-GB" sz="1400" spc="-1" strike="noStrike">
                 <a:solidFill>
                   <a:srgbClr val="000000"/>
@@ -429,7 +429,7 @@
         <p:spPr>
           <a:xfrm>
             <a:off x="533520" y="763560"/>
-            <a:ext cx="6690600" cy="3758760"/>
+            <a:ext cx="6690240" cy="3758400"/>
           </a:xfrm>
           <a:prstGeom prst="rect">
             <a:avLst/>
@@ -452,7 +452,7 @@
         <p:spPr>
           <a:xfrm>
             <a:off x="777240" y="4777560"/>
-            <a:ext cx="6204240" cy="4512600"/>
+            <a:ext cx="6203880" cy="4512240"/>
           </a:xfrm>
           <a:prstGeom prst="rect">
             <a:avLst/>
@@ -488,7 +488,7 @@
         <p:spPr>
           <a:xfrm>
             <a:off x="4399200" y="9555480"/>
-            <a:ext cx="3359520" cy="489240"/>
+            <a:ext cx="3359160" cy="488880"/>
           </a:xfrm>
           <a:prstGeom prst="rect">
             <a:avLst/>
@@ -514,7 +514,7 @@
                 <a:spcPct val="100000"/>
               </a:lnSpc>
             </a:pPr>
-            <a:fld id="{4C9B7804-20C1-441E-8733-71A7EE0F45FA}" type="slidenum">
+            <a:fld id="{07548FD9-D6AD-4EF8-931B-C6F0429438E9}" type="slidenum">
               <a:rPr b="0" lang="de-DE" sz="1800" spc="-1" strike="noStrike">
                 <a:solidFill>
                   <a:srgbClr val="000000"/>
@@ -522,7 +522,7 @@
                 <a:latin typeface="+mn-lt"/>
                 <a:ea typeface="+mn-ea"/>
               </a:rPr>
-              <a:t>&lt;number&gt;</a:t>
+              <a:t>6</a:t>
             </a:fld>
             <a:endParaRPr b="0" lang="en-GB" sz="1800" spc="-1" strike="noStrike">
               <a:solidFill>
@@ -568,7 +568,7 @@
         <p:spPr>
           <a:xfrm>
             <a:off x="533520" y="763560"/>
-            <a:ext cx="6690600" cy="3758760"/>
+            <a:ext cx="6690240" cy="3758400"/>
           </a:xfrm>
           <a:prstGeom prst="rect">
             <a:avLst/>
@@ -591,7 +591,7 @@
         <p:spPr>
           <a:xfrm>
             <a:off x="777240" y="4777560"/>
-            <a:ext cx="6204240" cy="4512600"/>
+            <a:ext cx="6203880" cy="4512240"/>
           </a:xfrm>
           <a:prstGeom prst="rect">
             <a:avLst/>
@@ -627,7 +627,7 @@
         <p:spPr>
           <a:xfrm>
             <a:off x="4399200" y="9555480"/>
-            <a:ext cx="3359520" cy="489240"/>
+            <a:ext cx="3359160" cy="488880"/>
           </a:xfrm>
           <a:prstGeom prst="rect">
             <a:avLst/>
@@ -653,7 +653,7 @@
                 <a:spcPct val="100000"/>
               </a:lnSpc>
             </a:pPr>
-            <a:fld id="{DF78F199-E414-4034-9213-D17635B9D0E5}" type="slidenum">
+            <a:fld id="{40D57CED-B8D9-4E69-BD00-AB12A2032813}" type="slidenum">
               <a:rPr b="0" lang="de-DE" sz="1800" spc="-1" strike="noStrike">
                 <a:solidFill>
                   <a:srgbClr val="000000"/>
@@ -707,7 +707,7 @@
         <p:spPr>
           <a:xfrm>
             <a:off x="533520" y="763560"/>
-            <a:ext cx="6690600" cy="3758760"/>
+            <a:ext cx="6690240" cy="3758400"/>
           </a:xfrm>
           <a:prstGeom prst="rect">
             <a:avLst/>
@@ -730,7 +730,7 @@
         <p:spPr>
           <a:xfrm>
             <a:off x="777240" y="4777560"/>
-            <a:ext cx="6204240" cy="4512600"/>
+            <a:ext cx="6203880" cy="4512240"/>
           </a:xfrm>
           <a:prstGeom prst="rect">
             <a:avLst/>
@@ -766,7 +766,7 @@
         <p:spPr>
           <a:xfrm>
             <a:off x="4399200" y="9555480"/>
-            <a:ext cx="3359520" cy="489240"/>
+            <a:ext cx="3359160" cy="488880"/>
           </a:xfrm>
           <a:prstGeom prst="rect">
             <a:avLst/>
@@ -792,7 +792,7 @@
                 <a:spcPct val="100000"/>
               </a:lnSpc>
             </a:pPr>
-            <a:fld id="{DFFA783B-34C1-4E33-9CAB-97A08DAEA4D2}" type="slidenum">
+            <a:fld id="{8FF50F8C-0F41-4D85-9658-BF38717A9584}" type="slidenum">
               <a:rPr b="0" lang="de-DE" sz="1800" spc="-1" strike="noStrike">
                 <a:solidFill>
                   <a:srgbClr val="000000"/>
@@ -4397,7 +4397,7 @@
         <p:spPr>
           <a:xfrm>
             <a:off x="11444760" y="0"/>
-            <a:ext cx="739080" cy="6847920"/>
+            <a:ext cx="738720" cy="6847560"/>
           </a:xfrm>
           <a:prstGeom prst="rect">
             <a:avLst/>
@@ -4446,7 +4446,7 @@
         <p:spPr>
           <a:xfrm>
             <a:off x="11438640" y="6453360"/>
-            <a:ext cx="756000" cy="363960"/>
+            <a:ext cx="755640" cy="363960"/>
           </a:xfrm>
           <a:prstGeom prst="rect">
             <a:avLst/>
@@ -4472,7 +4472,7 @@
                 <a:spcPct val="100000"/>
               </a:lnSpc>
             </a:pPr>
-            <a:fld id="{6173C6F9-2DC4-4F80-A9BC-5B40C4F59393}" type="slidenum">
+            <a:fld id="{F57FA7A7-AC6A-41FC-966E-B7C1F1F61F7A}" type="slidenum">
               <a:rPr b="0" lang="en-US" sz="1800" spc="-1" strike="noStrike">
                 <a:solidFill>
                   <a:srgbClr val="808080"/>
@@ -4500,7 +4500,7 @@
         <p:spPr>
           <a:xfrm>
             <a:off x="912240" y="1268280"/>
-            <a:ext cx="9205920" cy="359280"/>
+            <a:ext cx="9205560" cy="358920"/>
           </a:xfrm>
           <a:prstGeom prst="rect">
             <a:avLst/>
@@ -4549,7 +4549,7 @@
         <p:spPr>
           <a:xfrm>
             <a:off x="0" y="0"/>
-            <a:ext cx="3049920" cy="559800"/>
+            <a:ext cx="3049560" cy="559440"/>
           </a:xfrm>
           <a:prstGeom prst="rect">
             <a:avLst/>
@@ -4572,7 +4572,7 @@
         <p:spPr>
           <a:xfrm>
             <a:off x="7430400" y="134640"/>
-            <a:ext cx="3695760" cy="511920"/>
+            <a:ext cx="3695400" cy="511560"/>
           </a:xfrm>
           <a:prstGeom prst="rect">
             <a:avLst/>
@@ -4591,7 +4591,7 @@
         <p:spPr>
           <a:xfrm>
             <a:off x="912240" y="1268280"/>
-            <a:ext cx="9205920" cy="359280"/>
+            <a:ext cx="9205560" cy="358920"/>
           </a:xfrm>
           <a:prstGeom prst="rect">
             <a:avLst/>
@@ -4636,7 +4636,7 @@
         <p:spPr>
           <a:xfrm>
             <a:off x="11444760" y="0"/>
-            <a:ext cx="739080" cy="6847920"/>
+            <a:ext cx="738720" cy="6847560"/>
           </a:xfrm>
           <a:prstGeom prst="rect">
             <a:avLst/>
@@ -4685,7 +4685,7 @@
         <p:spPr>
           <a:xfrm>
             <a:off x="0" y="6642720"/>
-            <a:ext cx="12182040" cy="211320"/>
+            <a:ext cx="12181680" cy="211320"/>
           </a:xfrm>
           <a:prstGeom prst="rect">
             <a:avLst/>
@@ -5077,7 +5077,7 @@
         <p:spPr>
           <a:xfrm>
             <a:off x="11444760" y="0"/>
-            <a:ext cx="739080" cy="6847920"/>
+            <a:ext cx="738720" cy="6847560"/>
           </a:xfrm>
           <a:prstGeom prst="rect">
             <a:avLst/>
@@ -5126,7 +5126,7 @@
         <p:spPr>
           <a:xfrm>
             <a:off x="11438640" y="6453360"/>
-            <a:ext cx="756000" cy="363960"/>
+            <a:ext cx="755640" cy="363960"/>
           </a:xfrm>
           <a:prstGeom prst="rect">
             <a:avLst/>
@@ -5152,7 +5152,7 @@
                 <a:spcPct val="100000"/>
               </a:lnSpc>
             </a:pPr>
-            <a:fld id="{5524F22B-EC04-46CC-85B8-40102B348ADC}" type="slidenum">
+            <a:fld id="{5A2E3576-A09D-49E2-B572-5E6B25BA2D2C}" type="slidenum">
               <a:rPr b="0" lang="en-US" sz="1800" spc="-1" strike="noStrike">
                 <a:solidFill>
                   <a:srgbClr val="808080"/>
@@ -5180,7 +5180,7 @@
         <p:spPr>
           <a:xfrm>
             <a:off x="912240" y="1268280"/>
-            <a:ext cx="9205920" cy="359280"/>
+            <a:ext cx="9205560" cy="358920"/>
           </a:xfrm>
           <a:prstGeom prst="rect">
             <a:avLst/>
@@ -5229,7 +5229,7 @@
         <p:spPr>
           <a:xfrm>
             <a:off x="0" y="0"/>
-            <a:ext cx="3049920" cy="559800"/>
+            <a:ext cx="3049560" cy="559440"/>
           </a:xfrm>
           <a:prstGeom prst="rect">
             <a:avLst/>
@@ -5252,7 +5252,7 @@
         <p:spPr>
           <a:xfrm>
             <a:off x="7430400" y="134640"/>
-            <a:ext cx="3695760" cy="511920"/>
+            <a:ext cx="3695400" cy="511560"/>
           </a:xfrm>
           <a:prstGeom prst="rect">
             <a:avLst/>
@@ -5271,7 +5271,7 @@
         <p:spPr>
           <a:xfrm>
             <a:off x="11444760" y="0"/>
-            <a:ext cx="739080" cy="6847920"/>
+            <a:ext cx="738720" cy="6847560"/>
           </a:xfrm>
           <a:prstGeom prst="rect">
             <a:avLst/>
@@ -5320,7 +5320,7 @@
         <p:spPr>
           <a:xfrm>
             <a:off x="11438640" y="6453360"/>
-            <a:ext cx="756000" cy="363960"/>
+            <a:ext cx="755640" cy="363960"/>
           </a:xfrm>
           <a:prstGeom prst="rect">
             <a:avLst/>
@@ -5346,7 +5346,7 @@
                 <a:spcPct val="100000"/>
               </a:lnSpc>
             </a:pPr>
-            <a:fld id="{EE9E8B64-6847-406C-B80E-F2D219F5E5F0}" type="slidenum">
+            <a:fld id="{3FCA60D0-625A-4096-BE6B-ECDBB6431CFF}" type="slidenum">
               <a:rPr b="0" lang="en-US" sz="1800" spc="-1" strike="noStrike">
                 <a:solidFill>
                   <a:srgbClr val="808080"/>
@@ -5374,7 +5374,7 @@
         <p:spPr>
           <a:xfrm>
             <a:off x="0" y="6642720"/>
-            <a:ext cx="12182040" cy="211320"/>
+            <a:ext cx="12181680" cy="211320"/>
           </a:xfrm>
           <a:prstGeom prst="rect">
             <a:avLst/>
@@ -5759,7 +5759,7 @@
         <p:spPr>
           <a:xfrm>
             <a:off x="527400" y="1412640"/>
-            <a:ext cx="10359000" cy="1145520"/>
+            <a:ext cx="10358640" cy="1145160"/>
           </a:xfrm>
           <a:prstGeom prst="rect">
             <a:avLst/>
@@ -5813,7 +5813,7 @@
         <p:spPr>
           <a:xfrm>
             <a:off x="527400" y="2852640"/>
-            <a:ext cx="10359000" cy="2366280"/>
+            <a:ext cx="10358640" cy="2365920"/>
           </a:xfrm>
           <a:prstGeom prst="rect">
             <a:avLst/>
@@ -6076,7 +6076,7 @@
         <p:spPr>
           <a:xfrm>
             <a:off x="335520" y="764640"/>
-            <a:ext cx="10743120" cy="493920"/>
+            <a:ext cx="10742760" cy="493560"/>
           </a:xfrm>
           <a:prstGeom prst="rect">
             <a:avLst/>
@@ -6143,7 +6143,7 @@
         <p:spPr>
           <a:xfrm>
             <a:off x="335520" y="2408400"/>
-            <a:ext cx="10743120" cy="3890880"/>
+            <a:ext cx="10742760" cy="3890520"/>
           </a:xfrm>
           <a:prstGeom prst="rect">
             <a:avLst/>
@@ -6332,7 +6332,7 @@
         <p:spPr>
           <a:xfrm>
             <a:off x="335520" y="764640"/>
-            <a:ext cx="10743120" cy="493920"/>
+            <a:ext cx="10742760" cy="493560"/>
           </a:xfrm>
           <a:prstGeom prst="rect">
             <a:avLst/>
@@ -6386,7 +6386,7 @@
         <p:spPr>
           <a:xfrm>
             <a:off x="335520" y="2408400"/>
-            <a:ext cx="10743120" cy="3890880"/>
+            <a:ext cx="10742760" cy="3890520"/>
           </a:xfrm>
           <a:prstGeom prst="rect">
             <a:avLst/>
@@ -6607,7 +6607,7 @@
         <p:spPr>
           <a:xfrm>
             <a:off x="335520" y="764640"/>
-            <a:ext cx="10743120" cy="493920"/>
+            <a:ext cx="10742760" cy="493560"/>
           </a:xfrm>
           <a:prstGeom prst="rect">
             <a:avLst/>
@@ -6674,7 +6674,7 @@
         <p:spPr>
           <a:xfrm>
             <a:off x="335520" y="2408400"/>
-            <a:ext cx="10743120" cy="3890880"/>
+            <a:ext cx="10742760" cy="3890520"/>
           </a:xfrm>
           <a:prstGeom prst="rect">
             <a:avLst/>
@@ -6927,7 +6927,7 @@
         <p:spPr>
           <a:xfrm>
             <a:off x="335520" y="764640"/>
-            <a:ext cx="10743120" cy="493920"/>
+            <a:ext cx="10742760" cy="493560"/>
           </a:xfrm>
           <a:prstGeom prst="rect">
             <a:avLst/>
@@ -6981,7 +6981,7 @@
         <p:spPr>
           <a:xfrm>
             <a:off x="335520" y="1268640"/>
-            <a:ext cx="10743120" cy="5030640"/>
+            <a:ext cx="10742760" cy="5030280"/>
           </a:xfrm>
           <a:prstGeom prst="rect">
             <a:avLst/>
@@ -7534,7 +7534,7 @@
         <p:spPr>
           <a:xfrm>
             <a:off x="335520" y="764640"/>
-            <a:ext cx="10743120" cy="493920"/>
+            <a:ext cx="10742760" cy="493560"/>
           </a:xfrm>
           <a:prstGeom prst="rect">
             <a:avLst/>
@@ -7588,7 +7588,7 @@
         <p:spPr>
           <a:xfrm>
             <a:off x="335520" y="1268640"/>
-            <a:ext cx="10743120" cy="5030640"/>
+            <a:ext cx="10742760" cy="5030280"/>
           </a:xfrm>
           <a:prstGeom prst="rect">
             <a:avLst/>
@@ -8273,7 +8273,7 @@
         <p:spPr>
           <a:xfrm>
             <a:off x="335520" y="764640"/>
-            <a:ext cx="10743120" cy="493920"/>
+            <a:ext cx="10742760" cy="493560"/>
           </a:xfrm>
           <a:prstGeom prst="rect">
             <a:avLst/>
@@ -8327,7 +8327,7 @@
         <p:spPr>
           <a:xfrm>
             <a:off x="335520" y="1268280"/>
-            <a:ext cx="10743120" cy="5030640"/>
+            <a:ext cx="10742760" cy="5030280"/>
           </a:xfrm>
           <a:prstGeom prst="rect">
             <a:avLst/>
@@ -8450,7 +8450,7 @@
                 <a:latin typeface="DejaVu Sans"/>
                 <a:ea typeface="DejaVu Sans"/>
               </a:rPr>
-              <a:t>Slides will be uploaded to StudIP (Clausthal and Göttingen) and Github (</a:t>
+              <a:t>Slides are available on Github (</a:t>
             </a:r>
             <a:r>
               <a:rPr b="0" lang="en-US" sz="1800" spc="-1" strike="noStrike" u="sng">
@@ -8790,7 +8790,7 @@
         <p:spPr>
           <a:xfrm>
             <a:off x="335520" y="764640"/>
-            <a:ext cx="10741680" cy="492480"/>
+            <a:ext cx="10741320" cy="492120"/>
           </a:xfrm>
           <a:prstGeom prst="rect">
             <a:avLst/>
@@ -8870,7 +8870,7 @@
         <p:spPr>
           <a:xfrm>
             <a:off x="335520" y="1268640"/>
-            <a:ext cx="10741680" cy="5029200"/>
+            <a:ext cx="10741320" cy="5028840"/>
           </a:xfrm>
           <a:prstGeom prst="rect">
             <a:avLst/>
@@ -9301,7 +9301,7 @@
         <p:spPr>
           <a:xfrm>
             <a:off x="335520" y="764640"/>
-            <a:ext cx="10743120" cy="493920"/>
+            <a:ext cx="10742760" cy="493560"/>
           </a:xfrm>
           <a:prstGeom prst="rect">
             <a:avLst/>
@@ -9355,7 +9355,7 @@
         <p:spPr>
           <a:xfrm>
             <a:off x="335520" y="1268280"/>
-            <a:ext cx="10743120" cy="5030640"/>
+            <a:ext cx="10742760" cy="5030280"/>
           </a:xfrm>
           <a:prstGeom prst="rect">
             <a:avLst/>
@@ -9756,7 +9756,7 @@
         <p:spPr>
           <a:xfrm>
             <a:off x="335520" y="764640"/>
-            <a:ext cx="10743120" cy="493920"/>
+            <a:ext cx="10742760" cy="493560"/>
           </a:xfrm>
           <a:prstGeom prst="rect">
             <a:avLst/>
@@ -9810,7 +9810,7 @@
         <p:spPr>
           <a:xfrm>
             <a:off x="335520" y="1268640"/>
-            <a:ext cx="10743120" cy="5030640"/>
+            <a:ext cx="10742760" cy="5030280"/>
           </a:xfrm>
           <a:prstGeom prst="rect">
             <a:avLst/>
@@ -10041,7 +10041,7 @@
         <p:spPr>
           <a:xfrm>
             <a:off x="4655880" y="476640"/>
-            <a:ext cx="2429280" cy="355320"/>
+            <a:ext cx="2428920" cy="354960"/>
           </a:xfrm>
           <a:prstGeom prst="rect">
             <a:avLst/>
@@ -10116,7 +10116,7 @@
         <p:spPr>
           <a:xfrm>
             <a:off x="335520" y="764640"/>
-            <a:ext cx="10743120" cy="493920"/>
+            <a:ext cx="10742760" cy="493560"/>
           </a:xfrm>
           <a:prstGeom prst="rect">
             <a:avLst/>
@@ -10170,7 +10170,7 @@
         <p:spPr>
           <a:xfrm>
             <a:off x="335520" y="1268640"/>
-            <a:ext cx="10743120" cy="5030640"/>
+            <a:ext cx="10742760" cy="5030280"/>
           </a:xfrm>
           <a:prstGeom prst="rect">
             <a:avLst/>
@@ -10297,7 +10297,7 @@
         <p:spPr>
           <a:xfrm>
             <a:off x="4655880" y="476640"/>
-            <a:ext cx="2429280" cy="355320"/>
+            <a:ext cx="2428920" cy="354960"/>
           </a:xfrm>
           <a:prstGeom prst="rect">
             <a:avLst/>
@@ -10372,7 +10372,7 @@
         <p:spPr>
           <a:xfrm>
             <a:off x="335520" y="764640"/>
-            <a:ext cx="10740960" cy="491760"/>
+            <a:ext cx="10740600" cy="491400"/>
           </a:xfrm>
           <a:prstGeom prst="rect">
             <a:avLst/>
@@ -10426,7 +10426,7 @@
         <p:spPr>
           <a:xfrm>
             <a:off x="335520" y="1268640"/>
-            <a:ext cx="10740960" cy="5028480"/>
+            <a:ext cx="10740600" cy="5028120"/>
           </a:xfrm>
           <a:prstGeom prst="rect">
             <a:avLst/>
@@ -10489,7 +10489,7 @@
         <p:spPr>
           <a:xfrm>
             <a:off x="336600" y="3429000"/>
-            <a:ext cx="10858680" cy="2050560"/>
+            <a:ext cx="10858320" cy="2050200"/>
           </a:xfrm>
           <a:prstGeom prst="rect">
             <a:avLst/>
@@ -10684,7 +10684,7 @@
         <p:spPr>
           <a:xfrm>
             <a:off x="335520" y="840960"/>
-            <a:ext cx="10743120" cy="493920"/>
+            <a:ext cx="10742760" cy="493560"/>
           </a:xfrm>
           <a:prstGeom prst="rect">
             <a:avLst/>
@@ -10738,7 +10738,7 @@
         <p:spPr>
           <a:xfrm>
             <a:off x="388800" y="1488600"/>
-            <a:ext cx="10721520" cy="5204520"/>
+            <a:ext cx="10721160" cy="5204520"/>
           </a:xfrm>
           <a:prstGeom prst="rect">
             <a:avLst/>
@@ -11444,7 +11444,7 @@
         <p:spPr>
           <a:xfrm>
             <a:off x="335520" y="764640"/>
-            <a:ext cx="10743120" cy="493920"/>
+            <a:ext cx="10742760" cy="493560"/>
           </a:xfrm>
           <a:prstGeom prst="rect">
             <a:avLst/>
@@ -11498,7 +11498,7 @@
         <p:spPr>
           <a:xfrm>
             <a:off x="4655880" y="476640"/>
-            <a:ext cx="2429280" cy="355320"/>
+            <a:ext cx="2428920" cy="354960"/>
           </a:xfrm>
           <a:prstGeom prst="rect">
             <a:avLst/>
@@ -11543,7 +11543,7 @@
         <p:spPr>
           <a:xfrm>
             <a:off x="494640" y="1523880"/>
-            <a:ext cx="10361880" cy="477000"/>
+            <a:ext cx="10361520" cy="476640"/>
           </a:xfrm>
           <a:prstGeom prst="rect">
             <a:avLst/>
@@ -11602,7 +11602,7 @@
         <p:spPr>
           <a:xfrm>
             <a:off x="609120" y="2057760"/>
-            <a:ext cx="9514440" cy="3878640"/>
+            <a:ext cx="9514080" cy="3878280"/>
           </a:xfrm>
           <a:prstGeom prst="rect">
             <a:avLst/>
@@ -11651,7 +11651,7 @@
         <p:spPr>
           <a:xfrm>
             <a:off x="335520" y="764640"/>
-            <a:ext cx="10743120" cy="493920"/>
+            <a:ext cx="10742760" cy="493560"/>
           </a:xfrm>
           <a:prstGeom prst="rect">
             <a:avLst/>
@@ -11705,7 +11705,7 @@
         <p:spPr>
           <a:xfrm>
             <a:off x="4655880" y="476640"/>
-            <a:ext cx="2429280" cy="355320"/>
+            <a:ext cx="2428920" cy="354960"/>
           </a:xfrm>
           <a:prstGeom prst="rect">
             <a:avLst/>
@@ -11750,7 +11750,7 @@
         <p:spPr>
           <a:xfrm>
             <a:off x="494640" y="1474920"/>
-            <a:ext cx="10361880" cy="477000"/>
+            <a:ext cx="10361520" cy="476640"/>
           </a:xfrm>
           <a:prstGeom prst="rect">
             <a:avLst/>
@@ -11819,7 +11819,7 @@
         <p:spPr>
           <a:xfrm>
             <a:off x="446400" y="2185200"/>
-            <a:ext cx="9401760" cy="3844800"/>
+            <a:ext cx="9401400" cy="3844440"/>
           </a:xfrm>
           <a:prstGeom prst="rect">
             <a:avLst/>
@@ -11868,7 +11868,7 @@
         <p:spPr>
           <a:xfrm>
             <a:off x="335520" y="764640"/>
-            <a:ext cx="10743120" cy="493920"/>
+            <a:ext cx="10742760" cy="493560"/>
           </a:xfrm>
           <a:prstGeom prst="rect">
             <a:avLst/>
@@ -11922,7 +11922,7 @@
         <p:spPr>
           <a:xfrm>
             <a:off x="4655880" y="476640"/>
-            <a:ext cx="2429280" cy="355320"/>
+            <a:ext cx="2428920" cy="354960"/>
           </a:xfrm>
           <a:prstGeom prst="rect">
             <a:avLst/>
@@ -11967,7 +11967,7 @@
         <p:spPr>
           <a:xfrm>
             <a:off x="494640" y="1523880"/>
-            <a:ext cx="10361880" cy="477000"/>
+            <a:ext cx="10361520" cy="476640"/>
           </a:xfrm>
           <a:prstGeom prst="rect">
             <a:avLst/>
@@ -12026,7 +12026,7 @@
         <p:spPr>
           <a:xfrm>
             <a:off x="494640" y="2088360"/>
-            <a:ext cx="8939520" cy="3961080"/>
+            <a:ext cx="8939160" cy="3960720"/>
           </a:xfrm>
           <a:prstGeom prst="rect">
             <a:avLst/>
@@ -12075,7 +12075,7 @@
         <p:spPr>
           <a:xfrm>
             <a:off x="335520" y="764640"/>
-            <a:ext cx="10743120" cy="493920"/>
+            <a:ext cx="10742760" cy="493560"/>
           </a:xfrm>
           <a:prstGeom prst="rect">
             <a:avLst/>
@@ -12129,7 +12129,7 @@
         <p:spPr>
           <a:xfrm>
             <a:off x="4655880" y="476640"/>
-            <a:ext cx="2429280" cy="355320"/>
+            <a:ext cx="2428920" cy="354960"/>
           </a:xfrm>
           <a:prstGeom prst="rect">
             <a:avLst/>
@@ -12174,7 +12174,7 @@
         <p:spPr>
           <a:xfrm>
             <a:off x="494640" y="1523880"/>
-            <a:ext cx="10361880" cy="477000"/>
+            <a:ext cx="10361520" cy="476640"/>
           </a:xfrm>
           <a:prstGeom prst="rect">
             <a:avLst/>
@@ -12233,7 +12233,7 @@
         <p:spPr>
           <a:xfrm>
             <a:off x="494640" y="2166840"/>
-            <a:ext cx="8335080" cy="4176360"/>
+            <a:ext cx="8334720" cy="4176000"/>
           </a:xfrm>
           <a:prstGeom prst="rect">
             <a:avLst/>
@@ -12282,7 +12282,7 @@
         <p:spPr>
           <a:xfrm>
             <a:off x="335520" y="768240"/>
-            <a:ext cx="10743120" cy="493920"/>
+            <a:ext cx="10742760" cy="493560"/>
           </a:xfrm>
           <a:prstGeom prst="rect">
             <a:avLst/>
@@ -12336,7 +12336,7 @@
         <p:spPr>
           <a:xfrm>
             <a:off x="388800" y="1488600"/>
-            <a:ext cx="10716840" cy="5204520"/>
+            <a:ext cx="10716480" cy="5204520"/>
           </a:xfrm>
           <a:prstGeom prst="rect">
             <a:avLst/>
@@ -13046,7 +13046,7 @@
         <p:spPr>
           <a:xfrm>
             <a:off x="335520" y="764640"/>
-            <a:ext cx="10743120" cy="493920"/>
+            <a:ext cx="10742760" cy="493560"/>
           </a:xfrm>
           <a:prstGeom prst="rect">
             <a:avLst/>
@@ -13100,7 +13100,7 @@
         <p:spPr>
           <a:xfrm>
             <a:off x="494640" y="1523880"/>
-            <a:ext cx="10361880" cy="477000"/>
+            <a:ext cx="10361520" cy="476640"/>
           </a:xfrm>
           <a:prstGeom prst="rect">
             <a:avLst/>
@@ -13207,7 +13207,7 @@
         <p:spPr>
           <a:xfrm>
             <a:off x="1895760" y="2238840"/>
-            <a:ext cx="6784200" cy="4155120"/>
+            <a:ext cx="6783840" cy="4154760"/>
           </a:xfrm>
           <a:prstGeom prst="rect">
             <a:avLst/>
@@ -13256,7 +13256,7 @@
         <p:spPr>
           <a:xfrm>
             <a:off x="335520" y="764640"/>
-            <a:ext cx="10743120" cy="493920"/>
+            <a:ext cx="10742760" cy="493560"/>
           </a:xfrm>
           <a:prstGeom prst="rect">
             <a:avLst/>
@@ -13310,7 +13310,7 @@
         <p:spPr>
           <a:xfrm>
             <a:off x="494640" y="1488600"/>
-            <a:ext cx="5444640" cy="441720"/>
+            <a:ext cx="5444280" cy="441360"/>
           </a:xfrm>
           <a:prstGeom prst="rect">
             <a:avLst/>
@@ -13379,7 +13379,7 @@
         <p:spPr>
           <a:xfrm>
             <a:off x="1828800" y="1937160"/>
-            <a:ext cx="7951680" cy="4086000"/>
+            <a:ext cx="7951320" cy="4085640"/>
           </a:xfrm>
           <a:prstGeom prst="rect">
             <a:avLst/>
@@ -13428,7 +13428,7 @@
         <p:spPr>
           <a:xfrm>
             <a:off x="335520" y="764640"/>
-            <a:ext cx="10743120" cy="493920"/>
+            <a:ext cx="10742760" cy="493560"/>
           </a:xfrm>
           <a:prstGeom prst="rect">
             <a:avLst/>
@@ -13486,7 +13486,7 @@
         <p:spPr>
           <a:xfrm>
             <a:off x="2679480" y="2130480"/>
-            <a:ext cx="7372080" cy="3483000"/>
+            <a:ext cx="7371720" cy="3482640"/>
           </a:xfrm>
           <a:prstGeom prst="rect">
             <a:avLst/>
@@ -13505,7 +13505,7 @@
         <p:spPr>
           <a:xfrm>
             <a:off x="494640" y="1418040"/>
-            <a:ext cx="5216040" cy="441720"/>
+            <a:ext cx="5215680" cy="441360"/>
           </a:xfrm>
           <a:prstGeom prst="rect">
             <a:avLst/>
@@ -13593,7 +13593,7 @@
         <p:spPr>
           <a:xfrm>
             <a:off x="685800" y="2514600"/>
-            <a:ext cx="8870040" cy="3836520"/>
+            <a:ext cx="8869680" cy="3836160"/>
           </a:xfrm>
           <a:prstGeom prst="rect">
             <a:avLst/>
@@ -13612,7 +13612,7 @@
         <p:spPr>
           <a:xfrm>
             <a:off x="335520" y="764640"/>
-            <a:ext cx="10743120" cy="493920"/>
+            <a:ext cx="10742760" cy="493560"/>
           </a:xfrm>
           <a:prstGeom prst="rect">
             <a:avLst/>
@@ -13666,7 +13666,7 @@
         <p:spPr>
           <a:xfrm>
             <a:off x="494640" y="1312200"/>
-            <a:ext cx="1733040" cy="364320"/>
+            <a:ext cx="1732680" cy="363960"/>
           </a:xfrm>
           <a:prstGeom prst="rect">
             <a:avLst/>
@@ -13893,7 +13893,7 @@
         <p:spPr>
           <a:xfrm>
             <a:off x="642600" y="1679400"/>
-            <a:ext cx="4399920" cy="638280"/>
+            <a:ext cx="4399560" cy="638280"/>
           </a:xfrm>
           <a:prstGeom prst="rect">
             <a:avLst/>
@@ -13970,7 +13970,7 @@
         <p:spPr>
           <a:xfrm>
             <a:off x="6549480" y="1679400"/>
-            <a:ext cx="4873680" cy="630360"/>
+            <a:ext cx="4873320" cy="630000"/>
           </a:xfrm>
           <a:prstGeom prst="rect">
             <a:avLst/>
@@ -14047,7 +14047,7 @@
         <p:spPr>
           <a:xfrm>
             <a:off x="7839360" y="1679400"/>
-            <a:ext cx="2615040" cy="427680"/>
+            <a:ext cx="2614680" cy="427320"/>
           </a:xfrm>
           <a:prstGeom prst="rect">
             <a:avLst/>
@@ -14104,7 +14104,7 @@
         <p:spPr>
           <a:xfrm>
             <a:off x="8857440" y="3943440"/>
-            <a:ext cx="279720" cy="363960"/>
+            <a:ext cx="279360" cy="363960"/>
           </a:xfrm>
           <a:prstGeom prst="rect">
             <a:avLst/>
@@ -14158,7 +14158,7 @@
         <p:spPr>
           <a:xfrm>
             <a:off x="9537840" y="4548960"/>
-            <a:ext cx="279720" cy="363960"/>
+            <a:ext cx="279360" cy="363960"/>
           </a:xfrm>
           <a:prstGeom prst="rect">
             <a:avLst/>
@@ -14212,7 +14212,7 @@
         <p:spPr>
           <a:xfrm>
             <a:off x="7279920" y="6101280"/>
-            <a:ext cx="280080" cy="363960"/>
+            <a:ext cx="279720" cy="363960"/>
           </a:xfrm>
           <a:prstGeom prst="rect">
             <a:avLst/>
@@ -14315,7 +14315,7 @@
         <p:spPr>
           <a:xfrm>
             <a:off x="1058760" y="6130800"/>
-            <a:ext cx="280080" cy="363960"/>
+            <a:ext cx="279720" cy="363960"/>
           </a:xfrm>
           <a:prstGeom prst="rect">
             <a:avLst/>
@@ -14399,7 +14399,7 @@
         <p:spPr>
           <a:xfrm>
             <a:off x="335520" y="764640"/>
-            <a:ext cx="10743120" cy="493920"/>
+            <a:ext cx="10742760" cy="493560"/>
           </a:xfrm>
           <a:prstGeom prst="rect">
             <a:avLst/>
@@ -14457,7 +14457,7 @@
         <p:spPr>
           <a:xfrm>
             <a:off x="2394720" y="1153800"/>
-            <a:ext cx="1465920" cy="2167200"/>
+            <a:ext cx="1465560" cy="2166840"/>
           </a:xfrm>
           <a:prstGeom prst="rect">
             <a:avLst/>
@@ -14480,7 +14480,7 @@
         <p:spPr>
           <a:xfrm>
             <a:off x="7250040" y="1153800"/>
-            <a:ext cx="1731240" cy="2167200"/>
+            <a:ext cx="1730880" cy="2166840"/>
           </a:xfrm>
           <a:prstGeom prst="rect">
             <a:avLst/>
@@ -14503,7 +14503,7 @@
         <p:spPr>
           <a:xfrm>
             <a:off x="2207880" y="4110120"/>
-            <a:ext cx="1779840" cy="1771920"/>
+            <a:ext cx="1779480" cy="1771560"/>
           </a:xfrm>
           <a:prstGeom prst="rect">
             <a:avLst/>
@@ -14522,7 +14522,7 @@
         <p:spPr>
           <a:xfrm>
             <a:off x="1330200" y="3269880"/>
-            <a:ext cx="3630600" cy="672120"/>
+            <a:ext cx="3630240" cy="671760"/>
           </a:xfrm>
           <a:prstGeom prst="rect">
             <a:avLst/>
@@ -14579,7 +14579,7 @@
         <p:spPr>
           <a:xfrm>
             <a:off x="6321600" y="3269880"/>
-            <a:ext cx="3630600" cy="672120"/>
+            <a:ext cx="3630240" cy="671760"/>
           </a:xfrm>
           <a:prstGeom prst="rect">
             <a:avLst/>
@@ -14636,7 +14636,7 @@
         <p:spPr>
           <a:xfrm>
             <a:off x="1312200" y="5920200"/>
-            <a:ext cx="3630600" cy="672120"/>
+            <a:ext cx="3630240" cy="671760"/>
           </a:xfrm>
           <a:prstGeom prst="rect">
             <a:avLst/>
@@ -14699,7 +14699,7 @@
         <p:spPr>
           <a:xfrm>
             <a:off x="1312200" y="5807160"/>
-            <a:ext cx="3630600" cy="672120"/>
+            <a:ext cx="3630240" cy="671760"/>
           </a:xfrm>
           <a:prstGeom prst="rect">
             <a:avLst/>
@@ -14756,7 +14756,7 @@
         <p:spPr>
           <a:xfrm>
             <a:off x="4860000" y="5920200"/>
-            <a:ext cx="3630600" cy="672120"/>
+            <a:ext cx="3630240" cy="671760"/>
           </a:xfrm>
           <a:prstGeom prst="rect">
             <a:avLst/>
@@ -14801,7 +14801,7 @@
         <p:spPr>
           <a:xfrm>
             <a:off x="6300000" y="5807160"/>
-            <a:ext cx="3630600" cy="672120"/>
+            <a:ext cx="3630240" cy="671760"/>
           </a:xfrm>
           <a:prstGeom prst="rect">
             <a:avLst/>
@@ -14863,7 +14863,7 @@
         <p:spPr>
           <a:xfrm>
             <a:off x="7380000" y="3960000"/>
-            <a:ext cx="1439280" cy="1923120"/>
+            <a:ext cx="1438920" cy="1922760"/>
           </a:xfrm>
           <a:prstGeom prst="rect">
             <a:avLst/>
@@ -14912,7 +14912,7 @@
         <p:spPr>
           <a:xfrm>
             <a:off x="335520" y="764640"/>
-            <a:ext cx="10743120" cy="493920"/>
+            <a:ext cx="10742760" cy="493560"/>
           </a:xfrm>
           <a:prstGeom prst="rect">
             <a:avLst/>
@@ -14966,7 +14966,7 @@
         <p:spPr>
           <a:xfrm>
             <a:off x="335520" y="1268640"/>
-            <a:ext cx="10743120" cy="5030640"/>
+            <a:ext cx="10742760" cy="5030280"/>
           </a:xfrm>
           <a:prstGeom prst="rect">
             <a:avLst/>
@@ -15351,7 +15351,7 @@
         <p:spPr>
           <a:xfrm>
             <a:off x="335520" y="764640"/>
-            <a:ext cx="10741320" cy="492120"/>
+            <a:ext cx="10740960" cy="491760"/>
           </a:xfrm>
           <a:prstGeom prst="rect">
             <a:avLst/>
@@ -15405,7 +15405,7 @@
         <p:spPr>
           <a:xfrm>
             <a:off x="335520" y="1268280"/>
-            <a:ext cx="10741320" cy="5028840"/>
+            <a:ext cx="10740960" cy="5028480"/>
           </a:xfrm>
           <a:prstGeom prst="rect">
             <a:avLst/>
@@ -15501,7 +15501,7 @@
         <p:spPr>
           <a:xfrm>
             <a:off x="6285600" y="2132640"/>
-            <a:ext cx="510840" cy="490680"/>
+            <a:ext cx="510480" cy="490320"/>
           </a:xfrm>
           <a:prstGeom prst="star5">
             <a:avLst>
@@ -15562,7 +15562,7 @@
         <p:spPr>
           <a:xfrm>
             <a:off x="4089960" y="2247480"/>
-            <a:ext cx="2279160" cy="363960"/>
+            <a:ext cx="2278800" cy="363960"/>
           </a:xfrm>
           <a:prstGeom prst="rect">
             <a:avLst/>
@@ -15666,7 +15666,7 @@
         <p:spPr>
           <a:xfrm>
             <a:off x="335520" y="764640"/>
-            <a:ext cx="10741320" cy="492120"/>
+            <a:ext cx="10740960" cy="491760"/>
           </a:xfrm>
           <a:prstGeom prst="rect">
             <a:avLst/>
@@ -15720,7 +15720,7 @@
         <p:spPr>
           <a:xfrm>
             <a:off x="335520" y="1268640"/>
-            <a:ext cx="10741320" cy="5028840"/>
+            <a:ext cx="10740960" cy="5028480"/>
           </a:xfrm>
           <a:prstGeom prst="rect">
             <a:avLst/>
@@ -16161,7 +16161,7 @@
         <p:spPr>
           <a:xfrm>
             <a:off x="335520" y="764640"/>
-            <a:ext cx="10744560" cy="495360"/>
+            <a:ext cx="10744200" cy="495000"/>
           </a:xfrm>
           <a:prstGeom prst="rect">
             <a:avLst/>
@@ -16215,7 +16215,7 @@
         <p:spPr>
           <a:xfrm>
             <a:off x="335520" y="1268640"/>
-            <a:ext cx="10744560" cy="5032080"/>
+            <a:ext cx="10744200" cy="5031720"/>
           </a:xfrm>
           <a:prstGeom prst="rect">
             <a:avLst/>
@@ -16432,7 +16432,7 @@
         <p:spPr>
           <a:xfrm>
             <a:off x="335520" y="764640"/>
-            <a:ext cx="10743120" cy="493920"/>
+            <a:ext cx="10742760" cy="493560"/>
           </a:xfrm>
           <a:prstGeom prst="rect">
             <a:avLst/>
@@ -16486,7 +16486,7 @@
         <p:spPr>
           <a:xfrm>
             <a:off x="335520" y="1268640"/>
-            <a:ext cx="10743120" cy="5030640"/>
+            <a:ext cx="10742760" cy="5030280"/>
           </a:xfrm>
           <a:prstGeom prst="rect">
             <a:avLst/>
@@ -16971,7 +16971,7 @@
         <p:spPr>
           <a:xfrm>
             <a:off x="335520" y="764640"/>
-            <a:ext cx="10741320" cy="492120"/>
+            <a:ext cx="10740960" cy="491760"/>
           </a:xfrm>
           <a:prstGeom prst="rect">
             <a:avLst/>
@@ -17025,7 +17025,7 @@
         <p:spPr>
           <a:xfrm>
             <a:off x="335520" y="1268640"/>
-            <a:ext cx="10741320" cy="5028840"/>
+            <a:ext cx="10740960" cy="5028480"/>
           </a:xfrm>
           <a:prstGeom prst="rect">
             <a:avLst/>
@@ -17419,7 +17419,7 @@
         <p:spPr>
           <a:xfrm>
             <a:off x="335520" y="1268640"/>
-            <a:ext cx="10743120" cy="5030640"/>
+            <a:ext cx="10742760" cy="5030280"/>
           </a:xfrm>
           <a:prstGeom prst="rect">
             <a:avLst/>
@@ -17479,7 +17479,7 @@
         <p:spPr>
           <a:xfrm>
             <a:off x="335520" y="764640"/>
-            <a:ext cx="10743120" cy="493920"/>
+            <a:ext cx="10742760" cy="493560"/>
           </a:xfrm>
           <a:prstGeom prst="rect">
             <a:avLst/>
@@ -17554,7 +17554,7 @@
         <p:spPr>
           <a:xfrm>
             <a:off x="542880" y="721800"/>
-            <a:ext cx="10347480" cy="488160"/>
+            <a:ext cx="10347120" cy="487800"/>
           </a:xfrm>
           <a:prstGeom prst="rect">
             <a:avLst/>
@@ -17608,7 +17608,7 @@
         <p:spPr>
           <a:xfrm>
             <a:off x="451800" y="1709280"/>
-            <a:ext cx="8214840" cy="4343040"/>
+            <a:ext cx="8214480" cy="4342680"/>
           </a:xfrm>
           <a:prstGeom prst="rect">
             <a:avLst/>
@@ -17653,7 +17653,7 @@
         <p:spPr>
           <a:xfrm>
             <a:off x="609480" y="1769400"/>
-            <a:ext cx="10577880" cy="4845960"/>
+            <a:ext cx="10577520" cy="4845600"/>
           </a:xfrm>
           <a:prstGeom prst="rect">
             <a:avLst/>
@@ -18082,7 +18082,7 @@
         <p:spPr>
           <a:xfrm>
             <a:off x="542880" y="721800"/>
-            <a:ext cx="10347480" cy="488160"/>
+            <a:ext cx="10347120" cy="487800"/>
           </a:xfrm>
           <a:prstGeom prst="rect">
             <a:avLst/>
@@ -18136,7 +18136,7 @@
         <p:spPr>
           <a:xfrm>
             <a:off x="451800" y="1709280"/>
-            <a:ext cx="8214840" cy="4343040"/>
+            <a:ext cx="8214480" cy="4342680"/>
           </a:xfrm>
           <a:prstGeom prst="rect">
             <a:avLst/>
@@ -18181,7 +18181,7 @@
         <p:spPr>
           <a:xfrm>
             <a:off x="609480" y="1769400"/>
-            <a:ext cx="10577880" cy="4845960"/>
+            <a:ext cx="10577520" cy="4845600"/>
           </a:xfrm>
           <a:prstGeom prst="rect">
             <a:avLst/>
@@ -18612,7 +18612,7 @@
         <p:spPr>
           <a:xfrm>
             <a:off x="542880" y="721800"/>
-            <a:ext cx="10347480" cy="488160"/>
+            <a:ext cx="10347120" cy="487800"/>
           </a:xfrm>
           <a:prstGeom prst="rect">
             <a:avLst/>
@@ -18666,7 +18666,7 @@
         <p:spPr>
           <a:xfrm>
             <a:off x="451800" y="1709280"/>
-            <a:ext cx="8214840" cy="4343040"/>
+            <a:ext cx="8214480" cy="4342680"/>
           </a:xfrm>
           <a:prstGeom prst="rect">
             <a:avLst/>
@@ -18711,7 +18711,7 @@
         <p:spPr>
           <a:xfrm>
             <a:off x="609480" y="1769400"/>
-            <a:ext cx="10577880" cy="4845960"/>
+            <a:ext cx="10577520" cy="4845600"/>
           </a:xfrm>
           <a:prstGeom prst="rect">
             <a:avLst/>
@@ -19142,7 +19142,7 @@
         <p:spPr>
           <a:xfrm>
             <a:off x="335520" y="764640"/>
-            <a:ext cx="10743120" cy="493920"/>
+            <a:ext cx="10742760" cy="493560"/>
           </a:xfrm>
           <a:prstGeom prst="rect">
             <a:avLst/>
@@ -19196,7 +19196,7 @@
         <p:spPr>
           <a:xfrm>
             <a:off x="335520" y="2408400"/>
-            <a:ext cx="10743120" cy="3890880"/>
+            <a:ext cx="10742760" cy="3890520"/>
           </a:xfrm>
           <a:prstGeom prst="rect">
             <a:avLst/>
@@ -19289,7 +19289,7 @@
         <p:spPr>
           <a:xfrm>
             <a:off x="335520" y="764640"/>
-            <a:ext cx="10743120" cy="493920"/>
+            <a:ext cx="10742760" cy="493560"/>
           </a:xfrm>
           <a:prstGeom prst="rect">
             <a:avLst/>
@@ -19343,7 +19343,7 @@
         <p:spPr>
           <a:xfrm>
             <a:off x="335520" y="2408400"/>
-            <a:ext cx="10743120" cy="3890880"/>
+            <a:ext cx="10742760" cy="3890520"/>
           </a:xfrm>
           <a:prstGeom prst="rect">
             <a:avLst/>
@@ -19468,7 +19468,7 @@
         <p:spPr>
           <a:xfrm>
             <a:off x="335520" y="764640"/>
-            <a:ext cx="10743120" cy="493920"/>
+            <a:ext cx="10742760" cy="493560"/>
           </a:xfrm>
           <a:prstGeom prst="rect">
             <a:avLst/>
@@ -19522,7 +19522,7 @@
         <p:spPr>
           <a:xfrm>
             <a:off x="335520" y="2408400"/>
-            <a:ext cx="10743120" cy="3890880"/>
+            <a:ext cx="10742760" cy="3890520"/>
           </a:xfrm>
           <a:prstGeom prst="rect">
             <a:avLst/>

</xml_diff>

<commit_message>
* updated ETCE / IoT slides
</commit_message>
<xml_diff>
--- a/Emerging-Technologies-for-the-Circular-Economy/ETCE-L00-Organization.pptx
+++ b/Emerging-Technologies-for-the-Circular-Economy/ETCE-L00-Organization.pptx
@@ -73,8 +73,8 @@
         </p:nvSpPr>
         <p:spPr>
           <a:xfrm>
-            <a:off x="533520" y="764280"/>
-            <a:ext cx="6704640" cy="3771360"/>
+            <a:off x="216000" y="812520"/>
+            <a:ext cx="7127280" cy="4008960"/>
           </a:xfrm>
           <a:prstGeom prst="rect">
             <a:avLst/>
@@ -91,7 +91,7 @@
           <a:p>
             <a:pPr algn="ctr"/>
             <a:r>
-              <a:rPr b="0" lang="en-US" sz="4400" spc="-1" strike="noStrike">
+              <a:rPr b="0" lang="en-GB" sz="4400" spc="-1" strike="noStrike">
                 <a:solidFill>
                   <a:srgbClr val="000000"/>
                 </a:solidFill>
@@ -99,7 +99,7 @@
               </a:rPr>
               <a:t>Click to move the slide</a:t>
             </a:r>
-            <a:endParaRPr b="0" lang="en-US" sz="4400" spc="-1" strike="noStrike">
+            <a:endParaRPr b="0" lang="en-GB" sz="4400" spc="-1" strike="noStrike">
               <a:solidFill>
                 <a:srgbClr val="000000"/>
               </a:solidFill>
@@ -120,8 +120,8 @@
         </p:nvSpPr>
         <p:spPr>
           <a:xfrm>
-            <a:off x="777240" y="4777560"/>
-            <a:ext cx="6217560" cy="4525920"/>
+            <a:off x="756000" y="5078520"/>
+            <a:ext cx="6047640" cy="4811040"/>
           </a:xfrm>
           <a:prstGeom prst="rect">
             <a:avLst/>
@@ -140,7 +140,7 @@
               <a:buNone/>
             </a:pPr>
             <a:r>
-              <a:rPr b="0" lang="en-US" sz="2000" spc="-1" strike="noStrike">
+              <a:rPr b="0" lang="en-GB" sz="2000" spc="-1" strike="noStrike">
                 <a:solidFill>
                   <a:srgbClr val="000000"/>
                 </a:solidFill>
@@ -148,7 +148,7 @@
               </a:rPr>
               <a:t>Click to edit the notes format</a:t>
             </a:r>
-            <a:endParaRPr b="0" lang="en-US" sz="2000" spc="-1" strike="noStrike">
+            <a:endParaRPr b="0" lang="en-GB" sz="2000" spc="-1" strike="noStrike">
               <a:solidFill>
                 <a:srgbClr val="000000"/>
               </a:solidFill>
@@ -170,7 +170,7 @@
         <p:spPr>
           <a:xfrm>
             <a:off x="0" y="0"/>
-            <a:ext cx="3372840" cy="502560"/>
+            <a:ext cx="3280680" cy="534240"/>
           </a:xfrm>
           <a:prstGeom prst="rect">
             <a:avLst/>
@@ -189,7 +189,7 @@
               <a:buNone/>
             </a:pPr>
             <a:r>
-              <a:rPr b="0" lang="en-US" sz="1400" spc="-1" strike="noStrike">
+              <a:rPr b="0" lang="en-GB" sz="1400" spc="-1" strike="noStrike">
                 <a:solidFill>
                   <a:srgbClr val="000000"/>
                 </a:solidFill>
@@ -197,7 +197,7 @@
               </a:rPr>
               <a:t>&lt;header&gt;</a:t>
             </a:r>
-            <a:endParaRPr b="0" lang="en-US" sz="1400" spc="-1" strike="noStrike">
+            <a:endParaRPr b="0" lang="en-GB" sz="1400" spc="-1" strike="noStrike">
               <a:solidFill>
                 <a:srgbClr val="000000"/>
               </a:solidFill>
@@ -218,8 +218,8 @@
         </p:nvSpPr>
         <p:spPr>
           <a:xfrm>
-            <a:off x="4399200" y="0"/>
-            <a:ext cx="3372840" cy="502560"/>
+            <a:off x="4278960" y="0"/>
+            <a:ext cx="3280680" cy="534240"/>
           </a:xfrm>
           <a:prstGeom prst="rect">
             <a:avLst/>
@@ -236,7 +236,7 @@
           <a:lstStyle>
             <a:lvl1pPr indent="0" algn="r">
               <a:buNone/>
-              <a:defRPr b="0" lang="en-US" sz="1400" spc="-1" strike="noStrike">
+              <a:defRPr b="0" lang="en-GB" sz="1400" spc="-1" strike="noStrike">
                 <a:solidFill>
                   <a:srgbClr val="000000"/>
                 </a:solidFill>
@@ -249,7 +249,7 @@
               <a:buNone/>
             </a:pPr>
             <a:r>
-              <a:rPr b="0" lang="en-US" sz="1400" spc="-1" strike="noStrike">
+              <a:rPr b="0" lang="en-GB" sz="1400" spc="-1" strike="noStrike">
                 <a:solidFill>
                   <a:srgbClr val="000000"/>
                 </a:solidFill>
@@ -257,7 +257,7 @@
               </a:rPr>
               <a:t>&lt;date/time&gt;</a:t>
             </a:r>
-            <a:endParaRPr b="0" lang="en-US" sz="1400" spc="-1" strike="noStrike">
+            <a:endParaRPr b="0" lang="en-GB" sz="1400" spc="-1" strike="noStrike">
               <a:solidFill>
                 <a:srgbClr val="000000"/>
               </a:solidFill>
@@ -278,8 +278,8 @@
         </p:nvSpPr>
         <p:spPr>
           <a:xfrm>
-            <a:off x="0" y="9555480"/>
-            <a:ext cx="3372840" cy="502560"/>
+            <a:off x="0" y="10157400"/>
+            <a:ext cx="3280680" cy="534240"/>
           </a:xfrm>
           <a:prstGeom prst="rect">
             <a:avLst/>
@@ -296,7 +296,7 @@
           <a:lstStyle>
             <a:lvl1pPr indent="0">
               <a:buNone/>
-              <a:defRPr b="0" lang="en-US" sz="1400" spc="-1" strike="noStrike">
+              <a:defRPr b="0" lang="en-GB" sz="1400" spc="-1" strike="noStrike">
                 <a:solidFill>
                   <a:srgbClr val="000000"/>
                 </a:solidFill>
@@ -309,7 +309,7 @@
               <a:buNone/>
             </a:pPr>
             <a:r>
-              <a:rPr b="0" lang="en-US" sz="1400" spc="-1" strike="noStrike">
+              <a:rPr b="0" lang="en-GB" sz="1400" spc="-1" strike="noStrike">
                 <a:solidFill>
                   <a:srgbClr val="000000"/>
                 </a:solidFill>
@@ -317,7 +317,7 @@
               </a:rPr>
               <a:t>&lt;footer&gt;</a:t>
             </a:r>
-            <a:endParaRPr b="0" lang="en-US" sz="1400" spc="-1" strike="noStrike">
+            <a:endParaRPr b="0" lang="en-GB" sz="1400" spc="-1" strike="noStrike">
               <a:solidFill>
                 <a:srgbClr val="000000"/>
               </a:solidFill>
@@ -338,8 +338,8 @@
         </p:nvSpPr>
         <p:spPr>
           <a:xfrm>
-            <a:off x="4399200" y="9555480"/>
-            <a:ext cx="3372840" cy="502560"/>
+            <a:off x="4278960" y="10157400"/>
+            <a:ext cx="3280680" cy="534240"/>
           </a:xfrm>
           <a:prstGeom prst="rect">
             <a:avLst/>
@@ -356,7 +356,7 @@
           <a:lstStyle>
             <a:lvl1pPr indent="0" algn="r">
               <a:buNone/>
-              <a:defRPr b="0" lang="en-US" sz="1400" spc="-1" strike="noStrike">
+              <a:defRPr b="0" lang="en-GB" sz="1400" spc="-1" strike="noStrike">
                 <a:solidFill>
                   <a:srgbClr val="000000"/>
                 </a:solidFill>
@@ -368,8 +368,8 @@
             <a:pPr indent="0" algn="r">
               <a:buNone/>
             </a:pPr>
-            <a:fld id="{5515DF6C-C1D2-412C-A522-2E1481B43B43}" type="slidenum">
-              <a:rPr b="0" lang="en-US" sz="1400" spc="-1" strike="noStrike">
+            <a:fld id="{69A9FF9A-A136-4BB7-8EB6-55646345204D}" type="slidenum">
+              <a:rPr b="0" lang="en-GB" sz="1400" spc="-1" strike="noStrike">
                 <a:solidFill>
                   <a:srgbClr val="000000"/>
                 </a:solidFill>
@@ -377,7 +377,7 @@
               </a:rPr>
               <a:t>&lt;number&gt;</a:t>
             </a:fld>
-            <a:endParaRPr b="0" lang="en-US" sz="1400" spc="-1" strike="noStrike">
+            <a:endParaRPr b="0" lang="en-GB" sz="1400" spc="-1" strike="noStrike">
               <a:solidFill>
                 <a:srgbClr val="000000"/>
               </a:solidFill>
@@ -422,7 +422,7 @@
         <p:spPr>
           <a:xfrm>
             <a:off x="533520" y="763560"/>
-            <a:ext cx="6688440" cy="3756600"/>
+            <a:ext cx="6688080" cy="3756240"/>
           </a:xfrm>
           <a:prstGeom prst="rect">
             <a:avLst/>
@@ -445,7 +445,7 @@
         <p:spPr>
           <a:xfrm>
             <a:off x="777240" y="4777560"/>
-            <a:ext cx="6202080" cy="4510440"/>
+            <a:ext cx="6201720" cy="4510080"/>
           </a:xfrm>
           <a:prstGeom prst="rect">
             <a:avLst/>
@@ -463,7 +463,7 @@
             <a:pPr marL="216000" indent="-216000">
               <a:buNone/>
             </a:pPr>
-            <a:endParaRPr b="0" lang="en-US" sz="1800" spc="-1" strike="noStrike">
+            <a:endParaRPr b="0" lang="en-GB" sz="1800" spc="-1" strike="noStrike">
               <a:solidFill>
                 <a:srgbClr val="000000"/>
               </a:solidFill>
@@ -481,7 +481,7 @@
         <p:spPr>
           <a:xfrm>
             <a:off x="4399200" y="9555480"/>
-            <a:ext cx="3357360" cy="487080"/>
+            <a:ext cx="3357000" cy="486720"/>
           </a:xfrm>
           <a:prstGeom prst="rect">
             <a:avLst/>
@@ -507,7 +507,7 @@
                 <a:spcPct val="100000"/>
               </a:lnSpc>
             </a:pPr>
-            <a:fld id="{B980A73C-BDFF-42F2-9CE7-9D79730AE647}" type="slidenum">
+            <a:fld id="{DB9C3E34-8AEA-4043-B87F-65554393B503}" type="slidenum">
               <a:rPr b="0" lang="de-DE" sz="1800" spc="-1" strike="noStrike">
                 <a:solidFill>
                   <a:srgbClr val="000000"/>
@@ -515,9 +515,9 @@
                 <a:latin typeface="+mn-lt"/>
                 <a:ea typeface="+mn-ea"/>
               </a:rPr>
-              <a:t>6</a:t>
+              <a:t>&lt;number&gt;</a:t>
             </a:fld>
-            <a:endParaRPr b="0" lang="en-US" sz="1800" spc="-1" strike="noStrike">
+            <a:endParaRPr b="0" lang="en-GB" sz="1800" spc="-1" strike="noStrike">
               <a:solidFill>
                 <a:srgbClr val="000000"/>
               </a:solidFill>
@@ -561,7 +561,7 @@
         <p:spPr>
           <a:xfrm>
             <a:off x="533520" y="763560"/>
-            <a:ext cx="6688440" cy="3756600"/>
+            <a:ext cx="6688080" cy="3756240"/>
           </a:xfrm>
           <a:prstGeom prst="rect">
             <a:avLst/>
@@ -584,7 +584,7 @@
         <p:spPr>
           <a:xfrm>
             <a:off x="777240" y="4777560"/>
-            <a:ext cx="6202080" cy="4510440"/>
+            <a:ext cx="6201720" cy="4510080"/>
           </a:xfrm>
           <a:prstGeom prst="rect">
             <a:avLst/>
@@ -602,7 +602,7 @@
             <a:pPr marL="216000" indent="-216000">
               <a:buNone/>
             </a:pPr>
-            <a:endParaRPr b="0" lang="en-US" sz="1800" spc="-1" strike="noStrike">
+            <a:endParaRPr b="0" lang="en-GB" sz="1800" spc="-1" strike="noStrike">
               <a:solidFill>
                 <a:srgbClr val="000000"/>
               </a:solidFill>
@@ -620,7 +620,7 @@
         <p:spPr>
           <a:xfrm>
             <a:off x="4399200" y="9555480"/>
-            <a:ext cx="3357360" cy="487080"/>
+            <a:ext cx="3357000" cy="486720"/>
           </a:xfrm>
           <a:prstGeom prst="rect">
             <a:avLst/>
@@ -646,7 +646,7 @@
                 <a:spcPct val="100000"/>
               </a:lnSpc>
             </a:pPr>
-            <a:fld id="{2820D57C-B739-4620-AC3C-5B677ED5611A}" type="slidenum">
+            <a:fld id="{FC44C419-F171-4E63-8411-3DFA5CD9A243}" type="slidenum">
               <a:rPr b="0" lang="de-DE" sz="1800" spc="-1" strike="noStrike">
                 <a:solidFill>
                   <a:srgbClr val="000000"/>
@@ -656,7 +656,7 @@
               </a:rPr>
               <a:t>&lt;number&gt;</a:t>
             </a:fld>
-            <a:endParaRPr b="0" lang="en-US" sz="1800" spc="-1" strike="noStrike">
+            <a:endParaRPr b="0" lang="en-GB" sz="1800" spc="-1" strike="noStrike">
               <a:solidFill>
                 <a:srgbClr val="000000"/>
               </a:solidFill>
@@ -700,7 +700,7 @@
         <p:spPr>
           <a:xfrm>
             <a:off x="533520" y="763560"/>
-            <a:ext cx="6688440" cy="3756600"/>
+            <a:ext cx="6688080" cy="3756240"/>
           </a:xfrm>
           <a:prstGeom prst="rect">
             <a:avLst/>
@@ -723,7 +723,7 @@
         <p:spPr>
           <a:xfrm>
             <a:off x="777240" y="4777560"/>
-            <a:ext cx="6202080" cy="4510440"/>
+            <a:ext cx="6201720" cy="4510080"/>
           </a:xfrm>
           <a:prstGeom prst="rect">
             <a:avLst/>
@@ -741,7 +741,7 @@
             <a:pPr marL="216000" indent="-216000">
               <a:buNone/>
             </a:pPr>
-            <a:endParaRPr b="0" lang="en-US" sz="1800" spc="-1" strike="noStrike">
+            <a:endParaRPr b="0" lang="en-GB" sz="1800" spc="-1" strike="noStrike">
               <a:solidFill>
                 <a:srgbClr val="000000"/>
               </a:solidFill>
@@ -759,7 +759,7 @@
         <p:spPr>
           <a:xfrm>
             <a:off x="4399200" y="9555480"/>
-            <a:ext cx="3357360" cy="487080"/>
+            <a:ext cx="3357000" cy="486720"/>
           </a:xfrm>
           <a:prstGeom prst="rect">
             <a:avLst/>
@@ -785,7 +785,7 @@
                 <a:spcPct val="100000"/>
               </a:lnSpc>
             </a:pPr>
-            <a:fld id="{E7F2C237-4DAE-4454-AFC1-29A456D8FA01}" type="slidenum">
+            <a:fld id="{86016AFA-B314-4E49-8BA0-9D3E27A6A5EA}" type="slidenum">
               <a:rPr b="0" lang="de-DE" sz="1800" spc="-1" strike="noStrike">
                 <a:solidFill>
                   <a:srgbClr val="000000"/>
@@ -795,7 +795,7 @@
               </a:rPr>
               <a:t>&lt;number&gt;</a:t>
             </a:fld>
-            <a:endParaRPr b="0" lang="en-US" sz="1800" spc="-1" strike="noStrike">
+            <a:endParaRPr b="0" lang="en-GB" sz="1800" spc="-1" strike="noStrike">
               <a:solidFill>
                 <a:srgbClr val="000000"/>
               </a:solidFill>
@@ -886,7 +886,7 @@
         <p:spPr>
           <a:xfrm>
             <a:off x="11444760" y="0"/>
-            <a:ext cx="736920" cy="6845760"/>
+            <a:ext cx="736560" cy="6845400"/>
           </a:xfrm>
           <a:prstGeom prst="rect">
             <a:avLst/>
@@ -935,7 +935,7 @@
         <p:spPr>
           <a:xfrm>
             <a:off x="11438640" y="6453360"/>
-            <a:ext cx="753840" cy="363960"/>
+            <a:ext cx="753480" cy="363960"/>
           </a:xfrm>
           <a:prstGeom prst="rect">
             <a:avLst/>
@@ -961,7 +961,7 @@
                 <a:spcPct val="100000"/>
               </a:lnSpc>
             </a:pPr>
-            <a:fld id="{DF13DA0B-890C-466F-8174-A5552D845B02}" type="slidenum">
+            <a:fld id="{EB265EDC-B736-460B-A5A3-83CFE1E0D00E}" type="slidenum">
               <a:rPr b="0" lang="en-US" sz="1800" spc="-1" strike="noStrike">
                 <a:solidFill>
                   <a:srgbClr val="808080"/>
@@ -971,7 +971,7 @@
               </a:rPr>
               <a:t>&lt;number&gt;</a:t>
             </a:fld>
-            <a:endParaRPr b="0" lang="en-US" sz="1800" spc="-1" strike="noStrike">
+            <a:endParaRPr b="0" lang="en-GB" sz="1800" spc="-1" strike="noStrike">
               <a:solidFill>
                 <a:srgbClr val="000000"/>
               </a:solidFill>
@@ -989,7 +989,7 @@
         <p:spPr>
           <a:xfrm>
             <a:off x="912240" y="1268280"/>
-            <a:ext cx="9203760" cy="357120"/>
+            <a:ext cx="9203400" cy="356760"/>
           </a:xfrm>
           <a:prstGeom prst="rect">
             <a:avLst/>
@@ -1038,7 +1038,7 @@
         <p:spPr>
           <a:xfrm>
             <a:off x="0" y="0"/>
-            <a:ext cx="3047760" cy="557640"/>
+            <a:ext cx="3047400" cy="557280"/>
           </a:xfrm>
           <a:prstGeom prst="rect">
             <a:avLst/>
@@ -1061,7 +1061,7 @@
         <p:spPr>
           <a:xfrm>
             <a:off x="7430400" y="134640"/>
-            <a:ext cx="3693600" cy="509760"/>
+            <a:ext cx="3693240" cy="509400"/>
           </a:xfrm>
           <a:prstGeom prst="rect">
             <a:avLst/>
@@ -1080,7 +1080,7 @@
         <p:spPr>
           <a:xfrm>
             <a:off x="912240" y="1268280"/>
-            <a:ext cx="9203760" cy="357120"/>
+            <a:ext cx="9203400" cy="356760"/>
           </a:xfrm>
           <a:prstGeom prst="rect">
             <a:avLst/>
@@ -1125,7 +1125,7 @@
         <p:spPr>
           <a:xfrm>
             <a:off x="11444760" y="0"/>
-            <a:ext cx="736920" cy="6845760"/>
+            <a:ext cx="736560" cy="6845400"/>
           </a:xfrm>
           <a:prstGeom prst="rect">
             <a:avLst/>
@@ -1174,7 +1174,7 @@
         <p:spPr>
           <a:xfrm>
             <a:off x="0" y="6642720"/>
-            <a:ext cx="12179880" cy="211320"/>
+            <a:ext cx="12179520" cy="211320"/>
           </a:xfrm>
           <a:prstGeom prst="rect">
             <a:avLst/>
@@ -1210,7 +1210,7 @@
               </a:rPr>
               <a:t>Emerging Technologies for the Circular Economy – TU Clausthal</a:t>
             </a:r>
-            <a:endParaRPr b="0" lang="en-US" sz="800" spc="-1" strike="noStrike">
+            <a:endParaRPr b="0" lang="en-GB" sz="800" spc="-1" strike="noStrike">
               <a:solidFill>
                 <a:srgbClr val="000000"/>
               </a:solidFill>
@@ -1251,7 +1251,7 @@
               <a:buNone/>
             </a:pPr>
             <a:r>
-              <a:rPr b="0" lang="en-US" sz="4400" spc="-1" strike="noStrike">
+              <a:rPr b="0" lang="en-GB" sz="4400" spc="-1" strike="noStrike">
                 <a:solidFill>
                   <a:srgbClr val="000000"/>
                 </a:solidFill>
@@ -1259,7 +1259,7 @@
               </a:rPr>
               <a:t>Click to edit the title text format</a:t>
             </a:r>
-            <a:endParaRPr b="0" lang="en-US" sz="4400" spc="-1" strike="noStrike">
+            <a:endParaRPr b="0" lang="en-GB" sz="4400" spc="-1" strike="noStrike">
               <a:solidFill>
                 <a:srgbClr val="000000"/>
               </a:solidFill>
@@ -1308,7 +1308,7 @@
               <a:buChar char=""/>
             </a:pPr>
             <a:r>
-              <a:rPr b="0" lang="en-US" sz="3200" spc="-1" strike="noStrike">
+              <a:rPr b="0" lang="en-GB" sz="3200" spc="-1" strike="noStrike">
                 <a:solidFill>
                   <a:srgbClr val="000000"/>
                 </a:solidFill>
@@ -1316,7 +1316,7 @@
               </a:rPr>
               <a:t>Click to edit the outline text format</a:t>
             </a:r>
-            <a:endParaRPr b="0" lang="en-US" sz="3200" spc="-1" strike="noStrike">
+            <a:endParaRPr b="0" lang="en-GB" sz="3200" spc="-1" strike="noStrike">
               <a:solidFill>
                 <a:srgbClr val="000000"/>
               </a:solidFill>
@@ -1336,7 +1336,7 @@
               <a:buChar char=""/>
             </a:pPr>
             <a:r>
-              <a:rPr b="0" lang="en-US" sz="2800" spc="-1" strike="noStrike">
+              <a:rPr b="0" lang="en-GB" sz="2800" spc="-1" strike="noStrike">
                 <a:solidFill>
                   <a:srgbClr val="000000"/>
                 </a:solidFill>
@@ -1344,7 +1344,7 @@
               </a:rPr>
               <a:t>Second Outline Level</a:t>
             </a:r>
-            <a:endParaRPr b="0" lang="en-US" sz="2800" spc="-1" strike="noStrike">
+            <a:endParaRPr b="0" lang="en-GB" sz="2800" spc="-1" strike="noStrike">
               <a:solidFill>
                 <a:srgbClr val="000000"/>
               </a:solidFill>
@@ -1364,7 +1364,7 @@
               <a:buChar char=""/>
             </a:pPr>
             <a:r>
-              <a:rPr b="0" lang="en-US" sz="2400" spc="-1" strike="noStrike">
+              <a:rPr b="0" lang="en-GB" sz="2400" spc="-1" strike="noStrike">
                 <a:solidFill>
                   <a:srgbClr val="000000"/>
                 </a:solidFill>
@@ -1372,7 +1372,7 @@
               </a:rPr>
               <a:t>Third Outline Level</a:t>
             </a:r>
-            <a:endParaRPr b="0" lang="en-US" sz="2400" spc="-1" strike="noStrike">
+            <a:endParaRPr b="0" lang="en-GB" sz="2400" spc="-1" strike="noStrike">
               <a:solidFill>
                 <a:srgbClr val="000000"/>
               </a:solidFill>
@@ -1392,7 +1392,7 @@
               <a:buChar char=""/>
             </a:pPr>
             <a:r>
-              <a:rPr b="0" lang="en-US" sz="2000" spc="-1" strike="noStrike">
+              <a:rPr b="0" lang="en-GB" sz="2000" spc="-1" strike="noStrike">
                 <a:solidFill>
                   <a:srgbClr val="000000"/>
                 </a:solidFill>
@@ -1400,7 +1400,7 @@
               </a:rPr>
               <a:t>Fourth Outline Level</a:t>
             </a:r>
-            <a:endParaRPr b="0" lang="en-US" sz="2000" spc="-1" strike="noStrike">
+            <a:endParaRPr b="0" lang="en-GB" sz="2000" spc="-1" strike="noStrike">
               <a:solidFill>
                 <a:srgbClr val="000000"/>
               </a:solidFill>
@@ -1420,7 +1420,7 @@
               <a:buChar char=""/>
             </a:pPr>
             <a:r>
-              <a:rPr b="0" lang="en-US" sz="2000" spc="-1" strike="noStrike">
+              <a:rPr b="0" lang="en-GB" sz="2000" spc="-1" strike="noStrike">
                 <a:solidFill>
                   <a:srgbClr val="000000"/>
                 </a:solidFill>
@@ -1428,7 +1428,7 @@
               </a:rPr>
               <a:t>Fifth Outline Level</a:t>
             </a:r>
-            <a:endParaRPr b="0" lang="en-US" sz="2000" spc="-1" strike="noStrike">
+            <a:endParaRPr b="0" lang="en-GB" sz="2000" spc="-1" strike="noStrike">
               <a:solidFill>
                 <a:srgbClr val="000000"/>
               </a:solidFill>
@@ -1448,7 +1448,7 @@
               <a:buChar char=""/>
             </a:pPr>
             <a:r>
-              <a:rPr b="0" lang="en-US" sz="2000" spc="-1" strike="noStrike">
+              <a:rPr b="0" lang="en-GB" sz="2000" spc="-1" strike="noStrike">
                 <a:solidFill>
                   <a:srgbClr val="000000"/>
                 </a:solidFill>
@@ -1456,7 +1456,7 @@
               </a:rPr>
               <a:t>Sixth Outline Level</a:t>
             </a:r>
-            <a:endParaRPr b="0" lang="en-US" sz="2000" spc="-1" strike="noStrike">
+            <a:endParaRPr b="0" lang="en-GB" sz="2000" spc="-1" strike="noStrike">
               <a:solidFill>
                 <a:srgbClr val="000000"/>
               </a:solidFill>
@@ -1476,7 +1476,7 @@
               <a:buChar char=""/>
             </a:pPr>
             <a:r>
-              <a:rPr b="0" lang="en-US" sz="2000" spc="-1" strike="noStrike">
+              <a:rPr b="0" lang="en-GB" sz="2000" spc="-1" strike="noStrike">
                 <a:solidFill>
                   <a:srgbClr val="000000"/>
                 </a:solidFill>
@@ -1484,7 +1484,7 @@
               </a:rPr>
               <a:t>Seventh Outline Level</a:t>
             </a:r>
-            <a:endParaRPr b="0" lang="en-US" sz="2000" spc="-1" strike="noStrike">
+            <a:endParaRPr b="0" lang="en-GB" sz="2000" spc="-1" strike="noStrike">
               <a:solidFill>
                 <a:srgbClr val="000000"/>
               </a:solidFill>
@@ -1535,7 +1535,7 @@
         <p:spPr>
           <a:xfrm>
             <a:off x="11444760" y="0"/>
-            <a:ext cx="736920" cy="6845760"/>
+            <a:ext cx="736560" cy="6845400"/>
           </a:xfrm>
           <a:prstGeom prst="rect">
             <a:avLst/>
@@ -1584,7 +1584,7 @@
         <p:spPr>
           <a:xfrm>
             <a:off x="11438640" y="6453360"/>
-            <a:ext cx="753840" cy="363960"/>
+            <a:ext cx="753480" cy="363960"/>
           </a:xfrm>
           <a:prstGeom prst="rect">
             <a:avLst/>
@@ -1610,7 +1610,7 @@
                 <a:spcPct val="100000"/>
               </a:lnSpc>
             </a:pPr>
-            <a:fld id="{54D707E9-9CDB-4BE5-914F-7211D0814DA0}" type="slidenum">
+            <a:fld id="{E9585061-39A4-41C9-A95B-7C38CDA9E461}" type="slidenum">
               <a:rPr b="0" lang="en-US" sz="1800" spc="-1" strike="noStrike">
                 <a:solidFill>
                   <a:srgbClr val="808080"/>
@@ -1620,7 +1620,7 @@
               </a:rPr>
               <a:t>&lt;number&gt;</a:t>
             </a:fld>
-            <a:endParaRPr b="0" lang="en-US" sz="1800" spc="-1" strike="noStrike">
+            <a:endParaRPr b="0" lang="en-GB" sz="1800" spc="-1" strike="noStrike">
               <a:solidFill>
                 <a:srgbClr val="000000"/>
               </a:solidFill>
@@ -1638,7 +1638,7 @@
         <p:spPr>
           <a:xfrm>
             <a:off x="912240" y="1268280"/>
-            <a:ext cx="9203760" cy="357120"/>
+            <a:ext cx="9203400" cy="356760"/>
           </a:xfrm>
           <a:prstGeom prst="rect">
             <a:avLst/>
@@ -1687,7 +1687,7 @@
         <p:spPr>
           <a:xfrm>
             <a:off x="0" y="0"/>
-            <a:ext cx="3047760" cy="557640"/>
+            <a:ext cx="3047400" cy="557280"/>
           </a:xfrm>
           <a:prstGeom prst="rect">
             <a:avLst/>
@@ -1710,7 +1710,7 @@
         <p:spPr>
           <a:xfrm>
             <a:off x="7430400" y="134640"/>
-            <a:ext cx="3693600" cy="509760"/>
+            <a:ext cx="3693240" cy="509400"/>
           </a:xfrm>
           <a:prstGeom prst="rect">
             <a:avLst/>
@@ -1729,7 +1729,7 @@
         <p:spPr>
           <a:xfrm>
             <a:off x="11444760" y="0"/>
-            <a:ext cx="736920" cy="6845760"/>
+            <a:ext cx="736560" cy="6845400"/>
           </a:xfrm>
           <a:prstGeom prst="rect">
             <a:avLst/>
@@ -1778,7 +1778,7 @@
         <p:spPr>
           <a:xfrm>
             <a:off x="11438640" y="6453360"/>
-            <a:ext cx="753840" cy="363960"/>
+            <a:ext cx="753480" cy="363960"/>
           </a:xfrm>
           <a:prstGeom prst="rect">
             <a:avLst/>
@@ -1804,7 +1804,7 @@
                 <a:spcPct val="100000"/>
               </a:lnSpc>
             </a:pPr>
-            <a:fld id="{12101256-704F-471B-AB68-4606FDB0847B}" type="slidenum">
+            <a:fld id="{86625505-A87D-46EE-BEE4-8950F55FF49F}" type="slidenum">
               <a:rPr b="0" lang="en-US" sz="1800" spc="-1" strike="noStrike">
                 <a:solidFill>
                   <a:srgbClr val="808080"/>
@@ -1814,7 +1814,7 @@
               </a:rPr>
               <a:t>&lt;number&gt;</a:t>
             </a:fld>
-            <a:endParaRPr b="0" lang="en-US" sz="1800" spc="-1" strike="noStrike">
+            <a:endParaRPr b="0" lang="en-GB" sz="1800" spc="-1" strike="noStrike">
               <a:solidFill>
                 <a:srgbClr val="000000"/>
               </a:solidFill>
@@ -1832,7 +1832,7 @@
         <p:spPr>
           <a:xfrm>
             <a:off x="0" y="6642720"/>
-            <a:ext cx="12179880" cy="211320"/>
+            <a:ext cx="12179520" cy="211320"/>
           </a:xfrm>
           <a:prstGeom prst="rect">
             <a:avLst/>
@@ -1868,7 +1868,7 @@
               </a:rPr>
               <a:t>Emerging Technologies for the Circular Economy – TU Clausthal</a:t>
             </a:r>
-            <a:endParaRPr b="0" lang="en-US" sz="800" spc="-1" strike="noStrike">
+            <a:endParaRPr b="0" lang="en-GB" sz="800" spc="-1" strike="noStrike">
               <a:solidFill>
                 <a:srgbClr val="000000"/>
               </a:solidFill>
@@ -1909,7 +1909,7 @@
               <a:buNone/>
             </a:pPr>
             <a:r>
-              <a:rPr b="0" lang="en-US" sz="4400" spc="-1" strike="noStrike">
+              <a:rPr b="0" lang="en-GB" sz="4400" spc="-1" strike="noStrike">
                 <a:solidFill>
                   <a:srgbClr val="000000"/>
                 </a:solidFill>
@@ -1917,7 +1917,7 @@
               </a:rPr>
               <a:t>Click to edit the title text format</a:t>
             </a:r>
-            <a:endParaRPr b="0" lang="en-US" sz="4400" spc="-1" strike="noStrike">
+            <a:endParaRPr b="0" lang="en-GB" sz="4400" spc="-1" strike="noStrike">
               <a:solidFill>
                 <a:srgbClr val="000000"/>
               </a:solidFill>
@@ -1966,7 +1966,7 @@
               <a:buChar char=""/>
             </a:pPr>
             <a:r>
-              <a:rPr b="0" lang="en-US" sz="3200" spc="-1" strike="noStrike">
+              <a:rPr b="0" lang="en-GB" sz="3200" spc="-1" strike="noStrike">
                 <a:solidFill>
                   <a:srgbClr val="000000"/>
                 </a:solidFill>
@@ -1974,7 +1974,7 @@
               </a:rPr>
               <a:t>Click to edit the outline text format</a:t>
             </a:r>
-            <a:endParaRPr b="0" lang="en-US" sz="3200" spc="-1" strike="noStrike">
+            <a:endParaRPr b="0" lang="en-GB" sz="3200" spc="-1" strike="noStrike">
               <a:solidFill>
                 <a:srgbClr val="000000"/>
               </a:solidFill>
@@ -1994,7 +1994,7 @@
               <a:buChar char=""/>
             </a:pPr>
             <a:r>
-              <a:rPr b="0" lang="en-US" sz="2800" spc="-1" strike="noStrike">
+              <a:rPr b="0" lang="en-GB" sz="2800" spc="-1" strike="noStrike">
                 <a:solidFill>
                   <a:srgbClr val="000000"/>
                 </a:solidFill>
@@ -2002,7 +2002,7 @@
               </a:rPr>
               <a:t>Second Outline Level</a:t>
             </a:r>
-            <a:endParaRPr b="0" lang="en-US" sz="2800" spc="-1" strike="noStrike">
+            <a:endParaRPr b="0" lang="en-GB" sz="2800" spc="-1" strike="noStrike">
               <a:solidFill>
                 <a:srgbClr val="000000"/>
               </a:solidFill>
@@ -2022,7 +2022,7 @@
               <a:buChar char=""/>
             </a:pPr>
             <a:r>
-              <a:rPr b="0" lang="en-US" sz="2400" spc="-1" strike="noStrike">
+              <a:rPr b="0" lang="en-GB" sz="2400" spc="-1" strike="noStrike">
                 <a:solidFill>
                   <a:srgbClr val="000000"/>
                 </a:solidFill>
@@ -2030,7 +2030,7 @@
               </a:rPr>
               <a:t>Third Outline Level</a:t>
             </a:r>
-            <a:endParaRPr b="0" lang="en-US" sz="2400" spc="-1" strike="noStrike">
+            <a:endParaRPr b="0" lang="en-GB" sz="2400" spc="-1" strike="noStrike">
               <a:solidFill>
                 <a:srgbClr val="000000"/>
               </a:solidFill>
@@ -2050,7 +2050,7 @@
               <a:buChar char=""/>
             </a:pPr>
             <a:r>
-              <a:rPr b="0" lang="en-US" sz="2000" spc="-1" strike="noStrike">
+              <a:rPr b="0" lang="en-GB" sz="2000" spc="-1" strike="noStrike">
                 <a:solidFill>
                   <a:srgbClr val="000000"/>
                 </a:solidFill>
@@ -2058,7 +2058,7 @@
               </a:rPr>
               <a:t>Fourth Outline Level</a:t>
             </a:r>
-            <a:endParaRPr b="0" lang="en-US" sz="2000" spc="-1" strike="noStrike">
+            <a:endParaRPr b="0" lang="en-GB" sz="2000" spc="-1" strike="noStrike">
               <a:solidFill>
                 <a:srgbClr val="000000"/>
               </a:solidFill>
@@ -2078,7 +2078,7 @@
               <a:buChar char=""/>
             </a:pPr>
             <a:r>
-              <a:rPr b="0" lang="en-US" sz="2000" spc="-1" strike="noStrike">
+              <a:rPr b="0" lang="en-GB" sz="2000" spc="-1" strike="noStrike">
                 <a:solidFill>
                   <a:srgbClr val="000000"/>
                 </a:solidFill>
@@ -2086,7 +2086,7 @@
               </a:rPr>
               <a:t>Fifth Outline Level</a:t>
             </a:r>
-            <a:endParaRPr b="0" lang="en-US" sz="2000" spc="-1" strike="noStrike">
+            <a:endParaRPr b="0" lang="en-GB" sz="2000" spc="-1" strike="noStrike">
               <a:solidFill>
                 <a:srgbClr val="000000"/>
               </a:solidFill>
@@ -2106,7 +2106,7 @@
               <a:buChar char=""/>
             </a:pPr>
             <a:r>
-              <a:rPr b="0" lang="en-US" sz="2000" spc="-1" strike="noStrike">
+              <a:rPr b="0" lang="en-GB" sz="2000" spc="-1" strike="noStrike">
                 <a:solidFill>
                   <a:srgbClr val="000000"/>
                 </a:solidFill>
@@ -2114,7 +2114,7 @@
               </a:rPr>
               <a:t>Sixth Outline Level</a:t>
             </a:r>
-            <a:endParaRPr b="0" lang="en-US" sz="2000" spc="-1" strike="noStrike">
+            <a:endParaRPr b="0" lang="en-GB" sz="2000" spc="-1" strike="noStrike">
               <a:solidFill>
                 <a:srgbClr val="000000"/>
               </a:solidFill>
@@ -2134,7 +2134,7 @@
               <a:buChar char=""/>
             </a:pPr>
             <a:r>
-              <a:rPr b="0" lang="en-US" sz="2000" spc="-1" strike="noStrike">
+              <a:rPr b="0" lang="en-GB" sz="2000" spc="-1" strike="noStrike">
                 <a:solidFill>
                   <a:srgbClr val="000000"/>
                 </a:solidFill>
@@ -2142,7 +2142,7 @@
               </a:rPr>
               <a:t>Seventh Outline Level</a:t>
             </a:r>
-            <a:endParaRPr b="0" lang="en-US" sz="2000" spc="-1" strike="noStrike">
+            <a:endParaRPr b="0" lang="en-GB" sz="2000" spc="-1" strike="noStrike">
               <a:solidFill>
                 <a:srgbClr val="000000"/>
               </a:solidFill>
@@ -2186,7 +2186,7 @@
         <p:spPr>
           <a:xfrm>
             <a:off x="527400" y="1412640"/>
-            <a:ext cx="10356840" cy="1143360"/>
+            <a:ext cx="10356480" cy="1143000"/>
           </a:xfrm>
           <a:prstGeom prst="rect">
             <a:avLst/>
@@ -2222,7 +2222,7 @@
               </a:rPr>
               <a:t>Emerging Technologies for the Circular Economy</a:t>
             </a:r>
-            <a:endParaRPr b="0" lang="en-US" sz="3200" spc="-1" strike="noStrike">
+            <a:endParaRPr b="0" lang="en-GB" sz="3200" spc="-1" strike="noStrike">
               <a:solidFill>
                 <a:srgbClr val="000000"/>
               </a:solidFill>
@@ -2240,7 +2240,7 @@
         <p:spPr>
           <a:xfrm>
             <a:off x="527400" y="2852640"/>
-            <a:ext cx="10356840" cy="2364120"/>
+            <a:ext cx="10356480" cy="2363760"/>
           </a:xfrm>
           <a:prstGeom prst="rect">
             <a:avLst/>
@@ -2272,7 +2272,7 @@
                 <a:tab algn="l" pos="0"/>
               </a:tabLst>
             </a:pPr>
-            <a:endParaRPr b="0" lang="en-US" sz="2400" spc="-1" strike="noStrike">
+            <a:endParaRPr b="0" lang="en-GB" sz="2400" spc="-1" strike="noStrike">
               <a:solidFill>
                 <a:srgbClr val="000000"/>
               </a:solidFill>
@@ -2301,7 +2301,7 @@
               </a:rPr>
               <a:t>Lecture 0: Organization</a:t>
             </a:r>
-            <a:endParaRPr b="0" lang="en-US" sz="2400" spc="-1" strike="noStrike">
+            <a:endParaRPr b="0" lang="en-GB" sz="2400" spc="-1" strike="noStrike">
               <a:solidFill>
                 <a:srgbClr val="000000"/>
               </a:solidFill>
@@ -2320,7 +2320,7 @@
                 <a:tab algn="l" pos="0"/>
               </a:tabLst>
             </a:pPr>
-            <a:endParaRPr b="0" lang="en-US" sz="2400" spc="-1" strike="noStrike">
+            <a:endParaRPr b="0" lang="en-GB" sz="2400" spc="-1" strike="noStrike">
               <a:solidFill>
                 <a:srgbClr val="000000"/>
               </a:solidFill>
@@ -2339,7 +2339,7 @@
                 <a:tab algn="l" pos="0"/>
               </a:tabLst>
             </a:pPr>
-            <a:endParaRPr b="0" lang="en-US" sz="2400" spc="-1" strike="noStrike">
+            <a:endParaRPr b="0" lang="en-GB" sz="2400" spc="-1" strike="noStrike">
               <a:solidFill>
                 <a:srgbClr val="000000"/>
               </a:solidFill>
@@ -2368,7 +2368,7 @@
               </a:rPr>
               <a:t>Prof. Dr. Benjamin Leiding</a:t>
             </a:r>
-            <a:endParaRPr b="0" lang="en-US" sz="1600" spc="-1" strike="noStrike">
+            <a:endParaRPr b="0" lang="en-GB" sz="1600" spc="-1" strike="noStrike">
               <a:solidFill>
                 <a:srgbClr val="000000"/>
               </a:solidFill>
@@ -2397,7 +2397,7 @@
               </a:rPr>
               <a:t>M.Sc. Anant Sujatanagarjuna</a:t>
             </a:r>
-            <a:endParaRPr b="0" lang="en-US" sz="1600" spc="-1" strike="noStrike">
+            <a:endParaRPr b="0" lang="en-GB" sz="1600" spc="-1" strike="noStrike">
               <a:solidFill>
                 <a:srgbClr val="000000"/>
               </a:solidFill>
@@ -2426,7 +2426,7 @@
               </a:rPr>
               <a:t>M.Sc. Shohreh Kia</a:t>
             </a:r>
-            <a:endParaRPr b="0" lang="en-US" sz="1600" spc="-1" strike="noStrike">
+            <a:endParaRPr b="0" lang="en-GB" sz="1600" spc="-1" strike="noStrike">
               <a:solidFill>
                 <a:srgbClr val="000000"/>
               </a:solidFill>
@@ -2474,7 +2474,7 @@
         <p:spPr>
           <a:xfrm>
             <a:off x="335520" y="764640"/>
-            <a:ext cx="10740960" cy="491760"/>
+            <a:ext cx="10740600" cy="491400"/>
           </a:xfrm>
           <a:prstGeom prst="rect">
             <a:avLst/>
@@ -2510,7 +2510,7 @@
               </a:rPr>
               <a:t>Learning Outcome</a:t>
             </a:r>
-            <a:endParaRPr b="0" lang="en-US" sz="2400" spc="-1" strike="noStrike">
+            <a:endParaRPr b="0" lang="en-GB" sz="2400" spc="-1" strike="noStrike">
               <a:solidFill>
                 <a:srgbClr val="000000"/>
               </a:solidFill>
@@ -2523,7 +2523,7 @@
                 <a:spcPct val="100000"/>
               </a:lnSpc>
             </a:pPr>
-            <a:endParaRPr b="0" lang="en-US" sz="2400" spc="-1" strike="noStrike">
+            <a:endParaRPr b="0" lang="en-GB" sz="2400" spc="-1" strike="noStrike">
               <a:solidFill>
                 <a:srgbClr val="000000"/>
               </a:solidFill>
@@ -2541,7 +2541,7 @@
         <p:spPr>
           <a:xfrm>
             <a:off x="335520" y="2408400"/>
-            <a:ext cx="10740960" cy="3888720"/>
+            <a:ext cx="10740600" cy="3888360"/>
           </a:xfrm>
           <a:prstGeom prst="rect">
             <a:avLst/>
@@ -2586,7 +2586,7 @@
               </a:rPr>
               <a:t>Basic understanding of the concept of the Linear Economy, the Circular Economy, the Performance Economy and sustainability</a:t>
             </a:r>
-            <a:endParaRPr b="0" lang="en-US" sz="1800" spc="-1" strike="noStrike">
+            <a:endParaRPr b="0" lang="en-GB" sz="1800" spc="-1" strike="noStrike">
               <a:solidFill>
                 <a:srgbClr val="000000"/>
               </a:solidFill>
@@ -2618,7 +2618,7 @@
               </a:rPr>
               <a:t>Basic understanding of new technologies in the field of decentralized and smart systems</a:t>
             </a:r>
-            <a:endParaRPr b="0" lang="en-US" sz="1800" spc="-1" strike="noStrike">
+            <a:endParaRPr b="0" lang="en-GB" sz="1800" spc="-1" strike="noStrike">
               <a:solidFill>
                 <a:srgbClr val="000000"/>
               </a:solidFill>
@@ -2650,7 +2650,7 @@
               </a:rPr>
               <a:t>Understanding and overview of the Internet of Things and related concepts</a:t>
             </a:r>
-            <a:endParaRPr b="0" lang="en-US" sz="1800" spc="-1" strike="noStrike">
+            <a:endParaRPr b="0" lang="en-GB" sz="1800" spc="-1" strike="noStrike">
               <a:solidFill>
                 <a:srgbClr val="000000"/>
               </a:solidFill>
@@ -2682,7 +2682,7 @@
               </a:rPr>
               <a:t>Ability to design decentralized smart systems and applications in the context of connected sensor systems</a:t>
             </a:r>
-            <a:endParaRPr b="0" lang="en-US" sz="1800" spc="-1" strike="noStrike">
+            <a:endParaRPr b="0" lang="en-GB" sz="1800" spc="-1" strike="noStrike">
               <a:solidFill>
                 <a:srgbClr val="000000"/>
               </a:solidFill>
@@ -2730,7 +2730,7 @@
         <p:spPr>
           <a:xfrm>
             <a:off x="335520" y="764640"/>
-            <a:ext cx="10740960" cy="491760"/>
+            <a:ext cx="10740600" cy="491400"/>
           </a:xfrm>
           <a:prstGeom prst="rect">
             <a:avLst/>
@@ -2766,7 +2766,7 @@
               </a:rPr>
               <a:t>Learning Outcome</a:t>
             </a:r>
-            <a:endParaRPr b="0" lang="en-US" sz="2400" spc="-1" strike="noStrike">
+            <a:endParaRPr b="0" lang="en-GB" sz="2400" spc="-1" strike="noStrike">
               <a:solidFill>
                 <a:srgbClr val="000000"/>
               </a:solidFill>
@@ -2784,7 +2784,7 @@
         <p:spPr>
           <a:xfrm>
             <a:off x="335520" y="2408400"/>
-            <a:ext cx="10740960" cy="3888720"/>
+            <a:ext cx="10740600" cy="3888360"/>
           </a:xfrm>
           <a:prstGeom prst="rect">
             <a:avLst/>
@@ -2829,7 +2829,7 @@
               </a:rPr>
               <a:t>Basic understanding of the concept of the Linear Economy, the Circular Economy, the Performance Economy and sustainability</a:t>
             </a:r>
-            <a:endParaRPr b="0" lang="en-US" sz="1800" spc="-1" strike="noStrike">
+            <a:endParaRPr b="0" lang="en-GB" sz="1800" spc="-1" strike="noStrike">
               <a:solidFill>
                 <a:srgbClr val="000000"/>
               </a:solidFill>
@@ -2861,7 +2861,7 @@
               </a:rPr>
               <a:t>Basic understanding of new technologies in the field of decentralized and smart systems</a:t>
             </a:r>
-            <a:endParaRPr b="0" lang="en-US" sz="1800" spc="-1" strike="noStrike">
+            <a:endParaRPr b="0" lang="en-GB" sz="1800" spc="-1" strike="noStrike">
               <a:solidFill>
                 <a:srgbClr val="000000"/>
               </a:solidFill>
@@ -2893,7 +2893,7 @@
               </a:rPr>
               <a:t>Understanding and overview of the Internet of Things and related concepts</a:t>
             </a:r>
-            <a:endParaRPr b="0" lang="en-US" sz="1800" spc="-1" strike="noStrike">
+            <a:endParaRPr b="0" lang="en-GB" sz="1800" spc="-1" strike="noStrike">
               <a:solidFill>
                 <a:srgbClr val="000000"/>
               </a:solidFill>
@@ -2925,7 +2925,7 @@
               </a:rPr>
               <a:t>Ability to design decentralized smart systems and applications in the context of connected sensor systems</a:t>
             </a:r>
-            <a:endParaRPr b="0" lang="en-US" sz="1800" spc="-1" strike="noStrike">
+            <a:endParaRPr b="0" lang="en-GB" sz="1800" spc="-1" strike="noStrike">
               <a:solidFill>
                 <a:srgbClr val="000000"/>
               </a:solidFill>
@@ -2957,7 +2957,7 @@
               </a:rPr>
               <a:t>Knowledge of the design and consideration of privacy-preserving data processing procedures for smart and decentralized applications</a:t>
             </a:r>
-            <a:endParaRPr b="0" lang="en-US" sz="1800" spc="-1" strike="noStrike">
+            <a:endParaRPr b="0" lang="en-GB" sz="1800" spc="-1" strike="noStrike">
               <a:solidFill>
                 <a:srgbClr val="000000"/>
               </a:solidFill>
@@ -3005,7 +3005,7 @@
         <p:spPr>
           <a:xfrm>
             <a:off x="335520" y="764640"/>
-            <a:ext cx="10740960" cy="491760"/>
+            <a:ext cx="10740600" cy="491400"/>
           </a:xfrm>
           <a:prstGeom prst="rect">
             <a:avLst/>
@@ -3041,7 +3041,7 @@
               </a:rPr>
               <a:t>Learning Outcome</a:t>
             </a:r>
-            <a:endParaRPr b="0" lang="en-US" sz="2400" spc="-1" strike="noStrike">
+            <a:endParaRPr b="0" lang="en-GB" sz="2400" spc="-1" strike="noStrike">
               <a:solidFill>
                 <a:srgbClr val="000000"/>
               </a:solidFill>
@@ -3054,7 +3054,7 @@
                 <a:spcPct val="100000"/>
               </a:lnSpc>
             </a:pPr>
-            <a:endParaRPr b="0" lang="en-US" sz="2400" spc="-1" strike="noStrike">
+            <a:endParaRPr b="0" lang="en-GB" sz="2400" spc="-1" strike="noStrike">
               <a:solidFill>
                 <a:srgbClr val="000000"/>
               </a:solidFill>
@@ -3072,7 +3072,7 @@
         <p:spPr>
           <a:xfrm>
             <a:off x="335520" y="2408400"/>
-            <a:ext cx="10740960" cy="3888720"/>
+            <a:ext cx="10740600" cy="3888360"/>
           </a:xfrm>
           <a:prstGeom prst="rect">
             <a:avLst/>
@@ -3117,7 +3117,7 @@
               </a:rPr>
               <a:t>Basic understanding of the concept of the Linear Economy, the Circular Economy, the Performance Economy and sustainability</a:t>
             </a:r>
-            <a:endParaRPr b="0" lang="en-US" sz="1800" spc="-1" strike="noStrike">
+            <a:endParaRPr b="0" lang="en-GB" sz="1800" spc="-1" strike="noStrike">
               <a:solidFill>
                 <a:srgbClr val="000000"/>
               </a:solidFill>
@@ -3149,7 +3149,7 @@
               </a:rPr>
               <a:t>Basic understanding of new technologies in the field of decentralized and smart systems</a:t>
             </a:r>
-            <a:endParaRPr b="0" lang="en-US" sz="1800" spc="-1" strike="noStrike">
+            <a:endParaRPr b="0" lang="en-GB" sz="1800" spc="-1" strike="noStrike">
               <a:solidFill>
                 <a:srgbClr val="000000"/>
               </a:solidFill>
@@ -3181,7 +3181,7 @@
               </a:rPr>
               <a:t>Understanding and overview of the Internet of Things and related concepts</a:t>
             </a:r>
-            <a:endParaRPr b="0" lang="en-US" sz="1800" spc="-1" strike="noStrike">
+            <a:endParaRPr b="0" lang="en-GB" sz="1800" spc="-1" strike="noStrike">
               <a:solidFill>
                 <a:srgbClr val="000000"/>
               </a:solidFill>
@@ -3213,7 +3213,7 @@
               </a:rPr>
               <a:t>Ability to design decentralized smart systems and applications in the context of connected sensor systems</a:t>
             </a:r>
-            <a:endParaRPr b="0" lang="en-US" sz="1800" spc="-1" strike="noStrike">
+            <a:endParaRPr b="0" lang="en-GB" sz="1800" spc="-1" strike="noStrike">
               <a:solidFill>
                 <a:srgbClr val="000000"/>
               </a:solidFill>
@@ -3245,7 +3245,7 @@
               </a:rPr>
               <a:t>Knowledge of the design and consideration of privacy-preserving data processing procedures for smart and decentralized applications</a:t>
             </a:r>
-            <a:endParaRPr b="0" lang="en-US" sz="1800" spc="-1" strike="noStrike">
+            <a:endParaRPr b="0" lang="en-GB" sz="1800" spc="-1" strike="noStrike">
               <a:solidFill>
                 <a:srgbClr val="000000"/>
               </a:solidFill>
@@ -3277,7 +3277,7 @@
               </a:rPr>
               <a:t>Experience in prototyping such applications and systems</a:t>
             </a:r>
-            <a:endParaRPr b="0" lang="en-US" sz="1800" spc="-1" strike="noStrike">
+            <a:endParaRPr b="0" lang="en-GB" sz="1800" spc="-1" strike="noStrike">
               <a:solidFill>
                 <a:srgbClr val="000000"/>
               </a:solidFill>
@@ -3325,7 +3325,7 @@
         <p:spPr>
           <a:xfrm>
             <a:off x="335520" y="764640"/>
-            <a:ext cx="10740960" cy="491760"/>
+            <a:ext cx="10740600" cy="491400"/>
           </a:xfrm>
           <a:prstGeom prst="rect">
             <a:avLst/>
@@ -3361,7 +3361,7 @@
               </a:rPr>
               <a:t>Lectures</a:t>
             </a:r>
-            <a:endParaRPr b="0" lang="en-US" sz="2400" spc="-1" strike="noStrike">
+            <a:endParaRPr b="0" lang="en-GB" sz="2400" spc="-1" strike="noStrike">
               <a:solidFill>
                 <a:srgbClr val="000000"/>
               </a:solidFill>
@@ -3379,7 +3379,7 @@
         <p:spPr>
           <a:xfrm>
             <a:off x="335520" y="1268640"/>
-            <a:ext cx="10740960" cy="5028480"/>
+            <a:ext cx="10740600" cy="5028120"/>
           </a:xfrm>
           <a:prstGeom prst="rect">
             <a:avLst/>
@@ -3424,7 +3424,7 @@
               </a:rPr>
               <a:t>15.04.2024 → Organization (L00) + Introduction (L01)</a:t>
             </a:r>
-            <a:endParaRPr b="0" lang="en-US" sz="1800" spc="-1" strike="noStrike">
+            <a:endParaRPr b="0" lang="en-GB" sz="1800" spc="-1" strike="noStrike">
               <a:solidFill>
                 <a:srgbClr val="000000"/>
               </a:solidFill>
@@ -3456,7 +3456,7 @@
               </a:rPr>
               <a:t>22.04.2024 → Circular Economy (L02) </a:t>
             </a:r>
-            <a:endParaRPr b="0" lang="en-US" sz="1800" spc="-1" strike="noStrike">
+            <a:endParaRPr b="0" lang="en-GB" sz="1800" spc="-1" strike="noStrike">
               <a:solidFill>
                 <a:srgbClr val="000000"/>
               </a:solidFill>
@@ -3488,7 +3488,7 @@
               </a:rPr>
               <a:t>29.04.2024 → Lifecycle Assessment – LCA (L03)</a:t>
             </a:r>
-            <a:endParaRPr b="0" lang="en-US" sz="1800" spc="-1" strike="noStrike">
+            <a:endParaRPr b="0" lang="en-GB" sz="1800" spc="-1" strike="noStrike">
               <a:solidFill>
                 <a:srgbClr val="000000"/>
               </a:solidFill>
@@ -3520,7 +3520,7 @@
               </a:rPr>
               <a:t>06.05.2024 → Introduction to the Internet of Things (L04)</a:t>
             </a:r>
-            <a:endParaRPr b="0" lang="en-US" sz="1800" spc="-1" strike="noStrike">
+            <a:endParaRPr b="0" lang="en-GB" sz="1800" spc="-1" strike="noStrike">
               <a:solidFill>
                 <a:srgbClr val="000000"/>
               </a:solidFill>
@@ -3552,7 +3552,7 @@
               </a:rPr>
               <a:t>13.05.2024 → Internet of Things – Communication + Security and Privacy (L05)</a:t>
             </a:r>
-            <a:endParaRPr b="0" lang="en-US" sz="1800" spc="-1" strike="noStrike">
+            <a:endParaRPr b="0" lang="en-GB" sz="1800" spc="-1" strike="noStrike">
               <a:solidFill>
                 <a:srgbClr val="000000"/>
               </a:solidFill>
@@ -3584,7 +3584,7 @@
               </a:rPr>
               <a:t>27.05.2024 → Internet of Things – Data Processing and BigData (L06)</a:t>
             </a:r>
-            <a:endParaRPr b="0" lang="en-US" sz="1800" spc="-1" strike="noStrike">
+            <a:endParaRPr b="0" lang="en-GB" sz="1800" spc="-1" strike="noStrike">
               <a:solidFill>
                 <a:srgbClr val="000000"/>
               </a:solidFill>
@@ -3616,7 +3616,7 @@
               </a:rPr>
               <a:t>03.06.2024 → Industrial Internet of Things (L07)</a:t>
             </a:r>
-            <a:endParaRPr b="0" lang="en-US" sz="1800" spc="-1" strike="noStrike">
+            <a:endParaRPr b="0" lang="en-GB" sz="1800" spc="-1" strike="noStrike">
               <a:solidFill>
                 <a:srgbClr val="000000"/>
               </a:solidFill>
@@ -3648,7 +3648,7 @@
               </a:rPr>
               <a:t>10.06.2024 → Introduction to Blockchain Technology (L08)</a:t>
             </a:r>
-            <a:endParaRPr b="0" lang="en-US" sz="1800" spc="-1" strike="noStrike">
+            <a:endParaRPr b="0" lang="en-GB" sz="1800" spc="-1" strike="noStrike">
               <a:solidFill>
                 <a:srgbClr val="000000"/>
               </a:solidFill>
@@ -3680,7 +3680,7 @@
               </a:rPr>
               <a:t>17.06.2024 → Blockchain Technology – Consensus (L09)</a:t>
             </a:r>
-            <a:endParaRPr b="0" lang="en-US" sz="1800" spc="-1" strike="noStrike">
+            <a:endParaRPr b="0" lang="en-GB" sz="1800" spc="-1" strike="noStrike">
               <a:solidFill>
                 <a:srgbClr val="000000"/>
               </a:solidFill>
@@ -3712,7 +3712,7 @@
               </a:rPr>
               <a:t>24.06.2024 → Blockchain Technology – Ethereum and Smart Contracts (L10)</a:t>
             </a:r>
-            <a:endParaRPr b="0" lang="en-US" sz="1800" spc="-1" strike="noStrike">
+            <a:endParaRPr b="0" lang="en-GB" sz="1800" spc="-1" strike="noStrike">
               <a:solidFill>
                 <a:srgbClr val="000000"/>
               </a:solidFill>
@@ -3744,7 +3744,7 @@
               </a:rPr>
               <a:t>01.07.2024 → Blockchain Technology and Sustainability (L11)</a:t>
             </a:r>
-            <a:endParaRPr b="0" lang="en-US" sz="1800" spc="-1" strike="noStrike">
+            <a:endParaRPr b="0" lang="en-GB" sz="1800" spc="-1" strike="noStrike">
               <a:solidFill>
                 <a:srgbClr val="000000"/>
               </a:solidFill>
@@ -3776,7 +3776,7 @@
               </a:rPr>
               <a:t>08.07.2024 → The Machine-to-Everything Economy – A step towards the CE 2.0? (L12)</a:t>
             </a:r>
-            <a:endParaRPr b="0" lang="en-US" sz="1800" spc="-1" strike="noStrike">
+            <a:endParaRPr b="0" lang="en-GB" sz="1800" spc="-1" strike="noStrike">
               <a:solidFill>
                 <a:srgbClr val="000000"/>
               </a:solidFill>
@@ -3806,9 +3806,9 @@
                 <a:latin typeface="DejaVu Sans"/>
                 <a:ea typeface="DejaVu Sans"/>
               </a:rPr>
-              <a:t>29.07.2024 → Exam Q&amp;A</a:t>
-            </a:r>
-            <a:endParaRPr b="0" lang="en-US" sz="1800" spc="-1" strike="noStrike">
+              <a:t>22.07.2024 → Exam Q&amp;A</a:t>
+            </a:r>
+            <a:endParaRPr b="0" lang="en-GB" sz="1800" spc="-1" strike="noStrike">
               <a:solidFill>
                 <a:srgbClr val="000000"/>
               </a:solidFill>
@@ -3856,7 +3856,7 @@
         <p:spPr>
           <a:xfrm>
             <a:off x="335520" y="764640"/>
-            <a:ext cx="10740960" cy="491760"/>
+            <a:ext cx="10740600" cy="491400"/>
           </a:xfrm>
           <a:prstGeom prst="rect">
             <a:avLst/>
@@ -3892,7 +3892,7 @@
               </a:rPr>
               <a:t>Exercises</a:t>
             </a:r>
-            <a:endParaRPr b="0" lang="en-US" sz="2400" spc="-1" strike="noStrike">
+            <a:endParaRPr b="0" lang="en-GB" sz="2400" spc="-1" strike="noStrike">
               <a:solidFill>
                 <a:srgbClr val="000000"/>
               </a:solidFill>
@@ -3910,7 +3910,7 @@
         <p:spPr>
           <a:xfrm>
             <a:off x="335520" y="1268640"/>
-            <a:ext cx="10740960" cy="5028480"/>
+            <a:ext cx="10740600" cy="5028120"/>
           </a:xfrm>
           <a:prstGeom prst="rect">
             <a:avLst/>
@@ -3975,7 +3975,7 @@
               </a:rPr>
               <a:t> Exercise 01 – Knowledge Test (MC)</a:t>
             </a:r>
-            <a:endParaRPr b="0" lang="en-US" sz="1800" spc="-1" strike="noStrike">
+            <a:endParaRPr b="0" lang="en-GB" sz="1800" spc="-1" strike="noStrike">
               <a:solidFill>
                 <a:srgbClr val="000000"/>
               </a:solidFill>
@@ -4027,7 +4027,7 @@
               </a:rPr>
               <a:t> Exercise 02 – Circular Economy (MC)</a:t>
             </a:r>
-            <a:endParaRPr b="0" lang="en-US" sz="1800" spc="-1" strike="noStrike">
+            <a:endParaRPr b="0" lang="en-GB" sz="1800" spc="-1" strike="noStrike">
               <a:solidFill>
                 <a:srgbClr val="000000"/>
               </a:solidFill>
@@ -4079,7 +4079,7 @@
               </a:rPr>
               <a:t> Exercise 03 – Lifecycle Assessment (LCA)</a:t>
             </a:r>
-            <a:endParaRPr b="0" lang="en-US" sz="1800" spc="-1" strike="noStrike">
+            <a:endParaRPr b="0" lang="en-GB" sz="1800" spc="-1" strike="noStrike">
               <a:solidFill>
                 <a:srgbClr val="000000"/>
               </a:solidFill>
@@ -4131,7 +4131,7 @@
               </a:rPr>
               <a:t> Exercise 04 – IoT Sensing and Gathering Data</a:t>
             </a:r>
-            <a:endParaRPr b="0" lang="en-US" sz="1800" spc="-1" strike="noStrike">
+            <a:endParaRPr b="0" lang="en-GB" sz="1800" spc="-1" strike="noStrike">
               <a:solidFill>
                 <a:srgbClr val="000000"/>
               </a:solidFill>
@@ -4183,7 +4183,7 @@
               </a:rPr>
               <a:t> Exercise 05 – IoT Security</a:t>
             </a:r>
-            <a:endParaRPr b="0" lang="en-US" sz="1800" spc="-1" strike="noStrike">
+            <a:endParaRPr b="0" lang="en-GB" sz="1800" spc="-1" strike="noStrike">
               <a:solidFill>
                 <a:srgbClr val="000000"/>
               </a:solidFill>
@@ -4235,7 +4235,7 @@
               </a:rPr>
               <a:t> Exercise 06 – IoT Data Processing</a:t>
             </a:r>
-            <a:endParaRPr b="0" lang="en-US" sz="1800" spc="-1" strike="noStrike">
+            <a:endParaRPr b="0" lang="en-GB" sz="1800" spc="-1" strike="noStrike">
               <a:solidFill>
                 <a:srgbClr val="000000"/>
               </a:solidFill>
@@ -4267,7 +4267,7 @@
               </a:rPr>
               <a:t>03.06.2024 → Exercise 07 – Industrial IoT</a:t>
             </a:r>
-            <a:endParaRPr b="0" lang="en-US" sz="1800" spc="-1" strike="noStrike">
+            <a:endParaRPr b="0" lang="en-GB" sz="1800" spc="-1" strike="noStrike">
               <a:solidFill>
                 <a:srgbClr val="000000"/>
               </a:solidFill>
@@ -4339,7 +4339,7 @@
               </a:rPr>
               <a:t> 08 – Blockchain (MC)</a:t>
             </a:r>
-            <a:endParaRPr b="0" lang="en-US" sz="1800" spc="-1" strike="noStrike">
+            <a:endParaRPr b="0" lang="en-GB" sz="1800" spc="-1" strike="noStrike">
               <a:solidFill>
                 <a:srgbClr val="000000"/>
               </a:solidFill>
@@ -4391,7 +4391,7 @@
               </a:rPr>
               <a:t> Exercise 09 – Blockchain Basics</a:t>
             </a:r>
-            <a:endParaRPr b="0" lang="en-US" sz="1800" spc="-1" strike="noStrike">
+            <a:endParaRPr b="0" lang="en-GB" sz="1800" spc="-1" strike="noStrike">
               <a:solidFill>
                 <a:srgbClr val="000000"/>
               </a:solidFill>
@@ -4443,7 +4443,7 @@
               </a:rPr>
               <a:t> Exercise 10 – Blockchain Conensus</a:t>
             </a:r>
-            <a:endParaRPr b="0" lang="en-US" sz="1800" spc="-1" strike="noStrike">
+            <a:endParaRPr b="0" lang="en-GB" sz="1800" spc="-1" strike="noStrike">
               <a:solidFill>
                 <a:srgbClr val="000000"/>
               </a:solidFill>
@@ -4495,7 +4495,7 @@
               </a:rPr>
               <a:t> Exercise 11 – Blockchain Tokens</a:t>
             </a:r>
-            <a:endParaRPr b="0" lang="en-US" sz="1800" spc="-1" strike="noStrike">
+            <a:endParaRPr b="0" lang="en-GB" sz="1800" spc="-1" strike="noStrike">
               <a:solidFill>
                 <a:srgbClr val="000000"/>
               </a:solidFill>
@@ -4543,7 +4543,7 @@
         <p:spPr>
           <a:xfrm>
             <a:off x="335520" y="764640"/>
-            <a:ext cx="10740960" cy="491760"/>
+            <a:ext cx="10740600" cy="491400"/>
           </a:xfrm>
           <a:prstGeom prst="rect">
             <a:avLst/>
@@ -4579,7 +4579,7 @@
               </a:rPr>
               <a:t>Course Organization</a:t>
             </a:r>
-            <a:endParaRPr b="0" lang="en-US" sz="2400" spc="-1" strike="noStrike">
+            <a:endParaRPr b="0" lang="en-GB" sz="2400" spc="-1" strike="noStrike">
               <a:solidFill>
                 <a:srgbClr val="000000"/>
               </a:solidFill>
@@ -4597,7 +4597,7 @@
         <p:spPr>
           <a:xfrm>
             <a:off x="335520" y="1268280"/>
-            <a:ext cx="10740960" cy="5028480"/>
+            <a:ext cx="10740600" cy="5028120"/>
           </a:xfrm>
           <a:prstGeom prst="rect">
             <a:avLst/>
@@ -4626,7 +4626,7 @@
                 <a:spcPts val="360"/>
               </a:spcBef>
             </a:pPr>
-            <a:endParaRPr b="0" lang="en-US" sz="1800" spc="-1" strike="noStrike">
+            <a:endParaRPr b="0" lang="en-GB" sz="1800" spc="-1" strike="noStrike">
               <a:solidFill>
                 <a:srgbClr val="000000"/>
               </a:solidFill>
@@ -4658,7 +4658,7 @@
               </a:rPr>
               <a:t>Organization of the lecture:</a:t>
             </a:r>
-            <a:endParaRPr b="0" lang="en-US" sz="1800" spc="-1" strike="noStrike">
+            <a:endParaRPr b="0" lang="en-GB" sz="1800" spc="-1" strike="noStrike">
               <a:solidFill>
                 <a:srgbClr val="000000"/>
               </a:solidFill>
@@ -4712,7 +4712,7 @@
               </a:rPr>
               <a:t>)</a:t>
             </a:r>
-            <a:endParaRPr b="0" lang="en-US" sz="1800" spc="-1" strike="noStrike">
+            <a:endParaRPr b="0" lang="en-GB" sz="1800" spc="-1" strike="noStrike">
               <a:solidFill>
                 <a:srgbClr val="000000"/>
               </a:solidFill>
@@ -4744,7 +4744,7 @@
               </a:rPr>
               <a:t>Please report bugs!</a:t>
             </a:r>
-            <a:endParaRPr b="0" lang="en-US" sz="1800" spc="-1" strike="noStrike">
+            <a:endParaRPr b="0" lang="en-GB" sz="1800" spc="-1" strike="noStrike">
               <a:solidFill>
                 <a:srgbClr val="000000"/>
               </a:solidFill>
@@ -4776,7 +4776,7 @@
               </a:rPr>
               <a:t>Lectures and exercises as live stream (BBB – next slide)</a:t>
             </a:r>
-            <a:endParaRPr b="0" lang="en-US" sz="1800" spc="-1" strike="noStrike">
+            <a:endParaRPr b="0" lang="en-GB" sz="1800" spc="-1" strike="noStrike">
               <a:solidFill>
                 <a:srgbClr val="000000"/>
               </a:solidFill>
@@ -4808,7 +4808,7 @@
               </a:rPr>
               <a:t>Lecture recordings will be available on StudIP and on Github</a:t>
             </a:r>
-            <a:endParaRPr b="0" lang="en-US" sz="1800" spc="-1" strike="noStrike">
+            <a:endParaRPr b="0" lang="en-GB" sz="1800" spc="-1" strike="noStrike">
               <a:solidFill>
                 <a:srgbClr val="000000"/>
               </a:solidFill>
@@ -4860,7 +4860,7 @@
               </a:rPr>
               <a:t>Time for questions and eventual tutorials related to the exercises</a:t>
             </a:r>
-            <a:endParaRPr b="0" lang="en-US" sz="1800" spc="-1" strike="noStrike">
+            <a:endParaRPr b="0" lang="en-GB" sz="1800" spc="-1" strike="noStrike">
               <a:solidFill>
                 <a:srgbClr val="000000"/>
               </a:solidFill>
@@ -4876,7 +4876,7 @@
                 <a:spcPts val="360"/>
               </a:spcBef>
             </a:pPr>
-            <a:endParaRPr b="0" lang="en-US" sz="1800" spc="-1" strike="noStrike">
+            <a:endParaRPr b="0" lang="en-GB" sz="1800" spc="-1" strike="noStrike">
               <a:solidFill>
                 <a:srgbClr val="000000"/>
               </a:solidFill>
@@ -4954,7 +4954,7 @@
               </a:rPr>
               <a:t> respond to</a:t>
             </a:r>
-            <a:endParaRPr b="0" lang="en-US" sz="1800" spc="-1" strike="noStrike">
+            <a:endParaRPr b="0" lang="en-GB" sz="1800" spc="-1" strike="noStrike">
               <a:solidFill>
                 <a:srgbClr val="000000"/>
               </a:solidFill>
@@ -4980,7 +4980,7 @@
               </a:rPr>
               <a:t>emails written to this specific email address!</a:t>
             </a:r>
-            <a:endParaRPr b="0" lang="en-US" sz="1800" spc="-1" strike="noStrike">
+            <a:endParaRPr b="0" lang="en-GB" sz="1800" spc="-1" strike="noStrike">
               <a:solidFill>
                 <a:srgbClr val="000000"/>
               </a:solidFill>
@@ -5028,7 +5028,7 @@
         <p:spPr>
           <a:xfrm>
             <a:off x="335520" y="764640"/>
-            <a:ext cx="10739520" cy="490320"/>
+            <a:ext cx="10739160" cy="489960"/>
           </a:xfrm>
           <a:prstGeom prst="rect">
             <a:avLst/>
@@ -5064,7 +5064,7 @@
               </a:rPr>
               <a:t>Dates/Times/Locations</a:t>
             </a:r>
-            <a:endParaRPr b="0" lang="en-US" sz="2400" spc="-1" strike="noStrike">
+            <a:endParaRPr b="0" lang="en-GB" sz="2400" spc="-1" strike="noStrike">
               <a:solidFill>
                 <a:srgbClr val="000000"/>
               </a:solidFill>
@@ -5077,7 +5077,7 @@
                 <a:spcPct val="100000"/>
               </a:lnSpc>
             </a:pPr>
-            <a:endParaRPr b="0" lang="en-US" sz="2400" spc="-1" strike="noStrike">
+            <a:endParaRPr b="0" lang="en-GB" sz="2400" spc="-1" strike="noStrike">
               <a:solidFill>
                 <a:srgbClr val="000000"/>
               </a:solidFill>
@@ -5090,7 +5090,7 @@
                 <a:spcPct val="100000"/>
               </a:lnSpc>
             </a:pPr>
-            <a:endParaRPr b="0" lang="en-US" sz="2400" spc="-1" strike="noStrike">
+            <a:endParaRPr b="0" lang="en-GB" sz="2400" spc="-1" strike="noStrike">
               <a:solidFill>
                 <a:srgbClr val="000000"/>
               </a:solidFill>
@@ -5108,7 +5108,7 @@
         <p:spPr>
           <a:xfrm>
             <a:off x="335520" y="1268640"/>
-            <a:ext cx="10739520" cy="5027040"/>
+            <a:ext cx="10739160" cy="5026680"/>
           </a:xfrm>
           <a:prstGeom prst="rect">
             <a:avLst/>
@@ -5137,7 +5137,7 @@
                 <a:spcPts val="360"/>
               </a:spcBef>
             </a:pPr>
-            <a:endParaRPr b="0" lang="en-US" sz="1800" spc="-1" strike="noStrike">
+            <a:endParaRPr b="0" lang="en-GB" sz="1800" spc="-1" strike="noStrike">
               <a:solidFill>
                 <a:srgbClr val="000000"/>
               </a:solidFill>
@@ -5170,7 +5170,7 @@
               </a:rPr>
               <a:t>Lecture:</a:t>
             </a:r>
-            <a:endParaRPr b="0" lang="en-US" sz="1800" spc="-1" strike="noStrike">
+            <a:endParaRPr b="0" lang="en-GB" sz="1800" spc="-1" strike="noStrike">
               <a:solidFill>
                 <a:srgbClr val="000000"/>
               </a:solidFill>
@@ -5252,7 +5252,7 @@
               </a:rPr>
               <a:t>08.07.2024</a:t>
             </a:r>
-            <a:endParaRPr b="0" lang="en-US" sz="1800" spc="-1" strike="noStrike">
+            <a:endParaRPr b="0" lang="en-GB" sz="1800" spc="-1" strike="noStrike">
               <a:solidFill>
                 <a:srgbClr val="000000"/>
               </a:solidFill>
@@ -5306,7 +5306,7 @@
               </a:rPr>
               <a:t>)</a:t>
             </a:r>
-            <a:endParaRPr b="0" lang="en-US" sz="1800" spc="-1" strike="noStrike">
+            <a:endParaRPr b="0" lang="en-GB" sz="1800" spc="-1" strike="noStrike">
               <a:solidFill>
                 <a:srgbClr val="000000"/>
               </a:solidFill>
@@ -5322,7 +5322,7 @@
                 <a:spcPts val="360"/>
               </a:spcBef>
             </a:pPr>
-            <a:endParaRPr b="0" lang="en-US" sz="1800" spc="-1" strike="noStrike">
+            <a:endParaRPr b="0" lang="en-GB" sz="1800" spc="-1" strike="noStrike">
               <a:solidFill>
                 <a:srgbClr val="000000"/>
               </a:solidFill>
@@ -5355,7 +5355,7 @@
               </a:rPr>
               <a:t>Exercise / Q&amp;A:</a:t>
             </a:r>
-            <a:endParaRPr b="0" lang="en-US" sz="1800" spc="-1" strike="noStrike">
+            <a:endParaRPr b="0" lang="en-GB" sz="1800" spc="-1" strike="noStrike">
               <a:solidFill>
                 <a:srgbClr val="000000"/>
               </a:solidFill>
@@ -5437,7 +5437,7 @@
               </a:rPr>
               <a:t>08.07.2024</a:t>
             </a:r>
-            <a:endParaRPr b="0" lang="en-US" sz="1800" spc="-1" strike="noStrike">
+            <a:endParaRPr b="0" lang="en-GB" sz="1800" spc="-1" strike="noStrike">
               <a:solidFill>
                 <a:srgbClr val="000000"/>
               </a:solidFill>
@@ -5491,7 +5491,7 @@
               </a:rPr>
               <a:t>)</a:t>
             </a:r>
-            <a:endParaRPr b="0" lang="en-US" sz="1800" spc="-1" strike="noStrike">
+            <a:endParaRPr b="0" lang="en-GB" sz="1800" spc="-1" strike="noStrike">
               <a:solidFill>
                 <a:srgbClr val="000000"/>
               </a:solidFill>
@@ -5539,7 +5539,7 @@
         <p:spPr>
           <a:xfrm>
             <a:off x="335520" y="764640"/>
-            <a:ext cx="10740960" cy="491760"/>
+            <a:ext cx="10740600" cy="491400"/>
           </a:xfrm>
           <a:prstGeom prst="rect">
             <a:avLst/>
@@ -5575,7 +5575,7 @@
               </a:rPr>
               <a:t>Exercises </a:t>
             </a:r>
-            <a:endParaRPr b="0" lang="en-US" sz="2400" spc="-1" strike="noStrike">
+            <a:endParaRPr b="0" lang="en-GB" sz="2400" spc="-1" strike="noStrike">
               <a:solidFill>
                 <a:srgbClr val="000000"/>
               </a:solidFill>
@@ -5593,7 +5593,7 @@
         <p:spPr>
           <a:xfrm>
             <a:off x="335520" y="1268280"/>
-            <a:ext cx="10740960" cy="5028480"/>
+            <a:ext cx="10740600" cy="5028120"/>
           </a:xfrm>
           <a:prstGeom prst="rect">
             <a:avLst/>
@@ -5619,7 +5619,7 @@
                 <a:spcPct val="100000"/>
               </a:lnSpc>
             </a:pPr>
-            <a:endParaRPr b="0" lang="en-US" sz="1800" spc="-1" strike="noStrike">
+            <a:endParaRPr b="0" lang="en-GB" sz="1800" spc="-1" strike="noStrike">
               <a:solidFill>
                 <a:srgbClr val="000000"/>
               </a:solidFill>
@@ -5691,7 +5691,7 @@
               </a:rPr>
               <a:t>no group submissions</a:t>
             </a:r>
-            <a:endParaRPr b="0" lang="en-US" sz="1800" spc="-1" strike="noStrike">
+            <a:endParaRPr b="0" lang="en-GB" sz="1800" spc="-1" strike="noStrike">
               <a:solidFill>
                 <a:srgbClr val="000000"/>
               </a:solidFill>
@@ -5723,7 +5723,7 @@
               </a:rPr>
               <a:t>Multiple-Choice or coding tasks</a:t>
             </a:r>
-            <a:endParaRPr b="0" lang="en-US" sz="1800" spc="-1" strike="noStrike">
+            <a:endParaRPr b="0" lang="en-GB" sz="1800" spc="-1" strike="noStrike">
               <a:solidFill>
                 <a:srgbClr val="000000"/>
               </a:solidFill>
@@ -5755,7 +5755,7 @@
               </a:rPr>
               <a:t>7-14 days to submit (depending on the task)</a:t>
             </a:r>
-            <a:endParaRPr b="0" lang="en-US" sz="1800" spc="-1" strike="noStrike">
+            <a:endParaRPr b="0" lang="en-GB" sz="1800" spc="-1" strike="noStrike">
               <a:solidFill>
                 <a:srgbClr val="000000"/>
               </a:solidFill>
@@ -5787,7 +5787,7 @@
               </a:rPr>
               <a:t>Submission deadline is always Monday at 1:59pm (right before the next lecture)</a:t>
             </a:r>
-            <a:endParaRPr b="0" lang="en-US" sz="1800" spc="-1" strike="noStrike">
+            <a:endParaRPr b="0" lang="en-GB" sz="1800" spc="-1" strike="noStrike">
               <a:solidFill>
                 <a:srgbClr val="000000"/>
               </a:solidFill>
@@ -5849,7 +5849,7 @@
               </a:rPr>
               <a:t>mandatory</a:t>
             </a:r>
-            <a:endParaRPr b="0" lang="en-US" sz="1800" spc="-1" strike="noStrike">
+            <a:endParaRPr b="0" lang="en-GB" sz="1800" spc="-1" strike="noStrike">
               <a:solidFill>
                 <a:srgbClr val="000000"/>
               </a:solidFill>
@@ -5882,7 +5882,7 @@
               </a:rPr>
               <a:t>You pass by submitting an exercise – even if it is an empty page</a:t>
             </a:r>
-            <a:endParaRPr b="0" lang="en-US" sz="1800" spc="-1" strike="noStrike">
+            <a:endParaRPr b="0" lang="en-GB" sz="1800" spc="-1" strike="noStrike">
               <a:solidFill>
                 <a:srgbClr val="000000"/>
               </a:solidFill>
@@ -5914,7 +5914,7 @@
               </a:rPr>
               <a:t>You will receive feedback on your submission</a:t>
             </a:r>
-            <a:endParaRPr b="0" lang="en-US" sz="1800" spc="-1" strike="noStrike">
+            <a:endParaRPr b="0" lang="en-GB" sz="1800" spc="-1" strike="noStrike">
               <a:solidFill>
                 <a:srgbClr val="000000"/>
               </a:solidFill>
@@ -5946,7 +5946,7 @@
               </a:rPr>
               <a:t>Exercise = learning feedback</a:t>
             </a:r>
-            <a:endParaRPr b="0" lang="en-US" sz="1800" spc="-1" strike="noStrike">
+            <a:endParaRPr b="0" lang="en-GB" sz="1800" spc="-1" strike="noStrike">
               <a:solidFill>
                 <a:srgbClr val="000000"/>
               </a:solidFill>
@@ -5994,7 +5994,7 @@
         <p:spPr>
           <a:xfrm>
             <a:off x="335520" y="764640"/>
-            <a:ext cx="10740960" cy="491760"/>
+            <a:ext cx="10740600" cy="491400"/>
           </a:xfrm>
           <a:prstGeom prst="rect">
             <a:avLst/>
@@ -6030,7 +6030,7 @@
               </a:rPr>
               <a:t>Coding Exercise Submission and Grading</a:t>
             </a:r>
-            <a:endParaRPr b="0" lang="en-US" sz="2400" spc="-1" strike="noStrike">
+            <a:endParaRPr b="0" lang="en-GB" sz="2400" spc="-1" strike="noStrike">
               <a:solidFill>
                 <a:srgbClr val="000000"/>
               </a:solidFill>
@@ -6048,7 +6048,7 @@
         <p:spPr>
           <a:xfrm>
             <a:off x="335520" y="1268640"/>
-            <a:ext cx="10740960" cy="5028480"/>
+            <a:ext cx="10740600" cy="5028120"/>
           </a:xfrm>
           <a:prstGeom prst="rect">
             <a:avLst/>
@@ -6093,7 +6093,7 @@
               </a:rPr>
               <a:t>Coding exercises are graded semi-automatically. Due to this it is highly important that you follow the required submission format. Otherwise the grading process will fail and you will receive 0 points.</a:t>
             </a:r>
-            <a:endParaRPr b="0" lang="en-US" sz="1800" spc="-1" strike="noStrike">
+            <a:endParaRPr b="0" lang="en-GB" sz="1800" spc="-1" strike="noStrike">
               <a:solidFill>
                 <a:srgbClr val="000000"/>
               </a:solidFill>
@@ -6125,7 +6125,7 @@
               </a:rPr>
               <a:t>Coding exercises will be provided in the form of Jupyter Notebooks, and provided to you via Moodle and on our GitHub repository.</a:t>
             </a:r>
-            <a:endParaRPr b="0" lang="en-US" sz="1800" spc="-1" strike="noStrike">
+            <a:endParaRPr b="0" lang="en-GB" sz="1800" spc="-1" strike="noStrike">
               <a:solidFill>
                 <a:srgbClr val="000000"/>
               </a:solidFill>
@@ -6158,27 +6158,28 @@
               <a:t>You can run these notebooks on the GWDG’s jupyter cloud service: </a:t>
             </a:r>
             <a:r>
+              <a:rPr b="0" lang="de-DE" sz="1800" spc="-1" strike="noStrike" u="sng">
+                <a:solidFill>
+                  <a:srgbClr val="0000ff"/>
+                </a:solidFill>
+                <a:uFillTx/>
+                <a:latin typeface="DejaVu Sans"/>
+                <a:ea typeface="DejaVu Sans"/>
+                <a:hlinkClick r:id="rId1"/>
+              </a:rPr>
+              <a:t>https://jupyter-cloud.gwdg.de/</a:t>
+            </a:r>
+            <a:r>
               <a:rPr b="0" lang="de-DE" sz="1800" spc="-1" strike="noStrike">
                 <a:solidFill>
                   <a:srgbClr val="000000"/>
                 </a:solidFill>
                 <a:latin typeface="DejaVu Sans"/>
                 <a:ea typeface="DejaVu Sans"/>
-                <a:hlinkClick r:id="rId1"/>
-              </a:rPr>
-              <a:t>https://jupyter-cloud.gwdg.de/</a:t>
-            </a:r>
-            <a:r>
-              <a:rPr b="0" lang="de-DE" sz="1800" spc="-1" strike="noStrike">
-                <a:solidFill>
-                  <a:srgbClr val="000000"/>
-                </a:solidFill>
-                <a:latin typeface="DejaVu Sans"/>
-                <a:ea typeface="DejaVu Sans"/>
               </a:rPr>
               <a:t>, or on your local machine.</a:t>
             </a:r>
-            <a:endParaRPr b="0" lang="en-US" sz="1800" spc="-1" strike="noStrike">
+            <a:endParaRPr b="0" lang="en-GB" sz="1800" spc="-1" strike="noStrike">
               <a:solidFill>
                 <a:srgbClr val="000000"/>
               </a:solidFill>
@@ -6210,7 +6211,7 @@
               </a:rPr>
               <a:t>Once you have finished the editing the Jupyter notebook, submit your edited copy of the notebook back to the Moodle Exercise page.</a:t>
             </a:r>
-            <a:endParaRPr b="0" lang="en-US" sz="1800" spc="-1" strike="noStrike">
+            <a:endParaRPr b="0" lang="en-GB" sz="1800" spc="-1" strike="noStrike">
               <a:solidFill>
                 <a:srgbClr val="000000"/>
               </a:solidFill>
@@ -6242,7 +6243,7 @@
               </a:rPr>
               <a:t>Exercises which are not valid Jupyter Notebook files will be marked as having failed.</a:t>
             </a:r>
-            <a:endParaRPr b="0" lang="en-US" sz="1800" spc="-1" strike="noStrike">
+            <a:endParaRPr b="0" lang="en-GB" sz="1800" spc="-1" strike="noStrike">
               <a:solidFill>
                 <a:srgbClr val="000000"/>
               </a:solidFill>
@@ -6260,7 +6261,7 @@
         <p:spPr>
           <a:xfrm>
             <a:off x="4655880" y="476640"/>
-            <a:ext cx="2427120" cy="353160"/>
+            <a:ext cx="2426760" cy="352800"/>
           </a:xfrm>
           <a:prstGeom prst="rect">
             <a:avLst/>
@@ -6335,7 +6336,7 @@
         <p:spPr>
           <a:xfrm>
             <a:off x="335520" y="768240"/>
-            <a:ext cx="10740960" cy="491760"/>
+            <a:ext cx="10740600" cy="491400"/>
           </a:xfrm>
           <a:prstGeom prst="rect">
             <a:avLst/>
@@ -6371,7 +6372,7 @@
               </a:rPr>
               <a:t>Multiple-Choice Exercises</a:t>
             </a:r>
-            <a:endParaRPr b="0" lang="en-US" sz="2400" spc="-1" strike="noStrike">
+            <a:endParaRPr b="0" lang="en-GB" sz="2400" spc="-1" strike="noStrike">
               <a:solidFill>
                 <a:srgbClr val="000000"/>
               </a:solidFill>
@@ -6389,7 +6390,7 @@
         <p:spPr>
           <a:xfrm>
             <a:off x="388800" y="1488600"/>
-            <a:ext cx="10714680" cy="3505320"/>
+            <a:ext cx="10714320" cy="3505320"/>
           </a:xfrm>
           <a:prstGeom prst="rect">
             <a:avLst/>
@@ -6425,7 +6426,7 @@
               </a:rPr>
               <a:t>Every student enrolled in this course is advised to take the knowledge quiz in first two weeks of the course.  </a:t>
             </a:r>
-            <a:endParaRPr b="0" lang="en-US" sz="1400" spc="-1" strike="noStrike">
+            <a:endParaRPr b="0" lang="en-GB" sz="1400" spc="-1" strike="noStrike">
               <a:solidFill>
                 <a:srgbClr val="000000"/>
               </a:solidFill>
@@ -6438,7 +6439,7 @@
                 <a:spcPct val="100000"/>
               </a:lnSpc>
             </a:pPr>
-            <a:endParaRPr b="0" lang="en-US" sz="1400" spc="-1" strike="noStrike">
+            <a:endParaRPr b="0" lang="en-GB" sz="1400" spc="-1" strike="noStrike">
               <a:solidFill>
                 <a:srgbClr val="000000"/>
               </a:solidFill>
@@ -6451,7 +6452,7 @@
                 <a:spcPct val="100000"/>
               </a:lnSpc>
             </a:pPr>
-            <a:endParaRPr b="0" lang="en-US" sz="1400" spc="-1" strike="noStrike">
+            <a:endParaRPr b="0" lang="en-GB" sz="1400" spc="-1" strike="noStrike">
               <a:solidFill>
                 <a:srgbClr val="000000"/>
               </a:solidFill>
@@ -6480,7 +6481,7 @@
               </a:rPr>
               <a:t>Goal of the test:</a:t>
             </a:r>
-            <a:endParaRPr b="0" lang="en-US" sz="1400" spc="-1" strike="noStrike">
+            <a:endParaRPr b="0" lang="en-GB" sz="1400" spc="-1" strike="noStrike">
               <a:solidFill>
                 <a:srgbClr val="000000"/>
               </a:solidFill>
@@ -6509,7 +6510,7 @@
               </a:rPr>
               <a:t>To check the knowledge level of the student that is relevant to this course of study.</a:t>
             </a:r>
-            <a:endParaRPr b="0" lang="en-US" sz="1400" spc="-1" strike="noStrike">
+            <a:endParaRPr b="0" lang="en-GB" sz="1400" spc="-1" strike="noStrike">
               <a:solidFill>
                 <a:srgbClr val="000000"/>
               </a:solidFill>
@@ -6532,7 +6533,7 @@
               </a:rPr>
               <a:t> </a:t>
             </a:r>
-            <a:endParaRPr b="0" lang="en-US" sz="1400" spc="-1" strike="noStrike">
+            <a:endParaRPr b="0" lang="en-GB" sz="1400" spc="-1" strike="noStrike">
               <a:solidFill>
                 <a:srgbClr val="000000"/>
               </a:solidFill>
@@ -6561,7 +6562,7 @@
               </a:rPr>
               <a:t>Preparation:</a:t>
             </a:r>
-            <a:endParaRPr b="0" lang="en-US" sz="1400" spc="-1" strike="noStrike">
+            <a:endParaRPr b="0" lang="en-GB" sz="1400" spc="-1" strike="noStrike">
               <a:solidFill>
                 <a:srgbClr val="000000"/>
               </a:solidFill>
@@ -6590,7 +6591,7 @@
               </a:rPr>
               <a:t>A review of basic concepts of Cryptography and Circular Economy is recommended for Week 1 and Week 2 respectively</a:t>
             </a:r>
-            <a:endParaRPr b="0" lang="en-US" sz="1400" spc="-1" strike="noStrike">
+            <a:endParaRPr b="0" lang="en-GB" sz="1400" spc="-1" strike="noStrike">
               <a:solidFill>
                 <a:srgbClr val="000000"/>
               </a:solidFill>
@@ -6619,7 +6620,7 @@
               </a:rPr>
               <a:t>Knowledge quiz for Week 1 only tests your existing knowledge.</a:t>
             </a:r>
-            <a:endParaRPr b="0" lang="en-US" sz="1400" spc="-1" strike="noStrike">
+            <a:endParaRPr b="0" lang="en-GB" sz="1400" spc="-1" strike="noStrike">
               <a:solidFill>
                 <a:srgbClr val="000000"/>
               </a:solidFill>
@@ -6642,7 +6643,7 @@
               </a:rPr>
               <a:t> </a:t>
             </a:r>
-            <a:endParaRPr b="0" lang="en-US" sz="1400" spc="-1" strike="noStrike">
+            <a:endParaRPr b="0" lang="en-GB" sz="1400" spc="-1" strike="noStrike">
               <a:solidFill>
                 <a:srgbClr val="000000"/>
               </a:solidFill>
@@ -6671,7 +6672,7 @@
               </a:rPr>
               <a:t>THE TEST IS JUST FOR YOU → WE CANNOT CHECK THE TEST RESULTS</a:t>
             </a:r>
-            <a:endParaRPr b="0" lang="en-US" sz="1400" spc="-1" strike="noStrike">
+            <a:endParaRPr b="0" lang="en-GB" sz="1400" spc="-1" strike="noStrike">
               <a:solidFill>
                 <a:srgbClr val="000000"/>
               </a:solidFill>
@@ -6684,7 +6685,7 @@
                 <a:spcPct val="100000"/>
               </a:lnSpc>
             </a:pPr>
-            <a:endParaRPr b="0" lang="en-US" sz="1400" spc="-1" strike="noStrike">
+            <a:endParaRPr b="0" lang="en-GB" sz="1400" spc="-1" strike="noStrike">
               <a:solidFill>
                 <a:srgbClr val="000000"/>
               </a:solidFill>
@@ -6697,7 +6698,7 @@
                 <a:spcPct val="100000"/>
               </a:lnSpc>
             </a:pPr>
-            <a:endParaRPr b="0" lang="en-US" sz="1400" spc="-1" strike="noStrike">
+            <a:endParaRPr b="0" lang="en-GB" sz="1400" spc="-1" strike="noStrike">
               <a:solidFill>
                 <a:srgbClr val="000000"/>
               </a:solidFill>
@@ -6710,7 +6711,7 @@
                 <a:spcPct val="100000"/>
               </a:lnSpc>
             </a:pPr>
-            <a:endParaRPr b="0" lang="en-US" sz="1400" spc="-1" strike="noStrike">
+            <a:endParaRPr b="0" lang="en-GB" sz="1400" spc="-1" strike="noStrike">
               <a:solidFill>
                 <a:srgbClr val="000000"/>
               </a:solidFill>
@@ -6758,7 +6759,7 @@
         <p:spPr>
           <a:xfrm>
             <a:off x="335520" y="764640"/>
-            <a:ext cx="10738800" cy="489600"/>
+            <a:ext cx="10738440" cy="489240"/>
           </a:xfrm>
           <a:prstGeom prst="rect">
             <a:avLst/>
@@ -6794,7 +6795,7 @@
               </a:rPr>
               <a:t>License</a:t>
             </a:r>
-            <a:endParaRPr b="0" lang="en-US" sz="2400" spc="-1" strike="noStrike">
+            <a:endParaRPr b="0" lang="en-GB" sz="2400" spc="-1" strike="noStrike">
               <a:solidFill>
                 <a:srgbClr val="000000"/>
               </a:solidFill>
@@ -6812,7 +6813,7 @@
         <p:spPr>
           <a:xfrm>
             <a:off x="335520" y="1268640"/>
-            <a:ext cx="10738800" cy="5026320"/>
+            <a:ext cx="10738440" cy="5025960"/>
           </a:xfrm>
           <a:prstGeom prst="rect">
             <a:avLst/>
@@ -6841,7 +6842,7 @@
                 <a:spcPts val="360"/>
               </a:spcBef>
             </a:pPr>
-            <a:endParaRPr b="0" lang="en-US" sz="1800" spc="-1" strike="noStrike">
+            <a:endParaRPr b="0" lang="en-GB" sz="1800" spc="-1" strike="noStrike">
               <a:solidFill>
                 <a:srgbClr val="000000"/>
               </a:solidFill>
@@ -6857,7 +6858,7 @@
                 <a:spcPts val="360"/>
               </a:spcBef>
             </a:pPr>
-            <a:endParaRPr b="0" lang="en-US" sz="1800" spc="-1" strike="noStrike">
+            <a:endParaRPr b="0" lang="en-GB" sz="1800" spc="-1" strike="noStrike">
               <a:solidFill>
                 <a:srgbClr val="000000"/>
               </a:solidFill>
@@ -6875,7 +6876,7 @@
         <p:spPr>
           <a:xfrm>
             <a:off x="336600" y="3429000"/>
-            <a:ext cx="10856520" cy="2048400"/>
+            <a:ext cx="10856160" cy="2048040"/>
           </a:xfrm>
           <a:prstGeom prst="rect">
             <a:avLst/>
@@ -6965,7 +6966,7 @@
               </a:rPr>
               <a:t> .</a:t>
             </a:r>
-            <a:endParaRPr b="0" lang="en-US" sz="2000" spc="-1" strike="noStrike">
+            <a:endParaRPr b="0" lang="en-GB" sz="2000" spc="-1" strike="noStrike">
               <a:solidFill>
                 <a:srgbClr val="000000"/>
               </a:solidFill>
@@ -7022,7 +7023,7 @@
               </a:rPr>
               <a:t>.</a:t>
             </a:r>
-            <a:endParaRPr b="0" lang="en-US" sz="2000" spc="-1" strike="noStrike">
+            <a:endParaRPr b="0" lang="en-GB" sz="2000" spc="-1" strike="noStrike">
               <a:solidFill>
                 <a:srgbClr val="000000"/>
               </a:solidFill>
@@ -7070,7 +7071,7 @@
         <p:spPr>
           <a:xfrm>
             <a:off x="335520" y="768240"/>
-            <a:ext cx="10740960" cy="491760"/>
+            <a:ext cx="10740600" cy="491400"/>
           </a:xfrm>
           <a:prstGeom prst="rect">
             <a:avLst/>
@@ -7106,7 +7107,7 @@
               </a:rPr>
               <a:t>Multiple-Choice Exercises</a:t>
             </a:r>
-            <a:endParaRPr b="0" lang="en-US" sz="2400" spc="-1" strike="noStrike">
+            <a:endParaRPr b="0" lang="en-GB" sz="2400" spc="-1" strike="noStrike">
               <a:solidFill>
                 <a:srgbClr val="000000"/>
               </a:solidFill>
@@ -7124,7 +7125,7 @@
         <p:spPr>
           <a:xfrm>
             <a:off x="388800" y="1488600"/>
-            <a:ext cx="10714680" cy="3505320"/>
+            <a:ext cx="10714320" cy="3505320"/>
           </a:xfrm>
           <a:prstGeom prst="rect">
             <a:avLst/>
@@ -7160,7 +7161,7 @@
               </a:rPr>
               <a:t>Every student enrolled in this course is advised to take the knowledge quiz in first two weeks of the course.  </a:t>
             </a:r>
-            <a:endParaRPr b="0" lang="en-US" sz="1400" spc="-1" strike="noStrike">
+            <a:endParaRPr b="0" lang="en-GB" sz="1400" spc="-1" strike="noStrike">
               <a:solidFill>
                 <a:srgbClr val="000000"/>
               </a:solidFill>
@@ -7173,7 +7174,7 @@
                 <a:spcPct val="100000"/>
               </a:lnSpc>
             </a:pPr>
-            <a:endParaRPr b="0" lang="en-US" sz="1400" spc="-1" strike="noStrike">
+            <a:endParaRPr b="0" lang="en-GB" sz="1400" spc="-1" strike="noStrike">
               <a:solidFill>
                 <a:srgbClr val="000000"/>
               </a:solidFill>
@@ -7186,7 +7187,7 @@
                 <a:spcPct val="100000"/>
               </a:lnSpc>
             </a:pPr>
-            <a:endParaRPr b="0" lang="en-US" sz="1400" spc="-1" strike="noStrike">
+            <a:endParaRPr b="0" lang="en-GB" sz="1400" spc="-1" strike="noStrike">
               <a:solidFill>
                 <a:srgbClr val="000000"/>
               </a:solidFill>
@@ -7215,7 +7216,7 @@
               </a:rPr>
               <a:t>Goal of the test:</a:t>
             </a:r>
-            <a:endParaRPr b="0" lang="en-US" sz="1400" spc="-1" strike="noStrike">
+            <a:endParaRPr b="0" lang="en-GB" sz="1400" spc="-1" strike="noStrike">
               <a:solidFill>
                 <a:srgbClr val="000000"/>
               </a:solidFill>
@@ -7244,7 +7245,7 @@
               </a:rPr>
               <a:t>To check the knowledge level of the student that is relevant to this course of study.</a:t>
             </a:r>
-            <a:endParaRPr b="0" lang="en-US" sz="1400" spc="-1" strike="noStrike">
+            <a:endParaRPr b="0" lang="en-GB" sz="1400" spc="-1" strike="noStrike">
               <a:solidFill>
                 <a:srgbClr val="000000"/>
               </a:solidFill>
@@ -7267,7 +7268,7 @@
               </a:rPr>
               <a:t> </a:t>
             </a:r>
-            <a:endParaRPr b="0" lang="en-US" sz="1400" spc="-1" strike="noStrike">
+            <a:endParaRPr b="0" lang="en-GB" sz="1400" spc="-1" strike="noStrike">
               <a:solidFill>
                 <a:srgbClr val="000000"/>
               </a:solidFill>
@@ -7296,7 +7297,7 @@
               </a:rPr>
               <a:t>Preparation:</a:t>
             </a:r>
-            <a:endParaRPr b="0" lang="en-US" sz="1400" spc="-1" strike="noStrike">
+            <a:endParaRPr b="0" lang="en-GB" sz="1400" spc="-1" strike="noStrike">
               <a:solidFill>
                 <a:srgbClr val="000000"/>
               </a:solidFill>
@@ -7325,7 +7326,7 @@
               </a:rPr>
               <a:t>A review of basic concepts of Cryptography and Circular Economy is recommended for Week 1 and Week 2 respectively</a:t>
             </a:r>
-            <a:endParaRPr b="0" lang="en-US" sz="1400" spc="-1" strike="noStrike">
+            <a:endParaRPr b="0" lang="en-GB" sz="1400" spc="-1" strike="noStrike">
               <a:solidFill>
                 <a:srgbClr val="000000"/>
               </a:solidFill>
@@ -7354,7 +7355,7 @@
               </a:rPr>
               <a:t>Knowledge quiz for Week 1 only tests your existing knowledge.</a:t>
             </a:r>
-            <a:endParaRPr b="0" lang="en-US" sz="1400" spc="-1" strike="noStrike">
+            <a:endParaRPr b="0" lang="en-GB" sz="1400" spc="-1" strike="noStrike">
               <a:solidFill>
                 <a:srgbClr val="000000"/>
               </a:solidFill>
@@ -7377,7 +7378,7 @@
               </a:rPr>
               <a:t> </a:t>
             </a:r>
-            <a:endParaRPr b="0" lang="en-US" sz="1400" spc="-1" strike="noStrike">
+            <a:endParaRPr b="0" lang="en-GB" sz="1400" spc="-1" strike="noStrike">
               <a:solidFill>
                 <a:srgbClr val="000000"/>
               </a:solidFill>
@@ -7406,7 +7407,7 @@
               </a:rPr>
               <a:t>THE TEST IS JUST FOR YOU → WE CANNOT CHECK THE TEST RESULTS</a:t>
             </a:r>
-            <a:endParaRPr b="0" lang="en-US" sz="1400" spc="-1" strike="noStrike">
+            <a:endParaRPr b="0" lang="en-GB" sz="1400" spc="-1" strike="noStrike">
               <a:solidFill>
                 <a:srgbClr val="000000"/>
               </a:solidFill>
@@ -7419,7 +7420,7 @@
                 <a:spcPct val="100000"/>
               </a:lnSpc>
             </a:pPr>
-            <a:endParaRPr b="0" lang="en-US" sz="1400" spc="-1" strike="noStrike">
+            <a:endParaRPr b="0" lang="en-GB" sz="1400" spc="-1" strike="noStrike">
               <a:solidFill>
                 <a:srgbClr val="000000"/>
               </a:solidFill>
@@ -7432,7 +7433,7 @@
                 <a:spcPct val="100000"/>
               </a:lnSpc>
             </a:pPr>
-            <a:endParaRPr b="0" lang="en-US" sz="1400" spc="-1" strike="noStrike">
+            <a:endParaRPr b="0" lang="en-GB" sz="1400" spc="-1" strike="noStrike">
               <a:solidFill>
                 <a:srgbClr val="000000"/>
               </a:solidFill>
@@ -7465,7 +7466,7 @@
               </a:rPr>
               <a:t>etce.etce-lab.de</a:t>
             </a:r>
-            <a:endParaRPr b="0" lang="en-US" sz="1400" spc="-1" strike="noStrike">
+            <a:endParaRPr b="0" lang="en-GB" sz="1400" spc="-1" strike="noStrike">
               <a:solidFill>
                 <a:srgbClr val="000000"/>
               </a:solidFill>
@@ -7513,7 +7514,7 @@
         <p:spPr>
           <a:xfrm>
             <a:off x="335520" y="764640"/>
-            <a:ext cx="10740960" cy="491760"/>
+            <a:ext cx="10740600" cy="491400"/>
           </a:xfrm>
           <a:prstGeom prst="rect">
             <a:avLst/>
@@ -7549,7 +7550,7 @@
               </a:rPr>
               <a:t>Multiple-Choice Exercises </a:t>
             </a:r>
-            <a:endParaRPr b="0" lang="en-US" sz="2400" spc="-1" strike="noStrike">
+            <a:endParaRPr b="0" lang="en-GB" sz="2400" spc="-1" strike="noStrike">
               <a:solidFill>
                 <a:srgbClr val="000000"/>
               </a:solidFill>
@@ -7571,7 +7572,7 @@
         <p:spPr>
           <a:xfrm>
             <a:off x="3200400" y="685800"/>
-            <a:ext cx="5275800" cy="6000480"/>
+            <a:ext cx="5275440" cy="6000120"/>
           </a:xfrm>
           <a:prstGeom prst="rect">
             <a:avLst/>
@@ -7620,7 +7621,7 @@
         <p:spPr>
           <a:xfrm>
             <a:off x="335520" y="764640"/>
-            <a:ext cx="10740960" cy="491760"/>
+            <a:ext cx="10740600" cy="491400"/>
           </a:xfrm>
           <a:prstGeom prst="rect">
             <a:avLst/>
@@ -7656,7 +7657,7 @@
               </a:rPr>
               <a:t>Multiple-Choice Exercises </a:t>
             </a:r>
-            <a:endParaRPr b="0" lang="en-US" sz="2400" spc="-1" strike="noStrike">
+            <a:endParaRPr b="0" lang="en-GB" sz="2400" spc="-1" strike="noStrike">
               <a:solidFill>
                 <a:srgbClr val="000000"/>
               </a:solidFill>
@@ -7678,7 +7679,7 @@
         <p:spPr>
           <a:xfrm>
             <a:off x="1600200" y="1600200"/>
-            <a:ext cx="8362080" cy="4630680"/>
+            <a:ext cx="8361720" cy="4630320"/>
           </a:xfrm>
           <a:prstGeom prst="rect">
             <a:avLst/>
@@ -7727,7 +7728,7 @@
         <p:spPr>
           <a:xfrm>
             <a:off x="335520" y="764640"/>
-            <a:ext cx="10740960" cy="491760"/>
+            <a:ext cx="10740600" cy="491400"/>
           </a:xfrm>
           <a:prstGeom prst="rect">
             <a:avLst/>
@@ -7763,7 +7764,7 @@
               </a:rPr>
               <a:t>Examination</a:t>
             </a:r>
-            <a:endParaRPr b="0" lang="en-US" sz="2400" spc="-1" strike="noStrike">
+            <a:endParaRPr b="0" lang="en-GB" sz="2400" spc="-1" strike="noStrike">
               <a:solidFill>
                 <a:srgbClr val="000000"/>
               </a:solidFill>
@@ -7781,7 +7782,7 @@
         <p:spPr>
           <a:xfrm>
             <a:off x="335520" y="1268640"/>
-            <a:ext cx="10740960" cy="5028480"/>
+            <a:ext cx="10740600" cy="5028120"/>
           </a:xfrm>
           <a:prstGeom prst="rect">
             <a:avLst/>
@@ -7826,7 +7827,7 @@
               </a:rPr>
               <a:t>Prerequisite for admission to the final exam (all criteria have to be fulfilled):</a:t>
             </a:r>
-            <a:endParaRPr b="0" lang="en-US" sz="1800" spc="-1" strike="noStrike">
+            <a:endParaRPr b="0" lang="en-GB" sz="1800" spc="-1" strike="noStrike">
               <a:solidFill>
                 <a:srgbClr val="000000"/>
               </a:solidFill>
@@ -7858,7 +7859,7 @@
               </a:rPr>
               <a:t>Submit all exercises (except for the MC exercises).</a:t>
             </a:r>
-            <a:endParaRPr b="0" lang="en-US" sz="1800" spc="-1" strike="noStrike">
+            <a:endParaRPr b="0" lang="en-GB" sz="1800" spc="-1" strike="noStrike">
               <a:solidFill>
                 <a:srgbClr val="000000"/>
               </a:solidFill>
@@ -7874,7 +7875,7 @@
                 <a:spcPts val="360"/>
               </a:spcBef>
             </a:pPr>
-            <a:endParaRPr b="0" lang="en-US" sz="1800" spc="-1" strike="noStrike">
+            <a:endParaRPr b="0" lang="en-GB" sz="1800" spc="-1" strike="noStrike">
               <a:solidFill>
                 <a:srgbClr val="000000"/>
               </a:solidFill>
@@ -7906,7 +7907,7 @@
               </a:rPr>
               <a:t>Final exam:</a:t>
             </a:r>
-            <a:endParaRPr b="0" lang="en-US" sz="1800" spc="-1" strike="noStrike">
+            <a:endParaRPr b="0" lang="en-GB" sz="1800" spc="-1" strike="noStrike">
               <a:solidFill>
                 <a:srgbClr val="000000"/>
               </a:solidFill>
@@ -7938,7 +7939,7 @@
               </a:rPr>
               <a:t>Written exam (120min) via Moodle</a:t>
             </a:r>
-            <a:endParaRPr b="0" lang="en-US" sz="1800" spc="-1" strike="noStrike">
+            <a:endParaRPr b="0" lang="en-GB" sz="1800" spc="-1" strike="noStrike">
               <a:solidFill>
                 <a:srgbClr val="000000"/>
               </a:solidFill>
@@ -7978,9 +7979,9 @@
                 <a:latin typeface="DejaVu Sans"/>
                 <a:ea typeface="DejaVu Sans"/>
               </a:rPr>
-              <a:t>05.08.2024 from 2 pm – 4 pm</a:t>
-            </a:r>
-            <a:endParaRPr b="0" lang="en-US" sz="1800" spc="-1" strike="noStrike">
+              <a:t>29.07.2024 from 2 pm – 4 pm</a:t>
+            </a:r>
+            <a:endParaRPr b="0" lang="en-GB" sz="1800" spc="-1" strike="noStrike">
               <a:solidFill>
                 <a:srgbClr val="000000"/>
               </a:solidFill>
@@ -8028,7 +8029,7 @@
         <p:spPr>
           <a:xfrm>
             <a:off x="335520" y="764640"/>
-            <a:ext cx="10739160" cy="489960"/>
+            <a:ext cx="10738800" cy="489600"/>
           </a:xfrm>
           <a:prstGeom prst="rect">
             <a:avLst/>
@@ -8064,7 +8065,7 @@
               </a:rPr>
               <a:t>Self-Study Star</a:t>
             </a:r>
-            <a:endParaRPr b="0" lang="en-US" sz="2400" spc="-1" strike="noStrike">
+            <a:endParaRPr b="0" lang="en-GB" sz="2400" spc="-1" strike="noStrike">
               <a:solidFill>
                 <a:srgbClr val="000000"/>
               </a:solidFill>
@@ -8082,7 +8083,7 @@
         <p:spPr>
           <a:xfrm>
             <a:off x="335520" y="1268280"/>
-            <a:ext cx="10739160" cy="5026680"/>
+            <a:ext cx="10738800" cy="5026320"/>
           </a:xfrm>
           <a:prstGeom prst="rect">
             <a:avLst/>
@@ -8111,7 +8112,7 @@
                 <a:spcPts val="360"/>
               </a:spcBef>
             </a:pPr>
-            <a:endParaRPr b="0" lang="en-US" sz="1800" spc="-1" strike="noStrike">
+            <a:endParaRPr b="0" lang="en-GB" sz="1800" spc="-1" strike="noStrike">
               <a:solidFill>
                 <a:srgbClr val="000000"/>
               </a:solidFill>
@@ -8160,7 +8161,7 @@
               </a:rPr>
               <a:t> mandatory but could be helpful or interesting</a:t>
             </a:r>
-            <a:endParaRPr b="0" lang="en-US" sz="1800" spc="-1" strike="noStrike">
+            <a:endParaRPr b="0" lang="en-GB" sz="1800" spc="-1" strike="noStrike">
               <a:solidFill>
                 <a:srgbClr val="000000"/>
               </a:solidFill>
@@ -8178,7 +8179,7 @@
         <p:spPr>
           <a:xfrm>
             <a:off x="6285600" y="2132640"/>
-            <a:ext cx="508680" cy="488520"/>
+            <a:ext cx="508320" cy="488160"/>
           </a:xfrm>
           <a:prstGeom prst="star5">
             <a:avLst>
@@ -8239,7 +8240,7 @@
         <p:spPr>
           <a:xfrm>
             <a:off x="4089960" y="2247480"/>
-            <a:ext cx="2277000" cy="363960"/>
+            <a:ext cx="2276640" cy="363960"/>
           </a:xfrm>
           <a:prstGeom prst="rect">
             <a:avLst/>
@@ -8295,7 +8296,7 @@
               </a:rPr>
               <a:t> </a:t>
             </a:r>
-            <a:endParaRPr b="0" lang="en-US" sz="1800" spc="-1" strike="noStrike">
+            <a:endParaRPr b="0" lang="en-GB" sz="1800" spc="-1" strike="noStrike">
               <a:solidFill>
                 <a:srgbClr val="000000"/>
               </a:solidFill>
@@ -8343,7 +8344,7 @@
         <p:spPr>
           <a:xfrm>
             <a:off x="335520" y="764640"/>
-            <a:ext cx="10739160" cy="489960"/>
+            <a:ext cx="10738800" cy="489600"/>
           </a:xfrm>
           <a:prstGeom prst="rect">
             <a:avLst/>
@@ -8379,7 +8380,7 @@
               </a:rPr>
               <a:t>Literature</a:t>
             </a:r>
-            <a:endParaRPr b="0" lang="en-US" sz="2400" spc="-1" strike="noStrike">
+            <a:endParaRPr b="0" lang="en-GB" sz="2400" spc="-1" strike="noStrike">
               <a:solidFill>
                 <a:srgbClr val="000000"/>
               </a:solidFill>
@@ -8397,7 +8398,7 @@
         <p:spPr>
           <a:xfrm>
             <a:off x="335520" y="1268640"/>
-            <a:ext cx="10739160" cy="5026680"/>
+            <a:ext cx="10738800" cy="5026320"/>
           </a:xfrm>
           <a:prstGeom prst="rect">
             <a:avLst/>
@@ -8462,7 +8463,7 @@
               </a:rPr>
               <a:t> need to buy a book to pass the exam.</a:t>
             </a:r>
-            <a:endParaRPr b="0" lang="en-US" sz="1800" spc="-1" strike="noStrike">
+            <a:endParaRPr b="0" lang="en-GB" sz="1800" spc="-1" strike="noStrike">
               <a:solidFill>
                 <a:srgbClr val="000000"/>
               </a:solidFill>
@@ -8478,7 +8479,7 @@
                 <a:spcPts val="360"/>
               </a:spcBef>
             </a:pPr>
-            <a:endParaRPr b="0" lang="en-US" sz="1800" spc="-1" strike="noStrike">
+            <a:endParaRPr b="0" lang="en-GB" sz="1800" spc="-1" strike="noStrike">
               <a:solidFill>
                 <a:srgbClr val="000000"/>
               </a:solidFill>
@@ -8530,7 +8531,7 @@
               </a:rPr>
               <a:t> (1972).</a:t>
             </a:r>
-            <a:endParaRPr b="0" lang="en-US" sz="1800" spc="-1" strike="noStrike">
+            <a:endParaRPr b="0" lang="en-GB" sz="1800" spc="-1" strike="noStrike">
               <a:solidFill>
                 <a:srgbClr val="000000"/>
               </a:solidFill>
@@ -8582,7 +8583,7 @@
               </a:rPr>
               <a:t> (2004).</a:t>
             </a:r>
-            <a:endParaRPr b="0" lang="en-US" sz="1800" spc="-1" strike="noStrike">
+            <a:endParaRPr b="0" lang="en-GB" sz="1800" spc="-1" strike="noStrike">
               <a:solidFill>
                 <a:srgbClr val="000000"/>
               </a:solidFill>
@@ -8634,7 +8635,7 @@
               </a:rPr>
               <a:t>(2012).</a:t>
             </a:r>
-            <a:endParaRPr b="0" lang="en-US" sz="1800" spc="-1" strike="noStrike">
+            <a:endParaRPr b="0" lang="en-GB" sz="1800" spc="-1" strike="noStrike">
               <a:solidFill>
                 <a:srgbClr val="000000"/>
               </a:solidFill>
@@ -8686,7 +8687,7 @@
               </a:rPr>
               <a:t> (2019).</a:t>
             </a:r>
-            <a:endParaRPr b="0" lang="en-US" sz="1800" spc="-1" strike="noStrike">
+            <a:endParaRPr b="0" lang="en-GB" sz="1800" spc="-1" strike="noStrike">
               <a:solidFill>
                 <a:srgbClr val="000000"/>
               </a:solidFill>
@@ -8738,7 +8739,7 @@
               </a:rPr>
               <a:t> (2011).</a:t>
             </a:r>
-            <a:endParaRPr b="0" lang="en-US" sz="1800" spc="-1" strike="noStrike">
+            <a:endParaRPr b="0" lang="en-GB" sz="1800" spc="-1" strike="noStrike">
               <a:solidFill>
                 <a:srgbClr val="000000"/>
               </a:solidFill>
@@ -8790,7 +8791,7 @@
               </a:rPr>
               <a:t> (2017).</a:t>
             </a:r>
-            <a:endParaRPr b="0" lang="en-US" sz="1800" spc="-1" strike="noStrike">
+            <a:endParaRPr b="0" lang="en-GB" sz="1800" spc="-1" strike="noStrike">
               <a:solidFill>
                 <a:srgbClr val="000000"/>
               </a:solidFill>
@@ -8838,7 +8839,7 @@
         <p:spPr>
           <a:xfrm>
             <a:off x="335520" y="764640"/>
-            <a:ext cx="10742400" cy="493200"/>
+            <a:ext cx="10742040" cy="492840"/>
           </a:xfrm>
           <a:prstGeom prst="rect">
             <a:avLst/>
@@ -8874,7 +8875,7 @@
               </a:rPr>
               <a:t>Literature</a:t>
             </a:r>
-            <a:endParaRPr b="0" lang="en-US" sz="2400" spc="-1" strike="noStrike">
+            <a:endParaRPr b="0" lang="en-GB" sz="2400" spc="-1" strike="noStrike">
               <a:solidFill>
                 <a:srgbClr val="000000"/>
               </a:solidFill>
@@ -8892,7 +8893,7 @@
         <p:spPr>
           <a:xfrm>
             <a:off x="335520" y="1268640"/>
-            <a:ext cx="10742400" cy="5029920"/>
+            <a:ext cx="10742040" cy="5029560"/>
           </a:xfrm>
           <a:prstGeom prst="rect">
             <a:avLst/>
@@ -8957,7 +8958,7 @@
               </a:rPr>
               <a:t> (2019).</a:t>
             </a:r>
-            <a:endParaRPr b="0" lang="en-US" sz="1800" spc="-1" strike="noStrike">
+            <a:endParaRPr b="0" lang="en-GB" sz="1800" spc="-1" strike="noStrike">
               <a:solidFill>
                 <a:srgbClr val="000000"/>
               </a:solidFill>
@@ -9009,7 +9010,7 @@
               </a:rPr>
               <a:t> (2010).</a:t>
             </a:r>
-            <a:endParaRPr b="0" lang="en-US" sz="1800" spc="-1" strike="noStrike">
+            <a:endParaRPr b="0" lang="en-GB" sz="1800" spc="-1" strike="noStrike">
               <a:solidFill>
                 <a:srgbClr val="000000"/>
               </a:solidFill>
@@ -9061,7 +9062,7 @@
               </a:rPr>
               <a:t> (2008).</a:t>
             </a:r>
-            <a:endParaRPr b="0" lang="en-US" sz="1800" spc="-1" strike="noStrike">
+            <a:endParaRPr b="0" lang="en-GB" sz="1800" spc="-1" strike="noStrike">
               <a:solidFill>
                 <a:srgbClr val="000000"/>
               </a:solidFill>
@@ -9109,7 +9110,7 @@
         <p:spPr>
           <a:xfrm>
             <a:off x="335520" y="764640"/>
-            <a:ext cx="10740960" cy="491760"/>
+            <a:ext cx="10740600" cy="491400"/>
           </a:xfrm>
           <a:prstGeom prst="rect">
             <a:avLst/>
@@ -9145,7 +9146,7 @@
               </a:rPr>
               <a:t>Literature</a:t>
             </a:r>
-            <a:endParaRPr b="0" lang="en-US" sz="2400" spc="-1" strike="noStrike">
+            <a:endParaRPr b="0" lang="en-GB" sz="2400" spc="-1" strike="noStrike">
               <a:solidFill>
                 <a:srgbClr val="000000"/>
               </a:solidFill>
@@ -9163,7 +9164,7 @@
         <p:spPr>
           <a:xfrm>
             <a:off x="335520" y="1268640"/>
-            <a:ext cx="10740960" cy="5028480"/>
+            <a:ext cx="10740600" cy="5028120"/>
           </a:xfrm>
           <a:prstGeom prst="rect">
             <a:avLst/>
@@ -9192,7 +9193,7 @@
                 <a:spcPts val="360"/>
               </a:spcBef>
             </a:pPr>
-            <a:endParaRPr b="0" lang="en-US" sz="1800" spc="-1" strike="noStrike">
+            <a:endParaRPr b="0" lang="en-GB" sz="1800" spc="-1" strike="noStrike">
               <a:solidFill>
                 <a:srgbClr val="000000"/>
               </a:solidFill>
@@ -9266,7 +9267,7 @@
               </a:rPr>
               <a:t>).</a:t>
             </a:r>
-            <a:endParaRPr b="0" lang="en-US" sz="1800" spc="-1" strike="noStrike">
+            <a:endParaRPr b="0" lang="en-GB" sz="1800" spc="-1" strike="noStrike">
               <a:solidFill>
                 <a:srgbClr val="000000"/>
               </a:solidFill>
@@ -9340,7 +9341,7 @@
               </a:rPr>
               <a:t>).</a:t>
             </a:r>
-            <a:endParaRPr b="0" lang="en-US" sz="1800" spc="-1" strike="noStrike">
+            <a:endParaRPr b="0" lang="en-GB" sz="1800" spc="-1" strike="noStrike">
               <a:solidFill>
                 <a:srgbClr val="000000"/>
               </a:solidFill>
@@ -9392,7 +9393,7 @@
               </a:rPr>
               <a:t> (2019).</a:t>
             </a:r>
-            <a:endParaRPr b="0" lang="en-US" sz="1800" spc="-1" strike="noStrike">
+            <a:endParaRPr b="0" lang="en-GB" sz="1800" spc="-1" strike="noStrike">
               <a:solidFill>
                 <a:srgbClr val="000000"/>
               </a:solidFill>
@@ -9444,7 +9445,7 @@
               </a:rPr>
               <a:t> (2020).</a:t>
             </a:r>
-            <a:endParaRPr b="0" lang="en-US" sz="1800" spc="-1" strike="noStrike">
+            <a:endParaRPr b="0" lang="en-GB" sz="1800" spc="-1" strike="noStrike">
               <a:solidFill>
                 <a:srgbClr val="000000"/>
               </a:solidFill>
@@ -9496,7 +9497,7 @@
               </a:rPr>
               <a:t> (2018).</a:t>
             </a:r>
-            <a:endParaRPr b="0" lang="en-US" sz="1800" spc="-1" strike="noStrike">
+            <a:endParaRPr b="0" lang="en-GB" sz="1800" spc="-1" strike="noStrike">
               <a:solidFill>
                 <a:srgbClr val="000000"/>
               </a:solidFill>
@@ -9548,7 +9549,7 @@
               </a:rPr>
               <a:t> (2018).</a:t>
             </a:r>
-            <a:endParaRPr b="0" lang="en-US" sz="1800" spc="-1" strike="noStrike">
+            <a:endParaRPr b="0" lang="en-GB" sz="1800" spc="-1" strike="noStrike">
               <a:solidFill>
                 <a:srgbClr val="000000"/>
               </a:solidFill>
@@ -9600,7 +9601,7 @@
               </a:rPr>
               <a:t> (2010).</a:t>
             </a:r>
-            <a:endParaRPr b="0" lang="en-US" sz="1800" spc="-1" strike="noStrike">
+            <a:endParaRPr b="0" lang="en-GB" sz="1800" spc="-1" strike="noStrike">
               <a:solidFill>
                 <a:srgbClr val="000000"/>
               </a:solidFill>
@@ -9648,7 +9649,7 @@
         <p:spPr>
           <a:xfrm>
             <a:off x="335520" y="764640"/>
-            <a:ext cx="10739160" cy="489960"/>
+            <a:ext cx="10738800" cy="489600"/>
           </a:xfrm>
           <a:prstGeom prst="rect">
             <a:avLst/>
@@ -9684,7 +9685,7 @@
               </a:rPr>
               <a:t>Further Resources </a:t>
             </a:r>
-            <a:endParaRPr b="0" lang="en-US" sz="2400" spc="-1" strike="noStrike">
+            <a:endParaRPr b="0" lang="en-GB" sz="2400" spc="-1" strike="noStrike">
               <a:solidFill>
                 <a:srgbClr val="000000"/>
               </a:solidFill>
@@ -9702,7 +9703,7 @@
         <p:spPr>
           <a:xfrm>
             <a:off x="335520" y="1268640"/>
-            <a:ext cx="10739160" cy="5026680"/>
+            <a:ext cx="10738800" cy="5026320"/>
           </a:xfrm>
           <a:prstGeom prst="rect">
             <a:avLst/>
@@ -9759,7 +9760,7 @@
               </a:rPr>
               <a:t>Link</a:t>
             </a:r>
-            <a:endParaRPr b="0" lang="en-US" sz="1800" spc="-1" strike="noStrike">
+            <a:endParaRPr b="0" lang="en-GB" sz="1800" spc="-1" strike="noStrike">
               <a:solidFill>
                 <a:srgbClr val="000000"/>
               </a:solidFill>
@@ -9813,7 +9814,7 @@
               </a:rPr>
               <a:t> </a:t>
             </a:r>
-            <a:endParaRPr b="0" lang="en-US" sz="1800" spc="-1" strike="noStrike">
+            <a:endParaRPr b="0" lang="en-GB" sz="1800" spc="-1" strike="noStrike">
               <a:solidFill>
                 <a:srgbClr val="000000"/>
               </a:solidFill>
@@ -9857,7 +9858,7 @@
               </a:rPr>
               <a:t>Link</a:t>
             </a:r>
-            <a:endParaRPr b="0" lang="en-US" sz="1800" spc="-1" strike="noStrike">
+            <a:endParaRPr b="0" lang="en-GB" sz="1800" spc="-1" strike="noStrike">
               <a:solidFill>
                 <a:srgbClr val="000000"/>
               </a:solidFill>
@@ -9889,7 +9890,7 @@
               </a:rPr>
               <a:t>Podcasts:</a:t>
             </a:r>
-            <a:endParaRPr b="0" lang="en-US" sz="1800" spc="-1" strike="noStrike">
+            <a:endParaRPr b="0" lang="en-GB" sz="1800" spc="-1" strike="noStrike">
               <a:solidFill>
                 <a:srgbClr val="000000"/>
               </a:solidFill>
@@ -9940,7 +9941,7 @@
               </a:rPr>
               <a:t>)</a:t>
             </a:r>
-            <a:endParaRPr b="0" lang="en-US" sz="1800" spc="-1" strike="noStrike">
+            <a:endParaRPr b="0" lang="en-GB" sz="1800" spc="-1" strike="noStrike">
               <a:solidFill>
                 <a:srgbClr val="000000"/>
               </a:solidFill>
@@ -9994,7 +9995,7 @@
               </a:rPr>
               <a:t>)</a:t>
             </a:r>
-            <a:endParaRPr b="0" lang="en-US" sz="1800" spc="-1" strike="noStrike">
+            <a:endParaRPr b="0" lang="en-GB" sz="1800" spc="-1" strike="noStrike">
               <a:solidFill>
                 <a:srgbClr val="000000"/>
               </a:solidFill>
@@ -10048,7 +10049,7 @@
               </a:rPr>
               <a:t>)</a:t>
             </a:r>
-            <a:endParaRPr b="0" lang="en-US" sz="1800" spc="-1" strike="noStrike">
+            <a:endParaRPr b="0" lang="en-GB" sz="1800" spc="-1" strike="noStrike">
               <a:solidFill>
                 <a:srgbClr val="000000"/>
               </a:solidFill>
@@ -10096,7 +10097,7 @@
         <p:spPr>
           <a:xfrm>
             <a:off x="335520" y="1268640"/>
-            <a:ext cx="10740960" cy="5028480"/>
+            <a:ext cx="10740600" cy="5028120"/>
           </a:xfrm>
           <a:prstGeom prst="rect">
             <a:avLst/>
@@ -10138,7 +10139,7 @@
               </a:rPr>
               <a:t>Questions?</a:t>
             </a:r>
-            <a:endParaRPr b="0" lang="en-US" sz="4000" spc="-1" strike="noStrike">
+            <a:endParaRPr b="0" lang="en-GB" sz="4000" spc="-1" strike="noStrike">
               <a:solidFill>
                 <a:srgbClr val="000000"/>
               </a:solidFill>
@@ -10156,7 +10157,7 @@
         <p:spPr>
           <a:xfrm>
             <a:off x="335520" y="764640"/>
-            <a:ext cx="10740960" cy="491760"/>
+            <a:ext cx="10740600" cy="491400"/>
           </a:xfrm>
           <a:prstGeom prst="rect">
             <a:avLst/>
@@ -10231,7 +10232,7 @@
         <p:spPr>
           <a:xfrm>
             <a:off x="335520" y="764640"/>
-            <a:ext cx="10740960" cy="491760"/>
+            <a:ext cx="10740600" cy="491400"/>
           </a:xfrm>
           <a:prstGeom prst="rect">
             <a:avLst/>
@@ -10267,7 +10268,7 @@
               </a:rPr>
               <a:t>Team</a:t>
             </a:r>
-            <a:endParaRPr b="0" lang="en-US" sz="2400" spc="-1" strike="noStrike">
+            <a:endParaRPr b="0" lang="en-GB" sz="2400" spc="-1" strike="noStrike">
               <a:solidFill>
                 <a:srgbClr val="000000"/>
               </a:solidFill>
@@ -10289,7 +10290,7 @@
         <p:spPr>
           <a:xfrm>
             <a:off x="4923720" y="1257120"/>
-            <a:ext cx="1463760" cy="2165040"/>
+            <a:ext cx="1463400" cy="2164680"/>
           </a:xfrm>
           <a:prstGeom prst="rect">
             <a:avLst/>
@@ -10312,7 +10313,7 @@
         <p:spPr>
           <a:xfrm>
             <a:off x="2207880" y="4110120"/>
-            <a:ext cx="1777680" cy="1769760"/>
+            <a:ext cx="1777320" cy="1769400"/>
           </a:xfrm>
           <a:prstGeom prst="rect">
             <a:avLst/>
@@ -10331,7 +10332,7 @@
         <p:spPr>
           <a:xfrm>
             <a:off x="3859200" y="3373200"/>
-            <a:ext cx="3628440" cy="669960"/>
+            <a:ext cx="3628080" cy="669600"/>
           </a:xfrm>
           <a:prstGeom prst="rect">
             <a:avLst/>
@@ -10370,7 +10371,7 @@
               </a:rPr>
               <a:t>Prof. Dr. Benjamin Leiding</a:t>
             </a:r>
-            <a:endParaRPr b="0" lang="en-US" sz="1600" spc="-1" strike="noStrike">
+            <a:endParaRPr b="0" lang="en-GB" sz="1600" spc="-1" strike="noStrike">
               <a:solidFill>
                 <a:srgbClr val="000000"/>
               </a:solidFill>
@@ -10388,7 +10389,7 @@
         <p:spPr>
           <a:xfrm>
             <a:off x="1312200" y="5920200"/>
-            <a:ext cx="3628440" cy="669960"/>
+            <a:ext cx="3628080" cy="669600"/>
           </a:xfrm>
           <a:prstGeom prst="rect">
             <a:avLst/>
@@ -10417,7 +10418,7 @@
                 <a:spcPts val="360"/>
               </a:spcBef>
             </a:pPr>
-            <a:endParaRPr b="0" lang="en-US" sz="1800" spc="-1" strike="noStrike">
+            <a:endParaRPr b="0" lang="en-GB" sz="1800" spc="-1" strike="noStrike">
               <a:solidFill>
                 <a:srgbClr val="000000"/>
               </a:solidFill>
@@ -10433,7 +10434,7 @@
                 <a:spcPts val="360"/>
               </a:spcBef>
             </a:pPr>
-            <a:endParaRPr b="0" lang="en-US" sz="1800" spc="-1" strike="noStrike">
+            <a:endParaRPr b="0" lang="en-GB" sz="1800" spc="-1" strike="noStrike">
               <a:solidFill>
                 <a:srgbClr val="000000"/>
               </a:solidFill>
@@ -10451,7 +10452,7 @@
         <p:spPr>
           <a:xfrm>
             <a:off x="1312200" y="5807160"/>
-            <a:ext cx="3628440" cy="669960"/>
+            <a:ext cx="3628080" cy="669600"/>
           </a:xfrm>
           <a:prstGeom prst="rect">
             <a:avLst/>
@@ -10490,7 +10491,7 @@
               </a:rPr>
               <a:t>M.Sc. Anant Sujatanagarjuna</a:t>
             </a:r>
-            <a:endParaRPr b="0" lang="en-US" sz="1600" spc="-1" strike="noStrike">
+            <a:endParaRPr b="0" lang="en-GB" sz="1600" spc="-1" strike="noStrike">
               <a:solidFill>
                 <a:srgbClr val="000000"/>
               </a:solidFill>
@@ -10508,7 +10509,7 @@
         <p:spPr>
           <a:xfrm>
             <a:off x="4860000" y="5920200"/>
-            <a:ext cx="3628440" cy="669960"/>
+            <a:ext cx="3628080" cy="669600"/>
           </a:xfrm>
           <a:prstGeom prst="rect">
             <a:avLst/>
@@ -10553,7 +10554,7 @@
         <p:spPr>
           <a:xfrm>
             <a:off x="6300000" y="5807160"/>
-            <a:ext cx="3628440" cy="669960"/>
+            <a:ext cx="3628080" cy="669600"/>
           </a:xfrm>
           <a:prstGeom prst="rect">
             <a:avLst/>
@@ -10592,7 +10593,7 @@
               </a:rPr>
               <a:t>M.Sc. Shohreh Kia</a:t>
             </a:r>
-            <a:endParaRPr b="0" lang="en-US" sz="1600" spc="-1" strike="noStrike">
+            <a:endParaRPr b="0" lang="en-GB" sz="1600" spc="-1" strike="noStrike">
               <a:solidFill>
                 <a:srgbClr val="000000"/>
               </a:solidFill>
@@ -10615,7 +10616,7 @@
         <p:spPr>
           <a:xfrm>
             <a:off x="7380000" y="3960000"/>
-            <a:ext cx="1437120" cy="1920960"/>
+            <a:ext cx="1436760" cy="1920600"/>
           </a:xfrm>
           <a:prstGeom prst="rect">
             <a:avLst/>
@@ -10664,7 +10665,7 @@
         <p:spPr>
           <a:xfrm>
             <a:off x="542880" y="721800"/>
-            <a:ext cx="10345320" cy="486000"/>
+            <a:ext cx="10344960" cy="485640"/>
           </a:xfrm>
           <a:prstGeom prst="rect">
             <a:avLst/>
@@ -10700,7 +10701,7 @@
               </a:rPr>
               <a:t>ETCE Research Group</a:t>
             </a:r>
-            <a:endParaRPr b="0" lang="en-US" sz="2200" spc="-1" strike="noStrike">
+            <a:endParaRPr b="0" lang="en-GB" sz="2200" spc="-1" strike="noStrike">
               <a:solidFill>
                 <a:srgbClr val="000000"/>
               </a:solidFill>
@@ -10718,7 +10719,7 @@
         <p:spPr>
           <a:xfrm>
             <a:off x="451800" y="1709280"/>
-            <a:ext cx="8212680" cy="4340880"/>
+            <a:ext cx="8212320" cy="4340520"/>
           </a:xfrm>
           <a:prstGeom prst="rect">
             <a:avLst/>
@@ -10763,7 +10764,7 @@
         <p:spPr>
           <a:xfrm>
             <a:off x="609480" y="1769400"/>
-            <a:ext cx="10575720" cy="4843800"/>
+            <a:ext cx="10575360" cy="4843440"/>
           </a:xfrm>
           <a:prstGeom prst="rect">
             <a:avLst/>
@@ -10888,7 +10889,7 @@
               </a:rPr>
               <a:t>ETCE</a:t>
             </a:r>
-            <a:endParaRPr b="0" lang="en-US" sz="2000" spc="-1" strike="noStrike">
+            <a:endParaRPr b="0" lang="en-GB" sz="2000" spc="-1" strike="noStrike">
               <a:solidFill>
                 <a:srgbClr val="000000"/>
               </a:solidFill>
@@ -10920,7 +10921,7 @@
               </a:rPr>
               <a:t>Research focus:</a:t>
             </a:r>
-            <a:endParaRPr b="0" lang="en-US" sz="2000" spc="-1" strike="noStrike">
+            <a:endParaRPr b="0" lang="en-GB" sz="2000" spc="-1" strike="noStrike">
               <a:solidFill>
                 <a:srgbClr val="000000"/>
               </a:solidFill>
@@ -10952,7 +10953,7 @@
               </a:rPr>
               <a:t>Intersection of IT and sustainability</a:t>
             </a:r>
-            <a:endParaRPr b="0" lang="en-US" sz="1800" spc="-1" strike="noStrike">
+            <a:endParaRPr b="0" lang="en-GB" sz="1800" spc="-1" strike="noStrike">
               <a:solidFill>
                 <a:srgbClr val="000000"/>
               </a:solidFill>
@@ -10984,7 +10985,7 @@
               </a:rPr>
               <a:t>Circular Economy</a:t>
             </a:r>
-            <a:endParaRPr b="0" lang="en-US" sz="1800" spc="-1" strike="noStrike">
+            <a:endParaRPr b="0" lang="en-GB" sz="1800" spc="-1" strike="noStrike">
               <a:solidFill>
                 <a:srgbClr val="000000"/>
               </a:solidFill>
@@ -11016,7 +11017,7 @@
               </a:rPr>
               <a:t>Self-organized, decentralized and distributed systems</a:t>
             </a:r>
-            <a:endParaRPr b="0" lang="en-US" sz="1800" spc="-1" strike="noStrike">
+            <a:endParaRPr b="0" lang="en-GB" sz="1800" spc="-1" strike="noStrike">
               <a:solidFill>
                 <a:srgbClr val="000000"/>
               </a:solidFill>
@@ -11048,7 +11049,7 @@
               </a:rPr>
               <a:t>Sustainable and resilient food production</a:t>
             </a:r>
-            <a:endParaRPr b="0" lang="en-US" sz="1800" spc="-1" strike="noStrike">
+            <a:endParaRPr b="0" lang="en-GB" sz="1800" spc="-1" strike="noStrike">
               <a:solidFill>
                 <a:srgbClr val="000000"/>
               </a:solidFill>
@@ -11080,7 +11081,7 @@
               </a:rPr>
               <a:t>Other courses:</a:t>
             </a:r>
-            <a:endParaRPr b="0" lang="en-US" sz="2000" spc="-1" strike="noStrike">
+            <a:endParaRPr b="0" lang="en-GB" sz="2000" spc="-1" strike="noStrike">
               <a:solidFill>
                 <a:srgbClr val="000000"/>
               </a:solidFill>
@@ -11112,7 +11113,7 @@
               </a:rPr>
               <a:t>The Limits to Growth – Sustainability and the Circular Economy (WS – open for everyone)</a:t>
             </a:r>
-            <a:endParaRPr b="0" lang="en-US" sz="1800" spc="-1" strike="noStrike">
+            <a:endParaRPr b="0" lang="en-GB" sz="1800" spc="-1" strike="noStrike">
               <a:solidFill>
                 <a:srgbClr val="000000"/>
               </a:solidFill>
@@ -11144,7 +11145,7 @@
               </a:rPr>
               <a:t>Requirements Engineering (WS – M.Sc.)</a:t>
             </a:r>
-            <a:endParaRPr b="0" lang="en-US" sz="1800" spc="-1" strike="noStrike">
+            <a:endParaRPr b="0" lang="en-GB" sz="1800" spc="-1" strike="noStrike">
               <a:solidFill>
                 <a:srgbClr val="000000"/>
               </a:solidFill>
@@ -11192,7 +11193,7 @@
         <p:spPr>
           <a:xfrm>
             <a:off x="542880" y="721800"/>
-            <a:ext cx="10345320" cy="486000"/>
+            <a:ext cx="10344960" cy="485640"/>
           </a:xfrm>
           <a:prstGeom prst="rect">
             <a:avLst/>
@@ -11228,7 +11229,7 @@
               </a:rPr>
               <a:t>ETCE Research Group</a:t>
             </a:r>
-            <a:endParaRPr b="0" lang="en-US" sz="2200" spc="-1" strike="noStrike">
+            <a:endParaRPr b="0" lang="en-GB" sz="2200" spc="-1" strike="noStrike">
               <a:solidFill>
                 <a:srgbClr val="000000"/>
               </a:solidFill>
@@ -11246,7 +11247,7 @@
         <p:spPr>
           <a:xfrm>
             <a:off x="451800" y="1709280"/>
-            <a:ext cx="8212680" cy="4340880"/>
+            <a:ext cx="8212320" cy="4340520"/>
           </a:xfrm>
           <a:prstGeom prst="rect">
             <a:avLst/>
@@ -11291,7 +11292,7 @@
         <p:spPr>
           <a:xfrm>
             <a:off x="609480" y="1769400"/>
-            <a:ext cx="10575720" cy="4843800"/>
+            <a:ext cx="10575360" cy="4843440"/>
           </a:xfrm>
           <a:prstGeom prst="rect">
             <a:avLst/>
@@ -11358,7 +11359,7 @@
               </a:rPr>
               <a:t> </a:t>
             </a:r>
-            <a:endParaRPr b="0" lang="en-US" sz="2000" spc="-1" strike="noStrike">
+            <a:endParaRPr b="0" lang="en-GB" sz="2000" spc="-1" strike="noStrike">
               <a:solidFill>
                 <a:srgbClr val="000000"/>
               </a:solidFill>
@@ -11390,7 +11391,7 @@
               </a:rPr>
               <a:t>Course material </a:t>
             </a:r>
-            <a:endParaRPr b="0" lang="en-US" sz="1800" spc="-1" strike="noStrike">
+            <a:endParaRPr b="0" lang="en-GB" sz="1800" spc="-1" strike="noStrike">
               <a:solidFill>
                 <a:srgbClr val="000000"/>
               </a:solidFill>
@@ -11422,7 +11423,7 @@
               </a:rPr>
               <a:t>Theses/project topics</a:t>
             </a:r>
-            <a:endParaRPr b="0" lang="en-US" sz="1800" spc="-1" strike="noStrike">
+            <a:endParaRPr b="0" lang="en-GB" sz="1800" spc="-1" strike="noStrike">
               <a:solidFill>
                 <a:srgbClr val="000000"/>
               </a:solidFill>
@@ -11438,7 +11439,7 @@
                 <a:spcPts val="1009"/>
               </a:spcBef>
             </a:pPr>
-            <a:endParaRPr b="0" lang="en-US" sz="1800" spc="-1" strike="noStrike">
+            <a:endParaRPr b="0" lang="en-GB" sz="1800" spc="-1" strike="noStrike">
               <a:solidFill>
                 <a:srgbClr val="000000"/>
               </a:solidFill>
@@ -11473,7 +11474,7 @@
               </a:rPr>
               <a:t>Our research in action:</a:t>
             </a:r>
-            <a:endParaRPr b="0" lang="en-US" sz="2000" spc="-1" strike="noStrike">
+            <a:endParaRPr b="0" lang="en-GB" sz="2000" spc="-1" strike="noStrike">
               <a:solidFill>
                 <a:srgbClr val="000000"/>
               </a:solidFill>
@@ -11530,7 +11531,7 @@
               </a:rPr>
               <a:t> </a:t>
             </a:r>
-            <a:endParaRPr b="0" lang="en-US" sz="1800" spc="-1" strike="noStrike">
+            <a:endParaRPr b="0" lang="en-GB" sz="1800" spc="-1" strike="noStrike">
               <a:solidFill>
                 <a:srgbClr val="000000"/>
               </a:solidFill>
@@ -11587,7 +11588,7 @@
               </a:rPr>
               <a:t> </a:t>
             </a:r>
-            <a:endParaRPr b="0" lang="en-US" sz="1800" spc="-1" strike="noStrike">
+            <a:endParaRPr b="0" lang="en-GB" sz="1800" spc="-1" strike="noStrike">
               <a:solidFill>
                 <a:srgbClr val="000000"/>
               </a:solidFill>
@@ -11606,7 +11607,7 @@
                 <a:tab algn="l" pos="0"/>
               </a:tabLst>
             </a:pPr>
-            <a:endParaRPr b="0" lang="en-US" sz="1800" spc="-1" strike="noStrike">
+            <a:endParaRPr b="0" lang="en-GB" sz="1800" spc="-1" strike="noStrike">
               <a:solidFill>
                 <a:srgbClr val="000000"/>
               </a:solidFill>
@@ -11635,7 +11636,7 @@
               </a:rPr>
               <a:t>You want join us? Write us an email! </a:t>
             </a:r>
-            <a:endParaRPr b="0" lang="en-US" sz="2000" spc="-1" strike="noStrike">
+            <a:endParaRPr b="0" lang="en-GB" sz="2000" spc="-1" strike="noStrike">
               <a:solidFill>
                 <a:srgbClr val="000000"/>
               </a:solidFill>
@@ -11674,7 +11675,7 @@
               </a:rPr>
               <a:t>benjamin.leiding@tu-clausthal.de</a:t>
             </a:r>
-            <a:endParaRPr b="0" lang="en-US" sz="1600" spc="-1" strike="noStrike">
+            <a:endParaRPr b="0" lang="en-GB" sz="1600" spc="-1" strike="noStrike">
               <a:solidFill>
                 <a:srgbClr val="000000"/>
               </a:solidFill>
@@ -11722,7 +11723,7 @@
         <p:spPr>
           <a:xfrm>
             <a:off x="542880" y="721800"/>
-            <a:ext cx="10345320" cy="486000"/>
+            <a:ext cx="10344960" cy="485640"/>
           </a:xfrm>
           <a:prstGeom prst="rect">
             <a:avLst/>
@@ -11758,7 +11759,7 @@
               </a:rPr>
               <a:t>ETCE Research Group</a:t>
             </a:r>
-            <a:endParaRPr b="0" lang="en-US" sz="2200" spc="-1" strike="noStrike">
+            <a:endParaRPr b="0" lang="en-GB" sz="2200" spc="-1" strike="noStrike">
               <a:solidFill>
                 <a:srgbClr val="000000"/>
               </a:solidFill>
@@ -11776,7 +11777,7 @@
         <p:spPr>
           <a:xfrm>
             <a:off x="451800" y="1709280"/>
-            <a:ext cx="8212680" cy="4340880"/>
+            <a:ext cx="8212320" cy="4340520"/>
           </a:xfrm>
           <a:prstGeom prst="rect">
             <a:avLst/>
@@ -11821,7 +11822,7 @@
         <p:spPr>
           <a:xfrm>
             <a:off x="609480" y="1769400"/>
-            <a:ext cx="10575720" cy="4843800"/>
+            <a:ext cx="10575360" cy="4843440"/>
           </a:xfrm>
           <a:prstGeom prst="rect">
             <a:avLst/>
@@ -11888,7 +11889,7 @@
               </a:rPr>
               <a:t> </a:t>
             </a:r>
-            <a:endParaRPr b="0" lang="en-US" sz="2000" spc="-1" strike="noStrike">
+            <a:endParaRPr b="0" lang="en-GB" sz="2000" spc="-1" strike="noStrike">
               <a:solidFill>
                 <a:srgbClr val="000000"/>
               </a:solidFill>
@@ -11920,7 +11921,7 @@
               </a:rPr>
               <a:t>Course material </a:t>
             </a:r>
-            <a:endParaRPr b="0" lang="en-US" sz="1800" spc="-1" strike="noStrike">
+            <a:endParaRPr b="0" lang="en-GB" sz="1800" spc="-1" strike="noStrike">
               <a:solidFill>
                 <a:srgbClr val="000000"/>
               </a:solidFill>
@@ -11952,7 +11953,7 @@
               </a:rPr>
               <a:t>Theses/project topics</a:t>
             </a:r>
-            <a:endParaRPr b="0" lang="en-US" sz="1800" spc="-1" strike="noStrike">
+            <a:endParaRPr b="0" lang="en-GB" sz="1800" spc="-1" strike="noStrike">
               <a:solidFill>
                 <a:srgbClr val="000000"/>
               </a:solidFill>
@@ -11968,7 +11969,7 @@
                 <a:spcPts val="1009"/>
               </a:spcBef>
             </a:pPr>
-            <a:endParaRPr b="0" lang="en-US" sz="1800" spc="-1" strike="noStrike">
+            <a:endParaRPr b="0" lang="en-GB" sz="1800" spc="-1" strike="noStrike">
               <a:solidFill>
                 <a:srgbClr val="000000"/>
               </a:solidFill>
@@ -12003,7 +12004,7 @@
               </a:rPr>
               <a:t>Our research in action:</a:t>
             </a:r>
-            <a:endParaRPr b="0" lang="en-US" sz="2000" spc="-1" strike="noStrike">
+            <a:endParaRPr b="0" lang="en-GB" sz="2000" spc="-1" strike="noStrike">
               <a:solidFill>
                 <a:srgbClr val="000000"/>
               </a:solidFill>
@@ -12060,7 +12061,7 @@
               </a:rPr>
               <a:t> </a:t>
             </a:r>
-            <a:endParaRPr b="0" lang="en-US" sz="1800" spc="-1" strike="noStrike">
+            <a:endParaRPr b="0" lang="en-GB" sz="1800" spc="-1" strike="noStrike">
               <a:solidFill>
                 <a:srgbClr val="000000"/>
               </a:solidFill>
@@ -12117,7 +12118,7 @@
               </a:rPr>
               <a:t> </a:t>
             </a:r>
-            <a:endParaRPr b="0" lang="en-US" sz="1800" spc="-1" strike="noStrike">
+            <a:endParaRPr b="0" lang="en-GB" sz="1800" spc="-1" strike="noStrike">
               <a:solidFill>
                 <a:srgbClr val="000000"/>
               </a:solidFill>
@@ -12136,7 +12137,7 @@
                 <a:tab algn="l" pos="0"/>
               </a:tabLst>
             </a:pPr>
-            <a:endParaRPr b="0" lang="en-US" sz="1800" spc="-1" strike="noStrike">
+            <a:endParaRPr b="0" lang="en-GB" sz="1800" spc="-1" strike="noStrike">
               <a:solidFill>
                 <a:srgbClr val="000000"/>
               </a:solidFill>
@@ -12165,7 +12166,7 @@
               </a:rPr>
               <a:t>You want join us? Write us an email! </a:t>
             </a:r>
-            <a:endParaRPr b="0" lang="en-US" sz="2000" spc="-1" strike="noStrike">
+            <a:endParaRPr b="0" lang="en-GB" sz="2000" spc="-1" strike="noStrike">
               <a:solidFill>
                 <a:srgbClr val="000000"/>
               </a:solidFill>
@@ -12204,7 +12205,7 @@
               </a:rPr>
               <a:t>benjamin.leiding@tu-clausthal.de</a:t>
             </a:r>
-            <a:endParaRPr b="0" lang="en-US" sz="1600" spc="-1" strike="noStrike">
+            <a:endParaRPr b="0" lang="en-GB" sz="1600" spc="-1" strike="noStrike">
               <a:solidFill>
                 <a:srgbClr val="000000"/>
               </a:solidFill>
@@ -12252,7 +12253,7 @@
         <p:spPr>
           <a:xfrm>
             <a:off x="335520" y="764640"/>
-            <a:ext cx="10740960" cy="491760"/>
+            <a:ext cx="10740600" cy="491400"/>
           </a:xfrm>
           <a:prstGeom prst="rect">
             <a:avLst/>
@@ -12288,7 +12289,7 @@
               </a:rPr>
               <a:t>Learning Outcome</a:t>
             </a:r>
-            <a:endParaRPr b="0" lang="en-US" sz="2400" spc="-1" strike="noStrike">
+            <a:endParaRPr b="0" lang="en-GB" sz="2400" spc="-1" strike="noStrike">
               <a:solidFill>
                 <a:srgbClr val="000000"/>
               </a:solidFill>
@@ -12306,7 +12307,7 @@
         <p:spPr>
           <a:xfrm>
             <a:off x="335520" y="2408400"/>
-            <a:ext cx="10740960" cy="3888720"/>
+            <a:ext cx="10740600" cy="3888360"/>
           </a:xfrm>
           <a:prstGeom prst="rect">
             <a:avLst/>
@@ -12351,7 +12352,7 @@
               </a:rPr>
               <a:t>Basic understanding of the concept of the Linear Economy, the Circular Economy, the Performance Economy and sustainability</a:t>
             </a:r>
-            <a:endParaRPr b="0" lang="en-US" sz="1800" spc="-1" strike="noStrike">
+            <a:endParaRPr b="0" lang="en-GB" sz="1800" spc="-1" strike="noStrike">
               <a:solidFill>
                 <a:srgbClr val="000000"/>
               </a:solidFill>
@@ -12399,7 +12400,7 @@
         <p:spPr>
           <a:xfrm>
             <a:off x="335520" y="764640"/>
-            <a:ext cx="10740960" cy="491760"/>
+            <a:ext cx="10740600" cy="491400"/>
           </a:xfrm>
           <a:prstGeom prst="rect">
             <a:avLst/>
@@ -12435,7 +12436,7 @@
               </a:rPr>
               <a:t>Learning Outcome</a:t>
             </a:r>
-            <a:endParaRPr b="0" lang="en-US" sz="2400" spc="-1" strike="noStrike">
+            <a:endParaRPr b="0" lang="en-GB" sz="2400" spc="-1" strike="noStrike">
               <a:solidFill>
                 <a:srgbClr val="000000"/>
               </a:solidFill>
@@ -12453,7 +12454,7 @@
         <p:spPr>
           <a:xfrm>
             <a:off x="335520" y="2408400"/>
-            <a:ext cx="10740960" cy="3888720"/>
+            <a:ext cx="10740600" cy="3888360"/>
           </a:xfrm>
           <a:prstGeom prst="rect">
             <a:avLst/>
@@ -12498,7 +12499,7 @@
               </a:rPr>
               <a:t>Basic understanding of the concept of the Linear Economy, the Circular Economy, the Performance Economy and sustainability</a:t>
             </a:r>
-            <a:endParaRPr b="0" lang="en-US" sz="1800" spc="-1" strike="noStrike">
+            <a:endParaRPr b="0" lang="en-GB" sz="1800" spc="-1" strike="noStrike">
               <a:solidFill>
                 <a:srgbClr val="000000"/>
               </a:solidFill>
@@ -12530,7 +12531,7 @@
               </a:rPr>
               <a:t>Basic understanding of new technologies in the field of decentralized and smart systems</a:t>
             </a:r>
-            <a:endParaRPr b="0" lang="en-US" sz="1800" spc="-1" strike="noStrike">
+            <a:endParaRPr b="0" lang="en-GB" sz="1800" spc="-1" strike="noStrike">
               <a:solidFill>
                 <a:srgbClr val="000000"/>
               </a:solidFill>
@@ -12578,7 +12579,7 @@
         <p:spPr>
           <a:xfrm>
             <a:off x="335520" y="764640"/>
-            <a:ext cx="10740960" cy="491760"/>
+            <a:ext cx="10740600" cy="491400"/>
           </a:xfrm>
           <a:prstGeom prst="rect">
             <a:avLst/>
@@ -12614,7 +12615,7 @@
               </a:rPr>
               <a:t>Learning Outcome</a:t>
             </a:r>
-            <a:endParaRPr b="0" lang="en-US" sz="2400" spc="-1" strike="noStrike">
+            <a:endParaRPr b="0" lang="en-GB" sz="2400" spc="-1" strike="noStrike">
               <a:solidFill>
                 <a:srgbClr val="000000"/>
               </a:solidFill>
@@ -12632,7 +12633,7 @@
         <p:spPr>
           <a:xfrm>
             <a:off x="335520" y="2408400"/>
-            <a:ext cx="10740960" cy="3888720"/>
+            <a:ext cx="10740600" cy="3888360"/>
           </a:xfrm>
           <a:prstGeom prst="rect">
             <a:avLst/>
@@ -12677,7 +12678,7 @@
               </a:rPr>
               <a:t>Basic understanding of the concept of the Linear Economy, the Circular Economy, the Performance Economy and sustainability</a:t>
             </a:r>
-            <a:endParaRPr b="0" lang="en-US" sz="1800" spc="-1" strike="noStrike">
+            <a:endParaRPr b="0" lang="en-GB" sz="1800" spc="-1" strike="noStrike">
               <a:solidFill>
                 <a:srgbClr val="000000"/>
               </a:solidFill>
@@ -12709,7 +12710,7 @@
               </a:rPr>
               <a:t>Basic understanding of new technologies in the field of decentralized and smart systems</a:t>
             </a:r>
-            <a:endParaRPr b="0" lang="en-US" sz="1800" spc="-1" strike="noStrike">
+            <a:endParaRPr b="0" lang="en-GB" sz="1800" spc="-1" strike="noStrike">
               <a:solidFill>
                 <a:srgbClr val="000000"/>
               </a:solidFill>
@@ -12741,7 +12742,7 @@
               </a:rPr>
               <a:t>Understanding and overview of the Internet of Things and related concepts</a:t>
             </a:r>
-            <a:endParaRPr b="0" lang="en-US" sz="1800" spc="-1" strike="noStrike">
+            <a:endParaRPr b="0" lang="en-GB" sz="1800" spc="-1" strike="noStrike">
               <a:solidFill>
                 <a:srgbClr val="000000"/>
               </a:solidFill>

</xml_diff>

<commit_message>
Update Exercise Schedule, interchange IoT Processing and Security
</commit_message>
<xml_diff>
--- a/Emerging-Technologies-for-the-Circular-Economy/ETCE-L00-Organization.pptx
+++ b/Emerging-Technologies-for-the-Circular-Economy/ETCE-L00-Organization.pptx
@@ -73,8 +73,8 @@
         </p:nvSpPr>
         <p:spPr>
           <a:xfrm>
-            <a:off x="216000" y="812520"/>
-            <a:ext cx="7127280" cy="4008960"/>
+            <a:off x="533520" y="764280"/>
+            <a:ext cx="6704640" cy="3771360"/>
           </a:xfrm>
           <a:prstGeom prst="rect">
             <a:avLst/>
@@ -91,7 +91,7 @@
           <a:p>
             <a:pPr algn="ctr"/>
             <a:r>
-              <a:rPr b="0" lang="en-GB" sz="4400" spc="-1" strike="noStrike">
+              <a:rPr b="0" lang="en-US" sz="4400" spc="-1" strike="noStrike">
                 <a:solidFill>
                   <a:srgbClr val="000000"/>
                 </a:solidFill>
@@ -99,7 +99,7 @@
               </a:rPr>
               <a:t>Click to move the slide</a:t>
             </a:r>
-            <a:endParaRPr b="0" lang="en-GB" sz="4400" spc="-1" strike="noStrike">
+            <a:endParaRPr b="0" lang="en-US" sz="4400" spc="-1" strike="noStrike">
               <a:solidFill>
                 <a:srgbClr val="000000"/>
               </a:solidFill>
@@ -120,8 +120,8 @@
         </p:nvSpPr>
         <p:spPr>
           <a:xfrm>
-            <a:off x="756000" y="5078520"/>
-            <a:ext cx="6047640" cy="4811040"/>
+            <a:off x="777240" y="4777560"/>
+            <a:ext cx="6217560" cy="4525920"/>
           </a:xfrm>
           <a:prstGeom prst="rect">
             <a:avLst/>
@@ -140,7 +140,7 @@
               <a:buNone/>
             </a:pPr>
             <a:r>
-              <a:rPr b="0" lang="en-GB" sz="2000" spc="-1" strike="noStrike">
+              <a:rPr b="0" lang="en-US" sz="2000" spc="-1" strike="noStrike">
                 <a:solidFill>
                   <a:srgbClr val="000000"/>
                 </a:solidFill>
@@ -148,7 +148,7 @@
               </a:rPr>
               <a:t>Click to edit the notes format</a:t>
             </a:r>
-            <a:endParaRPr b="0" lang="en-GB" sz="2000" spc="-1" strike="noStrike">
+            <a:endParaRPr b="0" lang="en-US" sz="2000" spc="-1" strike="noStrike">
               <a:solidFill>
                 <a:srgbClr val="000000"/>
               </a:solidFill>
@@ -170,7 +170,7 @@
         <p:spPr>
           <a:xfrm>
             <a:off x="0" y="0"/>
-            <a:ext cx="3280680" cy="534240"/>
+            <a:ext cx="3372840" cy="502560"/>
           </a:xfrm>
           <a:prstGeom prst="rect">
             <a:avLst/>
@@ -189,7 +189,7 @@
               <a:buNone/>
             </a:pPr>
             <a:r>
-              <a:rPr b="0" lang="en-GB" sz="1400" spc="-1" strike="noStrike">
+              <a:rPr b="0" lang="en-US" sz="1400" spc="-1" strike="noStrike">
                 <a:solidFill>
                   <a:srgbClr val="000000"/>
                 </a:solidFill>
@@ -197,7 +197,7 @@
               </a:rPr>
               <a:t>&lt;header&gt;</a:t>
             </a:r>
-            <a:endParaRPr b="0" lang="en-GB" sz="1400" spc="-1" strike="noStrike">
+            <a:endParaRPr b="0" lang="en-US" sz="1400" spc="-1" strike="noStrike">
               <a:solidFill>
                 <a:srgbClr val="000000"/>
               </a:solidFill>
@@ -218,8 +218,8 @@
         </p:nvSpPr>
         <p:spPr>
           <a:xfrm>
-            <a:off x="4278960" y="0"/>
-            <a:ext cx="3280680" cy="534240"/>
+            <a:off x="4399200" y="0"/>
+            <a:ext cx="3372840" cy="502560"/>
           </a:xfrm>
           <a:prstGeom prst="rect">
             <a:avLst/>
@@ -236,7 +236,7 @@
           <a:lstStyle>
             <a:lvl1pPr indent="0" algn="r">
               <a:buNone/>
-              <a:defRPr b="0" lang="en-GB" sz="1400" spc="-1" strike="noStrike">
+              <a:defRPr b="0" lang="en-US" sz="1400" spc="-1" strike="noStrike">
                 <a:solidFill>
                   <a:srgbClr val="000000"/>
                 </a:solidFill>
@@ -249,7 +249,7 @@
               <a:buNone/>
             </a:pPr>
             <a:r>
-              <a:rPr b="0" lang="en-GB" sz="1400" spc="-1" strike="noStrike">
+              <a:rPr b="0" lang="en-US" sz="1400" spc="-1" strike="noStrike">
                 <a:solidFill>
                   <a:srgbClr val="000000"/>
                 </a:solidFill>
@@ -257,7 +257,7 @@
               </a:rPr>
               <a:t>&lt;date/time&gt;</a:t>
             </a:r>
-            <a:endParaRPr b="0" lang="en-GB" sz="1400" spc="-1" strike="noStrike">
+            <a:endParaRPr b="0" lang="en-US" sz="1400" spc="-1" strike="noStrike">
               <a:solidFill>
                 <a:srgbClr val="000000"/>
               </a:solidFill>
@@ -278,8 +278,8 @@
         </p:nvSpPr>
         <p:spPr>
           <a:xfrm>
-            <a:off x="0" y="10157400"/>
-            <a:ext cx="3280680" cy="534240"/>
+            <a:off x="0" y="9555480"/>
+            <a:ext cx="3372840" cy="502560"/>
           </a:xfrm>
           <a:prstGeom prst="rect">
             <a:avLst/>
@@ -296,7 +296,7 @@
           <a:lstStyle>
             <a:lvl1pPr indent="0">
               <a:buNone/>
-              <a:defRPr b="0" lang="en-GB" sz="1400" spc="-1" strike="noStrike">
+              <a:defRPr b="0" lang="en-US" sz="1400" spc="-1" strike="noStrike">
                 <a:solidFill>
                   <a:srgbClr val="000000"/>
                 </a:solidFill>
@@ -309,7 +309,7 @@
               <a:buNone/>
             </a:pPr>
             <a:r>
-              <a:rPr b="0" lang="en-GB" sz="1400" spc="-1" strike="noStrike">
+              <a:rPr b="0" lang="en-US" sz="1400" spc="-1" strike="noStrike">
                 <a:solidFill>
                   <a:srgbClr val="000000"/>
                 </a:solidFill>
@@ -317,7 +317,7 @@
               </a:rPr>
               <a:t>&lt;footer&gt;</a:t>
             </a:r>
-            <a:endParaRPr b="0" lang="en-GB" sz="1400" spc="-1" strike="noStrike">
+            <a:endParaRPr b="0" lang="en-US" sz="1400" spc="-1" strike="noStrike">
               <a:solidFill>
                 <a:srgbClr val="000000"/>
               </a:solidFill>
@@ -338,8 +338,8 @@
         </p:nvSpPr>
         <p:spPr>
           <a:xfrm>
-            <a:off x="4278960" y="10157400"/>
-            <a:ext cx="3280680" cy="534240"/>
+            <a:off x="4399200" y="9555480"/>
+            <a:ext cx="3372840" cy="502560"/>
           </a:xfrm>
           <a:prstGeom prst="rect">
             <a:avLst/>
@@ -356,7 +356,7 @@
           <a:lstStyle>
             <a:lvl1pPr indent="0" algn="r">
               <a:buNone/>
-              <a:defRPr b="0" lang="en-GB" sz="1400" spc="-1" strike="noStrike">
+              <a:defRPr b="0" lang="en-US" sz="1400" spc="-1" strike="noStrike">
                 <a:solidFill>
                   <a:srgbClr val="000000"/>
                 </a:solidFill>
@@ -368,8 +368,8 @@
             <a:pPr indent="0" algn="r">
               <a:buNone/>
             </a:pPr>
-            <a:fld id="{69A9FF9A-A136-4BB7-8EB6-55646345204D}" type="slidenum">
-              <a:rPr b="0" lang="en-GB" sz="1400" spc="-1" strike="noStrike">
+            <a:fld id="{791ABBD7-6AE2-41A8-8BCA-6AE162C29AC8}" type="slidenum">
+              <a:rPr b="0" lang="en-US" sz="1400" spc="-1" strike="noStrike">
                 <a:solidFill>
                   <a:srgbClr val="000000"/>
                 </a:solidFill>
@@ -377,7 +377,7 @@
               </a:rPr>
               <a:t>&lt;number&gt;</a:t>
             </a:fld>
-            <a:endParaRPr b="0" lang="en-GB" sz="1400" spc="-1" strike="noStrike">
+            <a:endParaRPr b="0" lang="en-US" sz="1400" spc="-1" strike="noStrike">
               <a:solidFill>
                 <a:srgbClr val="000000"/>
               </a:solidFill>
@@ -422,7 +422,7 @@
         <p:spPr>
           <a:xfrm>
             <a:off x="533520" y="763560"/>
-            <a:ext cx="6688080" cy="3756240"/>
+            <a:ext cx="6687720" cy="3755880"/>
           </a:xfrm>
           <a:prstGeom prst="rect">
             <a:avLst/>
@@ -445,7 +445,7 @@
         <p:spPr>
           <a:xfrm>
             <a:off x="777240" y="4777560"/>
-            <a:ext cx="6201720" cy="4510080"/>
+            <a:ext cx="6201360" cy="4509720"/>
           </a:xfrm>
           <a:prstGeom prst="rect">
             <a:avLst/>
@@ -463,7 +463,7 @@
             <a:pPr marL="216000" indent="-216000">
               <a:buNone/>
             </a:pPr>
-            <a:endParaRPr b="0" lang="en-GB" sz="1800" spc="-1" strike="noStrike">
+            <a:endParaRPr b="0" lang="en-US" sz="1800" spc="-1" strike="noStrike">
               <a:solidFill>
                 <a:srgbClr val="000000"/>
               </a:solidFill>
@@ -481,7 +481,7 @@
         <p:spPr>
           <a:xfrm>
             <a:off x="4399200" y="9555480"/>
-            <a:ext cx="3357000" cy="486720"/>
+            <a:ext cx="3356640" cy="486360"/>
           </a:xfrm>
           <a:prstGeom prst="rect">
             <a:avLst/>
@@ -507,7 +507,7 @@
                 <a:spcPct val="100000"/>
               </a:lnSpc>
             </a:pPr>
-            <a:fld id="{DB9C3E34-8AEA-4043-B87F-65554393B503}" type="slidenum">
+            <a:fld id="{6AC8042B-4A15-40AB-9FB9-3806418B953B}" type="slidenum">
               <a:rPr b="0" lang="de-DE" sz="1800" spc="-1" strike="noStrike">
                 <a:solidFill>
                   <a:srgbClr val="000000"/>
@@ -517,7 +517,7 @@
               </a:rPr>
               <a:t>&lt;number&gt;</a:t>
             </a:fld>
-            <a:endParaRPr b="0" lang="en-GB" sz="1800" spc="-1" strike="noStrike">
+            <a:endParaRPr b="0" lang="en-US" sz="1800" spc="-1" strike="noStrike">
               <a:solidFill>
                 <a:srgbClr val="000000"/>
               </a:solidFill>
@@ -561,7 +561,7 @@
         <p:spPr>
           <a:xfrm>
             <a:off x="533520" y="763560"/>
-            <a:ext cx="6688080" cy="3756240"/>
+            <a:ext cx="6687720" cy="3755880"/>
           </a:xfrm>
           <a:prstGeom prst="rect">
             <a:avLst/>
@@ -584,7 +584,7 @@
         <p:spPr>
           <a:xfrm>
             <a:off x="777240" y="4777560"/>
-            <a:ext cx="6201720" cy="4510080"/>
+            <a:ext cx="6201360" cy="4509720"/>
           </a:xfrm>
           <a:prstGeom prst="rect">
             <a:avLst/>
@@ -602,7 +602,7 @@
             <a:pPr marL="216000" indent="-216000">
               <a:buNone/>
             </a:pPr>
-            <a:endParaRPr b="0" lang="en-GB" sz="1800" spc="-1" strike="noStrike">
+            <a:endParaRPr b="0" lang="en-US" sz="1800" spc="-1" strike="noStrike">
               <a:solidFill>
                 <a:srgbClr val="000000"/>
               </a:solidFill>
@@ -620,7 +620,7 @@
         <p:spPr>
           <a:xfrm>
             <a:off x="4399200" y="9555480"/>
-            <a:ext cx="3357000" cy="486720"/>
+            <a:ext cx="3356640" cy="486360"/>
           </a:xfrm>
           <a:prstGeom prst="rect">
             <a:avLst/>
@@ -646,7 +646,7 @@
                 <a:spcPct val="100000"/>
               </a:lnSpc>
             </a:pPr>
-            <a:fld id="{FC44C419-F171-4E63-8411-3DFA5CD9A243}" type="slidenum">
+            <a:fld id="{0907545A-751A-4E77-B038-74368FA734BB}" type="slidenum">
               <a:rPr b="0" lang="de-DE" sz="1800" spc="-1" strike="noStrike">
                 <a:solidFill>
                   <a:srgbClr val="000000"/>
@@ -656,7 +656,7 @@
               </a:rPr>
               <a:t>&lt;number&gt;</a:t>
             </a:fld>
-            <a:endParaRPr b="0" lang="en-GB" sz="1800" spc="-1" strike="noStrike">
+            <a:endParaRPr b="0" lang="en-US" sz="1800" spc="-1" strike="noStrike">
               <a:solidFill>
                 <a:srgbClr val="000000"/>
               </a:solidFill>
@@ -700,7 +700,7 @@
         <p:spPr>
           <a:xfrm>
             <a:off x="533520" y="763560"/>
-            <a:ext cx="6688080" cy="3756240"/>
+            <a:ext cx="6687720" cy="3755880"/>
           </a:xfrm>
           <a:prstGeom prst="rect">
             <a:avLst/>
@@ -723,7 +723,7 @@
         <p:spPr>
           <a:xfrm>
             <a:off x="777240" y="4777560"/>
-            <a:ext cx="6201720" cy="4510080"/>
+            <a:ext cx="6201360" cy="4509720"/>
           </a:xfrm>
           <a:prstGeom prst="rect">
             <a:avLst/>
@@ -741,7 +741,7 @@
             <a:pPr marL="216000" indent="-216000">
               <a:buNone/>
             </a:pPr>
-            <a:endParaRPr b="0" lang="en-GB" sz="1800" spc="-1" strike="noStrike">
+            <a:endParaRPr b="0" lang="en-US" sz="1800" spc="-1" strike="noStrike">
               <a:solidFill>
                 <a:srgbClr val="000000"/>
               </a:solidFill>
@@ -759,7 +759,7 @@
         <p:spPr>
           <a:xfrm>
             <a:off x="4399200" y="9555480"/>
-            <a:ext cx="3357000" cy="486720"/>
+            <a:ext cx="3356640" cy="486360"/>
           </a:xfrm>
           <a:prstGeom prst="rect">
             <a:avLst/>
@@ -785,7 +785,7 @@
                 <a:spcPct val="100000"/>
               </a:lnSpc>
             </a:pPr>
-            <a:fld id="{86016AFA-B314-4E49-8BA0-9D3E27A6A5EA}" type="slidenum">
+            <a:fld id="{F566239E-1AB5-4EB3-B2E9-6E3715477FE6}" type="slidenum">
               <a:rPr b="0" lang="de-DE" sz="1800" spc="-1" strike="noStrike">
                 <a:solidFill>
                   <a:srgbClr val="000000"/>
@@ -795,7 +795,7 @@
               </a:rPr>
               <a:t>&lt;number&gt;</a:t>
             </a:fld>
-            <a:endParaRPr b="0" lang="en-GB" sz="1800" spc="-1" strike="noStrike">
+            <a:endParaRPr b="0" lang="en-US" sz="1800" spc="-1" strike="noStrike">
               <a:solidFill>
                 <a:srgbClr val="000000"/>
               </a:solidFill>
@@ -886,7 +886,7 @@
         <p:spPr>
           <a:xfrm>
             <a:off x="11444760" y="0"/>
-            <a:ext cx="736560" cy="6845400"/>
+            <a:ext cx="736200" cy="6845040"/>
           </a:xfrm>
           <a:prstGeom prst="rect">
             <a:avLst/>
@@ -935,7 +935,7 @@
         <p:spPr>
           <a:xfrm>
             <a:off x="11438640" y="6453360"/>
-            <a:ext cx="753480" cy="363960"/>
+            <a:ext cx="753120" cy="363960"/>
           </a:xfrm>
           <a:prstGeom prst="rect">
             <a:avLst/>
@@ -961,7 +961,7 @@
                 <a:spcPct val="100000"/>
               </a:lnSpc>
             </a:pPr>
-            <a:fld id="{EB265EDC-B736-460B-A5A3-83CFE1E0D00E}" type="slidenum">
+            <a:fld id="{4FCFE910-3DB0-44A8-849B-263099E13F22}" type="slidenum">
               <a:rPr b="0" lang="en-US" sz="1800" spc="-1" strike="noStrike">
                 <a:solidFill>
                   <a:srgbClr val="808080"/>
@@ -971,7 +971,7 @@
               </a:rPr>
               <a:t>&lt;number&gt;</a:t>
             </a:fld>
-            <a:endParaRPr b="0" lang="en-GB" sz="1800" spc="-1" strike="noStrike">
+            <a:endParaRPr b="0" lang="en-US" sz="1800" spc="-1" strike="noStrike">
               <a:solidFill>
                 <a:srgbClr val="000000"/>
               </a:solidFill>
@@ -989,7 +989,7 @@
         <p:spPr>
           <a:xfrm>
             <a:off x="912240" y="1268280"/>
-            <a:ext cx="9203400" cy="356760"/>
+            <a:ext cx="9203040" cy="356400"/>
           </a:xfrm>
           <a:prstGeom prst="rect">
             <a:avLst/>
@@ -1038,7 +1038,7 @@
         <p:spPr>
           <a:xfrm>
             <a:off x="0" y="0"/>
-            <a:ext cx="3047400" cy="557280"/>
+            <a:ext cx="3047040" cy="556920"/>
           </a:xfrm>
           <a:prstGeom prst="rect">
             <a:avLst/>
@@ -1061,7 +1061,7 @@
         <p:spPr>
           <a:xfrm>
             <a:off x="7430400" y="134640"/>
-            <a:ext cx="3693240" cy="509400"/>
+            <a:ext cx="3692880" cy="509040"/>
           </a:xfrm>
           <a:prstGeom prst="rect">
             <a:avLst/>
@@ -1080,7 +1080,7 @@
         <p:spPr>
           <a:xfrm>
             <a:off x="912240" y="1268280"/>
-            <a:ext cx="9203400" cy="356760"/>
+            <a:ext cx="9203040" cy="356400"/>
           </a:xfrm>
           <a:prstGeom prst="rect">
             <a:avLst/>
@@ -1125,7 +1125,7 @@
         <p:spPr>
           <a:xfrm>
             <a:off x="11444760" y="0"/>
-            <a:ext cx="736560" cy="6845400"/>
+            <a:ext cx="736200" cy="6845040"/>
           </a:xfrm>
           <a:prstGeom prst="rect">
             <a:avLst/>
@@ -1174,7 +1174,7 @@
         <p:spPr>
           <a:xfrm>
             <a:off x="0" y="6642720"/>
-            <a:ext cx="12179520" cy="211320"/>
+            <a:ext cx="12179160" cy="211320"/>
           </a:xfrm>
           <a:prstGeom prst="rect">
             <a:avLst/>
@@ -1210,7 +1210,7 @@
               </a:rPr>
               <a:t>Emerging Technologies for the Circular Economy – TU Clausthal</a:t>
             </a:r>
-            <a:endParaRPr b="0" lang="en-GB" sz="800" spc="-1" strike="noStrike">
+            <a:endParaRPr b="0" lang="en-US" sz="800" spc="-1" strike="noStrike">
               <a:solidFill>
                 <a:srgbClr val="000000"/>
               </a:solidFill>
@@ -1251,7 +1251,7 @@
               <a:buNone/>
             </a:pPr>
             <a:r>
-              <a:rPr b="0" lang="en-GB" sz="4400" spc="-1" strike="noStrike">
+              <a:rPr b="0" lang="en-US" sz="4400" spc="-1" strike="noStrike">
                 <a:solidFill>
                   <a:srgbClr val="000000"/>
                 </a:solidFill>
@@ -1259,7 +1259,7 @@
               </a:rPr>
               <a:t>Click to edit the title text format</a:t>
             </a:r>
-            <a:endParaRPr b="0" lang="en-GB" sz="4400" spc="-1" strike="noStrike">
+            <a:endParaRPr b="0" lang="en-US" sz="4400" spc="-1" strike="noStrike">
               <a:solidFill>
                 <a:srgbClr val="000000"/>
               </a:solidFill>
@@ -1308,7 +1308,7 @@
               <a:buChar char=""/>
             </a:pPr>
             <a:r>
-              <a:rPr b="0" lang="en-GB" sz="3200" spc="-1" strike="noStrike">
+              <a:rPr b="0" lang="en-US" sz="3200" spc="-1" strike="noStrike">
                 <a:solidFill>
                   <a:srgbClr val="000000"/>
                 </a:solidFill>
@@ -1316,7 +1316,7 @@
               </a:rPr>
               <a:t>Click to edit the outline text format</a:t>
             </a:r>
-            <a:endParaRPr b="0" lang="en-GB" sz="3200" spc="-1" strike="noStrike">
+            <a:endParaRPr b="0" lang="en-US" sz="3200" spc="-1" strike="noStrike">
               <a:solidFill>
                 <a:srgbClr val="000000"/>
               </a:solidFill>
@@ -1336,7 +1336,7 @@
               <a:buChar char=""/>
             </a:pPr>
             <a:r>
-              <a:rPr b="0" lang="en-GB" sz="2800" spc="-1" strike="noStrike">
+              <a:rPr b="0" lang="en-US" sz="2800" spc="-1" strike="noStrike">
                 <a:solidFill>
                   <a:srgbClr val="000000"/>
                 </a:solidFill>
@@ -1344,7 +1344,7 @@
               </a:rPr>
               <a:t>Second Outline Level</a:t>
             </a:r>
-            <a:endParaRPr b="0" lang="en-GB" sz="2800" spc="-1" strike="noStrike">
+            <a:endParaRPr b="0" lang="en-US" sz="2800" spc="-1" strike="noStrike">
               <a:solidFill>
                 <a:srgbClr val="000000"/>
               </a:solidFill>
@@ -1364,7 +1364,7 @@
               <a:buChar char=""/>
             </a:pPr>
             <a:r>
-              <a:rPr b="0" lang="en-GB" sz="2400" spc="-1" strike="noStrike">
+              <a:rPr b="0" lang="en-US" sz="2400" spc="-1" strike="noStrike">
                 <a:solidFill>
                   <a:srgbClr val="000000"/>
                 </a:solidFill>
@@ -1372,7 +1372,7 @@
               </a:rPr>
               <a:t>Third Outline Level</a:t>
             </a:r>
-            <a:endParaRPr b="0" lang="en-GB" sz="2400" spc="-1" strike="noStrike">
+            <a:endParaRPr b="0" lang="en-US" sz="2400" spc="-1" strike="noStrike">
               <a:solidFill>
                 <a:srgbClr val="000000"/>
               </a:solidFill>
@@ -1392,7 +1392,7 @@
               <a:buChar char=""/>
             </a:pPr>
             <a:r>
-              <a:rPr b="0" lang="en-GB" sz="2000" spc="-1" strike="noStrike">
+              <a:rPr b="0" lang="en-US" sz="2000" spc="-1" strike="noStrike">
                 <a:solidFill>
                   <a:srgbClr val="000000"/>
                 </a:solidFill>
@@ -1400,7 +1400,7 @@
               </a:rPr>
               <a:t>Fourth Outline Level</a:t>
             </a:r>
-            <a:endParaRPr b="0" lang="en-GB" sz="2000" spc="-1" strike="noStrike">
+            <a:endParaRPr b="0" lang="en-US" sz="2000" spc="-1" strike="noStrike">
               <a:solidFill>
                 <a:srgbClr val="000000"/>
               </a:solidFill>
@@ -1420,7 +1420,7 @@
               <a:buChar char=""/>
             </a:pPr>
             <a:r>
-              <a:rPr b="0" lang="en-GB" sz="2000" spc="-1" strike="noStrike">
+              <a:rPr b="0" lang="en-US" sz="2000" spc="-1" strike="noStrike">
                 <a:solidFill>
                   <a:srgbClr val="000000"/>
                 </a:solidFill>
@@ -1428,7 +1428,7 @@
               </a:rPr>
               <a:t>Fifth Outline Level</a:t>
             </a:r>
-            <a:endParaRPr b="0" lang="en-GB" sz="2000" spc="-1" strike="noStrike">
+            <a:endParaRPr b="0" lang="en-US" sz="2000" spc="-1" strike="noStrike">
               <a:solidFill>
                 <a:srgbClr val="000000"/>
               </a:solidFill>
@@ -1448,7 +1448,7 @@
               <a:buChar char=""/>
             </a:pPr>
             <a:r>
-              <a:rPr b="0" lang="en-GB" sz="2000" spc="-1" strike="noStrike">
+              <a:rPr b="0" lang="en-US" sz="2000" spc="-1" strike="noStrike">
                 <a:solidFill>
                   <a:srgbClr val="000000"/>
                 </a:solidFill>
@@ -1456,7 +1456,7 @@
               </a:rPr>
               <a:t>Sixth Outline Level</a:t>
             </a:r>
-            <a:endParaRPr b="0" lang="en-GB" sz="2000" spc="-1" strike="noStrike">
+            <a:endParaRPr b="0" lang="en-US" sz="2000" spc="-1" strike="noStrike">
               <a:solidFill>
                 <a:srgbClr val="000000"/>
               </a:solidFill>
@@ -1476,7 +1476,7 @@
               <a:buChar char=""/>
             </a:pPr>
             <a:r>
-              <a:rPr b="0" lang="en-GB" sz="2000" spc="-1" strike="noStrike">
+              <a:rPr b="0" lang="en-US" sz="2000" spc="-1" strike="noStrike">
                 <a:solidFill>
                   <a:srgbClr val="000000"/>
                 </a:solidFill>
@@ -1484,7 +1484,7 @@
               </a:rPr>
               <a:t>Seventh Outline Level</a:t>
             </a:r>
-            <a:endParaRPr b="0" lang="en-GB" sz="2000" spc="-1" strike="noStrike">
+            <a:endParaRPr b="0" lang="en-US" sz="2000" spc="-1" strike="noStrike">
               <a:solidFill>
                 <a:srgbClr val="000000"/>
               </a:solidFill>
@@ -1535,7 +1535,7 @@
         <p:spPr>
           <a:xfrm>
             <a:off x="11444760" y="0"/>
-            <a:ext cx="736560" cy="6845400"/>
+            <a:ext cx="736200" cy="6845040"/>
           </a:xfrm>
           <a:prstGeom prst="rect">
             <a:avLst/>
@@ -1584,7 +1584,7 @@
         <p:spPr>
           <a:xfrm>
             <a:off x="11438640" y="6453360"/>
-            <a:ext cx="753480" cy="363960"/>
+            <a:ext cx="753120" cy="363960"/>
           </a:xfrm>
           <a:prstGeom prst="rect">
             <a:avLst/>
@@ -1610,7 +1610,7 @@
                 <a:spcPct val="100000"/>
               </a:lnSpc>
             </a:pPr>
-            <a:fld id="{E9585061-39A4-41C9-A95B-7C38CDA9E461}" type="slidenum">
+            <a:fld id="{8213F1BE-DC7D-4B2C-B6AA-DF0BE1E6C871}" type="slidenum">
               <a:rPr b="0" lang="en-US" sz="1800" spc="-1" strike="noStrike">
                 <a:solidFill>
                   <a:srgbClr val="808080"/>
@@ -1620,7 +1620,7 @@
               </a:rPr>
               <a:t>&lt;number&gt;</a:t>
             </a:fld>
-            <a:endParaRPr b="0" lang="en-GB" sz="1800" spc="-1" strike="noStrike">
+            <a:endParaRPr b="0" lang="en-US" sz="1800" spc="-1" strike="noStrike">
               <a:solidFill>
                 <a:srgbClr val="000000"/>
               </a:solidFill>
@@ -1638,7 +1638,7 @@
         <p:spPr>
           <a:xfrm>
             <a:off x="912240" y="1268280"/>
-            <a:ext cx="9203400" cy="356760"/>
+            <a:ext cx="9203040" cy="356400"/>
           </a:xfrm>
           <a:prstGeom prst="rect">
             <a:avLst/>
@@ -1687,7 +1687,7 @@
         <p:spPr>
           <a:xfrm>
             <a:off x="0" y="0"/>
-            <a:ext cx="3047400" cy="557280"/>
+            <a:ext cx="3047040" cy="556920"/>
           </a:xfrm>
           <a:prstGeom prst="rect">
             <a:avLst/>
@@ -1710,7 +1710,7 @@
         <p:spPr>
           <a:xfrm>
             <a:off x="7430400" y="134640"/>
-            <a:ext cx="3693240" cy="509400"/>
+            <a:ext cx="3692880" cy="509040"/>
           </a:xfrm>
           <a:prstGeom prst="rect">
             <a:avLst/>
@@ -1729,7 +1729,7 @@
         <p:spPr>
           <a:xfrm>
             <a:off x="11444760" y="0"/>
-            <a:ext cx="736560" cy="6845400"/>
+            <a:ext cx="736200" cy="6845040"/>
           </a:xfrm>
           <a:prstGeom prst="rect">
             <a:avLst/>
@@ -1778,7 +1778,7 @@
         <p:spPr>
           <a:xfrm>
             <a:off x="11438640" y="6453360"/>
-            <a:ext cx="753480" cy="363960"/>
+            <a:ext cx="753120" cy="363960"/>
           </a:xfrm>
           <a:prstGeom prst="rect">
             <a:avLst/>
@@ -1804,7 +1804,7 @@
                 <a:spcPct val="100000"/>
               </a:lnSpc>
             </a:pPr>
-            <a:fld id="{86625505-A87D-46EE-BEE4-8950F55FF49F}" type="slidenum">
+            <a:fld id="{A26A925E-A726-47FF-B846-D94A4AA92C86}" type="slidenum">
               <a:rPr b="0" lang="en-US" sz="1800" spc="-1" strike="noStrike">
                 <a:solidFill>
                   <a:srgbClr val="808080"/>
@@ -1814,7 +1814,7 @@
               </a:rPr>
               <a:t>&lt;number&gt;</a:t>
             </a:fld>
-            <a:endParaRPr b="0" lang="en-GB" sz="1800" spc="-1" strike="noStrike">
+            <a:endParaRPr b="0" lang="en-US" sz="1800" spc="-1" strike="noStrike">
               <a:solidFill>
                 <a:srgbClr val="000000"/>
               </a:solidFill>
@@ -1832,7 +1832,7 @@
         <p:spPr>
           <a:xfrm>
             <a:off x="0" y="6642720"/>
-            <a:ext cx="12179520" cy="211320"/>
+            <a:ext cx="12179160" cy="211320"/>
           </a:xfrm>
           <a:prstGeom prst="rect">
             <a:avLst/>
@@ -1868,7 +1868,7 @@
               </a:rPr>
               <a:t>Emerging Technologies for the Circular Economy – TU Clausthal</a:t>
             </a:r>
-            <a:endParaRPr b="0" lang="en-GB" sz="800" spc="-1" strike="noStrike">
+            <a:endParaRPr b="0" lang="en-US" sz="800" spc="-1" strike="noStrike">
               <a:solidFill>
                 <a:srgbClr val="000000"/>
               </a:solidFill>
@@ -1909,7 +1909,7 @@
               <a:buNone/>
             </a:pPr>
             <a:r>
-              <a:rPr b="0" lang="en-GB" sz="4400" spc="-1" strike="noStrike">
+              <a:rPr b="0" lang="en-US" sz="4400" spc="-1" strike="noStrike">
                 <a:solidFill>
                   <a:srgbClr val="000000"/>
                 </a:solidFill>
@@ -1917,7 +1917,7 @@
               </a:rPr>
               <a:t>Click to edit the title text format</a:t>
             </a:r>
-            <a:endParaRPr b="0" lang="en-GB" sz="4400" spc="-1" strike="noStrike">
+            <a:endParaRPr b="0" lang="en-US" sz="4400" spc="-1" strike="noStrike">
               <a:solidFill>
                 <a:srgbClr val="000000"/>
               </a:solidFill>
@@ -1966,7 +1966,7 @@
               <a:buChar char=""/>
             </a:pPr>
             <a:r>
-              <a:rPr b="0" lang="en-GB" sz="3200" spc="-1" strike="noStrike">
+              <a:rPr b="0" lang="en-US" sz="3200" spc="-1" strike="noStrike">
                 <a:solidFill>
                   <a:srgbClr val="000000"/>
                 </a:solidFill>
@@ -1974,7 +1974,7 @@
               </a:rPr>
               <a:t>Click to edit the outline text format</a:t>
             </a:r>
-            <a:endParaRPr b="0" lang="en-GB" sz="3200" spc="-1" strike="noStrike">
+            <a:endParaRPr b="0" lang="en-US" sz="3200" spc="-1" strike="noStrike">
               <a:solidFill>
                 <a:srgbClr val="000000"/>
               </a:solidFill>
@@ -1994,7 +1994,7 @@
               <a:buChar char=""/>
             </a:pPr>
             <a:r>
-              <a:rPr b="0" lang="en-GB" sz="2800" spc="-1" strike="noStrike">
+              <a:rPr b="0" lang="en-US" sz="2800" spc="-1" strike="noStrike">
                 <a:solidFill>
                   <a:srgbClr val="000000"/>
                 </a:solidFill>
@@ -2002,7 +2002,7 @@
               </a:rPr>
               <a:t>Second Outline Level</a:t>
             </a:r>
-            <a:endParaRPr b="0" lang="en-GB" sz="2800" spc="-1" strike="noStrike">
+            <a:endParaRPr b="0" lang="en-US" sz="2800" spc="-1" strike="noStrike">
               <a:solidFill>
                 <a:srgbClr val="000000"/>
               </a:solidFill>
@@ -2022,7 +2022,7 @@
               <a:buChar char=""/>
             </a:pPr>
             <a:r>
-              <a:rPr b="0" lang="en-GB" sz="2400" spc="-1" strike="noStrike">
+              <a:rPr b="0" lang="en-US" sz="2400" spc="-1" strike="noStrike">
                 <a:solidFill>
                   <a:srgbClr val="000000"/>
                 </a:solidFill>
@@ -2030,7 +2030,7 @@
               </a:rPr>
               <a:t>Third Outline Level</a:t>
             </a:r>
-            <a:endParaRPr b="0" lang="en-GB" sz="2400" spc="-1" strike="noStrike">
+            <a:endParaRPr b="0" lang="en-US" sz="2400" spc="-1" strike="noStrike">
               <a:solidFill>
                 <a:srgbClr val="000000"/>
               </a:solidFill>
@@ -2050,7 +2050,7 @@
               <a:buChar char=""/>
             </a:pPr>
             <a:r>
-              <a:rPr b="0" lang="en-GB" sz="2000" spc="-1" strike="noStrike">
+              <a:rPr b="0" lang="en-US" sz="2000" spc="-1" strike="noStrike">
                 <a:solidFill>
                   <a:srgbClr val="000000"/>
                 </a:solidFill>
@@ -2058,7 +2058,7 @@
               </a:rPr>
               <a:t>Fourth Outline Level</a:t>
             </a:r>
-            <a:endParaRPr b="0" lang="en-GB" sz="2000" spc="-1" strike="noStrike">
+            <a:endParaRPr b="0" lang="en-US" sz="2000" spc="-1" strike="noStrike">
               <a:solidFill>
                 <a:srgbClr val="000000"/>
               </a:solidFill>
@@ -2078,7 +2078,7 @@
               <a:buChar char=""/>
             </a:pPr>
             <a:r>
-              <a:rPr b="0" lang="en-GB" sz="2000" spc="-1" strike="noStrike">
+              <a:rPr b="0" lang="en-US" sz="2000" spc="-1" strike="noStrike">
                 <a:solidFill>
                   <a:srgbClr val="000000"/>
                 </a:solidFill>
@@ -2086,7 +2086,7 @@
               </a:rPr>
               <a:t>Fifth Outline Level</a:t>
             </a:r>
-            <a:endParaRPr b="0" lang="en-GB" sz="2000" spc="-1" strike="noStrike">
+            <a:endParaRPr b="0" lang="en-US" sz="2000" spc="-1" strike="noStrike">
               <a:solidFill>
                 <a:srgbClr val="000000"/>
               </a:solidFill>
@@ -2106,7 +2106,7 @@
               <a:buChar char=""/>
             </a:pPr>
             <a:r>
-              <a:rPr b="0" lang="en-GB" sz="2000" spc="-1" strike="noStrike">
+              <a:rPr b="0" lang="en-US" sz="2000" spc="-1" strike="noStrike">
                 <a:solidFill>
                   <a:srgbClr val="000000"/>
                 </a:solidFill>
@@ -2114,7 +2114,7 @@
               </a:rPr>
               <a:t>Sixth Outline Level</a:t>
             </a:r>
-            <a:endParaRPr b="0" lang="en-GB" sz="2000" spc="-1" strike="noStrike">
+            <a:endParaRPr b="0" lang="en-US" sz="2000" spc="-1" strike="noStrike">
               <a:solidFill>
                 <a:srgbClr val="000000"/>
               </a:solidFill>
@@ -2134,7 +2134,7 @@
               <a:buChar char=""/>
             </a:pPr>
             <a:r>
-              <a:rPr b="0" lang="en-GB" sz="2000" spc="-1" strike="noStrike">
+              <a:rPr b="0" lang="en-US" sz="2000" spc="-1" strike="noStrike">
                 <a:solidFill>
                   <a:srgbClr val="000000"/>
                 </a:solidFill>
@@ -2142,7 +2142,7 @@
               </a:rPr>
               <a:t>Seventh Outline Level</a:t>
             </a:r>
-            <a:endParaRPr b="0" lang="en-GB" sz="2000" spc="-1" strike="noStrike">
+            <a:endParaRPr b="0" lang="en-US" sz="2000" spc="-1" strike="noStrike">
               <a:solidFill>
                 <a:srgbClr val="000000"/>
               </a:solidFill>
@@ -2186,7 +2186,7 @@
         <p:spPr>
           <a:xfrm>
             <a:off x="527400" y="1412640"/>
-            <a:ext cx="10356480" cy="1143000"/>
+            <a:ext cx="10356120" cy="1142640"/>
           </a:xfrm>
           <a:prstGeom prst="rect">
             <a:avLst/>
@@ -2222,7 +2222,7 @@
               </a:rPr>
               <a:t>Emerging Technologies for the Circular Economy</a:t>
             </a:r>
-            <a:endParaRPr b="0" lang="en-GB" sz="3200" spc="-1" strike="noStrike">
+            <a:endParaRPr b="0" lang="en-US" sz="3200" spc="-1" strike="noStrike">
               <a:solidFill>
                 <a:srgbClr val="000000"/>
               </a:solidFill>
@@ -2240,7 +2240,7 @@
         <p:spPr>
           <a:xfrm>
             <a:off x="527400" y="2852640"/>
-            <a:ext cx="10356480" cy="2363760"/>
+            <a:ext cx="10356120" cy="2363400"/>
           </a:xfrm>
           <a:prstGeom prst="rect">
             <a:avLst/>
@@ -2272,7 +2272,7 @@
                 <a:tab algn="l" pos="0"/>
               </a:tabLst>
             </a:pPr>
-            <a:endParaRPr b="0" lang="en-GB" sz="2400" spc="-1" strike="noStrike">
+            <a:endParaRPr b="0" lang="en-US" sz="2400" spc="-1" strike="noStrike">
               <a:solidFill>
                 <a:srgbClr val="000000"/>
               </a:solidFill>
@@ -2301,7 +2301,7 @@
               </a:rPr>
               <a:t>Lecture 0: Organization</a:t>
             </a:r>
-            <a:endParaRPr b="0" lang="en-GB" sz="2400" spc="-1" strike="noStrike">
+            <a:endParaRPr b="0" lang="en-US" sz="2400" spc="-1" strike="noStrike">
               <a:solidFill>
                 <a:srgbClr val="000000"/>
               </a:solidFill>
@@ -2320,7 +2320,7 @@
                 <a:tab algn="l" pos="0"/>
               </a:tabLst>
             </a:pPr>
-            <a:endParaRPr b="0" lang="en-GB" sz="2400" spc="-1" strike="noStrike">
+            <a:endParaRPr b="0" lang="en-US" sz="2400" spc="-1" strike="noStrike">
               <a:solidFill>
                 <a:srgbClr val="000000"/>
               </a:solidFill>
@@ -2339,7 +2339,7 @@
                 <a:tab algn="l" pos="0"/>
               </a:tabLst>
             </a:pPr>
-            <a:endParaRPr b="0" lang="en-GB" sz="2400" spc="-1" strike="noStrike">
+            <a:endParaRPr b="0" lang="en-US" sz="2400" spc="-1" strike="noStrike">
               <a:solidFill>
                 <a:srgbClr val="000000"/>
               </a:solidFill>
@@ -2368,7 +2368,7 @@
               </a:rPr>
               <a:t>Prof. Dr. Benjamin Leiding</a:t>
             </a:r>
-            <a:endParaRPr b="0" lang="en-GB" sz="1600" spc="-1" strike="noStrike">
+            <a:endParaRPr b="0" lang="en-US" sz="1600" spc="-1" strike="noStrike">
               <a:solidFill>
                 <a:srgbClr val="000000"/>
               </a:solidFill>
@@ -2397,7 +2397,7 @@
               </a:rPr>
               <a:t>M.Sc. Anant Sujatanagarjuna</a:t>
             </a:r>
-            <a:endParaRPr b="0" lang="en-GB" sz="1600" spc="-1" strike="noStrike">
+            <a:endParaRPr b="0" lang="en-US" sz="1600" spc="-1" strike="noStrike">
               <a:solidFill>
                 <a:srgbClr val="000000"/>
               </a:solidFill>
@@ -2426,7 +2426,7 @@
               </a:rPr>
               <a:t>M.Sc. Shohreh Kia</a:t>
             </a:r>
-            <a:endParaRPr b="0" lang="en-GB" sz="1600" spc="-1" strike="noStrike">
+            <a:endParaRPr b="0" lang="en-US" sz="1600" spc="-1" strike="noStrike">
               <a:solidFill>
                 <a:srgbClr val="000000"/>
               </a:solidFill>
@@ -2474,7 +2474,7 @@
         <p:spPr>
           <a:xfrm>
             <a:off x="335520" y="764640"/>
-            <a:ext cx="10740600" cy="491400"/>
+            <a:ext cx="10740240" cy="491040"/>
           </a:xfrm>
           <a:prstGeom prst="rect">
             <a:avLst/>
@@ -2510,7 +2510,7 @@
               </a:rPr>
               <a:t>Learning Outcome</a:t>
             </a:r>
-            <a:endParaRPr b="0" lang="en-GB" sz="2400" spc="-1" strike="noStrike">
+            <a:endParaRPr b="0" lang="en-US" sz="2400" spc="-1" strike="noStrike">
               <a:solidFill>
                 <a:srgbClr val="000000"/>
               </a:solidFill>
@@ -2523,7 +2523,7 @@
                 <a:spcPct val="100000"/>
               </a:lnSpc>
             </a:pPr>
-            <a:endParaRPr b="0" lang="en-GB" sz="2400" spc="-1" strike="noStrike">
+            <a:endParaRPr b="0" lang="en-US" sz="2400" spc="-1" strike="noStrike">
               <a:solidFill>
                 <a:srgbClr val="000000"/>
               </a:solidFill>
@@ -2541,7 +2541,7 @@
         <p:spPr>
           <a:xfrm>
             <a:off x="335520" y="2408400"/>
-            <a:ext cx="10740600" cy="3888360"/>
+            <a:ext cx="10740240" cy="3888000"/>
           </a:xfrm>
           <a:prstGeom prst="rect">
             <a:avLst/>
@@ -2586,7 +2586,7 @@
               </a:rPr>
               <a:t>Basic understanding of the concept of the Linear Economy, the Circular Economy, the Performance Economy and sustainability</a:t>
             </a:r>
-            <a:endParaRPr b="0" lang="en-GB" sz="1800" spc="-1" strike="noStrike">
+            <a:endParaRPr b="0" lang="en-US" sz="1800" spc="-1" strike="noStrike">
               <a:solidFill>
                 <a:srgbClr val="000000"/>
               </a:solidFill>
@@ -2618,7 +2618,7 @@
               </a:rPr>
               <a:t>Basic understanding of new technologies in the field of decentralized and smart systems</a:t>
             </a:r>
-            <a:endParaRPr b="0" lang="en-GB" sz="1800" spc="-1" strike="noStrike">
+            <a:endParaRPr b="0" lang="en-US" sz="1800" spc="-1" strike="noStrike">
               <a:solidFill>
                 <a:srgbClr val="000000"/>
               </a:solidFill>
@@ -2650,7 +2650,7 @@
               </a:rPr>
               <a:t>Understanding and overview of the Internet of Things and related concepts</a:t>
             </a:r>
-            <a:endParaRPr b="0" lang="en-GB" sz="1800" spc="-1" strike="noStrike">
+            <a:endParaRPr b="0" lang="en-US" sz="1800" spc="-1" strike="noStrike">
               <a:solidFill>
                 <a:srgbClr val="000000"/>
               </a:solidFill>
@@ -2682,7 +2682,7 @@
               </a:rPr>
               <a:t>Ability to design decentralized smart systems and applications in the context of connected sensor systems</a:t>
             </a:r>
-            <a:endParaRPr b="0" lang="en-GB" sz="1800" spc="-1" strike="noStrike">
+            <a:endParaRPr b="0" lang="en-US" sz="1800" spc="-1" strike="noStrike">
               <a:solidFill>
                 <a:srgbClr val="000000"/>
               </a:solidFill>
@@ -2730,7 +2730,7 @@
         <p:spPr>
           <a:xfrm>
             <a:off x="335520" y="764640"/>
-            <a:ext cx="10740600" cy="491400"/>
+            <a:ext cx="10740240" cy="491040"/>
           </a:xfrm>
           <a:prstGeom prst="rect">
             <a:avLst/>
@@ -2766,7 +2766,7 @@
               </a:rPr>
               <a:t>Learning Outcome</a:t>
             </a:r>
-            <a:endParaRPr b="0" lang="en-GB" sz="2400" spc="-1" strike="noStrike">
+            <a:endParaRPr b="0" lang="en-US" sz="2400" spc="-1" strike="noStrike">
               <a:solidFill>
                 <a:srgbClr val="000000"/>
               </a:solidFill>
@@ -2784,7 +2784,7 @@
         <p:spPr>
           <a:xfrm>
             <a:off x="335520" y="2408400"/>
-            <a:ext cx="10740600" cy="3888360"/>
+            <a:ext cx="10740240" cy="3888000"/>
           </a:xfrm>
           <a:prstGeom prst="rect">
             <a:avLst/>
@@ -2829,7 +2829,7 @@
               </a:rPr>
               <a:t>Basic understanding of the concept of the Linear Economy, the Circular Economy, the Performance Economy and sustainability</a:t>
             </a:r>
-            <a:endParaRPr b="0" lang="en-GB" sz="1800" spc="-1" strike="noStrike">
+            <a:endParaRPr b="0" lang="en-US" sz="1800" spc="-1" strike="noStrike">
               <a:solidFill>
                 <a:srgbClr val="000000"/>
               </a:solidFill>
@@ -2861,7 +2861,7 @@
               </a:rPr>
               <a:t>Basic understanding of new technologies in the field of decentralized and smart systems</a:t>
             </a:r>
-            <a:endParaRPr b="0" lang="en-GB" sz="1800" spc="-1" strike="noStrike">
+            <a:endParaRPr b="0" lang="en-US" sz="1800" spc="-1" strike="noStrike">
               <a:solidFill>
                 <a:srgbClr val="000000"/>
               </a:solidFill>
@@ -2893,7 +2893,7 @@
               </a:rPr>
               <a:t>Understanding and overview of the Internet of Things and related concepts</a:t>
             </a:r>
-            <a:endParaRPr b="0" lang="en-GB" sz="1800" spc="-1" strike="noStrike">
+            <a:endParaRPr b="0" lang="en-US" sz="1800" spc="-1" strike="noStrike">
               <a:solidFill>
                 <a:srgbClr val="000000"/>
               </a:solidFill>
@@ -2925,7 +2925,7 @@
               </a:rPr>
               <a:t>Ability to design decentralized smart systems and applications in the context of connected sensor systems</a:t>
             </a:r>
-            <a:endParaRPr b="0" lang="en-GB" sz="1800" spc="-1" strike="noStrike">
+            <a:endParaRPr b="0" lang="en-US" sz="1800" spc="-1" strike="noStrike">
               <a:solidFill>
                 <a:srgbClr val="000000"/>
               </a:solidFill>
@@ -2957,7 +2957,7 @@
               </a:rPr>
               <a:t>Knowledge of the design and consideration of privacy-preserving data processing procedures for smart and decentralized applications</a:t>
             </a:r>
-            <a:endParaRPr b="0" lang="en-GB" sz="1800" spc="-1" strike="noStrike">
+            <a:endParaRPr b="0" lang="en-US" sz="1800" spc="-1" strike="noStrike">
               <a:solidFill>
                 <a:srgbClr val="000000"/>
               </a:solidFill>
@@ -3005,7 +3005,7 @@
         <p:spPr>
           <a:xfrm>
             <a:off x="335520" y="764640"/>
-            <a:ext cx="10740600" cy="491400"/>
+            <a:ext cx="10740240" cy="491040"/>
           </a:xfrm>
           <a:prstGeom prst="rect">
             <a:avLst/>
@@ -3041,7 +3041,7 @@
               </a:rPr>
               <a:t>Learning Outcome</a:t>
             </a:r>
-            <a:endParaRPr b="0" lang="en-GB" sz="2400" spc="-1" strike="noStrike">
+            <a:endParaRPr b="0" lang="en-US" sz="2400" spc="-1" strike="noStrike">
               <a:solidFill>
                 <a:srgbClr val="000000"/>
               </a:solidFill>
@@ -3054,7 +3054,7 @@
                 <a:spcPct val="100000"/>
               </a:lnSpc>
             </a:pPr>
-            <a:endParaRPr b="0" lang="en-GB" sz="2400" spc="-1" strike="noStrike">
+            <a:endParaRPr b="0" lang="en-US" sz="2400" spc="-1" strike="noStrike">
               <a:solidFill>
                 <a:srgbClr val="000000"/>
               </a:solidFill>
@@ -3072,7 +3072,7 @@
         <p:spPr>
           <a:xfrm>
             <a:off x="335520" y="2408400"/>
-            <a:ext cx="10740600" cy="3888360"/>
+            <a:ext cx="10740240" cy="3888000"/>
           </a:xfrm>
           <a:prstGeom prst="rect">
             <a:avLst/>
@@ -3117,7 +3117,7 @@
               </a:rPr>
               <a:t>Basic understanding of the concept of the Linear Economy, the Circular Economy, the Performance Economy and sustainability</a:t>
             </a:r>
-            <a:endParaRPr b="0" lang="en-GB" sz="1800" spc="-1" strike="noStrike">
+            <a:endParaRPr b="0" lang="en-US" sz="1800" spc="-1" strike="noStrike">
               <a:solidFill>
                 <a:srgbClr val="000000"/>
               </a:solidFill>
@@ -3149,7 +3149,7 @@
               </a:rPr>
               <a:t>Basic understanding of new technologies in the field of decentralized and smart systems</a:t>
             </a:r>
-            <a:endParaRPr b="0" lang="en-GB" sz="1800" spc="-1" strike="noStrike">
+            <a:endParaRPr b="0" lang="en-US" sz="1800" spc="-1" strike="noStrike">
               <a:solidFill>
                 <a:srgbClr val="000000"/>
               </a:solidFill>
@@ -3181,7 +3181,7 @@
               </a:rPr>
               <a:t>Understanding and overview of the Internet of Things and related concepts</a:t>
             </a:r>
-            <a:endParaRPr b="0" lang="en-GB" sz="1800" spc="-1" strike="noStrike">
+            <a:endParaRPr b="0" lang="en-US" sz="1800" spc="-1" strike="noStrike">
               <a:solidFill>
                 <a:srgbClr val="000000"/>
               </a:solidFill>
@@ -3213,7 +3213,7 @@
               </a:rPr>
               <a:t>Ability to design decentralized smart systems and applications in the context of connected sensor systems</a:t>
             </a:r>
-            <a:endParaRPr b="0" lang="en-GB" sz="1800" spc="-1" strike="noStrike">
+            <a:endParaRPr b="0" lang="en-US" sz="1800" spc="-1" strike="noStrike">
               <a:solidFill>
                 <a:srgbClr val="000000"/>
               </a:solidFill>
@@ -3245,7 +3245,7 @@
               </a:rPr>
               <a:t>Knowledge of the design and consideration of privacy-preserving data processing procedures for smart and decentralized applications</a:t>
             </a:r>
-            <a:endParaRPr b="0" lang="en-GB" sz="1800" spc="-1" strike="noStrike">
+            <a:endParaRPr b="0" lang="en-US" sz="1800" spc="-1" strike="noStrike">
               <a:solidFill>
                 <a:srgbClr val="000000"/>
               </a:solidFill>
@@ -3277,7 +3277,7 @@
               </a:rPr>
               <a:t>Experience in prototyping such applications and systems</a:t>
             </a:r>
-            <a:endParaRPr b="0" lang="en-GB" sz="1800" spc="-1" strike="noStrike">
+            <a:endParaRPr b="0" lang="en-US" sz="1800" spc="-1" strike="noStrike">
               <a:solidFill>
                 <a:srgbClr val="000000"/>
               </a:solidFill>
@@ -3325,7 +3325,7 @@
         <p:spPr>
           <a:xfrm>
             <a:off x="335520" y="764640"/>
-            <a:ext cx="10740600" cy="491400"/>
+            <a:ext cx="10740240" cy="491040"/>
           </a:xfrm>
           <a:prstGeom prst="rect">
             <a:avLst/>
@@ -3361,7 +3361,7 @@
               </a:rPr>
               <a:t>Lectures</a:t>
             </a:r>
-            <a:endParaRPr b="0" lang="en-GB" sz="2400" spc="-1" strike="noStrike">
+            <a:endParaRPr b="0" lang="en-US" sz="2400" spc="-1" strike="noStrike">
               <a:solidFill>
                 <a:srgbClr val="000000"/>
               </a:solidFill>
@@ -3379,7 +3379,7 @@
         <p:spPr>
           <a:xfrm>
             <a:off x="335520" y="1268640"/>
-            <a:ext cx="10740600" cy="5028120"/>
+            <a:ext cx="10740240" cy="5027760"/>
           </a:xfrm>
           <a:prstGeom prst="rect">
             <a:avLst/>
@@ -3424,7 +3424,7 @@
               </a:rPr>
               <a:t>15.04.2024 → Organization (L00) + Introduction (L01)</a:t>
             </a:r>
-            <a:endParaRPr b="0" lang="en-GB" sz="1800" spc="-1" strike="noStrike">
+            <a:endParaRPr b="0" lang="en-US" sz="1800" spc="-1" strike="noStrike">
               <a:solidFill>
                 <a:srgbClr val="000000"/>
               </a:solidFill>
@@ -3456,7 +3456,7 @@
               </a:rPr>
               <a:t>22.04.2024 → Circular Economy (L02) </a:t>
             </a:r>
-            <a:endParaRPr b="0" lang="en-GB" sz="1800" spc="-1" strike="noStrike">
+            <a:endParaRPr b="0" lang="en-US" sz="1800" spc="-1" strike="noStrike">
               <a:solidFill>
                 <a:srgbClr val="000000"/>
               </a:solidFill>
@@ -3488,7 +3488,7 @@
               </a:rPr>
               <a:t>29.04.2024 → Lifecycle Assessment – LCA (L03)</a:t>
             </a:r>
-            <a:endParaRPr b="0" lang="en-GB" sz="1800" spc="-1" strike="noStrike">
+            <a:endParaRPr b="0" lang="en-US" sz="1800" spc="-1" strike="noStrike">
               <a:solidFill>
                 <a:srgbClr val="000000"/>
               </a:solidFill>
@@ -3520,7 +3520,7 @@
               </a:rPr>
               <a:t>06.05.2024 → Introduction to the Internet of Things (L04)</a:t>
             </a:r>
-            <a:endParaRPr b="0" lang="en-GB" sz="1800" spc="-1" strike="noStrike">
+            <a:endParaRPr b="0" lang="en-US" sz="1800" spc="-1" strike="noStrike">
               <a:solidFill>
                 <a:srgbClr val="000000"/>
               </a:solidFill>
@@ -3552,7 +3552,7 @@
               </a:rPr>
               <a:t>13.05.2024 → Internet of Things – Communication + Security and Privacy (L05)</a:t>
             </a:r>
-            <a:endParaRPr b="0" lang="en-GB" sz="1800" spc="-1" strike="noStrike">
+            <a:endParaRPr b="0" lang="en-US" sz="1800" spc="-1" strike="noStrike">
               <a:solidFill>
                 <a:srgbClr val="000000"/>
               </a:solidFill>
@@ -3584,7 +3584,7 @@
               </a:rPr>
               <a:t>27.05.2024 → Internet of Things – Data Processing and BigData (L06)</a:t>
             </a:r>
-            <a:endParaRPr b="0" lang="en-GB" sz="1800" spc="-1" strike="noStrike">
+            <a:endParaRPr b="0" lang="en-US" sz="1800" spc="-1" strike="noStrike">
               <a:solidFill>
                 <a:srgbClr val="000000"/>
               </a:solidFill>
@@ -3616,7 +3616,7 @@
               </a:rPr>
               <a:t>03.06.2024 → Industrial Internet of Things (L07)</a:t>
             </a:r>
-            <a:endParaRPr b="0" lang="en-GB" sz="1800" spc="-1" strike="noStrike">
+            <a:endParaRPr b="0" lang="en-US" sz="1800" spc="-1" strike="noStrike">
               <a:solidFill>
                 <a:srgbClr val="000000"/>
               </a:solidFill>
@@ -3648,7 +3648,7 @@
               </a:rPr>
               <a:t>10.06.2024 → Introduction to Blockchain Technology (L08)</a:t>
             </a:r>
-            <a:endParaRPr b="0" lang="en-GB" sz="1800" spc="-1" strike="noStrike">
+            <a:endParaRPr b="0" lang="en-US" sz="1800" spc="-1" strike="noStrike">
               <a:solidFill>
                 <a:srgbClr val="000000"/>
               </a:solidFill>
@@ -3680,7 +3680,7 @@
               </a:rPr>
               <a:t>17.06.2024 → Blockchain Technology – Consensus (L09)</a:t>
             </a:r>
-            <a:endParaRPr b="0" lang="en-GB" sz="1800" spc="-1" strike="noStrike">
+            <a:endParaRPr b="0" lang="en-US" sz="1800" spc="-1" strike="noStrike">
               <a:solidFill>
                 <a:srgbClr val="000000"/>
               </a:solidFill>
@@ -3712,7 +3712,7 @@
               </a:rPr>
               <a:t>24.06.2024 → Blockchain Technology – Ethereum and Smart Contracts (L10)</a:t>
             </a:r>
-            <a:endParaRPr b="0" lang="en-GB" sz="1800" spc="-1" strike="noStrike">
+            <a:endParaRPr b="0" lang="en-US" sz="1800" spc="-1" strike="noStrike">
               <a:solidFill>
                 <a:srgbClr val="000000"/>
               </a:solidFill>
@@ -3744,7 +3744,7 @@
               </a:rPr>
               <a:t>01.07.2024 → Blockchain Technology and Sustainability (L11)</a:t>
             </a:r>
-            <a:endParaRPr b="0" lang="en-GB" sz="1800" spc="-1" strike="noStrike">
+            <a:endParaRPr b="0" lang="en-US" sz="1800" spc="-1" strike="noStrike">
               <a:solidFill>
                 <a:srgbClr val="000000"/>
               </a:solidFill>
@@ -3776,7 +3776,7 @@
               </a:rPr>
               <a:t>08.07.2024 → The Machine-to-Everything Economy – A step towards the CE 2.0? (L12)</a:t>
             </a:r>
-            <a:endParaRPr b="0" lang="en-GB" sz="1800" spc="-1" strike="noStrike">
+            <a:endParaRPr b="0" lang="en-US" sz="1800" spc="-1" strike="noStrike">
               <a:solidFill>
                 <a:srgbClr val="000000"/>
               </a:solidFill>
@@ -3808,7 +3808,7 @@
               </a:rPr>
               <a:t>22.07.2024 → Exam Q&amp;A</a:t>
             </a:r>
-            <a:endParaRPr b="0" lang="en-GB" sz="1800" spc="-1" strike="noStrike">
+            <a:endParaRPr b="0" lang="en-US" sz="1800" spc="-1" strike="noStrike">
               <a:solidFill>
                 <a:srgbClr val="000000"/>
               </a:solidFill>
@@ -3856,7 +3856,7 @@
         <p:spPr>
           <a:xfrm>
             <a:off x="335520" y="764640"/>
-            <a:ext cx="10740600" cy="491400"/>
+            <a:ext cx="10740240" cy="491040"/>
           </a:xfrm>
           <a:prstGeom prst="rect">
             <a:avLst/>
@@ -3892,7 +3892,7 @@
               </a:rPr>
               <a:t>Exercises</a:t>
             </a:r>
-            <a:endParaRPr b="0" lang="en-GB" sz="2400" spc="-1" strike="noStrike">
+            <a:endParaRPr b="0" lang="en-US" sz="2400" spc="-1" strike="noStrike">
               <a:solidFill>
                 <a:srgbClr val="000000"/>
               </a:solidFill>
@@ -3910,7 +3910,7 @@
         <p:spPr>
           <a:xfrm>
             <a:off x="335520" y="1268640"/>
-            <a:ext cx="10740600" cy="5028120"/>
+            <a:ext cx="10740240" cy="5027760"/>
           </a:xfrm>
           <a:prstGeom prst="rect">
             <a:avLst/>
@@ -3975,7 +3975,7 @@
               </a:rPr>
               <a:t> Exercise 01 – Knowledge Test (MC)</a:t>
             </a:r>
-            <a:endParaRPr b="0" lang="en-GB" sz="1800" spc="-1" strike="noStrike">
+            <a:endParaRPr b="0" lang="en-US" sz="1800" spc="-1" strike="noStrike">
               <a:solidFill>
                 <a:srgbClr val="000000"/>
               </a:solidFill>
@@ -4027,7 +4027,7 @@
               </a:rPr>
               <a:t> Exercise 02 – Circular Economy (MC)</a:t>
             </a:r>
-            <a:endParaRPr b="0" lang="en-GB" sz="1800" spc="-1" strike="noStrike">
+            <a:endParaRPr b="0" lang="en-US" sz="1800" spc="-1" strike="noStrike">
               <a:solidFill>
                 <a:srgbClr val="000000"/>
               </a:solidFill>
@@ -4079,7 +4079,7 @@
               </a:rPr>
               <a:t> Exercise 03 – Lifecycle Assessment (LCA)</a:t>
             </a:r>
-            <a:endParaRPr b="0" lang="en-GB" sz="1800" spc="-1" strike="noStrike">
+            <a:endParaRPr b="0" lang="en-US" sz="1800" spc="-1" strike="noStrike">
               <a:solidFill>
                 <a:srgbClr val="000000"/>
               </a:solidFill>
@@ -4131,7 +4131,7 @@
               </a:rPr>
               <a:t> Exercise 04 – IoT Sensing and Gathering Data</a:t>
             </a:r>
-            <a:endParaRPr b="0" lang="en-GB" sz="1800" spc="-1" strike="noStrike">
+            <a:endParaRPr b="0" lang="en-US" sz="1800" spc="-1" strike="noStrike">
               <a:solidFill>
                 <a:srgbClr val="000000"/>
               </a:solidFill>
@@ -4181,9 +4181,9 @@
                 <a:latin typeface="DejaVu Sans"/>
                 <a:ea typeface="DejaVu Sans"/>
               </a:rPr>
-              <a:t> Exercise 05 – IoT Security</a:t>
-            </a:r>
-            <a:endParaRPr b="0" lang="en-GB" sz="1800" spc="-1" strike="noStrike">
+              <a:t> Exercise 05 – IoT Data Processing</a:t>
+            </a:r>
+            <a:endParaRPr b="0" lang="en-US" sz="1800" spc="-1" strike="noStrike">
               <a:solidFill>
                 <a:srgbClr val="000000"/>
               </a:solidFill>
@@ -4233,9 +4233,9 @@
                 <a:latin typeface="DejaVu Sans"/>
                 <a:ea typeface="DejaVu Sans"/>
               </a:rPr>
-              <a:t> Exercise 06 – IoT Data Processing</a:t>
-            </a:r>
-            <a:endParaRPr b="0" lang="en-GB" sz="1800" spc="-1" strike="noStrike">
+              <a:t> Exercise 06 – IoT Security</a:t>
+            </a:r>
+            <a:endParaRPr b="0" lang="en-US" sz="1800" spc="-1" strike="noStrike">
               <a:solidFill>
                 <a:srgbClr val="000000"/>
               </a:solidFill>
@@ -4267,7 +4267,7 @@
               </a:rPr>
               <a:t>03.06.2024 → Exercise 07 – Industrial IoT</a:t>
             </a:r>
-            <a:endParaRPr b="0" lang="en-GB" sz="1800" spc="-1" strike="noStrike">
+            <a:endParaRPr b="0" lang="en-US" sz="1800" spc="-1" strike="noStrike">
               <a:solidFill>
                 <a:srgbClr val="000000"/>
               </a:solidFill>
@@ -4339,7 +4339,7 @@
               </a:rPr>
               <a:t> 08 – Blockchain (MC)</a:t>
             </a:r>
-            <a:endParaRPr b="0" lang="en-GB" sz="1800" spc="-1" strike="noStrike">
+            <a:endParaRPr b="0" lang="en-US" sz="1800" spc="-1" strike="noStrike">
               <a:solidFill>
                 <a:srgbClr val="000000"/>
               </a:solidFill>
@@ -4391,7 +4391,7 @@
               </a:rPr>
               <a:t> Exercise 09 – Blockchain Basics</a:t>
             </a:r>
-            <a:endParaRPr b="0" lang="en-GB" sz="1800" spc="-1" strike="noStrike">
+            <a:endParaRPr b="0" lang="en-US" sz="1800" spc="-1" strike="noStrike">
               <a:solidFill>
                 <a:srgbClr val="000000"/>
               </a:solidFill>
@@ -4443,7 +4443,7 @@
               </a:rPr>
               <a:t> Exercise 10 – Blockchain Conensus</a:t>
             </a:r>
-            <a:endParaRPr b="0" lang="en-GB" sz="1800" spc="-1" strike="noStrike">
+            <a:endParaRPr b="0" lang="en-US" sz="1800" spc="-1" strike="noStrike">
               <a:solidFill>
                 <a:srgbClr val="000000"/>
               </a:solidFill>
@@ -4495,7 +4495,7 @@
               </a:rPr>
               <a:t> Exercise 11 – Blockchain Tokens</a:t>
             </a:r>
-            <a:endParaRPr b="0" lang="en-GB" sz="1800" spc="-1" strike="noStrike">
+            <a:endParaRPr b="0" lang="en-US" sz="1800" spc="-1" strike="noStrike">
               <a:solidFill>
                 <a:srgbClr val="000000"/>
               </a:solidFill>
@@ -4543,7 +4543,7 @@
         <p:spPr>
           <a:xfrm>
             <a:off x="335520" y="764640"/>
-            <a:ext cx="10740600" cy="491400"/>
+            <a:ext cx="10740240" cy="491040"/>
           </a:xfrm>
           <a:prstGeom prst="rect">
             <a:avLst/>
@@ -4579,7 +4579,7 @@
               </a:rPr>
               <a:t>Course Organization</a:t>
             </a:r>
-            <a:endParaRPr b="0" lang="en-GB" sz="2400" spc="-1" strike="noStrike">
+            <a:endParaRPr b="0" lang="en-US" sz="2400" spc="-1" strike="noStrike">
               <a:solidFill>
                 <a:srgbClr val="000000"/>
               </a:solidFill>
@@ -4597,7 +4597,7 @@
         <p:spPr>
           <a:xfrm>
             <a:off x="335520" y="1268280"/>
-            <a:ext cx="10740600" cy="5028120"/>
+            <a:ext cx="10740240" cy="5027760"/>
           </a:xfrm>
           <a:prstGeom prst="rect">
             <a:avLst/>
@@ -4626,7 +4626,7 @@
                 <a:spcPts val="360"/>
               </a:spcBef>
             </a:pPr>
-            <a:endParaRPr b="0" lang="en-GB" sz="1800" spc="-1" strike="noStrike">
+            <a:endParaRPr b="0" lang="en-US" sz="1800" spc="-1" strike="noStrike">
               <a:solidFill>
                 <a:srgbClr val="000000"/>
               </a:solidFill>
@@ -4658,7 +4658,7 @@
               </a:rPr>
               <a:t>Organization of the lecture:</a:t>
             </a:r>
-            <a:endParaRPr b="0" lang="en-GB" sz="1800" spc="-1" strike="noStrike">
+            <a:endParaRPr b="0" lang="en-US" sz="1800" spc="-1" strike="noStrike">
               <a:solidFill>
                 <a:srgbClr val="000000"/>
               </a:solidFill>
@@ -4712,7 +4712,7 @@
               </a:rPr>
               <a:t>)</a:t>
             </a:r>
-            <a:endParaRPr b="0" lang="en-GB" sz="1800" spc="-1" strike="noStrike">
+            <a:endParaRPr b="0" lang="en-US" sz="1800" spc="-1" strike="noStrike">
               <a:solidFill>
                 <a:srgbClr val="000000"/>
               </a:solidFill>
@@ -4744,7 +4744,7 @@
               </a:rPr>
               <a:t>Please report bugs!</a:t>
             </a:r>
-            <a:endParaRPr b="0" lang="en-GB" sz="1800" spc="-1" strike="noStrike">
+            <a:endParaRPr b="0" lang="en-US" sz="1800" spc="-1" strike="noStrike">
               <a:solidFill>
                 <a:srgbClr val="000000"/>
               </a:solidFill>
@@ -4776,7 +4776,7 @@
               </a:rPr>
               <a:t>Lectures and exercises as live stream (BBB – next slide)</a:t>
             </a:r>
-            <a:endParaRPr b="0" lang="en-GB" sz="1800" spc="-1" strike="noStrike">
+            <a:endParaRPr b="0" lang="en-US" sz="1800" spc="-1" strike="noStrike">
               <a:solidFill>
                 <a:srgbClr val="000000"/>
               </a:solidFill>
@@ -4808,7 +4808,7 @@
               </a:rPr>
               <a:t>Lecture recordings will be available on StudIP and on Github</a:t>
             </a:r>
-            <a:endParaRPr b="0" lang="en-GB" sz="1800" spc="-1" strike="noStrike">
+            <a:endParaRPr b="0" lang="en-US" sz="1800" spc="-1" strike="noStrike">
               <a:solidFill>
                 <a:srgbClr val="000000"/>
               </a:solidFill>
@@ -4860,7 +4860,7 @@
               </a:rPr>
               <a:t>Time for questions and eventual tutorials related to the exercises</a:t>
             </a:r>
-            <a:endParaRPr b="0" lang="en-GB" sz="1800" spc="-1" strike="noStrike">
+            <a:endParaRPr b="0" lang="en-US" sz="1800" spc="-1" strike="noStrike">
               <a:solidFill>
                 <a:srgbClr val="000000"/>
               </a:solidFill>
@@ -4876,7 +4876,7 @@
                 <a:spcPts val="360"/>
               </a:spcBef>
             </a:pPr>
-            <a:endParaRPr b="0" lang="en-GB" sz="1800" spc="-1" strike="noStrike">
+            <a:endParaRPr b="0" lang="en-US" sz="1800" spc="-1" strike="noStrike">
               <a:solidFill>
                 <a:srgbClr val="000000"/>
               </a:solidFill>
@@ -4954,7 +4954,7 @@
               </a:rPr>
               <a:t> respond to</a:t>
             </a:r>
-            <a:endParaRPr b="0" lang="en-GB" sz="1800" spc="-1" strike="noStrike">
+            <a:endParaRPr b="0" lang="en-US" sz="1800" spc="-1" strike="noStrike">
               <a:solidFill>
                 <a:srgbClr val="000000"/>
               </a:solidFill>
@@ -4980,7 +4980,7 @@
               </a:rPr>
               <a:t>emails written to this specific email address!</a:t>
             </a:r>
-            <a:endParaRPr b="0" lang="en-GB" sz="1800" spc="-1" strike="noStrike">
+            <a:endParaRPr b="0" lang="en-US" sz="1800" spc="-1" strike="noStrike">
               <a:solidFill>
                 <a:srgbClr val="000000"/>
               </a:solidFill>
@@ -5028,7 +5028,7 @@
         <p:spPr>
           <a:xfrm>
             <a:off x="335520" y="764640"/>
-            <a:ext cx="10739160" cy="489960"/>
+            <a:ext cx="10738800" cy="489600"/>
           </a:xfrm>
           <a:prstGeom prst="rect">
             <a:avLst/>
@@ -5064,7 +5064,7 @@
               </a:rPr>
               <a:t>Dates/Times/Locations</a:t>
             </a:r>
-            <a:endParaRPr b="0" lang="en-GB" sz="2400" spc="-1" strike="noStrike">
+            <a:endParaRPr b="0" lang="en-US" sz="2400" spc="-1" strike="noStrike">
               <a:solidFill>
                 <a:srgbClr val="000000"/>
               </a:solidFill>
@@ -5077,7 +5077,7 @@
                 <a:spcPct val="100000"/>
               </a:lnSpc>
             </a:pPr>
-            <a:endParaRPr b="0" lang="en-GB" sz="2400" spc="-1" strike="noStrike">
+            <a:endParaRPr b="0" lang="en-US" sz="2400" spc="-1" strike="noStrike">
               <a:solidFill>
                 <a:srgbClr val="000000"/>
               </a:solidFill>
@@ -5090,7 +5090,7 @@
                 <a:spcPct val="100000"/>
               </a:lnSpc>
             </a:pPr>
-            <a:endParaRPr b="0" lang="en-GB" sz="2400" spc="-1" strike="noStrike">
+            <a:endParaRPr b="0" lang="en-US" sz="2400" spc="-1" strike="noStrike">
               <a:solidFill>
                 <a:srgbClr val="000000"/>
               </a:solidFill>
@@ -5108,7 +5108,7 @@
         <p:spPr>
           <a:xfrm>
             <a:off x="335520" y="1268640"/>
-            <a:ext cx="10739160" cy="5026680"/>
+            <a:ext cx="10738800" cy="5026320"/>
           </a:xfrm>
           <a:prstGeom prst="rect">
             <a:avLst/>
@@ -5137,7 +5137,7 @@
                 <a:spcPts val="360"/>
               </a:spcBef>
             </a:pPr>
-            <a:endParaRPr b="0" lang="en-GB" sz="1800" spc="-1" strike="noStrike">
+            <a:endParaRPr b="0" lang="en-US" sz="1800" spc="-1" strike="noStrike">
               <a:solidFill>
                 <a:srgbClr val="000000"/>
               </a:solidFill>
@@ -5170,7 +5170,7 @@
               </a:rPr>
               <a:t>Lecture:</a:t>
             </a:r>
-            <a:endParaRPr b="0" lang="en-GB" sz="1800" spc="-1" strike="noStrike">
+            <a:endParaRPr b="0" lang="en-US" sz="1800" spc="-1" strike="noStrike">
               <a:solidFill>
                 <a:srgbClr val="000000"/>
               </a:solidFill>
@@ -5252,7 +5252,7 @@
               </a:rPr>
               <a:t>08.07.2024</a:t>
             </a:r>
-            <a:endParaRPr b="0" lang="en-GB" sz="1800" spc="-1" strike="noStrike">
+            <a:endParaRPr b="0" lang="en-US" sz="1800" spc="-1" strike="noStrike">
               <a:solidFill>
                 <a:srgbClr val="000000"/>
               </a:solidFill>
@@ -5306,7 +5306,7 @@
               </a:rPr>
               <a:t>)</a:t>
             </a:r>
-            <a:endParaRPr b="0" lang="en-GB" sz="1800" spc="-1" strike="noStrike">
+            <a:endParaRPr b="0" lang="en-US" sz="1800" spc="-1" strike="noStrike">
               <a:solidFill>
                 <a:srgbClr val="000000"/>
               </a:solidFill>
@@ -5322,7 +5322,7 @@
                 <a:spcPts val="360"/>
               </a:spcBef>
             </a:pPr>
-            <a:endParaRPr b="0" lang="en-GB" sz="1800" spc="-1" strike="noStrike">
+            <a:endParaRPr b="0" lang="en-US" sz="1800" spc="-1" strike="noStrike">
               <a:solidFill>
                 <a:srgbClr val="000000"/>
               </a:solidFill>
@@ -5355,7 +5355,7 @@
               </a:rPr>
               <a:t>Exercise / Q&amp;A:</a:t>
             </a:r>
-            <a:endParaRPr b="0" lang="en-GB" sz="1800" spc="-1" strike="noStrike">
+            <a:endParaRPr b="0" lang="en-US" sz="1800" spc="-1" strike="noStrike">
               <a:solidFill>
                 <a:srgbClr val="000000"/>
               </a:solidFill>
@@ -5437,7 +5437,7 @@
               </a:rPr>
               <a:t>08.07.2024</a:t>
             </a:r>
-            <a:endParaRPr b="0" lang="en-GB" sz="1800" spc="-1" strike="noStrike">
+            <a:endParaRPr b="0" lang="en-US" sz="1800" spc="-1" strike="noStrike">
               <a:solidFill>
                 <a:srgbClr val="000000"/>
               </a:solidFill>
@@ -5491,7 +5491,7 @@
               </a:rPr>
               <a:t>)</a:t>
             </a:r>
-            <a:endParaRPr b="0" lang="en-GB" sz="1800" spc="-1" strike="noStrike">
+            <a:endParaRPr b="0" lang="en-US" sz="1800" spc="-1" strike="noStrike">
               <a:solidFill>
                 <a:srgbClr val="000000"/>
               </a:solidFill>
@@ -5539,7 +5539,7 @@
         <p:spPr>
           <a:xfrm>
             <a:off x="335520" y="764640"/>
-            <a:ext cx="10740600" cy="491400"/>
+            <a:ext cx="10740240" cy="491040"/>
           </a:xfrm>
           <a:prstGeom prst="rect">
             <a:avLst/>
@@ -5575,7 +5575,7 @@
               </a:rPr>
               <a:t>Exercises </a:t>
             </a:r>
-            <a:endParaRPr b="0" lang="en-GB" sz="2400" spc="-1" strike="noStrike">
+            <a:endParaRPr b="0" lang="en-US" sz="2400" spc="-1" strike="noStrike">
               <a:solidFill>
                 <a:srgbClr val="000000"/>
               </a:solidFill>
@@ -5593,7 +5593,7 @@
         <p:spPr>
           <a:xfrm>
             <a:off x="335520" y="1268280"/>
-            <a:ext cx="10740600" cy="5028120"/>
+            <a:ext cx="10740240" cy="5027760"/>
           </a:xfrm>
           <a:prstGeom prst="rect">
             <a:avLst/>
@@ -5619,7 +5619,7 @@
                 <a:spcPct val="100000"/>
               </a:lnSpc>
             </a:pPr>
-            <a:endParaRPr b="0" lang="en-GB" sz="1800" spc="-1" strike="noStrike">
+            <a:endParaRPr b="0" lang="en-US" sz="1800" spc="-1" strike="noStrike">
               <a:solidFill>
                 <a:srgbClr val="000000"/>
               </a:solidFill>
@@ -5691,7 +5691,7 @@
               </a:rPr>
               <a:t>no group submissions</a:t>
             </a:r>
-            <a:endParaRPr b="0" lang="en-GB" sz="1800" spc="-1" strike="noStrike">
+            <a:endParaRPr b="0" lang="en-US" sz="1800" spc="-1" strike="noStrike">
               <a:solidFill>
                 <a:srgbClr val="000000"/>
               </a:solidFill>
@@ -5723,7 +5723,7 @@
               </a:rPr>
               <a:t>Multiple-Choice or coding tasks</a:t>
             </a:r>
-            <a:endParaRPr b="0" lang="en-GB" sz="1800" spc="-1" strike="noStrike">
+            <a:endParaRPr b="0" lang="en-US" sz="1800" spc="-1" strike="noStrike">
               <a:solidFill>
                 <a:srgbClr val="000000"/>
               </a:solidFill>
@@ -5755,7 +5755,7 @@
               </a:rPr>
               <a:t>7-14 days to submit (depending on the task)</a:t>
             </a:r>
-            <a:endParaRPr b="0" lang="en-GB" sz="1800" spc="-1" strike="noStrike">
+            <a:endParaRPr b="0" lang="en-US" sz="1800" spc="-1" strike="noStrike">
               <a:solidFill>
                 <a:srgbClr val="000000"/>
               </a:solidFill>
@@ -5787,7 +5787,7 @@
               </a:rPr>
               <a:t>Submission deadline is always Monday at 1:59pm (right before the next lecture)</a:t>
             </a:r>
-            <a:endParaRPr b="0" lang="en-GB" sz="1800" spc="-1" strike="noStrike">
+            <a:endParaRPr b="0" lang="en-US" sz="1800" spc="-1" strike="noStrike">
               <a:solidFill>
                 <a:srgbClr val="000000"/>
               </a:solidFill>
@@ -5849,7 +5849,7 @@
               </a:rPr>
               <a:t>mandatory</a:t>
             </a:r>
-            <a:endParaRPr b="0" lang="en-GB" sz="1800" spc="-1" strike="noStrike">
+            <a:endParaRPr b="0" lang="en-US" sz="1800" spc="-1" strike="noStrike">
               <a:solidFill>
                 <a:srgbClr val="000000"/>
               </a:solidFill>
@@ -5882,7 +5882,7 @@
               </a:rPr>
               <a:t>You pass by submitting an exercise – even if it is an empty page</a:t>
             </a:r>
-            <a:endParaRPr b="0" lang="en-GB" sz="1800" spc="-1" strike="noStrike">
+            <a:endParaRPr b="0" lang="en-US" sz="1800" spc="-1" strike="noStrike">
               <a:solidFill>
                 <a:srgbClr val="000000"/>
               </a:solidFill>
@@ -5914,7 +5914,7 @@
               </a:rPr>
               <a:t>You will receive feedback on your submission</a:t>
             </a:r>
-            <a:endParaRPr b="0" lang="en-GB" sz="1800" spc="-1" strike="noStrike">
+            <a:endParaRPr b="0" lang="en-US" sz="1800" spc="-1" strike="noStrike">
               <a:solidFill>
                 <a:srgbClr val="000000"/>
               </a:solidFill>
@@ -5946,7 +5946,7 @@
               </a:rPr>
               <a:t>Exercise = learning feedback</a:t>
             </a:r>
-            <a:endParaRPr b="0" lang="en-GB" sz="1800" spc="-1" strike="noStrike">
+            <a:endParaRPr b="0" lang="en-US" sz="1800" spc="-1" strike="noStrike">
               <a:solidFill>
                 <a:srgbClr val="000000"/>
               </a:solidFill>
@@ -5994,7 +5994,7 @@
         <p:spPr>
           <a:xfrm>
             <a:off x="335520" y="764640"/>
-            <a:ext cx="10740600" cy="491400"/>
+            <a:ext cx="10740240" cy="491040"/>
           </a:xfrm>
           <a:prstGeom prst="rect">
             <a:avLst/>
@@ -6030,7 +6030,7 @@
               </a:rPr>
               <a:t>Coding Exercise Submission and Grading</a:t>
             </a:r>
-            <a:endParaRPr b="0" lang="en-GB" sz="2400" spc="-1" strike="noStrike">
+            <a:endParaRPr b="0" lang="en-US" sz="2400" spc="-1" strike="noStrike">
               <a:solidFill>
                 <a:srgbClr val="000000"/>
               </a:solidFill>
@@ -6048,7 +6048,7 @@
         <p:spPr>
           <a:xfrm>
             <a:off x="335520" y="1268640"/>
-            <a:ext cx="10740600" cy="5028120"/>
+            <a:ext cx="10740240" cy="5027760"/>
           </a:xfrm>
           <a:prstGeom prst="rect">
             <a:avLst/>
@@ -6093,7 +6093,7 @@
               </a:rPr>
               <a:t>Coding exercises are graded semi-automatically. Due to this it is highly important that you follow the required submission format. Otherwise the grading process will fail and you will receive 0 points.</a:t>
             </a:r>
-            <a:endParaRPr b="0" lang="en-GB" sz="1800" spc="-1" strike="noStrike">
+            <a:endParaRPr b="0" lang="en-US" sz="1800" spc="-1" strike="noStrike">
               <a:solidFill>
                 <a:srgbClr val="000000"/>
               </a:solidFill>
@@ -6125,7 +6125,7 @@
               </a:rPr>
               <a:t>Coding exercises will be provided in the form of Jupyter Notebooks, and provided to you via Moodle and on our GitHub repository.</a:t>
             </a:r>
-            <a:endParaRPr b="0" lang="en-GB" sz="1800" spc="-1" strike="noStrike">
+            <a:endParaRPr b="0" lang="en-US" sz="1800" spc="-1" strike="noStrike">
               <a:solidFill>
                 <a:srgbClr val="000000"/>
               </a:solidFill>
@@ -6179,7 +6179,7 @@
               </a:rPr>
               <a:t>, or on your local machine.</a:t>
             </a:r>
-            <a:endParaRPr b="0" lang="en-GB" sz="1800" spc="-1" strike="noStrike">
+            <a:endParaRPr b="0" lang="en-US" sz="1800" spc="-1" strike="noStrike">
               <a:solidFill>
                 <a:srgbClr val="000000"/>
               </a:solidFill>
@@ -6211,7 +6211,7 @@
               </a:rPr>
               <a:t>Once you have finished the editing the Jupyter notebook, submit your edited copy of the notebook back to the Moodle Exercise page.</a:t>
             </a:r>
-            <a:endParaRPr b="0" lang="en-GB" sz="1800" spc="-1" strike="noStrike">
+            <a:endParaRPr b="0" lang="en-US" sz="1800" spc="-1" strike="noStrike">
               <a:solidFill>
                 <a:srgbClr val="000000"/>
               </a:solidFill>
@@ -6243,7 +6243,7 @@
               </a:rPr>
               <a:t>Exercises which are not valid Jupyter Notebook files will be marked as having failed.</a:t>
             </a:r>
-            <a:endParaRPr b="0" lang="en-GB" sz="1800" spc="-1" strike="noStrike">
+            <a:endParaRPr b="0" lang="en-US" sz="1800" spc="-1" strike="noStrike">
               <a:solidFill>
                 <a:srgbClr val="000000"/>
               </a:solidFill>
@@ -6261,7 +6261,7 @@
         <p:spPr>
           <a:xfrm>
             <a:off x="4655880" y="476640"/>
-            <a:ext cx="2426760" cy="352800"/>
+            <a:ext cx="2426400" cy="352440"/>
           </a:xfrm>
           <a:prstGeom prst="rect">
             <a:avLst/>
@@ -6336,7 +6336,7 @@
         <p:spPr>
           <a:xfrm>
             <a:off x="335520" y="768240"/>
-            <a:ext cx="10740600" cy="491400"/>
+            <a:ext cx="10740240" cy="491040"/>
           </a:xfrm>
           <a:prstGeom prst="rect">
             <a:avLst/>
@@ -6372,7 +6372,7 @@
               </a:rPr>
               <a:t>Multiple-Choice Exercises</a:t>
             </a:r>
-            <a:endParaRPr b="0" lang="en-GB" sz="2400" spc="-1" strike="noStrike">
+            <a:endParaRPr b="0" lang="en-US" sz="2400" spc="-1" strike="noStrike">
               <a:solidFill>
                 <a:srgbClr val="000000"/>
               </a:solidFill>
@@ -6390,7 +6390,7 @@
         <p:spPr>
           <a:xfrm>
             <a:off x="388800" y="1488600"/>
-            <a:ext cx="10714320" cy="3505320"/>
+            <a:ext cx="10713960" cy="3505320"/>
           </a:xfrm>
           <a:prstGeom prst="rect">
             <a:avLst/>
@@ -6426,7 +6426,7 @@
               </a:rPr>
               <a:t>Every student enrolled in this course is advised to take the knowledge quiz in first two weeks of the course.  </a:t>
             </a:r>
-            <a:endParaRPr b="0" lang="en-GB" sz="1400" spc="-1" strike="noStrike">
+            <a:endParaRPr b="0" lang="en-US" sz="1400" spc="-1" strike="noStrike">
               <a:solidFill>
                 <a:srgbClr val="000000"/>
               </a:solidFill>
@@ -6439,7 +6439,7 @@
                 <a:spcPct val="100000"/>
               </a:lnSpc>
             </a:pPr>
-            <a:endParaRPr b="0" lang="en-GB" sz="1400" spc="-1" strike="noStrike">
+            <a:endParaRPr b="0" lang="en-US" sz="1400" spc="-1" strike="noStrike">
               <a:solidFill>
                 <a:srgbClr val="000000"/>
               </a:solidFill>
@@ -6452,7 +6452,7 @@
                 <a:spcPct val="100000"/>
               </a:lnSpc>
             </a:pPr>
-            <a:endParaRPr b="0" lang="en-GB" sz="1400" spc="-1" strike="noStrike">
+            <a:endParaRPr b="0" lang="en-US" sz="1400" spc="-1" strike="noStrike">
               <a:solidFill>
                 <a:srgbClr val="000000"/>
               </a:solidFill>
@@ -6481,7 +6481,7 @@
               </a:rPr>
               <a:t>Goal of the test:</a:t>
             </a:r>
-            <a:endParaRPr b="0" lang="en-GB" sz="1400" spc="-1" strike="noStrike">
+            <a:endParaRPr b="0" lang="en-US" sz="1400" spc="-1" strike="noStrike">
               <a:solidFill>
                 <a:srgbClr val="000000"/>
               </a:solidFill>
@@ -6510,7 +6510,7 @@
               </a:rPr>
               <a:t>To check the knowledge level of the student that is relevant to this course of study.</a:t>
             </a:r>
-            <a:endParaRPr b="0" lang="en-GB" sz="1400" spc="-1" strike="noStrike">
+            <a:endParaRPr b="0" lang="en-US" sz="1400" spc="-1" strike="noStrike">
               <a:solidFill>
                 <a:srgbClr val="000000"/>
               </a:solidFill>
@@ -6533,7 +6533,7 @@
               </a:rPr>
               <a:t> </a:t>
             </a:r>
-            <a:endParaRPr b="0" lang="en-GB" sz="1400" spc="-1" strike="noStrike">
+            <a:endParaRPr b="0" lang="en-US" sz="1400" spc="-1" strike="noStrike">
               <a:solidFill>
                 <a:srgbClr val="000000"/>
               </a:solidFill>
@@ -6562,7 +6562,7 @@
               </a:rPr>
               <a:t>Preparation:</a:t>
             </a:r>
-            <a:endParaRPr b="0" lang="en-GB" sz="1400" spc="-1" strike="noStrike">
+            <a:endParaRPr b="0" lang="en-US" sz="1400" spc="-1" strike="noStrike">
               <a:solidFill>
                 <a:srgbClr val="000000"/>
               </a:solidFill>
@@ -6591,7 +6591,7 @@
               </a:rPr>
               <a:t>A review of basic concepts of Cryptography and Circular Economy is recommended for Week 1 and Week 2 respectively</a:t>
             </a:r>
-            <a:endParaRPr b="0" lang="en-GB" sz="1400" spc="-1" strike="noStrike">
+            <a:endParaRPr b="0" lang="en-US" sz="1400" spc="-1" strike="noStrike">
               <a:solidFill>
                 <a:srgbClr val="000000"/>
               </a:solidFill>
@@ -6620,7 +6620,7 @@
               </a:rPr>
               <a:t>Knowledge quiz for Week 1 only tests your existing knowledge.</a:t>
             </a:r>
-            <a:endParaRPr b="0" lang="en-GB" sz="1400" spc="-1" strike="noStrike">
+            <a:endParaRPr b="0" lang="en-US" sz="1400" spc="-1" strike="noStrike">
               <a:solidFill>
                 <a:srgbClr val="000000"/>
               </a:solidFill>
@@ -6643,7 +6643,7 @@
               </a:rPr>
               <a:t> </a:t>
             </a:r>
-            <a:endParaRPr b="0" lang="en-GB" sz="1400" spc="-1" strike="noStrike">
+            <a:endParaRPr b="0" lang="en-US" sz="1400" spc="-1" strike="noStrike">
               <a:solidFill>
                 <a:srgbClr val="000000"/>
               </a:solidFill>
@@ -6672,7 +6672,7 @@
               </a:rPr>
               <a:t>THE TEST IS JUST FOR YOU → WE CANNOT CHECK THE TEST RESULTS</a:t>
             </a:r>
-            <a:endParaRPr b="0" lang="en-GB" sz="1400" spc="-1" strike="noStrike">
+            <a:endParaRPr b="0" lang="en-US" sz="1400" spc="-1" strike="noStrike">
               <a:solidFill>
                 <a:srgbClr val="000000"/>
               </a:solidFill>
@@ -6685,7 +6685,7 @@
                 <a:spcPct val="100000"/>
               </a:lnSpc>
             </a:pPr>
-            <a:endParaRPr b="0" lang="en-GB" sz="1400" spc="-1" strike="noStrike">
+            <a:endParaRPr b="0" lang="en-US" sz="1400" spc="-1" strike="noStrike">
               <a:solidFill>
                 <a:srgbClr val="000000"/>
               </a:solidFill>
@@ -6698,7 +6698,7 @@
                 <a:spcPct val="100000"/>
               </a:lnSpc>
             </a:pPr>
-            <a:endParaRPr b="0" lang="en-GB" sz="1400" spc="-1" strike="noStrike">
+            <a:endParaRPr b="0" lang="en-US" sz="1400" spc="-1" strike="noStrike">
               <a:solidFill>
                 <a:srgbClr val="000000"/>
               </a:solidFill>
@@ -6711,7 +6711,7 @@
                 <a:spcPct val="100000"/>
               </a:lnSpc>
             </a:pPr>
-            <a:endParaRPr b="0" lang="en-GB" sz="1400" spc="-1" strike="noStrike">
+            <a:endParaRPr b="0" lang="en-US" sz="1400" spc="-1" strike="noStrike">
               <a:solidFill>
                 <a:srgbClr val="000000"/>
               </a:solidFill>
@@ -6759,7 +6759,7 @@
         <p:spPr>
           <a:xfrm>
             <a:off x="335520" y="764640"/>
-            <a:ext cx="10738440" cy="489240"/>
+            <a:ext cx="10738080" cy="488880"/>
           </a:xfrm>
           <a:prstGeom prst="rect">
             <a:avLst/>
@@ -6795,7 +6795,7 @@
               </a:rPr>
               <a:t>License</a:t>
             </a:r>
-            <a:endParaRPr b="0" lang="en-GB" sz="2400" spc="-1" strike="noStrike">
+            <a:endParaRPr b="0" lang="en-US" sz="2400" spc="-1" strike="noStrike">
               <a:solidFill>
                 <a:srgbClr val="000000"/>
               </a:solidFill>
@@ -6813,7 +6813,7 @@
         <p:spPr>
           <a:xfrm>
             <a:off x="335520" y="1268640"/>
-            <a:ext cx="10738440" cy="5025960"/>
+            <a:ext cx="10738080" cy="5025600"/>
           </a:xfrm>
           <a:prstGeom prst="rect">
             <a:avLst/>
@@ -6842,7 +6842,7 @@
                 <a:spcPts val="360"/>
               </a:spcBef>
             </a:pPr>
-            <a:endParaRPr b="0" lang="en-GB" sz="1800" spc="-1" strike="noStrike">
+            <a:endParaRPr b="0" lang="en-US" sz="1800" spc="-1" strike="noStrike">
               <a:solidFill>
                 <a:srgbClr val="000000"/>
               </a:solidFill>
@@ -6858,7 +6858,7 @@
                 <a:spcPts val="360"/>
               </a:spcBef>
             </a:pPr>
-            <a:endParaRPr b="0" lang="en-GB" sz="1800" spc="-1" strike="noStrike">
+            <a:endParaRPr b="0" lang="en-US" sz="1800" spc="-1" strike="noStrike">
               <a:solidFill>
                 <a:srgbClr val="000000"/>
               </a:solidFill>
@@ -6876,7 +6876,7 @@
         <p:spPr>
           <a:xfrm>
             <a:off x="336600" y="3429000"/>
-            <a:ext cx="10856160" cy="2048040"/>
+            <a:ext cx="10855800" cy="2047680"/>
           </a:xfrm>
           <a:prstGeom prst="rect">
             <a:avLst/>
@@ -6966,7 +6966,7 @@
               </a:rPr>
               <a:t> .</a:t>
             </a:r>
-            <a:endParaRPr b="0" lang="en-GB" sz="2000" spc="-1" strike="noStrike">
+            <a:endParaRPr b="0" lang="en-US" sz="2000" spc="-1" strike="noStrike">
               <a:solidFill>
                 <a:srgbClr val="000000"/>
               </a:solidFill>
@@ -7023,7 +7023,7 @@
               </a:rPr>
               <a:t>.</a:t>
             </a:r>
-            <a:endParaRPr b="0" lang="en-GB" sz="2000" spc="-1" strike="noStrike">
+            <a:endParaRPr b="0" lang="en-US" sz="2000" spc="-1" strike="noStrike">
               <a:solidFill>
                 <a:srgbClr val="000000"/>
               </a:solidFill>
@@ -7071,7 +7071,7 @@
         <p:spPr>
           <a:xfrm>
             <a:off x="335520" y="768240"/>
-            <a:ext cx="10740600" cy="491400"/>
+            <a:ext cx="10740240" cy="491040"/>
           </a:xfrm>
           <a:prstGeom prst="rect">
             <a:avLst/>
@@ -7107,7 +7107,7 @@
               </a:rPr>
               <a:t>Multiple-Choice Exercises</a:t>
             </a:r>
-            <a:endParaRPr b="0" lang="en-GB" sz="2400" spc="-1" strike="noStrike">
+            <a:endParaRPr b="0" lang="en-US" sz="2400" spc="-1" strike="noStrike">
               <a:solidFill>
                 <a:srgbClr val="000000"/>
               </a:solidFill>
@@ -7125,7 +7125,7 @@
         <p:spPr>
           <a:xfrm>
             <a:off x="388800" y="1488600"/>
-            <a:ext cx="10714320" cy="3505320"/>
+            <a:ext cx="10713960" cy="3505320"/>
           </a:xfrm>
           <a:prstGeom prst="rect">
             <a:avLst/>
@@ -7161,7 +7161,7 @@
               </a:rPr>
               <a:t>Every student enrolled in this course is advised to take the knowledge quiz in first two weeks of the course.  </a:t>
             </a:r>
-            <a:endParaRPr b="0" lang="en-GB" sz="1400" spc="-1" strike="noStrike">
+            <a:endParaRPr b="0" lang="en-US" sz="1400" spc="-1" strike="noStrike">
               <a:solidFill>
                 <a:srgbClr val="000000"/>
               </a:solidFill>
@@ -7174,7 +7174,7 @@
                 <a:spcPct val="100000"/>
               </a:lnSpc>
             </a:pPr>
-            <a:endParaRPr b="0" lang="en-GB" sz="1400" spc="-1" strike="noStrike">
+            <a:endParaRPr b="0" lang="en-US" sz="1400" spc="-1" strike="noStrike">
               <a:solidFill>
                 <a:srgbClr val="000000"/>
               </a:solidFill>
@@ -7187,7 +7187,7 @@
                 <a:spcPct val="100000"/>
               </a:lnSpc>
             </a:pPr>
-            <a:endParaRPr b="0" lang="en-GB" sz="1400" spc="-1" strike="noStrike">
+            <a:endParaRPr b="0" lang="en-US" sz="1400" spc="-1" strike="noStrike">
               <a:solidFill>
                 <a:srgbClr val="000000"/>
               </a:solidFill>
@@ -7216,7 +7216,7 @@
               </a:rPr>
               <a:t>Goal of the test:</a:t>
             </a:r>
-            <a:endParaRPr b="0" lang="en-GB" sz="1400" spc="-1" strike="noStrike">
+            <a:endParaRPr b="0" lang="en-US" sz="1400" spc="-1" strike="noStrike">
               <a:solidFill>
                 <a:srgbClr val="000000"/>
               </a:solidFill>
@@ -7245,7 +7245,7 @@
               </a:rPr>
               <a:t>To check the knowledge level of the student that is relevant to this course of study.</a:t>
             </a:r>
-            <a:endParaRPr b="0" lang="en-GB" sz="1400" spc="-1" strike="noStrike">
+            <a:endParaRPr b="0" lang="en-US" sz="1400" spc="-1" strike="noStrike">
               <a:solidFill>
                 <a:srgbClr val="000000"/>
               </a:solidFill>
@@ -7268,7 +7268,7 @@
               </a:rPr>
               <a:t> </a:t>
             </a:r>
-            <a:endParaRPr b="0" lang="en-GB" sz="1400" spc="-1" strike="noStrike">
+            <a:endParaRPr b="0" lang="en-US" sz="1400" spc="-1" strike="noStrike">
               <a:solidFill>
                 <a:srgbClr val="000000"/>
               </a:solidFill>
@@ -7297,7 +7297,7 @@
               </a:rPr>
               <a:t>Preparation:</a:t>
             </a:r>
-            <a:endParaRPr b="0" lang="en-GB" sz="1400" spc="-1" strike="noStrike">
+            <a:endParaRPr b="0" lang="en-US" sz="1400" spc="-1" strike="noStrike">
               <a:solidFill>
                 <a:srgbClr val="000000"/>
               </a:solidFill>
@@ -7326,7 +7326,7 @@
               </a:rPr>
               <a:t>A review of basic concepts of Cryptography and Circular Economy is recommended for Week 1 and Week 2 respectively</a:t>
             </a:r>
-            <a:endParaRPr b="0" lang="en-GB" sz="1400" spc="-1" strike="noStrike">
+            <a:endParaRPr b="0" lang="en-US" sz="1400" spc="-1" strike="noStrike">
               <a:solidFill>
                 <a:srgbClr val="000000"/>
               </a:solidFill>
@@ -7355,7 +7355,7 @@
               </a:rPr>
               <a:t>Knowledge quiz for Week 1 only tests your existing knowledge.</a:t>
             </a:r>
-            <a:endParaRPr b="0" lang="en-GB" sz="1400" spc="-1" strike="noStrike">
+            <a:endParaRPr b="0" lang="en-US" sz="1400" spc="-1" strike="noStrike">
               <a:solidFill>
                 <a:srgbClr val="000000"/>
               </a:solidFill>
@@ -7378,7 +7378,7 @@
               </a:rPr>
               <a:t> </a:t>
             </a:r>
-            <a:endParaRPr b="0" lang="en-GB" sz="1400" spc="-1" strike="noStrike">
+            <a:endParaRPr b="0" lang="en-US" sz="1400" spc="-1" strike="noStrike">
               <a:solidFill>
                 <a:srgbClr val="000000"/>
               </a:solidFill>
@@ -7407,7 +7407,7 @@
               </a:rPr>
               <a:t>THE TEST IS JUST FOR YOU → WE CANNOT CHECK THE TEST RESULTS</a:t>
             </a:r>
-            <a:endParaRPr b="0" lang="en-GB" sz="1400" spc="-1" strike="noStrike">
+            <a:endParaRPr b="0" lang="en-US" sz="1400" spc="-1" strike="noStrike">
               <a:solidFill>
                 <a:srgbClr val="000000"/>
               </a:solidFill>
@@ -7420,7 +7420,7 @@
                 <a:spcPct val="100000"/>
               </a:lnSpc>
             </a:pPr>
-            <a:endParaRPr b="0" lang="en-GB" sz="1400" spc="-1" strike="noStrike">
+            <a:endParaRPr b="0" lang="en-US" sz="1400" spc="-1" strike="noStrike">
               <a:solidFill>
                 <a:srgbClr val="000000"/>
               </a:solidFill>
@@ -7433,7 +7433,7 @@
                 <a:spcPct val="100000"/>
               </a:lnSpc>
             </a:pPr>
-            <a:endParaRPr b="0" lang="en-GB" sz="1400" spc="-1" strike="noStrike">
+            <a:endParaRPr b="0" lang="en-US" sz="1400" spc="-1" strike="noStrike">
               <a:solidFill>
                 <a:srgbClr val="000000"/>
               </a:solidFill>
@@ -7466,7 +7466,7 @@
               </a:rPr>
               <a:t>etce.etce-lab.de</a:t>
             </a:r>
-            <a:endParaRPr b="0" lang="en-GB" sz="1400" spc="-1" strike="noStrike">
+            <a:endParaRPr b="0" lang="en-US" sz="1400" spc="-1" strike="noStrike">
               <a:solidFill>
                 <a:srgbClr val="000000"/>
               </a:solidFill>
@@ -7514,7 +7514,7 @@
         <p:spPr>
           <a:xfrm>
             <a:off x="335520" y="764640"/>
-            <a:ext cx="10740600" cy="491400"/>
+            <a:ext cx="10740240" cy="491040"/>
           </a:xfrm>
           <a:prstGeom prst="rect">
             <a:avLst/>
@@ -7550,7 +7550,7 @@
               </a:rPr>
               <a:t>Multiple-Choice Exercises </a:t>
             </a:r>
-            <a:endParaRPr b="0" lang="en-GB" sz="2400" spc="-1" strike="noStrike">
+            <a:endParaRPr b="0" lang="en-US" sz="2400" spc="-1" strike="noStrike">
               <a:solidFill>
                 <a:srgbClr val="000000"/>
               </a:solidFill>
@@ -7572,7 +7572,7 @@
         <p:spPr>
           <a:xfrm>
             <a:off x="3200400" y="685800"/>
-            <a:ext cx="5275440" cy="6000120"/>
+            <a:ext cx="5275080" cy="5999760"/>
           </a:xfrm>
           <a:prstGeom prst="rect">
             <a:avLst/>
@@ -7621,7 +7621,7 @@
         <p:spPr>
           <a:xfrm>
             <a:off x="335520" y="764640"/>
-            <a:ext cx="10740600" cy="491400"/>
+            <a:ext cx="10740240" cy="491040"/>
           </a:xfrm>
           <a:prstGeom prst="rect">
             <a:avLst/>
@@ -7657,7 +7657,7 @@
               </a:rPr>
               <a:t>Multiple-Choice Exercises </a:t>
             </a:r>
-            <a:endParaRPr b="0" lang="en-GB" sz="2400" spc="-1" strike="noStrike">
+            <a:endParaRPr b="0" lang="en-US" sz="2400" spc="-1" strike="noStrike">
               <a:solidFill>
                 <a:srgbClr val="000000"/>
               </a:solidFill>
@@ -7679,7 +7679,7 @@
         <p:spPr>
           <a:xfrm>
             <a:off x="1600200" y="1600200"/>
-            <a:ext cx="8361720" cy="4630320"/>
+            <a:ext cx="8361360" cy="4629960"/>
           </a:xfrm>
           <a:prstGeom prst="rect">
             <a:avLst/>
@@ -7728,7 +7728,7 @@
         <p:spPr>
           <a:xfrm>
             <a:off x="335520" y="764640"/>
-            <a:ext cx="10740600" cy="491400"/>
+            <a:ext cx="10740240" cy="491040"/>
           </a:xfrm>
           <a:prstGeom prst="rect">
             <a:avLst/>
@@ -7764,7 +7764,7 @@
               </a:rPr>
               <a:t>Examination</a:t>
             </a:r>
-            <a:endParaRPr b="0" lang="en-GB" sz="2400" spc="-1" strike="noStrike">
+            <a:endParaRPr b="0" lang="en-US" sz="2400" spc="-1" strike="noStrike">
               <a:solidFill>
                 <a:srgbClr val="000000"/>
               </a:solidFill>
@@ -7782,7 +7782,7 @@
         <p:spPr>
           <a:xfrm>
             <a:off x="335520" y="1268640"/>
-            <a:ext cx="10740600" cy="5028120"/>
+            <a:ext cx="10740240" cy="5027760"/>
           </a:xfrm>
           <a:prstGeom prst="rect">
             <a:avLst/>
@@ -7827,7 +7827,7 @@
               </a:rPr>
               <a:t>Prerequisite for admission to the final exam (all criteria have to be fulfilled):</a:t>
             </a:r>
-            <a:endParaRPr b="0" lang="en-GB" sz="1800" spc="-1" strike="noStrike">
+            <a:endParaRPr b="0" lang="en-US" sz="1800" spc="-1" strike="noStrike">
               <a:solidFill>
                 <a:srgbClr val="000000"/>
               </a:solidFill>
@@ -7859,7 +7859,7 @@
               </a:rPr>
               <a:t>Submit all exercises (except for the MC exercises).</a:t>
             </a:r>
-            <a:endParaRPr b="0" lang="en-GB" sz="1800" spc="-1" strike="noStrike">
+            <a:endParaRPr b="0" lang="en-US" sz="1800" spc="-1" strike="noStrike">
               <a:solidFill>
                 <a:srgbClr val="000000"/>
               </a:solidFill>
@@ -7875,7 +7875,7 @@
                 <a:spcPts val="360"/>
               </a:spcBef>
             </a:pPr>
-            <a:endParaRPr b="0" lang="en-GB" sz="1800" spc="-1" strike="noStrike">
+            <a:endParaRPr b="0" lang="en-US" sz="1800" spc="-1" strike="noStrike">
               <a:solidFill>
                 <a:srgbClr val="000000"/>
               </a:solidFill>
@@ -7907,7 +7907,7 @@
               </a:rPr>
               <a:t>Final exam:</a:t>
             </a:r>
-            <a:endParaRPr b="0" lang="en-GB" sz="1800" spc="-1" strike="noStrike">
+            <a:endParaRPr b="0" lang="en-US" sz="1800" spc="-1" strike="noStrike">
               <a:solidFill>
                 <a:srgbClr val="000000"/>
               </a:solidFill>
@@ -7939,7 +7939,7 @@
               </a:rPr>
               <a:t>Written exam (120min) via Moodle</a:t>
             </a:r>
-            <a:endParaRPr b="0" lang="en-GB" sz="1800" spc="-1" strike="noStrike">
+            <a:endParaRPr b="0" lang="en-US" sz="1800" spc="-1" strike="noStrike">
               <a:solidFill>
                 <a:srgbClr val="000000"/>
               </a:solidFill>
@@ -7981,7 +7981,7 @@
               </a:rPr>
               <a:t>29.07.2024 from 2 pm – 4 pm</a:t>
             </a:r>
-            <a:endParaRPr b="0" lang="en-GB" sz="1800" spc="-1" strike="noStrike">
+            <a:endParaRPr b="0" lang="en-US" sz="1800" spc="-1" strike="noStrike">
               <a:solidFill>
                 <a:srgbClr val="000000"/>
               </a:solidFill>
@@ -8029,7 +8029,7 @@
         <p:spPr>
           <a:xfrm>
             <a:off x="335520" y="764640"/>
-            <a:ext cx="10738800" cy="489600"/>
+            <a:ext cx="10738440" cy="489240"/>
           </a:xfrm>
           <a:prstGeom prst="rect">
             <a:avLst/>
@@ -8065,7 +8065,7 @@
               </a:rPr>
               <a:t>Self-Study Star</a:t>
             </a:r>
-            <a:endParaRPr b="0" lang="en-GB" sz="2400" spc="-1" strike="noStrike">
+            <a:endParaRPr b="0" lang="en-US" sz="2400" spc="-1" strike="noStrike">
               <a:solidFill>
                 <a:srgbClr val="000000"/>
               </a:solidFill>
@@ -8083,7 +8083,7 @@
         <p:spPr>
           <a:xfrm>
             <a:off x="335520" y="1268280"/>
-            <a:ext cx="10738800" cy="5026320"/>
+            <a:ext cx="10738440" cy="5025960"/>
           </a:xfrm>
           <a:prstGeom prst="rect">
             <a:avLst/>
@@ -8112,7 +8112,7 @@
                 <a:spcPts val="360"/>
               </a:spcBef>
             </a:pPr>
-            <a:endParaRPr b="0" lang="en-GB" sz="1800" spc="-1" strike="noStrike">
+            <a:endParaRPr b="0" lang="en-US" sz="1800" spc="-1" strike="noStrike">
               <a:solidFill>
                 <a:srgbClr val="000000"/>
               </a:solidFill>
@@ -8161,7 +8161,7 @@
               </a:rPr>
               <a:t> mandatory but could be helpful or interesting</a:t>
             </a:r>
-            <a:endParaRPr b="0" lang="en-GB" sz="1800" spc="-1" strike="noStrike">
+            <a:endParaRPr b="0" lang="en-US" sz="1800" spc="-1" strike="noStrike">
               <a:solidFill>
                 <a:srgbClr val="000000"/>
               </a:solidFill>
@@ -8179,7 +8179,7 @@
         <p:spPr>
           <a:xfrm>
             <a:off x="6285600" y="2132640"/>
-            <a:ext cx="508320" cy="488160"/>
+            <a:ext cx="507960" cy="487800"/>
           </a:xfrm>
           <a:prstGeom prst="star5">
             <a:avLst>
@@ -8240,7 +8240,7 @@
         <p:spPr>
           <a:xfrm>
             <a:off x="4089960" y="2247480"/>
-            <a:ext cx="2276640" cy="363960"/>
+            <a:ext cx="2276280" cy="363960"/>
           </a:xfrm>
           <a:prstGeom prst="rect">
             <a:avLst/>
@@ -8296,7 +8296,7 @@
               </a:rPr>
               <a:t> </a:t>
             </a:r>
-            <a:endParaRPr b="0" lang="en-GB" sz="1800" spc="-1" strike="noStrike">
+            <a:endParaRPr b="0" lang="en-US" sz="1800" spc="-1" strike="noStrike">
               <a:solidFill>
                 <a:srgbClr val="000000"/>
               </a:solidFill>
@@ -8344,7 +8344,7 @@
         <p:spPr>
           <a:xfrm>
             <a:off x="335520" y="764640"/>
-            <a:ext cx="10738800" cy="489600"/>
+            <a:ext cx="10738440" cy="489240"/>
           </a:xfrm>
           <a:prstGeom prst="rect">
             <a:avLst/>
@@ -8380,7 +8380,7 @@
               </a:rPr>
               <a:t>Literature</a:t>
             </a:r>
-            <a:endParaRPr b="0" lang="en-GB" sz="2400" spc="-1" strike="noStrike">
+            <a:endParaRPr b="0" lang="en-US" sz="2400" spc="-1" strike="noStrike">
               <a:solidFill>
                 <a:srgbClr val="000000"/>
               </a:solidFill>
@@ -8398,7 +8398,7 @@
         <p:spPr>
           <a:xfrm>
             <a:off x="335520" y="1268640"/>
-            <a:ext cx="10738800" cy="5026320"/>
+            <a:ext cx="10738440" cy="5025960"/>
           </a:xfrm>
           <a:prstGeom prst="rect">
             <a:avLst/>
@@ -8463,7 +8463,7 @@
               </a:rPr>
               <a:t> need to buy a book to pass the exam.</a:t>
             </a:r>
-            <a:endParaRPr b="0" lang="en-GB" sz="1800" spc="-1" strike="noStrike">
+            <a:endParaRPr b="0" lang="en-US" sz="1800" spc="-1" strike="noStrike">
               <a:solidFill>
                 <a:srgbClr val="000000"/>
               </a:solidFill>
@@ -8479,7 +8479,7 @@
                 <a:spcPts val="360"/>
               </a:spcBef>
             </a:pPr>
-            <a:endParaRPr b="0" lang="en-GB" sz="1800" spc="-1" strike="noStrike">
+            <a:endParaRPr b="0" lang="en-US" sz="1800" spc="-1" strike="noStrike">
               <a:solidFill>
                 <a:srgbClr val="000000"/>
               </a:solidFill>
@@ -8531,7 +8531,7 @@
               </a:rPr>
               <a:t> (1972).</a:t>
             </a:r>
-            <a:endParaRPr b="0" lang="en-GB" sz="1800" spc="-1" strike="noStrike">
+            <a:endParaRPr b="0" lang="en-US" sz="1800" spc="-1" strike="noStrike">
               <a:solidFill>
                 <a:srgbClr val="000000"/>
               </a:solidFill>
@@ -8583,7 +8583,7 @@
               </a:rPr>
               <a:t> (2004).</a:t>
             </a:r>
-            <a:endParaRPr b="0" lang="en-GB" sz="1800" spc="-1" strike="noStrike">
+            <a:endParaRPr b="0" lang="en-US" sz="1800" spc="-1" strike="noStrike">
               <a:solidFill>
                 <a:srgbClr val="000000"/>
               </a:solidFill>
@@ -8635,7 +8635,7 @@
               </a:rPr>
               <a:t>(2012).</a:t>
             </a:r>
-            <a:endParaRPr b="0" lang="en-GB" sz="1800" spc="-1" strike="noStrike">
+            <a:endParaRPr b="0" lang="en-US" sz="1800" spc="-1" strike="noStrike">
               <a:solidFill>
                 <a:srgbClr val="000000"/>
               </a:solidFill>
@@ -8687,7 +8687,7 @@
               </a:rPr>
               <a:t> (2019).</a:t>
             </a:r>
-            <a:endParaRPr b="0" lang="en-GB" sz="1800" spc="-1" strike="noStrike">
+            <a:endParaRPr b="0" lang="en-US" sz="1800" spc="-1" strike="noStrike">
               <a:solidFill>
                 <a:srgbClr val="000000"/>
               </a:solidFill>
@@ -8739,7 +8739,7 @@
               </a:rPr>
               <a:t> (2011).</a:t>
             </a:r>
-            <a:endParaRPr b="0" lang="en-GB" sz="1800" spc="-1" strike="noStrike">
+            <a:endParaRPr b="0" lang="en-US" sz="1800" spc="-1" strike="noStrike">
               <a:solidFill>
                 <a:srgbClr val="000000"/>
               </a:solidFill>
@@ -8791,7 +8791,7 @@
               </a:rPr>
               <a:t> (2017).</a:t>
             </a:r>
-            <a:endParaRPr b="0" lang="en-GB" sz="1800" spc="-1" strike="noStrike">
+            <a:endParaRPr b="0" lang="en-US" sz="1800" spc="-1" strike="noStrike">
               <a:solidFill>
                 <a:srgbClr val="000000"/>
               </a:solidFill>
@@ -8839,7 +8839,7 @@
         <p:spPr>
           <a:xfrm>
             <a:off x="335520" y="764640"/>
-            <a:ext cx="10742040" cy="492840"/>
+            <a:ext cx="10741680" cy="492480"/>
           </a:xfrm>
           <a:prstGeom prst="rect">
             <a:avLst/>
@@ -8875,7 +8875,7 @@
               </a:rPr>
               <a:t>Literature</a:t>
             </a:r>
-            <a:endParaRPr b="0" lang="en-GB" sz="2400" spc="-1" strike="noStrike">
+            <a:endParaRPr b="0" lang="en-US" sz="2400" spc="-1" strike="noStrike">
               <a:solidFill>
                 <a:srgbClr val="000000"/>
               </a:solidFill>
@@ -8893,7 +8893,7 @@
         <p:spPr>
           <a:xfrm>
             <a:off x="335520" y="1268640"/>
-            <a:ext cx="10742040" cy="5029560"/>
+            <a:ext cx="10741680" cy="5029200"/>
           </a:xfrm>
           <a:prstGeom prst="rect">
             <a:avLst/>
@@ -8958,7 +8958,7 @@
               </a:rPr>
               <a:t> (2019).</a:t>
             </a:r>
-            <a:endParaRPr b="0" lang="en-GB" sz="1800" spc="-1" strike="noStrike">
+            <a:endParaRPr b="0" lang="en-US" sz="1800" spc="-1" strike="noStrike">
               <a:solidFill>
                 <a:srgbClr val="000000"/>
               </a:solidFill>
@@ -9010,7 +9010,7 @@
               </a:rPr>
               <a:t> (2010).</a:t>
             </a:r>
-            <a:endParaRPr b="0" lang="en-GB" sz="1800" spc="-1" strike="noStrike">
+            <a:endParaRPr b="0" lang="en-US" sz="1800" spc="-1" strike="noStrike">
               <a:solidFill>
                 <a:srgbClr val="000000"/>
               </a:solidFill>
@@ -9062,7 +9062,7 @@
               </a:rPr>
               <a:t> (2008).</a:t>
             </a:r>
-            <a:endParaRPr b="0" lang="en-GB" sz="1800" spc="-1" strike="noStrike">
+            <a:endParaRPr b="0" lang="en-US" sz="1800" spc="-1" strike="noStrike">
               <a:solidFill>
                 <a:srgbClr val="000000"/>
               </a:solidFill>
@@ -9110,7 +9110,7 @@
         <p:spPr>
           <a:xfrm>
             <a:off x="335520" y="764640"/>
-            <a:ext cx="10740600" cy="491400"/>
+            <a:ext cx="10740240" cy="491040"/>
           </a:xfrm>
           <a:prstGeom prst="rect">
             <a:avLst/>
@@ -9146,7 +9146,7 @@
               </a:rPr>
               <a:t>Literature</a:t>
             </a:r>
-            <a:endParaRPr b="0" lang="en-GB" sz="2400" spc="-1" strike="noStrike">
+            <a:endParaRPr b="0" lang="en-US" sz="2400" spc="-1" strike="noStrike">
               <a:solidFill>
                 <a:srgbClr val="000000"/>
               </a:solidFill>
@@ -9164,7 +9164,7 @@
         <p:spPr>
           <a:xfrm>
             <a:off x="335520" y="1268640"/>
-            <a:ext cx="10740600" cy="5028120"/>
+            <a:ext cx="10740240" cy="5027760"/>
           </a:xfrm>
           <a:prstGeom prst="rect">
             <a:avLst/>
@@ -9193,7 +9193,7 @@
                 <a:spcPts val="360"/>
               </a:spcBef>
             </a:pPr>
-            <a:endParaRPr b="0" lang="en-GB" sz="1800" spc="-1" strike="noStrike">
+            <a:endParaRPr b="0" lang="en-US" sz="1800" spc="-1" strike="noStrike">
               <a:solidFill>
                 <a:srgbClr val="000000"/>
               </a:solidFill>
@@ -9267,7 +9267,7 @@
               </a:rPr>
               <a:t>).</a:t>
             </a:r>
-            <a:endParaRPr b="0" lang="en-GB" sz="1800" spc="-1" strike="noStrike">
+            <a:endParaRPr b="0" lang="en-US" sz="1800" spc="-1" strike="noStrike">
               <a:solidFill>
                 <a:srgbClr val="000000"/>
               </a:solidFill>
@@ -9341,7 +9341,7 @@
               </a:rPr>
               <a:t>).</a:t>
             </a:r>
-            <a:endParaRPr b="0" lang="en-GB" sz="1800" spc="-1" strike="noStrike">
+            <a:endParaRPr b="0" lang="en-US" sz="1800" spc="-1" strike="noStrike">
               <a:solidFill>
                 <a:srgbClr val="000000"/>
               </a:solidFill>
@@ -9393,7 +9393,7 @@
               </a:rPr>
               <a:t> (2019).</a:t>
             </a:r>
-            <a:endParaRPr b="0" lang="en-GB" sz="1800" spc="-1" strike="noStrike">
+            <a:endParaRPr b="0" lang="en-US" sz="1800" spc="-1" strike="noStrike">
               <a:solidFill>
                 <a:srgbClr val="000000"/>
               </a:solidFill>
@@ -9445,7 +9445,7 @@
               </a:rPr>
               <a:t> (2020).</a:t>
             </a:r>
-            <a:endParaRPr b="0" lang="en-GB" sz="1800" spc="-1" strike="noStrike">
+            <a:endParaRPr b="0" lang="en-US" sz="1800" spc="-1" strike="noStrike">
               <a:solidFill>
                 <a:srgbClr val="000000"/>
               </a:solidFill>
@@ -9497,7 +9497,7 @@
               </a:rPr>
               <a:t> (2018).</a:t>
             </a:r>
-            <a:endParaRPr b="0" lang="en-GB" sz="1800" spc="-1" strike="noStrike">
+            <a:endParaRPr b="0" lang="en-US" sz="1800" spc="-1" strike="noStrike">
               <a:solidFill>
                 <a:srgbClr val="000000"/>
               </a:solidFill>
@@ -9549,7 +9549,7 @@
               </a:rPr>
               <a:t> (2018).</a:t>
             </a:r>
-            <a:endParaRPr b="0" lang="en-GB" sz="1800" spc="-1" strike="noStrike">
+            <a:endParaRPr b="0" lang="en-US" sz="1800" spc="-1" strike="noStrike">
               <a:solidFill>
                 <a:srgbClr val="000000"/>
               </a:solidFill>
@@ -9601,7 +9601,7 @@
               </a:rPr>
               <a:t> (2010).</a:t>
             </a:r>
-            <a:endParaRPr b="0" lang="en-GB" sz="1800" spc="-1" strike="noStrike">
+            <a:endParaRPr b="0" lang="en-US" sz="1800" spc="-1" strike="noStrike">
               <a:solidFill>
                 <a:srgbClr val="000000"/>
               </a:solidFill>
@@ -9649,7 +9649,7 @@
         <p:spPr>
           <a:xfrm>
             <a:off x="335520" y="764640"/>
-            <a:ext cx="10738800" cy="489600"/>
+            <a:ext cx="10738440" cy="489240"/>
           </a:xfrm>
           <a:prstGeom prst="rect">
             <a:avLst/>
@@ -9685,7 +9685,7 @@
               </a:rPr>
               <a:t>Further Resources </a:t>
             </a:r>
-            <a:endParaRPr b="0" lang="en-GB" sz="2400" spc="-1" strike="noStrike">
+            <a:endParaRPr b="0" lang="en-US" sz="2400" spc="-1" strike="noStrike">
               <a:solidFill>
                 <a:srgbClr val="000000"/>
               </a:solidFill>
@@ -9703,7 +9703,7 @@
         <p:spPr>
           <a:xfrm>
             <a:off x="335520" y="1268640"/>
-            <a:ext cx="10738800" cy="5026320"/>
+            <a:ext cx="10738440" cy="5025960"/>
           </a:xfrm>
           <a:prstGeom prst="rect">
             <a:avLst/>
@@ -9760,7 +9760,7 @@
               </a:rPr>
               <a:t>Link</a:t>
             </a:r>
-            <a:endParaRPr b="0" lang="en-GB" sz="1800" spc="-1" strike="noStrike">
+            <a:endParaRPr b="0" lang="en-US" sz="1800" spc="-1" strike="noStrike">
               <a:solidFill>
                 <a:srgbClr val="000000"/>
               </a:solidFill>
@@ -9814,7 +9814,7 @@
               </a:rPr>
               <a:t> </a:t>
             </a:r>
-            <a:endParaRPr b="0" lang="en-GB" sz="1800" spc="-1" strike="noStrike">
+            <a:endParaRPr b="0" lang="en-US" sz="1800" spc="-1" strike="noStrike">
               <a:solidFill>
                 <a:srgbClr val="000000"/>
               </a:solidFill>
@@ -9858,7 +9858,7 @@
               </a:rPr>
               <a:t>Link</a:t>
             </a:r>
-            <a:endParaRPr b="0" lang="en-GB" sz="1800" spc="-1" strike="noStrike">
+            <a:endParaRPr b="0" lang="en-US" sz="1800" spc="-1" strike="noStrike">
               <a:solidFill>
                 <a:srgbClr val="000000"/>
               </a:solidFill>
@@ -9890,7 +9890,7 @@
               </a:rPr>
               <a:t>Podcasts:</a:t>
             </a:r>
-            <a:endParaRPr b="0" lang="en-GB" sz="1800" spc="-1" strike="noStrike">
+            <a:endParaRPr b="0" lang="en-US" sz="1800" spc="-1" strike="noStrike">
               <a:solidFill>
                 <a:srgbClr val="000000"/>
               </a:solidFill>
@@ -9941,7 +9941,7 @@
               </a:rPr>
               <a:t>)</a:t>
             </a:r>
-            <a:endParaRPr b="0" lang="en-GB" sz="1800" spc="-1" strike="noStrike">
+            <a:endParaRPr b="0" lang="en-US" sz="1800" spc="-1" strike="noStrike">
               <a:solidFill>
                 <a:srgbClr val="000000"/>
               </a:solidFill>
@@ -9995,7 +9995,7 @@
               </a:rPr>
               <a:t>)</a:t>
             </a:r>
-            <a:endParaRPr b="0" lang="en-GB" sz="1800" spc="-1" strike="noStrike">
+            <a:endParaRPr b="0" lang="en-US" sz="1800" spc="-1" strike="noStrike">
               <a:solidFill>
                 <a:srgbClr val="000000"/>
               </a:solidFill>
@@ -10049,7 +10049,7 @@
               </a:rPr>
               <a:t>)</a:t>
             </a:r>
-            <a:endParaRPr b="0" lang="en-GB" sz="1800" spc="-1" strike="noStrike">
+            <a:endParaRPr b="0" lang="en-US" sz="1800" spc="-1" strike="noStrike">
               <a:solidFill>
                 <a:srgbClr val="000000"/>
               </a:solidFill>
@@ -10097,7 +10097,7 @@
         <p:spPr>
           <a:xfrm>
             <a:off x="335520" y="1268640"/>
-            <a:ext cx="10740600" cy="5028120"/>
+            <a:ext cx="10740240" cy="5027760"/>
           </a:xfrm>
           <a:prstGeom prst="rect">
             <a:avLst/>
@@ -10139,7 +10139,7 @@
               </a:rPr>
               <a:t>Questions?</a:t>
             </a:r>
-            <a:endParaRPr b="0" lang="en-GB" sz="4000" spc="-1" strike="noStrike">
+            <a:endParaRPr b="0" lang="en-US" sz="4000" spc="-1" strike="noStrike">
               <a:solidFill>
                 <a:srgbClr val="000000"/>
               </a:solidFill>
@@ -10157,7 +10157,7 @@
         <p:spPr>
           <a:xfrm>
             <a:off x="335520" y="764640"/>
-            <a:ext cx="10740600" cy="491400"/>
+            <a:ext cx="10740240" cy="491040"/>
           </a:xfrm>
           <a:prstGeom prst="rect">
             <a:avLst/>
@@ -10232,7 +10232,7 @@
         <p:spPr>
           <a:xfrm>
             <a:off x="335520" y="764640"/>
-            <a:ext cx="10740600" cy="491400"/>
+            <a:ext cx="10740240" cy="491040"/>
           </a:xfrm>
           <a:prstGeom prst="rect">
             <a:avLst/>
@@ -10268,7 +10268,7 @@
               </a:rPr>
               <a:t>Team</a:t>
             </a:r>
-            <a:endParaRPr b="0" lang="en-GB" sz="2400" spc="-1" strike="noStrike">
+            <a:endParaRPr b="0" lang="en-US" sz="2400" spc="-1" strike="noStrike">
               <a:solidFill>
                 <a:srgbClr val="000000"/>
               </a:solidFill>
@@ -10290,7 +10290,7 @@
         <p:spPr>
           <a:xfrm>
             <a:off x="4923720" y="1257120"/>
-            <a:ext cx="1463400" cy="2164680"/>
+            <a:ext cx="1463040" cy="2164320"/>
           </a:xfrm>
           <a:prstGeom prst="rect">
             <a:avLst/>
@@ -10313,7 +10313,7 @@
         <p:spPr>
           <a:xfrm>
             <a:off x="2207880" y="4110120"/>
-            <a:ext cx="1777320" cy="1769400"/>
+            <a:ext cx="1776960" cy="1769040"/>
           </a:xfrm>
           <a:prstGeom prst="rect">
             <a:avLst/>
@@ -10332,7 +10332,7 @@
         <p:spPr>
           <a:xfrm>
             <a:off x="3859200" y="3373200"/>
-            <a:ext cx="3628080" cy="669600"/>
+            <a:ext cx="3627720" cy="669240"/>
           </a:xfrm>
           <a:prstGeom prst="rect">
             <a:avLst/>
@@ -10371,7 +10371,7 @@
               </a:rPr>
               <a:t>Prof. Dr. Benjamin Leiding</a:t>
             </a:r>
-            <a:endParaRPr b="0" lang="en-GB" sz="1600" spc="-1" strike="noStrike">
+            <a:endParaRPr b="0" lang="en-US" sz="1600" spc="-1" strike="noStrike">
               <a:solidFill>
                 <a:srgbClr val="000000"/>
               </a:solidFill>
@@ -10389,7 +10389,7 @@
         <p:spPr>
           <a:xfrm>
             <a:off x="1312200" y="5920200"/>
-            <a:ext cx="3628080" cy="669600"/>
+            <a:ext cx="3627720" cy="669240"/>
           </a:xfrm>
           <a:prstGeom prst="rect">
             <a:avLst/>
@@ -10418,7 +10418,7 @@
                 <a:spcPts val="360"/>
               </a:spcBef>
             </a:pPr>
-            <a:endParaRPr b="0" lang="en-GB" sz="1800" spc="-1" strike="noStrike">
+            <a:endParaRPr b="0" lang="en-US" sz="1800" spc="-1" strike="noStrike">
               <a:solidFill>
                 <a:srgbClr val="000000"/>
               </a:solidFill>
@@ -10434,7 +10434,7 @@
                 <a:spcPts val="360"/>
               </a:spcBef>
             </a:pPr>
-            <a:endParaRPr b="0" lang="en-GB" sz="1800" spc="-1" strike="noStrike">
+            <a:endParaRPr b="0" lang="en-US" sz="1800" spc="-1" strike="noStrike">
               <a:solidFill>
                 <a:srgbClr val="000000"/>
               </a:solidFill>
@@ -10452,7 +10452,7 @@
         <p:spPr>
           <a:xfrm>
             <a:off x="1312200" y="5807160"/>
-            <a:ext cx="3628080" cy="669600"/>
+            <a:ext cx="3627720" cy="669240"/>
           </a:xfrm>
           <a:prstGeom prst="rect">
             <a:avLst/>
@@ -10491,7 +10491,7 @@
               </a:rPr>
               <a:t>M.Sc. Anant Sujatanagarjuna</a:t>
             </a:r>
-            <a:endParaRPr b="0" lang="en-GB" sz="1600" spc="-1" strike="noStrike">
+            <a:endParaRPr b="0" lang="en-US" sz="1600" spc="-1" strike="noStrike">
               <a:solidFill>
                 <a:srgbClr val="000000"/>
               </a:solidFill>
@@ -10509,7 +10509,7 @@
         <p:spPr>
           <a:xfrm>
             <a:off x="4860000" y="5920200"/>
-            <a:ext cx="3628080" cy="669600"/>
+            <a:ext cx="3627720" cy="669240"/>
           </a:xfrm>
           <a:prstGeom prst="rect">
             <a:avLst/>
@@ -10554,7 +10554,7 @@
         <p:spPr>
           <a:xfrm>
             <a:off x="6300000" y="5807160"/>
-            <a:ext cx="3628080" cy="669600"/>
+            <a:ext cx="3627720" cy="669240"/>
           </a:xfrm>
           <a:prstGeom prst="rect">
             <a:avLst/>
@@ -10593,7 +10593,7 @@
               </a:rPr>
               <a:t>M.Sc. Shohreh Kia</a:t>
             </a:r>
-            <a:endParaRPr b="0" lang="en-GB" sz="1600" spc="-1" strike="noStrike">
+            <a:endParaRPr b="0" lang="en-US" sz="1600" spc="-1" strike="noStrike">
               <a:solidFill>
                 <a:srgbClr val="000000"/>
               </a:solidFill>
@@ -10616,7 +10616,7 @@
         <p:spPr>
           <a:xfrm>
             <a:off x="7380000" y="3960000"/>
-            <a:ext cx="1436760" cy="1920600"/>
+            <a:ext cx="1436400" cy="1920240"/>
           </a:xfrm>
           <a:prstGeom prst="rect">
             <a:avLst/>
@@ -10665,7 +10665,7 @@
         <p:spPr>
           <a:xfrm>
             <a:off x="542880" y="721800"/>
-            <a:ext cx="10344960" cy="485640"/>
+            <a:ext cx="10344600" cy="485280"/>
           </a:xfrm>
           <a:prstGeom prst="rect">
             <a:avLst/>
@@ -10701,7 +10701,7 @@
               </a:rPr>
               <a:t>ETCE Research Group</a:t>
             </a:r>
-            <a:endParaRPr b="0" lang="en-GB" sz="2200" spc="-1" strike="noStrike">
+            <a:endParaRPr b="0" lang="en-US" sz="2200" spc="-1" strike="noStrike">
               <a:solidFill>
                 <a:srgbClr val="000000"/>
               </a:solidFill>
@@ -10719,7 +10719,7 @@
         <p:spPr>
           <a:xfrm>
             <a:off x="451800" y="1709280"/>
-            <a:ext cx="8212320" cy="4340520"/>
+            <a:ext cx="8211960" cy="4340160"/>
           </a:xfrm>
           <a:prstGeom prst="rect">
             <a:avLst/>
@@ -10764,7 +10764,7 @@
         <p:spPr>
           <a:xfrm>
             <a:off x="609480" y="1769400"/>
-            <a:ext cx="10575360" cy="4843440"/>
+            <a:ext cx="10575000" cy="4843080"/>
           </a:xfrm>
           <a:prstGeom prst="rect">
             <a:avLst/>
@@ -10889,7 +10889,7 @@
               </a:rPr>
               <a:t>ETCE</a:t>
             </a:r>
-            <a:endParaRPr b="0" lang="en-GB" sz="2000" spc="-1" strike="noStrike">
+            <a:endParaRPr b="0" lang="en-US" sz="2000" spc="-1" strike="noStrike">
               <a:solidFill>
                 <a:srgbClr val="000000"/>
               </a:solidFill>
@@ -10921,7 +10921,7 @@
               </a:rPr>
               <a:t>Research focus:</a:t>
             </a:r>
-            <a:endParaRPr b="0" lang="en-GB" sz="2000" spc="-1" strike="noStrike">
+            <a:endParaRPr b="0" lang="en-US" sz="2000" spc="-1" strike="noStrike">
               <a:solidFill>
                 <a:srgbClr val="000000"/>
               </a:solidFill>
@@ -10953,7 +10953,7 @@
               </a:rPr>
               <a:t>Intersection of IT and sustainability</a:t>
             </a:r>
-            <a:endParaRPr b="0" lang="en-GB" sz="1800" spc="-1" strike="noStrike">
+            <a:endParaRPr b="0" lang="en-US" sz="1800" spc="-1" strike="noStrike">
               <a:solidFill>
                 <a:srgbClr val="000000"/>
               </a:solidFill>
@@ -10985,7 +10985,7 @@
               </a:rPr>
               <a:t>Circular Economy</a:t>
             </a:r>
-            <a:endParaRPr b="0" lang="en-GB" sz="1800" spc="-1" strike="noStrike">
+            <a:endParaRPr b="0" lang="en-US" sz="1800" spc="-1" strike="noStrike">
               <a:solidFill>
                 <a:srgbClr val="000000"/>
               </a:solidFill>
@@ -11017,7 +11017,7 @@
               </a:rPr>
               <a:t>Self-organized, decentralized and distributed systems</a:t>
             </a:r>
-            <a:endParaRPr b="0" lang="en-GB" sz="1800" spc="-1" strike="noStrike">
+            <a:endParaRPr b="0" lang="en-US" sz="1800" spc="-1" strike="noStrike">
               <a:solidFill>
                 <a:srgbClr val="000000"/>
               </a:solidFill>
@@ -11049,7 +11049,7 @@
               </a:rPr>
               <a:t>Sustainable and resilient food production</a:t>
             </a:r>
-            <a:endParaRPr b="0" lang="en-GB" sz="1800" spc="-1" strike="noStrike">
+            <a:endParaRPr b="0" lang="en-US" sz="1800" spc="-1" strike="noStrike">
               <a:solidFill>
                 <a:srgbClr val="000000"/>
               </a:solidFill>
@@ -11081,7 +11081,7 @@
               </a:rPr>
               <a:t>Other courses:</a:t>
             </a:r>
-            <a:endParaRPr b="0" lang="en-GB" sz="2000" spc="-1" strike="noStrike">
+            <a:endParaRPr b="0" lang="en-US" sz="2000" spc="-1" strike="noStrike">
               <a:solidFill>
                 <a:srgbClr val="000000"/>
               </a:solidFill>
@@ -11113,7 +11113,7 @@
               </a:rPr>
               <a:t>The Limits to Growth – Sustainability and the Circular Economy (WS – open for everyone)</a:t>
             </a:r>
-            <a:endParaRPr b="0" lang="en-GB" sz="1800" spc="-1" strike="noStrike">
+            <a:endParaRPr b="0" lang="en-US" sz="1800" spc="-1" strike="noStrike">
               <a:solidFill>
                 <a:srgbClr val="000000"/>
               </a:solidFill>
@@ -11145,7 +11145,7 @@
               </a:rPr>
               <a:t>Requirements Engineering (WS – M.Sc.)</a:t>
             </a:r>
-            <a:endParaRPr b="0" lang="en-GB" sz="1800" spc="-1" strike="noStrike">
+            <a:endParaRPr b="0" lang="en-US" sz="1800" spc="-1" strike="noStrike">
               <a:solidFill>
                 <a:srgbClr val="000000"/>
               </a:solidFill>
@@ -11193,7 +11193,7 @@
         <p:spPr>
           <a:xfrm>
             <a:off x="542880" y="721800"/>
-            <a:ext cx="10344960" cy="485640"/>
+            <a:ext cx="10344600" cy="485280"/>
           </a:xfrm>
           <a:prstGeom prst="rect">
             <a:avLst/>
@@ -11229,7 +11229,7 @@
               </a:rPr>
               <a:t>ETCE Research Group</a:t>
             </a:r>
-            <a:endParaRPr b="0" lang="en-GB" sz="2200" spc="-1" strike="noStrike">
+            <a:endParaRPr b="0" lang="en-US" sz="2200" spc="-1" strike="noStrike">
               <a:solidFill>
                 <a:srgbClr val="000000"/>
               </a:solidFill>
@@ -11247,7 +11247,7 @@
         <p:spPr>
           <a:xfrm>
             <a:off x="451800" y="1709280"/>
-            <a:ext cx="8212320" cy="4340520"/>
+            <a:ext cx="8211960" cy="4340160"/>
           </a:xfrm>
           <a:prstGeom prst="rect">
             <a:avLst/>
@@ -11292,7 +11292,7 @@
         <p:spPr>
           <a:xfrm>
             <a:off x="609480" y="1769400"/>
-            <a:ext cx="10575360" cy="4843440"/>
+            <a:ext cx="10575000" cy="4843080"/>
           </a:xfrm>
           <a:prstGeom prst="rect">
             <a:avLst/>
@@ -11359,7 +11359,7 @@
               </a:rPr>
               <a:t> </a:t>
             </a:r>
-            <a:endParaRPr b="0" lang="en-GB" sz="2000" spc="-1" strike="noStrike">
+            <a:endParaRPr b="0" lang="en-US" sz="2000" spc="-1" strike="noStrike">
               <a:solidFill>
                 <a:srgbClr val="000000"/>
               </a:solidFill>
@@ -11391,7 +11391,7 @@
               </a:rPr>
               <a:t>Course material </a:t>
             </a:r>
-            <a:endParaRPr b="0" lang="en-GB" sz="1800" spc="-1" strike="noStrike">
+            <a:endParaRPr b="0" lang="en-US" sz="1800" spc="-1" strike="noStrike">
               <a:solidFill>
                 <a:srgbClr val="000000"/>
               </a:solidFill>
@@ -11423,7 +11423,7 @@
               </a:rPr>
               <a:t>Theses/project topics</a:t>
             </a:r>
-            <a:endParaRPr b="0" lang="en-GB" sz="1800" spc="-1" strike="noStrike">
+            <a:endParaRPr b="0" lang="en-US" sz="1800" spc="-1" strike="noStrike">
               <a:solidFill>
                 <a:srgbClr val="000000"/>
               </a:solidFill>
@@ -11439,7 +11439,7 @@
                 <a:spcPts val="1009"/>
               </a:spcBef>
             </a:pPr>
-            <a:endParaRPr b="0" lang="en-GB" sz="1800" spc="-1" strike="noStrike">
+            <a:endParaRPr b="0" lang="en-US" sz="1800" spc="-1" strike="noStrike">
               <a:solidFill>
                 <a:srgbClr val="000000"/>
               </a:solidFill>
@@ -11474,7 +11474,7 @@
               </a:rPr>
               <a:t>Our research in action:</a:t>
             </a:r>
-            <a:endParaRPr b="0" lang="en-GB" sz="2000" spc="-1" strike="noStrike">
+            <a:endParaRPr b="0" lang="en-US" sz="2000" spc="-1" strike="noStrike">
               <a:solidFill>
                 <a:srgbClr val="000000"/>
               </a:solidFill>
@@ -11531,7 +11531,7 @@
               </a:rPr>
               <a:t> </a:t>
             </a:r>
-            <a:endParaRPr b="0" lang="en-GB" sz="1800" spc="-1" strike="noStrike">
+            <a:endParaRPr b="0" lang="en-US" sz="1800" spc="-1" strike="noStrike">
               <a:solidFill>
                 <a:srgbClr val="000000"/>
               </a:solidFill>
@@ -11588,7 +11588,7 @@
               </a:rPr>
               <a:t> </a:t>
             </a:r>
-            <a:endParaRPr b="0" lang="en-GB" sz="1800" spc="-1" strike="noStrike">
+            <a:endParaRPr b="0" lang="en-US" sz="1800" spc="-1" strike="noStrike">
               <a:solidFill>
                 <a:srgbClr val="000000"/>
               </a:solidFill>
@@ -11607,7 +11607,7 @@
                 <a:tab algn="l" pos="0"/>
               </a:tabLst>
             </a:pPr>
-            <a:endParaRPr b="0" lang="en-GB" sz="1800" spc="-1" strike="noStrike">
+            <a:endParaRPr b="0" lang="en-US" sz="1800" spc="-1" strike="noStrike">
               <a:solidFill>
                 <a:srgbClr val="000000"/>
               </a:solidFill>
@@ -11636,7 +11636,7 @@
               </a:rPr>
               <a:t>You want join us? Write us an email! </a:t>
             </a:r>
-            <a:endParaRPr b="0" lang="en-GB" sz="2000" spc="-1" strike="noStrike">
+            <a:endParaRPr b="0" lang="en-US" sz="2000" spc="-1" strike="noStrike">
               <a:solidFill>
                 <a:srgbClr val="000000"/>
               </a:solidFill>
@@ -11675,7 +11675,7 @@
               </a:rPr>
               <a:t>benjamin.leiding@tu-clausthal.de</a:t>
             </a:r>
-            <a:endParaRPr b="0" lang="en-GB" sz="1600" spc="-1" strike="noStrike">
+            <a:endParaRPr b="0" lang="en-US" sz="1600" spc="-1" strike="noStrike">
               <a:solidFill>
                 <a:srgbClr val="000000"/>
               </a:solidFill>
@@ -11723,7 +11723,7 @@
         <p:spPr>
           <a:xfrm>
             <a:off x="542880" y="721800"/>
-            <a:ext cx="10344960" cy="485640"/>
+            <a:ext cx="10344600" cy="485280"/>
           </a:xfrm>
           <a:prstGeom prst="rect">
             <a:avLst/>
@@ -11759,7 +11759,7 @@
               </a:rPr>
               <a:t>ETCE Research Group</a:t>
             </a:r>
-            <a:endParaRPr b="0" lang="en-GB" sz="2200" spc="-1" strike="noStrike">
+            <a:endParaRPr b="0" lang="en-US" sz="2200" spc="-1" strike="noStrike">
               <a:solidFill>
                 <a:srgbClr val="000000"/>
               </a:solidFill>
@@ -11777,7 +11777,7 @@
         <p:spPr>
           <a:xfrm>
             <a:off x="451800" y="1709280"/>
-            <a:ext cx="8212320" cy="4340520"/>
+            <a:ext cx="8211960" cy="4340160"/>
           </a:xfrm>
           <a:prstGeom prst="rect">
             <a:avLst/>
@@ -11822,7 +11822,7 @@
         <p:spPr>
           <a:xfrm>
             <a:off x="609480" y="1769400"/>
-            <a:ext cx="10575360" cy="4843440"/>
+            <a:ext cx="10575000" cy="4843080"/>
           </a:xfrm>
           <a:prstGeom prst="rect">
             <a:avLst/>
@@ -11889,7 +11889,7 @@
               </a:rPr>
               <a:t> </a:t>
             </a:r>
-            <a:endParaRPr b="0" lang="en-GB" sz="2000" spc="-1" strike="noStrike">
+            <a:endParaRPr b="0" lang="en-US" sz="2000" spc="-1" strike="noStrike">
               <a:solidFill>
                 <a:srgbClr val="000000"/>
               </a:solidFill>
@@ -11921,7 +11921,7 @@
               </a:rPr>
               <a:t>Course material </a:t>
             </a:r>
-            <a:endParaRPr b="0" lang="en-GB" sz="1800" spc="-1" strike="noStrike">
+            <a:endParaRPr b="0" lang="en-US" sz="1800" spc="-1" strike="noStrike">
               <a:solidFill>
                 <a:srgbClr val="000000"/>
               </a:solidFill>
@@ -11953,7 +11953,7 @@
               </a:rPr>
               <a:t>Theses/project topics</a:t>
             </a:r>
-            <a:endParaRPr b="0" lang="en-GB" sz="1800" spc="-1" strike="noStrike">
+            <a:endParaRPr b="0" lang="en-US" sz="1800" spc="-1" strike="noStrike">
               <a:solidFill>
                 <a:srgbClr val="000000"/>
               </a:solidFill>
@@ -11969,7 +11969,7 @@
                 <a:spcPts val="1009"/>
               </a:spcBef>
             </a:pPr>
-            <a:endParaRPr b="0" lang="en-GB" sz="1800" spc="-1" strike="noStrike">
+            <a:endParaRPr b="0" lang="en-US" sz="1800" spc="-1" strike="noStrike">
               <a:solidFill>
                 <a:srgbClr val="000000"/>
               </a:solidFill>
@@ -12004,7 +12004,7 @@
               </a:rPr>
               <a:t>Our research in action:</a:t>
             </a:r>
-            <a:endParaRPr b="0" lang="en-GB" sz="2000" spc="-1" strike="noStrike">
+            <a:endParaRPr b="0" lang="en-US" sz="2000" spc="-1" strike="noStrike">
               <a:solidFill>
                 <a:srgbClr val="000000"/>
               </a:solidFill>
@@ -12061,7 +12061,7 @@
               </a:rPr>
               <a:t> </a:t>
             </a:r>
-            <a:endParaRPr b="0" lang="en-GB" sz="1800" spc="-1" strike="noStrike">
+            <a:endParaRPr b="0" lang="en-US" sz="1800" spc="-1" strike="noStrike">
               <a:solidFill>
                 <a:srgbClr val="000000"/>
               </a:solidFill>
@@ -12118,7 +12118,7 @@
               </a:rPr>
               <a:t> </a:t>
             </a:r>
-            <a:endParaRPr b="0" lang="en-GB" sz="1800" spc="-1" strike="noStrike">
+            <a:endParaRPr b="0" lang="en-US" sz="1800" spc="-1" strike="noStrike">
               <a:solidFill>
                 <a:srgbClr val="000000"/>
               </a:solidFill>
@@ -12137,7 +12137,7 @@
                 <a:tab algn="l" pos="0"/>
               </a:tabLst>
             </a:pPr>
-            <a:endParaRPr b="0" lang="en-GB" sz="1800" spc="-1" strike="noStrike">
+            <a:endParaRPr b="0" lang="en-US" sz="1800" spc="-1" strike="noStrike">
               <a:solidFill>
                 <a:srgbClr val="000000"/>
               </a:solidFill>
@@ -12166,7 +12166,7 @@
               </a:rPr>
               <a:t>You want join us? Write us an email! </a:t>
             </a:r>
-            <a:endParaRPr b="0" lang="en-GB" sz="2000" spc="-1" strike="noStrike">
+            <a:endParaRPr b="0" lang="en-US" sz="2000" spc="-1" strike="noStrike">
               <a:solidFill>
                 <a:srgbClr val="000000"/>
               </a:solidFill>
@@ -12205,7 +12205,7 @@
               </a:rPr>
               <a:t>benjamin.leiding@tu-clausthal.de</a:t>
             </a:r>
-            <a:endParaRPr b="0" lang="en-GB" sz="1600" spc="-1" strike="noStrike">
+            <a:endParaRPr b="0" lang="en-US" sz="1600" spc="-1" strike="noStrike">
               <a:solidFill>
                 <a:srgbClr val="000000"/>
               </a:solidFill>
@@ -12253,7 +12253,7 @@
         <p:spPr>
           <a:xfrm>
             <a:off x="335520" y="764640"/>
-            <a:ext cx="10740600" cy="491400"/>
+            <a:ext cx="10740240" cy="491040"/>
           </a:xfrm>
           <a:prstGeom prst="rect">
             <a:avLst/>
@@ -12289,7 +12289,7 @@
               </a:rPr>
               <a:t>Learning Outcome</a:t>
             </a:r>
-            <a:endParaRPr b="0" lang="en-GB" sz="2400" spc="-1" strike="noStrike">
+            <a:endParaRPr b="0" lang="en-US" sz="2400" spc="-1" strike="noStrike">
               <a:solidFill>
                 <a:srgbClr val="000000"/>
               </a:solidFill>
@@ -12307,7 +12307,7 @@
         <p:spPr>
           <a:xfrm>
             <a:off x="335520" y="2408400"/>
-            <a:ext cx="10740600" cy="3888360"/>
+            <a:ext cx="10740240" cy="3888000"/>
           </a:xfrm>
           <a:prstGeom prst="rect">
             <a:avLst/>
@@ -12352,7 +12352,7 @@
               </a:rPr>
               <a:t>Basic understanding of the concept of the Linear Economy, the Circular Economy, the Performance Economy and sustainability</a:t>
             </a:r>
-            <a:endParaRPr b="0" lang="en-GB" sz="1800" spc="-1" strike="noStrike">
+            <a:endParaRPr b="0" lang="en-US" sz="1800" spc="-1" strike="noStrike">
               <a:solidFill>
                 <a:srgbClr val="000000"/>
               </a:solidFill>
@@ -12400,7 +12400,7 @@
         <p:spPr>
           <a:xfrm>
             <a:off x="335520" y="764640"/>
-            <a:ext cx="10740600" cy="491400"/>
+            <a:ext cx="10740240" cy="491040"/>
           </a:xfrm>
           <a:prstGeom prst="rect">
             <a:avLst/>
@@ -12436,7 +12436,7 @@
               </a:rPr>
               <a:t>Learning Outcome</a:t>
             </a:r>
-            <a:endParaRPr b="0" lang="en-GB" sz="2400" spc="-1" strike="noStrike">
+            <a:endParaRPr b="0" lang="en-US" sz="2400" spc="-1" strike="noStrike">
               <a:solidFill>
                 <a:srgbClr val="000000"/>
               </a:solidFill>
@@ -12454,7 +12454,7 @@
         <p:spPr>
           <a:xfrm>
             <a:off x="335520" y="2408400"/>
-            <a:ext cx="10740600" cy="3888360"/>
+            <a:ext cx="10740240" cy="3888000"/>
           </a:xfrm>
           <a:prstGeom prst="rect">
             <a:avLst/>
@@ -12499,7 +12499,7 @@
               </a:rPr>
               <a:t>Basic understanding of the concept of the Linear Economy, the Circular Economy, the Performance Economy and sustainability</a:t>
             </a:r>
-            <a:endParaRPr b="0" lang="en-GB" sz="1800" spc="-1" strike="noStrike">
+            <a:endParaRPr b="0" lang="en-US" sz="1800" spc="-1" strike="noStrike">
               <a:solidFill>
                 <a:srgbClr val="000000"/>
               </a:solidFill>
@@ -12531,7 +12531,7 @@
               </a:rPr>
               <a:t>Basic understanding of new technologies in the field of decentralized and smart systems</a:t>
             </a:r>
-            <a:endParaRPr b="0" lang="en-GB" sz="1800" spc="-1" strike="noStrike">
+            <a:endParaRPr b="0" lang="en-US" sz="1800" spc="-1" strike="noStrike">
               <a:solidFill>
                 <a:srgbClr val="000000"/>
               </a:solidFill>
@@ -12579,7 +12579,7 @@
         <p:spPr>
           <a:xfrm>
             <a:off x="335520" y="764640"/>
-            <a:ext cx="10740600" cy="491400"/>
+            <a:ext cx="10740240" cy="491040"/>
           </a:xfrm>
           <a:prstGeom prst="rect">
             <a:avLst/>
@@ -12615,7 +12615,7 @@
               </a:rPr>
               <a:t>Learning Outcome</a:t>
             </a:r>
-            <a:endParaRPr b="0" lang="en-GB" sz="2400" spc="-1" strike="noStrike">
+            <a:endParaRPr b="0" lang="en-US" sz="2400" spc="-1" strike="noStrike">
               <a:solidFill>
                 <a:srgbClr val="000000"/>
               </a:solidFill>
@@ -12633,7 +12633,7 @@
         <p:spPr>
           <a:xfrm>
             <a:off x="335520" y="2408400"/>
-            <a:ext cx="10740600" cy="3888360"/>
+            <a:ext cx="10740240" cy="3888000"/>
           </a:xfrm>
           <a:prstGeom prst="rect">
             <a:avLst/>
@@ -12678,7 +12678,7 @@
               </a:rPr>
               <a:t>Basic understanding of the concept of the Linear Economy, the Circular Economy, the Performance Economy and sustainability</a:t>
             </a:r>
-            <a:endParaRPr b="0" lang="en-GB" sz="1800" spc="-1" strike="noStrike">
+            <a:endParaRPr b="0" lang="en-US" sz="1800" spc="-1" strike="noStrike">
               <a:solidFill>
                 <a:srgbClr val="000000"/>
               </a:solidFill>
@@ -12710,7 +12710,7 @@
               </a:rPr>
               <a:t>Basic understanding of new technologies in the field of decentralized and smart systems</a:t>
             </a:r>
-            <a:endParaRPr b="0" lang="en-GB" sz="1800" spc="-1" strike="noStrike">
+            <a:endParaRPr b="0" lang="en-US" sz="1800" spc="-1" strike="noStrike">
               <a:solidFill>
                 <a:srgbClr val="000000"/>
               </a:solidFill>
@@ -12742,7 +12742,7 @@
               </a:rPr>
               <a:t>Understanding and overview of the Internet of Things and related concepts</a:t>
             </a:r>
-            <a:endParaRPr b="0" lang="en-GB" sz="1800" spc="-1" strike="noStrike">
+            <a:endParaRPr b="0" lang="en-US" sz="1800" spc="-1" strike="noStrike">
               <a:solidFill>
                 <a:srgbClr val="000000"/>
               </a:solidFill>

</xml_diff>